<commit_message>
Add Unit 2 to PPT
</commit_message>
<xml_diff>
--- a/WPF-Workshop-Sexton-Oct2023.pptx
+++ b/WPF-Workshop-Sexton-Oct2023.pptx
@@ -5,7 +5,7 @@
     <p:sldMasterId id="2147483896" r:id="rId1"/>
   </p:sldMasterIdLst>
   <p:notesMasterIdLst>
-    <p:notesMasterId r:id="rId12"/>
+    <p:notesMasterId r:id="rId18"/>
   </p:notesMasterIdLst>
   <p:sldIdLst>
     <p:sldId id="256" r:id="rId2"/>
@@ -18,6 +18,12 @@
     <p:sldId id="264" r:id="rId9"/>
     <p:sldId id="265" r:id="rId10"/>
     <p:sldId id="266" r:id="rId11"/>
+    <p:sldId id="267" r:id="rId12"/>
+    <p:sldId id="268" r:id="rId13"/>
+    <p:sldId id="269" r:id="rId14"/>
+    <p:sldId id="270" r:id="rId15"/>
+    <p:sldId id="271" r:id="rId16"/>
+    <p:sldId id="272" r:id="rId17"/>
   </p:sldIdLst>
   <p:sldSz cx="12192000" cy="6858000"/>
   <p:notesSz cx="6858000" cy="9144000"/>
@@ -680,6 +686,619 @@
     <p:extLst>
       <p:ext uri="{BB962C8B-B14F-4D97-AF65-F5344CB8AC3E}">
         <p14:creationId xmlns:p14="http://schemas.microsoft.com/office/powerpoint/2010/main" val="1831641554"/>
+      </p:ext>
+    </p:extLst>
+  </p:cSld>
+  <p:clrMapOvr>
+    <a:masterClrMapping/>
+  </p:clrMapOvr>
+</p:notes>
+</file>
+
+<file path=ppt/notesSlides/notesSlide11.xml><?xml version="1.0" encoding="utf-8"?>
+<p:notes xmlns:a="http://schemas.openxmlformats.org/drawingml/2006/main" xmlns:r="http://schemas.openxmlformats.org/officeDocument/2006/relationships" xmlns:p="http://schemas.openxmlformats.org/presentationml/2006/main">
+  <p:cSld>
+    <p:spTree>
+      <p:nvGrpSpPr>
+        <p:cNvPr id="1" name=""/>
+        <p:cNvGrpSpPr/>
+        <p:nvPr/>
+      </p:nvGrpSpPr>
+      <p:grpSpPr>
+        <a:xfrm>
+          <a:off x="0" y="0"/>
+          <a:ext cx="0" cy="0"/>
+          <a:chOff x="0" y="0"/>
+          <a:chExt cx="0" cy="0"/>
+        </a:xfrm>
+      </p:grpSpPr>
+      <p:sp>
+        <p:nvSpPr>
+          <p:cNvPr id="2" name="Slide Image Placeholder 1"/>
+          <p:cNvSpPr>
+            <a:spLocks noGrp="1" noRot="1" noChangeAspect="1"/>
+          </p:cNvSpPr>
+          <p:nvPr>
+            <p:ph type="sldImg"/>
+          </p:nvPr>
+        </p:nvSpPr>
+        <p:spPr/>
+      </p:sp>
+      <p:sp>
+        <p:nvSpPr>
+          <p:cNvPr id="3" name="Notes Placeholder 2"/>
+          <p:cNvSpPr>
+            <a:spLocks noGrp="1"/>
+          </p:cNvSpPr>
+          <p:nvPr>
+            <p:ph type="body" idx="1"/>
+          </p:nvPr>
+        </p:nvSpPr>
+        <p:spPr/>
+        <p:txBody>
+          <a:bodyPr/>
+          <a:lstStyle/>
+          <a:p>
+            <a:endParaRPr lang="en-US" dirty="0"/>
+          </a:p>
+          <a:p>
+            <a:r>
+              <a:rPr lang="en-US" dirty="0"/>
+              <a:t>LAST: Example</a:t>
+            </a:r>
+          </a:p>
+          <a:p>
+            <a:r>
+              <a:rPr lang="en-US" dirty="0"/>
+              <a:t>Example</a:t>
+            </a:r>
+          </a:p>
+          <a:p>
+            <a:r>
+              <a:rPr lang="en-US" dirty="0"/>
+              <a:t>- Show: row/column definition, specifying which one</a:t>
+            </a:r>
+          </a:p>
+          <a:p>
+            <a:r>
+              <a:rPr lang="en-US" dirty="0"/>
+              <a:t>- </a:t>
+            </a:r>
+            <a:r>
+              <a:rPr lang="en-US" dirty="0" err="1"/>
+              <a:t>ShowGridLines</a:t>
+            </a:r>
+            <a:endParaRPr lang="en-US" dirty="0"/>
+          </a:p>
+          <a:p>
+            <a:r>
+              <a:rPr lang="en-US" dirty="0"/>
+              <a:t>- Runtime: show proportional sizing</a:t>
+            </a:r>
+          </a:p>
+        </p:txBody>
+      </p:sp>
+      <p:sp>
+        <p:nvSpPr>
+          <p:cNvPr id="4" name="Slide Number Placeholder 3"/>
+          <p:cNvSpPr>
+            <a:spLocks noGrp="1"/>
+          </p:cNvSpPr>
+          <p:nvPr>
+            <p:ph type="sldNum" sz="quarter" idx="5"/>
+          </p:nvPr>
+        </p:nvSpPr>
+        <p:spPr/>
+        <p:txBody>
+          <a:bodyPr/>
+          <a:lstStyle/>
+          <a:p>
+            <a:fld id="{52D86A8A-0D3B-4DD1-BCA4-15D29761E8A6}" type="slidenum">
+              <a:rPr lang="en-US" smtClean="0"/>
+              <a:t>11</a:t>
+            </a:fld>
+            <a:endParaRPr lang="en-US"/>
+          </a:p>
+        </p:txBody>
+      </p:sp>
+    </p:spTree>
+    <p:extLst>
+      <p:ext uri="{BB962C8B-B14F-4D97-AF65-F5344CB8AC3E}">
+        <p14:creationId xmlns:p14="http://schemas.microsoft.com/office/powerpoint/2010/main" val="499529802"/>
+      </p:ext>
+    </p:extLst>
+  </p:cSld>
+  <p:clrMapOvr>
+    <a:masterClrMapping/>
+  </p:clrMapOvr>
+</p:notes>
+</file>
+
+<file path=ppt/notesSlides/notesSlide12.xml><?xml version="1.0" encoding="utf-8"?>
+<p:notes xmlns:a="http://schemas.openxmlformats.org/drawingml/2006/main" xmlns:r="http://schemas.openxmlformats.org/officeDocument/2006/relationships" xmlns:p="http://schemas.openxmlformats.org/presentationml/2006/main">
+  <p:cSld>
+    <p:spTree>
+      <p:nvGrpSpPr>
+        <p:cNvPr id="1" name=""/>
+        <p:cNvGrpSpPr/>
+        <p:nvPr/>
+      </p:nvGrpSpPr>
+      <p:grpSpPr>
+        <a:xfrm>
+          <a:off x="0" y="0"/>
+          <a:ext cx="0" cy="0"/>
+          <a:chOff x="0" y="0"/>
+          <a:chExt cx="0" cy="0"/>
+        </a:xfrm>
+      </p:grpSpPr>
+      <p:sp>
+        <p:nvSpPr>
+          <p:cNvPr id="2" name="Slide Image Placeholder 1"/>
+          <p:cNvSpPr>
+            <a:spLocks noGrp="1" noRot="1" noChangeAspect="1"/>
+          </p:cNvSpPr>
+          <p:nvPr>
+            <p:ph type="sldImg"/>
+          </p:nvPr>
+        </p:nvSpPr>
+        <p:spPr/>
+      </p:sp>
+      <p:sp>
+        <p:nvSpPr>
+          <p:cNvPr id="3" name="Notes Placeholder 2"/>
+          <p:cNvSpPr>
+            <a:spLocks noGrp="1"/>
+          </p:cNvSpPr>
+          <p:nvPr>
+            <p:ph type="body" idx="1"/>
+          </p:nvPr>
+        </p:nvSpPr>
+        <p:spPr/>
+        <p:txBody>
+          <a:bodyPr/>
+          <a:lstStyle/>
+          <a:p>
+            <a:r>
+              <a:rPr lang="en-US" dirty="0"/>
+              <a:t>If each item - Think of the stars like tickets--you hand them out to rows/columns</a:t>
+            </a:r>
+          </a:p>
+          <a:p>
+            <a:r>
+              <a:rPr lang="en-US" dirty="0"/>
+              <a:t>    - The more stars you have, the more space you get</a:t>
+            </a:r>
+          </a:p>
+          <a:p>
+            <a:r>
+              <a:rPr lang="en-US" dirty="0"/>
+              <a:t>Example – Star Sizing</a:t>
+            </a:r>
+          </a:p>
+          <a:p>
+            <a:r>
+              <a:rPr lang="en-US" dirty="0"/>
+              <a:t>- Now we've explicitly given everybody 1 star, which is the default behavior if we don't specify anything</a:t>
+            </a:r>
+          </a:p>
+          <a:p>
+            <a:r>
+              <a:rPr lang="en-US" dirty="0"/>
+              <a:t>- Behavior at run=time is the same</a:t>
+            </a:r>
+          </a:p>
+          <a:p>
+            <a:r>
+              <a:rPr lang="en-US" dirty="0"/>
+              <a:t>LAST: Example – Proportional</a:t>
+            </a:r>
+          </a:p>
+          <a:p>
+            <a:r>
+              <a:rPr lang="en-US" dirty="0"/>
+              <a:t>- Talk through the example, showing XAML and runtime</a:t>
+            </a:r>
+          </a:p>
+          <a:p>
+            <a:endParaRPr lang="en-US" dirty="0"/>
+          </a:p>
+        </p:txBody>
+      </p:sp>
+      <p:sp>
+        <p:nvSpPr>
+          <p:cNvPr id="4" name="Slide Number Placeholder 3"/>
+          <p:cNvSpPr>
+            <a:spLocks noGrp="1"/>
+          </p:cNvSpPr>
+          <p:nvPr>
+            <p:ph type="sldNum" sz="quarter" idx="5"/>
+          </p:nvPr>
+        </p:nvSpPr>
+        <p:spPr/>
+        <p:txBody>
+          <a:bodyPr/>
+          <a:lstStyle/>
+          <a:p>
+            <a:fld id="{52D86A8A-0D3B-4DD1-BCA4-15D29761E8A6}" type="slidenum">
+              <a:rPr lang="en-US" smtClean="0"/>
+              <a:t>12</a:t>
+            </a:fld>
+            <a:endParaRPr lang="en-US"/>
+          </a:p>
+        </p:txBody>
+      </p:sp>
+    </p:spTree>
+    <p:extLst>
+      <p:ext uri="{BB962C8B-B14F-4D97-AF65-F5344CB8AC3E}">
+        <p14:creationId xmlns:p14="http://schemas.microsoft.com/office/powerpoint/2010/main" val="817398064"/>
+      </p:ext>
+    </p:extLst>
+  </p:cSld>
+  <p:clrMapOvr>
+    <a:masterClrMapping/>
+  </p:clrMapOvr>
+</p:notes>
+</file>
+
+<file path=ppt/notesSlides/notesSlide13.xml><?xml version="1.0" encoding="utf-8"?>
+<p:notes xmlns:a="http://schemas.openxmlformats.org/drawingml/2006/main" xmlns:r="http://schemas.openxmlformats.org/officeDocument/2006/relationships" xmlns:p="http://schemas.openxmlformats.org/presentationml/2006/main">
+  <p:cSld>
+    <p:spTree>
+      <p:nvGrpSpPr>
+        <p:cNvPr id="1" name=""/>
+        <p:cNvGrpSpPr/>
+        <p:nvPr/>
+      </p:nvGrpSpPr>
+      <p:grpSpPr>
+        <a:xfrm>
+          <a:off x="0" y="0"/>
+          <a:ext cx="0" cy="0"/>
+          <a:chOff x="0" y="0"/>
+          <a:chExt cx="0" cy="0"/>
+        </a:xfrm>
+      </p:grpSpPr>
+      <p:sp>
+        <p:nvSpPr>
+          <p:cNvPr id="2" name="Slide Image Placeholder 1"/>
+          <p:cNvSpPr>
+            <a:spLocks noGrp="1" noRot="1" noChangeAspect="1"/>
+          </p:cNvSpPr>
+          <p:nvPr>
+            <p:ph type="sldImg"/>
+          </p:nvPr>
+        </p:nvSpPr>
+        <p:spPr/>
+      </p:sp>
+      <p:sp>
+        <p:nvSpPr>
+          <p:cNvPr id="3" name="Notes Placeholder 2"/>
+          <p:cNvSpPr>
+            <a:spLocks noGrp="1"/>
+          </p:cNvSpPr>
+          <p:nvPr>
+            <p:ph type="body" idx="1"/>
+          </p:nvPr>
+        </p:nvSpPr>
+        <p:spPr/>
+        <p:txBody>
+          <a:bodyPr/>
+          <a:lstStyle/>
+          <a:p>
+            <a:r>
+              <a:rPr lang="en-US" dirty="0"/>
+              <a:t>LAST: Non-work areas</a:t>
+            </a:r>
+          </a:p>
+        </p:txBody>
+      </p:sp>
+      <p:sp>
+        <p:nvSpPr>
+          <p:cNvPr id="4" name="Slide Number Placeholder 3"/>
+          <p:cNvSpPr>
+            <a:spLocks noGrp="1"/>
+          </p:cNvSpPr>
+          <p:nvPr>
+            <p:ph type="sldNum" sz="quarter" idx="5"/>
+          </p:nvPr>
+        </p:nvSpPr>
+        <p:spPr/>
+        <p:txBody>
+          <a:bodyPr/>
+          <a:lstStyle/>
+          <a:p>
+            <a:fld id="{52D86A8A-0D3B-4DD1-BCA4-15D29761E8A6}" type="slidenum">
+              <a:rPr lang="en-US" smtClean="0"/>
+              <a:t>13</a:t>
+            </a:fld>
+            <a:endParaRPr lang="en-US"/>
+          </a:p>
+        </p:txBody>
+      </p:sp>
+    </p:spTree>
+    <p:extLst>
+      <p:ext uri="{BB962C8B-B14F-4D97-AF65-F5344CB8AC3E}">
+        <p14:creationId xmlns:p14="http://schemas.microsoft.com/office/powerpoint/2010/main" val="2654822554"/>
+      </p:ext>
+    </p:extLst>
+  </p:cSld>
+  <p:clrMapOvr>
+    <a:masterClrMapping/>
+  </p:clrMapOvr>
+</p:notes>
+</file>
+
+<file path=ppt/notesSlides/notesSlide14.xml><?xml version="1.0" encoding="utf-8"?>
+<p:notes xmlns:a="http://schemas.openxmlformats.org/drawingml/2006/main" xmlns:r="http://schemas.openxmlformats.org/officeDocument/2006/relationships" xmlns:p="http://schemas.openxmlformats.org/presentationml/2006/main">
+  <p:cSld>
+    <p:spTree>
+      <p:nvGrpSpPr>
+        <p:cNvPr id="1" name=""/>
+        <p:cNvGrpSpPr/>
+        <p:nvPr/>
+      </p:nvGrpSpPr>
+      <p:grpSpPr>
+        <a:xfrm>
+          <a:off x="0" y="0"/>
+          <a:ext cx="0" cy="0"/>
+          <a:chOff x="0" y="0"/>
+          <a:chExt cx="0" cy="0"/>
+        </a:xfrm>
+      </p:grpSpPr>
+      <p:sp>
+        <p:nvSpPr>
+          <p:cNvPr id="2" name="Slide Image Placeholder 1"/>
+          <p:cNvSpPr>
+            <a:spLocks noGrp="1" noRot="1" noChangeAspect="1"/>
+          </p:cNvSpPr>
+          <p:nvPr>
+            <p:ph type="sldImg"/>
+          </p:nvPr>
+        </p:nvSpPr>
+        <p:spPr/>
+      </p:sp>
+      <p:sp>
+        <p:nvSpPr>
+          <p:cNvPr id="3" name="Notes Placeholder 2"/>
+          <p:cNvSpPr>
+            <a:spLocks noGrp="1"/>
+          </p:cNvSpPr>
+          <p:nvPr>
+            <p:ph type="body" idx="1"/>
+          </p:nvPr>
+        </p:nvSpPr>
+        <p:spPr/>
+        <p:txBody>
+          <a:bodyPr/>
+          <a:lstStyle/>
+          <a:p>
+            <a:r>
+              <a:rPr lang="en-US" dirty="0"/>
+              <a:t>Discouraged - Like avoiding absolute height and width of controls themselves</a:t>
+            </a:r>
+          </a:p>
+          <a:p>
+            <a:r>
+              <a:rPr lang="en-US" dirty="0"/>
+              <a:t>LAST: Example</a:t>
+            </a:r>
+          </a:p>
+          <a:p>
+            <a:r>
+              <a:rPr lang="en-US" dirty="0"/>
+              <a:t>- Note absolute row height</a:t>
+            </a:r>
+          </a:p>
+          <a:p>
+            <a:r>
+              <a:rPr lang="en-US" dirty="0"/>
+              <a:t>- Note - can also do Auto and add Margin to get what you want</a:t>
+            </a:r>
+          </a:p>
+        </p:txBody>
+      </p:sp>
+      <p:sp>
+        <p:nvSpPr>
+          <p:cNvPr id="4" name="Slide Number Placeholder 3"/>
+          <p:cNvSpPr>
+            <a:spLocks noGrp="1"/>
+          </p:cNvSpPr>
+          <p:nvPr>
+            <p:ph type="sldNum" sz="quarter" idx="5"/>
+          </p:nvPr>
+        </p:nvSpPr>
+        <p:spPr/>
+        <p:txBody>
+          <a:bodyPr/>
+          <a:lstStyle/>
+          <a:p>
+            <a:fld id="{52D86A8A-0D3B-4DD1-BCA4-15D29761E8A6}" type="slidenum">
+              <a:rPr lang="en-US" smtClean="0"/>
+              <a:t>14</a:t>
+            </a:fld>
+            <a:endParaRPr lang="en-US"/>
+          </a:p>
+        </p:txBody>
+      </p:sp>
+    </p:spTree>
+    <p:extLst>
+      <p:ext uri="{BB962C8B-B14F-4D97-AF65-F5344CB8AC3E}">
+        <p14:creationId xmlns:p14="http://schemas.microsoft.com/office/powerpoint/2010/main" val="2544998634"/>
+      </p:ext>
+    </p:extLst>
+  </p:cSld>
+  <p:clrMapOvr>
+    <a:masterClrMapping/>
+  </p:clrMapOvr>
+</p:notes>
+</file>
+
+<file path=ppt/notesSlides/notesSlide15.xml><?xml version="1.0" encoding="utf-8"?>
+<p:notes xmlns:a="http://schemas.openxmlformats.org/drawingml/2006/main" xmlns:r="http://schemas.openxmlformats.org/officeDocument/2006/relationships" xmlns:p="http://schemas.openxmlformats.org/presentationml/2006/main">
+  <p:cSld>
+    <p:spTree>
+      <p:nvGrpSpPr>
+        <p:cNvPr id="1" name=""/>
+        <p:cNvGrpSpPr/>
+        <p:nvPr/>
+      </p:nvGrpSpPr>
+      <p:grpSpPr>
+        <a:xfrm>
+          <a:off x="0" y="0"/>
+          <a:ext cx="0" cy="0"/>
+          <a:chOff x="0" y="0"/>
+          <a:chExt cx="0" cy="0"/>
+        </a:xfrm>
+      </p:grpSpPr>
+      <p:sp>
+        <p:nvSpPr>
+          <p:cNvPr id="2" name="Slide Image Placeholder 1"/>
+          <p:cNvSpPr>
+            <a:spLocks noGrp="1" noRot="1" noChangeAspect="1"/>
+          </p:cNvSpPr>
+          <p:nvPr>
+            <p:ph type="sldImg"/>
+          </p:nvPr>
+        </p:nvSpPr>
+        <p:spPr/>
+      </p:sp>
+      <p:sp>
+        <p:nvSpPr>
+          <p:cNvPr id="3" name="Notes Placeholder 2"/>
+          <p:cNvSpPr>
+            <a:spLocks noGrp="1"/>
+          </p:cNvSpPr>
+          <p:nvPr>
+            <p:ph type="body" idx="1"/>
+          </p:nvPr>
+        </p:nvSpPr>
+        <p:spPr/>
+        <p:txBody>
+          <a:bodyPr/>
+          <a:lstStyle/>
+          <a:p>
+            <a:r>
+              <a:rPr lang="en-US" dirty="0"/>
+              <a:t>LAST: </a:t>
+            </a:r>
+            <a:r>
+              <a:rPr lang="en-US" dirty="0" err="1"/>
+              <a:t>Grid.RowSpan</a:t>
+            </a:r>
+            <a:endParaRPr lang="en-US" dirty="0"/>
+          </a:p>
+        </p:txBody>
+      </p:sp>
+      <p:sp>
+        <p:nvSpPr>
+          <p:cNvPr id="4" name="Slide Number Placeholder 3"/>
+          <p:cNvSpPr>
+            <a:spLocks noGrp="1"/>
+          </p:cNvSpPr>
+          <p:nvPr>
+            <p:ph type="sldNum" sz="quarter" idx="5"/>
+          </p:nvPr>
+        </p:nvSpPr>
+        <p:spPr/>
+        <p:txBody>
+          <a:bodyPr/>
+          <a:lstStyle/>
+          <a:p>
+            <a:fld id="{52D86A8A-0D3B-4DD1-BCA4-15D29761E8A6}" type="slidenum">
+              <a:rPr lang="en-US" smtClean="0"/>
+              <a:t>15</a:t>
+            </a:fld>
+            <a:endParaRPr lang="en-US"/>
+          </a:p>
+        </p:txBody>
+      </p:sp>
+    </p:spTree>
+    <p:extLst>
+      <p:ext uri="{BB962C8B-B14F-4D97-AF65-F5344CB8AC3E}">
+        <p14:creationId xmlns:p14="http://schemas.microsoft.com/office/powerpoint/2010/main" val="3263694143"/>
+      </p:ext>
+    </p:extLst>
+  </p:cSld>
+  <p:clrMapOvr>
+    <a:masterClrMapping/>
+  </p:clrMapOvr>
+</p:notes>
+</file>
+
+<file path=ppt/notesSlides/notesSlide16.xml><?xml version="1.0" encoding="utf-8"?>
+<p:notes xmlns:a="http://schemas.openxmlformats.org/drawingml/2006/main" xmlns:r="http://schemas.openxmlformats.org/officeDocument/2006/relationships" xmlns:p="http://schemas.openxmlformats.org/presentationml/2006/main">
+  <p:cSld>
+    <p:spTree>
+      <p:nvGrpSpPr>
+        <p:cNvPr id="1" name=""/>
+        <p:cNvGrpSpPr/>
+        <p:nvPr/>
+      </p:nvGrpSpPr>
+      <p:grpSpPr>
+        <a:xfrm>
+          <a:off x="0" y="0"/>
+          <a:ext cx="0" cy="0"/>
+          <a:chOff x="0" y="0"/>
+          <a:chExt cx="0" cy="0"/>
+        </a:xfrm>
+      </p:grpSpPr>
+      <p:sp>
+        <p:nvSpPr>
+          <p:cNvPr id="2" name="Slide Image Placeholder 1"/>
+          <p:cNvSpPr>
+            <a:spLocks noGrp="1" noRot="1" noChangeAspect="1"/>
+          </p:cNvSpPr>
+          <p:nvPr>
+            <p:ph type="sldImg"/>
+          </p:nvPr>
+        </p:nvSpPr>
+        <p:spPr/>
+      </p:sp>
+      <p:sp>
+        <p:nvSpPr>
+          <p:cNvPr id="3" name="Notes Placeholder 2"/>
+          <p:cNvSpPr>
+            <a:spLocks noGrp="1"/>
+          </p:cNvSpPr>
+          <p:nvPr>
+            <p:ph type="body" idx="1"/>
+          </p:nvPr>
+        </p:nvSpPr>
+        <p:spPr/>
+        <p:txBody>
+          <a:bodyPr/>
+          <a:lstStyle/>
+          <a:p>
+            <a:endParaRPr lang="en-US" dirty="0"/>
+          </a:p>
+        </p:txBody>
+      </p:sp>
+      <p:sp>
+        <p:nvSpPr>
+          <p:cNvPr id="4" name="Slide Number Placeholder 3"/>
+          <p:cNvSpPr>
+            <a:spLocks noGrp="1"/>
+          </p:cNvSpPr>
+          <p:nvPr>
+            <p:ph type="sldNum" sz="quarter" idx="5"/>
+          </p:nvPr>
+        </p:nvSpPr>
+        <p:spPr/>
+        <p:txBody>
+          <a:bodyPr/>
+          <a:lstStyle/>
+          <a:p>
+            <a:fld id="{52D86A8A-0D3B-4DD1-BCA4-15D29761E8A6}" type="slidenum">
+              <a:rPr lang="en-US" smtClean="0"/>
+              <a:t>16</a:t>
+            </a:fld>
+            <a:endParaRPr lang="en-US"/>
+          </a:p>
+        </p:txBody>
+      </p:sp>
+    </p:spTree>
+    <p:extLst>
+      <p:ext uri="{BB962C8B-B14F-4D97-AF65-F5344CB8AC3E}">
+        <p14:creationId xmlns:p14="http://schemas.microsoft.com/office/powerpoint/2010/main" val="3154407502"/>
       </p:ext>
     </p:extLst>
   </p:cSld>
@@ -9435,6 +10054,2895 @@
 </p:sld>
 </file>
 
+<file path=ppt/slides/slide11.xml><?xml version="1.0" encoding="utf-8"?>
+<p:sld xmlns:a="http://schemas.openxmlformats.org/drawingml/2006/main" xmlns:r="http://schemas.openxmlformats.org/officeDocument/2006/relationships" xmlns:p="http://schemas.openxmlformats.org/presentationml/2006/main">
+  <p:cSld>
+    <p:spTree>
+      <p:nvGrpSpPr>
+        <p:cNvPr id="1" name=""/>
+        <p:cNvGrpSpPr/>
+        <p:nvPr/>
+      </p:nvGrpSpPr>
+      <p:grpSpPr>
+        <a:xfrm>
+          <a:off x="0" y="0"/>
+          <a:ext cx="0" cy="0"/>
+          <a:chOff x="0" y="0"/>
+          <a:chExt cx="0" cy="0"/>
+        </a:xfrm>
+      </p:grpSpPr>
+      <p:sp>
+        <p:nvSpPr>
+          <p:cNvPr id="2" name="Title 1">
+            <a:extLst>
+              <a:ext uri="{FF2B5EF4-FFF2-40B4-BE49-F238E27FC236}">
+                <a16:creationId xmlns:a16="http://schemas.microsoft.com/office/drawing/2014/main" id="{CFF52108-31ED-81D5-1083-9B81433CE081}"/>
+              </a:ext>
+            </a:extLst>
+          </p:cNvPr>
+          <p:cNvSpPr>
+            <a:spLocks noGrp="1"/>
+          </p:cNvSpPr>
+          <p:nvPr>
+            <p:ph type="title"/>
+          </p:nvPr>
+        </p:nvSpPr>
+        <p:spPr/>
+        <p:txBody>
+          <a:bodyPr/>
+          <a:lstStyle/>
+          <a:p>
+            <a:r>
+              <a:rPr lang="en-US" dirty="0"/>
+              <a:t>Unit 2 – Layout Using Grid</a:t>
+            </a:r>
+          </a:p>
+        </p:txBody>
+      </p:sp>
+      <p:sp>
+        <p:nvSpPr>
+          <p:cNvPr id="3" name="Content Placeholder 2">
+            <a:extLst>
+              <a:ext uri="{FF2B5EF4-FFF2-40B4-BE49-F238E27FC236}">
+                <a16:creationId xmlns:a16="http://schemas.microsoft.com/office/drawing/2014/main" id="{064CD27E-8536-2493-C445-126233A83B5E}"/>
+              </a:ext>
+            </a:extLst>
+          </p:cNvPr>
+          <p:cNvSpPr>
+            <a:spLocks noGrp="1"/>
+          </p:cNvSpPr>
+          <p:nvPr>
+            <p:ph idx="1"/>
+          </p:nvPr>
+        </p:nvSpPr>
+        <p:spPr/>
+        <p:txBody>
+          <a:bodyPr/>
+          <a:lstStyle/>
+          <a:p>
+            <a:r>
+              <a:rPr lang="en-US" dirty="0"/>
+              <a:t>Review – </a:t>
+            </a:r>
+            <a:r>
+              <a:rPr lang="en-US" dirty="0" err="1"/>
+              <a:t>StackPanel</a:t>
+            </a:r>
+            <a:endParaRPr lang="en-US" dirty="0"/>
+          </a:p>
+          <a:p>
+            <a:pPr lvl="1"/>
+            <a:r>
+              <a:rPr lang="en-US" dirty="0" err="1"/>
+              <a:t>StackPanel</a:t>
+            </a:r>
+            <a:r>
+              <a:rPr lang="en-US" dirty="0"/>
+              <a:t> good when you want controls in line, one right after the other</a:t>
+            </a:r>
+          </a:p>
+          <a:p>
+            <a:pPr lvl="1"/>
+            <a:r>
+              <a:rPr lang="en-US" dirty="0"/>
+              <a:t>But harder to line things up</a:t>
+            </a:r>
+          </a:p>
+          <a:p>
+            <a:r>
+              <a:rPr lang="en-US" dirty="0"/>
+              <a:t>Grid -- layout in rows and columns</a:t>
+            </a:r>
+          </a:p>
+          <a:p>
+            <a:pPr lvl="1"/>
+            <a:r>
+              <a:rPr lang="en-US" dirty="0"/>
+              <a:t>Create definitions for rows and columns</a:t>
+            </a:r>
+          </a:p>
+          <a:p>
+            <a:pPr lvl="1"/>
+            <a:r>
+              <a:rPr lang="en-US" dirty="0"/>
+              <a:t>Place child controls inside &lt;Grid&gt; element</a:t>
+            </a:r>
+          </a:p>
+          <a:p>
+            <a:pPr lvl="1"/>
+            <a:r>
+              <a:rPr lang="en-US" dirty="0"/>
+              <a:t>For each child, specify Row and Column  (0-based)</a:t>
+            </a:r>
+          </a:p>
+          <a:p>
+            <a:r>
+              <a:rPr lang="en-US" dirty="0">
+                <a:solidFill>
+                  <a:srgbClr val="00B050"/>
+                </a:solidFill>
+              </a:rPr>
+              <a:t>Example – Grid with Child Elements</a:t>
+            </a:r>
+          </a:p>
+        </p:txBody>
+      </p:sp>
+    </p:spTree>
+    <p:extLst>
+      <p:ext uri="{BB962C8B-B14F-4D97-AF65-F5344CB8AC3E}">
+        <p14:creationId xmlns:p14="http://schemas.microsoft.com/office/powerpoint/2010/main" val="646441358"/>
+      </p:ext>
+    </p:extLst>
+  </p:cSld>
+  <p:clrMapOvr>
+    <a:masterClrMapping/>
+  </p:clrMapOvr>
+  <p:timing>
+    <p:tnLst>
+      <p:par>
+        <p:cTn id="1" dur="indefinite" restart="never" nodeType="tmRoot">
+          <p:childTnLst>
+            <p:seq concurrent="1" nextAc="seek">
+              <p:cTn id="2" dur="indefinite" nodeType="mainSeq">
+                <p:childTnLst>
+                  <p:par>
+                    <p:cTn id="3" fill="hold">
+                      <p:stCondLst>
+                        <p:cond delay="indefinite"/>
+                      </p:stCondLst>
+                      <p:childTnLst>
+                        <p:par>
+                          <p:cTn id="4" fill="hold">
+                            <p:stCondLst>
+                              <p:cond delay="0"/>
+                            </p:stCondLst>
+                            <p:childTnLst>
+                              <p:par>
+                                <p:cTn id="5" presetID="10" presetClass="entr" presetSubtype="0" fill="hold" grpId="0" nodeType="clickEffect">
+                                  <p:stCondLst>
+                                    <p:cond delay="0"/>
+                                  </p:stCondLst>
+                                  <p:childTnLst>
+                                    <p:set>
+                                      <p:cBhvr>
+                                        <p:cTn id="6" dur="1" fill="hold">
+                                          <p:stCondLst>
+                                            <p:cond delay="0"/>
+                                          </p:stCondLst>
+                                        </p:cTn>
+                                        <p:tgtEl>
+                                          <p:spTgt spid="3">
+                                            <p:txEl>
+                                              <p:pRg st="0" end="0"/>
+                                            </p:txEl>
+                                          </p:spTgt>
+                                        </p:tgtEl>
+                                        <p:attrNameLst>
+                                          <p:attrName>style.visibility</p:attrName>
+                                        </p:attrNameLst>
+                                      </p:cBhvr>
+                                      <p:to>
+                                        <p:strVal val="visible"/>
+                                      </p:to>
+                                    </p:set>
+                                    <p:animEffect transition="in" filter="fade">
+                                      <p:cBhvr>
+                                        <p:cTn id="7" dur="500"/>
+                                        <p:tgtEl>
+                                          <p:spTgt spid="3">
+                                            <p:txEl>
+                                              <p:pRg st="0" end="0"/>
+                                            </p:txEl>
+                                          </p:spTgt>
+                                        </p:tgtEl>
+                                      </p:cBhvr>
+                                    </p:animEffect>
+                                  </p:childTnLst>
+                                </p:cTn>
+                              </p:par>
+                              <p:par>
+                                <p:cTn id="8" presetID="10" presetClass="entr" presetSubtype="0" fill="hold" grpId="0" nodeType="withEffect">
+                                  <p:stCondLst>
+                                    <p:cond delay="0"/>
+                                  </p:stCondLst>
+                                  <p:childTnLst>
+                                    <p:set>
+                                      <p:cBhvr>
+                                        <p:cTn id="9" dur="1" fill="hold">
+                                          <p:stCondLst>
+                                            <p:cond delay="0"/>
+                                          </p:stCondLst>
+                                        </p:cTn>
+                                        <p:tgtEl>
+                                          <p:spTgt spid="3">
+                                            <p:txEl>
+                                              <p:pRg st="1" end="1"/>
+                                            </p:txEl>
+                                          </p:spTgt>
+                                        </p:tgtEl>
+                                        <p:attrNameLst>
+                                          <p:attrName>style.visibility</p:attrName>
+                                        </p:attrNameLst>
+                                      </p:cBhvr>
+                                      <p:to>
+                                        <p:strVal val="visible"/>
+                                      </p:to>
+                                    </p:set>
+                                    <p:animEffect transition="in" filter="fade">
+                                      <p:cBhvr>
+                                        <p:cTn id="10" dur="500"/>
+                                        <p:tgtEl>
+                                          <p:spTgt spid="3">
+                                            <p:txEl>
+                                              <p:pRg st="1" end="1"/>
+                                            </p:txEl>
+                                          </p:spTgt>
+                                        </p:tgtEl>
+                                      </p:cBhvr>
+                                    </p:animEffect>
+                                  </p:childTnLst>
+                                </p:cTn>
+                              </p:par>
+                              <p:par>
+                                <p:cTn id="11" presetID="10" presetClass="entr" presetSubtype="0" fill="hold" grpId="0" nodeType="withEffect">
+                                  <p:stCondLst>
+                                    <p:cond delay="0"/>
+                                  </p:stCondLst>
+                                  <p:childTnLst>
+                                    <p:set>
+                                      <p:cBhvr>
+                                        <p:cTn id="12" dur="1" fill="hold">
+                                          <p:stCondLst>
+                                            <p:cond delay="0"/>
+                                          </p:stCondLst>
+                                        </p:cTn>
+                                        <p:tgtEl>
+                                          <p:spTgt spid="3">
+                                            <p:txEl>
+                                              <p:pRg st="2" end="2"/>
+                                            </p:txEl>
+                                          </p:spTgt>
+                                        </p:tgtEl>
+                                        <p:attrNameLst>
+                                          <p:attrName>style.visibility</p:attrName>
+                                        </p:attrNameLst>
+                                      </p:cBhvr>
+                                      <p:to>
+                                        <p:strVal val="visible"/>
+                                      </p:to>
+                                    </p:set>
+                                    <p:animEffect transition="in" filter="fade">
+                                      <p:cBhvr>
+                                        <p:cTn id="13" dur="500"/>
+                                        <p:tgtEl>
+                                          <p:spTgt spid="3">
+                                            <p:txEl>
+                                              <p:pRg st="2" end="2"/>
+                                            </p:txEl>
+                                          </p:spTgt>
+                                        </p:tgtEl>
+                                      </p:cBhvr>
+                                    </p:animEffect>
+                                  </p:childTnLst>
+                                </p:cTn>
+                              </p:par>
+                            </p:childTnLst>
+                          </p:cTn>
+                        </p:par>
+                      </p:childTnLst>
+                    </p:cTn>
+                  </p:par>
+                  <p:par>
+                    <p:cTn id="14" fill="hold">
+                      <p:stCondLst>
+                        <p:cond delay="indefinite"/>
+                      </p:stCondLst>
+                      <p:childTnLst>
+                        <p:par>
+                          <p:cTn id="15" fill="hold">
+                            <p:stCondLst>
+                              <p:cond delay="0"/>
+                            </p:stCondLst>
+                            <p:childTnLst>
+                              <p:par>
+                                <p:cTn id="16" presetID="10" presetClass="entr" presetSubtype="0" fill="hold" grpId="0" nodeType="clickEffect">
+                                  <p:stCondLst>
+                                    <p:cond delay="0"/>
+                                  </p:stCondLst>
+                                  <p:childTnLst>
+                                    <p:set>
+                                      <p:cBhvr>
+                                        <p:cTn id="17" dur="1" fill="hold">
+                                          <p:stCondLst>
+                                            <p:cond delay="0"/>
+                                          </p:stCondLst>
+                                        </p:cTn>
+                                        <p:tgtEl>
+                                          <p:spTgt spid="3">
+                                            <p:txEl>
+                                              <p:pRg st="3" end="3"/>
+                                            </p:txEl>
+                                          </p:spTgt>
+                                        </p:tgtEl>
+                                        <p:attrNameLst>
+                                          <p:attrName>style.visibility</p:attrName>
+                                        </p:attrNameLst>
+                                      </p:cBhvr>
+                                      <p:to>
+                                        <p:strVal val="visible"/>
+                                      </p:to>
+                                    </p:set>
+                                    <p:animEffect transition="in" filter="fade">
+                                      <p:cBhvr>
+                                        <p:cTn id="18" dur="500"/>
+                                        <p:tgtEl>
+                                          <p:spTgt spid="3">
+                                            <p:txEl>
+                                              <p:pRg st="3" end="3"/>
+                                            </p:txEl>
+                                          </p:spTgt>
+                                        </p:tgtEl>
+                                      </p:cBhvr>
+                                    </p:animEffect>
+                                  </p:childTnLst>
+                                </p:cTn>
+                              </p:par>
+                              <p:par>
+                                <p:cTn id="19" presetID="10" presetClass="entr" presetSubtype="0" fill="hold" grpId="0" nodeType="withEffect">
+                                  <p:stCondLst>
+                                    <p:cond delay="0"/>
+                                  </p:stCondLst>
+                                  <p:childTnLst>
+                                    <p:set>
+                                      <p:cBhvr>
+                                        <p:cTn id="20" dur="1" fill="hold">
+                                          <p:stCondLst>
+                                            <p:cond delay="0"/>
+                                          </p:stCondLst>
+                                        </p:cTn>
+                                        <p:tgtEl>
+                                          <p:spTgt spid="3">
+                                            <p:txEl>
+                                              <p:pRg st="4" end="4"/>
+                                            </p:txEl>
+                                          </p:spTgt>
+                                        </p:tgtEl>
+                                        <p:attrNameLst>
+                                          <p:attrName>style.visibility</p:attrName>
+                                        </p:attrNameLst>
+                                      </p:cBhvr>
+                                      <p:to>
+                                        <p:strVal val="visible"/>
+                                      </p:to>
+                                    </p:set>
+                                    <p:animEffect transition="in" filter="fade">
+                                      <p:cBhvr>
+                                        <p:cTn id="21" dur="500"/>
+                                        <p:tgtEl>
+                                          <p:spTgt spid="3">
+                                            <p:txEl>
+                                              <p:pRg st="4" end="4"/>
+                                            </p:txEl>
+                                          </p:spTgt>
+                                        </p:tgtEl>
+                                      </p:cBhvr>
+                                    </p:animEffect>
+                                  </p:childTnLst>
+                                </p:cTn>
+                              </p:par>
+                              <p:par>
+                                <p:cTn id="22" presetID="10" presetClass="entr" presetSubtype="0" fill="hold" grpId="0" nodeType="withEffect">
+                                  <p:stCondLst>
+                                    <p:cond delay="0"/>
+                                  </p:stCondLst>
+                                  <p:childTnLst>
+                                    <p:set>
+                                      <p:cBhvr>
+                                        <p:cTn id="23" dur="1" fill="hold">
+                                          <p:stCondLst>
+                                            <p:cond delay="0"/>
+                                          </p:stCondLst>
+                                        </p:cTn>
+                                        <p:tgtEl>
+                                          <p:spTgt spid="3">
+                                            <p:txEl>
+                                              <p:pRg st="5" end="5"/>
+                                            </p:txEl>
+                                          </p:spTgt>
+                                        </p:tgtEl>
+                                        <p:attrNameLst>
+                                          <p:attrName>style.visibility</p:attrName>
+                                        </p:attrNameLst>
+                                      </p:cBhvr>
+                                      <p:to>
+                                        <p:strVal val="visible"/>
+                                      </p:to>
+                                    </p:set>
+                                    <p:animEffect transition="in" filter="fade">
+                                      <p:cBhvr>
+                                        <p:cTn id="24" dur="500"/>
+                                        <p:tgtEl>
+                                          <p:spTgt spid="3">
+                                            <p:txEl>
+                                              <p:pRg st="5" end="5"/>
+                                            </p:txEl>
+                                          </p:spTgt>
+                                        </p:tgtEl>
+                                      </p:cBhvr>
+                                    </p:animEffect>
+                                  </p:childTnLst>
+                                </p:cTn>
+                              </p:par>
+                              <p:par>
+                                <p:cTn id="25" presetID="10" presetClass="entr" presetSubtype="0" fill="hold" grpId="0" nodeType="withEffect">
+                                  <p:stCondLst>
+                                    <p:cond delay="0"/>
+                                  </p:stCondLst>
+                                  <p:childTnLst>
+                                    <p:set>
+                                      <p:cBhvr>
+                                        <p:cTn id="26" dur="1" fill="hold">
+                                          <p:stCondLst>
+                                            <p:cond delay="0"/>
+                                          </p:stCondLst>
+                                        </p:cTn>
+                                        <p:tgtEl>
+                                          <p:spTgt spid="3">
+                                            <p:txEl>
+                                              <p:pRg st="6" end="6"/>
+                                            </p:txEl>
+                                          </p:spTgt>
+                                        </p:tgtEl>
+                                        <p:attrNameLst>
+                                          <p:attrName>style.visibility</p:attrName>
+                                        </p:attrNameLst>
+                                      </p:cBhvr>
+                                      <p:to>
+                                        <p:strVal val="visible"/>
+                                      </p:to>
+                                    </p:set>
+                                    <p:animEffect transition="in" filter="fade">
+                                      <p:cBhvr>
+                                        <p:cTn id="27" dur="500"/>
+                                        <p:tgtEl>
+                                          <p:spTgt spid="3">
+                                            <p:txEl>
+                                              <p:pRg st="6" end="6"/>
+                                            </p:txEl>
+                                          </p:spTgt>
+                                        </p:tgtEl>
+                                      </p:cBhvr>
+                                    </p:animEffect>
+                                  </p:childTnLst>
+                                </p:cTn>
+                              </p:par>
+                            </p:childTnLst>
+                          </p:cTn>
+                        </p:par>
+                      </p:childTnLst>
+                    </p:cTn>
+                  </p:par>
+                  <p:par>
+                    <p:cTn id="28" fill="hold">
+                      <p:stCondLst>
+                        <p:cond delay="indefinite"/>
+                      </p:stCondLst>
+                      <p:childTnLst>
+                        <p:par>
+                          <p:cTn id="29" fill="hold">
+                            <p:stCondLst>
+                              <p:cond delay="0"/>
+                            </p:stCondLst>
+                            <p:childTnLst>
+                              <p:par>
+                                <p:cTn id="30" presetID="10" presetClass="entr" presetSubtype="0" fill="hold" grpId="0" nodeType="clickEffect">
+                                  <p:stCondLst>
+                                    <p:cond delay="0"/>
+                                  </p:stCondLst>
+                                  <p:childTnLst>
+                                    <p:set>
+                                      <p:cBhvr>
+                                        <p:cTn id="31" dur="1" fill="hold">
+                                          <p:stCondLst>
+                                            <p:cond delay="0"/>
+                                          </p:stCondLst>
+                                        </p:cTn>
+                                        <p:tgtEl>
+                                          <p:spTgt spid="3">
+                                            <p:txEl>
+                                              <p:pRg st="7" end="7"/>
+                                            </p:txEl>
+                                          </p:spTgt>
+                                        </p:tgtEl>
+                                        <p:attrNameLst>
+                                          <p:attrName>style.visibility</p:attrName>
+                                        </p:attrNameLst>
+                                      </p:cBhvr>
+                                      <p:to>
+                                        <p:strVal val="visible"/>
+                                      </p:to>
+                                    </p:set>
+                                    <p:animEffect transition="in" filter="fade">
+                                      <p:cBhvr>
+                                        <p:cTn id="32" dur="500"/>
+                                        <p:tgtEl>
+                                          <p:spTgt spid="3">
+                                            <p:txEl>
+                                              <p:pRg st="7" end="7"/>
+                                            </p:txEl>
+                                          </p:spTgt>
+                                        </p:tgtEl>
+                                      </p:cBhvr>
+                                    </p:animEffect>
+                                  </p:childTnLst>
+                                </p:cTn>
+                              </p:par>
+                            </p:childTnLst>
+                          </p:cTn>
+                        </p:par>
+                      </p:childTnLst>
+                    </p:cTn>
+                  </p:par>
+                </p:childTnLst>
+              </p:cTn>
+              <p:prevCondLst>
+                <p:cond evt="onPrev" delay="0">
+                  <p:tgtEl>
+                    <p:sldTgt/>
+                  </p:tgtEl>
+                </p:cond>
+              </p:prevCondLst>
+              <p:nextCondLst>
+                <p:cond evt="onNext" delay="0">
+                  <p:tgtEl>
+                    <p:sldTgt/>
+                  </p:tgtEl>
+                </p:cond>
+              </p:nextCondLst>
+            </p:seq>
+          </p:childTnLst>
+        </p:cTn>
+      </p:par>
+    </p:tnLst>
+    <p:bldLst>
+      <p:bldP spid="3" grpId="0" uiExpand="1" build="p"/>
+    </p:bldLst>
+  </p:timing>
+</p:sld>
+</file>
+
+<file path=ppt/slides/slide12.xml><?xml version="1.0" encoding="utf-8"?>
+<p:sld xmlns:a="http://schemas.openxmlformats.org/drawingml/2006/main" xmlns:r="http://schemas.openxmlformats.org/officeDocument/2006/relationships" xmlns:p="http://schemas.openxmlformats.org/presentationml/2006/main">
+  <p:cSld>
+    <p:spTree>
+      <p:nvGrpSpPr>
+        <p:cNvPr id="1" name=""/>
+        <p:cNvGrpSpPr/>
+        <p:nvPr/>
+      </p:nvGrpSpPr>
+      <p:grpSpPr>
+        <a:xfrm>
+          <a:off x="0" y="0"/>
+          <a:ext cx="0" cy="0"/>
+          <a:chOff x="0" y="0"/>
+          <a:chExt cx="0" cy="0"/>
+        </a:xfrm>
+      </p:grpSpPr>
+      <p:sp>
+        <p:nvSpPr>
+          <p:cNvPr id="2" name="Title 1">
+            <a:extLst>
+              <a:ext uri="{FF2B5EF4-FFF2-40B4-BE49-F238E27FC236}">
+                <a16:creationId xmlns:a16="http://schemas.microsoft.com/office/drawing/2014/main" id="{EC4C1BBA-418D-4C93-7A53-4A6DB9EC9FD1}"/>
+              </a:ext>
+            </a:extLst>
+          </p:cNvPr>
+          <p:cNvSpPr>
+            <a:spLocks noGrp="1"/>
+          </p:cNvSpPr>
+          <p:nvPr>
+            <p:ph type="title"/>
+          </p:nvPr>
+        </p:nvSpPr>
+        <p:spPr/>
+        <p:txBody>
+          <a:bodyPr/>
+          <a:lstStyle/>
+          <a:p>
+            <a:r>
+              <a:rPr lang="en-US" dirty="0"/>
+              <a:t>Unit 2 – Layout Using Grid</a:t>
+            </a:r>
+          </a:p>
+        </p:txBody>
+      </p:sp>
+      <p:sp>
+        <p:nvSpPr>
+          <p:cNvPr id="3" name="Content Placeholder 2">
+            <a:extLst>
+              <a:ext uri="{FF2B5EF4-FFF2-40B4-BE49-F238E27FC236}">
+                <a16:creationId xmlns:a16="http://schemas.microsoft.com/office/drawing/2014/main" id="{9D0A5760-A86C-7636-AE58-4122E4AB4254}"/>
+              </a:ext>
+            </a:extLst>
+          </p:cNvPr>
+          <p:cNvSpPr>
+            <a:spLocks noGrp="1"/>
+          </p:cNvSpPr>
+          <p:nvPr>
+            <p:ph idx="1"/>
+          </p:nvPr>
+        </p:nvSpPr>
+        <p:spPr/>
+        <p:txBody>
+          <a:bodyPr/>
+          <a:lstStyle/>
+          <a:p>
+            <a:r>
+              <a:rPr lang="en-US" dirty="0"/>
+              <a:t>Grid - Proportional Sizing	</a:t>
+            </a:r>
+          </a:p>
+          <a:p>
+            <a:pPr lvl="1"/>
+            <a:r>
+              <a:rPr lang="en-US" dirty="0"/>
+              <a:t>Row height and column width</a:t>
+            </a:r>
+          </a:p>
+          <a:p>
+            <a:pPr lvl="2"/>
+            <a:r>
+              <a:rPr lang="en-US" dirty="0"/>
+              <a:t>Default -- rows take up equal amounts of available vertical space</a:t>
+            </a:r>
+          </a:p>
+          <a:p>
+            <a:pPr lvl="2"/>
+            <a:r>
+              <a:rPr lang="en-US" dirty="0"/>
+              <a:t>Default -- columns take up equal amounts of available horizontal space</a:t>
+            </a:r>
+          </a:p>
+          <a:p>
+            <a:pPr lvl="1"/>
+            <a:r>
+              <a:rPr lang="en-US" dirty="0"/>
+              <a:t>Star sizing</a:t>
+            </a:r>
+          </a:p>
+          <a:p>
+            <a:pPr lvl="2"/>
+            <a:r>
+              <a:rPr lang="en-US" dirty="0"/>
+              <a:t>Use * to indicate that Row or Column takes up some percentage of the available space</a:t>
+            </a:r>
+          </a:p>
+          <a:p>
+            <a:pPr lvl="2"/>
+            <a:r>
+              <a:rPr lang="en-US" dirty="0"/>
+              <a:t>If each item is a single *, they get equal space</a:t>
+            </a:r>
+          </a:p>
+          <a:p>
+            <a:r>
+              <a:rPr lang="en-US" dirty="0">
+                <a:solidFill>
+                  <a:srgbClr val="00B050"/>
+                </a:solidFill>
+              </a:rPr>
+              <a:t>Example - Star Sizing Defaults</a:t>
+            </a:r>
+          </a:p>
+          <a:p>
+            <a:r>
+              <a:rPr lang="en-US" dirty="0">
+                <a:solidFill>
+                  <a:srgbClr val="00B050"/>
+                </a:solidFill>
+              </a:rPr>
+              <a:t>Example - Proportional Size with Star Sizing</a:t>
+            </a:r>
+          </a:p>
+          <a:p>
+            <a:endParaRPr lang="en-US" dirty="0"/>
+          </a:p>
+        </p:txBody>
+      </p:sp>
+    </p:spTree>
+    <p:extLst>
+      <p:ext uri="{BB962C8B-B14F-4D97-AF65-F5344CB8AC3E}">
+        <p14:creationId xmlns:p14="http://schemas.microsoft.com/office/powerpoint/2010/main" val="4021263657"/>
+      </p:ext>
+    </p:extLst>
+  </p:cSld>
+  <p:clrMapOvr>
+    <a:masterClrMapping/>
+  </p:clrMapOvr>
+  <p:timing>
+    <p:tnLst>
+      <p:par>
+        <p:cTn id="1" dur="indefinite" restart="never" nodeType="tmRoot">
+          <p:childTnLst>
+            <p:seq concurrent="1" nextAc="seek">
+              <p:cTn id="2" dur="indefinite" nodeType="mainSeq">
+                <p:childTnLst>
+                  <p:par>
+                    <p:cTn id="3" fill="hold">
+                      <p:stCondLst>
+                        <p:cond delay="indefinite"/>
+                      </p:stCondLst>
+                      <p:childTnLst>
+                        <p:par>
+                          <p:cTn id="4" fill="hold">
+                            <p:stCondLst>
+                              <p:cond delay="0"/>
+                            </p:stCondLst>
+                            <p:childTnLst>
+                              <p:par>
+                                <p:cTn id="5" presetID="10" presetClass="entr" presetSubtype="0" fill="hold" grpId="0" nodeType="clickEffect">
+                                  <p:stCondLst>
+                                    <p:cond delay="0"/>
+                                  </p:stCondLst>
+                                  <p:childTnLst>
+                                    <p:set>
+                                      <p:cBhvr>
+                                        <p:cTn id="6" dur="1" fill="hold">
+                                          <p:stCondLst>
+                                            <p:cond delay="0"/>
+                                          </p:stCondLst>
+                                        </p:cTn>
+                                        <p:tgtEl>
+                                          <p:spTgt spid="3">
+                                            <p:txEl>
+                                              <p:pRg st="0" end="0"/>
+                                            </p:txEl>
+                                          </p:spTgt>
+                                        </p:tgtEl>
+                                        <p:attrNameLst>
+                                          <p:attrName>style.visibility</p:attrName>
+                                        </p:attrNameLst>
+                                      </p:cBhvr>
+                                      <p:to>
+                                        <p:strVal val="visible"/>
+                                      </p:to>
+                                    </p:set>
+                                    <p:animEffect transition="in" filter="fade">
+                                      <p:cBhvr>
+                                        <p:cTn id="7" dur="500"/>
+                                        <p:tgtEl>
+                                          <p:spTgt spid="3">
+                                            <p:txEl>
+                                              <p:pRg st="0" end="0"/>
+                                            </p:txEl>
+                                          </p:spTgt>
+                                        </p:tgtEl>
+                                      </p:cBhvr>
+                                    </p:animEffect>
+                                  </p:childTnLst>
+                                </p:cTn>
+                              </p:par>
+                            </p:childTnLst>
+                          </p:cTn>
+                        </p:par>
+                      </p:childTnLst>
+                    </p:cTn>
+                  </p:par>
+                  <p:par>
+                    <p:cTn id="8" fill="hold">
+                      <p:stCondLst>
+                        <p:cond delay="indefinite"/>
+                      </p:stCondLst>
+                      <p:childTnLst>
+                        <p:par>
+                          <p:cTn id="9" fill="hold">
+                            <p:stCondLst>
+                              <p:cond delay="0"/>
+                            </p:stCondLst>
+                            <p:childTnLst>
+                              <p:par>
+                                <p:cTn id="10" presetID="10" presetClass="entr" presetSubtype="0" fill="hold" grpId="0" nodeType="clickEffect">
+                                  <p:stCondLst>
+                                    <p:cond delay="0"/>
+                                  </p:stCondLst>
+                                  <p:childTnLst>
+                                    <p:set>
+                                      <p:cBhvr>
+                                        <p:cTn id="11" dur="1" fill="hold">
+                                          <p:stCondLst>
+                                            <p:cond delay="0"/>
+                                          </p:stCondLst>
+                                        </p:cTn>
+                                        <p:tgtEl>
+                                          <p:spTgt spid="3">
+                                            <p:txEl>
+                                              <p:pRg st="1" end="1"/>
+                                            </p:txEl>
+                                          </p:spTgt>
+                                        </p:tgtEl>
+                                        <p:attrNameLst>
+                                          <p:attrName>style.visibility</p:attrName>
+                                        </p:attrNameLst>
+                                      </p:cBhvr>
+                                      <p:to>
+                                        <p:strVal val="visible"/>
+                                      </p:to>
+                                    </p:set>
+                                    <p:animEffect transition="in" filter="fade">
+                                      <p:cBhvr>
+                                        <p:cTn id="12" dur="500"/>
+                                        <p:tgtEl>
+                                          <p:spTgt spid="3">
+                                            <p:txEl>
+                                              <p:pRg st="1" end="1"/>
+                                            </p:txEl>
+                                          </p:spTgt>
+                                        </p:tgtEl>
+                                      </p:cBhvr>
+                                    </p:animEffect>
+                                  </p:childTnLst>
+                                </p:cTn>
+                              </p:par>
+                              <p:par>
+                                <p:cTn id="13" presetID="10" presetClass="entr" presetSubtype="0" fill="hold" grpId="0" nodeType="withEffect">
+                                  <p:stCondLst>
+                                    <p:cond delay="0"/>
+                                  </p:stCondLst>
+                                  <p:childTnLst>
+                                    <p:set>
+                                      <p:cBhvr>
+                                        <p:cTn id="14" dur="1" fill="hold">
+                                          <p:stCondLst>
+                                            <p:cond delay="0"/>
+                                          </p:stCondLst>
+                                        </p:cTn>
+                                        <p:tgtEl>
+                                          <p:spTgt spid="3">
+                                            <p:txEl>
+                                              <p:pRg st="2" end="2"/>
+                                            </p:txEl>
+                                          </p:spTgt>
+                                        </p:tgtEl>
+                                        <p:attrNameLst>
+                                          <p:attrName>style.visibility</p:attrName>
+                                        </p:attrNameLst>
+                                      </p:cBhvr>
+                                      <p:to>
+                                        <p:strVal val="visible"/>
+                                      </p:to>
+                                    </p:set>
+                                    <p:animEffect transition="in" filter="fade">
+                                      <p:cBhvr>
+                                        <p:cTn id="15" dur="500"/>
+                                        <p:tgtEl>
+                                          <p:spTgt spid="3">
+                                            <p:txEl>
+                                              <p:pRg st="2" end="2"/>
+                                            </p:txEl>
+                                          </p:spTgt>
+                                        </p:tgtEl>
+                                      </p:cBhvr>
+                                    </p:animEffect>
+                                  </p:childTnLst>
+                                </p:cTn>
+                              </p:par>
+                              <p:par>
+                                <p:cTn id="16" presetID="10" presetClass="entr" presetSubtype="0" fill="hold" grpId="0" nodeType="withEffect">
+                                  <p:stCondLst>
+                                    <p:cond delay="0"/>
+                                  </p:stCondLst>
+                                  <p:childTnLst>
+                                    <p:set>
+                                      <p:cBhvr>
+                                        <p:cTn id="17" dur="1" fill="hold">
+                                          <p:stCondLst>
+                                            <p:cond delay="0"/>
+                                          </p:stCondLst>
+                                        </p:cTn>
+                                        <p:tgtEl>
+                                          <p:spTgt spid="3">
+                                            <p:txEl>
+                                              <p:pRg st="3" end="3"/>
+                                            </p:txEl>
+                                          </p:spTgt>
+                                        </p:tgtEl>
+                                        <p:attrNameLst>
+                                          <p:attrName>style.visibility</p:attrName>
+                                        </p:attrNameLst>
+                                      </p:cBhvr>
+                                      <p:to>
+                                        <p:strVal val="visible"/>
+                                      </p:to>
+                                    </p:set>
+                                    <p:animEffect transition="in" filter="fade">
+                                      <p:cBhvr>
+                                        <p:cTn id="18" dur="500"/>
+                                        <p:tgtEl>
+                                          <p:spTgt spid="3">
+                                            <p:txEl>
+                                              <p:pRg st="3" end="3"/>
+                                            </p:txEl>
+                                          </p:spTgt>
+                                        </p:tgtEl>
+                                      </p:cBhvr>
+                                    </p:animEffect>
+                                  </p:childTnLst>
+                                </p:cTn>
+                              </p:par>
+                            </p:childTnLst>
+                          </p:cTn>
+                        </p:par>
+                      </p:childTnLst>
+                    </p:cTn>
+                  </p:par>
+                  <p:par>
+                    <p:cTn id="19" fill="hold">
+                      <p:stCondLst>
+                        <p:cond delay="indefinite"/>
+                      </p:stCondLst>
+                      <p:childTnLst>
+                        <p:par>
+                          <p:cTn id="20" fill="hold">
+                            <p:stCondLst>
+                              <p:cond delay="0"/>
+                            </p:stCondLst>
+                            <p:childTnLst>
+                              <p:par>
+                                <p:cTn id="21" presetID="10" presetClass="entr" presetSubtype="0" fill="hold" grpId="0" nodeType="clickEffect">
+                                  <p:stCondLst>
+                                    <p:cond delay="0"/>
+                                  </p:stCondLst>
+                                  <p:childTnLst>
+                                    <p:set>
+                                      <p:cBhvr>
+                                        <p:cTn id="22" dur="1" fill="hold">
+                                          <p:stCondLst>
+                                            <p:cond delay="0"/>
+                                          </p:stCondLst>
+                                        </p:cTn>
+                                        <p:tgtEl>
+                                          <p:spTgt spid="3">
+                                            <p:txEl>
+                                              <p:pRg st="4" end="4"/>
+                                            </p:txEl>
+                                          </p:spTgt>
+                                        </p:tgtEl>
+                                        <p:attrNameLst>
+                                          <p:attrName>style.visibility</p:attrName>
+                                        </p:attrNameLst>
+                                      </p:cBhvr>
+                                      <p:to>
+                                        <p:strVal val="visible"/>
+                                      </p:to>
+                                    </p:set>
+                                    <p:animEffect transition="in" filter="fade">
+                                      <p:cBhvr>
+                                        <p:cTn id="23" dur="500"/>
+                                        <p:tgtEl>
+                                          <p:spTgt spid="3">
+                                            <p:txEl>
+                                              <p:pRg st="4" end="4"/>
+                                            </p:txEl>
+                                          </p:spTgt>
+                                        </p:tgtEl>
+                                      </p:cBhvr>
+                                    </p:animEffect>
+                                  </p:childTnLst>
+                                </p:cTn>
+                              </p:par>
+                              <p:par>
+                                <p:cTn id="24" presetID="10" presetClass="entr" presetSubtype="0" fill="hold" grpId="0" nodeType="withEffect">
+                                  <p:stCondLst>
+                                    <p:cond delay="0"/>
+                                  </p:stCondLst>
+                                  <p:childTnLst>
+                                    <p:set>
+                                      <p:cBhvr>
+                                        <p:cTn id="25" dur="1" fill="hold">
+                                          <p:stCondLst>
+                                            <p:cond delay="0"/>
+                                          </p:stCondLst>
+                                        </p:cTn>
+                                        <p:tgtEl>
+                                          <p:spTgt spid="3">
+                                            <p:txEl>
+                                              <p:pRg st="5" end="5"/>
+                                            </p:txEl>
+                                          </p:spTgt>
+                                        </p:tgtEl>
+                                        <p:attrNameLst>
+                                          <p:attrName>style.visibility</p:attrName>
+                                        </p:attrNameLst>
+                                      </p:cBhvr>
+                                      <p:to>
+                                        <p:strVal val="visible"/>
+                                      </p:to>
+                                    </p:set>
+                                    <p:animEffect transition="in" filter="fade">
+                                      <p:cBhvr>
+                                        <p:cTn id="26" dur="500"/>
+                                        <p:tgtEl>
+                                          <p:spTgt spid="3">
+                                            <p:txEl>
+                                              <p:pRg st="5" end="5"/>
+                                            </p:txEl>
+                                          </p:spTgt>
+                                        </p:tgtEl>
+                                      </p:cBhvr>
+                                    </p:animEffect>
+                                  </p:childTnLst>
+                                </p:cTn>
+                              </p:par>
+                              <p:par>
+                                <p:cTn id="27" presetID="10" presetClass="entr" presetSubtype="0" fill="hold" grpId="0" nodeType="withEffect">
+                                  <p:stCondLst>
+                                    <p:cond delay="0"/>
+                                  </p:stCondLst>
+                                  <p:childTnLst>
+                                    <p:set>
+                                      <p:cBhvr>
+                                        <p:cTn id="28" dur="1" fill="hold">
+                                          <p:stCondLst>
+                                            <p:cond delay="0"/>
+                                          </p:stCondLst>
+                                        </p:cTn>
+                                        <p:tgtEl>
+                                          <p:spTgt spid="3">
+                                            <p:txEl>
+                                              <p:pRg st="6" end="6"/>
+                                            </p:txEl>
+                                          </p:spTgt>
+                                        </p:tgtEl>
+                                        <p:attrNameLst>
+                                          <p:attrName>style.visibility</p:attrName>
+                                        </p:attrNameLst>
+                                      </p:cBhvr>
+                                      <p:to>
+                                        <p:strVal val="visible"/>
+                                      </p:to>
+                                    </p:set>
+                                    <p:animEffect transition="in" filter="fade">
+                                      <p:cBhvr>
+                                        <p:cTn id="29" dur="500"/>
+                                        <p:tgtEl>
+                                          <p:spTgt spid="3">
+                                            <p:txEl>
+                                              <p:pRg st="6" end="6"/>
+                                            </p:txEl>
+                                          </p:spTgt>
+                                        </p:tgtEl>
+                                      </p:cBhvr>
+                                    </p:animEffect>
+                                  </p:childTnLst>
+                                </p:cTn>
+                              </p:par>
+                            </p:childTnLst>
+                          </p:cTn>
+                        </p:par>
+                      </p:childTnLst>
+                    </p:cTn>
+                  </p:par>
+                  <p:par>
+                    <p:cTn id="30" fill="hold">
+                      <p:stCondLst>
+                        <p:cond delay="indefinite"/>
+                      </p:stCondLst>
+                      <p:childTnLst>
+                        <p:par>
+                          <p:cTn id="31" fill="hold">
+                            <p:stCondLst>
+                              <p:cond delay="0"/>
+                            </p:stCondLst>
+                            <p:childTnLst>
+                              <p:par>
+                                <p:cTn id="32" presetID="10" presetClass="entr" presetSubtype="0" fill="hold" grpId="0" nodeType="clickEffect">
+                                  <p:stCondLst>
+                                    <p:cond delay="0"/>
+                                  </p:stCondLst>
+                                  <p:childTnLst>
+                                    <p:set>
+                                      <p:cBhvr>
+                                        <p:cTn id="33" dur="1" fill="hold">
+                                          <p:stCondLst>
+                                            <p:cond delay="0"/>
+                                          </p:stCondLst>
+                                        </p:cTn>
+                                        <p:tgtEl>
+                                          <p:spTgt spid="3">
+                                            <p:txEl>
+                                              <p:pRg st="7" end="7"/>
+                                            </p:txEl>
+                                          </p:spTgt>
+                                        </p:tgtEl>
+                                        <p:attrNameLst>
+                                          <p:attrName>style.visibility</p:attrName>
+                                        </p:attrNameLst>
+                                      </p:cBhvr>
+                                      <p:to>
+                                        <p:strVal val="visible"/>
+                                      </p:to>
+                                    </p:set>
+                                    <p:animEffect transition="in" filter="fade">
+                                      <p:cBhvr>
+                                        <p:cTn id="34" dur="500"/>
+                                        <p:tgtEl>
+                                          <p:spTgt spid="3">
+                                            <p:txEl>
+                                              <p:pRg st="7" end="7"/>
+                                            </p:txEl>
+                                          </p:spTgt>
+                                        </p:tgtEl>
+                                      </p:cBhvr>
+                                    </p:animEffect>
+                                  </p:childTnLst>
+                                </p:cTn>
+                              </p:par>
+                            </p:childTnLst>
+                          </p:cTn>
+                        </p:par>
+                      </p:childTnLst>
+                    </p:cTn>
+                  </p:par>
+                  <p:par>
+                    <p:cTn id="35" fill="hold">
+                      <p:stCondLst>
+                        <p:cond delay="indefinite"/>
+                      </p:stCondLst>
+                      <p:childTnLst>
+                        <p:par>
+                          <p:cTn id="36" fill="hold">
+                            <p:stCondLst>
+                              <p:cond delay="0"/>
+                            </p:stCondLst>
+                            <p:childTnLst>
+                              <p:par>
+                                <p:cTn id="37" presetID="10" presetClass="entr" presetSubtype="0" fill="hold" grpId="0" nodeType="clickEffect">
+                                  <p:stCondLst>
+                                    <p:cond delay="0"/>
+                                  </p:stCondLst>
+                                  <p:childTnLst>
+                                    <p:set>
+                                      <p:cBhvr>
+                                        <p:cTn id="38" dur="1" fill="hold">
+                                          <p:stCondLst>
+                                            <p:cond delay="0"/>
+                                          </p:stCondLst>
+                                        </p:cTn>
+                                        <p:tgtEl>
+                                          <p:spTgt spid="3">
+                                            <p:txEl>
+                                              <p:pRg st="8" end="8"/>
+                                            </p:txEl>
+                                          </p:spTgt>
+                                        </p:tgtEl>
+                                        <p:attrNameLst>
+                                          <p:attrName>style.visibility</p:attrName>
+                                        </p:attrNameLst>
+                                      </p:cBhvr>
+                                      <p:to>
+                                        <p:strVal val="visible"/>
+                                      </p:to>
+                                    </p:set>
+                                    <p:animEffect transition="in" filter="fade">
+                                      <p:cBhvr>
+                                        <p:cTn id="39" dur="500"/>
+                                        <p:tgtEl>
+                                          <p:spTgt spid="3">
+                                            <p:txEl>
+                                              <p:pRg st="8" end="8"/>
+                                            </p:txEl>
+                                          </p:spTgt>
+                                        </p:tgtEl>
+                                      </p:cBhvr>
+                                    </p:animEffect>
+                                  </p:childTnLst>
+                                </p:cTn>
+                              </p:par>
+                            </p:childTnLst>
+                          </p:cTn>
+                        </p:par>
+                      </p:childTnLst>
+                    </p:cTn>
+                  </p:par>
+                </p:childTnLst>
+              </p:cTn>
+              <p:prevCondLst>
+                <p:cond evt="onPrev" delay="0">
+                  <p:tgtEl>
+                    <p:sldTgt/>
+                  </p:tgtEl>
+                </p:cond>
+              </p:prevCondLst>
+              <p:nextCondLst>
+                <p:cond evt="onNext" delay="0">
+                  <p:tgtEl>
+                    <p:sldTgt/>
+                  </p:tgtEl>
+                </p:cond>
+              </p:nextCondLst>
+            </p:seq>
+          </p:childTnLst>
+        </p:cTn>
+      </p:par>
+    </p:tnLst>
+    <p:bldLst>
+      <p:bldP spid="3" grpId="0" uiExpand="1" build="p"/>
+    </p:bldLst>
+  </p:timing>
+</p:sld>
+</file>
+
+<file path=ppt/slides/slide13.xml><?xml version="1.0" encoding="utf-8"?>
+<p:sld xmlns:a="http://schemas.openxmlformats.org/drawingml/2006/main" xmlns:r="http://schemas.openxmlformats.org/officeDocument/2006/relationships" xmlns:p="http://schemas.openxmlformats.org/presentationml/2006/main">
+  <p:cSld>
+    <p:spTree>
+      <p:nvGrpSpPr>
+        <p:cNvPr id="1" name=""/>
+        <p:cNvGrpSpPr/>
+        <p:nvPr/>
+      </p:nvGrpSpPr>
+      <p:grpSpPr>
+        <a:xfrm>
+          <a:off x="0" y="0"/>
+          <a:ext cx="0" cy="0"/>
+          <a:chOff x="0" y="0"/>
+          <a:chExt cx="0" cy="0"/>
+        </a:xfrm>
+      </p:grpSpPr>
+      <p:sp>
+        <p:nvSpPr>
+          <p:cNvPr id="2" name="Title 1">
+            <a:extLst>
+              <a:ext uri="{FF2B5EF4-FFF2-40B4-BE49-F238E27FC236}">
+                <a16:creationId xmlns:a16="http://schemas.microsoft.com/office/drawing/2014/main" id="{A338AC80-32E4-BCFC-994D-C9145CF3298D}"/>
+              </a:ext>
+            </a:extLst>
+          </p:cNvPr>
+          <p:cNvSpPr>
+            <a:spLocks noGrp="1"/>
+          </p:cNvSpPr>
+          <p:nvPr>
+            <p:ph type="title"/>
+          </p:nvPr>
+        </p:nvSpPr>
+        <p:spPr/>
+        <p:txBody>
+          <a:bodyPr/>
+          <a:lstStyle/>
+          <a:p>
+            <a:r>
+              <a:rPr lang="en-US" dirty="0"/>
+              <a:t>Unit 2 – Layout Using Grid</a:t>
+            </a:r>
+          </a:p>
+        </p:txBody>
+      </p:sp>
+      <p:sp>
+        <p:nvSpPr>
+          <p:cNvPr id="3" name="Content Placeholder 2">
+            <a:extLst>
+              <a:ext uri="{FF2B5EF4-FFF2-40B4-BE49-F238E27FC236}">
+                <a16:creationId xmlns:a16="http://schemas.microsoft.com/office/drawing/2014/main" id="{49753D9D-9DF4-AD2F-B38D-D4829E8A4FCF}"/>
+              </a:ext>
+            </a:extLst>
+          </p:cNvPr>
+          <p:cNvSpPr>
+            <a:spLocks noGrp="1"/>
+          </p:cNvSpPr>
+          <p:nvPr>
+            <p:ph idx="1"/>
+          </p:nvPr>
+        </p:nvSpPr>
+        <p:spPr/>
+        <p:txBody>
+          <a:bodyPr>
+            <a:normAutofit lnSpcReduction="10000"/>
+          </a:bodyPr>
+          <a:lstStyle/>
+          <a:p>
+            <a:r>
+              <a:rPr lang="en-US" dirty="0"/>
+              <a:t>Grid – Auto Sizing</a:t>
+            </a:r>
+          </a:p>
+          <a:p>
+            <a:pPr lvl="1"/>
+            <a:r>
+              <a:rPr lang="en-US" dirty="0"/>
+              <a:t>Star Sizing - sets sizes based on total available space that Grid size</a:t>
+            </a:r>
+          </a:p>
+          <a:p>
+            <a:pPr lvl="1"/>
+            <a:r>
+              <a:rPr lang="en-US" dirty="0"/>
+              <a:t>Auto Sizing - sets sizes based on content</a:t>
+            </a:r>
+          </a:p>
+          <a:p>
+            <a:pPr lvl="2"/>
+            <a:r>
+              <a:rPr lang="en-US" dirty="0"/>
+              <a:t>Set rows or column as Auto sized to fit content</a:t>
+            </a:r>
+          </a:p>
+          <a:p>
+            <a:pPr lvl="2"/>
+            <a:r>
+              <a:rPr lang="en-US" dirty="0"/>
+              <a:t>Star Sizing then uses whatever is left</a:t>
+            </a:r>
+          </a:p>
+          <a:p>
+            <a:pPr lvl="1"/>
+            <a:r>
+              <a:rPr lang="en-US" dirty="0">
+                <a:solidFill>
+                  <a:srgbClr val="00B050"/>
+                </a:solidFill>
+              </a:rPr>
+              <a:t>Example – Auto Sizing</a:t>
+            </a:r>
+          </a:p>
+          <a:p>
+            <a:pPr lvl="1"/>
+            <a:r>
+              <a:rPr lang="en-US" dirty="0">
+                <a:solidFill>
+                  <a:schemeClr val="tx1"/>
+                </a:solidFill>
+              </a:rPr>
+              <a:t>How to use this</a:t>
+            </a:r>
+          </a:p>
+          <a:p>
+            <a:pPr lvl="2"/>
+            <a:r>
+              <a:rPr lang="en-US" dirty="0">
+                <a:solidFill>
+                  <a:schemeClr val="tx1"/>
+                </a:solidFill>
+              </a:rPr>
+              <a:t>Think about which areas of application are "work areas</a:t>
+            </a:r>
+          </a:p>
+          <a:p>
+            <a:pPr lvl="3"/>
+            <a:r>
+              <a:rPr lang="en-US" dirty="0">
+                <a:solidFill>
+                  <a:schemeClr val="tx1"/>
+                </a:solidFill>
+              </a:rPr>
+              <a:t>Those placed in star-sized rows or columns</a:t>
+            </a:r>
+          </a:p>
+          <a:p>
+            <a:pPr lvl="3"/>
+            <a:r>
+              <a:rPr lang="en-US" dirty="0">
+                <a:solidFill>
+                  <a:schemeClr val="tx1"/>
+                </a:solidFill>
+              </a:rPr>
+              <a:t>Workspace grows or shrinks when containing window changes size</a:t>
+            </a:r>
+          </a:p>
+          <a:p>
+            <a:pPr lvl="2"/>
+            <a:r>
+              <a:rPr lang="en-US" dirty="0">
+                <a:solidFill>
+                  <a:schemeClr val="tx1"/>
+                </a:solidFill>
+              </a:rPr>
+              <a:t>Non-work areas, e.g. widgets are typically Auto sized</a:t>
+            </a:r>
+          </a:p>
+        </p:txBody>
+      </p:sp>
+    </p:spTree>
+    <p:extLst>
+      <p:ext uri="{BB962C8B-B14F-4D97-AF65-F5344CB8AC3E}">
+        <p14:creationId xmlns:p14="http://schemas.microsoft.com/office/powerpoint/2010/main" val="1651441045"/>
+      </p:ext>
+    </p:extLst>
+  </p:cSld>
+  <p:clrMapOvr>
+    <a:masterClrMapping/>
+  </p:clrMapOvr>
+  <p:timing>
+    <p:tnLst>
+      <p:par>
+        <p:cTn id="1" dur="indefinite" restart="never" nodeType="tmRoot">
+          <p:childTnLst>
+            <p:seq concurrent="1" nextAc="seek">
+              <p:cTn id="2" dur="indefinite" nodeType="mainSeq">
+                <p:childTnLst>
+                  <p:par>
+                    <p:cTn id="3" fill="hold">
+                      <p:stCondLst>
+                        <p:cond delay="indefinite"/>
+                      </p:stCondLst>
+                      <p:childTnLst>
+                        <p:par>
+                          <p:cTn id="4" fill="hold">
+                            <p:stCondLst>
+                              <p:cond delay="0"/>
+                            </p:stCondLst>
+                            <p:childTnLst>
+                              <p:par>
+                                <p:cTn id="5" presetID="10" presetClass="entr" presetSubtype="0" fill="hold" grpId="0" nodeType="clickEffect">
+                                  <p:stCondLst>
+                                    <p:cond delay="0"/>
+                                  </p:stCondLst>
+                                  <p:childTnLst>
+                                    <p:set>
+                                      <p:cBhvr>
+                                        <p:cTn id="6" dur="1" fill="hold">
+                                          <p:stCondLst>
+                                            <p:cond delay="0"/>
+                                          </p:stCondLst>
+                                        </p:cTn>
+                                        <p:tgtEl>
+                                          <p:spTgt spid="3">
+                                            <p:txEl>
+                                              <p:pRg st="0" end="0"/>
+                                            </p:txEl>
+                                          </p:spTgt>
+                                        </p:tgtEl>
+                                        <p:attrNameLst>
+                                          <p:attrName>style.visibility</p:attrName>
+                                        </p:attrNameLst>
+                                      </p:cBhvr>
+                                      <p:to>
+                                        <p:strVal val="visible"/>
+                                      </p:to>
+                                    </p:set>
+                                    <p:animEffect transition="in" filter="fade">
+                                      <p:cBhvr>
+                                        <p:cTn id="7" dur="500"/>
+                                        <p:tgtEl>
+                                          <p:spTgt spid="3">
+                                            <p:txEl>
+                                              <p:pRg st="0" end="0"/>
+                                            </p:txEl>
+                                          </p:spTgt>
+                                        </p:tgtEl>
+                                      </p:cBhvr>
+                                    </p:animEffect>
+                                  </p:childTnLst>
+                                </p:cTn>
+                              </p:par>
+                              <p:par>
+                                <p:cTn id="8" presetID="10" presetClass="entr" presetSubtype="0" fill="hold" grpId="0" nodeType="withEffect">
+                                  <p:stCondLst>
+                                    <p:cond delay="0"/>
+                                  </p:stCondLst>
+                                  <p:childTnLst>
+                                    <p:set>
+                                      <p:cBhvr>
+                                        <p:cTn id="9" dur="1" fill="hold">
+                                          <p:stCondLst>
+                                            <p:cond delay="0"/>
+                                          </p:stCondLst>
+                                        </p:cTn>
+                                        <p:tgtEl>
+                                          <p:spTgt spid="3">
+                                            <p:txEl>
+                                              <p:pRg st="1" end="1"/>
+                                            </p:txEl>
+                                          </p:spTgt>
+                                        </p:tgtEl>
+                                        <p:attrNameLst>
+                                          <p:attrName>style.visibility</p:attrName>
+                                        </p:attrNameLst>
+                                      </p:cBhvr>
+                                      <p:to>
+                                        <p:strVal val="visible"/>
+                                      </p:to>
+                                    </p:set>
+                                    <p:animEffect transition="in" filter="fade">
+                                      <p:cBhvr>
+                                        <p:cTn id="10" dur="500"/>
+                                        <p:tgtEl>
+                                          <p:spTgt spid="3">
+                                            <p:txEl>
+                                              <p:pRg st="1" end="1"/>
+                                            </p:txEl>
+                                          </p:spTgt>
+                                        </p:tgtEl>
+                                      </p:cBhvr>
+                                    </p:animEffect>
+                                  </p:childTnLst>
+                                </p:cTn>
+                              </p:par>
+                            </p:childTnLst>
+                          </p:cTn>
+                        </p:par>
+                      </p:childTnLst>
+                    </p:cTn>
+                  </p:par>
+                  <p:par>
+                    <p:cTn id="11" fill="hold">
+                      <p:stCondLst>
+                        <p:cond delay="indefinite"/>
+                      </p:stCondLst>
+                      <p:childTnLst>
+                        <p:par>
+                          <p:cTn id="12" fill="hold">
+                            <p:stCondLst>
+                              <p:cond delay="0"/>
+                            </p:stCondLst>
+                            <p:childTnLst>
+                              <p:par>
+                                <p:cTn id="13" presetID="10" presetClass="entr" presetSubtype="0" fill="hold" grpId="0" nodeType="clickEffect">
+                                  <p:stCondLst>
+                                    <p:cond delay="0"/>
+                                  </p:stCondLst>
+                                  <p:childTnLst>
+                                    <p:set>
+                                      <p:cBhvr>
+                                        <p:cTn id="14" dur="1" fill="hold">
+                                          <p:stCondLst>
+                                            <p:cond delay="0"/>
+                                          </p:stCondLst>
+                                        </p:cTn>
+                                        <p:tgtEl>
+                                          <p:spTgt spid="3">
+                                            <p:txEl>
+                                              <p:pRg st="2" end="2"/>
+                                            </p:txEl>
+                                          </p:spTgt>
+                                        </p:tgtEl>
+                                        <p:attrNameLst>
+                                          <p:attrName>style.visibility</p:attrName>
+                                        </p:attrNameLst>
+                                      </p:cBhvr>
+                                      <p:to>
+                                        <p:strVal val="visible"/>
+                                      </p:to>
+                                    </p:set>
+                                    <p:animEffect transition="in" filter="fade">
+                                      <p:cBhvr>
+                                        <p:cTn id="15" dur="500"/>
+                                        <p:tgtEl>
+                                          <p:spTgt spid="3">
+                                            <p:txEl>
+                                              <p:pRg st="2" end="2"/>
+                                            </p:txEl>
+                                          </p:spTgt>
+                                        </p:tgtEl>
+                                      </p:cBhvr>
+                                    </p:animEffect>
+                                  </p:childTnLst>
+                                </p:cTn>
+                              </p:par>
+                              <p:par>
+                                <p:cTn id="16" presetID="10" presetClass="entr" presetSubtype="0" fill="hold" grpId="0" nodeType="withEffect">
+                                  <p:stCondLst>
+                                    <p:cond delay="0"/>
+                                  </p:stCondLst>
+                                  <p:childTnLst>
+                                    <p:set>
+                                      <p:cBhvr>
+                                        <p:cTn id="17" dur="1" fill="hold">
+                                          <p:stCondLst>
+                                            <p:cond delay="0"/>
+                                          </p:stCondLst>
+                                        </p:cTn>
+                                        <p:tgtEl>
+                                          <p:spTgt spid="3">
+                                            <p:txEl>
+                                              <p:pRg st="3" end="3"/>
+                                            </p:txEl>
+                                          </p:spTgt>
+                                        </p:tgtEl>
+                                        <p:attrNameLst>
+                                          <p:attrName>style.visibility</p:attrName>
+                                        </p:attrNameLst>
+                                      </p:cBhvr>
+                                      <p:to>
+                                        <p:strVal val="visible"/>
+                                      </p:to>
+                                    </p:set>
+                                    <p:animEffect transition="in" filter="fade">
+                                      <p:cBhvr>
+                                        <p:cTn id="18" dur="500"/>
+                                        <p:tgtEl>
+                                          <p:spTgt spid="3">
+                                            <p:txEl>
+                                              <p:pRg st="3" end="3"/>
+                                            </p:txEl>
+                                          </p:spTgt>
+                                        </p:tgtEl>
+                                      </p:cBhvr>
+                                    </p:animEffect>
+                                  </p:childTnLst>
+                                </p:cTn>
+                              </p:par>
+                              <p:par>
+                                <p:cTn id="19" presetID="10" presetClass="entr" presetSubtype="0" fill="hold" grpId="0" nodeType="withEffect">
+                                  <p:stCondLst>
+                                    <p:cond delay="0"/>
+                                  </p:stCondLst>
+                                  <p:childTnLst>
+                                    <p:set>
+                                      <p:cBhvr>
+                                        <p:cTn id="20" dur="1" fill="hold">
+                                          <p:stCondLst>
+                                            <p:cond delay="0"/>
+                                          </p:stCondLst>
+                                        </p:cTn>
+                                        <p:tgtEl>
+                                          <p:spTgt spid="3">
+                                            <p:txEl>
+                                              <p:pRg st="4" end="4"/>
+                                            </p:txEl>
+                                          </p:spTgt>
+                                        </p:tgtEl>
+                                        <p:attrNameLst>
+                                          <p:attrName>style.visibility</p:attrName>
+                                        </p:attrNameLst>
+                                      </p:cBhvr>
+                                      <p:to>
+                                        <p:strVal val="visible"/>
+                                      </p:to>
+                                    </p:set>
+                                    <p:animEffect transition="in" filter="fade">
+                                      <p:cBhvr>
+                                        <p:cTn id="21" dur="500"/>
+                                        <p:tgtEl>
+                                          <p:spTgt spid="3">
+                                            <p:txEl>
+                                              <p:pRg st="4" end="4"/>
+                                            </p:txEl>
+                                          </p:spTgt>
+                                        </p:tgtEl>
+                                      </p:cBhvr>
+                                    </p:animEffect>
+                                  </p:childTnLst>
+                                </p:cTn>
+                              </p:par>
+                            </p:childTnLst>
+                          </p:cTn>
+                        </p:par>
+                      </p:childTnLst>
+                    </p:cTn>
+                  </p:par>
+                  <p:par>
+                    <p:cTn id="22" fill="hold">
+                      <p:stCondLst>
+                        <p:cond delay="indefinite"/>
+                      </p:stCondLst>
+                      <p:childTnLst>
+                        <p:par>
+                          <p:cTn id="23" fill="hold">
+                            <p:stCondLst>
+                              <p:cond delay="0"/>
+                            </p:stCondLst>
+                            <p:childTnLst>
+                              <p:par>
+                                <p:cTn id="24" presetID="10" presetClass="entr" presetSubtype="0" fill="hold" grpId="0" nodeType="clickEffect">
+                                  <p:stCondLst>
+                                    <p:cond delay="0"/>
+                                  </p:stCondLst>
+                                  <p:childTnLst>
+                                    <p:set>
+                                      <p:cBhvr>
+                                        <p:cTn id="25" dur="1" fill="hold">
+                                          <p:stCondLst>
+                                            <p:cond delay="0"/>
+                                          </p:stCondLst>
+                                        </p:cTn>
+                                        <p:tgtEl>
+                                          <p:spTgt spid="3">
+                                            <p:txEl>
+                                              <p:pRg st="5" end="5"/>
+                                            </p:txEl>
+                                          </p:spTgt>
+                                        </p:tgtEl>
+                                        <p:attrNameLst>
+                                          <p:attrName>style.visibility</p:attrName>
+                                        </p:attrNameLst>
+                                      </p:cBhvr>
+                                      <p:to>
+                                        <p:strVal val="visible"/>
+                                      </p:to>
+                                    </p:set>
+                                    <p:animEffect transition="in" filter="fade">
+                                      <p:cBhvr>
+                                        <p:cTn id="26" dur="500"/>
+                                        <p:tgtEl>
+                                          <p:spTgt spid="3">
+                                            <p:txEl>
+                                              <p:pRg st="5" end="5"/>
+                                            </p:txEl>
+                                          </p:spTgt>
+                                        </p:tgtEl>
+                                      </p:cBhvr>
+                                    </p:animEffect>
+                                  </p:childTnLst>
+                                </p:cTn>
+                              </p:par>
+                            </p:childTnLst>
+                          </p:cTn>
+                        </p:par>
+                      </p:childTnLst>
+                    </p:cTn>
+                  </p:par>
+                  <p:par>
+                    <p:cTn id="27" fill="hold">
+                      <p:stCondLst>
+                        <p:cond delay="indefinite"/>
+                      </p:stCondLst>
+                      <p:childTnLst>
+                        <p:par>
+                          <p:cTn id="28" fill="hold">
+                            <p:stCondLst>
+                              <p:cond delay="0"/>
+                            </p:stCondLst>
+                            <p:childTnLst>
+                              <p:par>
+                                <p:cTn id="29" presetID="10" presetClass="entr" presetSubtype="0" fill="hold" grpId="0" nodeType="clickEffect">
+                                  <p:stCondLst>
+                                    <p:cond delay="0"/>
+                                  </p:stCondLst>
+                                  <p:childTnLst>
+                                    <p:set>
+                                      <p:cBhvr>
+                                        <p:cTn id="30" dur="1" fill="hold">
+                                          <p:stCondLst>
+                                            <p:cond delay="0"/>
+                                          </p:stCondLst>
+                                        </p:cTn>
+                                        <p:tgtEl>
+                                          <p:spTgt spid="3">
+                                            <p:txEl>
+                                              <p:pRg st="6" end="6"/>
+                                            </p:txEl>
+                                          </p:spTgt>
+                                        </p:tgtEl>
+                                        <p:attrNameLst>
+                                          <p:attrName>style.visibility</p:attrName>
+                                        </p:attrNameLst>
+                                      </p:cBhvr>
+                                      <p:to>
+                                        <p:strVal val="visible"/>
+                                      </p:to>
+                                    </p:set>
+                                    <p:animEffect transition="in" filter="fade">
+                                      <p:cBhvr>
+                                        <p:cTn id="31" dur="500"/>
+                                        <p:tgtEl>
+                                          <p:spTgt spid="3">
+                                            <p:txEl>
+                                              <p:pRg st="6" end="6"/>
+                                            </p:txEl>
+                                          </p:spTgt>
+                                        </p:tgtEl>
+                                      </p:cBhvr>
+                                    </p:animEffect>
+                                  </p:childTnLst>
+                                </p:cTn>
+                              </p:par>
+                              <p:par>
+                                <p:cTn id="32" presetID="10" presetClass="entr" presetSubtype="0" fill="hold" grpId="0" nodeType="withEffect">
+                                  <p:stCondLst>
+                                    <p:cond delay="0"/>
+                                  </p:stCondLst>
+                                  <p:childTnLst>
+                                    <p:set>
+                                      <p:cBhvr>
+                                        <p:cTn id="33" dur="1" fill="hold">
+                                          <p:stCondLst>
+                                            <p:cond delay="0"/>
+                                          </p:stCondLst>
+                                        </p:cTn>
+                                        <p:tgtEl>
+                                          <p:spTgt spid="3">
+                                            <p:txEl>
+                                              <p:pRg st="7" end="7"/>
+                                            </p:txEl>
+                                          </p:spTgt>
+                                        </p:tgtEl>
+                                        <p:attrNameLst>
+                                          <p:attrName>style.visibility</p:attrName>
+                                        </p:attrNameLst>
+                                      </p:cBhvr>
+                                      <p:to>
+                                        <p:strVal val="visible"/>
+                                      </p:to>
+                                    </p:set>
+                                    <p:animEffect transition="in" filter="fade">
+                                      <p:cBhvr>
+                                        <p:cTn id="34" dur="500"/>
+                                        <p:tgtEl>
+                                          <p:spTgt spid="3">
+                                            <p:txEl>
+                                              <p:pRg st="7" end="7"/>
+                                            </p:txEl>
+                                          </p:spTgt>
+                                        </p:tgtEl>
+                                      </p:cBhvr>
+                                    </p:animEffect>
+                                  </p:childTnLst>
+                                </p:cTn>
+                              </p:par>
+                              <p:par>
+                                <p:cTn id="35" presetID="10" presetClass="entr" presetSubtype="0" fill="hold" grpId="0" nodeType="withEffect">
+                                  <p:stCondLst>
+                                    <p:cond delay="0"/>
+                                  </p:stCondLst>
+                                  <p:childTnLst>
+                                    <p:set>
+                                      <p:cBhvr>
+                                        <p:cTn id="36" dur="1" fill="hold">
+                                          <p:stCondLst>
+                                            <p:cond delay="0"/>
+                                          </p:stCondLst>
+                                        </p:cTn>
+                                        <p:tgtEl>
+                                          <p:spTgt spid="3">
+                                            <p:txEl>
+                                              <p:pRg st="8" end="8"/>
+                                            </p:txEl>
+                                          </p:spTgt>
+                                        </p:tgtEl>
+                                        <p:attrNameLst>
+                                          <p:attrName>style.visibility</p:attrName>
+                                        </p:attrNameLst>
+                                      </p:cBhvr>
+                                      <p:to>
+                                        <p:strVal val="visible"/>
+                                      </p:to>
+                                    </p:set>
+                                    <p:animEffect transition="in" filter="fade">
+                                      <p:cBhvr>
+                                        <p:cTn id="37" dur="500"/>
+                                        <p:tgtEl>
+                                          <p:spTgt spid="3">
+                                            <p:txEl>
+                                              <p:pRg st="8" end="8"/>
+                                            </p:txEl>
+                                          </p:spTgt>
+                                        </p:tgtEl>
+                                      </p:cBhvr>
+                                    </p:animEffect>
+                                  </p:childTnLst>
+                                </p:cTn>
+                              </p:par>
+                              <p:par>
+                                <p:cTn id="38" presetID="10" presetClass="entr" presetSubtype="0" fill="hold" grpId="0" nodeType="withEffect">
+                                  <p:stCondLst>
+                                    <p:cond delay="0"/>
+                                  </p:stCondLst>
+                                  <p:childTnLst>
+                                    <p:set>
+                                      <p:cBhvr>
+                                        <p:cTn id="39" dur="1" fill="hold">
+                                          <p:stCondLst>
+                                            <p:cond delay="0"/>
+                                          </p:stCondLst>
+                                        </p:cTn>
+                                        <p:tgtEl>
+                                          <p:spTgt spid="3">
+                                            <p:txEl>
+                                              <p:pRg st="9" end="9"/>
+                                            </p:txEl>
+                                          </p:spTgt>
+                                        </p:tgtEl>
+                                        <p:attrNameLst>
+                                          <p:attrName>style.visibility</p:attrName>
+                                        </p:attrNameLst>
+                                      </p:cBhvr>
+                                      <p:to>
+                                        <p:strVal val="visible"/>
+                                      </p:to>
+                                    </p:set>
+                                    <p:animEffect transition="in" filter="fade">
+                                      <p:cBhvr>
+                                        <p:cTn id="40" dur="500"/>
+                                        <p:tgtEl>
+                                          <p:spTgt spid="3">
+                                            <p:txEl>
+                                              <p:pRg st="9" end="9"/>
+                                            </p:txEl>
+                                          </p:spTgt>
+                                        </p:tgtEl>
+                                      </p:cBhvr>
+                                    </p:animEffect>
+                                  </p:childTnLst>
+                                </p:cTn>
+                              </p:par>
+                            </p:childTnLst>
+                          </p:cTn>
+                        </p:par>
+                      </p:childTnLst>
+                    </p:cTn>
+                  </p:par>
+                  <p:par>
+                    <p:cTn id="41" fill="hold">
+                      <p:stCondLst>
+                        <p:cond delay="indefinite"/>
+                      </p:stCondLst>
+                      <p:childTnLst>
+                        <p:par>
+                          <p:cTn id="42" fill="hold">
+                            <p:stCondLst>
+                              <p:cond delay="0"/>
+                            </p:stCondLst>
+                            <p:childTnLst>
+                              <p:par>
+                                <p:cTn id="43" presetID="10" presetClass="entr" presetSubtype="0" fill="hold" grpId="0" nodeType="clickEffect">
+                                  <p:stCondLst>
+                                    <p:cond delay="0"/>
+                                  </p:stCondLst>
+                                  <p:childTnLst>
+                                    <p:set>
+                                      <p:cBhvr>
+                                        <p:cTn id="44" dur="1" fill="hold">
+                                          <p:stCondLst>
+                                            <p:cond delay="0"/>
+                                          </p:stCondLst>
+                                        </p:cTn>
+                                        <p:tgtEl>
+                                          <p:spTgt spid="3">
+                                            <p:txEl>
+                                              <p:pRg st="10" end="10"/>
+                                            </p:txEl>
+                                          </p:spTgt>
+                                        </p:tgtEl>
+                                        <p:attrNameLst>
+                                          <p:attrName>style.visibility</p:attrName>
+                                        </p:attrNameLst>
+                                      </p:cBhvr>
+                                      <p:to>
+                                        <p:strVal val="visible"/>
+                                      </p:to>
+                                    </p:set>
+                                    <p:animEffect transition="in" filter="fade">
+                                      <p:cBhvr>
+                                        <p:cTn id="45" dur="500"/>
+                                        <p:tgtEl>
+                                          <p:spTgt spid="3">
+                                            <p:txEl>
+                                              <p:pRg st="10" end="10"/>
+                                            </p:txEl>
+                                          </p:spTgt>
+                                        </p:tgtEl>
+                                      </p:cBhvr>
+                                    </p:animEffect>
+                                  </p:childTnLst>
+                                </p:cTn>
+                              </p:par>
+                            </p:childTnLst>
+                          </p:cTn>
+                        </p:par>
+                      </p:childTnLst>
+                    </p:cTn>
+                  </p:par>
+                </p:childTnLst>
+              </p:cTn>
+              <p:prevCondLst>
+                <p:cond evt="onPrev" delay="0">
+                  <p:tgtEl>
+                    <p:sldTgt/>
+                  </p:tgtEl>
+                </p:cond>
+              </p:prevCondLst>
+              <p:nextCondLst>
+                <p:cond evt="onNext" delay="0">
+                  <p:tgtEl>
+                    <p:sldTgt/>
+                  </p:tgtEl>
+                </p:cond>
+              </p:nextCondLst>
+            </p:seq>
+          </p:childTnLst>
+        </p:cTn>
+      </p:par>
+    </p:tnLst>
+    <p:bldLst>
+      <p:bldP spid="3" grpId="0" uiExpand="1" build="p"/>
+    </p:bldLst>
+  </p:timing>
+</p:sld>
+</file>
+
+<file path=ppt/slides/slide14.xml><?xml version="1.0" encoding="utf-8"?>
+<p:sld xmlns:a="http://schemas.openxmlformats.org/drawingml/2006/main" xmlns:r="http://schemas.openxmlformats.org/officeDocument/2006/relationships" xmlns:p="http://schemas.openxmlformats.org/presentationml/2006/main">
+  <p:cSld>
+    <p:spTree>
+      <p:nvGrpSpPr>
+        <p:cNvPr id="1" name=""/>
+        <p:cNvGrpSpPr/>
+        <p:nvPr/>
+      </p:nvGrpSpPr>
+      <p:grpSpPr>
+        <a:xfrm>
+          <a:off x="0" y="0"/>
+          <a:ext cx="0" cy="0"/>
+          <a:chOff x="0" y="0"/>
+          <a:chExt cx="0" cy="0"/>
+        </a:xfrm>
+      </p:grpSpPr>
+      <p:sp>
+        <p:nvSpPr>
+          <p:cNvPr id="2" name="Title 1">
+            <a:extLst>
+              <a:ext uri="{FF2B5EF4-FFF2-40B4-BE49-F238E27FC236}">
+                <a16:creationId xmlns:a16="http://schemas.microsoft.com/office/drawing/2014/main" id="{099F37DE-8AEB-180C-0270-717F376335E6}"/>
+              </a:ext>
+            </a:extLst>
+          </p:cNvPr>
+          <p:cNvSpPr>
+            <a:spLocks noGrp="1"/>
+          </p:cNvSpPr>
+          <p:nvPr>
+            <p:ph type="title"/>
+          </p:nvPr>
+        </p:nvSpPr>
+        <p:spPr/>
+        <p:txBody>
+          <a:bodyPr/>
+          <a:lstStyle/>
+          <a:p>
+            <a:r>
+              <a:rPr lang="en-US" dirty="0"/>
+              <a:t>Unit 2 – Layout Using Grid</a:t>
+            </a:r>
+          </a:p>
+        </p:txBody>
+      </p:sp>
+      <p:sp>
+        <p:nvSpPr>
+          <p:cNvPr id="3" name="Content Placeholder 2">
+            <a:extLst>
+              <a:ext uri="{FF2B5EF4-FFF2-40B4-BE49-F238E27FC236}">
+                <a16:creationId xmlns:a16="http://schemas.microsoft.com/office/drawing/2014/main" id="{F3C7BD12-F2CE-3720-C9D1-439A62E2BE21}"/>
+              </a:ext>
+            </a:extLst>
+          </p:cNvPr>
+          <p:cNvSpPr>
+            <a:spLocks noGrp="1"/>
+          </p:cNvSpPr>
+          <p:nvPr>
+            <p:ph idx="1"/>
+          </p:nvPr>
+        </p:nvSpPr>
+        <p:spPr/>
+        <p:txBody>
+          <a:bodyPr/>
+          <a:lstStyle/>
+          <a:p>
+            <a:r>
+              <a:rPr lang="en-US" dirty="0"/>
+              <a:t>Grid - Absolute Sizing</a:t>
+            </a:r>
+          </a:p>
+          <a:p>
+            <a:pPr lvl="1"/>
+            <a:r>
+              <a:rPr lang="en-US" dirty="0"/>
+              <a:t>Absolute sizing -- can also specify exact Height (rows) or Width (columns</a:t>
+            </a:r>
+          </a:p>
+          <a:p>
+            <a:pPr lvl="1"/>
+            <a:r>
+              <a:rPr lang="en-US" dirty="0"/>
+              <a:t>Discouraged -- better to size to content</a:t>
+            </a:r>
+          </a:p>
+          <a:p>
+            <a:r>
+              <a:rPr lang="en-US" dirty="0">
+                <a:solidFill>
+                  <a:srgbClr val="00B050"/>
+                </a:solidFill>
+              </a:rPr>
+              <a:t>Example - Absolute Sizing</a:t>
+            </a:r>
+          </a:p>
+        </p:txBody>
+      </p:sp>
+    </p:spTree>
+    <p:extLst>
+      <p:ext uri="{BB962C8B-B14F-4D97-AF65-F5344CB8AC3E}">
+        <p14:creationId xmlns:p14="http://schemas.microsoft.com/office/powerpoint/2010/main" val="1136218342"/>
+      </p:ext>
+    </p:extLst>
+  </p:cSld>
+  <p:clrMapOvr>
+    <a:masterClrMapping/>
+  </p:clrMapOvr>
+  <p:timing>
+    <p:tnLst>
+      <p:par>
+        <p:cTn id="1" dur="indefinite" restart="never" nodeType="tmRoot">
+          <p:childTnLst>
+            <p:seq concurrent="1" nextAc="seek">
+              <p:cTn id="2" dur="indefinite" nodeType="mainSeq">
+                <p:childTnLst>
+                  <p:par>
+                    <p:cTn id="3" fill="hold">
+                      <p:stCondLst>
+                        <p:cond delay="indefinite"/>
+                      </p:stCondLst>
+                      <p:childTnLst>
+                        <p:par>
+                          <p:cTn id="4" fill="hold">
+                            <p:stCondLst>
+                              <p:cond delay="0"/>
+                            </p:stCondLst>
+                            <p:childTnLst>
+                              <p:par>
+                                <p:cTn id="5" presetID="10" presetClass="entr" presetSubtype="0" fill="hold" grpId="0" nodeType="clickEffect">
+                                  <p:stCondLst>
+                                    <p:cond delay="0"/>
+                                  </p:stCondLst>
+                                  <p:childTnLst>
+                                    <p:set>
+                                      <p:cBhvr>
+                                        <p:cTn id="6" dur="1" fill="hold">
+                                          <p:stCondLst>
+                                            <p:cond delay="0"/>
+                                          </p:stCondLst>
+                                        </p:cTn>
+                                        <p:tgtEl>
+                                          <p:spTgt spid="3">
+                                            <p:txEl>
+                                              <p:pRg st="0" end="0"/>
+                                            </p:txEl>
+                                          </p:spTgt>
+                                        </p:tgtEl>
+                                        <p:attrNameLst>
+                                          <p:attrName>style.visibility</p:attrName>
+                                        </p:attrNameLst>
+                                      </p:cBhvr>
+                                      <p:to>
+                                        <p:strVal val="visible"/>
+                                      </p:to>
+                                    </p:set>
+                                    <p:animEffect transition="in" filter="fade">
+                                      <p:cBhvr>
+                                        <p:cTn id="7" dur="500"/>
+                                        <p:tgtEl>
+                                          <p:spTgt spid="3">
+                                            <p:txEl>
+                                              <p:pRg st="0" end="0"/>
+                                            </p:txEl>
+                                          </p:spTgt>
+                                        </p:tgtEl>
+                                      </p:cBhvr>
+                                    </p:animEffect>
+                                  </p:childTnLst>
+                                </p:cTn>
+                              </p:par>
+                              <p:par>
+                                <p:cTn id="8" presetID="10" presetClass="entr" presetSubtype="0" fill="hold" grpId="0" nodeType="withEffect">
+                                  <p:stCondLst>
+                                    <p:cond delay="0"/>
+                                  </p:stCondLst>
+                                  <p:childTnLst>
+                                    <p:set>
+                                      <p:cBhvr>
+                                        <p:cTn id="9" dur="1" fill="hold">
+                                          <p:stCondLst>
+                                            <p:cond delay="0"/>
+                                          </p:stCondLst>
+                                        </p:cTn>
+                                        <p:tgtEl>
+                                          <p:spTgt spid="3">
+                                            <p:txEl>
+                                              <p:pRg st="1" end="1"/>
+                                            </p:txEl>
+                                          </p:spTgt>
+                                        </p:tgtEl>
+                                        <p:attrNameLst>
+                                          <p:attrName>style.visibility</p:attrName>
+                                        </p:attrNameLst>
+                                      </p:cBhvr>
+                                      <p:to>
+                                        <p:strVal val="visible"/>
+                                      </p:to>
+                                    </p:set>
+                                    <p:animEffect transition="in" filter="fade">
+                                      <p:cBhvr>
+                                        <p:cTn id="10" dur="500"/>
+                                        <p:tgtEl>
+                                          <p:spTgt spid="3">
+                                            <p:txEl>
+                                              <p:pRg st="1" end="1"/>
+                                            </p:txEl>
+                                          </p:spTgt>
+                                        </p:tgtEl>
+                                      </p:cBhvr>
+                                    </p:animEffect>
+                                  </p:childTnLst>
+                                </p:cTn>
+                              </p:par>
+                              <p:par>
+                                <p:cTn id="11" presetID="10" presetClass="entr" presetSubtype="0" fill="hold" grpId="0" nodeType="withEffect">
+                                  <p:stCondLst>
+                                    <p:cond delay="0"/>
+                                  </p:stCondLst>
+                                  <p:childTnLst>
+                                    <p:set>
+                                      <p:cBhvr>
+                                        <p:cTn id="12" dur="1" fill="hold">
+                                          <p:stCondLst>
+                                            <p:cond delay="0"/>
+                                          </p:stCondLst>
+                                        </p:cTn>
+                                        <p:tgtEl>
+                                          <p:spTgt spid="3">
+                                            <p:txEl>
+                                              <p:pRg st="2" end="2"/>
+                                            </p:txEl>
+                                          </p:spTgt>
+                                        </p:tgtEl>
+                                        <p:attrNameLst>
+                                          <p:attrName>style.visibility</p:attrName>
+                                        </p:attrNameLst>
+                                      </p:cBhvr>
+                                      <p:to>
+                                        <p:strVal val="visible"/>
+                                      </p:to>
+                                    </p:set>
+                                    <p:animEffect transition="in" filter="fade">
+                                      <p:cBhvr>
+                                        <p:cTn id="13" dur="500"/>
+                                        <p:tgtEl>
+                                          <p:spTgt spid="3">
+                                            <p:txEl>
+                                              <p:pRg st="2" end="2"/>
+                                            </p:txEl>
+                                          </p:spTgt>
+                                        </p:tgtEl>
+                                      </p:cBhvr>
+                                    </p:animEffect>
+                                  </p:childTnLst>
+                                </p:cTn>
+                              </p:par>
+                            </p:childTnLst>
+                          </p:cTn>
+                        </p:par>
+                      </p:childTnLst>
+                    </p:cTn>
+                  </p:par>
+                  <p:par>
+                    <p:cTn id="14" fill="hold">
+                      <p:stCondLst>
+                        <p:cond delay="indefinite"/>
+                      </p:stCondLst>
+                      <p:childTnLst>
+                        <p:par>
+                          <p:cTn id="15" fill="hold">
+                            <p:stCondLst>
+                              <p:cond delay="0"/>
+                            </p:stCondLst>
+                            <p:childTnLst>
+                              <p:par>
+                                <p:cTn id="16" presetID="10" presetClass="entr" presetSubtype="0" fill="hold" grpId="0" nodeType="clickEffect">
+                                  <p:stCondLst>
+                                    <p:cond delay="0"/>
+                                  </p:stCondLst>
+                                  <p:childTnLst>
+                                    <p:set>
+                                      <p:cBhvr>
+                                        <p:cTn id="17" dur="1" fill="hold">
+                                          <p:stCondLst>
+                                            <p:cond delay="0"/>
+                                          </p:stCondLst>
+                                        </p:cTn>
+                                        <p:tgtEl>
+                                          <p:spTgt spid="3">
+                                            <p:txEl>
+                                              <p:pRg st="3" end="3"/>
+                                            </p:txEl>
+                                          </p:spTgt>
+                                        </p:tgtEl>
+                                        <p:attrNameLst>
+                                          <p:attrName>style.visibility</p:attrName>
+                                        </p:attrNameLst>
+                                      </p:cBhvr>
+                                      <p:to>
+                                        <p:strVal val="visible"/>
+                                      </p:to>
+                                    </p:set>
+                                    <p:animEffect transition="in" filter="fade">
+                                      <p:cBhvr>
+                                        <p:cTn id="18" dur="500"/>
+                                        <p:tgtEl>
+                                          <p:spTgt spid="3">
+                                            <p:txEl>
+                                              <p:pRg st="3" end="3"/>
+                                            </p:txEl>
+                                          </p:spTgt>
+                                        </p:tgtEl>
+                                      </p:cBhvr>
+                                    </p:animEffect>
+                                  </p:childTnLst>
+                                </p:cTn>
+                              </p:par>
+                            </p:childTnLst>
+                          </p:cTn>
+                        </p:par>
+                      </p:childTnLst>
+                    </p:cTn>
+                  </p:par>
+                </p:childTnLst>
+              </p:cTn>
+              <p:prevCondLst>
+                <p:cond evt="onPrev" delay="0">
+                  <p:tgtEl>
+                    <p:sldTgt/>
+                  </p:tgtEl>
+                </p:cond>
+              </p:prevCondLst>
+              <p:nextCondLst>
+                <p:cond evt="onNext" delay="0">
+                  <p:tgtEl>
+                    <p:sldTgt/>
+                  </p:tgtEl>
+                </p:cond>
+              </p:nextCondLst>
+            </p:seq>
+          </p:childTnLst>
+        </p:cTn>
+      </p:par>
+    </p:tnLst>
+    <p:bldLst>
+      <p:bldP spid="3" grpId="0" uiExpand="1" build="p"/>
+    </p:bldLst>
+  </p:timing>
+</p:sld>
+</file>
+
+<file path=ppt/slides/slide15.xml><?xml version="1.0" encoding="utf-8"?>
+<p:sld xmlns:a="http://schemas.openxmlformats.org/drawingml/2006/main" xmlns:r="http://schemas.openxmlformats.org/officeDocument/2006/relationships" xmlns:p="http://schemas.openxmlformats.org/presentationml/2006/main">
+  <p:cSld>
+    <p:spTree>
+      <p:nvGrpSpPr>
+        <p:cNvPr id="1" name=""/>
+        <p:cNvGrpSpPr/>
+        <p:nvPr/>
+      </p:nvGrpSpPr>
+      <p:grpSpPr>
+        <a:xfrm>
+          <a:off x="0" y="0"/>
+          <a:ext cx="0" cy="0"/>
+          <a:chOff x="0" y="0"/>
+          <a:chExt cx="0" cy="0"/>
+        </a:xfrm>
+      </p:grpSpPr>
+      <p:sp>
+        <p:nvSpPr>
+          <p:cNvPr id="2" name="Title 1">
+            <a:extLst>
+              <a:ext uri="{FF2B5EF4-FFF2-40B4-BE49-F238E27FC236}">
+                <a16:creationId xmlns:a16="http://schemas.microsoft.com/office/drawing/2014/main" id="{D820E5FD-8317-6AF1-28C5-B51ACC316E48}"/>
+              </a:ext>
+            </a:extLst>
+          </p:cNvPr>
+          <p:cNvSpPr>
+            <a:spLocks noGrp="1"/>
+          </p:cNvSpPr>
+          <p:nvPr>
+            <p:ph type="title"/>
+          </p:nvPr>
+        </p:nvSpPr>
+        <p:spPr/>
+        <p:txBody>
+          <a:bodyPr/>
+          <a:lstStyle/>
+          <a:p>
+            <a:r>
+              <a:rPr lang="en-US" dirty="0"/>
+              <a:t>Unit 2 – Layout Using Grid</a:t>
+            </a:r>
+          </a:p>
+        </p:txBody>
+      </p:sp>
+      <p:sp>
+        <p:nvSpPr>
+          <p:cNvPr id="3" name="Content Placeholder 2">
+            <a:extLst>
+              <a:ext uri="{FF2B5EF4-FFF2-40B4-BE49-F238E27FC236}">
+                <a16:creationId xmlns:a16="http://schemas.microsoft.com/office/drawing/2014/main" id="{4346CC46-1CE4-CDE9-E016-201D0E96CD96}"/>
+              </a:ext>
+            </a:extLst>
+          </p:cNvPr>
+          <p:cNvSpPr>
+            <a:spLocks noGrp="1"/>
+          </p:cNvSpPr>
+          <p:nvPr>
+            <p:ph idx="1"/>
+          </p:nvPr>
+        </p:nvSpPr>
+        <p:spPr/>
+        <p:txBody>
+          <a:bodyPr/>
+          <a:lstStyle/>
+          <a:p>
+            <a:r>
+              <a:rPr lang="en-US" dirty="0"/>
+              <a:t>Grid - Spanning Rows and Columns</a:t>
+            </a:r>
+          </a:p>
+          <a:p>
+            <a:pPr lvl="1"/>
+            <a:r>
+              <a:rPr lang="en-US" dirty="0"/>
+              <a:t>You can set controls to span multiple rows or columns</a:t>
+            </a:r>
+          </a:p>
+          <a:p>
+            <a:pPr lvl="1"/>
+            <a:r>
+              <a:rPr lang="en-US" dirty="0"/>
+              <a:t>Set spanning on child element that should span</a:t>
+            </a:r>
+          </a:p>
+          <a:p>
+            <a:pPr lvl="1"/>
+            <a:r>
+              <a:rPr lang="en-US" dirty="0" err="1"/>
+              <a:t>Grid.RowSpan</a:t>
+            </a:r>
+            <a:r>
+              <a:rPr lang="en-US" dirty="0"/>
+              <a:t>, </a:t>
+            </a:r>
+            <a:r>
+              <a:rPr lang="en-US" dirty="0" err="1"/>
+              <a:t>Grid.ColumnSpan</a:t>
+            </a:r>
+            <a:r>
+              <a:rPr lang="en-US" dirty="0"/>
+              <a:t> - and # columns</a:t>
+            </a:r>
+          </a:p>
+        </p:txBody>
+      </p:sp>
+    </p:spTree>
+    <p:extLst>
+      <p:ext uri="{BB962C8B-B14F-4D97-AF65-F5344CB8AC3E}">
+        <p14:creationId xmlns:p14="http://schemas.microsoft.com/office/powerpoint/2010/main" val="2852243770"/>
+      </p:ext>
+    </p:extLst>
+  </p:cSld>
+  <p:clrMapOvr>
+    <a:masterClrMapping/>
+  </p:clrMapOvr>
+  <p:timing>
+    <p:tnLst>
+      <p:par>
+        <p:cTn id="1" dur="indefinite" restart="never" nodeType="tmRoot">
+          <p:childTnLst>
+            <p:seq concurrent="1" nextAc="seek">
+              <p:cTn id="2" dur="indefinite" nodeType="mainSeq">
+                <p:childTnLst>
+                  <p:par>
+                    <p:cTn id="3" fill="hold">
+                      <p:stCondLst>
+                        <p:cond delay="indefinite"/>
+                      </p:stCondLst>
+                      <p:childTnLst>
+                        <p:par>
+                          <p:cTn id="4" fill="hold">
+                            <p:stCondLst>
+                              <p:cond delay="0"/>
+                            </p:stCondLst>
+                            <p:childTnLst>
+                              <p:par>
+                                <p:cTn id="5" presetID="10" presetClass="entr" presetSubtype="0" fill="hold" grpId="0" nodeType="clickEffect">
+                                  <p:stCondLst>
+                                    <p:cond delay="0"/>
+                                  </p:stCondLst>
+                                  <p:childTnLst>
+                                    <p:set>
+                                      <p:cBhvr>
+                                        <p:cTn id="6" dur="1" fill="hold">
+                                          <p:stCondLst>
+                                            <p:cond delay="0"/>
+                                          </p:stCondLst>
+                                        </p:cTn>
+                                        <p:tgtEl>
+                                          <p:spTgt spid="3">
+                                            <p:txEl>
+                                              <p:pRg st="0" end="0"/>
+                                            </p:txEl>
+                                          </p:spTgt>
+                                        </p:tgtEl>
+                                        <p:attrNameLst>
+                                          <p:attrName>style.visibility</p:attrName>
+                                        </p:attrNameLst>
+                                      </p:cBhvr>
+                                      <p:to>
+                                        <p:strVal val="visible"/>
+                                      </p:to>
+                                    </p:set>
+                                    <p:animEffect transition="in" filter="fade">
+                                      <p:cBhvr>
+                                        <p:cTn id="7" dur="500"/>
+                                        <p:tgtEl>
+                                          <p:spTgt spid="3">
+                                            <p:txEl>
+                                              <p:pRg st="0" end="0"/>
+                                            </p:txEl>
+                                          </p:spTgt>
+                                        </p:tgtEl>
+                                      </p:cBhvr>
+                                    </p:animEffect>
+                                  </p:childTnLst>
+                                </p:cTn>
+                              </p:par>
+                            </p:childTnLst>
+                          </p:cTn>
+                        </p:par>
+                      </p:childTnLst>
+                    </p:cTn>
+                  </p:par>
+                  <p:par>
+                    <p:cTn id="8" fill="hold">
+                      <p:stCondLst>
+                        <p:cond delay="indefinite"/>
+                      </p:stCondLst>
+                      <p:childTnLst>
+                        <p:par>
+                          <p:cTn id="9" fill="hold">
+                            <p:stCondLst>
+                              <p:cond delay="0"/>
+                            </p:stCondLst>
+                            <p:childTnLst>
+                              <p:par>
+                                <p:cTn id="10" presetID="10" presetClass="entr" presetSubtype="0" fill="hold" grpId="0" nodeType="clickEffect">
+                                  <p:stCondLst>
+                                    <p:cond delay="0"/>
+                                  </p:stCondLst>
+                                  <p:childTnLst>
+                                    <p:set>
+                                      <p:cBhvr>
+                                        <p:cTn id="11" dur="1" fill="hold">
+                                          <p:stCondLst>
+                                            <p:cond delay="0"/>
+                                          </p:stCondLst>
+                                        </p:cTn>
+                                        <p:tgtEl>
+                                          <p:spTgt spid="3">
+                                            <p:txEl>
+                                              <p:pRg st="1" end="1"/>
+                                            </p:txEl>
+                                          </p:spTgt>
+                                        </p:tgtEl>
+                                        <p:attrNameLst>
+                                          <p:attrName>style.visibility</p:attrName>
+                                        </p:attrNameLst>
+                                      </p:cBhvr>
+                                      <p:to>
+                                        <p:strVal val="visible"/>
+                                      </p:to>
+                                    </p:set>
+                                    <p:animEffect transition="in" filter="fade">
+                                      <p:cBhvr>
+                                        <p:cTn id="12" dur="500"/>
+                                        <p:tgtEl>
+                                          <p:spTgt spid="3">
+                                            <p:txEl>
+                                              <p:pRg st="1" end="1"/>
+                                            </p:txEl>
+                                          </p:spTgt>
+                                        </p:tgtEl>
+                                      </p:cBhvr>
+                                    </p:animEffect>
+                                  </p:childTnLst>
+                                </p:cTn>
+                              </p:par>
+                            </p:childTnLst>
+                          </p:cTn>
+                        </p:par>
+                      </p:childTnLst>
+                    </p:cTn>
+                  </p:par>
+                  <p:par>
+                    <p:cTn id="13" fill="hold">
+                      <p:stCondLst>
+                        <p:cond delay="indefinite"/>
+                      </p:stCondLst>
+                      <p:childTnLst>
+                        <p:par>
+                          <p:cTn id="14" fill="hold">
+                            <p:stCondLst>
+                              <p:cond delay="0"/>
+                            </p:stCondLst>
+                            <p:childTnLst>
+                              <p:par>
+                                <p:cTn id="15" presetID="10" presetClass="entr" presetSubtype="0" fill="hold" grpId="0" nodeType="clickEffect">
+                                  <p:stCondLst>
+                                    <p:cond delay="0"/>
+                                  </p:stCondLst>
+                                  <p:childTnLst>
+                                    <p:set>
+                                      <p:cBhvr>
+                                        <p:cTn id="16" dur="1" fill="hold">
+                                          <p:stCondLst>
+                                            <p:cond delay="0"/>
+                                          </p:stCondLst>
+                                        </p:cTn>
+                                        <p:tgtEl>
+                                          <p:spTgt spid="3">
+                                            <p:txEl>
+                                              <p:pRg st="2" end="2"/>
+                                            </p:txEl>
+                                          </p:spTgt>
+                                        </p:tgtEl>
+                                        <p:attrNameLst>
+                                          <p:attrName>style.visibility</p:attrName>
+                                        </p:attrNameLst>
+                                      </p:cBhvr>
+                                      <p:to>
+                                        <p:strVal val="visible"/>
+                                      </p:to>
+                                    </p:set>
+                                    <p:animEffect transition="in" filter="fade">
+                                      <p:cBhvr>
+                                        <p:cTn id="17" dur="500"/>
+                                        <p:tgtEl>
+                                          <p:spTgt spid="3">
+                                            <p:txEl>
+                                              <p:pRg st="2" end="2"/>
+                                            </p:txEl>
+                                          </p:spTgt>
+                                        </p:tgtEl>
+                                      </p:cBhvr>
+                                    </p:animEffect>
+                                  </p:childTnLst>
+                                </p:cTn>
+                              </p:par>
+                            </p:childTnLst>
+                          </p:cTn>
+                        </p:par>
+                      </p:childTnLst>
+                    </p:cTn>
+                  </p:par>
+                  <p:par>
+                    <p:cTn id="18" fill="hold">
+                      <p:stCondLst>
+                        <p:cond delay="indefinite"/>
+                      </p:stCondLst>
+                      <p:childTnLst>
+                        <p:par>
+                          <p:cTn id="19" fill="hold">
+                            <p:stCondLst>
+                              <p:cond delay="0"/>
+                            </p:stCondLst>
+                            <p:childTnLst>
+                              <p:par>
+                                <p:cTn id="20" presetID="10" presetClass="entr" presetSubtype="0" fill="hold" grpId="0" nodeType="clickEffect">
+                                  <p:stCondLst>
+                                    <p:cond delay="0"/>
+                                  </p:stCondLst>
+                                  <p:childTnLst>
+                                    <p:set>
+                                      <p:cBhvr>
+                                        <p:cTn id="21" dur="1" fill="hold">
+                                          <p:stCondLst>
+                                            <p:cond delay="0"/>
+                                          </p:stCondLst>
+                                        </p:cTn>
+                                        <p:tgtEl>
+                                          <p:spTgt spid="3">
+                                            <p:txEl>
+                                              <p:pRg st="3" end="3"/>
+                                            </p:txEl>
+                                          </p:spTgt>
+                                        </p:tgtEl>
+                                        <p:attrNameLst>
+                                          <p:attrName>style.visibility</p:attrName>
+                                        </p:attrNameLst>
+                                      </p:cBhvr>
+                                      <p:to>
+                                        <p:strVal val="visible"/>
+                                      </p:to>
+                                    </p:set>
+                                    <p:animEffect transition="in" filter="fade">
+                                      <p:cBhvr>
+                                        <p:cTn id="22" dur="500"/>
+                                        <p:tgtEl>
+                                          <p:spTgt spid="3">
+                                            <p:txEl>
+                                              <p:pRg st="3" end="3"/>
+                                            </p:txEl>
+                                          </p:spTgt>
+                                        </p:tgtEl>
+                                      </p:cBhvr>
+                                    </p:animEffect>
+                                  </p:childTnLst>
+                                </p:cTn>
+                              </p:par>
+                            </p:childTnLst>
+                          </p:cTn>
+                        </p:par>
+                      </p:childTnLst>
+                    </p:cTn>
+                  </p:par>
+                </p:childTnLst>
+              </p:cTn>
+              <p:prevCondLst>
+                <p:cond evt="onPrev" delay="0">
+                  <p:tgtEl>
+                    <p:sldTgt/>
+                  </p:tgtEl>
+                </p:cond>
+              </p:prevCondLst>
+              <p:nextCondLst>
+                <p:cond evt="onNext" delay="0">
+                  <p:tgtEl>
+                    <p:sldTgt/>
+                  </p:tgtEl>
+                </p:cond>
+              </p:nextCondLst>
+            </p:seq>
+          </p:childTnLst>
+        </p:cTn>
+      </p:par>
+    </p:tnLst>
+    <p:bldLst>
+      <p:bldP spid="3" grpId="0" uiExpand="1" build="p"/>
+    </p:bldLst>
+  </p:timing>
+</p:sld>
+</file>
+
+<file path=ppt/slides/slide16.xml><?xml version="1.0" encoding="utf-8"?>
+<p:sld xmlns:a="http://schemas.openxmlformats.org/drawingml/2006/main" xmlns:r="http://schemas.openxmlformats.org/officeDocument/2006/relationships" xmlns:p="http://schemas.openxmlformats.org/presentationml/2006/main">
+  <p:cSld>
+    <p:spTree>
+      <p:nvGrpSpPr>
+        <p:cNvPr id="1" name=""/>
+        <p:cNvGrpSpPr/>
+        <p:nvPr/>
+      </p:nvGrpSpPr>
+      <p:grpSpPr>
+        <a:xfrm>
+          <a:off x="0" y="0"/>
+          <a:ext cx="0" cy="0"/>
+          <a:chOff x="0" y="0"/>
+          <a:chExt cx="0" cy="0"/>
+        </a:xfrm>
+      </p:grpSpPr>
+      <p:sp>
+        <p:nvSpPr>
+          <p:cNvPr id="2" name="Title 1">
+            <a:extLst>
+              <a:ext uri="{FF2B5EF4-FFF2-40B4-BE49-F238E27FC236}">
+                <a16:creationId xmlns:a16="http://schemas.microsoft.com/office/drawing/2014/main" id="{0408F1B1-4452-136D-2291-987CA2375327}"/>
+              </a:ext>
+            </a:extLst>
+          </p:cNvPr>
+          <p:cNvSpPr>
+            <a:spLocks noGrp="1"/>
+          </p:cNvSpPr>
+          <p:nvPr>
+            <p:ph type="title"/>
+          </p:nvPr>
+        </p:nvSpPr>
+        <p:spPr/>
+        <p:txBody>
+          <a:bodyPr/>
+          <a:lstStyle/>
+          <a:p>
+            <a:r>
+              <a:rPr lang="en-US" dirty="0">
+                <a:solidFill>
+                  <a:schemeClr val="accent5">
+                    <a:lumMod val="75000"/>
+                  </a:schemeClr>
+                </a:solidFill>
+              </a:rPr>
+              <a:t>Exercise 2 – Layout Using Grid</a:t>
+            </a:r>
+          </a:p>
+        </p:txBody>
+      </p:sp>
+      <p:sp>
+        <p:nvSpPr>
+          <p:cNvPr id="3" name="Content Placeholder 2">
+            <a:extLst>
+              <a:ext uri="{FF2B5EF4-FFF2-40B4-BE49-F238E27FC236}">
+                <a16:creationId xmlns:a16="http://schemas.microsoft.com/office/drawing/2014/main" id="{8E115352-276E-D4B0-5E40-EE34C32ECBCB}"/>
+              </a:ext>
+            </a:extLst>
+          </p:cNvPr>
+          <p:cNvSpPr>
+            <a:spLocks noGrp="1"/>
+          </p:cNvSpPr>
+          <p:nvPr>
+            <p:ph idx="1"/>
+          </p:nvPr>
+        </p:nvSpPr>
+        <p:spPr/>
+        <p:txBody>
+          <a:bodyPr/>
+          <a:lstStyle/>
+          <a:p>
+            <a:r>
+              <a:rPr lang="en-US" dirty="0"/>
+              <a:t>What You’ll Learn</a:t>
+            </a:r>
+          </a:p>
+          <a:p>
+            <a:pPr lvl="1"/>
+            <a:r>
+              <a:rPr lang="en-US" dirty="0"/>
+              <a:t>How to arrange child controls in a Grid panel</a:t>
+            </a:r>
+          </a:p>
+          <a:p>
+            <a:r>
+              <a:rPr lang="en-US" dirty="0"/>
+              <a:t>Exercise</a:t>
+            </a:r>
+          </a:p>
+          <a:p>
+            <a:pPr lvl="1"/>
+            <a:r>
+              <a:rPr lang="en-US" dirty="0"/>
+              <a:t>Create new project or use existing</a:t>
+            </a:r>
+          </a:p>
+          <a:p>
+            <a:pPr lvl="1"/>
+            <a:r>
+              <a:rPr lang="en-US" dirty="0"/>
+              <a:t>Create controls in a Grid</a:t>
+            </a:r>
+          </a:p>
+          <a:p>
+            <a:pPr lvl="1"/>
+            <a:r>
+              <a:rPr lang="en-US" dirty="0"/>
+              <a:t>Extra credit</a:t>
+            </a:r>
+          </a:p>
+        </p:txBody>
+      </p:sp>
+    </p:spTree>
+    <p:extLst>
+      <p:ext uri="{BB962C8B-B14F-4D97-AF65-F5344CB8AC3E}">
+        <p14:creationId xmlns:p14="http://schemas.microsoft.com/office/powerpoint/2010/main" val="3098273416"/>
+      </p:ext>
+    </p:extLst>
+  </p:cSld>
+  <p:clrMapOvr>
+    <a:masterClrMapping/>
+  </p:clrMapOvr>
+</p:sld>
+</file>
+
 <file path=ppt/slides/slide2.xml><?xml version="1.0" encoding="utf-8"?>
 <p:sld xmlns:a="http://schemas.openxmlformats.org/drawingml/2006/main" xmlns:r="http://schemas.openxmlformats.org/officeDocument/2006/relationships" xmlns:p="http://schemas.openxmlformats.org/presentationml/2006/main">
   <p:cSld>
@@ -12134,7 +15642,7 @@
                   <a:srgbClr val="00B050"/>
                 </a:solidFill>
               </a:rPr>
-              <a:t>Example</a:t>
+              <a:t>Example - XAML</a:t>
             </a:r>
           </a:p>
         </p:txBody>

</xml_diff>

<commit_message>
Working on Unit 3
</commit_message>
<xml_diff>
--- a/WPF-Workshop-Sexton-Oct2023.pptx
+++ b/WPF-Workshop-Sexton-Oct2023.pptx
@@ -5,7 +5,7 @@
     <p:sldMasterId id="2147483896" r:id="rId1"/>
   </p:sldMasterIdLst>
   <p:notesMasterIdLst>
-    <p:notesMasterId r:id="rId18"/>
+    <p:notesMasterId r:id="rId25"/>
   </p:notesMasterIdLst>
   <p:sldIdLst>
     <p:sldId id="256" r:id="rId2"/>
@@ -24,6 +24,13 @@
     <p:sldId id="270" r:id="rId15"/>
     <p:sldId id="271" r:id="rId16"/>
     <p:sldId id="272" r:id="rId17"/>
+    <p:sldId id="273" r:id="rId18"/>
+    <p:sldId id="274" r:id="rId19"/>
+    <p:sldId id="275" r:id="rId20"/>
+    <p:sldId id="276" r:id="rId21"/>
+    <p:sldId id="277" r:id="rId22"/>
+    <p:sldId id="278" r:id="rId23"/>
+    <p:sldId id="279" r:id="rId24"/>
   </p:sldIdLst>
   <p:sldSz cx="12192000" cy="6858000"/>
   <p:notesSz cx="6858000" cy="9144000"/>
@@ -1308,6 +1315,280 @@
 </p:notes>
 </file>
 
+<file path=ppt/notesSlides/notesSlide17.xml><?xml version="1.0" encoding="utf-8"?>
+<p:notes xmlns:a="http://schemas.openxmlformats.org/drawingml/2006/main" xmlns:r="http://schemas.openxmlformats.org/officeDocument/2006/relationships" xmlns:p="http://schemas.openxmlformats.org/presentationml/2006/main">
+  <p:cSld>
+    <p:spTree>
+      <p:nvGrpSpPr>
+        <p:cNvPr id="1" name=""/>
+        <p:cNvGrpSpPr/>
+        <p:nvPr/>
+      </p:nvGrpSpPr>
+      <p:grpSpPr>
+        <a:xfrm>
+          <a:off x="0" y="0"/>
+          <a:ext cx="0" cy="0"/>
+          <a:chOff x="0" y="0"/>
+          <a:chExt cx="0" cy="0"/>
+        </a:xfrm>
+      </p:grpSpPr>
+      <p:sp>
+        <p:nvSpPr>
+          <p:cNvPr id="2" name="Slide Image Placeholder 1"/>
+          <p:cNvSpPr>
+            <a:spLocks noGrp="1" noRot="1" noChangeAspect="1"/>
+          </p:cNvSpPr>
+          <p:nvPr>
+            <p:ph type="sldImg"/>
+          </p:nvPr>
+        </p:nvSpPr>
+        <p:spPr/>
+      </p:sp>
+      <p:sp>
+        <p:nvSpPr>
+          <p:cNvPr id="3" name="Notes Placeholder 2"/>
+          <p:cNvSpPr>
+            <a:spLocks noGrp="1"/>
+          </p:cNvSpPr>
+          <p:nvPr>
+            <p:ph type="body" idx="1"/>
+          </p:nvPr>
+        </p:nvSpPr>
+        <p:spPr/>
+        <p:txBody>
+          <a:bodyPr/>
+          <a:lstStyle/>
+          <a:p>
+            <a:r>
+              <a:rPr lang="en-US" dirty="0"/>
+              <a:t>e.g. a basic data entry application</a:t>
+            </a:r>
+          </a:p>
+          <a:p>
+            <a:r>
+              <a:rPr lang="en-US" dirty="0"/>
+              <a:t>LAST: Store that data back</a:t>
+            </a:r>
+            <a:br>
+              <a:rPr lang="en-US" dirty="0"/>
+            </a:br>
+            <a:r>
+              <a:rPr lang="en-US" dirty="0"/>
+              <a:t>- Question - what's the best architecture for this type of application?</a:t>
+            </a:r>
+          </a:p>
+        </p:txBody>
+      </p:sp>
+      <p:sp>
+        <p:nvSpPr>
+          <p:cNvPr id="4" name="Slide Number Placeholder 3"/>
+          <p:cNvSpPr>
+            <a:spLocks noGrp="1"/>
+          </p:cNvSpPr>
+          <p:nvPr>
+            <p:ph type="sldNum" sz="quarter" idx="5"/>
+          </p:nvPr>
+        </p:nvSpPr>
+        <p:spPr/>
+        <p:txBody>
+          <a:bodyPr/>
+          <a:lstStyle/>
+          <a:p>
+            <a:fld id="{52D86A8A-0D3B-4DD1-BCA4-15D29761E8A6}" type="slidenum">
+              <a:rPr lang="en-US" smtClean="0"/>
+              <a:t>17</a:t>
+            </a:fld>
+            <a:endParaRPr lang="en-US"/>
+          </a:p>
+        </p:txBody>
+      </p:sp>
+    </p:spTree>
+    <p:extLst>
+      <p:ext uri="{BB962C8B-B14F-4D97-AF65-F5344CB8AC3E}">
+        <p14:creationId xmlns:p14="http://schemas.microsoft.com/office/powerpoint/2010/main" val="1878715022"/>
+      </p:ext>
+    </p:extLst>
+  </p:cSld>
+  <p:clrMapOvr>
+    <a:masterClrMapping/>
+  </p:clrMapOvr>
+</p:notes>
+</file>
+
+<file path=ppt/notesSlides/notesSlide18.xml><?xml version="1.0" encoding="utf-8"?>
+<p:notes xmlns:a="http://schemas.openxmlformats.org/drawingml/2006/main" xmlns:r="http://schemas.openxmlformats.org/officeDocument/2006/relationships" xmlns:p="http://schemas.openxmlformats.org/presentationml/2006/main">
+  <p:cSld>
+    <p:spTree>
+      <p:nvGrpSpPr>
+        <p:cNvPr id="1" name=""/>
+        <p:cNvGrpSpPr/>
+        <p:nvPr/>
+      </p:nvGrpSpPr>
+      <p:grpSpPr>
+        <a:xfrm>
+          <a:off x="0" y="0"/>
+          <a:ext cx="0" cy="0"/>
+          <a:chOff x="0" y="0"/>
+          <a:chExt cx="0" cy="0"/>
+        </a:xfrm>
+      </p:grpSpPr>
+      <p:sp>
+        <p:nvSpPr>
+          <p:cNvPr id="2" name="Slide Image Placeholder 1"/>
+          <p:cNvSpPr>
+            <a:spLocks noGrp="1" noRot="1" noChangeAspect="1"/>
+          </p:cNvSpPr>
+          <p:nvPr>
+            <p:ph type="sldImg"/>
+          </p:nvPr>
+        </p:nvSpPr>
+        <p:spPr/>
+      </p:sp>
+      <p:sp>
+        <p:nvSpPr>
+          <p:cNvPr id="3" name="Notes Placeholder 2"/>
+          <p:cNvSpPr>
+            <a:spLocks noGrp="1"/>
+          </p:cNvSpPr>
+          <p:nvPr>
+            <p:ph type="body" idx="1"/>
+          </p:nvPr>
+        </p:nvSpPr>
+        <p:spPr/>
+        <p:txBody>
+          <a:bodyPr/>
+          <a:lstStyle/>
+          <a:p>
+            <a:r>
+              <a:rPr lang="en-US" dirty="0"/>
+              <a:t>LAST: Model takes</a:t>
+            </a:r>
+          </a:p>
+        </p:txBody>
+      </p:sp>
+      <p:sp>
+        <p:nvSpPr>
+          <p:cNvPr id="4" name="Slide Number Placeholder 3"/>
+          <p:cNvSpPr>
+            <a:spLocks noGrp="1"/>
+          </p:cNvSpPr>
+          <p:nvPr>
+            <p:ph type="sldNum" sz="quarter" idx="5"/>
+          </p:nvPr>
+        </p:nvSpPr>
+        <p:spPr/>
+        <p:txBody>
+          <a:bodyPr/>
+          <a:lstStyle/>
+          <a:p>
+            <a:fld id="{52D86A8A-0D3B-4DD1-BCA4-15D29761E8A6}" type="slidenum">
+              <a:rPr lang="en-US" smtClean="0"/>
+              <a:t>19</a:t>
+            </a:fld>
+            <a:endParaRPr lang="en-US"/>
+          </a:p>
+        </p:txBody>
+      </p:sp>
+    </p:spTree>
+    <p:extLst>
+      <p:ext uri="{BB962C8B-B14F-4D97-AF65-F5344CB8AC3E}">
+        <p14:creationId xmlns:p14="http://schemas.microsoft.com/office/powerpoint/2010/main" val="3801312271"/>
+      </p:ext>
+    </p:extLst>
+  </p:cSld>
+  <p:clrMapOvr>
+    <a:masterClrMapping/>
+  </p:clrMapOvr>
+</p:notes>
+</file>
+
+<file path=ppt/notesSlides/notesSlide19.xml><?xml version="1.0" encoding="utf-8"?>
+<p:notes xmlns:a="http://schemas.openxmlformats.org/drawingml/2006/main" xmlns:r="http://schemas.openxmlformats.org/officeDocument/2006/relationships" xmlns:p="http://schemas.openxmlformats.org/presentationml/2006/main">
+  <p:cSld>
+    <p:spTree>
+      <p:nvGrpSpPr>
+        <p:cNvPr id="1" name=""/>
+        <p:cNvGrpSpPr/>
+        <p:nvPr/>
+      </p:nvGrpSpPr>
+      <p:grpSpPr>
+        <a:xfrm>
+          <a:off x="0" y="0"/>
+          <a:ext cx="0" cy="0"/>
+          <a:chOff x="0" y="0"/>
+          <a:chExt cx="0" cy="0"/>
+        </a:xfrm>
+      </p:grpSpPr>
+      <p:sp>
+        <p:nvSpPr>
+          <p:cNvPr id="2" name="Slide Image Placeholder 1"/>
+          <p:cNvSpPr>
+            <a:spLocks noGrp="1" noRot="1" noChangeAspect="1"/>
+          </p:cNvSpPr>
+          <p:nvPr>
+            <p:ph type="sldImg"/>
+          </p:nvPr>
+        </p:nvSpPr>
+        <p:spPr/>
+      </p:sp>
+      <p:sp>
+        <p:nvSpPr>
+          <p:cNvPr id="3" name="Notes Placeholder 2"/>
+          <p:cNvSpPr>
+            <a:spLocks noGrp="1"/>
+          </p:cNvSpPr>
+          <p:nvPr>
+            <p:ph type="body" idx="1"/>
+          </p:nvPr>
+        </p:nvSpPr>
+        <p:spPr/>
+        <p:txBody>
+          <a:bodyPr/>
+          <a:lstStyle/>
+          <a:p>
+            <a:r>
+              <a:rPr lang="en-US" dirty="0"/>
+              <a:t>LAST: Quite common</a:t>
+            </a:r>
+          </a:p>
+        </p:txBody>
+      </p:sp>
+      <p:sp>
+        <p:nvSpPr>
+          <p:cNvPr id="4" name="Slide Number Placeholder 3"/>
+          <p:cNvSpPr>
+            <a:spLocks noGrp="1"/>
+          </p:cNvSpPr>
+          <p:nvPr>
+            <p:ph type="sldNum" sz="quarter" idx="5"/>
+          </p:nvPr>
+        </p:nvSpPr>
+        <p:spPr/>
+        <p:txBody>
+          <a:bodyPr/>
+          <a:lstStyle/>
+          <a:p>
+            <a:fld id="{52D86A8A-0D3B-4DD1-BCA4-15D29761E8A6}" type="slidenum">
+              <a:rPr lang="en-US" smtClean="0"/>
+              <a:t>20</a:t>
+            </a:fld>
+            <a:endParaRPr lang="en-US"/>
+          </a:p>
+        </p:txBody>
+      </p:sp>
+    </p:spTree>
+    <p:extLst>
+      <p:ext uri="{BB962C8B-B14F-4D97-AF65-F5344CB8AC3E}">
+        <p14:creationId xmlns:p14="http://schemas.microsoft.com/office/powerpoint/2010/main" val="1767865913"/>
+      </p:ext>
+    </p:extLst>
+  </p:cSld>
+  <p:clrMapOvr>
+    <a:masterClrMapping/>
+  </p:clrMapOvr>
+</p:notes>
+</file>
+
 <file path=ppt/notesSlides/notesSlide2.xml><?xml version="1.0" encoding="utf-8"?>
 <p:notes xmlns:a="http://schemas.openxmlformats.org/drawingml/2006/main" xmlns:r="http://schemas.openxmlformats.org/officeDocument/2006/relationships" xmlns:p="http://schemas.openxmlformats.org/presentationml/2006/main">
   <p:cSld>
@@ -1437,6 +1718,331 @@
     <p:extLst>
       <p:ext uri="{BB962C8B-B14F-4D97-AF65-F5344CB8AC3E}">
         <p14:creationId xmlns:p14="http://schemas.microsoft.com/office/powerpoint/2010/main" val="1452565925"/>
+      </p:ext>
+    </p:extLst>
+  </p:cSld>
+  <p:clrMapOvr>
+    <a:masterClrMapping/>
+  </p:clrMapOvr>
+</p:notes>
+</file>
+
+<file path=ppt/notesSlides/notesSlide20.xml><?xml version="1.0" encoding="utf-8"?>
+<p:notes xmlns:a="http://schemas.openxmlformats.org/drawingml/2006/main" xmlns:r="http://schemas.openxmlformats.org/officeDocument/2006/relationships" xmlns:p="http://schemas.openxmlformats.org/presentationml/2006/main">
+  <p:cSld>
+    <p:spTree>
+      <p:nvGrpSpPr>
+        <p:cNvPr id="1" name=""/>
+        <p:cNvGrpSpPr/>
+        <p:nvPr/>
+      </p:nvGrpSpPr>
+      <p:grpSpPr>
+        <a:xfrm>
+          <a:off x="0" y="0"/>
+          <a:ext cx="0" cy="0"/>
+          <a:chOff x="0" y="0"/>
+          <a:chExt cx="0" cy="0"/>
+        </a:xfrm>
+      </p:grpSpPr>
+      <p:sp>
+        <p:nvSpPr>
+          <p:cNvPr id="2" name="Slide Image Placeholder 1"/>
+          <p:cNvSpPr>
+            <a:spLocks noGrp="1" noRot="1" noChangeAspect="1"/>
+          </p:cNvSpPr>
+          <p:nvPr>
+            <p:ph type="sldImg"/>
+          </p:nvPr>
+        </p:nvSpPr>
+        <p:spPr/>
+      </p:sp>
+      <p:sp>
+        <p:nvSpPr>
+          <p:cNvPr id="3" name="Notes Placeholder 2"/>
+          <p:cNvSpPr>
+            <a:spLocks noGrp="1"/>
+          </p:cNvSpPr>
+          <p:nvPr>
+            <p:ph type="body" idx="1"/>
+          </p:nvPr>
+        </p:nvSpPr>
+        <p:spPr/>
+        <p:txBody>
+          <a:bodyPr/>
+          <a:lstStyle/>
+          <a:p>
+            <a:r>
+              <a:rPr lang="en-US" dirty="0"/>
+              <a:t>Where you might use modes</a:t>
+            </a:r>
+          </a:p>
+          <a:p>
+            <a:r>
+              <a:rPr lang="en-US" dirty="0"/>
+              <a:t>- </a:t>
+            </a:r>
+            <a:r>
+              <a:rPr lang="en-US" dirty="0" err="1"/>
+              <a:t>OneWay</a:t>
+            </a:r>
+            <a:r>
+              <a:rPr lang="en-US" dirty="0"/>
+              <a:t> - for populating UI on load, e.g. filling list with items, where user can't change the list</a:t>
+            </a:r>
+          </a:p>
+          <a:p>
+            <a:r>
+              <a:rPr lang="en-US" dirty="0"/>
+              <a:t>- </a:t>
+            </a:r>
+            <a:r>
+              <a:rPr lang="en-US" dirty="0" err="1"/>
+              <a:t>TwoWay</a:t>
+            </a:r>
+            <a:r>
+              <a:rPr lang="en-US" dirty="0"/>
+              <a:t> - typical user data entry, fill in </a:t>
+            </a:r>
+            <a:r>
+              <a:rPr lang="en-US" dirty="0" err="1"/>
+              <a:t>TextBox</a:t>
+            </a:r>
+            <a:r>
+              <a:rPr lang="en-US" dirty="0"/>
+              <a:t> on load, let user change it, update ViewModel</a:t>
+            </a:r>
+          </a:p>
+          <a:p>
+            <a:r>
+              <a:rPr lang="en-US" dirty="0"/>
+              <a:t>LAST: When is ViewModel</a:t>
+            </a:r>
+          </a:p>
+          <a:p>
+            <a:r>
+              <a:rPr lang="en-US" dirty="0"/>
+              <a:t>- </a:t>
+            </a:r>
+            <a:r>
+              <a:rPr lang="en-US" dirty="0" err="1"/>
+              <a:t>UpdateSourceTrigger</a:t>
+            </a:r>
+            <a:r>
+              <a:rPr lang="en-US" dirty="0"/>
+              <a:t> - E.g. when typing in </a:t>
+            </a:r>
+            <a:r>
+              <a:rPr lang="en-US" dirty="0" err="1"/>
+              <a:t>TextBox</a:t>
+            </a:r>
+            <a:endParaRPr lang="en-US" dirty="0"/>
+          </a:p>
+        </p:txBody>
+      </p:sp>
+      <p:sp>
+        <p:nvSpPr>
+          <p:cNvPr id="4" name="Slide Number Placeholder 3"/>
+          <p:cNvSpPr>
+            <a:spLocks noGrp="1"/>
+          </p:cNvSpPr>
+          <p:nvPr>
+            <p:ph type="sldNum" sz="quarter" idx="5"/>
+          </p:nvPr>
+        </p:nvSpPr>
+        <p:spPr/>
+        <p:txBody>
+          <a:bodyPr/>
+          <a:lstStyle/>
+          <a:p>
+            <a:fld id="{52D86A8A-0D3B-4DD1-BCA4-15D29761E8A6}" type="slidenum">
+              <a:rPr lang="en-US" smtClean="0"/>
+              <a:t>21</a:t>
+            </a:fld>
+            <a:endParaRPr lang="en-US"/>
+          </a:p>
+        </p:txBody>
+      </p:sp>
+    </p:spTree>
+    <p:extLst>
+      <p:ext uri="{BB962C8B-B14F-4D97-AF65-F5344CB8AC3E}">
+        <p14:creationId xmlns:p14="http://schemas.microsoft.com/office/powerpoint/2010/main" val="1997652249"/>
+      </p:ext>
+    </p:extLst>
+  </p:cSld>
+  <p:clrMapOvr>
+    <a:masterClrMapping/>
+  </p:clrMapOvr>
+</p:notes>
+</file>
+
+<file path=ppt/notesSlides/notesSlide21.xml><?xml version="1.0" encoding="utf-8"?>
+<p:notes xmlns:a="http://schemas.openxmlformats.org/drawingml/2006/main" xmlns:r="http://schemas.openxmlformats.org/officeDocument/2006/relationships" xmlns:p="http://schemas.openxmlformats.org/presentationml/2006/main">
+  <p:cSld>
+    <p:spTree>
+      <p:nvGrpSpPr>
+        <p:cNvPr id="1" name=""/>
+        <p:cNvGrpSpPr/>
+        <p:nvPr/>
+      </p:nvGrpSpPr>
+      <p:grpSpPr>
+        <a:xfrm>
+          <a:off x="0" y="0"/>
+          <a:ext cx="0" cy="0"/>
+          <a:chOff x="0" y="0"/>
+          <a:chExt cx="0" cy="0"/>
+        </a:xfrm>
+      </p:grpSpPr>
+      <p:sp>
+        <p:nvSpPr>
+          <p:cNvPr id="2" name="Slide Image Placeholder 1"/>
+          <p:cNvSpPr>
+            <a:spLocks noGrp="1" noRot="1" noChangeAspect="1"/>
+          </p:cNvSpPr>
+          <p:nvPr>
+            <p:ph type="sldImg"/>
+          </p:nvPr>
+        </p:nvSpPr>
+        <p:spPr/>
+      </p:sp>
+      <p:sp>
+        <p:nvSpPr>
+          <p:cNvPr id="3" name="Notes Placeholder 2"/>
+          <p:cNvSpPr>
+            <a:spLocks noGrp="1"/>
+          </p:cNvSpPr>
+          <p:nvPr>
+            <p:ph type="body" idx="1"/>
+          </p:nvPr>
+        </p:nvSpPr>
+        <p:spPr/>
+        <p:txBody>
+          <a:bodyPr/>
+          <a:lstStyle/>
+          <a:p>
+            <a:endParaRPr lang="en-US" dirty="0"/>
+          </a:p>
+        </p:txBody>
+      </p:sp>
+      <p:sp>
+        <p:nvSpPr>
+          <p:cNvPr id="4" name="Slide Number Placeholder 3"/>
+          <p:cNvSpPr>
+            <a:spLocks noGrp="1"/>
+          </p:cNvSpPr>
+          <p:nvPr>
+            <p:ph type="sldNum" sz="quarter" idx="5"/>
+          </p:nvPr>
+        </p:nvSpPr>
+        <p:spPr/>
+        <p:txBody>
+          <a:bodyPr/>
+          <a:lstStyle/>
+          <a:p>
+            <a:fld id="{52D86A8A-0D3B-4DD1-BCA4-15D29761E8A6}" type="slidenum">
+              <a:rPr lang="en-US" smtClean="0"/>
+              <a:t>22</a:t>
+            </a:fld>
+            <a:endParaRPr lang="en-US"/>
+          </a:p>
+        </p:txBody>
+      </p:sp>
+    </p:spTree>
+    <p:extLst>
+      <p:ext uri="{BB962C8B-B14F-4D97-AF65-F5344CB8AC3E}">
+        <p14:creationId xmlns:p14="http://schemas.microsoft.com/office/powerpoint/2010/main" val="2936175989"/>
+      </p:ext>
+    </p:extLst>
+  </p:cSld>
+  <p:clrMapOvr>
+    <a:masterClrMapping/>
+  </p:clrMapOvr>
+</p:notes>
+</file>
+
+<file path=ppt/notesSlides/notesSlide22.xml><?xml version="1.0" encoding="utf-8"?>
+<p:notes xmlns:a="http://schemas.openxmlformats.org/drawingml/2006/main" xmlns:r="http://schemas.openxmlformats.org/officeDocument/2006/relationships" xmlns:p="http://schemas.openxmlformats.org/presentationml/2006/main">
+  <p:cSld>
+    <p:spTree>
+      <p:nvGrpSpPr>
+        <p:cNvPr id="1" name=""/>
+        <p:cNvGrpSpPr/>
+        <p:nvPr/>
+      </p:nvGrpSpPr>
+      <p:grpSpPr>
+        <a:xfrm>
+          <a:off x="0" y="0"/>
+          <a:ext cx="0" cy="0"/>
+          <a:chOff x="0" y="0"/>
+          <a:chExt cx="0" cy="0"/>
+        </a:xfrm>
+      </p:grpSpPr>
+      <p:sp>
+        <p:nvSpPr>
+          <p:cNvPr id="2" name="Slide Image Placeholder 1"/>
+          <p:cNvSpPr>
+            <a:spLocks noGrp="1" noRot="1" noChangeAspect="1"/>
+          </p:cNvSpPr>
+          <p:nvPr>
+            <p:ph type="sldImg"/>
+          </p:nvPr>
+        </p:nvSpPr>
+        <p:spPr/>
+      </p:sp>
+      <p:sp>
+        <p:nvSpPr>
+          <p:cNvPr id="3" name="Notes Placeholder 2"/>
+          <p:cNvSpPr>
+            <a:spLocks noGrp="1"/>
+          </p:cNvSpPr>
+          <p:nvPr>
+            <p:ph type="body" idx="1"/>
+          </p:nvPr>
+        </p:nvSpPr>
+        <p:spPr/>
+        <p:txBody>
+          <a:bodyPr/>
+          <a:lstStyle/>
+          <a:p>
+            <a:r>
+              <a:rPr lang="en-US" dirty="0"/>
+              <a:t>LAST: Example</a:t>
+            </a:r>
+          </a:p>
+          <a:p>
+            <a:r>
+              <a:rPr lang="en-US" dirty="0"/>
+              <a:t>- Show ViewModel, setting DataContext, binding in View</a:t>
+            </a:r>
+          </a:p>
+        </p:txBody>
+      </p:sp>
+      <p:sp>
+        <p:nvSpPr>
+          <p:cNvPr id="4" name="Slide Number Placeholder 3"/>
+          <p:cNvSpPr>
+            <a:spLocks noGrp="1"/>
+          </p:cNvSpPr>
+          <p:nvPr>
+            <p:ph type="sldNum" sz="quarter" idx="5"/>
+          </p:nvPr>
+        </p:nvSpPr>
+        <p:spPr/>
+        <p:txBody>
+          <a:bodyPr/>
+          <a:lstStyle/>
+          <a:p>
+            <a:fld id="{52D86A8A-0D3B-4DD1-BCA4-15D29761E8A6}" type="slidenum">
+              <a:rPr lang="en-US" smtClean="0"/>
+              <a:t>23</a:t>
+            </a:fld>
+            <a:endParaRPr lang="en-US"/>
+          </a:p>
+        </p:txBody>
+      </p:sp>
+    </p:spTree>
+    <p:extLst>
+      <p:ext uri="{BB962C8B-B14F-4D97-AF65-F5344CB8AC3E}">
+        <p14:creationId xmlns:p14="http://schemas.microsoft.com/office/powerpoint/2010/main" val="3038833892"/>
       </p:ext>
     </p:extLst>
   </p:cSld>
@@ -12943,6 +13549,1506 @@
 </p:sld>
 </file>
 
+<file path=ppt/slides/slide17.xml><?xml version="1.0" encoding="utf-8"?>
+<p:sld xmlns:a="http://schemas.openxmlformats.org/drawingml/2006/main" xmlns:r="http://schemas.openxmlformats.org/officeDocument/2006/relationships" xmlns:p="http://schemas.openxmlformats.org/presentationml/2006/main">
+  <p:cSld>
+    <p:spTree>
+      <p:nvGrpSpPr>
+        <p:cNvPr id="1" name=""/>
+        <p:cNvGrpSpPr/>
+        <p:nvPr/>
+      </p:nvGrpSpPr>
+      <p:grpSpPr>
+        <a:xfrm>
+          <a:off x="0" y="0"/>
+          <a:ext cx="0" cy="0"/>
+          <a:chOff x="0" y="0"/>
+          <a:chExt cx="0" cy="0"/>
+        </a:xfrm>
+      </p:grpSpPr>
+      <p:sp>
+        <p:nvSpPr>
+          <p:cNvPr id="2" name="Title 1">
+            <a:extLst>
+              <a:ext uri="{FF2B5EF4-FFF2-40B4-BE49-F238E27FC236}">
+                <a16:creationId xmlns:a16="http://schemas.microsoft.com/office/drawing/2014/main" id="{8A216AE6-B08B-D61C-2E11-31273EF2A8DC}"/>
+              </a:ext>
+            </a:extLst>
+          </p:cNvPr>
+          <p:cNvSpPr>
+            <a:spLocks noGrp="1"/>
+          </p:cNvSpPr>
+          <p:nvPr>
+            <p:ph type="title"/>
+          </p:nvPr>
+        </p:nvSpPr>
+        <p:spPr/>
+        <p:txBody>
+          <a:bodyPr/>
+          <a:lstStyle/>
+          <a:p>
+            <a:r>
+              <a:rPr lang="en-US" dirty="0"/>
+              <a:t>Unit 3 – Data Binding</a:t>
+            </a:r>
+          </a:p>
+        </p:txBody>
+      </p:sp>
+      <p:sp>
+        <p:nvSpPr>
+          <p:cNvPr id="3" name="Content Placeholder 2">
+            <a:extLst>
+              <a:ext uri="{FF2B5EF4-FFF2-40B4-BE49-F238E27FC236}">
+                <a16:creationId xmlns:a16="http://schemas.microsoft.com/office/drawing/2014/main" id="{09F1FC3E-4DE4-5AF7-138D-293A8989DA8C}"/>
+              </a:ext>
+            </a:extLst>
+          </p:cNvPr>
+          <p:cNvSpPr>
+            <a:spLocks noGrp="1"/>
+          </p:cNvSpPr>
+          <p:nvPr>
+            <p:ph idx="1"/>
+          </p:nvPr>
+        </p:nvSpPr>
+        <p:spPr/>
+        <p:txBody>
+          <a:bodyPr/>
+          <a:lstStyle/>
+          <a:p>
+            <a:r>
+              <a:rPr lang="en-US" dirty="0"/>
+              <a:t>How UI-based Applications Work</a:t>
+            </a:r>
+          </a:p>
+          <a:p>
+            <a:pPr lvl="1"/>
+            <a:r>
+              <a:rPr lang="en-US" dirty="0"/>
+              <a:t>Bunch of widgets on the screen</a:t>
+            </a:r>
+          </a:p>
+          <a:p>
+            <a:pPr lvl="1"/>
+            <a:r>
+              <a:rPr lang="en-US" dirty="0"/>
+              <a:t>We load data into the widgets</a:t>
+            </a:r>
+          </a:p>
+          <a:p>
+            <a:pPr lvl="1"/>
+            <a:r>
+              <a:rPr lang="en-US" dirty="0"/>
+              <a:t>User works with the data, changing some state</a:t>
+            </a:r>
+          </a:p>
+          <a:p>
+            <a:pPr lvl="1"/>
+            <a:r>
+              <a:rPr lang="en-US" dirty="0"/>
+              <a:t>Store that data back to some data store</a:t>
+            </a:r>
+          </a:p>
+          <a:p>
+            <a:endParaRPr lang="en-US" dirty="0"/>
+          </a:p>
+        </p:txBody>
+      </p:sp>
+    </p:spTree>
+    <p:extLst>
+      <p:ext uri="{BB962C8B-B14F-4D97-AF65-F5344CB8AC3E}">
+        <p14:creationId xmlns:p14="http://schemas.microsoft.com/office/powerpoint/2010/main" val="626039066"/>
+      </p:ext>
+    </p:extLst>
+  </p:cSld>
+  <p:clrMapOvr>
+    <a:masterClrMapping/>
+  </p:clrMapOvr>
+  <p:timing>
+    <p:tnLst>
+      <p:par>
+        <p:cTn id="1" dur="indefinite" restart="never" nodeType="tmRoot">
+          <p:childTnLst>
+            <p:seq concurrent="1" nextAc="seek">
+              <p:cTn id="2" dur="indefinite" nodeType="mainSeq">
+                <p:childTnLst>
+                  <p:par>
+                    <p:cTn id="3" fill="hold">
+                      <p:stCondLst>
+                        <p:cond delay="indefinite"/>
+                      </p:stCondLst>
+                      <p:childTnLst>
+                        <p:par>
+                          <p:cTn id="4" fill="hold">
+                            <p:stCondLst>
+                              <p:cond delay="0"/>
+                            </p:stCondLst>
+                            <p:childTnLst>
+                              <p:par>
+                                <p:cTn id="5" presetID="10" presetClass="entr" presetSubtype="0" fill="hold" grpId="0" nodeType="clickEffect">
+                                  <p:stCondLst>
+                                    <p:cond delay="0"/>
+                                  </p:stCondLst>
+                                  <p:childTnLst>
+                                    <p:set>
+                                      <p:cBhvr>
+                                        <p:cTn id="6" dur="1" fill="hold">
+                                          <p:stCondLst>
+                                            <p:cond delay="0"/>
+                                          </p:stCondLst>
+                                        </p:cTn>
+                                        <p:tgtEl>
+                                          <p:spTgt spid="3">
+                                            <p:txEl>
+                                              <p:pRg st="0" end="0"/>
+                                            </p:txEl>
+                                          </p:spTgt>
+                                        </p:tgtEl>
+                                        <p:attrNameLst>
+                                          <p:attrName>style.visibility</p:attrName>
+                                        </p:attrNameLst>
+                                      </p:cBhvr>
+                                      <p:to>
+                                        <p:strVal val="visible"/>
+                                      </p:to>
+                                    </p:set>
+                                    <p:animEffect transition="in" filter="fade">
+                                      <p:cBhvr>
+                                        <p:cTn id="7" dur="500"/>
+                                        <p:tgtEl>
+                                          <p:spTgt spid="3">
+                                            <p:txEl>
+                                              <p:pRg st="0" end="0"/>
+                                            </p:txEl>
+                                          </p:spTgt>
+                                        </p:tgtEl>
+                                      </p:cBhvr>
+                                    </p:animEffect>
+                                  </p:childTnLst>
+                                </p:cTn>
+                              </p:par>
+                            </p:childTnLst>
+                          </p:cTn>
+                        </p:par>
+                      </p:childTnLst>
+                    </p:cTn>
+                  </p:par>
+                  <p:par>
+                    <p:cTn id="8" fill="hold">
+                      <p:stCondLst>
+                        <p:cond delay="indefinite"/>
+                      </p:stCondLst>
+                      <p:childTnLst>
+                        <p:par>
+                          <p:cTn id="9" fill="hold">
+                            <p:stCondLst>
+                              <p:cond delay="0"/>
+                            </p:stCondLst>
+                            <p:childTnLst>
+                              <p:par>
+                                <p:cTn id="10" presetID="10" presetClass="entr" presetSubtype="0" fill="hold" grpId="0" nodeType="clickEffect">
+                                  <p:stCondLst>
+                                    <p:cond delay="0"/>
+                                  </p:stCondLst>
+                                  <p:childTnLst>
+                                    <p:set>
+                                      <p:cBhvr>
+                                        <p:cTn id="11" dur="1" fill="hold">
+                                          <p:stCondLst>
+                                            <p:cond delay="0"/>
+                                          </p:stCondLst>
+                                        </p:cTn>
+                                        <p:tgtEl>
+                                          <p:spTgt spid="3">
+                                            <p:txEl>
+                                              <p:pRg st="1" end="1"/>
+                                            </p:txEl>
+                                          </p:spTgt>
+                                        </p:tgtEl>
+                                        <p:attrNameLst>
+                                          <p:attrName>style.visibility</p:attrName>
+                                        </p:attrNameLst>
+                                      </p:cBhvr>
+                                      <p:to>
+                                        <p:strVal val="visible"/>
+                                      </p:to>
+                                    </p:set>
+                                    <p:animEffect transition="in" filter="fade">
+                                      <p:cBhvr>
+                                        <p:cTn id="12" dur="500"/>
+                                        <p:tgtEl>
+                                          <p:spTgt spid="3">
+                                            <p:txEl>
+                                              <p:pRg st="1" end="1"/>
+                                            </p:txEl>
+                                          </p:spTgt>
+                                        </p:tgtEl>
+                                      </p:cBhvr>
+                                    </p:animEffect>
+                                  </p:childTnLst>
+                                </p:cTn>
+                              </p:par>
+                            </p:childTnLst>
+                          </p:cTn>
+                        </p:par>
+                      </p:childTnLst>
+                    </p:cTn>
+                  </p:par>
+                  <p:par>
+                    <p:cTn id="13" fill="hold">
+                      <p:stCondLst>
+                        <p:cond delay="indefinite"/>
+                      </p:stCondLst>
+                      <p:childTnLst>
+                        <p:par>
+                          <p:cTn id="14" fill="hold">
+                            <p:stCondLst>
+                              <p:cond delay="0"/>
+                            </p:stCondLst>
+                            <p:childTnLst>
+                              <p:par>
+                                <p:cTn id="15" presetID="10" presetClass="entr" presetSubtype="0" fill="hold" grpId="0" nodeType="clickEffect">
+                                  <p:stCondLst>
+                                    <p:cond delay="0"/>
+                                  </p:stCondLst>
+                                  <p:childTnLst>
+                                    <p:set>
+                                      <p:cBhvr>
+                                        <p:cTn id="16" dur="1" fill="hold">
+                                          <p:stCondLst>
+                                            <p:cond delay="0"/>
+                                          </p:stCondLst>
+                                        </p:cTn>
+                                        <p:tgtEl>
+                                          <p:spTgt spid="3">
+                                            <p:txEl>
+                                              <p:pRg st="2" end="2"/>
+                                            </p:txEl>
+                                          </p:spTgt>
+                                        </p:tgtEl>
+                                        <p:attrNameLst>
+                                          <p:attrName>style.visibility</p:attrName>
+                                        </p:attrNameLst>
+                                      </p:cBhvr>
+                                      <p:to>
+                                        <p:strVal val="visible"/>
+                                      </p:to>
+                                    </p:set>
+                                    <p:animEffect transition="in" filter="fade">
+                                      <p:cBhvr>
+                                        <p:cTn id="17" dur="500"/>
+                                        <p:tgtEl>
+                                          <p:spTgt spid="3">
+                                            <p:txEl>
+                                              <p:pRg st="2" end="2"/>
+                                            </p:txEl>
+                                          </p:spTgt>
+                                        </p:tgtEl>
+                                      </p:cBhvr>
+                                    </p:animEffect>
+                                  </p:childTnLst>
+                                </p:cTn>
+                              </p:par>
+                            </p:childTnLst>
+                          </p:cTn>
+                        </p:par>
+                      </p:childTnLst>
+                    </p:cTn>
+                  </p:par>
+                  <p:par>
+                    <p:cTn id="18" fill="hold">
+                      <p:stCondLst>
+                        <p:cond delay="indefinite"/>
+                      </p:stCondLst>
+                      <p:childTnLst>
+                        <p:par>
+                          <p:cTn id="19" fill="hold">
+                            <p:stCondLst>
+                              <p:cond delay="0"/>
+                            </p:stCondLst>
+                            <p:childTnLst>
+                              <p:par>
+                                <p:cTn id="20" presetID="10" presetClass="entr" presetSubtype="0" fill="hold" grpId="0" nodeType="clickEffect">
+                                  <p:stCondLst>
+                                    <p:cond delay="0"/>
+                                  </p:stCondLst>
+                                  <p:childTnLst>
+                                    <p:set>
+                                      <p:cBhvr>
+                                        <p:cTn id="21" dur="1" fill="hold">
+                                          <p:stCondLst>
+                                            <p:cond delay="0"/>
+                                          </p:stCondLst>
+                                        </p:cTn>
+                                        <p:tgtEl>
+                                          <p:spTgt spid="3">
+                                            <p:txEl>
+                                              <p:pRg st="3" end="3"/>
+                                            </p:txEl>
+                                          </p:spTgt>
+                                        </p:tgtEl>
+                                        <p:attrNameLst>
+                                          <p:attrName>style.visibility</p:attrName>
+                                        </p:attrNameLst>
+                                      </p:cBhvr>
+                                      <p:to>
+                                        <p:strVal val="visible"/>
+                                      </p:to>
+                                    </p:set>
+                                    <p:animEffect transition="in" filter="fade">
+                                      <p:cBhvr>
+                                        <p:cTn id="22" dur="500"/>
+                                        <p:tgtEl>
+                                          <p:spTgt spid="3">
+                                            <p:txEl>
+                                              <p:pRg st="3" end="3"/>
+                                            </p:txEl>
+                                          </p:spTgt>
+                                        </p:tgtEl>
+                                      </p:cBhvr>
+                                    </p:animEffect>
+                                  </p:childTnLst>
+                                </p:cTn>
+                              </p:par>
+                            </p:childTnLst>
+                          </p:cTn>
+                        </p:par>
+                      </p:childTnLst>
+                    </p:cTn>
+                  </p:par>
+                  <p:par>
+                    <p:cTn id="23" fill="hold">
+                      <p:stCondLst>
+                        <p:cond delay="indefinite"/>
+                      </p:stCondLst>
+                      <p:childTnLst>
+                        <p:par>
+                          <p:cTn id="24" fill="hold">
+                            <p:stCondLst>
+                              <p:cond delay="0"/>
+                            </p:stCondLst>
+                            <p:childTnLst>
+                              <p:par>
+                                <p:cTn id="25" presetID="10" presetClass="entr" presetSubtype="0" fill="hold" grpId="0" nodeType="clickEffect">
+                                  <p:stCondLst>
+                                    <p:cond delay="0"/>
+                                  </p:stCondLst>
+                                  <p:childTnLst>
+                                    <p:set>
+                                      <p:cBhvr>
+                                        <p:cTn id="26" dur="1" fill="hold">
+                                          <p:stCondLst>
+                                            <p:cond delay="0"/>
+                                          </p:stCondLst>
+                                        </p:cTn>
+                                        <p:tgtEl>
+                                          <p:spTgt spid="3">
+                                            <p:txEl>
+                                              <p:pRg st="4" end="4"/>
+                                            </p:txEl>
+                                          </p:spTgt>
+                                        </p:tgtEl>
+                                        <p:attrNameLst>
+                                          <p:attrName>style.visibility</p:attrName>
+                                        </p:attrNameLst>
+                                      </p:cBhvr>
+                                      <p:to>
+                                        <p:strVal val="visible"/>
+                                      </p:to>
+                                    </p:set>
+                                    <p:animEffect transition="in" filter="fade">
+                                      <p:cBhvr>
+                                        <p:cTn id="27" dur="500"/>
+                                        <p:tgtEl>
+                                          <p:spTgt spid="3">
+                                            <p:txEl>
+                                              <p:pRg st="4" end="4"/>
+                                            </p:txEl>
+                                          </p:spTgt>
+                                        </p:tgtEl>
+                                      </p:cBhvr>
+                                    </p:animEffect>
+                                  </p:childTnLst>
+                                </p:cTn>
+                              </p:par>
+                            </p:childTnLst>
+                          </p:cTn>
+                        </p:par>
+                      </p:childTnLst>
+                    </p:cTn>
+                  </p:par>
+                </p:childTnLst>
+              </p:cTn>
+              <p:prevCondLst>
+                <p:cond evt="onPrev" delay="0">
+                  <p:tgtEl>
+                    <p:sldTgt/>
+                  </p:tgtEl>
+                </p:cond>
+              </p:prevCondLst>
+              <p:nextCondLst>
+                <p:cond evt="onNext" delay="0">
+                  <p:tgtEl>
+                    <p:sldTgt/>
+                  </p:tgtEl>
+                </p:cond>
+              </p:nextCondLst>
+            </p:seq>
+          </p:childTnLst>
+        </p:cTn>
+      </p:par>
+    </p:tnLst>
+    <p:bldLst>
+      <p:bldP spid="3" grpId="0" uiExpand="1" build="p"/>
+    </p:bldLst>
+  </p:timing>
+</p:sld>
+</file>
+
+<file path=ppt/slides/slide18.xml><?xml version="1.0" encoding="utf-8"?>
+<p:sld xmlns:a="http://schemas.openxmlformats.org/drawingml/2006/main" xmlns:r="http://schemas.openxmlformats.org/officeDocument/2006/relationships" xmlns:p="http://schemas.openxmlformats.org/presentationml/2006/main">
+  <p:cSld>
+    <p:spTree>
+      <p:nvGrpSpPr>
+        <p:cNvPr id="1" name=""/>
+        <p:cNvGrpSpPr/>
+        <p:nvPr/>
+      </p:nvGrpSpPr>
+      <p:grpSpPr>
+        <a:xfrm>
+          <a:off x="0" y="0"/>
+          <a:ext cx="0" cy="0"/>
+          <a:chOff x="0" y="0"/>
+          <a:chExt cx="0" cy="0"/>
+        </a:xfrm>
+      </p:grpSpPr>
+      <p:sp>
+        <p:nvSpPr>
+          <p:cNvPr id="2" name="Title 1">
+            <a:extLst>
+              <a:ext uri="{FF2B5EF4-FFF2-40B4-BE49-F238E27FC236}">
+                <a16:creationId xmlns:a16="http://schemas.microsoft.com/office/drawing/2014/main" id="{BA06A963-1B3F-E67B-E63C-B1B547831589}"/>
+              </a:ext>
+            </a:extLst>
+          </p:cNvPr>
+          <p:cNvSpPr>
+            <a:spLocks noGrp="1"/>
+          </p:cNvSpPr>
+          <p:nvPr>
+            <p:ph type="title"/>
+          </p:nvPr>
+        </p:nvSpPr>
+        <p:spPr/>
+        <p:txBody>
+          <a:bodyPr/>
+          <a:lstStyle/>
+          <a:p>
+            <a:r>
+              <a:rPr lang="en-US" dirty="0"/>
+              <a:t>Unit 3 – Data Binding</a:t>
+            </a:r>
+          </a:p>
+        </p:txBody>
+      </p:sp>
+      <p:sp>
+        <p:nvSpPr>
+          <p:cNvPr id="3" name="Content Placeholder 2">
+            <a:extLst>
+              <a:ext uri="{FF2B5EF4-FFF2-40B4-BE49-F238E27FC236}">
+                <a16:creationId xmlns:a16="http://schemas.microsoft.com/office/drawing/2014/main" id="{DC6DEFFE-6626-521F-9D35-118ABBD62F35}"/>
+              </a:ext>
+            </a:extLst>
+          </p:cNvPr>
+          <p:cNvSpPr>
+            <a:spLocks noGrp="1"/>
+          </p:cNvSpPr>
+          <p:nvPr>
+            <p:ph idx="1"/>
+          </p:nvPr>
+        </p:nvSpPr>
+        <p:spPr/>
+        <p:txBody>
+          <a:bodyPr/>
+          <a:lstStyle/>
+          <a:p>
+            <a:r>
+              <a:rPr lang="en-US" dirty="0"/>
+              <a:t>MVVM (Model View ViewModel)</a:t>
+            </a:r>
+          </a:p>
+          <a:p>
+            <a:pPr lvl="1"/>
+            <a:r>
+              <a:rPr lang="en-US" dirty="0"/>
+              <a:t>MVVM is the typical architecture used for WPF application</a:t>
+            </a:r>
+          </a:p>
+          <a:p>
+            <a:pPr lvl="1"/>
+            <a:endParaRPr lang="en-US" dirty="0"/>
+          </a:p>
+          <a:p>
+            <a:pPr lvl="1"/>
+            <a:endParaRPr lang="en-US" dirty="0"/>
+          </a:p>
+          <a:p>
+            <a:pPr lvl="1"/>
+            <a:endParaRPr lang="en-US" dirty="0"/>
+          </a:p>
+          <a:p>
+            <a:pPr lvl="1"/>
+            <a:endParaRPr lang="en-US" dirty="0"/>
+          </a:p>
+          <a:p>
+            <a:pPr lvl="1"/>
+            <a:endParaRPr lang="en-US" dirty="0"/>
+          </a:p>
+          <a:p>
+            <a:pPr lvl="1"/>
+            <a:r>
+              <a:rPr lang="en-US" dirty="0"/>
+              <a:t>Separates business logic from UI behavior</a:t>
+            </a:r>
+          </a:p>
+          <a:p>
+            <a:pPr lvl="1"/>
+            <a:endParaRPr lang="en-US" dirty="0"/>
+          </a:p>
+        </p:txBody>
+      </p:sp>
+      <p:pic>
+        <p:nvPicPr>
+          <p:cNvPr id="4" name="Picture 3">
+            <a:extLst>
+              <a:ext uri="{FF2B5EF4-FFF2-40B4-BE49-F238E27FC236}">
+                <a16:creationId xmlns:a16="http://schemas.microsoft.com/office/drawing/2014/main" id="{167BF8EC-B2D0-4114-25A4-10BEBB2E52AE}"/>
+              </a:ext>
+            </a:extLst>
+          </p:cNvPr>
+          <p:cNvPicPr>
+            <a:picLocks noChangeAspect="1"/>
+          </p:cNvPicPr>
+          <p:nvPr/>
+        </p:nvPicPr>
+        <p:blipFill>
+          <a:blip r:embed="rId2"/>
+          <a:stretch>
+            <a:fillRect/>
+          </a:stretch>
+        </p:blipFill>
+        <p:spPr>
+          <a:xfrm>
+            <a:off x="3104114" y="2924589"/>
+            <a:ext cx="5705475" cy="1714500"/>
+          </a:xfrm>
+          <a:prstGeom prst="rect">
+            <a:avLst/>
+          </a:prstGeom>
+        </p:spPr>
+      </p:pic>
+    </p:spTree>
+    <p:extLst>
+      <p:ext uri="{BB962C8B-B14F-4D97-AF65-F5344CB8AC3E}">
+        <p14:creationId xmlns:p14="http://schemas.microsoft.com/office/powerpoint/2010/main" val="1515088931"/>
+      </p:ext>
+    </p:extLst>
+  </p:cSld>
+  <p:clrMapOvr>
+    <a:masterClrMapping/>
+  </p:clrMapOvr>
+  <p:timing>
+    <p:tnLst>
+      <p:par>
+        <p:cTn id="1" dur="indefinite" restart="never" nodeType="tmRoot">
+          <p:childTnLst>
+            <p:seq concurrent="1" nextAc="seek">
+              <p:cTn id="2" dur="indefinite" nodeType="mainSeq">
+                <p:childTnLst>
+                  <p:par>
+                    <p:cTn id="3" fill="hold">
+                      <p:stCondLst>
+                        <p:cond delay="indefinite"/>
+                        <p:cond evt="onBegin" delay="0">
+                          <p:tn val="2"/>
+                        </p:cond>
+                      </p:stCondLst>
+                      <p:childTnLst>
+                        <p:par>
+                          <p:cTn id="4" fill="hold">
+                            <p:stCondLst>
+                              <p:cond delay="0"/>
+                            </p:stCondLst>
+                            <p:childTnLst>
+                              <p:par>
+                                <p:cTn id="5" presetID="10" presetClass="entr" presetSubtype="0" fill="hold" grpId="0" nodeType="withEffect">
+                                  <p:stCondLst>
+                                    <p:cond delay="0"/>
+                                  </p:stCondLst>
+                                  <p:childTnLst>
+                                    <p:set>
+                                      <p:cBhvr>
+                                        <p:cTn id="6" dur="1" fill="hold">
+                                          <p:stCondLst>
+                                            <p:cond delay="0"/>
+                                          </p:stCondLst>
+                                        </p:cTn>
+                                        <p:tgtEl>
+                                          <p:spTgt spid="3">
+                                            <p:txEl>
+                                              <p:pRg st="0" end="0"/>
+                                            </p:txEl>
+                                          </p:spTgt>
+                                        </p:tgtEl>
+                                        <p:attrNameLst>
+                                          <p:attrName>style.visibility</p:attrName>
+                                        </p:attrNameLst>
+                                      </p:cBhvr>
+                                      <p:to>
+                                        <p:strVal val="visible"/>
+                                      </p:to>
+                                    </p:set>
+                                    <p:animEffect transition="in" filter="fade">
+                                      <p:cBhvr>
+                                        <p:cTn id="7" dur="500"/>
+                                        <p:tgtEl>
+                                          <p:spTgt spid="3">
+                                            <p:txEl>
+                                              <p:pRg st="0" end="0"/>
+                                            </p:txEl>
+                                          </p:spTgt>
+                                        </p:tgtEl>
+                                      </p:cBhvr>
+                                    </p:animEffect>
+                                  </p:childTnLst>
+                                </p:cTn>
+                              </p:par>
+                              <p:par>
+                                <p:cTn id="8" presetID="10" presetClass="entr" presetSubtype="0" fill="hold" grpId="0" nodeType="withEffect">
+                                  <p:stCondLst>
+                                    <p:cond delay="0"/>
+                                  </p:stCondLst>
+                                  <p:childTnLst>
+                                    <p:set>
+                                      <p:cBhvr>
+                                        <p:cTn id="9" dur="1" fill="hold">
+                                          <p:stCondLst>
+                                            <p:cond delay="0"/>
+                                          </p:stCondLst>
+                                        </p:cTn>
+                                        <p:tgtEl>
+                                          <p:spTgt spid="3">
+                                            <p:txEl>
+                                              <p:pRg st="1" end="1"/>
+                                            </p:txEl>
+                                          </p:spTgt>
+                                        </p:tgtEl>
+                                        <p:attrNameLst>
+                                          <p:attrName>style.visibility</p:attrName>
+                                        </p:attrNameLst>
+                                      </p:cBhvr>
+                                      <p:to>
+                                        <p:strVal val="visible"/>
+                                      </p:to>
+                                    </p:set>
+                                    <p:animEffect transition="in" filter="fade">
+                                      <p:cBhvr>
+                                        <p:cTn id="10" dur="500"/>
+                                        <p:tgtEl>
+                                          <p:spTgt spid="3">
+                                            <p:txEl>
+                                              <p:pRg st="1" end="1"/>
+                                            </p:txEl>
+                                          </p:spTgt>
+                                        </p:tgtEl>
+                                      </p:cBhvr>
+                                    </p:animEffect>
+                                  </p:childTnLst>
+                                </p:cTn>
+                              </p:par>
+                              <p:par>
+                                <p:cTn id="11" presetID="10" presetClass="entr" presetSubtype="0" fill="hold" grpId="0" nodeType="withEffect">
+                                  <p:stCondLst>
+                                    <p:cond delay="0"/>
+                                  </p:stCondLst>
+                                  <p:childTnLst>
+                                    <p:set>
+                                      <p:cBhvr>
+                                        <p:cTn id="12" dur="1" fill="hold">
+                                          <p:stCondLst>
+                                            <p:cond delay="0"/>
+                                          </p:stCondLst>
+                                        </p:cTn>
+                                        <p:tgtEl>
+                                          <p:spTgt spid="3">
+                                            <p:txEl>
+                                              <p:pRg st="7" end="7"/>
+                                            </p:txEl>
+                                          </p:spTgt>
+                                        </p:tgtEl>
+                                        <p:attrNameLst>
+                                          <p:attrName>style.visibility</p:attrName>
+                                        </p:attrNameLst>
+                                      </p:cBhvr>
+                                      <p:to>
+                                        <p:strVal val="visible"/>
+                                      </p:to>
+                                    </p:set>
+                                    <p:animEffect transition="in" filter="fade">
+                                      <p:cBhvr>
+                                        <p:cTn id="13" dur="500"/>
+                                        <p:tgtEl>
+                                          <p:spTgt spid="3">
+                                            <p:txEl>
+                                              <p:pRg st="7" end="7"/>
+                                            </p:txEl>
+                                          </p:spTgt>
+                                        </p:tgtEl>
+                                      </p:cBhvr>
+                                    </p:animEffect>
+                                  </p:childTnLst>
+                                </p:cTn>
+                              </p:par>
+                            </p:childTnLst>
+                          </p:cTn>
+                        </p:par>
+                      </p:childTnLst>
+                    </p:cTn>
+                  </p:par>
+                </p:childTnLst>
+              </p:cTn>
+              <p:prevCondLst>
+                <p:cond evt="onPrev" delay="0">
+                  <p:tgtEl>
+                    <p:sldTgt/>
+                  </p:tgtEl>
+                </p:cond>
+              </p:prevCondLst>
+              <p:nextCondLst>
+                <p:cond evt="onNext" delay="0">
+                  <p:tgtEl>
+                    <p:sldTgt/>
+                  </p:tgtEl>
+                </p:cond>
+              </p:nextCondLst>
+            </p:seq>
+          </p:childTnLst>
+        </p:cTn>
+      </p:par>
+    </p:tnLst>
+    <p:bldLst>
+      <p:bldP spid="3" grpId="0" uiExpand="1" build="allAtOnce"/>
+    </p:bldLst>
+  </p:timing>
+</p:sld>
+</file>
+
+<file path=ppt/slides/slide19.xml><?xml version="1.0" encoding="utf-8"?>
+<p:sld xmlns:a="http://schemas.openxmlformats.org/drawingml/2006/main" xmlns:r="http://schemas.openxmlformats.org/officeDocument/2006/relationships" xmlns:p="http://schemas.openxmlformats.org/presentationml/2006/main">
+  <p:cSld>
+    <p:spTree>
+      <p:nvGrpSpPr>
+        <p:cNvPr id="1" name=""/>
+        <p:cNvGrpSpPr/>
+        <p:nvPr/>
+      </p:nvGrpSpPr>
+      <p:grpSpPr>
+        <a:xfrm>
+          <a:off x="0" y="0"/>
+          <a:ext cx="0" cy="0"/>
+          <a:chOff x="0" y="0"/>
+          <a:chExt cx="0" cy="0"/>
+        </a:xfrm>
+      </p:grpSpPr>
+      <p:sp>
+        <p:nvSpPr>
+          <p:cNvPr id="2" name="Title 1">
+            <a:extLst>
+              <a:ext uri="{FF2B5EF4-FFF2-40B4-BE49-F238E27FC236}">
+                <a16:creationId xmlns:a16="http://schemas.microsoft.com/office/drawing/2014/main" id="{2C2119FC-1760-3AE3-0EB9-A16B9715903B}"/>
+              </a:ext>
+            </a:extLst>
+          </p:cNvPr>
+          <p:cNvSpPr>
+            <a:spLocks noGrp="1"/>
+          </p:cNvSpPr>
+          <p:nvPr>
+            <p:ph type="title"/>
+          </p:nvPr>
+        </p:nvSpPr>
+        <p:spPr/>
+        <p:txBody>
+          <a:bodyPr/>
+          <a:lstStyle/>
+          <a:p>
+            <a:r>
+              <a:rPr lang="en-US" dirty="0"/>
+              <a:t>Unit 3 – Data Binding</a:t>
+            </a:r>
+          </a:p>
+        </p:txBody>
+      </p:sp>
+      <p:sp>
+        <p:nvSpPr>
+          <p:cNvPr id="3" name="Content Placeholder 2">
+            <a:extLst>
+              <a:ext uri="{FF2B5EF4-FFF2-40B4-BE49-F238E27FC236}">
+                <a16:creationId xmlns:a16="http://schemas.microsoft.com/office/drawing/2014/main" id="{FC044B31-ED22-0B03-B47C-99FF408A2D5A}"/>
+              </a:ext>
+            </a:extLst>
+          </p:cNvPr>
+          <p:cNvSpPr>
+            <a:spLocks noGrp="1"/>
+          </p:cNvSpPr>
+          <p:nvPr>
+            <p:ph idx="1"/>
+          </p:nvPr>
+        </p:nvSpPr>
+        <p:spPr/>
+        <p:txBody>
+          <a:bodyPr>
+            <a:normAutofit/>
+          </a:bodyPr>
+          <a:lstStyle/>
+          <a:p>
+            <a:r>
+              <a:rPr lang="en-US" dirty="0"/>
+              <a:t>How MVVM Works</a:t>
+            </a:r>
+          </a:p>
+          <a:p>
+            <a:pPr lvl="1"/>
+            <a:r>
+              <a:rPr lang="en-US" dirty="0"/>
+              <a:t>The View contains the UI widgets that the user interacts with</a:t>
+            </a:r>
+          </a:p>
+          <a:p>
+            <a:pPr lvl="1"/>
+            <a:r>
+              <a:rPr lang="en-US" dirty="0"/>
+              <a:t>Data binding mechanism transfers data between View and ViewModel</a:t>
+            </a:r>
+          </a:p>
+          <a:p>
+            <a:pPr lvl="1"/>
+            <a:r>
+              <a:rPr lang="en-US" dirty="0"/>
+              <a:t>ViewModel contains a copy of the data being displayed in the View</a:t>
+            </a:r>
+          </a:p>
+          <a:p>
+            <a:pPr lvl="2"/>
+            <a:r>
+              <a:rPr lang="en-US" dirty="0"/>
+              <a:t>As user changes something in UI, property in ViewModel is updated</a:t>
+            </a:r>
+          </a:p>
+          <a:p>
+            <a:pPr lvl="2"/>
+            <a:r>
+              <a:rPr lang="en-US" dirty="0"/>
+              <a:t>If property changes in ViewModel (e.g. load object), UI controls are updated</a:t>
+            </a:r>
+          </a:p>
+          <a:p>
+            <a:pPr lvl="1"/>
+            <a:r>
+              <a:rPr lang="en-US" dirty="0"/>
+              <a:t>Model takes care of actual business logic</a:t>
+            </a:r>
+          </a:p>
+          <a:p>
+            <a:pPr lvl="2"/>
+            <a:r>
+              <a:rPr lang="en-US" dirty="0"/>
+              <a:t>Load / save data	</a:t>
+            </a:r>
+          </a:p>
+          <a:p>
+            <a:pPr lvl="2"/>
+            <a:r>
+              <a:rPr lang="en-US" dirty="0"/>
+              <a:t>Execute operations on data</a:t>
+            </a:r>
+          </a:p>
+          <a:p>
+            <a:pPr lvl="2"/>
+            <a:r>
+              <a:rPr lang="en-US" dirty="0"/>
+              <a:t>Manage dependencies between properties</a:t>
+            </a:r>
+          </a:p>
+          <a:p>
+            <a:pPr lvl="1"/>
+            <a:endParaRPr lang="en-US" dirty="0"/>
+          </a:p>
+        </p:txBody>
+      </p:sp>
+    </p:spTree>
+    <p:extLst>
+      <p:ext uri="{BB962C8B-B14F-4D97-AF65-F5344CB8AC3E}">
+        <p14:creationId xmlns:p14="http://schemas.microsoft.com/office/powerpoint/2010/main" val="3867100590"/>
+      </p:ext>
+    </p:extLst>
+  </p:cSld>
+  <p:clrMapOvr>
+    <a:masterClrMapping/>
+  </p:clrMapOvr>
+  <p:timing>
+    <p:tnLst>
+      <p:par>
+        <p:cTn id="1" dur="indefinite" restart="never" nodeType="tmRoot">
+          <p:childTnLst>
+            <p:seq concurrent="1" nextAc="seek">
+              <p:cTn id="2" dur="indefinite" nodeType="mainSeq">
+                <p:childTnLst>
+                  <p:par>
+                    <p:cTn id="3" fill="hold">
+                      <p:stCondLst>
+                        <p:cond delay="indefinite"/>
+                      </p:stCondLst>
+                      <p:childTnLst>
+                        <p:par>
+                          <p:cTn id="4" fill="hold">
+                            <p:stCondLst>
+                              <p:cond delay="0"/>
+                            </p:stCondLst>
+                            <p:childTnLst>
+                              <p:par>
+                                <p:cTn id="5" presetID="10" presetClass="entr" presetSubtype="0" fill="hold" grpId="0" nodeType="clickEffect">
+                                  <p:stCondLst>
+                                    <p:cond delay="0"/>
+                                  </p:stCondLst>
+                                  <p:childTnLst>
+                                    <p:set>
+                                      <p:cBhvr>
+                                        <p:cTn id="6" dur="1" fill="hold">
+                                          <p:stCondLst>
+                                            <p:cond delay="0"/>
+                                          </p:stCondLst>
+                                        </p:cTn>
+                                        <p:tgtEl>
+                                          <p:spTgt spid="3">
+                                            <p:txEl>
+                                              <p:pRg st="0" end="0"/>
+                                            </p:txEl>
+                                          </p:spTgt>
+                                        </p:tgtEl>
+                                        <p:attrNameLst>
+                                          <p:attrName>style.visibility</p:attrName>
+                                        </p:attrNameLst>
+                                      </p:cBhvr>
+                                      <p:to>
+                                        <p:strVal val="visible"/>
+                                      </p:to>
+                                    </p:set>
+                                    <p:animEffect transition="in" filter="fade">
+                                      <p:cBhvr>
+                                        <p:cTn id="7" dur="500"/>
+                                        <p:tgtEl>
+                                          <p:spTgt spid="3">
+                                            <p:txEl>
+                                              <p:pRg st="0" end="0"/>
+                                            </p:txEl>
+                                          </p:spTgt>
+                                        </p:tgtEl>
+                                      </p:cBhvr>
+                                    </p:animEffect>
+                                  </p:childTnLst>
+                                </p:cTn>
+                              </p:par>
+                            </p:childTnLst>
+                          </p:cTn>
+                        </p:par>
+                      </p:childTnLst>
+                    </p:cTn>
+                  </p:par>
+                  <p:par>
+                    <p:cTn id="8" fill="hold">
+                      <p:stCondLst>
+                        <p:cond delay="indefinite"/>
+                      </p:stCondLst>
+                      <p:childTnLst>
+                        <p:par>
+                          <p:cTn id="9" fill="hold">
+                            <p:stCondLst>
+                              <p:cond delay="0"/>
+                            </p:stCondLst>
+                            <p:childTnLst>
+                              <p:par>
+                                <p:cTn id="10" presetID="10" presetClass="entr" presetSubtype="0" fill="hold" grpId="0" nodeType="clickEffect">
+                                  <p:stCondLst>
+                                    <p:cond delay="0"/>
+                                  </p:stCondLst>
+                                  <p:childTnLst>
+                                    <p:set>
+                                      <p:cBhvr>
+                                        <p:cTn id="11" dur="1" fill="hold">
+                                          <p:stCondLst>
+                                            <p:cond delay="0"/>
+                                          </p:stCondLst>
+                                        </p:cTn>
+                                        <p:tgtEl>
+                                          <p:spTgt spid="3">
+                                            <p:txEl>
+                                              <p:pRg st="1" end="1"/>
+                                            </p:txEl>
+                                          </p:spTgt>
+                                        </p:tgtEl>
+                                        <p:attrNameLst>
+                                          <p:attrName>style.visibility</p:attrName>
+                                        </p:attrNameLst>
+                                      </p:cBhvr>
+                                      <p:to>
+                                        <p:strVal val="visible"/>
+                                      </p:to>
+                                    </p:set>
+                                    <p:animEffect transition="in" filter="fade">
+                                      <p:cBhvr>
+                                        <p:cTn id="12" dur="500"/>
+                                        <p:tgtEl>
+                                          <p:spTgt spid="3">
+                                            <p:txEl>
+                                              <p:pRg st="1" end="1"/>
+                                            </p:txEl>
+                                          </p:spTgt>
+                                        </p:tgtEl>
+                                      </p:cBhvr>
+                                    </p:animEffect>
+                                  </p:childTnLst>
+                                </p:cTn>
+                              </p:par>
+                            </p:childTnLst>
+                          </p:cTn>
+                        </p:par>
+                      </p:childTnLst>
+                    </p:cTn>
+                  </p:par>
+                  <p:par>
+                    <p:cTn id="13" fill="hold">
+                      <p:stCondLst>
+                        <p:cond delay="indefinite"/>
+                      </p:stCondLst>
+                      <p:childTnLst>
+                        <p:par>
+                          <p:cTn id="14" fill="hold">
+                            <p:stCondLst>
+                              <p:cond delay="0"/>
+                            </p:stCondLst>
+                            <p:childTnLst>
+                              <p:par>
+                                <p:cTn id="15" presetID="10" presetClass="entr" presetSubtype="0" fill="hold" grpId="0" nodeType="clickEffect">
+                                  <p:stCondLst>
+                                    <p:cond delay="0"/>
+                                  </p:stCondLst>
+                                  <p:childTnLst>
+                                    <p:set>
+                                      <p:cBhvr>
+                                        <p:cTn id="16" dur="1" fill="hold">
+                                          <p:stCondLst>
+                                            <p:cond delay="0"/>
+                                          </p:stCondLst>
+                                        </p:cTn>
+                                        <p:tgtEl>
+                                          <p:spTgt spid="3">
+                                            <p:txEl>
+                                              <p:pRg st="2" end="2"/>
+                                            </p:txEl>
+                                          </p:spTgt>
+                                        </p:tgtEl>
+                                        <p:attrNameLst>
+                                          <p:attrName>style.visibility</p:attrName>
+                                        </p:attrNameLst>
+                                      </p:cBhvr>
+                                      <p:to>
+                                        <p:strVal val="visible"/>
+                                      </p:to>
+                                    </p:set>
+                                    <p:animEffect transition="in" filter="fade">
+                                      <p:cBhvr>
+                                        <p:cTn id="17" dur="500"/>
+                                        <p:tgtEl>
+                                          <p:spTgt spid="3">
+                                            <p:txEl>
+                                              <p:pRg st="2" end="2"/>
+                                            </p:txEl>
+                                          </p:spTgt>
+                                        </p:tgtEl>
+                                      </p:cBhvr>
+                                    </p:animEffect>
+                                  </p:childTnLst>
+                                </p:cTn>
+                              </p:par>
+                            </p:childTnLst>
+                          </p:cTn>
+                        </p:par>
+                      </p:childTnLst>
+                    </p:cTn>
+                  </p:par>
+                  <p:par>
+                    <p:cTn id="18" fill="hold">
+                      <p:stCondLst>
+                        <p:cond delay="indefinite"/>
+                      </p:stCondLst>
+                      <p:childTnLst>
+                        <p:par>
+                          <p:cTn id="19" fill="hold">
+                            <p:stCondLst>
+                              <p:cond delay="0"/>
+                            </p:stCondLst>
+                            <p:childTnLst>
+                              <p:par>
+                                <p:cTn id="20" presetID="10" presetClass="entr" presetSubtype="0" fill="hold" grpId="0" nodeType="clickEffect">
+                                  <p:stCondLst>
+                                    <p:cond delay="0"/>
+                                  </p:stCondLst>
+                                  <p:childTnLst>
+                                    <p:set>
+                                      <p:cBhvr>
+                                        <p:cTn id="21" dur="1" fill="hold">
+                                          <p:stCondLst>
+                                            <p:cond delay="0"/>
+                                          </p:stCondLst>
+                                        </p:cTn>
+                                        <p:tgtEl>
+                                          <p:spTgt spid="3">
+                                            <p:txEl>
+                                              <p:pRg st="3" end="3"/>
+                                            </p:txEl>
+                                          </p:spTgt>
+                                        </p:tgtEl>
+                                        <p:attrNameLst>
+                                          <p:attrName>style.visibility</p:attrName>
+                                        </p:attrNameLst>
+                                      </p:cBhvr>
+                                      <p:to>
+                                        <p:strVal val="visible"/>
+                                      </p:to>
+                                    </p:set>
+                                    <p:animEffect transition="in" filter="fade">
+                                      <p:cBhvr>
+                                        <p:cTn id="22" dur="500"/>
+                                        <p:tgtEl>
+                                          <p:spTgt spid="3">
+                                            <p:txEl>
+                                              <p:pRg st="3" end="3"/>
+                                            </p:txEl>
+                                          </p:spTgt>
+                                        </p:tgtEl>
+                                      </p:cBhvr>
+                                    </p:animEffect>
+                                  </p:childTnLst>
+                                </p:cTn>
+                              </p:par>
+                              <p:par>
+                                <p:cTn id="23" presetID="10" presetClass="entr" presetSubtype="0" fill="hold" grpId="0" nodeType="withEffect">
+                                  <p:stCondLst>
+                                    <p:cond delay="0"/>
+                                  </p:stCondLst>
+                                  <p:childTnLst>
+                                    <p:set>
+                                      <p:cBhvr>
+                                        <p:cTn id="24" dur="1" fill="hold">
+                                          <p:stCondLst>
+                                            <p:cond delay="0"/>
+                                          </p:stCondLst>
+                                        </p:cTn>
+                                        <p:tgtEl>
+                                          <p:spTgt spid="3">
+                                            <p:txEl>
+                                              <p:pRg st="4" end="4"/>
+                                            </p:txEl>
+                                          </p:spTgt>
+                                        </p:tgtEl>
+                                        <p:attrNameLst>
+                                          <p:attrName>style.visibility</p:attrName>
+                                        </p:attrNameLst>
+                                      </p:cBhvr>
+                                      <p:to>
+                                        <p:strVal val="visible"/>
+                                      </p:to>
+                                    </p:set>
+                                    <p:animEffect transition="in" filter="fade">
+                                      <p:cBhvr>
+                                        <p:cTn id="25" dur="500"/>
+                                        <p:tgtEl>
+                                          <p:spTgt spid="3">
+                                            <p:txEl>
+                                              <p:pRg st="4" end="4"/>
+                                            </p:txEl>
+                                          </p:spTgt>
+                                        </p:tgtEl>
+                                      </p:cBhvr>
+                                    </p:animEffect>
+                                  </p:childTnLst>
+                                </p:cTn>
+                              </p:par>
+                              <p:par>
+                                <p:cTn id="26" presetID="10" presetClass="entr" presetSubtype="0" fill="hold" grpId="0" nodeType="withEffect">
+                                  <p:stCondLst>
+                                    <p:cond delay="0"/>
+                                  </p:stCondLst>
+                                  <p:childTnLst>
+                                    <p:set>
+                                      <p:cBhvr>
+                                        <p:cTn id="27" dur="1" fill="hold">
+                                          <p:stCondLst>
+                                            <p:cond delay="0"/>
+                                          </p:stCondLst>
+                                        </p:cTn>
+                                        <p:tgtEl>
+                                          <p:spTgt spid="3">
+                                            <p:txEl>
+                                              <p:pRg st="5" end="5"/>
+                                            </p:txEl>
+                                          </p:spTgt>
+                                        </p:tgtEl>
+                                        <p:attrNameLst>
+                                          <p:attrName>style.visibility</p:attrName>
+                                        </p:attrNameLst>
+                                      </p:cBhvr>
+                                      <p:to>
+                                        <p:strVal val="visible"/>
+                                      </p:to>
+                                    </p:set>
+                                    <p:animEffect transition="in" filter="fade">
+                                      <p:cBhvr>
+                                        <p:cTn id="28" dur="500"/>
+                                        <p:tgtEl>
+                                          <p:spTgt spid="3">
+                                            <p:txEl>
+                                              <p:pRg st="5" end="5"/>
+                                            </p:txEl>
+                                          </p:spTgt>
+                                        </p:tgtEl>
+                                      </p:cBhvr>
+                                    </p:animEffect>
+                                  </p:childTnLst>
+                                </p:cTn>
+                              </p:par>
+                            </p:childTnLst>
+                          </p:cTn>
+                        </p:par>
+                      </p:childTnLst>
+                    </p:cTn>
+                  </p:par>
+                  <p:par>
+                    <p:cTn id="29" fill="hold">
+                      <p:stCondLst>
+                        <p:cond delay="indefinite"/>
+                      </p:stCondLst>
+                      <p:childTnLst>
+                        <p:par>
+                          <p:cTn id="30" fill="hold">
+                            <p:stCondLst>
+                              <p:cond delay="0"/>
+                            </p:stCondLst>
+                            <p:childTnLst>
+                              <p:par>
+                                <p:cTn id="31" presetID="10" presetClass="entr" presetSubtype="0" fill="hold" grpId="0" nodeType="clickEffect">
+                                  <p:stCondLst>
+                                    <p:cond delay="0"/>
+                                  </p:stCondLst>
+                                  <p:childTnLst>
+                                    <p:set>
+                                      <p:cBhvr>
+                                        <p:cTn id="32" dur="1" fill="hold">
+                                          <p:stCondLst>
+                                            <p:cond delay="0"/>
+                                          </p:stCondLst>
+                                        </p:cTn>
+                                        <p:tgtEl>
+                                          <p:spTgt spid="3">
+                                            <p:txEl>
+                                              <p:pRg st="6" end="6"/>
+                                            </p:txEl>
+                                          </p:spTgt>
+                                        </p:tgtEl>
+                                        <p:attrNameLst>
+                                          <p:attrName>style.visibility</p:attrName>
+                                        </p:attrNameLst>
+                                      </p:cBhvr>
+                                      <p:to>
+                                        <p:strVal val="visible"/>
+                                      </p:to>
+                                    </p:set>
+                                    <p:animEffect transition="in" filter="fade">
+                                      <p:cBhvr>
+                                        <p:cTn id="33" dur="500"/>
+                                        <p:tgtEl>
+                                          <p:spTgt spid="3">
+                                            <p:txEl>
+                                              <p:pRg st="6" end="6"/>
+                                            </p:txEl>
+                                          </p:spTgt>
+                                        </p:tgtEl>
+                                      </p:cBhvr>
+                                    </p:animEffect>
+                                  </p:childTnLst>
+                                </p:cTn>
+                              </p:par>
+                              <p:par>
+                                <p:cTn id="34" presetID="10" presetClass="entr" presetSubtype="0" fill="hold" grpId="0" nodeType="withEffect">
+                                  <p:stCondLst>
+                                    <p:cond delay="0"/>
+                                  </p:stCondLst>
+                                  <p:childTnLst>
+                                    <p:set>
+                                      <p:cBhvr>
+                                        <p:cTn id="35" dur="1" fill="hold">
+                                          <p:stCondLst>
+                                            <p:cond delay="0"/>
+                                          </p:stCondLst>
+                                        </p:cTn>
+                                        <p:tgtEl>
+                                          <p:spTgt spid="3">
+                                            <p:txEl>
+                                              <p:pRg st="7" end="7"/>
+                                            </p:txEl>
+                                          </p:spTgt>
+                                        </p:tgtEl>
+                                        <p:attrNameLst>
+                                          <p:attrName>style.visibility</p:attrName>
+                                        </p:attrNameLst>
+                                      </p:cBhvr>
+                                      <p:to>
+                                        <p:strVal val="visible"/>
+                                      </p:to>
+                                    </p:set>
+                                    <p:animEffect transition="in" filter="fade">
+                                      <p:cBhvr>
+                                        <p:cTn id="36" dur="500"/>
+                                        <p:tgtEl>
+                                          <p:spTgt spid="3">
+                                            <p:txEl>
+                                              <p:pRg st="7" end="7"/>
+                                            </p:txEl>
+                                          </p:spTgt>
+                                        </p:tgtEl>
+                                      </p:cBhvr>
+                                    </p:animEffect>
+                                  </p:childTnLst>
+                                </p:cTn>
+                              </p:par>
+                              <p:par>
+                                <p:cTn id="37" presetID="10" presetClass="entr" presetSubtype="0" fill="hold" grpId="0" nodeType="withEffect">
+                                  <p:stCondLst>
+                                    <p:cond delay="0"/>
+                                  </p:stCondLst>
+                                  <p:childTnLst>
+                                    <p:set>
+                                      <p:cBhvr>
+                                        <p:cTn id="38" dur="1" fill="hold">
+                                          <p:stCondLst>
+                                            <p:cond delay="0"/>
+                                          </p:stCondLst>
+                                        </p:cTn>
+                                        <p:tgtEl>
+                                          <p:spTgt spid="3">
+                                            <p:txEl>
+                                              <p:pRg st="8" end="8"/>
+                                            </p:txEl>
+                                          </p:spTgt>
+                                        </p:tgtEl>
+                                        <p:attrNameLst>
+                                          <p:attrName>style.visibility</p:attrName>
+                                        </p:attrNameLst>
+                                      </p:cBhvr>
+                                      <p:to>
+                                        <p:strVal val="visible"/>
+                                      </p:to>
+                                    </p:set>
+                                    <p:animEffect transition="in" filter="fade">
+                                      <p:cBhvr>
+                                        <p:cTn id="39" dur="500"/>
+                                        <p:tgtEl>
+                                          <p:spTgt spid="3">
+                                            <p:txEl>
+                                              <p:pRg st="8" end="8"/>
+                                            </p:txEl>
+                                          </p:spTgt>
+                                        </p:tgtEl>
+                                      </p:cBhvr>
+                                    </p:animEffect>
+                                  </p:childTnLst>
+                                </p:cTn>
+                              </p:par>
+                              <p:par>
+                                <p:cTn id="40" presetID="10" presetClass="entr" presetSubtype="0" fill="hold" grpId="0" nodeType="withEffect">
+                                  <p:stCondLst>
+                                    <p:cond delay="0"/>
+                                  </p:stCondLst>
+                                  <p:childTnLst>
+                                    <p:set>
+                                      <p:cBhvr>
+                                        <p:cTn id="41" dur="1" fill="hold">
+                                          <p:stCondLst>
+                                            <p:cond delay="0"/>
+                                          </p:stCondLst>
+                                        </p:cTn>
+                                        <p:tgtEl>
+                                          <p:spTgt spid="3">
+                                            <p:txEl>
+                                              <p:pRg st="9" end="9"/>
+                                            </p:txEl>
+                                          </p:spTgt>
+                                        </p:tgtEl>
+                                        <p:attrNameLst>
+                                          <p:attrName>style.visibility</p:attrName>
+                                        </p:attrNameLst>
+                                      </p:cBhvr>
+                                      <p:to>
+                                        <p:strVal val="visible"/>
+                                      </p:to>
+                                    </p:set>
+                                    <p:animEffect transition="in" filter="fade">
+                                      <p:cBhvr>
+                                        <p:cTn id="42" dur="500"/>
+                                        <p:tgtEl>
+                                          <p:spTgt spid="3">
+                                            <p:txEl>
+                                              <p:pRg st="9" end="9"/>
+                                            </p:txEl>
+                                          </p:spTgt>
+                                        </p:tgtEl>
+                                      </p:cBhvr>
+                                    </p:animEffect>
+                                  </p:childTnLst>
+                                </p:cTn>
+                              </p:par>
+                            </p:childTnLst>
+                          </p:cTn>
+                        </p:par>
+                      </p:childTnLst>
+                    </p:cTn>
+                  </p:par>
+                </p:childTnLst>
+              </p:cTn>
+              <p:prevCondLst>
+                <p:cond evt="onPrev" delay="0">
+                  <p:tgtEl>
+                    <p:sldTgt/>
+                  </p:tgtEl>
+                </p:cond>
+              </p:prevCondLst>
+              <p:nextCondLst>
+                <p:cond evt="onNext" delay="0">
+                  <p:tgtEl>
+                    <p:sldTgt/>
+                  </p:tgtEl>
+                </p:cond>
+              </p:nextCondLst>
+            </p:seq>
+          </p:childTnLst>
+        </p:cTn>
+      </p:par>
+    </p:tnLst>
+    <p:bldLst>
+      <p:bldP spid="3" grpId="0" uiExpand="1" build="p"/>
+    </p:bldLst>
+  </p:timing>
+</p:sld>
+</file>
+
 <file path=ppt/slides/slide2.xml><?xml version="1.0" encoding="utf-8"?>
 <p:sld xmlns:a="http://schemas.openxmlformats.org/drawingml/2006/main" xmlns:r="http://schemas.openxmlformats.org/officeDocument/2006/relationships" xmlns:p="http://schemas.openxmlformats.org/presentationml/2006/main">
   <p:cSld>
@@ -13451,6 +15557,1714 @@
       <p:bldP spid="3" grpId="0" uiExpand="1" build="p"/>
     </p:bldLst>
   </p:timing>
+</p:sld>
+</file>
+
+<file path=ppt/slides/slide20.xml><?xml version="1.0" encoding="utf-8"?>
+<p:sld xmlns:a="http://schemas.openxmlformats.org/drawingml/2006/main" xmlns:r="http://schemas.openxmlformats.org/officeDocument/2006/relationships" xmlns:p="http://schemas.openxmlformats.org/presentationml/2006/main">
+  <p:cSld>
+    <p:spTree>
+      <p:nvGrpSpPr>
+        <p:cNvPr id="1" name=""/>
+        <p:cNvGrpSpPr/>
+        <p:nvPr/>
+      </p:nvGrpSpPr>
+      <p:grpSpPr>
+        <a:xfrm>
+          <a:off x="0" y="0"/>
+          <a:ext cx="0" cy="0"/>
+          <a:chOff x="0" y="0"/>
+          <a:chExt cx="0" cy="0"/>
+        </a:xfrm>
+      </p:grpSpPr>
+      <p:sp>
+        <p:nvSpPr>
+          <p:cNvPr id="2" name="Title 1">
+            <a:extLst>
+              <a:ext uri="{FF2B5EF4-FFF2-40B4-BE49-F238E27FC236}">
+                <a16:creationId xmlns:a16="http://schemas.microsoft.com/office/drawing/2014/main" id="{9352FA24-2F98-B235-D34E-F53793F96B66}"/>
+              </a:ext>
+            </a:extLst>
+          </p:cNvPr>
+          <p:cNvSpPr>
+            <a:spLocks noGrp="1"/>
+          </p:cNvSpPr>
+          <p:nvPr>
+            <p:ph type="title"/>
+          </p:nvPr>
+        </p:nvSpPr>
+        <p:spPr/>
+        <p:txBody>
+          <a:bodyPr/>
+          <a:lstStyle/>
+          <a:p>
+            <a:r>
+              <a:rPr lang="en-US" dirty="0"/>
+              <a:t>Unit 3 – Data Binding</a:t>
+            </a:r>
+          </a:p>
+        </p:txBody>
+      </p:sp>
+      <p:sp>
+        <p:nvSpPr>
+          <p:cNvPr id="3" name="Content Placeholder 2">
+            <a:extLst>
+              <a:ext uri="{FF2B5EF4-FFF2-40B4-BE49-F238E27FC236}">
+                <a16:creationId xmlns:a16="http://schemas.microsoft.com/office/drawing/2014/main" id="{354DC353-604A-E91D-E53C-908CF553D11F}"/>
+              </a:ext>
+            </a:extLst>
+          </p:cNvPr>
+          <p:cNvSpPr>
+            <a:spLocks noGrp="1"/>
+          </p:cNvSpPr>
+          <p:nvPr>
+            <p:ph idx="1"/>
+          </p:nvPr>
+        </p:nvSpPr>
+        <p:spPr/>
+        <p:txBody>
+          <a:bodyPr/>
+          <a:lstStyle/>
+          <a:p>
+            <a:r>
+              <a:rPr lang="en-US" dirty="0"/>
+              <a:t>MVVM</a:t>
+            </a:r>
+          </a:p>
+          <a:p>
+            <a:pPr lvl="1"/>
+            <a:r>
+              <a:rPr lang="en-US" dirty="0"/>
+              <a:t>This pattern can be as granular as you like</a:t>
+            </a:r>
+          </a:p>
+          <a:p>
+            <a:pPr lvl="2"/>
+            <a:r>
+              <a:rPr lang="en-US" dirty="0"/>
+              <a:t>View could be entire window, ViewModel contains data for everything</a:t>
+            </a:r>
+          </a:p>
+          <a:p>
+            <a:pPr lvl="2"/>
+            <a:r>
+              <a:rPr lang="en-US" dirty="0"/>
+              <a:t>Or window could contain a series of child views, each of which has their own ViewModel</a:t>
+            </a:r>
+          </a:p>
+          <a:p>
+            <a:pPr lvl="2"/>
+            <a:r>
+              <a:rPr lang="en-US" dirty="0"/>
+              <a:t>Quite common to have a hierarchy of Views/</a:t>
+            </a:r>
+            <a:r>
+              <a:rPr lang="en-US" dirty="0" err="1"/>
+              <a:t>ViewModels</a:t>
+            </a:r>
+            <a:r>
+              <a:rPr lang="en-US" dirty="0"/>
+              <a:t> in an application</a:t>
+            </a:r>
+          </a:p>
+          <a:p>
+            <a:pPr lvl="2"/>
+            <a:endParaRPr lang="en-US" dirty="0"/>
+          </a:p>
+        </p:txBody>
+      </p:sp>
+    </p:spTree>
+    <p:extLst>
+      <p:ext uri="{BB962C8B-B14F-4D97-AF65-F5344CB8AC3E}">
+        <p14:creationId xmlns:p14="http://schemas.microsoft.com/office/powerpoint/2010/main" val="951497690"/>
+      </p:ext>
+    </p:extLst>
+  </p:cSld>
+  <p:clrMapOvr>
+    <a:masterClrMapping/>
+  </p:clrMapOvr>
+  <p:timing>
+    <p:tnLst>
+      <p:par>
+        <p:cTn id="1" dur="indefinite" restart="never" nodeType="tmRoot">
+          <p:childTnLst>
+            <p:seq concurrent="1" nextAc="seek">
+              <p:cTn id="2" dur="indefinite" nodeType="mainSeq">
+                <p:childTnLst>
+                  <p:par>
+                    <p:cTn id="3" fill="hold">
+                      <p:stCondLst>
+                        <p:cond delay="indefinite"/>
+                      </p:stCondLst>
+                      <p:childTnLst>
+                        <p:par>
+                          <p:cTn id="4" fill="hold">
+                            <p:stCondLst>
+                              <p:cond delay="0"/>
+                            </p:stCondLst>
+                            <p:childTnLst>
+                              <p:par>
+                                <p:cTn id="5" presetID="10" presetClass="entr" presetSubtype="0" fill="hold" grpId="0" nodeType="clickEffect">
+                                  <p:stCondLst>
+                                    <p:cond delay="0"/>
+                                  </p:stCondLst>
+                                  <p:childTnLst>
+                                    <p:set>
+                                      <p:cBhvr>
+                                        <p:cTn id="6" dur="1" fill="hold">
+                                          <p:stCondLst>
+                                            <p:cond delay="0"/>
+                                          </p:stCondLst>
+                                        </p:cTn>
+                                        <p:tgtEl>
+                                          <p:spTgt spid="3">
+                                            <p:txEl>
+                                              <p:pRg st="0" end="0"/>
+                                            </p:txEl>
+                                          </p:spTgt>
+                                        </p:tgtEl>
+                                        <p:attrNameLst>
+                                          <p:attrName>style.visibility</p:attrName>
+                                        </p:attrNameLst>
+                                      </p:cBhvr>
+                                      <p:to>
+                                        <p:strVal val="visible"/>
+                                      </p:to>
+                                    </p:set>
+                                    <p:animEffect transition="in" filter="fade">
+                                      <p:cBhvr>
+                                        <p:cTn id="7" dur="500"/>
+                                        <p:tgtEl>
+                                          <p:spTgt spid="3">
+                                            <p:txEl>
+                                              <p:pRg st="0" end="0"/>
+                                            </p:txEl>
+                                          </p:spTgt>
+                                        </p:tgtEl>
+                                      </p:cBhvr>
+                                    </p:animEffect>
+                                  </p:childTnLst>
+                                </p:cTn>
+                              </p:par>
+                            </p:childTnLst>
+                          </p:cTn>
+                        </p:par>
+                      </p:childTnLst>
+                    </p:cTn>
+                  </p:par>
+                  <p:par>
+                    <p:cTn id="8" fill="hold">
+                      <p:stCondLst>
+                        <p:cond delay="indefinite"/>
+                      </p:stCondLst>
+                      <p:childTnLst>
+                        <p:par>
+                          <p:cTn id="9" fill="hold">
+                            <p:stCondLst>
+                              <p:cond delay="0"/>
+                            </p:stCondLst>
+                            <p:childTnLst>
+                              <p:par>
+                                <p:cTn id="10" presetID="10" presetClass="entr" presetSubtype="0" fill="hold" grpId="0" nodeType="clickEffect">
+                                  <p:stCondLst>
+                                    <p:cond delay="0"/>
+                                  </p:stCondLst>
+                                  <p:childTnLst>
+                                    <p:set>
+                                      <p:cBhvr>
+                                        <p:cTn id="11" dur="1" fill="hold">
+                                          <p:stCondLst>
+                                            <p:cond delay="0"/>
+                                          </p:stCondLst>
+                                        </p:cTn>
+                                        <p:tgtEl>
+                                          <p:spTgt spid="3">
+                                            <p:txEl>
+                                              <p:pRg st="1" end="1"/>
+                                            </p:txEl>
+                                          </p:spTgt>
+                                        </p:tgtEl>
+                                        <p:attrNameLst>
+                                          <p:attrName>style.visibility</p:attrName>
+                                        </p:attrNameLst>
+                                      </p:cBhvr>
+                                      <p:to>
+                                        <p:strVal val="visible"/>
+                                      </p:to>
+                                    </p:set>
+                                    <p:animEffect transition="in" filter="fade">
+                                      <p:cBhvr>
+                                        <p:cTn id="12" dur="500"/>
+                                        <p:tgtEl>
+                                          <p:spTgt spid="3">
+                                            <p:txEl>
+                                              <p:pRg st="1" end="1"/>
+                                            </p:txEl>
+                                          </p:spTgt>
+                                        </p:tgtEl>
+                                      </p:cBhvr>
+                                    </p:animEffect>
+                                  </p:childTnLst>
+                                </p:cTn>
+                              </p:par>
+                            </p:childTnLst>
+                          </p:cTn>
+                        </p:par>
+                      </p:childTnLst>
+                    </p:cTn>
+                  </p:par>
+                  <p:par>
+                    <p:cTn id="13" fill="hold">
+                      <p:stCondLst>
+                        <p:cond delay="indefinite"/>
+                      </p:stCondLst>
+                      <p:childTnLst>
+                        <p:par>
+                          <p:cTn id="14" fill="hold">
+                            <p:stCondLst>
+                              <p:cond delay="0"/>
+                            </p:stCondLst>
+                            <p:childTnLst>
+                              <p:par>
+                                <p:cTn id="15" presetID="10" presetClass="entr" presetSubtype="0" fill="hold" grpId="0" nodeType="clickEffect">
+                                  <p:stCondLst>
+                                    <p:cond delay="0"/>
+                                  </p:stCondLst>
+                                  <p:childTnLst>
+                                    <p:set>
+                                      <p:cBhvr>
+                                        <p:cTn id="16" dur="1" fill="hold">
+                                          <p:stCondLst>
+                                            <p:cond delay="0"/>
+                                          </p:stCondLst>
+                                        </p:cTn>
+                                        <p:tgtEl>
+                                          <p:spTgt spid="3">
+                                            <p:txEl>
+                                              <p:pRg st="2" end="2"/>
+                                            </p:txEl>
+                                          </p:spTgt>
+                                        </p:tgtEl>
+                                        <p:attrNameLst>
+                                          <p:attrName>style.visibility</p:attrName>
+                                        </p:attrNameLst>
+                                      </p:cBhvr>
+                                      <p:to>
+                                        <p:strVal val="visible"/>
+                                      </p:to>
+                                    </p:set>
+                                    <p:animEffect transition="in" filter="fade">
+                                      <p:cBhvr>
+                                        <p:cTn id="17" dur="500"/>
+                                        <p:tgtEl>
+                                          <p:spTgt spid="3">
+                                            <p:txEl>
+                                              <p:pRg st="2" end="2"/>
+                                            </p:txEl>
+                                          </p:spTgt>
+                                        </p:tgtEl>
+                                      </p:cBhvr>
+                                    </p:animEffect>
+                                  </p:childTnLst>
+                                </p:cTn>
+                              </p:par>
+                            </p:childTnLst>
+                          </p:cTn>
+                        </p:par>
+                      </p:childTnLst>
+                    </p:cTn>
+                  </p:par>
+                  <p:par>
+                    <p:cTn id="18" fill="hold">
+                      <p:stCondLst>
+                        <p:cond delay="indefinite"/>
+                      </p:stCondLst>
+                      <p:childTnLst>
+                        <p:par>
+                          <p:cTn id="19" fill="hold">
+                            <p:stCondLst>
+                              <p:cond delay="0"/>
+                            </p:stCondLst>
+                            <p:childTnLst>
+                              <p:par>
+                                <p:cTn id="20" presetID="10" presetClass="entr" presetSubtype="0" fill="hold" grpId="0" nodeType="clickEffect">
+                                  <p:stCondLst>
+                                    <p:cond delay="0"/>
+                                  </p:stCondLst>
+                                  <p:childTnLst>
+                                    <p:set>
+                                      <p:cBhvr>
+                                        <p:cTn id="21" dur="1" fill="hold">
+                                          <p:stCondLst>
+                                            <p:cond delay="0"/>
+                                          </p:stCondLst>
+                                        </p:cTn>
+                                        <p:tgtEl>
+                                          <p:spTgt spid="3">
+                                            <p:txEl>
+                                              <p:pRg st="3" end="3"/>
+                                            </p:txEl>
+                                          </p:spTgt>
+                                        </p:tgtEl>
+                                        <p:attrNameLst>
+                                          <p:attrName>style.visibility</p:attrName>
+                                        </p:attrNameLst>
+                                      </p:cBhvr>
+                                      <p:to>
+                                        <p:strVal val="visible"/>
+                                      </p:to>
+                                    </p:set>
+                                    <p:animEffect transition="in" filter="fade">
+                                      <p:cBhvr>
+                                        <p:cTn id="22" dur="500"/>
+                                        <p:tgtEl>
+                                          <p:spTgt spid="3">
+                                            <p:txEl>
+                                              <p:pRg st="3" end="3"/>
+                                            </p:txEl>
+                                          </p:spTgt>
+                                        </p:tgtEl>
+                                      </p:cBhvr>
+                                    </p:animEffect>
+                                  </p:childTnLst>
+                                </p:cTn>
+                              </p:par>
+                            </p:childTnLst>
+                          </p:cTn>
+                        </p:par>
+                      </p:childTnLst>
+                    </p:cTn>
+                  </p:par>
+                  <p:par>
+                    <p:cTn id="23" fill="hold">
+                      <p:stCondLst>
+                        <p:cond delay="indefinite"/>
+                      </p:stCondLst>
+                      <p:childTnLst>
+                        <p:par>
+                          <p:cTn id="24" fill="hold">
+                            <p:stCondLst>
+                              <p:cond delay="0"/>
+                            </p:stCondLst>
+                            <p:childTnLst>
+                              <p:par>
+                                <p:cTn id="25" presetID="10" presetClass="entr" presetSubtype="0" fill="hold" grpId="0" nodeType="clickEffect">
+                                  <p:stCondLst>
+                                    <p:cond delay="0"/>
+                                  </p:stCondLst>
+                                  <p:childTnLst>
+                                    <p:set>
+                                      <p:cBhvr>
+                                        <p:cTn id="26" dur="1" fill="hold">
+                                          <p:stCondLst>
+                                            <p:cond delay="0"/>
+                                          </p:stCondLst>
+                                        </p:cTn>
+                                        <p:tgtEl>
+                                          <p:spTgt spid="3">
+                                            <p:txEl>
+                                              <p:pRg st="4" end="4"/>
+                                            </p:txEl>
+                                          </p:spTgt>
+                                        </p:tgtEl>
+                                        <p:attrNameLst>
+                                          <p:attrName>style.visibility</p:attrName>
+                                        </p:attrNameLst>
+                                      </p:cBhvr>
+                                      <p:to>
+                                        <p:strVal val="visible"/>
+                                      </p:to>
+                                    </p:set>
+                                    <p:animEffect transition="in" filter="fade">
+                                      <p:cBhvr>
+                                        <p:cTn id="27" dur="500"/>
+                                        <p:tgtEl>
+                                          <p:spTgt spid="3">
+                                            <p:txEl>
+                                              <p:pRg st="4" end="4"/>
+                                            </p:txEl>
+                                          </p:spTgt>
+                                        </p:tgtEl>
+                                      </p:cBhvr>
+                                    </p:animEffect>
+                                  </p:childTnLst>
+                                </p:cTn>
+                              </p:par>
+                            </p:childTnLst>
+                          </p:cTn>
+                        </p:par>
+                      </p:childTnLst>
+                    </p:cTn>
+                  </p:par>
+                </p:childTnLst>
+              </p:cTn>
+              <p:prevCondLst>
+                <p:cond evt="onPrev" delay="0">
+                  <p:tgtEl>
+                    <p:sldTgt/>
+                  </p:tgtEl>
+                </p:cond>
+              </p:prevCondLst>
+              <p:nextCondLst>
+                <p:cond evt="onNext" delay="0">
+                  <p:tgtEl>
+                    <p:sldTgt/>
+                  </p:tgtEl>
+                </p:cond>
+              </p:nextCondLst>
+            </p:seq>
+          </p:childTnLst>
+        </p:cTn>
+      </p:par>
+    </p:tnLst>
+    <p:bldLst>
+      <p:bldP spid="3" grpId="0" uiExpand="1" build="p"/>
+    </p:bldLst>
+  </p:timing>
+</p:sld>
+</file>
+
+<file path=ppt/slides/slide21.xml><?xml version="1.0" encoding="utf-8"?>
+<p:sld xmlns:a="http://schemas.openxmlformats.org/drawingml/2006/main" xmlns:r="http://schemas.openxmlformats.org/officeDocument/2006/relationships" xmlns:p="http://schemas.openxmlformats.org/presentationml/2006/main">
+  <p:cSld>
+    <p:spTree>
+      <p:nvGrpSpPr>
+        <p:cNvPr id="1" name=""/>
+        <p:cNvGrpSpPr/>
+        <p:nvPr/>
+      </p:nvGrpSpPr>
+      <p:grpSpPr>
+        <a:xfrm>
+          <a:off x="0" y="0"/>
+          <a:ext cx="0" cy="0"/>
+          <a:chOff x="0" y="0"/>
+          <a:chExt cx="0" cy="0"/>
+        </a:xfrm>
+      </p:grpSpPr>
+      <p:sp>
+        <p:nvSpPr>
+          <p:cNvPr id="2" name="Title 1">
+            <a:extLst>
+              <a:ext uri="{FF2B5EF4-FFF2-40B4-BE49-F238E27FC236}">
+                <a16:creationId xmlns:a16="http://schemas.microsoft.com/office/drawing/2014/main" id="{07E3C454-81ED-E13A-D3E6-6FD1412570C5}"/>
+              </a:ext>
+            </a:extLst>
+          </p:cNvPr>
+          <p:cNvSpPr>
+            <a:spLocks noGrp="1"/>
+          </p:cNvSpPr>
+          <p:nvPr>
+            <p:ph type="title"/>
+          </p:nvPr>
+        </p:nvSpPr>
+        <p:spPr/>
+        <p:txBody>
+          <a:bodyPr/>
+          <a:lstStyle/>
+          <a:p>
+            <a:r>
+              <a:rPr lang="en-US" dirty="0"/>
+              <a:t>Unit 3 – Data Binding</a:t>
+            </a:r>
+          </a:p>
+        </p:txBody>
+      </p:sp>
+      <p:sp>
+        <p:nvSpPr>
+          <p:cNvPr id="3" name="Content Placeholder 2">
+            <a:extLst>
+              <a:ext uri="{FF2B5EF4-FFF2-40B4-BE49-F238E27FC236}">
+                <a16:creationId xmlns:a16="http://schemas.microsoft.com/office/drawing/2014/main" id="{6265C7C2-ADDF-D435-5DAC-5EC8267091C7}"/>
+              </a:ext>
+            </a:extLst>
+          </p:cNvPr>
+          <p:cNvSpPr>
+            <a:spLocks noGrp="1"/>
+          </p:cNvSpPr>
+          <p:nvPr>
+            <p:ph idx="1"/>
+          </p:nvPr>
+        </p:nvSpPr>
+        <p:spPr/>
+        <p:txBody>
+          <a:bodyPr>
+            <a:normAutofit fontScale="92500" lnSpcReduction="10000"/>
+          </a:bodyPr>
+          <a:lstStyle/>
+          <a:p>
+            <a:r>
+              <a:rPr lang="en-US" dirty="0"/>
+              <a:t>MVVM in WPF</a:t>
+            </a:r>
+          </a:p>
+          <a:p>
+            <a:pPr lvl="1"/>
+            <a:r>
+              <a:rPr lang="en-US" dirty="0"/>
+              <a:t>MVVM in WPF achieved using Data Binding</a:t>
+            </a:r>
+          </a:p>
+          <a:p>
+            <a:pPr lvl="2"/>
+            <a:r>
+              <a:rPr lang="en-US" dirty="0"/>
+              <a:t>UI element sets DataContext to instance of a ViewModel</a:t>
+            </a:r>
+          </a:p>
+          <a:p>
+            <a:pPr lvl="2"/>
+            <a:r>
+              <a:rPr lang="en-US" dirty="0"/>
+              <a:t>Properties of UI elements are data bound to properties in the ViewModel</a:t>
+            </a:r>
+          </a:p>
+          <a:p>
+            <a:pPr lvl="1"/>
+            <a:r>
+              <a:rPr lang="en-US" dirty="0"/>
+              <a:t>Binding modes</a:t>
+            </a:r>
+          </a:p>
+          <a:p>
+            <a:pPr lvl="2"/>
+            <a:r>
+              <a:rPr lang="en-US" dirty="0"/>
+              <a:t>Each data binding has a binding Mode dictating what direction data flows</a:t>
+            </a:r>
+          </a:p>
+          <a:p>
+            <a:pPr lvl="2"/>
+            <a:r>
+              <a:rPr lang="en-US" dirty="0" err="1"/>
+              <a:t>OneWay</a:t>
+            </a:r>
+            <a:r>
+              <a:rPr lang="en-US" dirty="0"/>
+              <a:t> - from ViewModel to View</a:t>
+            </a:r>
+          </a:p>
+          <a:p>
+            <a:pPr lvl="2"/>
+            <a:r>
+              <a:rPr lang="en-US" dirty="0" err="1"/>
+              <a:t>OneWayToSource</a:t>
+            </a:r>
+            <a:r>
+              <a:rPr lang="en-US" dirty="0"/>
+              <a:t> - from View to ViewModel</a:t>
+            </a:r>
+          </a:p>
+          <a:p>
+            <a:pPr lvl="2"/>
+            <a:r>
+              <a:rPr lang="en-US" dirty="0" err="1"/>
+              <a:t>TwoWay</a:t>
+            </a:r>
+            <a:r>
+              <a:rPr lang="en-US" dirty="0"/>
+              <a:t> - in both directions</a:t>
+            </a:r>
+          </a:p>
+          <a:p>
+            <a:pPr lvl="2"/>
+            <a:r>
+              <a:rPr lang="en-US" dirty="0" err="1"/>
+              <a:t>OneTime</a:t>
+            </a:r>
+            <a:r>
+              <a:rPr lang="en-US" dirty="0"/>
+              <a:t> - like </a:t>
+            </a:r>
+            <a:r>
+              <a:rPr lang="en-US" dirty="0" err="1"/>
+              <a:t>OneWay</a:t>
+            </a:r>
+            <a:r>
+              <a:rPr lang="en-US" dirty="0"/>
+              <a:t>, but just once  </a:t>
+            </a:r>
+            <a:r>
+              <a:rPr lang="en-US" i="1" dirty="0"/>
+              <a:t>(rarely used)</a:t>
+            </a:r>
+          </a:p>
+          <a:p>
+            <a:pPr lvl="1"/>
+            <a:r>
+              <a:rPr lang="en-US" dirty="0"/>
+              <a:t>When is ViewModel updated?</a:t>
+            </a:r>
+          </a:p>
+          <a:p>
+            <a:pPr lvl="2"/>
+            <a:r>
+              <a:rPr lang="en-US" dirty="0" err="1"/>
+              <a:t>UpdateSourceTrigger</a:t>
+            </a:r>
+            <a:r>
+              <a:rPr lang="en-US" dirty="0"/>
+              <a:t> - typically </a:t>
+            </a:r>
+            <a:r>
+              <a:rPr lang="en-US" dirty="0" err="1"/>
+              <a:t>LostFocus</a:t>
+            </a:r>
+            <a:r>
+              <a:rPr lang="en-US" dirty="0"/>
+              <a:t> or </a:t>
+            </a:r>
+            <a:r>
+              <a:rPr lang="en-US" dirty="0" err="1"/>
+              <a:t>PropertyChanged</a:t>
+            </a:r>
+            <a:endParaRPr lang="en-US" dirty="0"/>
+          </a:p>
+        </p:txBody>
+      </p:sp>
+    </p:spTree>
+    <p:extLst>
+      <p:ext uri="{BB962C8B-B14F-4D97-AF65-F5344CB8AC3E}">
+        <p14:creationId xmlns:p14="http://schemas.microsoft.com/office/powerpoint/2010/main" val="2153225792"/>
+      </p:ext>
+    </p:extLst>
+  </p:cSld>
+  <p:clrMapOvr>
+    <a:masterClrMapping/>
+  </p:clrMapOvr>
+  <p:timing>
+    <p:tnLst>
+      <p:par>
+        <p:cTn id="1" dur="indefinite" restart="never" nodeType="tmRoot">
+          <p:childTnLst>
+            <p:seq concurrent="1" nextAc="seek">
+              <p:cTn id="2" dur="indefinite" nodeType="mainSeq">
+                <p:childTnLst>
+                  <p:par>
+                    <p:cTn id="3" fill="hold">
+                      <p:stCondLst>
+                        <p:cond delay="indefinite"/>
+                      </p:stCondLst>
+                      <p:childTnLst>
+                        <p:par>
+                          <p:cTn id="4" fill="hold">
+                            <p:stCondLst>
+                              <p:cond delay="0"/>
+                            </p:stCondLst>
+                            <p:childTnLst>
+                              <p:par>
+                                <p:cTn id="5" presetID="10" presetClass="entr" presetSubtype="0" fill="hold" grpId="0" nodeType="clickEffect">
+                                  <p:stCondLst>
+                                    <p:cond delay="0"/>
+                                  </p:stCondLst>
+                                  <p:childTnLst>
+                                    <p:set>
+                                      <p:cBhvr>
+                                        <p:cTn id="6" dur="1" fill="hold">
+                                          <p:stCondLst>
+                                            <p:cond delay="0"/>
+                                          </p:stCondLst>
+                                        </p:cTn>
+                                        <p:tgtEl>
+                                          <p:spTgt spid="3">
+                                            <p:txEl>
+                                              <p:pRg st="0" end="0"/>
+                                            </p:txEl>
+                                          </p:spTgt>
+                                        </p:tgtEl>
+                                        <p:attrNameLst>
+                                          <p:attrName>style.visibility</p:attrName>
+                                        </p:attrNameLst>
+                                      </p:cBhvr>
+                                      <p:to>
+                                        <p:strVal val="visible"/>
+                                      </p:to>
+                                    </p:set>
+                                    <p:animEffect transition="in" filter="fade">
+                                      <p:cBhvr>
+                                        <p:cTn id="7" dur="500"/>
+                                        <p:tgtEl>
+                                          <p:spTgt spid="3">
+                                            <p:txEl>
+                                              <p:pRg st="0" end="0"/>
+                                            </p:txEl>
+                                          </p:spTgt>
+                                        </p:tgtEl>
+                                      </p:cBhvr>
+                                    </p:animEffect>
+                                  </p:childTnLst>
+                                </p:cTn>
+                              </p:par>
+                            </p:childTnLst>
+                          </p:cTn>
+                        </p:par>
+                      </p:childTnLst>
+                    </p:cTn>
+                  </p:par>
+                  <p:par>
+                    <p:cTn id="8" fill="hold">
+                      <p:stCondLst>
+                        <p:cond delay="indefinite"/>
+                      </p:stCondLst>
+                      <p:childTnLst>
+                        <p:par>
+                          <p:cTn id="9" fill="hold">
+                            <p:stCondLst>
+                              <p:cond delay="0"/>
+                            </p:stCondLst>
+                            <p:childTnLst>
+                              <p:par>
+                                <p:cTn id="10" presetID="10" presetClass="entr" presetSubtype="0" fill="hold" grpId="0" nodeType="clickEffect">
+                                  <p:stCondLst>
+                                    <p:cond delay="0"/>
+                                  </p:stCondLst>
+                                  <p:childTnLst>
+                                    <p:set>
+                                      <p:cBhvr>
+                                        <p:cTn id="11" dur="1" fill="hold">
+                                          <p:stCondLst>
+                                            <p:cond delay="0"/>
+                                          </p:stCondLst>
+                                        </p:cTn>
+                                        <p:tgtEl>
+                                          <p:spTgt spid="3">
+                                            <p:txEl>
+                                              <p:pRg st="1" end="1"/>
+                                            </p:txEl>
+                                          </p:spTgt>
+                                        </p:tgtEl>
+                                        <p:attrNameLst>
+                                          <p:attrName>style.visibility</p:attrName>
+                                        </p:attrNameLst>
+                                      </p:cBhvr>
+                                      <p:to>
+                                        <p:strVal val="visible"/>
+                                      </p:to>
+                                    </p:set>
+                                    <p:animEffect transition="in" filter="fade">
+                                      <p:cBhvr>
+                                        <p:cTn id="12" dur="500"/>
+                                        <p:tgtEl>
+                                          <p:spTgt spid="3">
+                                            <p:txEl>
+                                              <p:pRg st="1" end="1"/>
+                                            </p:txEl>
+                                          </p:spTgt>
+                                        </p:tgtEl>
+                                      </p:cBhvr>
+                                    </p:animEffect>
+                                  </p:childTnLst>
+                                </p:cTn>
+                              </p:par>
+                              <p:par>
+                                <p:cTn id="13" presetID="10" presetClass="entr" presetSubtype="0" fill="hold" grpId="0" nodeType="withEffect">
+                                  <p:stCondLst>
+                                    <p:cond delay="0"/>
+                                  </p:stCondLst>
+                                  <p:childTnLst>
+                                    <p:set>
+                                      <p:cBhvr>
+                                        <p:cTn id="14" dur="1" fill="hold">
+                                          <p:stCondLst>
+                                            <p:cond delay="0"/>
+                                          </p:stCondLst>
+                                        </p:cTn>
+                                        <p:tgtEl>
+                                          <p:spTgt spid="3">
+                                            <p:txEl>
+                                              <p:pRg st="2" end="2"/>
+                                            </p:txEl>
+                                          </p:spTgt>
+                                        </p:tgtEl>
+                                        <p:attrNameLst>
+                                          <p:attrName>style.visibility</p:attrName>
+                                        </p:attrNameLst>
+                                      </p:cBhvr>
+                                      <p:to>
+                                        <p:strVal val="visible"/>
+                                      </p:to>
+                                    </p:set>
+                                    <p:animEffect transition="in" filter="fade">
+                                      <p:cBhvr>
+                                        <p:cTn id="15" dur="500"/>
+                                        <p:tgtEl>
+                                          <p:spTgt spid="3">
+                                            <p:txEl>
+                                              <p:pRg st="2" end="2"/>
+                                            </p:txEl>
+                                          </p:spTgt>
+                                        </p:tgtEl>
+                                      </p:cBhvr>
+                                    </p:animEffect>
+                                  </p:childTnLst>
+                                </p:cTn>
+                              </p:par>
+                              <p:par>
+                                <p:cTn id="16" presetID="10" presetClass="entr" presetSubtype="0" fill="hold" grpId="0" nodeType="withEffect">
+                                  <p:stCondLst>
+                                    <p:cond delay="0"/>
+                                  </p:stCondLst>
+                                  <p:childTnLst>
+                                    <p:set>
+                                      <p:cBhvr>
+                                        <p:cTn id="17" dur="1" fill="hold">
+                                          <p:stCondLst>
+                                            <p:cond delay="0"/>
+                                          </p:stCondLst>
+                                        </p:cTn>
+                                        <p:tgtEl>
+                                          <p:spTgt spid="3">
+                                            <p:txEl>
+                                              <p:pRg st="3" end="3"/>
+                                            </p:txEl>
+                                          </p:spTgt>
+                                        </p:tgtEl>
+                                        <p:attrNameLst>
+                                          <p:attrName>style.visibility</p:attrName>
+                                        </p:attrNameLst>
+                                      </p:cBhvr>
+                                      <p:to>
+                                        <p:strVal val="visible"/>
+                                      </p:to>
+                                    </p:set>
+                                    <p:animEffect transition="in" filter="fade">
+                                      <p:cBhvr>
+                                        <p:cTn id="18" dur="500"/>
+                                        <p:tgtEl>
+                                          <p:spTgt spid="3">
+                                            <p:txEl>
+                                              <p:pRg st="3" end="3"/>
+                                            </p:txEl>
+                                          </p:spTgt>
+                                        </p:tgtEl>
+                                      </p:cBhvr>
+                                    </p:animEffect>
+                                  </p:childTnLst>
+                                </p:cTn>
+                              </p:par>
+                            </p:childTnLst>
+                          </p:cTn>
+                        </p:par>
+                      </p:childTnLst>
+                    </p:cTn>
+                  </p:par>
+                  <p:par>
+                    <p:cTn id="19" fill="hold">
+                      <p:stCondLst>
+                        <p:cond delay="indefinite"/>
+                      </p:stCondLst>
+                      <p:childTnLst>
+                        <p:par>
+                          <p:cTn id="20" fill="hold">
+                            <p:stCondLst>
+                              <p:cond delay="0"/>
+                            </p:stCondLst>
+                            <p:childTnLst>
+                              <p:par>
+                                <p:cTn id="21" presetID="10" presetClass="entr" presetSubtype="0" fill="hold" grpId="0" nodeType="clickEffect">
+                                  <p:stCondLst>
+                                    <p:cond delay="0"/>
+                                  </p:stCondLst>
+                                  <p:childTnLst>
+                                    <p:set>
+                                      <p:cBhvr>
+                                        <p:cTn id="22" dur="1" fill="hold">
+                                          <p:stCondLst>
+                                            <p:cond delay="0"/>
+                                          </p:stCondLst>
+                                        </p:cTn>
+                                        <p:tgtEl>
+                                          <p:spTgt spid="3">
+                                            <p:txEl>
+                                              <p:pRg st="4" end="4"/>
+                                            </p:txEl>
+                                          </p:spTgt>
+                                        </p:tgtEl>
+                                        <p:attrNameLst>
+                                          <p:attrName>style.visibility</p:attrName>
+                                        </p:attrNameLst>
+                                      </p:cBhvr>
+                                      <p:to>
+                                        <p:strVal val="visible"/>
+                                      </p:to>
+                                    </p:set>
+                                    <p:animEffect transition="in" filter="fade">
+                                      <p:cBhvr>
+                                        <p:cTn id="23" dur="500"/>
+                                        <p:tgtEl>
+                                          <p:spTgt spid="3">
+                                            <p:txEl>
+                                              <p:pRg st="4" end="4"/>
+                                            </p:txEl>
+                                          </p:spTgt>
+                                        </p:tgtEl>
+                                      </p:cBhvr>
+                                    </p:animEffect>
+                                  </p:childTnLst>
+                                </p:cTn>
+                              </p:par>
+                              <p:par>
+                                <p:cTn id="24" presetID="10" presetClass="entr" presetSubtype="0" fill="hold" grpId="0" nodeType="withEffect">
+                                  <p:stCondLst>
+                                    <p:cond delay="0"/>
+                                  </p:stCondLst>
+                                  <p:childTnLst>
+                                    <p:set>
+                                      <p:cBhvr>
+                                        <p:cTn id="25" dur="1" fill="hold">
+                                          <p:stCondLst>
+                                            <p:cond delay="0"/>
+                                          </p:stCondLst>
+                                        </p:cTn>
+                                        <p:tgtEl>
+                                          <p:spTgt spid="3">
+                                            <p:txEl>
+                                              <p:pRg st="5" end="5"/>
+                                            </p:txEl>
+                                          </p:spTgt>
+                                        </p:tgtEl>
+                                        <p:attrNameLst>
+                                          <p:attrName>style.visibility</p:attrName>
+                                        </p:attrNameLst>
+                                      </p:cBhvr>
+                                      <p:to>
+                                        <p:strVal val="visible"/>
+                                      </p:to>
+                                    </p:set>
+                                    <p:animEffect transition="in" filter="fade">
+                                      <p:cBhvr>
+                                        <p:cTn id="26" dur="500"/>
+                                        <p:tgtEl>
+                                          <p:spTgt spid="3">
+                                            <p:txEl>
+                                              <p:pRg st="5" end="5"/>
+                                            </p:txEl>
+                                          </p:spTgt>
+                                        </p:tgtEl>
+                                      </p:cBhvr>
+                                    </p:animEffect>
+                                  </p:childTnLst>
+                                </p:cTn>
+                              </p:par>
+                              <p:par>
+                                <p:cTn id="27" presetID="10" presetClass="entr" presetSubtype="0" fill="hold" grpId="0" nodeType="withEffect">
+                                  <p:stCondLst>
+                                    <p:cond delay="0"/>
+                                  </p:stCondLst>
+                                  <p:childTnLst>
+                                    <p:set>
+                                      <p:cBhvr>
+                                        <p:cTn id="28" dur="1" fill="hold">
+                                          <p:stCondLst>
+                                            <p:cond delay="0"/>
+                                          </p:stCondLst>
+                                        </p:cTn>
+                                        <p:tgtEl>
+                                          <p:spTgt spid="3">
+                                            <p:txEl>
+                                              <p:pRg st="6" end="6"/>
+                                            </p:txEl>
+                                          </p:spTgt>
+                                        </p:tgtEl>
+                                        <p:attrNameLst>
+                                          <p:attrName>style.visibility</p:attrName>
+                                        </p:attrNameLst>
+                                      </p:cBhvr>
+                                      <p:to>
+                                        <p:strVal val="visible"/>
+                                      </p:to>
+                                    </p:set>
+                                    <p:animEffect transition="in" filter="fade">
+                                      <p:cBhvr>
+                                        <p:cTn id="29" dur="500"/>
+                                        <p:tgtEl>
+                                          <p:spTgt spid="3">
+                                            <p:txEl>
+                                              <p:pRg st="6" end="6"/>
+                                            </p:txEl>
+                                          </p:spTgt>
+                                        </p:tgtEl>
+                                      </p:cBhvr>
+                                    </p:animEffect>
+                                  </p:childTnLst>
+                                </p:cTn>
+                              </p:par>
+                              <p:par>
+                                <p:cTn id="30" presetID="10" presetClass="entr" presetSubtype="0" fill="hold" grpId="0" nodeType="withEffect">
+                                  <p:stCondLst>
+                                    <p:cond delay="0"/>
+                                  </p:stCondLst>
+                                  <p:childTnLst>
+                                    <p:set>
+                                      <p:cBhvr>
+                                        <p:cTn id="31" dur="1" fill="hold">
+                                          <p:stCondLst>
+                                            <p:cond delay="0"/>
+                                          </p:stCondLst>
+                                        </p:cTn>
+                                        <p:tgtEl>
+                                          <p:spTgt spid="3">
+                                            <p:txEl>
+                                              <p:pRg st="7" end="7"/>
+                                            </p:txEl>
+                                          </p:spTgt>
+                                        </p:tgtEl>
+                                        <p:attrNameLst>
+                                          <p:attrName>style.visibility</p:attrName>
+                                        </p:attrNameLst>
+                                      </p:cBhvr>
+                                      <p:to>
+                                        <p:strVal val="visible"/>
+                                      </p:to>
+                                    </p:set>
+                                    <p:animEffect transition="in" filter="fade">
+                                      <p:cBhvr>
+                                        <p:cTn id="32" dur="500"/>
+                                        <p:tgtEl>
+                                          <p:spTgt spid="3">
+                                            <p:txEl>
+                                              <p:pRg st="7" end="7"/>
+                                            </p:txEl>
+                                          </p:spTgt>
+                                        </p:tgtEl>
+                                      </p:cBhvr>
+                                    </p:animEffect>
+                                  </p:childTnLst>
+                                </p:cTn>
+                              </p:par>
+                              <p:par>
+                                <p:cTn id="33" presetID="10" presetClass="entr" presetSubtype="0" fill="hold" grpId="0" nodeType="withEffect">
+                                  <p:stCondLst>
+                                    <p:cond delay="0"/>
+                                  </p:stCondLst>
+                                  <p:childTnLst>
+                                    <p:set>
+                                      <p:cBhvr>
+                                        <p:cTn id="34" dur="1" fill="hold">
+                                          <p:stCondLst>
+                                            <p:cond delay="0"/>
+                                          </p:stCondLst>
+                                        </p:cTn>
+                                        <p:tgtEl>
+                                          <p:spTgt spid="3">
+                                            <p:txEl>
+                                              <p:pRg st="8" end="8"/>
+                                            </p:txEl>
+                                          </p:spTgt>
+                                        </p:tgtEl>
+                                        <p:attrNameLst>
+                                          <p:attrName>style.visibility</p:attrName>
+                                        </p:attrNameLst>
+                                      </p:cBhvr>
+                                      <p:to>
+                                        <p:strVal val="visible"/>
+                                      </p:to>
+                                    </p:set>
+                                    <p:animEffect transition="in" filter="fade">
+                                      <p:cBhvr>
+                                        <p:cTn id="35" dur="500"/>
+                                        <p:tgtEl>
+                                          <p:spTgt spid="3">
+                                            <p:txEl>
+                                              <p:pRg st="8" end="8"/>
+                                            </p:txEl>
+                                          </p:spTgt>
+                                        </p:tgtEl>
+                                      </p:cBhvr>
+                                    </p:animEffect>
+                                  </p:childTnLst>
+                                </p:cTn>
+                              </p:par>
+                              <p:par>
+                                <p:cTn id="36" presetID="10" presetClass="entr" presetSubtype="0" fill="hold" grpId="0" nodeType="withEffect">
+                                  <p:stCondLst>
+                                    <p:cond delay="0"/>
+                                  </p:stCondLst>
+                                  <p:childTnLst>
+                                    <p:set>
+                                      <p:cBhvr>
+                                        <p:cTn id="37" dur="1" fill="hold">
+                                          <p:stCondLst>
+                                            <p:cond delay="0"/>
+                                          </p:stCondLst>
+                                        </p:cTn>
+                                        <p:tgtEl>
+                                          <p:spTgt spid="3">
+                                            <p:txEl>
+                                              <p:pRg st="9" end="9"/>
+                                            </p:txEl>
+                                          </p:spTgt>
+                                        </p:tgtEl>
+                                        <p:attrNameLst>
+                                          <p:attrName>style.visibility</p:attrName>
+                                        </p:attrNameLst>
+                                      </p:cBhvr>
+                                      <p:to>
+                                        <p:strVal val="visible"/>
+                                      </p:to>
+                                    </p:set>
+                                    <p:animEffect transition="in" filter="fade">
+                                      <p:cBhvr>
+                                        <p:cTn id="38" dur="500"/>
+                                        <p:tgtEl>
+                                          <p:spTgt spid="3">
+                                            <p:txEl>
+                                              <p:pRg st="9" end="9"/>
+                                            </p:txEl>
+                                          </p:spTgt>
+                                        </p:tgtEl>
+                                      </p:cBhvr>
+                                    </p:animEffect>
+                                  </p:childTnLst>
+                                </p:cTn>
+                              </p:par>
+                            </p:childTnLst>
+                          </p:cTn>
+                        </p:par>
+                      </p:childTnLst>
+                    </p:cTn>
+                  </p:par>
+                  <p:par>
+                    <p:cTn id="39" fill="hold">
+                      <p:stCondLst>
+                        <p:cond delay="indefinite"/>
+                      </p:stCondLst>
+                      <p:childTnLst>
+                        <p:par>
+                          <p:cTn id="40" fill="hold">
+                            <p:stCondLst>
+                              <p:cond delay="0"/>
+                            </p:stCondLst>
+                            <p:childTnLst>
+                              <p:par>
+                                <p:cTn id="41" presetID="10" presetClass="entr" presetSubtype="0" fill="hold" grpId="0" nodeType="clickEffect">
+                                  <p:stCondLst>
+                                    <p:cond delay="0"/>
+                                  </p:stCondLst>
+                                  <p:childTnLst>
+                                    <p:set>
+                                      <p:cBhvr>
+                                        <p:cTn id="42" dur="1" fill="hold">
+                                          <p:stCondLst>
+                                            <p:cond delay="0"/>
+                                          </p:stCondLst>
+                                        </p:cTn>
+                                        <p:tgtEl>
+                                          <p:spTgt spid="3">
+                                            <p:txEl>
+                                              <p:pRg st="10" end="10"/>
+                                            </p:txEl>
+                                          </p:spTgt>
+                                        </p:tgtEl>
+                                        <p:attrNameLst>
+                                          <p:attrName>style.visibility</p:attrName>
+                                        </p:attrNameLst>
+                                      </p:cBhvr>
+                                      <p:to>
+                                        <p:strVal val="visible"/>
+                                      </p:to>
+                                    </p:set>
+                                    <p:animEffect transition="in" filter="fade">
+                                      <p:cBhvr>
+                                        <p:cTn id="43" dur="500"/>
+                                        <p:tgtEl>
+                                          <p:spTgt spid="3">
+                                            <p:txEl>
+                                              <p:pRg st="10" end="10"/>
+                                            </p:txEl>
+                                          </p:spTgt>
+                                        </p:tgtEl>
+                                      </p:cBhvr>
+                                    </p:animEffect>
+                                  </p:childTnLst>
+                                </p:cTn>
+                              </p:par>
+                              <p:par>
+                                <p:cTn id="44" presetID="10" presetClass="entr" presetSubtype="0" fill="hold" grpId="0" nodeType="withEffect">
+                                  <p:stCondLst>
+                                    <p:cond delay="0"/>
+                                  </p:stCondLst>
+                                  <p:childTnLst>
+                                    <p:set>
+                                      <p:cBhvr>
+                                        <p:cTn id="45" dur="1" fill="hold">
+                                          <p:stCondLst>
+                                            <p:cond delay="0"/>
+                                          </p:stCondLst>
+                                        </p:cTn>
+                                        <p:tgtEl>
+                                          <p:spTgt spid="3">
+                                            <p:txEl>
+                                              <p:pRg st="11" end="11"/>
+                                            </p:txEl>
+                                          </p:spTgt>
+                                        </p:tgtEl>
+                                        <p:attrNameLst>
+                                          <p:attrName>style.visibility</p:attrName>
+                                        </p:attrNameLst>
+                                      </p:cBhvr>
+                                      <p:to>
+                                        <p:strVal val="visible"/>
+                                      </p:to>
+                                    </p:set>
+                                    <p:animEffect transition="in" filter="fade">
+                                      <p:cBhvr>
+                                        <p:cTn id="46" dur="500"/>
+                                        <p:tgtEl>
+                                          <p:spTgt spid="3">
+                                            <p:txEl>
+                                              <p:pRg st="11" end="11"/>
+                                            </p:txEl>
+                                          </p:spTgt>
+                                        </p:tgtEl>
+                                      </p:cBhvr>
+                                    </p:animEffect>
+                                  </p:childTnLst>
+                                </p:cTn>
+                              </p:par>
+                            </p:childTnLst>
+                          </p:cTn>
+                        </p:par>
+                      </p:childTnLst>
+                    </p:cTn>
+                  </p:par>
+                </p:childTnLst>
+              </p:cTn>
+              <p:prevCondLst>
+                <p:cond evt="onPrev" delay="0">
+                  <p:tgtEl>
+                    <p:sldTgt/>
+                  </p:tgtEl>
+                </p:cond>
+              </p:prevCondLst>
+              <p:nextCondLst>
+                <p:cond evt="onNext" delay="0">
+                  <p:tgtEl>
+                    <p:sldTgt/>
+                  </p:tgtEl>
+                </p:cond>
+              </p:nextCondLst>
+            </p:seq>
+          </p:childTnLst>
+        </p:cTn>
+      </p:par>
+    </p:tnLst>
+    <p:bldLst>
+      <p:bldP spid="3" grpId="0" uiExpand="1" build="p"/>
+    </p:bldLst>
+  </p:timing>
+</p:sld>
+</file>
+
+<file path=ppt/slides/slide22.xml><?xml version="1.0" encoding="utf-8"?>
+<p:sld xmlns:a="http://schemas.openxmlformats.org/drawingml/2006/main" xmlns:r="http://schemas.openxmlformats.org/officeDocument/2006/relationships" xmlns:p="http://schemas.openxmlformats.org/presentationml/2006/main">
+  <p:cSld>
+    <p:spTree>
+      <p:nvGrpSpPr>
+        <p:cNvPr id="1" name=""/>
+        <p:cNvGrpSpPr/>
+        <p:nvPr/>
+      </p:nvGrpSpPr>
+      <p:grpSpPr>
+        <a:xfrm>
+          <a:off x="0" y="0"/>
+          <a:ext cx="0" cy="0"/>
+          <a:chOff x="0" y="0"/>
+          <a:chExt cx="0" cy="0"/>
+        </a:xfrm>
+      </p:grpSpPr>
+      <p:sp>
+        <p:nvSpPr>
+          <p:cNvPr id="2" name="Title 1">
+            <a:extLst>
+              <a:ext uri="{FF2B5EF4-FFF2-40B4-BE49-F238E27FC236}">
+                <a16:creationId xmlns:a16="http://schemas.microsoft.com/office/drawing/2014/main" id="{914E8638-DC19-E97C-375D-B98684EA8D96}"/>
+              </a:ext>
+            </a:extLst>
+          </p:cNvPr>
+          <p:cNvSpPr>
+            <a:spLocks noGrp="1"/>
+          </p:cNvSpPr>
+          <p:nvPr>
+            <p:ph type="title"/>
+          </p:nvPr>
+        </p:nvSpPr>
+        <p:spPr/>
+        <p:txBody>
+          <a:bodyPr/>
+          <a:lstStyle/>
+          <a:p>
+            <a:r>
+              <a:rPr lang="en-US" dirty="0"/>
+              <a:t>Unit 3 – Data Binding</a:t>
+            </a:r>
+          </a:p>
+        </p:txBody>
+      </p:sp>
+      <p:sp>
+        <p:nvSpPr>
+          <p:cNvPr id="3" name="Content Placeholder 2">
+            <a:extLst>
+              <a:ext uri="{FF2B5EF4-FFF2-40B4-BE49-F238E27FC236}">
+                <a16:creationId xmlns:a16="http://schemas.microsoft.com/office/drawing/2014/main" id="{9C3B9301-309A-93E1-3CC6-8835BA81C688}"/>
+              </a:ext>
+            </a:extLst>
+          </p:cNvPr>
+          <p:cNvSpPr>
+            <a:spLocks noGrp="1"/>
+          </p:cNvSpPr>
+          <p:nvPr>
+            <p:ph idx="1"/>
+          </p:nvPr>
+        </p:nvSpPr>
+        <p:spPr>
+          <a:xfrm>
+            <a:off x="2589212" y="2133600"/>
+            <a:ext cx="5563386" cy="2357311"/>
+          </a:xfrm>
+        </p:spPr>
+        <p:txBody>
+          <a:bodyPr>
+            <a:normAutofit fontScale="92500" lnSpcReduction="10000"/>
+          </a:bodyPr>
+          <a:lstStyle/>
+          <a:p>
+            <a:r>
+              <a:rPr lang="en-US" dirty="0">
+                <a:solidFill>
+                  <a:schemeClr val="tx1"/>
+                </a:solidFill>
+              </a:rPr>
+              <a:t>Data Binding in action</a:t>
+            </a:r>
+          </a:p>
+          <a:p>
+            <a:pPr lvl="1"/>
+            <a:r>
+              <a:rPr lang="en-US" dirty="0"/>
+              <a:t>Data binding a </a:t>
+            </a:r>
+            <a:r>
+              <a:rPr lang="en-US" dirty="0" err="1"/>
+              <a:t>TextBox</a:t>
+            </a:r>
+            <a:r>
+              <a:rPr lang="en-US" dirty="0"/>
+              <a:t> to a string-based property in the ViewModel</a:t>
+            </a:r>
+          </a:p>
+          <a:p>
+            <a:pPr lvl="1"/>
+            <a:r>
+              <a:rPr lang="en-US" dirty="0"/>
+              <a:t>User enters last name, data bound to </a:t>
+            </a:r>
+            <a:r>
+              <a:rPr lang="en-US" dirty="0" err="1"/>
+              <a:t>LastName</a:t>
+            </a:r>
+            <a:r>
+              <a:rPr lang="en-US" dirty="0"/>
+              <a:t> property</a:t>
+            </a:r>
+          </a:p>
+          <a:p>
+            <a:pPr lvl="2"/>
+            <a:r>
+              <a:rPr lang="en-US" dirty="0"/>
+              <a:t>Two-way binding – getter and setter on C# property</a:t>
+            </a:r>
+          </a:p>
+          <a:p>
+            <a:pPr lvl="2"/>
+            <a:r>
+              <a:rPr lang="en-US" dirty="0"/>
+              <a:t>UI loads – uses getter to read value</a:t>
+            </a:r>
+          </a:p>
+          <a:p>
+            <a:pPr lvl="2"/>
+            <a:r>
+              <a:rPr lang="en-US" dirty="0"/>
+              <a:t>User changes value – setter called</a:t>
+            </a:r>
+          </a:p>
+          <a:p>
+            <a:endParaRPr lang="en-US" dirty="0"/>
+          </a:p>
+        </p:txBody>
+      </p:sp>
+      <p:pic>
+        <p:nvPicPr>
+          <p:cNvPr id="2050" name="Picture 2" descr="First Name: &#10;Last Name: Doe &#10;View &#10;Customer.xaml &#10;O references 1 0 changes I O authors, 0 changes &#10;public string LastName &#10;get =&gt; lastName; &#10;set =&gt; SetVaIueCref lastName , &#10;ViewModel &#10;CustomerViewModeI.cs &#10;value) ; ">
+            <a:extLst>
+              <a:ext uri="{FF2B5EF4-FFF2-40B4-BE49-F238E27FC236}">
+                <a16:creationId xmlns:a16="http://schemas.microsoft.com/office/drawing/2014/main" id="{6926E92F-F7D5-2131-2668-4D303E3C8462}"/>
+              </a:ext>
+            </a:extLst>
+          </p:cNvPr>
+          <p:cNvPicPr>
+            <a:picLocks noChangeAspect="1" noChangeArrowheads="1"/>
+          </p:cNvPicPr>
+          <p:nvPr/>
+        </p:nvPicPr>
+        <p:blipFill>
+          <a:blip r:embed="rId3">
+            <a:extLst>
+              <a:ext uri="{28A0092B-C50C-407E-A947-70E740481C1C}">
+                <a14:useLocalDpi xmlns:a14="http://schemas.microsoft.com/office/drawing/2010/main" val="0"/>
+              </a:ext>
+            </a:extLst>
+          </a:blip>
+          <a:srcRect/>
+          <a:stretch>
+            <a:fillRect/>
+          </a:stretch>
+        </p:blipFill>
+        <p:spPr bwMode="auto">
+          <a:xfrm>
+            <a:off x="2782955" y="4534441"/>
+            <a:ext cx="5282947" cy="1813845"/>
+          </a:xfrm>
+          <a:prstGeom prst="rect">
+            <a:avLst/>
+          </a:prstGeom>
+          <a:noFill/>
+          <a:extLst>
+            <a:ext uri="{909E8E84-426E-40DD-AFC4-6F175D3DCCD1}">
+              <a14:hiddenFill xmlns:a14="http://schemas.microsoft.com/office/drawing/2010/main">
+                <a:solidFill>
+                  <a:srgbClr val="FFFFFF"/>
+                </a:solidFill>
+              </a14:hiddenFill>
+            </a:ext>
+          </a:extLst>
+        </p:spPr>
+      </p:pic>
+    </p:spTree>
+    <p:extLst>
+      <p:ext uri="{BB962C8B-B14F-4D97-AF65-F5344CB8AC3E}">
+        <p14:creationId xmlns:p14="http://schemas.microsoft.com/office/powerpoint/2010/main" val="2523523483"/>
+      </p:ext>
+    </p:extLst>
+  </p:cSld>
+  <p:clrMapOvr>
+    <a:masterClrMapping/>
+  </p:clrMapOvr>
+</p:sld>
+</file>
+
+<file path=ppt/slides/slide23.xml><?xml version="1.0" encoding="utf-8"?>
+<p:sld xmlns:a="http://schemas.openxmlformats.org/drawingml/2006/main" xmlns:r="http://schemas.openxmlformats.org/officeDocument/2006/relationships" xmlns:p="http://schemas.openxmlformats.org/presentationml/2006/main">
+  <p:cSld>
+    <p:spTree>
+      <p:nvGrpSpPr>
+        <p:cNvPr id="1" name=""/>
+        <p:cNvGrpSpPr/>
+        <p:nvPr/>
+      </p:nvGrpSpPr>
+      <p:grpSpPr>
+        <a:xfrm>
+          <a:off x="0" y="0"/>
+          <a:ext cx="0" cy="0"/>
+          <a:chOff x="0" y="0"/>
+          <a:chExt cx="0" cy="0"/>
+        </a:xfrm>
+      </p:grpSpPr>
+      <p:sp>
+        <p:nvSpPr>
+          <p:cNvPr id="2" name="Title 1">
+            <a:extLst>
+              <a:ext uri="{FF2B5EF4-FFF2-40B4-BE49-F238E27FC236}">
+                <a16:creationId xmlns:a16="http://schemas.microsoft.com/office/drawing/2014/main" id="{86FEA3C1-CB00-E4C1-8871-7EC3AD1EBC7B}"/>
+              </a:ext>
+            </a:extLst>
+          </p:cNvPr>
+          <p:cNvSpPr>
+            <a:spLocks noGrp="1"/>
+          </p:cNvSpPr>
+          <p:nvPr>
+            <p:ph type="title"/>
+          </p:nvPr>
+        </p:nvSpPr>
+        <p:spPr/>
+        <p:txBody>
+          <a:bodyPr/>
+          <a:lstStyle/>
+          <a:p>
+            <a:r>
+              <a:rPr lang="en-US" dirty="0"/>
+              <a:t>Unit 3 – Data Binding</a:t>
+            </a:r>
+          </a:p>
+        </p:txBody>
+      </p:sp>
+      <p:sp>
+        <p:nvSpPr>
+          <p:cNvPr id="3" name="Content Placeholder 2">
+            <a:extLst>
+              <a:ext uri="{FF2B5EF4-FFF2-40B4-BE49-F238E27FC236}">
+                <a16:creationId xmlns:a16="http://schemas.microsoft.com/office/drawing/2014/main" id="{44E1EB92-14E0-85C7-4F62-A3A47FF5D10F}"/>
+              </a:ext>
+            </a:extLst>
+          </p:cNvPr>
+          <p:cNvSpPr>
+            <a:spLocks noGrp="1"/>
+          </p:cNvSpPr>
+          <p:nvPr>
+            <p:ph idx="1"/>
+          </p:nvPr>
+        </p:nvSpPr>
+        <p:spPr/>
+        <p:txBody>
+          <a:bodyPr>
+            <a:normAutofit fontScale="77500" lnSpcReduction="20000"/>
+          </a:bodyPr>
+          <a:lstStyle/>
+          <a:p>
+            <a:r>
+              <a:rPr lang="en-US" dirty="0"/>
+              <a:t>Data Binding – How To</a:t>
+            </a:r>
+          </a:p>
+          <a:p>
+            <a:pPr lvl="1"/>
+            <a:r>
+              <a:rPr lang="en-US" dirty="0"/>
+              <a:t>Create ViewModel</a:t>
+            </a:r>
+          </a:p>
+          <a:p>
+            <a:pPr lvl="2"/>
+            <a:r>
+              <a:rPr lang="en-US" dirty="0"/>
+              <a:t>C# class with properties that implements </a:t>
+            </a:r>
+            <a:r>
+              <a:rPr lang="en-US" dirty="0" err="1"/>
+              <a:t>INotifyPropertyChanged</a:t>
+            </a:r>
+            <a:endParaRPr lang="en-US" dirty="0"/>
+          </a:p>
+          <a:p>
+            <a:pPr lvl="2"/>
+            <a:r>
+              <a:rPr lang="en-US" dirty="0" err="1"/>
+              <a:t>INotifyPropertyChanged</a:t>
+            </a:r>
+            <a:r>
+              <a:rPr lang="en-US" dirty="0"/>
+              <a:t> - class fires </a:t>
+            </a:r>
+            <a:r>
+              <a:rPr lang="en-US" dirty="0" err="1"/>
+              <a:t>PropertyChanged</a:t>
+            </a:r>
+            <a:r>
+              <a:rPr lang="en-US" dirty="0"/>
+              <a:t> when a property value changes</a:t>
+            </a:r>
+          </a:p>
+          <a:p>
+            <a:pPr lvl="3"/>
+            <a:r>
+              <a:rPr lang="en-US" dirty="0"/>
+              <a:t>The magic sauce that makes WPF data binding work</a:t>
+            </a:r>
+          </a:p>
+          <a:p>
+            <a:pPr lvl="3"/>
+            <a:r>
+              <a:rPr lang="en-US" dirty="0"/>
+              <a:t>We'll encapsulate in </a:t>
+            </a:r>
+            <a:r>
+              <a:rPr lang="en-US" dirty="0" err="1"/>
+              <a:t>ViewModelBase</a:t>
+            </a:r>
+            <a:r>
+              <a:rPr lang="en-US" dirty="0"/>
+              <a:t> class</a:t>
+            </a:r>
+          </a:p>
+          <a:p>
+            <a:pPr lvl="2"/>
+            <a:r>
+              <a:rPr lang="en-US" dirty="0"/>
+              <a:t>Property for each thing you want to bind to</a:t>
+            </a:r>
+          </a:p>
+          <a:p>
+            <a:pPr lvl="1"/>
+            <a:r>
+              <a:rPr lang="en-US" dirty="0"/>
+              <a:t>Set DataContext for main window</a:t>
+            </a:r>
+          </a:p>
+          <a:p>
+            <a:pPr lvl="2"/>
+            <a:r>
+              <a:rPr lang="en-US" dirty="0"/>
+              <a:t>Do this in code-behind</a:t>
+            </a:r>
+          </a:p>
+          <a:p>
+            <a:pPr lvl="2"/>
+            <a:r>
+              <a:rPr lang="en-US" dirty="0"/>
+              <a:t>Create instance of ViewModel and set top-level Window's DataContext to it</a:t>
+            </a:r>
+          </a:p>
+          <a:p>
+            <a:pPr lvl="1"/>
+            <a:r>
+              <a:rPr lang="en-US" dirty="0"/>
+              <a:t>Create View</a:t>
+            </a:r>
+          </a:p>
+          <a:p>
+            <a:pPr lvl="2"/>
+            <a:r>
+              <a:rPr lang="en-US" dirty="0"/>
+              <a:t>Property on UI element binds to property in ViewModel</a:t>
+            </a:r>
+          </a:p>
+          <a:p>
+            <a:pPr lvl="2"/>
+            <a:r>
+              <a:rPr lang="en-US" dirty="0"/>
+              <a:t>Set </a:t>
+            </a:r>
+            <a:r>
+              <a:rPr lang="en-US" dirty="0" err="1"/>
+              <a:t>UpdateSourceTrigger</a:t>
+            </a:r>
+            <a:r>
+              <a:rPr lang="en-US" dirty="0"/>
+              <a:t>, if necessary</a:t>
+            </a:r>
+          </a:p>
+          <a:p>
+            <a:r>
+              <a:rPr lang="en-US" dirty="0">
+                <a:solidFill>
+                  <a:srgbClr val="00B050"/>
+                </a:solidFill>
+              </a:rPr>
+              <a:t>Example – Data Binding</a:t>
+            </a:r>
+          </a:p>
+        </p:txBody>
+      </p:sp>
+    </p:spTree>
+    <p:extLst>
+      <p:ext uri="{BB962C8B-B14F-4D97-AF65-F5344CB8AC3E}">
+        <p14:creationId xmlns:p14="http://schemas.microsoft.com/office/powerpoint/2010/main" val="3553102706"/>
+      </p:ext>
+    </p:extLst>
+  </p:cSld>
+  <p:clrMapOvr>
+    <a:masterClrMapping/>
+  </p:clrMapOvr>
 </p:sld>
 </file>
 

</xml_diff>

<commit_message>
Add content for Unit 4
</commit_message>
<xml_diff>
--- a/WPF-Workshop-Sexton-Oct2023.pptx
+++ b/WPF-Workshop-Sexton-Oct2023.pptx
@@ -5,7 +5,7 @@
     <p:sldMasterId id="2147483896" r:id="rId1"/>
   </p:sldMasterIdLst>
   <p:notesMasterIdLst>
-    <p:notesMasterId r:id="rId25"/>
+    <p:notesMasterId r:id="rId31"/>
   </p:notesMasterIdLst>
   <p:sldIdLst>
     <p:sldId id="256" r:id="rId2"/>
@@ -31,6 +31,12 @@
     <p:sldId id="277" r:id="rId22"/>
     <p:sldId id="278" r:id="rId23"/>
     <p:sldId id="279" r:id="rId24"/>
+    <p:sldId id="280" r:id="rId25"/>
+    <p:sldId id="281" r:id="rId26"/>
+    <p:sldId id="282" r:id="rId27"/>
+    <p:sldId id="283" r:id="rId28"/>
+    <p:sldId id="284" r:id="rId29"/>
+    <p:sldId id="285" r:id="rId30"/>
   </p:sldIdLst>
   <p:sldSz cx="12192000" cy="6858000"/>
   <p:notesSz cx="6858000" cy="9144000"/>
@@ -2043,6 +2049,479 @@
     <p:extLst>
       <p:ext uri="{BB962C8B-B14F-4D97-AF65-F5344CB8AC3E}">
         <p14:creationId xmlns:p14="http://schemas.microsoft.com/office/powerpoint/2010/main" val="3038833892"/>
+      </p:ext>
+    </p:extLst>
+  </p:cSld>
+  <p:clrMapOvr>
+    <a:masterClrMapping/>
+  </p:clrMapOvr>
+</p:notes>
+</file>
+
+<file path=ppt/notesSlides/notesSlide23.xml><?xml version="1.0" encoding="utf-8"?>
+<p:notes xmlns:a="http://schemas.openxmlformats.org/drawingml/2006/main" xmlns:r="http://schemas.openxmlformats.org/officeDocument/2006/relationships" xmlns:p="http://schemas.openxmlformats.org/presentationml/2006/main">
+  <p:cSld>
+    <p:spTree>
+      <p:nvGrpSpPr>
+        <p:cNvPr id="1" name=""/>
+        <p:cNvGrpSpPr/>
+        <p:nvPr/>
+      </p:nvGrpSpPr>
+      <p:grpSpPr>
+        <a:xfrm>
+          <a:off x="0" y="0"/>
+          <a:ext cx="0" cy="0"/>
+          <a:chOff x="0" y="0"/>
+          <a:chExt cx="0" cy="0"/>
+        </a:xfrm>
+      </p:grpSpPr>
+      <p:sp>
+        <p:nvSpPr>
+          <p:cNvPr id="2" name="Slide Image Placeholder 1"/>
+          <p:cNvSpPr>
+            <a:spLocks noGrp="1" noRot="1" noChangeAspect="1"/>
+          </p:cNvSpPr>
+          <p:nvPr>
+            <p:ph type="sldImg"/>
+          </p:nvPr>
+        </p:nvSpPr>
+        <p:spPr/>
+      </p:sp>
+      <p:sp>
+        <p:nvSpPr>
+          <p:cNvPr id="3" name="Notes Placeholder 2"/>
+          <p:cNvSpPr>
+            <a:spLocks noGrp="1"/>
+          </p:cNvSpPr>
+          <p:nvPr>
+            <p:ph type="body" idx="1"/>
+          </p:nvPr>
+        </p:nvSpPr>
+        <p:spPr/>
+        <p:txBody>
+          <a:bodyPr/>
+          <a:lstStyle/>
+          <a:p>
+            <a:pPr rtl="0" fontAlgn="ctr">
+              <a:spcBef>
+                <a:spcPts val="0"/>
+              </a:spcBef>
+              <a:spcAft>
+                <a:spcPts val="0"/>
+              </a:spcAft>
+              <a:buFont typeface="Arial" panose="020B0604020202020204" pitchFamily="34" charset="0"/>
+              <a:buNone/>
+            </a:pPr>
+            <a:r>
+              <a:rPr lang="en-US" sz="1800" i="1" dirty="0">
+                <a:effectLst/>
+                <a:latin typeface="Calibri" panose="020F0502020204030204" pitchFamily="34" charset="0"/>
+              </a:rPr>
+              <a:t>- Recall that everything in WPF is rendered through a graphics engine</a:t>
+            </a:r>
+            <a:endParaRPr lang="en-US" sz="1800" dirty="0">
+              <a:effectLst/>
+              <a:latin typeface="Calibri" panose="020F0502020204030204" pitchFamily="34" charset="0"/>
+            </a:endParaRPr>
+          </a:p>
+          <a:p>
+            <a:pPr rtl="0" fontAlgn="ctr">
+              <a:spcBef>
+                <a:spcPts val="0"/>
+              </a:spcBef>
+              <a:spcAft>
+                <a:spcPts val="0"/>
+              </a:spcAft>
+              <a:buFont typeface="Arial" panose="020B0604020202020204" pitchFamily="34" charset="0"/>
+              <a:buNone/>
+            </a:pPr>
+            <a:r>
+              <a:rPr lang="en-US" sz="1800" i="1" dirty="0">
+                <a:effectLst/>
+                <a:latin typeface="Calibri" panose="020F0502020204030204" pitchFamily="34" charset="0"/>
+              </a:rPr>
+              <a:t>- This means that everything runs through standard 2D graphics transforms</a:t>
+            </a:r>
+            <a:endParaRPr lang="en-US" sz="1800" dirty="0">
+              <a:effectLst/>
+              <a:latin typeface="Calibri" panose="020F0502020204030204" pitchFamily="34" charset="0"/>
+            </a:endParaRPr>
+          </a:p>
+          <a:p>
+            <a:pPr rtl="0" fontAlgn="ctr">
+              <a:spcBef>
+                <a:spcPts val="0"/>
+              </a:spcBef>
+              <a:spcAft>
+                <a:spcPts val="0"/>
+              </a:spcAft>
+              <a:buFont typeface="Arial" panose="020B0604020202020204" pitchFamily="34" charset="0"/>
+              <a:buNone/>
+            </a:pPr>
+            <a:r>
+              <a:rPr lang="en-US" sz="1800" i="1" dirty="0">
+                <a:effectLst/>
+                <a:latin typeface="Calibri" panose="020F0502020204030204" pitchFamily="34" charset="0"/>
+              </a:rPr>
+              <a:t>- So we can hook up to those transforms and use data binding to control them</a:t>
+            </a:r>
+            <a:endParaRPr lang="en-US" sz="1800" dirty="0">
+              <a:effectLst/>
+              <a:latin typeface="Calibri" panose="020F0502020204030204" pitchFamily="34" charset="0"/>
+            </a:endParaRPr>
+          </a:p>
+          <a:p>
+            <a:pPr rtl="0" fontAlgn="ctr">
+              <a:spcBef>
+                <a:spcPts val="0"/>
+              </a:spcBef>
+              <a:spcAft>
+                <a:spcPts val="0"/>
+              </a:spcAft>
+              <a:buFont typeface="Arial" panose="020B0604020202020204" pitchFamily="34" charset="0"/>
+              <a:buNone/>
+            </a:pPr>
+            <a:r>
+              <a:rPr lang="en-US" sz="1800" i="1" dirty="0">
+                <a:effectLst/>
+                <a:latin typeface="Calibri" panose="020F0502020204030204" pitchFamily="34" charset="0"/>
+              </a:rPr>
+              <a:t>- Perhaps a little silly; but the point is that we can bind to anything and how easy things are to wire up; this took just five minutes to create</a:t>
+            </a:r>
+            <a:endParaRPr lang="en-US" sz="1800" dirty="0">
+              <a:effectLst/>
+              <a:latin typeface="Calibri" panose="020F0502020204030204" pitchFamily="34" charset="0"/>
+            </a:endParaRPr>
+          </a:p>
+          <a:p>
+            <a:endParaRPr lang="en-US" dirty="0"/>
+          </a:p>
+        </p:txBody>
+      </p:sp>
+      <p:sp>
+        <p:nvSpPr>
+          <p:cNvPr id="4" name="Slide Number Placeholder 3"/>
+          <p:cNvSpPr>
+            <a:spLocks noGrp="1"/>
+          </p:cNvSpPr>
+          <p:nvPr>
+            <p:ph type="sldNum" sz="quarter" idx="5"/>
+          </p:nvPr>
+        </p:nvSpPr>
+        <p:spPr/>
+        <p:txBody>
+          <a:bodyPr/>
+          <a:lstStyle/>
+          <a:p>
+            <a:fld id="{52D86A8A-0D3B-4DD1-BCA4-15D29761E8A6}" type="slidenum">
+              <a:rPr lang="en-US" smtClean="0"/>
+              <a:t>26</a:t>
+            </a:fld>
+            <a:endParaRPr lang="en-US"/>
+          </a:p>
+        </p:txBody>
+      </p:sp>
+    </p:spTree>
+    <p:extLst>
+      <p:ext uri="{BB962C8B-B14F-4D97-AF65-F5344CB8AC3E}">
+        <p14:creationId xmlns:p14="http://schemas.microsoft.com/office/powerpoint/2010/main" val="94611158"/>
+      </p:ext>
+    </p:extLst>
+  </p:cSld>
+  <p:clrMapOvr>
+    <a:masterClrMapping/>
+  </p:clrMapOvr>
+</p:notes>
+</file>
+
+<file path=ppt/notesSlides/notesSlide24.xml><?xml version="1.0" encoding="utf-8"?>
+<p:notes xmlns:a="http://schemas.openxmlformats.org/drawingml/2006/main" xmlns:r="http://schemas.openxmlformats.org/officeDocument/2006/relationships" xmlns:p="http://schemas.openxmlformats.org/presentationml/2006/main">
+  <p:cSld>
+    <p:spTree>
+      <p:nvGrpSpPr>
+        <p:cNvPr id="1" name=""/>
+        <p:cNvGrpSpPr/>
+        <p:nvPr/>
+      </p:nvGrpSpPr>
+      <p:grpSpPr>
+        <a:xfrm>
+          <a:off x="0" y="0"/>
+          <a:ext cx="0" cy="0"/>
+          <a:chOff x="0" y="0"/>
+          <a:chExt cx="0" cy="0"/>
+        </a:xfrm>
+      </p:grpSpPr>
+      <p:sp>
+        <p:nvSpPr>
+          <p:cNvPr id="2" name="Slide Image Placeholder 1"/>
+          <p:cNvSpPr>
+            <a:spLocks noGrp="1" noRot="1" noChangeAspect="1"/>
+          </p:cNvSpPr>
+          <p:nvPr>
+            <p:ph type="sldImg"/>
+          </p:nvPr>
+        </p:nvSpPr>
+        <p:spPr/>
+      </p:sp>
+      <p:sp>
+        <p:nvSpPr>
+          <p:cNvPr id="3" name="Notes Placeholder 2"/>
+          <p:cNvSpPr>
+            <a:spLocks noGrp="1"/>
+          </p:cNvSpPr>
+          <p:nvPr>
+            <p:ph type="body" idx="1"/>
+          </p:nvPr>
+        </p:nvSpPr>
+        <p:spPr/>
+        <p:txBody>
+          <a:bodyPr/>
+          <a:lstStyle/>
+          <a:p>
+            <a:r>
+              <a:rPr lang="en-US" dirty="0"/>
+              <a:t>LAST: Example</a:t>
+            </a:r>
+          </a:p>
+          <a:p>
+            <a:pPr marL="0" marR="0" lvl="0" indent="0" algn="l" defTabSz="914400" rtl="0" eaLnBrk="1" fontAlgn="auto" latinLnBrk="0" hangingPunct="1">
+              <a:lnSpc>
+                <a:spcPct val="100000"/>
+              </a:lnSpc>
+              <a:spcBef>
+                <a:spcPts val="0"/>
+              </a:spcBef>
+              <a:spcAft>
+                <a:spcPts val="0"/>
+              </a:spcAft>
+              <a:buClrTx/>
+              <a:buSzTx/>
+              <a:buFontTx/>
+              <a:buNone/>
+              <a:tabLst/>
+              <a:defRPr/>
+            </a:pPr>
+            <a:r>
+              <a:rPr lang="en-US" i="0" dirty="0"/>
+              <a:t>- </a:t>
+            </a:r>
+            <a:r>
+              <a:rPr lang="en-US" sz="1800" i="0" dirty="0">
+                <a:effectLst/>
+                <a:latin typeface="Calibri" panose="020F0502020204030204" pitchFamily="34" charset="0"/>
+              </a:rPr>
+              <a:t>Show ViewModel, View, then run</a:t>
+            </a:r>
+          </a:p>
+          <a:p>
+            <a:endParaRPr lang="en-US" dirty="0"/>
+          </a:p>
+        </p:txBody>
+      </p:sp>
+      <p:sp>
+        <p:nvSpPr>
+          <p:cNvPr id="4" name="Slide Number Placeholder 3"/>
+          <p:cNvSpPr>
+            <a:spLocks noGrp="1"/>
+          </p:cNvSpPr>
+          <p:nvPr>
+            <p:ph type="sldNum" sz="quarter" idx="5"/>
+          </p:nvPr>
+        </p:nvSpPr>
+        <p:spPr/>
+        <p:txBody>
+          <a:bodyPr/>
+          <a:lstStyle/>
+          <a:p>
+            <a:fld id="{52D86A8A-0D3B-4DD1-BCA4-15D29761E8A6}" type="slidenum">
+              <a:rPr lang="en-US" smtClean="0"/>
+              <a:t>27</a:t>
+            </a:fld>
+            <a:endParaRPr lang="en-US"/>
+          </a:p>
+        </p:txBody>
+      </p:sp>
+    </p:spTree>
+    <p:extLst>
+      <p:ext uri="{BB962C8B-B14F-4D97-AF65-F5344CB8AC3E}">
+        <p14:creationId xmlns:p14="http://schemas.microsoft.com/office/powerpoint/2010/main" val="531610119"/>
+      </p:ext>
+    </p:extLst>
+  </p:cSld>
+  <p:clrMapOvr>
+    <a:masterClrMapping/>
+  </p:clrMapOvr>
+</p:notes>
+</file>
+
+<file path=ppt/notesSlides/notesSlide25.xml><?xml version="1.0" encoding="utf-8"?>
+<p:notes xmlns:a="http://schemas.openxmlformats.org/drawingml/2006/main" xmlns:r="http://schemas.openxmlformats.org/officeDocument/2006/relationships" xmlns:p="http://schemas.openxmlformats.org/presentationml/2006/main">
+  <p:cSld>
+    <p:spTree>
+      <p:nvGrpSpPr>
+        <p:cNvPr id="1" name=""/>
+        <p:cNvGrpSpPr/>
+        <p:nvPr/>
+      </p:nvGrpSpPr>
+      <p:grpSpPr>
+        <a:xfrm>
+          <a:off x="0" y="0"/>
+          <a:ext cx="0" cy="0"/>
+          <a:chOff x="0" y="0"/>
+          <a:chExt cx="0" cy="0"/>
+        </a:xfrm>
+      </p:grpSpPr>
+      <p:sp>
+        <p:nvSpPr>
+          <p:cNvPr id="2" name="Slide Image Placeholder 1"/>
+          <p:cNvSpPr>
+            <a:spLocks noGrp="1" noRot="1" noChangeAspect="1"/>
+          </p:cNvSpPr>
+          <p:nvPr>
+            <p:ph type="sldImg"/>
+          </p:nvPr>
+        </p:nvSpPr>
+        <p:spPr/>
+      </p:sp>
+      <p:sp>
+        <p:nvSpPr>
+          <p:cNvPr id="3" name="Notes Placeholder 2"/>
+          <p:cNvSpPr>
+            <a:spLocks noGrp="1"/>
+          </p:cNvSpPr>
+          <p:nvPr>
+            <p:ph type="body" idx="1"/>
+          </p:nvPr>
+        </p:nvSpPr>
+        <p:spPr/>
+        <p:txBody>
+          <a:bodyPr/>
+          <a:lstStyle/>
+          <a:p>
+            <a:r>
+              <a:rPr lang="en-US" dirty="0"/>
+              <a:t>LAST: Example</a:t>
+            </a:r>
+          </a:p>
+          <a:p>
+            <a:r>
+              <a:rPr lang="en-US" dirty="0"/>
+              <a:t>- Show example 3 -- ViewModel, View, runtime</a:t>
+            </a:r>
+          </a:p>
+        </p:txBody>
+      </p:sp>
+      <p:sp>
+        <p:nvSpPr>
+          <p:cNvPr id="4" name="Slide Number Placeholder 3"/>
+          <p:cNvSpPr>
+            <a:spLocks noGrp="1"/>
+          </p:cNvSpPr>
+          <p:nvPr>
+            <p:ph type="sldNum" sz="quarter" idx="5"/>
+          </p:nvPr>
+        </p:nvSpPr>
+        <p:spPr/>
+        <p:txBody>
+          <a:bodyPr/>
+          <a:lstStyle/>
+          <a:p>
+            <a:fld id="{52D86A8A-0D3B-4DD1-BCA4-15D29761E8A6}" type="slidenum">
+              <a:rPr lang="en-US" smtClean="0"/>
+              <a:t>28</a:t>
+            </a:fld>
+            <a:endParaRPr lang="en-US"/>
+          </a:p>
+        </p:txBody>
+      </p:sp>
+    </p:spTree>
+    <p:extLst>
+      <p:ext uri="{BB962C8B-B14F-4D97-AF65-F5344CB8AC3E}">
+        <p14:creationId xmlns:p14="http://schemas.microsoft.com/office/powerpoint/2010/main" val="507816259"/>
+      </p:ext>
+    </p:extLst>
+  </p:cSld>
+  <p:clrMapOvr>
+    <a:masterClrMapping/>
+  </p:clrMapOvr>
+</p:notes>
+</file>
+
+<file path=ppt/notesSlides/notesSlide26.xml><?xml version="1.0" encoding="utf-8"?>
+<p:notes xmlns:a="http://schemas.openxmlformats.org/drawingml/2006/main" xmlns:r="http://schemas.openxmlformats.org/officeDocument/2006/relationships" xmlns:p="http://schemas.openxmlformats.org/presentationml/2006/main">
+  <p:cSld>
+    <p:spTree>
+      <p:nvGrpSpPr>
+        <p:cNvPr id="1" name=""/>
+        <p:cNvGrpSpPr/>
+        <p:nvPr/>
+      </p:nvGrpSpPr>
+      <p:grpSpPr>
+        <a:xfrm>
+          <a:off x="0" y="0"/>
+          <a:ext cx="0" cy="0"/>
+          <a:chOff x="0" y="0"/>
+          <a:chExt cx="0" cy="0"/>
+        </a:xfrm>
+      </p:grpSpPr>
+      <p:sp>
+        <p:nvSpPr>
+          <p:cNvPr id="2" name="Slide Image Placeholder 1"/>
+          <p:cNvSpPr>
+            <a:spLocks noGrp="1" noRot="1" noChangeAspect="1"/>
+          </p:cNvSpPr>
+          <p:nvPr>
+            <p:ph type="sldImg"/>
+          </p:nvPr>
+        </p:nvSpPr>
+        <p:spPr/>
+      </p:sp>
+      <p:sp>
+        <p:nvSpPr>
+          <p:cNvPr id="3" name="Notes Placeholder 2"/>
+          <p:cNvSpPr>
+            <a:spLocks noGrp="1"/>
+          </p:cNvSpPr>
+          <p:nvPr>
+            <p:ph type="body" idx="1"/>
+          </p:nvPr>
+        </p:nvSpPr>
+        <p:spPr/>
+        <p:txBody>
+          <a:bodyPr/>
+          <a:lstStyle/>
+          <a:p>
+            <a:endParaRPr lang="en-US" dirty="0"/>
+          </a:p>
+        </p:txBody>
+      </p:sp>
+      <p:sp>
+        <p:nvSpPr>
+          <p:cNvPr id="4" name="Slide Number Placeholder 3"/>
+          <p:cNvSpPr>
+            <a:spLocks noGrp="1"/>
+          </p:cNvSpPr>
+          <p:nvPr>
+            <p:ph type="sldNum" sz="quarter" idx="5"/>
+          </p:nvPr>
+        </p:nvSpPr>
+        <p:spPr/>
+        <p:txBody>
+          <a:bodyPr/>
+          <a:lstStyle/>
+          <a:p>
+            <a:fld id="{52D86A8A-0D3B-4DD1-BCA4-15D29761E8A6}" type="slidenum">
+              <a:rPr lang="en-US" smtClean="0"/>
+              <a:t>29</a:t>
+            </a:fld>
+            <a:endParaRPr lang="en-US"/>
+          </a:p>
+        </p:txBody>
+      </p:sp>
+    </p:spTree>
+    <p:extLst>
+      <p:ext uri="{BB962C8B-B14F-4D97-AF65-F5344CB8AC3E}">
+        <p14:creationId xmlns:p14="http://schemas.microsoft.com/office/powerpoint/2010/main" val="1154638772"/>
       </p:ext>
     </p:extLst>
   </p:cSld>
@@ -17265,6 +17744,2705 @@
   <p:clrMapOvr>
     <a:masterClrMapping/>
   </p:clrMapOvr>
+  <p:timing>
+    <p:tnLst>
+      <p:par>
+        <p:cTn id="1" dur="indefinite" restart="never" nodeType="tmRoot">
+          <p:childTnLst>
+            <p:seq concurrent="1" nextAc="seek">
+              <p:cTn id="2" dur="indefinite" nodeType="mainSeq">
+                <p:childTnLst>
+                  <p:par>
+                    <p:cTn id="3" fill="hold">
+                      <p:stCondLst>
+                        <p:cond delay="indefinite"/>
+                      </p:stCondLst>
+                      <p:childTnLst>
+                        <p:par>
+                          <p:cTn id="4" fill="hold">
+                            <p:stCondLst>
+                              <p:cond delay="0"/>
+                            </p:stCondLst>
+                            <p:childTnLst>
+                              <p:par>
+                                <p:cTn id="5" presetID="10" presetClass="entr" presetSubtype="0" fill="hold" grpId="0" nodeType="clickEffect">
+                                  <p:stCondLst>
+                                    <p:cond delay="0"/>
+                                  </p:stCondLst>
+                                  <p:childTnLst>
+                                    <p:set>
+                                      <p:cBhvr>
+                                        <p:cTn id="6" dur="1" fill="hold">
+                                          <p:stCondLst>
+                                            <p:cond delay="0"/>
+                                          </p:stCondLst>
+                                        </p:cTn>
+                                        <p:tgtEl>
+                                          <p:spTgt spid="3">
+                                            <p:txEl>
+                                              <p:pRg st="0" end="0"/>
+                                            </p:txEl>
+                                          </p:spTgt>
+                                        </p:tgtEl>
+                                        <p:attrNameLst>
+                                          <p:attrName>style.visibility</p:attrName>
+                                        </p:attrNameLst>
+                                      </p:cBhvr>
+                                      <p:to>
+                                        <p:strVal val="visible"/>
+                                      </p:to>
+                                    </p:set>
+                                    <p:animEffect transition="in" filter="fade">
+                                      <p:cBhvr>
+                                        <p:cTn id="7" dur="500"/>
+                                        <p:tgtEl>
+                                          <p:spTgt spid="3">
+                                            <p:txEl>
+                                              <p:pRg st="0" end="0"/>
+                                            </p:txEl>
+                                          </p:spTgt>
+                                        </p:tgtEl>
+                                      </p:cBhvr>
+                                    </p:animEffect>
+                                  </p:childTnLst>
+                                </p:cTn>
+                              </p:par>
+                            </p:childTnLst>
+                          </p:cTn>
+                        </p:par>
+                      </p:childTnLst>
+                    </p:cTn>
+                  </p:par>
+                  <p:par>
+                    <p:cTn id="8" fill="hold">
+                      <p:stCondLst>
+                        <p:cond delay="indefinite"/>
+                      </p:stCondLst>
+                      <p:childTnLst>
+                        <p:par>
+                          <p:cTn id="9" fill="hold">
+                            <p:stCondLst>
+                              <p:cond delay="0"/>
+                            </p:stCondLst>
+                            <p:childTnLst>
+                              <p:par>
+                                <p:cTn id="10" presetID="10" presetClass="entr" presetSubtype="0" fill="hold" grpId="0" nodeType="clickEffect">
+                                  <p:stCondLst>
+                                    <p:cond delay="0"/>
+                                  </p:stCondLst>
+                                  <p:childTnLst>
+                                    <p:set>
+                                      <p:cBhvr>
+                                        <p:cTn id="11" dur="1" fill="hold">
+                                          <p:stCondLst>
+                                            <p:cond delay="0"/>
+                                          </p:stCondLst>
+                                        </p:cTn>
+                                        <p:tgtEl>
+                                          <p:spTgt spid="3">
+                                            <p:txEl>
+                                              <p:pRg st="1" end="1"/>
+                                            </p:txEl>
+                                          </p:spTgt>
+                                        </p:tgtEl>
+                                        <p:attrNameLst>
+                                          <p:attrName>style.visibility</p:attrName>
+                                        </p:attrNameLst>
+                                      </p:cBhvr>
+                                      <p:to>
+                                        <p:strVal val="visible"/>
+                                      </p:to>
+                                    </p:set>
+                                    <p:animEffect transition="in" filter="fade">
+                                      <p:cBhvr>
+                                        <p:cTn id="12" dur="500"/>
+                                        <p:tgtEl>
+                                          <p:spTgt spid="3">
+                                            <p:txEl>
+                                              <p:pRg st="1" end="1"/>
+                                            </p:txEl>
+                                          </p:spTgt>
+                                        </p:tgtEl>
+                                      </p:cBhvr>
+                                    </p:animEffect>
+                                  </p:childTnLst>
+                                </p:cTn>
+                              </p:par>
+                              <p:par>
+                                <p:cTn id="13" presetID="10" presetClass="entr" presetSubtype="0" fill="hold" grpId="0" nodeType="withEffect">
+                                  <p:stCondLst>
+                                    <p:cond delay="0"/>
+                                  </p:stCondLst>
+                                  <p:childTnLst>
+                                    <p:set>
+                                      <p:cBhvr>
+                                        <p:cTn id="14" dur="1" fill="hold">
+                                          <p:stCondLst>
+                                            <p:cond delay="0"/>
+                                          </p:stCondLst>
+                                        </p:cTn>
+                                        <p:tgtEl>
+                                          <p:spTgt spid="3">
+                                            <p:txEl>
+                                              <p:pRg st="2" end="2"/>
+                                            </p:txEl>
+                                          </p:spTgt>
+                                        </p:tgtEl>
+                                        <p:attrNameLst>
+                                          <p:attrName>style.visibility</p:attrName>
+                                        </p:attrNameLst>
+                                      </p:cBhvr>
+                                      <p:to>
+                                        <p:strVal val="visible"/>
+                                      </p:to>
+                                    </p:set>
+                                    <p:animEffect transition="in" filter="fade">
+                                      <p:cBhvr>
+                                        <p:cTn id="15" dur="500"/>
+                                        <p:tgtEl>
+                                          <p:spTgt spid="3">
+                                            <p:txEl>
+                                              <p:pRg st="2" end="2"/>
+                                            </p:txEl>
+                                          </p:spTgt>
+                                        </p:tgtEl>
+                                      </p:cBhvr>
+                                    </p:animEffect>
+                                  </p:childTnLst>
+                                </p:cTn>
+                              </p:par>
+                              <p:par>
+                                <p:cTn id="16" presetID="10" presetClass="entr" presetSubtype="0" fill="hold" grpId="0" nodeType="withEffect">
+                                  <p:stCondLst>
+                                    <p:cond delay="0"/>
+                                  </p:stCondLst>
+                                  <p:childTnLst>
+                                    <p:set>
+                                      <p:cBhvr>
+                                        <p:cTn id="17" dur="1" fill="hold">
+                                          <p:stCondLst>
+                                            <p:cond delay="0"/>
+                                          </p:stCondLst>
+                                        </p:cTn>
+                                        <p:tgtEl>
+                                          <p:spTgt spid="3">
+                                            <p:txEl>
+                                              <p:pRg st="3" end="3"/>
+                                            </p:txEl>
+                                          </p:spTgt>
+                                        </p:tgtEl>
+                                        <p:attrNameLst>
+                                          <p:attrName>style.visibility</p:attrName>
+                                        </p:attrNameLst>
+                                      </p:cBhvr>
+                                      <p:to>
+                                        <p:strVal val="visible"/>
+                                      </p:to>
+                                    </p:set>
+                                    <p:animEffect transition="in" filter="fade">
+                                      <p:cBhvr>
+                                        <p:cTn id="18" dur="500"/>
+                                        <p:tgtEl>
+                                          <p:spTgt spid="3">
+                                            <p:txEl>
+                                              <p:pRg st="3" end="3"/>
+                                            </p:txEl>
+                                          </p:spTgt>
+                                        </p:tgtEl>
+                                      </p:cBhvr>
+                                    </p:animEffect>
+                                  </p:childTnLst>
+                                </p:cTn>
+                              </p:par>
+                              <p:par>
+                                <p:cTn id="19" presetID="10" presetClass="entr" presetSubtype="0" fill="hold" grpId="0" nodeType="withEffect">
+                                  <p:stCondLst>
+                                    <p:cond delay="0"/>
+                                  </p:stCondLst>
+                                  <p:childTnLst>
+                                    <p:set>
+                                      <p:cBhvr>
+                                        <p:cTn id="20" dur="1" fill="hold">
+                                          <p:stCondLst>
+                                            <p:cond delay="0"/>
+                                          </p:stCondLst>
+                                        </p:cTn>
+                                        <p:tgtEl>
+                                          <p:spTgt spid="3">
+                                            <p:txEl>
+                                              <p:pRg st="4" end="4"/>
+                                            </p:txEl>
+                                          </p:spTgt>
+                                        </p:tgtEl>
+                                        <p:attrNameLst>
+                                          <p:attrName>style.visibility</p:attrName>
+                                        </p:attrNameLst>
+                                      </p:cBhvr>
+                                      <p:to>
+                                        <p:strVal val="visible"/>
+                                      </p:to>
+                                    </p:set>
+                                    <p:animEffect transition="in" filter="fade">
+                                      <p:cBhvr>
+                                        <p:cTn id="21" dur="500"/>
+                                        <p:tgtEl>
+                                          <p:spTgt spid="3">
+                                            <p:txEl>
+                                              <p:pRg st="4" end="4"/>
+                                            </p:txEl>
+                                          </p:spTgt>
+                                        </p:tgtEl>
+                                      </p:cBhvr>
+                                    </p:animEffect>
+                                  </p:childTnLst>
+                                </p:cTn>
+                              </p:par>
+                              <p:par>
+                                <p:cTn id="22" presetID="10" presetClass="entr" presetSubtype="0" fill="hold" grpId="0" nodeType="withEffect">
+                                  <p:stCondLst>
+                                    <p:cond delay="0"/>
+                                  </p:stCondLst>
+                                  <p:childTnLst>
+                                    <p:set>
+                                      <p:cBhvr>
+                                        <p:cTn id="23" dur="1" fill="hold">
+                                          <p:stCondLst>
+                                            <p:cond delay="0"/>
+                                          </p:stCondLst>
+                                        </p:cTn>
+                                        <p:tgtEl>
+                                          <p:spTgt spid="3">
+                                            <p:txEl>
+                                              <p:pRg st="5" end="5"/>
+                                            </p:txEl>
+                                          </p:spTgt>
+                                        </p:tgtEl>
+                                        <p:attrNameLst>
+                                          <p:attrName>style.visibility</p:attrName>
+                                        </p:attrNameLst>
+                                      </p:cBhvr>
+                                      <p:to>
+                                        <p:strVal val="visible"/>
+                                      </p:to>
+                                    </p:set>
+                                    <p:animEffect transition="in" filter="fade">
+                                      <p:cBhvr>
+                                        <p:cTn id="24" dur="500"/>
+                                        <p:tgtEl>
+                                          <p:spTgt spid="3">
+                                            <p:txEl>
+                                              <p:pRg st="5" end="5"/>
+                                            </p:txEl>
+                                          </p:spTgt>
+                                        </p:tgtEl>
+                                      </p:cBhvr>
+                                    </p:animEffect>
+                                  </p:childTnLst>
+                                </p:cTn>
+                              </p:par>
+                              <p:par>
+                                <p:cTn id="25" presetID="10" presetClass="entr" presetSubtype="0" fill="hold" grpId="0" nodeType="withEffect">
+                                  <p:stCondLst>
+                                    <p:cond delay="0"/>
+                                  </p:stCondLst>
+                                  <p:childTnLst>
+                                    <p:set>
+                                      <p:cBhvr>
+                                        <p:cTn id="26" dur="1" fill="hold">
+                                          <p:stCondLst>
+                                            <p:cond delay="0"/>
+                                          </p:stCondLst>
+                                        </p:cTn>
+                                        <p:tgtEl>
+                                          <p:spTgt spid="3">
+                                            <p:txEl>
+                                              <p:pRg st="6" end="6"/>
+                                            </p:txEl>
+                                          </p:spTgt>
+                                        </p:tgtEl>
+                                        <p:attrNameLst>
+                                          <p:attrName>style.visibility</p:attrName>
+                                        </p:attrNameLst>
+                                      </p:cBhvr>
+                                      <p:to>
+                                        <p:strVal val="visible"/>
+                                      </p:to>
+                                    </p:set>
+                                    <p:animEffect transition="in" filter="fade">
+                                      <p:cBhvr>
+                                        <p:cTn id="27" dur="500"/>
+                                        <p:tgtEl>
+                                          <p:spTgt spid="3">
+                                            <p:txEl>
+                                              <p:pRg st="6" end="6"/>
+                                            </p:txEl>
+                                          </p:spTgt>
+                                        </p:tgtEl>
+                                      </p:cBhvr>
+                                    </p:animEffect>
+                                  </p:childTnLst>
+                                </p:cTn>
+                              </p:par>
+                            </p:childTnLst>
+                          </p:cTn>
+                        </p:par>
+                      </p:childTnLst>
+                    </p:cTn>
+                  </p:par>
+                  <p:par>
+                    <p:cTn id="28" fill="hold">
+                      <p:stCondLst>
+                        <p:cond delay="indefinite"/>
+                      </p:stCondLst>
+                      <p:childTnLst>
+                        <p:par>
+                          <p:cTn id="29" fill="hold">
+                            <p:stCondLst>
+                              <p:cond delay="0"/>
+                            </p:stCondLst>
+                            <p:childTnLst>
+                              <p:par>
+                                <p:cTn id="30" presetID="10" presetClass="entr" presetSubtype="0" fill="hold" grpId="0" nodeType="clickEffect">
+                                  <p:stCondLst>
+                                    <p:cond delay="0"/>
+                                  </p:stCondLst>
+                                  <p:childTnLst>
+                                    <p:set>
+                                      <p:cBhvr>
+                                        <p:cTn id="31" dur="1" fill="hold">
+                                          <p:stCondLst>
+                                            <p:cond delay="0"/>
+                                          </p:stCondLst>
+                                        </p:cTn>
+                                        <p:tgtEl>
+                                          <p:spTgt spid="3">
+                                            <p:txEl>
+                                              <p:pRg st="7" end="7"/>
+                                            </p:txEl>
+                                          </p:spTgt>
+                                        </p:tgtEl>
+                                        <p:attrNameLst>
+                                          <p:attrName>style.visibility</p:attrName>
+                                        </p:attrNameLst>
+                                      </p:cBhvr>
+                                      <p:to>
+                                        <p:strVal val="visible"/>
+                                      </p:to>
+                                    </p:set>
+                                    <p:animEffect transition="in" filter="fade">
+                                      <p:cBhvr>
+                                        <p:cTn id="32" dur="500"/>
+                                        <p:tgtEl>
+                                          <p:spTgt spid="3">
+                                            <p:txEl>
+                                              <p:pRg st="7" end="7"/>
+                                            </p:txEl>
+                                          </p:spTgt>
+                                        </p:tgtEl>
+                                      </p:cBhvr>
+                                    </p:animEffect>
+                                  </p:childTnLst>
+                                </p:cTn>
+                              </p:par>
+                              <p:par>
+                                <p:cTn id="33" presetID="10" presetClass="entr" presetSubtype="0" fill="hold" grpId="0" nodeType="withEffect">
+                                  <p:stCondLst>
+                                    <p:cond delay="0"/>
+                                  </p:stCondLst>
+                                  <p:childTnLst>
+                                    <p:set>
+                                      <p:cBhvr>
+                                        <p:cTn id="34" dur="1" fill="hold">
+                                          <p:stCondLst>
+                                            <p:cond delay="0"/>
+                                          </p:stCondLst>
+                                        </p:cTn>
+                                        <p:tgtEl>
+                                          <p:spTgt spid="3">
+                                            <p:txEl>
+                                              <p:pRg st="8" end="8"/>
+                                            </p:txEl>
+                                          </p:spTgt>
+                                        </p:tgtEl>
+                                        <p:attrNameLst>
+                                          <p:attrName>style.visibility</p:attrName>
+                                        </p:attrNameLst>
+                                      </p:cBhvr>
+                                      <p:to>
+                                        <p:strVal val="visible"/>
+                                      </p:to>
+                                    </p:set>
+                                    <p:animEffect transition="in" filter="fade">
+                                      <p:cBhvr>
+                                        <p:cTn id="35" dur="500"/>
+                                        <p:tgtEl>
+                                          <p:spTgt spid="3">
+                                            <p:txEl>
+                                              <p:pRg st="8" end="8"/>
+                                            </p:txEl>
+                                          </p:spTgt>
+                                        </p:tgtEl>
+                                      </p:cBhvr>
+                                    </p:animEffect>
+                                  </p:childTnLst>
+                                </p:cTn>
+                              </p:par>
+                              <p:par>
+                                <p:cTn id="36" presetID="10" presetClass="entr" presetSubtype="0" fill="hold" grpId="0" nodeType="withEffect">
+                                  <p:stCondLst>
+                                    <p:cond delay="0"/>
+                                  </p:stCondLst>
+                                  <p:childTnLst>
+                                    <p:set>
+                                      <p:cBhvr>
+                                        <p:cTn id="37" dur="1" fill="hold">
+                                          <p:stCondLst>
+                                            <p:cond delay="0"/>
+                                          </p:stCondLst>
+                                        </p:cTn>
+                                        <p:tgtEl>
+                                          <p:spTgt spid="3">
+                                            <p:txEl>
+                                              <p:pRg st="9" end="9"/>
+                                            </p:txEl>
+                                          </p:spTgt>
+                                        </p:tgtEl>
+                                        <p:attrNameLst>
+                                          <p:attrName>style.visibility</p:attrName>
+                                        </p:attrNameLst>
+                                      </p:cBhvr>
+                                      <p:to>
+                                        <p:strVal val="visible"/>
+                                      </p:to>
+                                    </p:set>
+                                    <p:animEffect transition="in" filter="fade">
+                                      <p:cBhvr>
+                                        <p:cTn id="38" dur="500"/>
+                                        <p:tgtEl>
+                                          <p:spTgt spid="3">
+                                            <p:txEl>
+                                              <p:pRg st="9" end="9"/>
+                                            </p:txEl>
+                                          </p:spTgt>
+                                        </p:tgtEl>
+                                      </p:cBhvr>
+                                    </p:animEffect>
+                                  </p:childTnLst>
+                                </p:cTn>
+                              </p:par>
+                            </p:childTnLst>
+                          </p:cTn>
+                        </p:par>
+                      </p:childTnLst>
+                    </p:cTn>
+                  </p:par>
+                  <p:par>
+                    <p:cTn id="39" fill="hold">
+                      <p:stCondLst>
+                        <p:cond delay="indefinite"/>
+                      </p:stCondLst>
+                      <p:childTnLst>
+                        <p:par>
+                          <p:cTn id="40" fill="hold">
+                            <p:stCondLst>
+                              <p:cond delay="0"/>
+                            </p:stCondLst>
+                            <p:childTnLst>
+                              <p:par>
+                                <p:cTn id="41" presetID="10" presetClass="entr" presetSubtype="0" fill="hold" grpId="0" nodeType="clickEffect">
+                                  <p:stCondLst>
+                                    <p:cond delay="0"/>
+                                  </p:stCondLst>
+                                  <p:childTnLst>
+                                    <p:set>
+                                      <p:cBhvr>
+                                        <p:cTn id="42" dur="1" fill="hold">
+                                          <p:stCondLst>
+                                            <p:cond delay="0"/>
+                                          </p:stCondLst>
+                                        </p:cTn>
+                                        <p:tgtEl>
+                                          <p:spTgt spid="3">
+                                            <p:txEl>
+                                              <p:pRg st="10" end="10"/>
+                                            </p:txEl>
+                                          </p:spTgt>
+                                        </p:tgtEl>
+                                        <p:attrNameLst>
+                                          <p:attrName>style.visibility</p:attrName>
+                                        </p:attrNameLst>
+                                      </p:cBhvr>
+                                      <p:to>
+                                        <p:strVal val="visible"/>
+                                      </p:to>
+                                    </p:set>
+                                    <p:animEffect transition="in" filter="fade">
+                                      <p:cBhvr>
+                                        <p:cTn id="43" dur="500"/>
+                                        <p:tgtEl>
+                                          <p:spTgt spid="3">
+                                            <p:txEl>
+                                              <p:pRg st="10" end="10"/>
+                                            </p:txEl>
+                                          </p:spTgt>
+                                        </p:tgtEl>
+                                      </p:cBhvr>
+                                    </p:animEffect>
+                                  </p:childTnLst>
+                                </p:cTn>
+                              </p:par>
+                              <p:par>
+                                <p:cTn id="44" presetID="10" presetClass="entr" presetSubtype="0" fill="hold" grpId="0" nodeType="withEffect">
+                                  <p:stCondLst>
+                                    <p:cond delay="0"/>
+                                  </p:stCondLst>
+                                  <p:childTnLst>
+                                    <p:set>
+                                      <p:cBhvr>
+                                        <p:cTn id="45" dur="1" fill="hold">
+                                          <p:stCondLst>
+                                            <p:cond delay="0"/>
+                                          </p:stCondLst>
+                                        </p:cTn>
+                                        <p:tgtEl>
+                                          <p:spTgt spid="3">
+                                            <p:txEl>
+                                              <p:pRg st="11" end="11"/>
+                                            </p:txEl>
+                                          </p:spTgt>
+                                        </p:tgtEl>
+                                        <p:attrNameLst>
+                                          <p:attrName>style.visibility</p:attrName>
+                                        </p:attrNameLst>
+                                      </p:cBhvr>
+                                      <p:to>
+                                        <p:strVal val="visible"/>
+                                      </p:to>
+                                    </p:set>
+                                    <p:animEffect transition="in" filter="fade">
+                                      <p:cBhvr>
+                                        <p:cTn id="46" dur="500"/>
+                                        <p:tgtEl>
+                                          <p:spTgt spid="3">
+                                            <p:txEl>
+                                              <p:pRg st="11" end="11"/>
+                                            </p:txEl>
+                                          </p:spTgt>
+                                        </p:tgtEl>
+                                      </p:cBhvr>
+                                    </p:animEffect>
+                                  </p:childTnLst>
+                                </p:cTn>
+                              </p:par>
+                              <p:par>
+                                <p:cTn id="47" presetID="10" presetClass="entr" presetSubtype="0" fill="hold" grpId="0" nodeType="withEffect">
+                                  <p:stCondLst>
+                                    <p:cond delay="0"/>
+                                  </p:stCondLst>
+                                  <p:childTnLst>
+                                    <p:set>
+                                      <p:cBhvr>
+                                        <p:cTn id="48" dur="1" fill="hold">
+                                          <p:stCondLst>
+                                            <p:cond delay="0"/>
+                                          </p:stCondLst>
+                                        </p:cTn>
+                                        <p:tgtEl>
+                                          <p:spTgt spid="3">
+                                            <p:txEl>
+                                              <p:pRg st="12" end="12"/>
+                                            </p:txEl>
+                                          </p:spTgt>
+                                        </p:tgtEl>
+                                        <p:attrNameLst>
+                                          <p:attrName>style.visibility</p:attrName>
+                                        </p:attrNameLst>
+                                      </p:cBhvr>
+                                      <p:to>
+                                        <p:strVal val="visible"/>
+                                      </p:to>
+                                    </p:set>
+                                    <p:animEffect transition="in" filter="fade">
+                                      <p:cBhvr>
+                                        <p:cTn id="49" dur="500"/>
+                                        <p:tgtEl>
+                                          <p:spTgt spid="3">
+                                            <p:txEl>
+                                              <p:pRg st="12" end="12"/>
+                                            </p:txEl>
+                                          </p:spTgt>
+                                        </p:tgtEl>
+                                      </p:cBhvr>
+                                    </p:animEffect>
+                                  </p:childTnLst>
+                                </p:cTn>
+                              </p:par>
+                            </p:childTnLst>
+                          </p:cTn>
+                        </p:par>
+                      </p:childTnLst>
+                    </p:cTn>
+                  </p:par>
+                  <p:par>
+                    <p:cTn id="50" fill="hold">
+                      <p:stCondLst>
+                        <p:cond delay="indefinite"/>
+                      </p:stCondLst>
+                      <p:childTnLst>
+                        <p:par>
+                          <p:cTn id="51" fill="hold">
+                            <p:stCondLst>
+                              <p:cond delay="0"/>
+                            </p:stCondLst>
+                            <p:childTnLst>
+                              <p:par>
+                                <p:cTn id="52" presetID="10" presetClass="entr" presetSubtype="0" fill="hold" grpId="0" nodeType="clickEffect">
+                                  <p:stCondLst>
+                                    <p:cond delay="0"/>
+                                  </p:stCondLst>
+                                  <p:childTnLst>
+                                    <p:set>
+                                      <p:cBhvr>
+                                        <p:cTn id="53" dur="1" fill="hold">
+                                          <p:stCondLst>
+                                            <p:cond delay="0"/>
+                                          </p:stCondLst>
+                                        </p:cTn>
+                                        <p:tgtEl>
+                                          <p:spTgt spid="3">
+                                            <p:txEl>
+                                              <p:pRg st="13" end="13"/>
+                                            </p:txEl>
+                                          </p:spTgt>
+                                        </p:tgtEl>
+                                        <p:attrNameLst>
+                                          <p:attrName>style.visibility</p:attrName>
+                                        </p:attrNameLst>
+                                      </p:cBhvr>
+                                      <p:to>
+                                        <p:strVal val="visible"/>
+                                      </p:to>
+                                    </p:set>
+                                    <p:animEffect transition="in" filter="fade">
+                                      <p:cBhvr>
+                                        <p:cTn id="54" dur="500"/>
+                                        <p:tgtEl>
+                                          <p:spTgt spid="3">
+                                            <p:txEl>
+                                              <p:pRg st="13" end="13"/>
+                                            </p:txEl>
+                                          </p:spTgt>
+                                        </p:tgtEl>
+                                      </p:cBhvr>
+                                    </p:animEffect>
+                                  </p:childTnLst>
+                                </p:cTn>
+                              </p:par>
+                            </p:childTnLst>
+                          </p:cTn>
+                        </p:par>
+                      </p:childTnLst>
+                    </p:cTn>
+                  </p:par>
+                </p:childTnLst>
+              </p:cTn>
+              <p:prevCondLst>
+                <p:cond evt="onPrev" delay="0">
+                  <p:tgtEl>
+                    <p:sldTgt/>
+                  </p:tgtEl>
+                </p:cond>
+              </p:prevCondLst>
+              <p:nextCondLst>
+                <p:cond evt="onNext" delay="0">
+                  <p:tgtEl>
+                    <p:sldTgt/>
+                  </p:tgtEl>
+                </p:cond>
+              </p:nextCondLst>
+            </p:seq>
+          </p:childTnLst>
+        </p:cTn>
+      </p:par>
+    </p:tnLst>
+    <p:bldLst>
+      <p:bldP spid="3" grpId="0" uiExpand="1" build="p"/>
+    </p:bldLst>
+  </p:timing>
+</p:sld>
+</file>
+
+<file path=ppt/slides/slide24.xml><?xml version="1.0" encoding="utf-8"?>
+<p:sld xmlns:a="http://schemas.openxmlformats.org/drawingml/2006/main" xmlns:r="http://schemas.openxmlformats.org/officeDocument/2006/relationships" xmlns:p="http://schemas.openxmlformats.org/presentationml/2006/main">
+  <p:cSld>
+    <p:spTree>
+      <p:nvGrpSpPr>
+        <p:cNvPr id="1" name=""/>
+        <p:cNvGrpSpPr/>
+        <p:nvPr/>
+      </p:nvGrpSpPr>
+      <p:grpSpPr>
+        <a:xfrm>
+          <a:off x="0" y="0"/>
+          <a:ext cx="0" cy="0"/>
+          <a:chOff x="0" y="0"/>
+          <a:chExt cx="0" cy="0"/>
+        </a:xfrm>
+      </p:grpSpPr>
+      <p:sp>
+        <p:nvSpPr>
+          <p:cNvPr id="2" name="Title 1">
+            <a:extLst>
+              <a:ext uri="{FF2B5EF4-FFF2-40B4-BE49-F238E27FC236}">
+                <a16:creationId xmlns:a16="http://schemas.microsoft.com/office/drawing/2014/main" id="{1787459C-176C-76C2-33B6-1646CEC3E53E}"/>
+              </a:ext>
+            </a:extLst>
+          </p:cNvPr>
+          <p:cNvSpPr>
+            <a:spLocks noGrp="1"/>
+          </p:cNvSpPr>
+          <p:nvPr>
+            <p:ph type="title"/>
+          </p:nvPr>
+        </p:nvSpPr>
+        <p:spPr/>
+        <p:txBody>
+          <a:bodyPr/>
+          <a:lstStyle/>
+          <a:p>
+            <a:r>
+              <a:rPr lang="en-US" dirty="0">
+                <a:solidFill>
+                  <a:schemeClr val="accent5">
+                    <a:lumMod val="75000"/>
+                  </a:schemeClr>
+                </a:solidFill>
+              </a:rPr>
+              <a:t>Exercise 3 – Data Binding</a:t>
+            </a:r>
+          </a:p>
+        </p:txBody>
+      </p:sp>
+      <p:sp>
+        <p:nvSpPr>
+          <p:cNvPr id="3" name="Content Placeholder 2">
+            <a:extLst>
+              <a:ext uri="{FF2B5EF4-FFF2-40B4-BE49-F238E27FC236}">
+                <a16:creationId xmlns:a16="http://schemas.microsoft.com/office/drawing/2014/main" id="{AFD2AEB0-6C0D-34BF-F901-4E651A6E9AE6}"/>
+              </a:ext>
+            </a:extLst>
+          </p:cNvPr>
+          <p:cNvSpPr>
+            <a:spLocks noGrp="1"/>
+          </p:cNvSpPr>
+          <p:nvPr>
+            <p:ph idx="1"/>
+          </p:nvPr>
+        </p:nvSpPr>
+        <p:spPr/>
+        <p:txBody>
+          <a:bodyPr/>
+          <a:lstStyle/>
+          <a:p>
+            <a:r>
+              <a:rPr lang="en-US" dirty="0"/>
+              <a:t>What You’ll Learn</a:t>
+            </a:r>
+          </a:p>
+          <a:p>
+            <a:pPr lvl="1"/>
+            <a:r>
+              <a:rPr lang="en-US" dirty="0"/>
+              <a:t>How to use data binding to tie UI controls to properties in a ViewModel</a:t>
+            </a:r>
+          </a:p>
+          <a:p>
+            <a:r>
+              <a:rPr lang="en-US" dirty="0"/>
+              <a:t>Exercise</a:t>
+            </a:r>
+          </a:p>
+          <a:p>
+            <a:pPr lvl="1"/>
+            <a:r>
+              <a:rPr lang="en-US" dirty="0"/>
+              <a:t>Start from existing project: Exercise_3_DataBinding</a:t>
+            </a:r>
+          </a:p>
+          <a:p>
+            <a:pPr lvl="1"/>
+            <a:r>
+              <a:rPr lang="en-US" dirty="0"/>
+              <a:t>Create a ViewModel</a:t>
+            </a:r>
+          </a:p>
+          <a:p>
+            <a:pPr lvl="1"/>
+            <a:r>
+              <a:rPr lang="en-US" dirty="0"/>
+              <a:t>Set DataContext of main window</a:t>
+            </a:r>
+          </a:p>
+          <a:p>
+            <a:pPr lvl="1"/>
+            <a:r>
+              <a:rPr lang="en-US" dirty="0"/>
+              <a:t>Create controls in a grid</a:t>
+            </a:r>
+          </a:p>
+          <a:p>
+            <a:pPr lvl="1"/>
+            <a:r>
+              <a:rPr lang="en-US" dirty="0"/>
+              <a:t>Add other data bound labels</a:t>
+            </a:r>
+          </a:p>
+          <a:p>
+            <a:pPr lvl="1"/>
+            <a:r>
+              <a:rPr lang="en-US" dirty="0"/>
+              <a:t>Extra credit</a:t>
+            </a:r>
+          </a:p>
+        </p:txBody>
+      </p:sp>
+    </p:spTree>
+    <p:extLst>
+      <p:ext uri="{BB962C8B-B14F-4D97-AF65-F5344CB8AC3E}">
+        <p14:creationId xmlns:p14="http://schemas.microsoft.com/office/powerpoint/2010/main" val="3064677728"/>
+      </p:ext>
+    </p:extLst>
+  </p:cSld>
+  <p:clrMapOvr>
+    <a:masterClrMapping/>
+  </p:clrMapOvr>
+</p:sld>
+</file>
+
+<file path=ppt/slides/slide25.xml><?xml version="1.0" encoding="utf-8"?>
+<p:sld xmlns:a="http://schemas.openxmlformats.org/drawingml/2006/main" xmlns:r="http://schemas.openxmlformats.org/officeDocument/2006/relationships" xmlns:p="http://schemas.openxmlformats.org/presentationml/2006/main">
+  <p:cSld>
+    <p:spTree>
+      <p:nvGrpSpPr>
+        <p:cNvPr id="1" name=""/>
+        <p:cNvGrpSpPr/>
+        <p:nvPr/>
+      </p:nvGrpSpPr>
+      <p:grpSpPr>
+        <a:xfrm>
+          <a:off x="0" y="0"/>
+          <a:ext cx="0" cy="0"/>
+          <a:chOff x="0" y="0"/>
+          <a:chExt cx="0" cy="0"/>
+        </a:xfrm>
+      </p:grpSpPr>
+      <p:sp>
+        <p:nvSpPr>
+          <p:cNvPr id="2" name="Title 1">
+            <a:extLst>
+              <a:ext uri="{FF2B5EF4-FFF2-40B4-BE49-F238E27FC236}">
+                <a16:creationId xmlns:a16="http://schemas.microsoft.com/office/drawing/2014/main" id="{90239403-4197-DF61-EE82-19A20857DB51}"/>
+              </a:ext>
+            </a:extLst>
+          </p:cNvPr>
+          <p:cNvSpPr>
+            <a:spLocks noGrp="1"/>
+          </p:cNvSpPr>
+          <p:nvPr>
+            <p:ph type="title"/>
+          </p:nvPr>
+        </p:nvSpPr>
+        <p:spPr/>
+        <p:txBody>
+          <a:bodyPr/>
+          <a:lstStyle/>
+          <a:p>
+            <a:r>
+              <a:rPr lang="en-US" dirty="0"/>
+              <a:t>Unit 4 – Binding to List</a:t>
+            </a:r>
+          </a:p>
+        </p:txBody>
+      </p:sp>
+      <p:sp>
+        <p:nvSpPr>
+          <p:cNvPr id="3" name="Content Placeholder 2">
+            <a:extLst>
+              <a:ext uri="{FF2B5EF4-FFF2-40B4-BE49-F238E27FC236}">
+                <a16:creationId xmlns:a16="http://schemas.microsoft.com/office/drawing/2014/main" id="{06E7978C-9A6C-2703-A853-ACBDB1949FCF}"/>
+              </a:ext>
+            </a:extLst>
+          </p:cNvPr>
+          <p:cNvSpPr>
+            <a:spLocks noGrp="1"/>
+          </p:cNvSpPr>
+          <p:nvPr>
+            <p:ph idx="1"/>
+          </p:nvPr>
+        </p:nvSpPr>
+        <p:spPr/>
+        <p:txBody>
+          <a:bodyPr>
+            <a:normAutofit fontScale="70000" lnSpcReduction="20000"/>
+          </a:bodyPr>
+          <a:lstStyle/>
+          <a:p>
+            <a:r>
+              <a:rPr lang="en-US" dirty="0"/>
+              <a:t>What can you bind to?</a:t>
+            </a:r>
+          </a:p>
+          <a:p>
+            <a:pPr lvl="1"/>
+            <a:r>
+              <a:rPr lang="en-US" dirty="0"/>
+              <a:t>Almost any property on any XAML element  </a:t>
+            </a:r>
+            <a:r>
+              <a:rPr lang="en-US" i="1" dirty="0"/>
+              <a:t>(dependency properties)</a:t>
+            </a:r>
+          </a:p>
+          <a:p>
+            <a:pPr lvl="1"/>
+            <a:r>
+              <a:rPr lang="en-US" dirty="0"/>
+              <a:t>Data binding used </a:t>
+            </a:r>
+            <a:r>
+              <a:rPr lang="en-US" b="1" i="1" dirty="0"/>
+              <a:t>everywhere</a:t>
+            </a:r>
+            <a:endParaRPr lang="en-US" dirty="0"/>
+          </a:p>
+          <a:p>
+            <a:r>
+              <a:rPr lang="en-US" dirty="0"/>
+              <a:t>Most commonly bind to data oriented properties</a:t>
+            </a:r>
+          </a:p>
+          <a:p>
+            <a:pPr lvl="1"/>
+            <a:r>
+              <a:rPr lang="en-US" dirty="0"/>
+              <a:t>Displaying data to user, e.g. lists of choices</a:t>
+            </a:r>
+          </a:p>
+          <a:p>
+            <a:pPr lvl="1"/>
+            <a:r>
+              <a:rPr lang="en-US" dirty="0"/>
+              <a:t>Retrieving data entered by user</a:t>
+            </a:r>
+          </a:p>
+          <a:p>
+            <a:r>
+              <a:rPr lang="en-US" dirty="0"/>
+              <a:t>Other common binding scenarios</a:t>
+            </a:r>
+          </a:p>
+          <a:p>
+            <a:pPr lvl="1"/>
+            <a:r>
+              <a:rPr lang="en-US" dirty="0"/>
+              <a:t>Bind Visibility property based on </a:t>
+            </a:r>
+            <a:r>
+              <a:rPr lang="en-US" dirty="0" err="1"/>
+              <a:t>boolean</a:t>
+            </a:r>
+            <a:r>
+              <a:rPr lang="en-US" dirty="0"/>
+              <a:t> property (e.g. </a:t>
+            </a:r>
+            <a:r>
+              <a:rPr lang="en-US" dirty="0" err="1"/>
+              <a:t>ShowScope</a:t>
+            </a:r>
+            <a:r>
+              <a:rPr lang="en-US" dirty="0"/>
+              <a:t>)</a:t>
+            </a:r>
+          </a:p>
+          <a:p>
+            <a:pPr lvl="1"/>
+            <a:r>
+              <a:rPr lang="en-US" dirty="0"/>
+              <a:t>Bind </a:t>
+            </a:r>
+            <a:r>
+              <a:rPr lang="en-US" dirty="0" err="1"/>
+              <a:t>IsEnabled</a:t>
+            </a:r>
+            <a:r>
+              <a:rPr lang="en-US" dirty="0"/>
+              <a:t> property based on state, enabling/disabling controls</a:t>
+            </a:r>
+          </a:p>
+          <a:p>
+            <a:pPr lvl="1"/>
+            <a:r>
+              <a:rPr lang="en-US" dirty="0"/>
+              <a:t>Binding static labels to localized strings</a:t>
+            </a:r>
+          </a:p>
+          <a:p>
+            <a:pPr lvl="1"/>
+            <a:r>
+              <a:rPr lang="en-US" dirty="0"/>
+              <a:t>Binding to list of selectable items in a dropdown list, </a:t>
+            </a:r>
+            <a:r>
+              <a:rPr lang="en-US" dirty="0" err="1"/>
+              <a:t>listbox</a:t>
+            </a:r>
+            <a:r>
+              <a:rPr lang="en-US" dirty="0"/>
+              <a:t>, or grid</a:t>
+            </a:r>
+          </a:p>
+          <a:p>
+            <a:pPr lvl="1"/>
+            <a:r>
+              <a:rPr lang="en-US" dirty="0"/>
+              <a:t>Binding selected items--e.g. in list, selected tab, </a:t>
+            </a:r>
+            <a:r>
+              <a:rPr lang="en-US" dirty="0" err="1"/>
+              <a:t>etc</a:t>
+            </a:r>
+            <a:endParaRPr lang="en-US" dirty="0"/>
+          </a:p>
+          <a:p>
+            <a:pPr lvl="1"/>
+            <a:r>
+              <a:rPr lang="en-US" dirty="0"/>
+              <a:t>Binding layout properties, e.g. margins, padding, sizes</a:t>
+            </a:r>
+          </a:p>
+          <a:p>
+            <a:pPr lvl="1"/>
+            <a:r>
+              <a:rPr lang="en-US" dirty="0"/>
+              <a:t>Binding DataContext of child items (to child object in ViewModel)</a:t>
+            </a:r>
+          </a:p>
+        </p:txBody>
+      </p:sp>
+    </p:spTree>
+    <p:extLst>
+      <p:ext uri="{BB962C8B-B14F-4D97-AF65-F5344CB8AC3E}">
+        <p14:creationId xmlns:p14="http://schemas.microsoft.com/office/powerpoint/2010/main" val="3977926142"/>
+      </p:ext>
+    </p:extLst>
+  </p:cSld>
+  <p:clrMapOvr>
+    <a:masterClrMapping/>
+  </p:clrMapOvr>
+  <p:timing>
+    <p:tnLst>
+      <p:par>
+        <p:cTn id="1" dur="indefinite" restart="never" nodeType="tmRoot">
+          <p:childTnLst>
+            <p:seq concurrent="1" nextAc="seek">
+              <p:cTn id="2" dur="indefinite" nodeType="mainSeq">
+                <p:childTnLst>
+                  <p:par>
+                    <p:cTn id="3" fill="hold">
+                      <p:stCondLst>
+                        <p:cond delay="indefinite"/>
+                      </p:stCondLst>
+                      <p:childTnLst>
+                        <p:par>
+                          <p:cTn id="4" fill="hold">
+                            <p:stCondLst>
+                              <p:cond delay="0"/>
+                            </p:stCondLst>
+                            <p:childTnLst>
+                              <p:par>
+                                <p:cTn id="5" presetID="10" presetClass="entr" presetSubtype="0" fill="hold" grpId="0" nodeType="clickEffect">
+                                  <p:stCondLst>
+                                    <p:cond delay="0"/>
+                                  </p:stCondLst>
+                                  <p:childTnLst>
+                                    <p:set>
+                                      <p:cBhvr>
+                                        <p:cTn id="6" dur="1" fill="hold">
+                                          <p:stCondLst>
+                                            <p:cond delay="0"/>
+                                          </p:stCondLst>
+                                        </p:cTn>
+                                        <p:tgtEl>
+                                          <p:spTgt spid="3">
+                                            <p:txEl>
+                                              <p:pRg st="0" end="0"/>
+                                            </p:txEl>
+                                          </p:spTgt>
+                                        </p:tgtEl>
+                                        <p:attrNameLst>
+                                          <p:attrName>style.visibility</p:attrName>
+                                        </p:attrNameLst>
+                                      </p:cBhvr>
+                                      <p:to>
+                                        <p:strVal val="visible"/>
+                                      </p:to>
+                                    </p:set>
+                                    <p:animEffect transition="in" filter="fade">
+                                      <p:cBhvr>
+                                        <p:cTn id="7" dur="500"/>
+                                        <p:tgtEl>
+                                          <p:spTgt spid="3">
+                                            <p:txEl>
+                                              <p:pRg st="0" end="0"/>
+                                            </p:txEl>
+                                          </p:spTgt>
+                                        </p:tgtEl>
+                                      </p:cBhvr>
+                                    </p:animEffect>
+                                  </p:childTnLst>
+                                </p:cTn>
+                              </p:par>
+                              <p:par>
+                                <p:cTn id="8" presetID="10" presetClass="entr" presetSubtype="0" fill="hold" grpId="0" nodeType="withEffect">
+                                  <p:stCondLst>
+                                    <p:cond delay="0"/>
+                                  </p:stCondLst>
+                                  <p:childTnLst>
+                                    <p:set>
+                                      <p:cBhvr>
+                                        <p:cTn id="9" dur="1" fill="hold">
+                                          <p:stCondLst>
+                                            <p:cond delay="0"/>
+                                          </p:stCondLst>
+                                        </p:cTn>
+                                        <p:tgtEl>
+                                          <p:spTgt spid="3">
+                                            <p:txEl>
+                                              <p:pRg st="1" end="1"/>
+                                            </p:txEl>
+                                          </p:spTgt>
+                                        </p:tgtEl>
+                                        <p:attrNameLst>
+                                          <p:attrName>style.visibility</p:attrName>
+                                        </p:attrNameLst>
+                                      </p:cBhvr>
+                                      <p:to>
+                                        <p:strVal val="visible"/>
+                                      </p:to>
+                                    </p:set>
+                                    <p:animEffect transition="in" filter="fade">
+                                      <p:cBhvr>
+                                        <p:cTn id="10" dur="500"/>
+                                        <p:tgtEl>
+                                          <p:spTgt spid="3">
+                                            <p:txEl>
+                                              <p:pRg st="1" end="1"/>
+                                            </p:txEl>
+                                          </p:spTgt>
+                                        </p:tgtEl>
+                                      </p:cBhvr>
+                                    </p:animEffect>
+                                  </p:childTnLst>
+                                </p:cTn>
+                              </p:par>
+                              <p:par>
+                                <p:cTn id="11" presetID="10" presetClass="entr" presetSubtype="0" fill="hold" grpId="0" nodeType="withEffect">
+                                  <p:stCondLst>
+                                    <p:cond delay="0"/>
+                                  </p:stCondLst>
+                                  <p:childTnLst>
+                                    <p:set>
+                                      <p:cBhvr>
+                                        <p:cTn id="12" dur="1" fill="hold">
+                                          <p:stCondLst>
+                                            <p:cond delay="0"/>
+                                          </p:stCondLst>
+                                        </p:cTn>
+                                        <p:tgtEl>
+                                          <p:spTgt spid="3">
+                                            <p:txEl>
+                                              <p:pRg st="2" end="2"/>
+                                            </p:txEl>
+                                          </p:spTgt>
+                                        </p:tgtEl>
+                                        <p:attrNameLst>
+                                          <p:attrName>style.visibility</p:attrName>
+                                        </p:attrNameLst>
+                                      </p:cBhvr>
+                                      <p:to>
+                                        <p:strVal val="visible"/>
+                                      </p:to>
+                                    </p:set>
+                                    <p:animEffect transition="in" filter="fade">
+                                      <p:cBhvr>
+                                        <p:cTn id="13" dur="500"/>
+                                        <p:tgtEl>
+                                          <p:spTgt spid="3">
+                                            <p:txEl>
+                                              <p:pRg st="2" end="2"/>
+                                            </p:txEl>
+                                          </p:spTgt>
+                                        </p:tgtEl>
+                                      </p:cBhvr>
+                                    </p:animEffect>
+                                  </p:childTnLst>
+                                </p:cTn>
+                              </p:par>
+                            </p:childTnLst>
+                          </p:cTn>
+                        </p:par>
+                      </p:childTnLst>
+                    </p:cTn>
+                  </p:par>
+                  <p:par>
+                    <p:cTn id="14" fill="hold">
+                      <p:stCondLst>
+                        <p:cond delay="indefinite"/>
+                      </p:stCondLst>
+                      <p:childTnLst>
+                        <p:par>
+                          <p:cTn id="15" fill="hold">
+                            <p:stCondLst>
+                              <p:cond delay="0"/>
+                            </p:stCondLst>
+                            <p:childTnLst>
+                              <p:par>
+                                <p:cTn id="16" presetID="10" presetClass="entr" presetSubtype="0" fill="hold" grpId="0" nodeType="clickEffect">
+                                  <p:stCondLst>
+                                    <p:cond delay="0"/>
+                                  </p:stCondLst>
+                                  <p:childTnLst>
+                                    <p:set>
+                                      <p:cBhvr>
+                                        <p:cTn id="17" dur="1" fill="hold">
+                                          <p:stCondLst>
+                                            <p:cond delay="0"/>
+                                          </p:stCondLst>
+                                        </p:cTn>
+                                        <p:tgtEl>
+                                          <p:spTgt spid="3">
+                                            <p:txEl>
+                                              <p:pRg st="3" end="3"/>
+                                            </p:txEl>
+                                          </p:spTgt>
+                                        </p:tgtEl>
+                                        <p:attrNameLst>
+                                          <p:attrName>style.visibility</p:attrName>
+                                        </p:attrNameLst>
+                                      </p:cBhvr>
+                                      <p:to>
+                                        <p:strVal val="visible"/>
+                                      </p:to>
+                                    </p:set>
+                                    <p:animEffect transition="in" filter="fade">
+                                      <p:cBhvr>
+                                        <p:cTn id="18" dur="500"/>
+                                        <p:tgtEl>
+                                          <p:spTgt spid="3">
+                                            <p:txEl>
+                                              <p:pRg st="3" end="3"/>
+                                            </p:txEl>
+                                          </p:spTgt>
+                                        </p:tgtEl>
+                                      </p:cBhvr>
+                                    </p:animEffect>
+                                  </p:childTnLst>
+                                </p:cTn>
+                              </p:par>
+                              <p:par>
+                                <p:cTn id="19" presetID="10" presetClass="entr" presetSubtype="0" fill="hold" grpId="0" nodeType="withEffect">
+                                  <p:stCondLst>
+                                    <p:cond delay="0"/>
+                                  </p:stCondLst>
+                                  <p:childTnLst>
+                                    <p:set>
+                                      <p:cBhvr>
+                                        <p:cTn id="20" dur="1" fill="hold">
+                                          <p:stCondLst>
+                                            <p:cond delay="0"/>
+                                          </p:stCondLst>
+                                        </p:cTn>
+                                        <p:tgtEl>
+                                          <p:spTgt spid="3">
+                                            <p:txEl>
+                                              <p:pRg st="4" end="4"/>
+                                            </p:txEl>
+                                          </p:spTgt>
+                                        </p:tgtEl>
+                                        <p:attrNameLst>
+                                          <p:attrName>style.visibility</p:attrName>
+                                        </p:attrNameLst>
+                                      </p:cBhvr>
+                                      <p:to>
+                                        <p:strVal val="visible"/>
+                                      </p:to>
+                                    </p:set>
+                                    <p:animEffect transition="in" filter="fade">
+                                      <p:cBhvr>
+                                        <p:cTn id="21" dur="500"/>
+                                        <p:tgtEl>
+                                          <p:spTgt spid="3">
+                                            <p:txEl>
+                                              <p:pRg st="4" end="4"/>
+                                            </p:txEl>
+                                          </p:spTgt>
+                                        </p:tgtEl>
+                                      </p:cBhvr>
+                                    </p:animEffect>
+                                  </p:childTnLst>
+                                </p:cTn>
+                              </p:par>
+                              <p:par>
+                                <p:cTn id="22" presetID="10" presetClass="entr" presetSubtype="0" fill="hold" grpId="0" nodeType="withEffect">
+                                  <p:stCondLst>
+                                    <p:cond delay="0"/>
+                                  </p:stCondLst>
+                                  <p:childTnLst>
+                                    <p:set>
+                                      <p:cBhvr>
+                                        <p:cTn id="23" dur="1" fill="hold">
+                                          <p:stCondLst>
+                                            <p:cond delay="0"/>
+                                          </p:stCondLst>
+                                        </p:cTn>
+                                        <p:tgtEl>
+                                          <p:spTgt spid="3">
+                                            <p:txEl>
+                                              <p:pRg st="5" end="5"/>
+                                            </p:txEl>
+                                          </p:spTgt>
+                                        </p:tgtEl>
+                                        <p:attrNameLst>
+                                          <p:attrName>style.visibility</p:attrName>
+                                        </p:attrNameLst>
+                                      </p:cBhvr>
+                                      <p:to>
+                                        <p:strVal val="visible"/>
+                                      </p:to>
+                                    </p:set>
+                                    <p:animEffect transition="in" filter="fade">
+                                      <p:cBhvr>
+                                        <p:cTn id="24" dur="500"/>
+                                        <p:tgtEl>
+                                          <p:spTgt spid="3">
+                                            <p:txEl>
+                                              <p:pRg st="5" end="5"/>
+                                            </p:txEl>
+                                          </p:spTgt>
+                                        </p:tgtEl>
+                                      </p:cBhvr>
+                                    </p:animEffect>
+                                  </p:childTnLst>
+                                </p:cTn>
+                              </p:par>
+                            </p:childTnLst>
+                          </p:cTn>
+                        </p:par>
+                      </p:childTnLst>
+                    </p:cTn>
+                  </p:par>
+                  <p:par>
+                    <p:cTn id="25" fill="hold">
+                      <p:stCondLst>
+                        <p:cond delay="indefinite"/>
+                      </p:stCondLst>
+                      <p:childTnLst>
+                        <p:par>
+                          <p:cTn id="26" fill="hold">
+                            <p:stCondLst>
+                              <p:cond delay="0"/>
+                            </p:stCondLst>
+                            <p:childTnLst>
+                              <p:par>
+                                <p:cTn id="27" presetID="10" presetClass="entr" presetSubtype="0" fill="hold" grpId="0" nodeType="clickEffect">
+                                  <p:stCondLst>
+                                    <p:cond delay="0"/>
+                                  </p:stCondLst>
+                                  <p:childTnLst>
+                                    <p:set>
+                                      <p:cBhvr>
+                                        <p:cTn id="28" dur="1" fill="hold">
+                                          <p:stCondLst>
+                                            <p:cond delay="0"/>
+                                          </p:stCondLst>
+                                        </p:cTn>
+                                        <p:tgtEl>
+                                          <p:spTgt spid="3">
+                                            <p:txEl>
+                                              <p:pRg st="6" end="6"/>
+                                            </p:txEl>
+                                          </p:spTgt>
+                                        </p:tgtEl>
+                                        <p:attrNameLst>
+                                          <p:attrName>style.visibility</p:attrName>
+                                        </p:attrNameLst>
+                                      </p:cBhvr>
+                                      <p:to>
+                                        <p:strVal val="visible"/>
+                                      </p:to>
+                                    </p:set>
+                                    <p:animEffect transition="in" filter="fade">
+                                      <p:cBhvr>
+                                        <p:cTn id="29" dur="500"/>
+                                        <p:tgtEl>
+                                          <p:spTgt spid="3">
+                                            <p:txEl>
+                                              <p:pRg st="6" end="6"/>
+                                            </p:txEl>
+                                          </p:spTgt>
+                                        </p:tgtEl>
+                                      </p:cBhvr>
+                                    </p:animEffect>
+                                  </p:childTnLst>
+                                </p:cTn>
+                              </p:par>
+                              <p:par>
+                                <p:cTn id="30" presetID="10" presetClass="entr" presetSubtype="0" fill="hold" grpId="0" nodeType="withEffect">
+                                  <p:stCondLst>
+                                    <p:cond delay="0"/>
+                                  </p:stCondLst>
+                                  <p:childTnLst>
+                                    <p:set>
+                                      <p:cBhvr>
+                                        <p:cTn id="31" dur="1" fill="hold">
+                                          <p:stCondLst>
+                                            <p:cond delay="0"/>
+                                          </p:stCondLst>
+                                        </p:cTn>
+                                        <p:tgtEl>
+                                          <p:spTgt spid="3">
+                                            <p:txEl>
+                                              <p:pRg st="7" end="7"/>
+                                            </p:txEl>
+                                          </p:spTgt>
+                                        </p:tgtEl>
+                                        <p:attrNameLst>
+                                          <p:attrName>style.visibility</p:attrName>
+                                        </p:attrNameLst>
+                                      </p:cBhvr>
+                                      <p:to>
+                                        <p:strVal val="visible"/>
+                                      </p:to>
+                                    </p:set>
+                                    <p:animEffect transition="in" filter="fade">
+                                      <p:cBhvr>
+                                        <p:cTn id="32" dur="500"/>
+                                        <p:tgtEl>
+                                          <p:spTgt spid="3">
+                                            <p:txEl>
+                                              <p:pRg st="7" end="7"/>
+                                            </p:txEl>
+                                          </p:spTgt>
+                                        </p:tgtEl>
+                                      </p:cBhvr>
+                                    </p:animEffect>
+                                  </p:childTnLst>
+                                </p:cTn>
+                              </p:par>
+                              <p:par>
+                                <p:cTn id="33" presetID="10" presetClass="entr" presetSubtype="0" fill="hold" grpId="0" nodeType="withEffect">
+                                  <p:stCondLst>
+                                    <p:cond delay="0"/>
+                                  </p:stCondLst>
+                                  <p:childTnLst>
+                                    <p:set>
+                                      <p:cBhvr>
+                                        <p:cTn id="34" dur="1" fill="hold">
+                                          <p:stCondLst>
+                                            <p:cond delay="0"/>
+                                          </p:stCondLst>
+                                        </p:cTn>
+                                        <p:tgtEl>
+                                          <p:spTgt spid="3">
+                                            <p:txEl>
+                                              <p:pRg st="8" end="8"/>
+                                            </p:txEl>
+                                          </p:spTgt>
+                                        </p:tgtEl>
+                                        <p:attrNameLst>
+                                          <p:attrName>style.visibility</p:attrName>
+                                        </p:attrNameLst>
+                                      </p:cBhvr>
+                                      <p:to>
+                                        <p:strVal val="visible"/>
+                                      </p:to>
+                                    </p:set>
+                                    <p:animEffect transition="in" filter="fade">
+                                      <p:cBhvr>
+                                        <p:cTn id="35" dur="500"/>
+                                        <p:tgtEl>
+                                          <p:spTgt spid="3">
+                                            <p:txEl>
+                                              <p:pRg st="8" end="8"/>
+                                            </p:txEl>
+                                          </p:spTgt>
+                                        </p:tgtEl>
+                                      </p:cBhvr>
+                                    </p:animEffect>
+                                  </p:childTnLst>
+                                </p:cTn>
+                              </p:par>
+                              <p:par>
+                                <p:cTn id="36" presetID="10" presetClass="entr" presetSubtype="0" fill="hold" grpId="0" nodeType="withEffect">
+                                  <p:stCondLst>
+                                    <p:cond delay="0"/>
+                                  </p:stCondLst>
+                                  <p:childTnLst>
+                                    <p:set>
+                                      <p:cBhvr>
+                                        <p:cTn id="37" dur="1" fill="hold">
+                                          <p:stCondLst>
+                                            <p:cond delay="0"/>
+                                          </p:stCondLst>
+                                        </p:cTn>
+                                        <p:tgtEl>
+                                          <p:spTgt spid="3">
+                                            <p:txEl>
+                                              <p:pRg st="9" end="9"/>
+                                            </p:txEl>
+                                          </p:spTgt>
+                                        </p:tgtEl>
+                                        <p:attrNameLst>
+                                          <p:attrName>style.visibility</p:attrName>
+                                        </p:attrNameLst>
+                                      </p:cBhvr>
+                                      <p:to>
+                                        <p:strVal val="visible"/>
+                                      </p:to>
+                                    </p:set>
+                                    <p:animEffect transition="in" filter="fade">
+                                      <p:cBhvr>
+                                        <p:cTn id="38" dur="500"/>
+                                        <p:tgtEl>
+                                          <p:spTgt spid="3">
+                                            <p:txEl>
+                                              <p:pRg st="9" end="9"/>
+                                            </p:txEl>
+                                          </p:spTgt>
+                                        </p:tgtEl>
+                                      </p:cBhvr>
+                                    </p:animEffect>
+                                  </p:childTnLst>
+                                </p:cTn>
+                              </p:par>
+                              <p:par>
+                                <p:cTn id="39" presetID="10" presetClass="entr" presetSubtype="0" fill="hold" grpId="0" nodeType="withEffect">
+                                  <p:stCondLst>
+                                    <p:cond delay="0"/>
+                                  </p:stCondLst>
+                                  <p:childTnLst>
+                                    <p:set>
+                                      <p:cBhvr>
+                                        <p:cTn id="40" dur="1" fill="hold">
+                                          <p:stCondLst>
+                                            <p:cond delay="0"/>
+                                          </p:stCondLst>
+                                        </p:cTn>
+                                        <p:tgtEl>
+                                          <p:spTgt spid="3">
+                                            <p:txEl>
+                                              <p:pRg st="10" end="10"/>
+                                            </p:txEl>
+                                          </p:spTgt>
+                                        </p:tgtEl>
+                                        <p:attrNameLst>
+                                          <p:attrName>style.visibility</p:attrName>
+                                        </p:attrNameLst>
+                                      </p:cBhvr>
+                                      <p:to>
+                                        <p:strVal val="visible"/>
+                                      </p:to>
+                                    </p:set>
+                                    <p:animEffect transition="in" filter="fade">
+                                      <p:cBhvr>
+                                        <p:cTn id="41" dur="500"/>
+                                        <p:tgtEl>
+                                          <p:spTgt spid="3">
+                                            <p:txEl>
+                                              <p:pRg st="10" end="10"/>
+                                            </p:txEl>
+                                          </p:spTgt>
+                                        </p:tgtEl>
+                                      </p:cBhvr>
+                                    </p:animEffect>
+                                  </p:childTnLst>
+                                </p:cTn>
+                              </p:par>
+                              <p:par>
+                                <p:cTn id="42" presetID="10" presetClass="entr" presetSubtype="0" fill="hold" grpId="0" nodeType="withEffect">
+                                  <p:stCondLst>
+                                    <p:cond delay="0"/>
+                                  </p:stCondLst>
+                                  <p:childTnLst>
+                                    <p:set>
+                                      <p:cBhvr>
+                                        <p:cTn id="43" dur="1" fill="hold">
+                                          <p:stCondLst>
+                                            <p:cond delay="0"/>
+                                          </p:stCondLst>
+                                        </p:cTn>
+                                        <p:tgtEl>
+                                          <p:spTgt spid="3">
+                                            <p:txEl>
+                                              <p:pRg st="11" end="11"/>
+                                            </p:txEl>
+                                          </p:spTgt>
+                                        </p:tgtEl>
+                                        <p:attrNameLst>
+                                          <p:attrName>style.visibility</p:attrName>
+                                        </p:attrNameLst>
+                                      </p:cBhvr>
+                                      <p:to>
+                                        <p:strVal val="visible"/>
+                                      </p:to>
+                                    </p:set>
+                                    <p:animEffect transition="in" filter="fade">
+                                      <p:cBhvr>
+                                        <p:cTn id="44" dur="500"/>
+                                        <p:tgtEl>
+                                          <p:spTgt spid="3">
+                                            <p:txEl>
+                                              <p:pRg st="11" end="11"/>
+                                            </p:txEl>
+                                          </p:spTgt>
+                                        </p:tgtEl>
+                                      </p:cBhvr>
+                                    </p:animEffect>
+                                  </p:childTnLst>
+                                </p:cTn>
+                              </p:par>
+                              <p:par>
+                                <p:cTn id="45" presetID="10" presetClass="entr" presetSubtype="0" fill="hold" grpId="0" nodeType="withEffect">
+                                  <p:stCondLst>
+                                    <p:cond delay="0"/>
+                                  </p:stCondLst>
+                                  <p:childTnLst>
+                                    <p:set>
+                                      <p:cBhvr>
+                                        <p:cTn id="46" dur="1" fill="hold">
+                                          <p:stCondLst>
+                                            <p:cond delay="0"/>
+                                          </p:stCondLst>
+                                        </p:cTn>
+                                        <p:tgtEl>
+                                          <p:spTgt spid="3">
+                                            <p:txEl>
+                                              <p:pRg st="12" end="12"/>
+                                            </p:txEl>
+                                          </p:spTgt>
+                                        </p:tgtEl>
+                                        <p:attrNameLst>
+                                          <p:attrName>style.visibility</p:attrName>
+                                        </p:attrNameLst>
+                                      </p:cBhvr>
+                                      <p:to>
+                                        <p:strVal val="visible"/>
+                                      </p:to>
+                                    </p:set>
+                                    <p:animEffect transition="in" filter="fade">
+                                      <p:cBhvr>
+                                        <p:cTn id="47" dur="500"/>
+                                        <p:tgtEl>
+                                          <p:spTgt spid="3">
+                                            <p:txEl>
+                                              <p:pRg st="12" end="12"/>
+                                            </p:txEl>
+                                          </p:spTgt>
+                                        </p:tgtEl>
+                                      </p:cBhvr>
+                                    </p:animEffect>
+                                  </p:childTnLst>
+                                </p:cTn>
+                              </p:par>
+                              <p:par>
+                                <p:cTn id="48" presetID="10" presetClass="entr" presetSubtype="0" fill="hold" grpId="0" nodeType="withEffect">
+                                  <p:stCondLst>
+                                    <p:cond delay="0"/>
+                                  </p:stCondLst>
+                                  <p:childTnLst>
+                                    <p:set>
+                                      <p:cBhvr>
+                                        <p:cTn id="49" dur="1" fill="hold">
+                                          <p:stCondLst>
+                                            <p:cond delay="0"/>
+                                          </p:stCondLst>
+                                        </p:cTn>
+                                        <p:tgtEl>
+                                          <p:spTgt spid="3">
+                                            <p:txEl>
+                                              <p:pRg st="13" end="13"/>
+                                            </p:txEl>
+                                          </p:spTgt>
+                                        </p:tgtEl>
+                                        <p:attrNameLst>
+                                          <p:attrName>style.visibility</p:attrName>
+                                        </p:attrNameLst>
+                                      </p:cBhvr>
+                                      <p:to>
+                                        <p:strVal val="visible"/>
+                                      </p:to>
+                                    </p:set>
+                                    <p:animEffect transition="in" filter="fade">
+                                      <p:cBhvr>
+                                        <p:cTn id="50" dur="500"/>
+                                        <p:tgtEl>
+                                          <p:spTgt spid="3">
+                                            <p:txEl>
+                                              <p:pRg st="13" end="13"/>
+                                            </p:txEl>
+                                          </p:spTgt>
+                                        </p:tgtEl>
+                                      </p:cBhvr>
+                                    </p:animEffect>
+                                  </p:childTnLst>
+                                </p:cTn>
+                              </p:par>
+                            </p:childTnLst>
+                          </p:cTn>
+                        </p:par>
+                      </p:childTnLst>
+                    </p:cTn>
+                  </p:par>
+                </p:childTnLst>
+              </p:cTn>
+              <p:prevCondLst>
+                <p:cond evt="onPrev" delay="0">
+                  <p:tgtEl>
+                    <p:sldTgt/>
+                  </p:tgtEl>
+                </p:cond>
+              </p:prevCondLst>
+              <p:nextCondLst>
+                <p:cond evt="onNext" delay="0">
+                  <p:tgtEl>
+                    <p:sldTgt/>
+                  </p:tgtEl>
+                </p:cond>
+              </p:nextCondLst>
+            </p:seq>
+          </p:childTnLst>
+        </p:cTn>
+      </p:par>
+    </p:tnLst>
+    <p:bldLst>
+      <p:bldP spid="3" grpId="0" uiExpand="1" build="p"/>
+    </p:bldLst>
+  </p:timing>
+</p:sld>
+</file>
+
+<file path=ppt/slides/slide26.xml><?xml version="1.0" encoding="utf-8"?>
+<p:sld xmlns:a="http://schemas.openxmlformats.org/drawingml/2006/main" xmlns:r="http://schemas.openxmlformats.org/officeDocument/2006/relationships" xmlns:p="http://schemas.openxmlformats.org/presentationml/2006/main">
+  <p:cSld>
+    <p:spTree>
+      <p:nvGrpSpPr>
+        <p:cNvPr id="1" name=""/>
+        <p:cNvGrpSpPr/>
+        <p:nvPr/>
+      </p:nvGrpSpPr>
+      <p:grpSpPr>
+        <a:xfrm>
+          <a:off x="0" y="0"/>
+          <a:ext cx="0" cy="0"/>
+          <a:chOff x="0" y="0"/>
+          <a:chExt cx="0" cy="0"/>
+        </a:xfrm>
+      </p:grpSpPr>
+      <p:sp>
+        <p:nvSpPr>
+          <p:cNvPr id="2" name="Title 1">
+            <a:extLst>
+              <a:ext uri="{FF2B5EF4-FFF2-40B4-BE49-F238E27FC236}">
+                <a16:creationId xmlns:a16="http://schemas.microsoft.com/office/drawing/2014/main" id="{3353F6A8-EEA7-E58C-2282-8ADE7FB1EDD5}"/>
+              </a:ext>
+            </a:extLst>
+          </p:cNvPr>
+          <p:cNvSpPr>
+            <a:spLocks noGrp="1"/>
+          </p:cNvSpPr>
+          <p:nvPr>
+            <p:ph type="title"/>
+          </p:nvPr>
+        </p:nvSpPr>
+        <p:spPr/>
+        <p:txBody>
+          <a:bodyPr/>
+          <a:lstStyle/>
+          <a:p>
+            <a:r>
+              <a:rPr lang="en-US" dirty="0"/>
+              <a:t>Unit 4 – Binding to List</a:t>
+            </a:r>
+          </a:p>
+        </p:txBody>
+      </p:sp>
+      <p:sp>
+        <p:nvSpPr>
+          <p:cNvPr id="3" name="Content Placeholder 2">
+            <a:extLst>
+              <a:ext uri="{FF2B5EF4-FFF2-40B4-BE49-F238E27FC236}">
+                <a16:creationId xmlns:a16="http://schemas.microsoft.com/office/drawing/2014/main" id="{E01CAEA2-9678-70A3-EE50-0F14617624AE}"/>
+              </a:ext>
+            </a:extLst>
+          </p:cNvPr>
+          <p:cNvSpPr>
+            <a:spLocks noGrp="1"/>
+          </p:cNvSpPr>
+          <p:nvPr>
+            <p:ph idx="1"/>
+          </p:nvPr>
+        </p:nvSpPr>
+        <p:spPr/>
+        <p:txBody>
+          <a:bodyPr/>
+          <a:lstStyle/>
+          <a:p>
+            <a:r>
+              <a:rPr lang="en-US" dirty="0">
+                <a:solidFill>
+                  <a:srgbClr val="00B050"/>
+                </a:solidFill>
+              </a:rPr>
+              <a:t>Example - Binding to Layout Transforms</a:t>
+            </a:r>
+          </a:p>
+        </p:txBody>
+      </p:sp>
+    </p:spTree>
+    <p:extLst>
+      <p:ext uri="{BB962C8B-B14F-4D97-AF65-F5344CB8AC3E}">
+        <p14:creationId xmlns:p14="http://schemas.microsoft.com/office/powerpoint/2010/main" val="1059773887"/>
+      </p:ext>
+    </p:extLst>
+  </p:cSld>
+  <p:clrMapOvr>
+    <a:masterClrMapping/>
+  </p:clrMapOvr>
+</p:sld>
+</file>
+
+<file path=ppt/slides/slide27.xml><?xml version="1.0" encoding="utf-8"?>
+<p:sld xmlns:a="http://schemas.openxmlformats.org/drawingml/2006/main" xmlns:r="http://schemas.openxmlformats.org/officeDocument/2006/relationships" xmlns:p="http://schemas.openxmlformats.org/presentationml/2006/main">
+  <p:cSld>
+    <p:spTree>
+      <p:nvGrpSpPr>
+        <p:cNvPr id="1" name=""/>
+        <p:cNvGrpSpPr/>
+        <p:nvPr/>
+      </p:nvGrpSpPr>
+      <p:grpSpPr>
+        <a:xfrm>
+          <a:off x="0" y="0"/>
+          <a:ext cx="0" cy="0"/>
+          <a:chOff x="0" y="0"/>
+          <a:chExt cx="0" cy="0"/>
+        </a:xfrm>
+      </p:grpSpPr>
+      <p:sp>
+        <p:nvSpPr>
+          <p:cNvPr id="2" name="Title 1">
+            <a:extLst>
+              <a:ext uri="{FF2B5EF4-FFF2-40B4-BE49-F238E27FC236}">
+                <a16:creationId xmlns:a16="http://schemas.microsoft.com/office/drawing/2014/main" id="{165BB33B-3519-A3A1-527A-D2C10FE56860}"/>
+              </a:ext>
+            </a:extLst>
+          </p:cNvPr>
+          <p:cNvSpPr>
+            <a:spLocks noGrp="1"/>
+          </p:cNvSpPr>
+          <p:nvPr>
+            <p:ph type="title"/>
+          </p:nvPr>
+        </p:nvSpPr>
+        <p:spPr/>
+        <p:txBody>
+          <a:bodyPr/>
+          <a:lstStyle/>
+          <a:p>
+            <a:r>
+              <a:rPr lang="en-US" dirty="0"/>
+              <a:t>Unit 4 – Binding to List</a:t>
+            </a:r>
+          </a:p>
+        </p:txBody>
+      </p:sp>
+      <p:sp>
+        <p:nvSpPr>
+          <p:cNvPr id="3" name="Content Placeholder 2">
+            <a:extLst>
+              <a:ext uri="{FF2B5EF4-FFF2-40B4-BE49-F238E27FC236}">
+                <a16:creationId xmlns:a16="http://schemas.microsoft.com/office/drawing/2014/main" id="{4F4A48CB-9502-1992-7F57-562595543274}"/>
+              </a:ext>
+            </a:extLst>
+          </p:cNvPr>
+          <p:cNvSpPr>
+            <a:spLocks noGrp="1"/>
+          </p:cNvSpPr>
+          <p:nvPr>
+            <p:ph idx="1"/>
+          </p:nvPr>
+        </p:nvSpPr>
+        <p:spPr/>
+        <p:txBody>
+          <a:bodyPr/>
+          <a:lstStyle/>
+          <a:p>
+            <a:r>
+              <a:rPr lang="en-US" dirty="0"/>
+              <a:t>Binding to a list</a:t>
+            </a:r>
+          </a:p>
+          <a:p>
+            <a:pPr lvl="1"/>
+            <a:r>
+              <a:rPr lang="en-US" dirty="0"/>
+              <a:t>Populate a list by binding to a list of objects -- quite common</a:t>
+            </a:r>
+          </a:p>
+          <a:p>
+            <a:pPr lvl="1"/>
+            <a:r>
+              <a:rPr lang="en-US" dirty="0"/>
+              <a:t>Populating a </a:t>
+            </a:r>
+            <a:r>
+              <a:rPr lang="en-US" dirty="0" err="1"/>
+              <a:t>ListBox</a:t>
+            </a:r>
+            <a:endParaRPr lang="en-US" dirty="0"/>
+          </a:p>
+          <a:p>
+            <a:pPr lvl="2"/>
+            <a:r>
+              <a:rPr lang="en-US" dirty="0"/>
+              <a:t>In ViewModel, create property that is List&lt;T&gt; -- list of objects, of some type T</a:t>
+            </a:r>
+          </a:p>
+          <a:p>
+            <a:pPr lvl="2"/>
+            <a:r>
+              <a:rPr lang="en-US" dirty="0"/>
+              <a:t>In View, bind </a:t>
+            </a:r>
+            <a:r>
+              <a:rPr lang="en-US" dirty="0" err="1"/>
+              <a:t>ItemsSource</a:t>
+            </a:r>
+            <a:r>
+              <a:rPr lang="en-US" dirty="0"/>
+              <a:t> property of </a:t>
+            </a:r>
+            <a:r>
+              <a:rPr lang="en-US" dirty="0" err="1"/>
+              <a:t>ListBox</a:t>
+            </a:r>
+            <a:endParaRPr lang="en-US" dirty="0"/>
+          </a:p>
+          <a:p>
+            <a:r>
+              <a:rPr lang="en-US" dirty="0">
+                <a:solidFill>
+                  <a:srgbClr val="00B050"/>
+                </a:solidFill>
+              </a:rPr>
+              <a:t>Example – Binding to List</a:t>
+            </a:r>
+          </a:p>
+        </p:txBody>
+      </p:sp>
+    </p:spTree>
+    <p:extLst>
+      <p:ext uri="{BB962C8B-B14F-4D97-AF65-F5344CB8AC3E}">
+        <p14:creationId xmlns:p14="http://schemas.microsoft.com/office/powerpoint/2010/main" val="2716555905"/>
+      </p:ext>
+    </p:extLst>
+  </p:cSld>
+  <p:clrMapOvr>
+    <a:masterClrMapping/>
+  </p:clrMapOvr>
+  <p:timing>
+    <p:tnLst>
+      <p:par>
+        <p:cTn id="1" dur="indefinite" restart="never" nodeType="tmRoot">
+          <p:childTnLst>
+            <p:seq concurrent="1" nextAc="seek">
+              <p:cTn id="2" dur="indefinite" nodeType="mainSeq">
+                <p:childTnLst>
+                  <p:par>
+                    <p:cTn id="3" fill="hold">
+                      <p:stCondLst>
+                        <p:cond delay="indefinite"/>
+                      </p:stCondLst>
+                      <p:childTnLst>
+                        <p:par>
+                          <p:cTn id="4" fill="hold">
+                            <p:stCondLst>
+                              <p:cond delay="0"/>
+                            </p:stCondLst>
+                            <p:childTnLst>
+                              <p:par>
+                                <p:cTn id="5" presetID="10" presetClass="entr" presetSubtype="0" fill="hold" grpId="0" nodeType="clickEffect">
+                                  <p:stCondLst>
+                                    <p:cond delay="0"/>
+                                  </p:stCondLst>
+                                  <p:childTnLst>
+                                    <p:set>
+                                      <p:cBhvr>
+                                        <p:cTn id="6" dur="1" fill="hold">
+                                          <p:stCondLst>
+                                            <p:cond delay="0"/>
+                                          </p:stCondLst>
+                                        </p:cTn>
+                                        <p:tgtEl>
+                                          <p:spTgt spid="3">
+                                            <p:txEl>
+                                              <p:pRg st="0" end="0"/>
+                                            </p:txEl>
+                                          </p:spTgt>
+                                        </p:tgtEl>
+                                        <p:attrNameLst>
+                                          <p:attrName>style.visibility</p:attrName>
+                                        </p:attrNameLst>
+                                      </p:cBhvr>
+                                      <p:to>
+                                        <p:strVal val="visible"/>
+                                      </p:to>
+                                    </p:set>
+                                    <p:animEffect transition="in" filter="fade">
+                                      <p:cBhvr>
+                                        <p:cTn id="7" dur="500"/>
+                                        <p:tgtEl>
+                                          <p:spTgt spid="3">
+                                            <p:txEl>
+                                              <p:pRg st="0" end="0"/>
+                                            </p:txEl>
+                                          </p:spTgt>
+                                        </p:tgtEl>
+                                      </p:cBhvr>
+                                    </p:animEffect>
+                                  </p:childTnLst>
+                                </p:cTn>
+                              </p:par>
+                            </p:childTnLst>
+                          </p:cTn>
+                        </p:par>
+                      </p:childTnLst>
+                    </p:cTn>
+                  </p:par>
+                  <p:par>
+                    <p:cTn id="8" fill="hold">
+                      <p:stCondLst>
+                        <p:cond delay="indefinite"/>
+                      </p:stCondLst>
+                      <p:childTnLst>
+                        <p:par>
+                          <p:cTn id="9" fill="hold">
+                            <p:stCondLst>
+                              <p:cond delay="0"/>
+                            </p:stCondLst>
+                            <p:childTnLst>
+                              <p:par>
+                                <p:cTn id="10" presetID="10" presetClass="entr" presetSubtype="0" fill="hold" grpId="0" nodeType="clickEffect">
+                                  <p:stCondLst>
+                                    <p:cond delay="0"/>
+                                  </p:stCondLst>
+                                  <p:childTnLst>
+                                    <p:set>
+                                      <p:cBhvr>
+                                        <p:cTn id="11" dur="1" fill="hold">
+                                          <p:stCondLst>
+                                            <p:cond delay="0"/>
+                                          </p:stCondLst>
+                                        </p:cTn>
+                                        <p:tgtEl>
+                                          <p:spTgt spid="3">
+                                            <p:txEl>
+                                              <p:pRg st="1" end="1"/>
+                                            </p:txEl>
+                                          </p:spTgt>
+                                        </p:tgtEl>
+                                        <p:attrNameLst>
+                                          <p:attrName>style.visibility</p:attrName>
+                                        </p:attrNameLst>
+                                      </p:cBhvr>
+                                      <p:to>
+                                        <p:strVal val="visible"/>
+                                      </p:to>
+                                    </p:set>
+                                    <p:animEffect transition="in" filter="fade">
+                                      <p:cBhvr>
+                                        <p:cTn id="12" dur="500"/>
+                                        <p:tgtEl>
+                                          <p:spTgt spid="3">
+                                            <p:txEl>
+                                              <p:pRg st="1" end="1"/>
+                                            </p:txEl>
+                                          </p:spTgt>
+                                        </p:tgtEl>
+                                      </p:cBhvr>
+                                    </p:animEffect>
+                                  </p:childTnLst>
+                                </p:cTn>
+                              </p:par>
+                            </p:childTnLst>
+                          </p:cTn>
+                        </p:par>
+                      </p:childTnLst>
+                    </p:cTn>
+                  </p:par>
+                  <p:par>
+                    <p:cTn id="13" fill="hold">
+                      <p:stCondLst>
+                        <p:cond delay="indefinite"/>
+                      </p:stCondLst>
+                      <p:childTnLst>
+                        <p:par>
+                          <p:cTn id="14" fill="hold">
+                            <p:stCondLst>
+                              <p:cond delay="0"/>
+                            </p:stCondLst>
+                            <p:childTnLst>
+                              <p:par>
+                                <p:cTn id="15" presetID="10" presetClass="entr" presetSubtype="0" fill="hold" grpId="0" nodeType="clickEffect">
+                                  <p:stCondLst>
+                                    <p:cond delay="0"/>
+                                  </p:stCondLst>
+                                  <p:childTnLst>
+                                    <p:set>
+                                      <p:cBhvr>
+                                        <p:cTn id="16" dur="1" fill="hold">
+                                          <p:stCondLst>
+                                            <p:cond delay="0"/>
+                                          </p:stCondLst>
+                                        </p:cTn>
+                                        <p:tgtEl>
+                                          <p:spTgt spid="3">
+                                            <p:txEl>
+                                              <p:pRg st="2" end="2"/>
+                                            </p:txEl>
+                                          </p:spTgt>
+                                        </p:tgtEl>
+                                        <p:attrNameLst>
+                                          <p:attrName>style.visibility</p:attrName>
+                                        </p:attrNameLst>
+                                      </p:cBhvr>
+                                      <p:to>
+                                        <p:strVal val="visible"/>
+                                      </p:to>
+                                    </p:set>
+                                    <p:animEffect transition="in" filter="fade">
+                                      <p:cBhvr>
+                                        <p:cTn id="17" dur="500"/>
+                                        <p:tgtEl>
+                                          <p:spTgt spid="3">
+                                            <p:txEl>
+                                              <p:pRg st="2" end="2"/>
+                                            </p:txEl>
+                                          </p:spTgt>
+                                        </p:tgtEl>
+                                      </p:cBhvr>
+                                    </p:animEffect>
+                                  </p:childTnLst>
+                                </p:cTn>
+                              </p:par>
+                              <p:par>
+                                <p:cTn id="18" presetID="10" presetClass="entr" presetSubtype="0" fill="hold" grpId="0" nodeType="withEffect">
+                                  <p:stCondLst>
+                                    <p:cond delay="0"/>
+                                  </p:stCondLst>
+                                  <p:childTnLst>
+                                    <p:set>
+                                      <p:cBhvr>
+                                        <p:cTn id="19" dur="1" fill="hold">
+                                          <p:stCondLst>
+                                            <p:cond delay="0"/>
+                                          </p:stCondLst>
+                                        </p:cTn>
+                                        <p:tgtEl>
+                                          <p:spTgt spid="3">
+                                            <p:txEl>
+                                              <p:pRg st="3" end="3"/>
+                                            </p:txEl>
+                                          </p:spTgt>
+                                        </p:tgtEl>
+                                        <p:attrNameLst>
+                                          <p:attrName>style.visibility</p:attrName>
+                                        </p:attrNameLst>
+                                      </p:cBhvr>
+                                      <p:to>
+                                        <p:strVal val="visible"/>
+                                      </p:to>
+                                    </p:set>
+                                    <p:animEffect transition="in" filter="fade">
+                                      <p:cBhvr>
+                                        <p:cTn id="20" dur="500"/>
+                                        <p:tgtEl>
+                                          <p:spTgt spid="3">
+                                            <p:txEl>
+                                              <p:pRg st="3" end="3"/>
+                                            </p:txEl>
+                                          </p:spTgt>
+                                        </p:tgtEl>
+                                      </p:cBhvr>
+                                    </p:animEffect>
+                                  </p:childTnLst>
+                                </p:cTn>
+                              </p:par>
+                              <p:par>
+                                <p:cTn id="21" presetID="10" presetClass="entr" presetSubtype="0" fill="hold" grpId="0" nodeType="withEffect">
+                                  <p:stCondLst>
+                                    <p:cond delay="0"/>
+                                  </p:stCondLst>
+                                  <p:childTnLst>
+                                    <p:set>
+                                      <p:cBhvr>
+                                        <p:cTn id="22" dur="1" fill="hold">
+                                          <p:stCondLst>
+                                            <p:cond delay="0"/>
+                                          </p:stCondLst>
+                                        </p:cTn>
+                                        <p:tgtEl>
+                                          <p:spTgt spid="3">
+                                            <p:txEl>
+                                              <p:pRg st="4" end="4"/>
+                                            </p:txEl>
+                                          </p:spTgt>
+                                        </p:tgtEl>
+                                        <p:attrNameLst>
+                                          <p:attrName>style.visibility</p:attrName>
+                                        </p:attrNameLst>
+                                      </p:cBhvr>
+                                      <p:to>
+                                        <p:strVal val="visible"/>
+                                      </p:to>
+                                    </p:set>
+                                    <p:animEffect transition="in" filter="fade">
+                                      <p:cBhvr>
+                                        <p:cTn id="23" dur="500"/>
+                                        <p:tgtEl>
+                                          <p:spTgt spid="3">
+                                            <p:txEl>
+                                              <p:pRg st="4" end="4"/>
+                                            </p:txEl>
+                                          </p:spTgt>
+                                        </p:tgtEl>
+                                      </p:cBhvr>
+                                    </p:animEffect>
+                                  </p:childTnLst>
+                                </p:cTn>
+                              </p:par>
+                            </p:childTnLst>
+                          </p:cTn>
+                        </p:par>
+                      </p:childTnLst>
+                    </p:cTn>
+                  </p:par>
+                  <p:par>
+                    <p:cTn id="24" fill="hold">
+                      <p:stCondLst>
+                        <p:cond delay="indefinite"/>
+                      </p:stCondLst>
+                      <p:childTnLst>
+                        <p:par>
+                          <p:cTn id="25" fill="hold">
+                            <p:stCondLst>
+                              <p:cond delay="0"/>
+                            </p:stCondLst>
+                            <p:childTnLst>
+                              <p:par>
+                                <p:cTn id="26" presetID="10" presetClass="entr" presetSubtype="0" fill="hold" grpId="0" nodeType="clickEffect">
+                                  <p:stCondLst>
+                                    <p:cond delay="0"/>
+                                  </p:stCondLst>
+                                  <p:childTnLst>
+                                    <p:set>
+                                      <p:cBhvr>
+                                        <p:cTn id="27" dur="1" fill="hold">
+                                          <p:stCondLst>
+                                            <p:cond delay="0"/>
+                                          </p:stCondLst>
+                                        </p:cTn>
+                                        <p:tgtEl>
+                                          <p:spTgt spid="3">
+                                            <p:txEl>
+                                              <p:pRg st="5" end="5"/>
+                                            </p:txEl>
+                                          </p:spTgt>
+                                        </p:tgtEl>
+                                        <p:attrNameLst>
+                                          <p:attrName>style.visibility</p:attrName>
+                                        </p:attrNameLst>
+                                      </p:cBhvr>
+                                      <p:to>
+                                        <p:strVal val="visible"/>
+                                      </p:to>
+                                    </p:set>
+                                    <p:animEffect transition="in" filter="fade">
+                                      <p:cBhvr>
+                                        <p:cTn id="28" dur="500"/>
+                                        <p:tgtEl>
+                                          <p:spTgt spid="3">
+                                            <p:txEl>
+                                              <p:pRg st="5" end="5"/>
+                                            </p:txEl>
+                                          </p:spTgt>
+                                        </p:tgtEl>
+                                      </p:cBhvr>
+                                    </p:animEffect>
+                                  </p:childTnLst>
+                                </p:cTn>
+                              </p:par>
+                            </p:childTnLst>
+                          </p:cTn>
+                        </p:par>
+                      </p:childTnLst>
+                    </p:cTn>
+                  </p:par>
+                </p:childTnLst>
+              </p:cTn>
+              <p:prevCondLst>
+                <p:cond evt="onPrev" delay="0">
+                  <p:tgtEl>
+                    <p:sldTgt/>
+                  </p:tgtEl>
+                </p:cond>
+              </p:prevCondLst>
+              <p:nextCondLst>
+                <p:cond evt="onNext" delay="0">
+                  <p:tgtEl>
+                    <p:sldTgt/>
+                  </p:tgtEl>
+                </p:cond>
+              </p:nextCondLst>
+            </p:seq>
+          </p:childTnLst>
+        </p:cTn>
+      </p:par>
+    </p:tnLst>
+    <p:bldLst>
+      <p:bldP spid="3" grpId="0" uiExpand="1" build="p"/>
+    </p:bldLst>
+  </p:timing>
+</p:sld>
+</file>
+
+<file path=ppt/slides/slide28.xml><?xml version="1.0" encoding="utf-8"?>
+<p:sld xmlns:a="http://schemas.openxmlformats.org/drawingml/2006/main" xmlns:r="http://schemas.openxmlformats.org/officeDocument/2006/relationships" xmlns:p="http://schemas.openxmlformats.org/presentationml/2006/main">
+  <p:cSld>
+    <p:spTree>
+      <p:nvGrpSpPr>
+        <p:cNvPr id="1" name=""/>
+        <p:cNvGrpSpPr/>
+        <p:nvPr/>
+      </p:nvGrpSpPr>
+      <p:grpSpPr>
+        <a:xfrm>
+          <a:off x="0" y="0"/>
+          <a:ext cx="0" cy="0"/>
+          <a:chOff x="0" y="0"/>
+          <a:chExt cx="0" cy="0"/>
+        </a:xfrm>
+      </p:grpSpPr>
+      <p:sp>
+        <p:nvSpPr>
+          <p:cNvPr id="2" name="Title 1">
+            <a:extLst>
+              <a:ext uri="{FF2B5EF4-FFF2-40B4-BE49-F238E27FC236}">
+                <a16:creationId xmlns:a16="http://schemas.microsoft.com/office/drawing/2014/main" id="{115D9107-F124-841C-7948-02D0BFC7152F}"/>
+              </a:ext>
+            </a:extLst>
+          </p:cNvPr>
+          <p:cNvSpPr>
+            <a:spLocks noGrp="1"/>
+          </p:cNvSpPr>
+          <p:nvPr>
+            <p:ph type="title"/>
+          </p:nvPr>
+        </p:nvSpPr>
+        <p:spPr/>
+        <p:txBody>
+          <a:bodyPr/>
+          <a:lstStyle/>
+          <a:p>
+            <a:r>
+              <a:rPr lang="en-US" dirty="0"/>
+              <a:t>Unit 4 – Binding to List</a:t>
+            </a:r>
+          </a:p>
+        </p:txBody>
+      </p:sp>
+      <p:sp>
+        <p:nvSpPr>
+          <p:cNvPr id="3" name="Content Placeholder 2">
+            <a:extLst>
+              <a:ext uri="{FF2B5EF4-FFF2-40B4-BE49-F238E27FC236}">
+                <a16:creationId xmlns:a16="http://schemas.microsoft.com/office/drawing/2014/main" id="{DCC1E6EA-5BB3-A195-A198-2114C5F67049}"/>
+              </a:ext>
+            </a:extLst>
+          </p:cNvPr>
+          <p:cNvSpPr>
+            <a:spLocks noGrp="1"/>
+          </p:cNvSpPr>
+          <p:nvPr>
+            <p:ph idx="1"/>
+          </p:nvPr>
+        </p:nvSpPr>
+        <p:spPr/>
+        <p:txBody>
+          <a:bodyPr/>
+          <a:lstStyle/>
+          <a:p>
+            <a:r>
+              <a:rPr lang="en-US" dirty="0"/>
+              <a:t>Binding Selected Item in List</a:t>
+            </a:r>
+          </a:p>
+          <a:p>
+            <a:pPr lvl="1"/>
+            <a:r>
+              <a:rPr lang="en-US" dirty="0"/>
+              <a:t>We want to know what item in </a:t>
+            </a:r>
+            <a:r>
+              <a:rPr lang="en-US" dirty="0" err="1"/>
+              <a:t>ListBox</a:t>
+            </a:r>
+            <a:r>
+              <a:rPr lang="en-US" dirty="0"/>
+              <a:t> the user selected</a:t>
+            </a:r>
+          </a:p>
+          <a:p>
+            <a:pPr lvl="1"/>
+            <a:r>
+              <a:rPr lang="en-US" dirty="0"/>
+              <a:t>Steps</a:t>
+            </a:r>
+          </a:p>
+          <a:p>
+            <a:pPr lvl="2"/>
+            <a:r>
+              <a:rPr lang="en-US" dirty="0"/>
+              <a:t>In ViewModel, add property in ViewModel of type T  (type of object in list)</a:t>
+            </a:r>
+          </a:p>
+          <a:p>
+            <a:pPr lvl="2"/>
+            <a:r>
+              <a:rPr lang="en-US" dirty="0"/>
+              <a:t>In View, bind </a:t>
+            </a:r>
+            <a:r>
+              <a:rPr lang="en-US" dirty="0" err="1"/>
+              <a:t>SelectedItem</a:t>
+            </a:r>
+            <a:r>
+              <a:rPr lang="en-US" dirty="0"/>
+              <a:t> property of </a:t>
+            </a:r>
+            <a:r>
+              <a:rPr lang="en-US" dirty="0" err="1"/>
+              <a:t>ListBox</a:t>
+            </a:r>
+            <a:endParaRPr lang="en-US" dirty="0"/>
+          </a:p>
+          <a:p>
+            <a:r>
+              <a:rPr lang="en-US" dirty="0">
+                <a:solidFill>
+                  <a:srgbClr val="00B050"/>
+                </a:solidFill>
+              </a:rPr>
+              <a:t>Example – Binding to Selected Item</a:t>
+            </a:r>
+          </a:p>
+        </p:txBody>
+      </p:sp>
+    </p:spTree>
+    <p:extLst>
+      <p:ext uri="{BB962C8B-B14F-4D97-AF65-F5344CB8AC3E}">
+        <p14:creationId xmlns:p14="http://schemas.microsoft.com/office/powerpoint/2010/main" val="3343508095"/>
+      </p:ext>
+    </p:extLst>
+  </p:cSld>
+  <p:clrMapOvr>
+    <a:masterClrMapping/>
+  </p:clrMapOvr>
+</p:sld>
+</file>
+
+<file path=ppt/slides/slide29.xml><?xml version="1.0" encoding="utf-8"?>
+<p:sld xmlns:a="http://schemas.openxmlformats.org/drawingml/2006/main" xmlns:r="http://schemas.openxmlformats.org/officeDocument/2006/relationships" xmlns:p="http://schemas.openxmlformats.org/presentationml/2006/main">
+  <p:cSld>
+    <p:spTree>
+      <p:nvGrpSpPr>
+        <p:cNvPr id="1" name=""/>
+        <p:cNvGrpSpPr/>
+        <p:nvPr/>
+      </p:nvGrpSpPr>
+      <p:grpSpPr>
+        <a:xfrm>
+          <a:off x="0" y="0"/>
+          <a:ext cx="0" cy="0"/>
+          <a:chOff x="0" y="0"/>
+          <a:chExt cx="0" cy="0"/>
+        </a:xfrm>
+      </p:grpSpPr>
+      <p:sp>
+        <p:nvSpPr>
+          <p:cNvPr id="2" name="Title 1">
+            <a:extLst>
+              <a:ext uri="{FF2B5EF4-FFF2-40B4-BE49-F238E27FC236}">
+                <a16:creationId xmlns:a16="http://schemas.microsoft.com/office/drawing/2014/main" id="{2249022B-90B9-FBC1-E96A-15B0F32EC2DD}"/>
+              </a:ext>
+            </a:extLst>
+          </p:cNvPr>
+          <p:cNvSpPr>
+            <a:spLocks noGrp="1"/>
+          </p:cNvSpPr>
+          <p:nvPr>
+            <p:ph type="title"/>
+          </p:nvPr>
+        </p:nvSpPr>
+        <p:spPr/>
+        <p:txBody>
+          <a:bodyPr/>
+          <a:lstStyle/>
+          <a:p>
+            <a:r>
+              <a:rPr lang="en-US" dirty="0">
+                <a:solidFill>
+                  <a:schemeClr val="accent5">
+                    <a:lumMod val="75000"/>
+                  </a:schemeClr>
+                </a:solidFill>
+              </a:rPr>
+              <a:t>Exercise 4 – Binding to List</a:t>
+            </a:r>
+          </a:p>
+        </p:txBody>
+      </p:sp>
+      <p:sp>
+        <p:nvSpPr>
+          <p:cNvPr id="3" name="Content Placeholder 2">
+            <a:extLst>
+              <a:ext uri="{FF2B5EF4-FFF2-40B4-BE49-F238E27FC236}">
+                <a16:creationId xmlns:a16="http://schemas.microsoft.com/office/drawing/2014/main" id="{4EC0DF58-7926-E27C-9B1B-7A522DB0B81A}"/>
+              </a:ext>
+            </a:extLst>
+          </p:cNvPr>
+          <p:cNvSpPr>
+            <a:spLocks noGrp="1"/>
+          </p:cNvSpPr>
+          <p:nvPr>
+            <p:ph idx="1"/>
+          </p:nvPr>
+        </p:nvSpPr>
+        <p:spPr/>
+        <p:txBody>
+          <a:bodyPr/>
+          <a:lstStyle/>
+          <a:p>
+            <a:r>
+              <a:rPr lang="en-US" dirty="0"/>
+              <a:t>What You’ll Learn</a:t>
+            </a:r>
+          </a:p>
+          <a:p>
+            <a:pPr lvl="1"/>
+            <a:r>
+              <a:rPr lang="en-US" dirty="0"/>
+              <a:t>How to bind the items in a </a:t>
+            </a:r>
+            <a:r>
+              <a:rPr lang="en-US" dirty="0" err="1"/>
+              <a:t>ListBox</a:t>
+            </a:r>
+            <a:r>
+              <a:rPr lang="en-US" dirty="0"/>
+              <a:t> to a list of objects</a:t>
+            </a:r>
+          </a:p>
+          <a:p>
+            <a:pPr lvl="1"/>
+            <a:r>
+              <a:rPr lang="en-US" dirty="0"/>
+              <a:t>How to bind the selected item</a:t>
+            </a:r>
+          </a:p>
+          <a:p>
+            <a:r>
+              <a:rPr lang="en-US" dirty="0"/>
+              <a:t>Exercise</a:t>
+            </a:r>
+          </a:p>
+          <a:p>
+            <a:pPr lvl="1"/>
+            <a:r>
+              <a:rPr lang="en-US" dirty="0"/>
+              <a:t>Start from existing project: Exercise_4_BindingToList</a:t>
+            </a:r>
+          </a:p>
+          <a:p>
+            <a:pPr lvl="1"/>
+            <a:r>
+              <a:rPr lang="en-US" dirty="0"/>
+              <a:t>Create the ViewModel</a:t>
+            </a:r>
+          </a:p>
+          <a:p>
+            <a:pPr lvl="1"/>
+            <a:r>
+              <a:rPr lang="en-US" dirty="0"/>
+              <a:t>Set the DataContext</a:t>
+            </a:r>
+          </a:p>
+          <a:p>
+            <a:pPr lvl="1"/>
+            <a:r>
+              <a:rPr lang="en-US" dirty="0"/>
+              <a:t>Create the </a:t>
+            </a:r>
+            <a:r>
+              <a:rPr lang="en-US" dirty="0" err="1"/>
+              <a:t>ListBox</a:t>
+            </a:r>
+            <a:endParaRPr lang="en-US" dirty="0"/>
+          </a:p>
+          <a:p>
+            <a:pPr lvl="1"/>
+            <a:r>
+              <a:rPr lang="en-US" dirty="0"/>
+              <a:t>Fix the </a:t>
+            </a:r>
+            <a:r>
+              <a:rPr lang="en-US" dirty="0" err="1"/>
+              <a:t>ListBox</a:t>
+            </a:r>
+            <a:r>
+              <a:rPr lang="en-US" dirty="0"/>
+              <a:t> entries</a:t>
+            </a:r>
+          </a:p>
+          <a:p>
+            <a:pPr lvl="1"/>
+            <a:r>
+              <a:rPr lang="en-US" dirty="0"/>
+              <a:t>Display selected item info</a:t>
+            </a:r>
+          </a:p>
+        </p:txBody>
+      </p:sp>
+    </p:spTree>
+    <p:extLst>
+      <p:ext uri="{BB962C8B-B14F-4D97-AF65-F5344CB8AC3E}">
+        <p14:creationId xmlns:p14="http://schemas.microsoft.com/office/powerpoint/2010/main" val="60035143"/>
+      </p:ext>
+    </p:extLst>
+  </p:cSld>
+  <p:clrMapOvr>
+    <a:masterClrMapping/>
+  </p:clrMapOvr>
 </p:sld>
 </file>
 

</xml_diff>

<commit_message>
Add unit 6 content
</commit_message>
<xml_diff>
--- a/WPF-Workshop-Sexton-Oct2023.pptx
+++ b/WPF-Workshop-Sexton-Oct2023.pptx
@@ -5,7 +5,7 @@
     <p:sldMasterId id="2147483896" r:id="rId1"/>
   </p:sldMasterIdLst>
   <p:notesMasterIdLst>
-    <p:notesMasterId r:id="rId31"/>
+    <p:notesMasterId r:id="rId37"/>
   </p:notesMasterIdLst>
   <p:sldIdLst>
     <p:sldId id="256" r:id="rId2"/>
@@ -37,6 +37,12 @@
     <p:sldId id="283" r:id="rId28"/>
     <p:sldId id="284" r:id="rId29"/>
     <p:sldId id="285" r:id="rId30"/>
+    <p:sldId id="286" r:id="rId31"/>
+    <p:sldId id="287" r:id="rId32"/>
+    <p:sldId id="288" r:id="rId33"/>
+    <p:sldId id="289" r:id="rId34"/>
+    <p:sldId id="290" r:id="rId35"/>
+    <p:sldId id="291" r:id="rId36"/>
   </p:sldIdLst>
   <p:sldSz cx="12192000" cy="6858000"/>
   <p:notesSz cx="6858000" cy="9144000"/>
@@ -2531,6 +2537,323 @@
 </p:notes>
 </file>
 
+<file path=ppt/notesSlides/notesSlide27.xml><?xml version="1.0" encoding="utf-8"?>
+<p:notes xmlns:a="http://schemas.openxmlformats.org/drawingml/2006/main" xmlns:r="http://schemas.openxmlformats.org/officeDocument/2006/relationships" xmlns:p="http://schemas.openxmlformats.org/presentationml/2006/main">
+  <p:cSld>
+    <p:spTree>
+      <p:nvGrpSpPr>
+        <p:cNvPr id="1" name=""/>
+        <p:cNvGrpSpPr/>
+        <p:nvPr/>
+      </p:nvGrpSpPr>
+      <p:grpSpPr>
+        <a:xfrm>
+          <a:off x="0" y="0"/>
+          <a:ext cx="0" cy="0"/>
+          <a:chOff x="0" y="0"/>
+          <a:chExt cx="0" cy="0"/>
+        </a:xfrm>
+      </p:grpSpPr>
+      <p:sp>
+        <p:nvSpPr>
+          <p:cNvPr id="2" name="Slide Image Placeholder 1"/>
+          <p:cNvSpPr>
+            <a:spLocks noGrp="1" noRot="1" noChangeAspect="1"/>
+          </p:cNvSpPr>
+          <p:nvPr>
+            <p:ph type="sldImg"/>
+          </p:nvPr>
+        </p:nvSpPr>
+        <p:spPr/>
+      </p:sp>
+      <p:sp>
+        <p:nvSpPr>
+          <p:cNvPr id="3" name="Notes Placeholder 2"/>
+          <p:cNvSpPr>
+            <a:spLocks noGrp="1"/>
+          </p:cNvSpPr>
+          <p:nvPr>
+            <p:ph type="body" idx="1"/>
+          </p:nvPr>
+        </p:nvSpPr>
+        <p:spPr/>
+        <p:txBody>
+          <a:bodyPr/>
+          <a:lstStyle/>
+          <a:p>
+            <a:r>
+              <a:rPr lang="en-US" dirty="0"/>
+              <a:t>Dictate - They are used in a variety of places, but we'll look at lists first</a:t>
+            </a:r>
+          </a:p>
+          <a:p>
+            <a:r>
+              <a:rPr lang="en-US" dirty="0"/>
+              <a:t>Text comes from - You saw this with the Person; w/o </a:t>
+            </a:r>
+            <a:r>
+              <a:rPr lang="en-US" dirty="0" err="1"/>
+              <a:t>ToString</a:t>
+            </a:r>
+            <a:r>
+              <a:rPr lang="en-US" dirty="0"/>
+              <a:t>, you just got the type of the object</a:t>
+            </a:r>
+          </a:p>
+          <a:p>
+            <a:r>
+              <a:rPr lang="en-US" dirty="0"/>
+              <a:t>LAST – Example</a:t>
+            </a:r>
+          </a:p>
+          <a:p>
+            <a:r>
+              <a:rPr lang="en-US" dirty="0"/>
+              <a:t>- Show ViewModel, View, then run-time</a:t>
+            </a:r>
+          </a:p>
+        </p:txBody>
+      </p:sp>
+      <p:sp>
+        <p:nvSpPr>
+          <p:cNvPr id="4" name="Slide Number Placeholder 3"/>
+          <p:cNvSpPr>
+            <a:spLocks noGrp="1"/>
+          </p:cNvSpPr>
+          <p:nvPr>
+            <p:ph type="sldNum" sz="quarter" idx="5"/>
+          </p:nvPr>
+        </p:nvSpPr>
+        <p:spPr/>
+        <p:txBody>
+          <a:bodyPr/>
+          <a:lstStyle/>
+          <a:p>
+            <a:fld id="{52D86A8A-0D3B-4DD1-BCA4-15D29761E8A6}" type="slidenum">
+              <a:rPr lang="en-US" smtClean="0"/>
+              <a:t>30</a:t>
+            </a:fld>
+            <a:endParaRPr lang="en-US"/>
+          </a:p>
+        </p:txBody>
+      </p:sp>
+    </p:spTree>
+    <p:extLst>
+      <p:ext uri="{BB962C8B-B14F-4D97-AF65-F5344CB8AC3E}">
+        <p14:creationId xmlns:p14="http://schemas.microsoft.com/office/powerpoint/2010/main" val="1710443305"/>
+      </p:ext>
+    </p:extLst>
+  </p:cSld>
+  <p:clrMapOvr>
+    <a:masterClrMapping/>
+  </p:clrMapOvr>
+</p:notes>
+</file>
+
+<file path=ppt/notesSlides/notesSlide28.xml><?xml version="1.0" encoding="utf-8"?>
+<p:notes xmlns:a="http://schemas.openxmlformats.org/drawingml/2006/main" xmlns:r="http://schemas.openxmlformats.org/officeDocument/2006/relationships" xmlns:p="http://schemas.openxmlformats.org/presentationml/2006/main">
+  <p:cSld>
+    <p:spTree>
+      <p:nvGrpSpPr>
+        <p:cNvPr id="1" name=""/>
+        <p:cNvGrpSpPr/>
+        <p:nvPr/>
+      </p:nvGrpSpPr>
+      <p:grpSpPr>
+        <a:xfrm>
+          <a:off x="0" y="0"/>
+          <a:ext cx="0" cy="0"/>
+          <a:chOff x="0" y="0"/>
+          <a:chExt cx="0" cy="0"/>
+        </a:xfrm>
+      </p:grpSpPr>
+      <p:sp>
+        <p:nvSpPr>
+          <p:cNvPr id="2" name="Slide Image Placeholder 1"/>
+          <p:cNvSpPr>
+            <a:spLocks noGrp="1" noRot="1" noChangeAspect="1"/>
+          </p:cNvSpPr>
+          <p:nvPr>
+            <p:ph type="sldImg"/>
+          </p:nvPr>
+        </p:nvSpPr>
+        <p:spPr/>
+      </p:sp>
+      <p:sp>
+        <p:nvSpPr>
+          <p:cNvPr id="3" name="Notes Placeholder 2"/>
+          <p:cNvSpPr>
+            <a:spLocks noGrp="1"/>
+          </p:cNvSpPr>
+          <p:nvPr>
+            <p:ph type="body" idx="1"/>
+          </p:nvPr>
+        </p:nvSpPr>
+        <p:spPr/>
+        <p:txBody>
+          <a:bodyPr/>
+          <a:lstStyle/>
+          <a:p>
+            <a:r>
+              <a:rPr lang="en-US" dirty="0"/>
+              <a:t>LAST: </a:t>
+            </a:r>
+            <a:r>
+              <a:rPr lang="en-US" dirty="0" err="1"/>
+              <a:t>ContentTemplate</a:t>
+            </a:r>
+            <a:endParaRPr lang="en-US" dirty="0"/>
+          </a:p>
+        </p:txBody>
+      </p:sp>
+      <p:sp>
+        <p:nvSpPr>
+          <p:cNvPr id="4" name="Slide Number Placeholder 3"/>
+          <p:cNvSpPr>
+            <a:spLocks noGrp="1"/>
+          </p:cNvSpPr>
+          <p:nvPr>
+            <p:ph type="sldNum" sz="quarter" idx="5"/>
+          </p:nvPr>
+        </p:nvSpPr>
+        <p:spPr/>
+        <p:txBody>
+          <a:bodyPr/>
+          <a:lstStyle/>
+          <a:p>
+            <a:fld id="{52D86A8A-0D3B-4DD1-BCA4-15D29761E8A6}" type="slidenum">
+              <a:rPr lang="en-US" smtClean="0"/>
+              <a:t>31</a:t>
+            </a:fld>
+            <a:endParaRPr lang="en-US"/>
+          </a:p>
+        </p:txBody>
+      </p:sp>
+    </p:spTree>
+    <p:extLst>
+      <p:ext uri="{BB962C8B-B14F-4D97-AF65-F5344CB8AC3E}">
+        <p14:creationId xmlns:p14="http://schemas.microsoft.com/office/powerpoint/2010/main" val="3300006305"/>
+      </p:ext>
+    </p:extLst>
+  </p:cSld>
+  <p:clrMapOvr>
+    <a:masterClrMapping/>
+  </p:clrMapOvr>
+</p:notes>
+</file>
+
+<file path=ppt/notesSlides/notesSlide29.xml><?xml version="1.0" encoding="utf-8"?>
+<p:notes xmlns:a="http://schemas.openxmlformats.org/drawingml/2006/main" xmlns:r="http://schemas.openxmlformats.org/officeDocument/2006/relationships" xmlns:p="http://schemas.openxmlformats.org/presentationml/2006/main">
+  <p:cSld>
+    <p:spTree>
+      <p:nvGrpSpPr>
+        <p:cNvPr id="1" name=""/>
+        <p:cNvGrpSpPr/>
+        <p:nvPr/>
+      </p:nvGrpSpPr>
+      <p:grpSpPr>
+        <a:xfrm>
+          <a:off x="0" y="0"/>
+          <a:ext cx="0" cy="0"/>
+          <a:chOff x="0" y="0"/>
+          <a:chExt cx="0" cy="0"/>
+        </a:xfrm>
+      </p:grpSpPr>
+      <p:sp>
+        <p:nvSpPr>
+          <p:cNvPr id="2" name="Slide Image Placeholder 1"/>
+          <p:cNvSpPr>
+            <a:spLocks noGrp="1" noRot="1" noChangeAspect="1"/>
+          </p:cNvSpPr>
+          <p:nvPr>
+            <p:ph type="sldImg"/>
+          </p:nvPr>
+        </p:nvSpPr>
+        <p:spPr/>
+      </p:sp>
+      <p:sp>
+        <p:nvSpPr>
+          <p:cNvPr id="3" name="Notes Placeholder 2"/>
+          <p:cNvSpPr>
+            <a:spLocks noGrp="1"/>
+          </p:cNvSpPr>
+          <p:nvPr>
+            <p:ph type="body" idx="1"/>
+          </p:nvPr>
+        </p:nvSpPr>
+        <p:spPr/>
+        <p:txBody>
+          <a:bodyPr/>
+          <a:lstStyle/>
+          <a:p>
+            <a:r>
+              <a:rPr lang="en-US" dirty="0"/>
+              <a:t>LAST: Benefits</a:t>
+            </a:r>
+          </a:p>
+          <a:p>
+            <a:r>
+              <a:rPr lang="en-US" dirty="0" err="1"/>
+              <a:t>CanExecute</a:t>
+            </a:r>
+            <a:r>
+              <a:rPr lang="en-US" dirty="0"/>
+              <a:t> - Build logic into command</a:t>
+            </a:r>
+          </a:p>
+          <a:p>
+            <a:r>
+              <a:rPr lang="en-US" dirty="0"/>
+              <a:t>    - Command can have state, or require certain pre-conditions</a:t>
+            </a:r>
+          </a:p>
+          <a:p>
+            <a:r>
+              <a:rPr lang="en-US" dirty="0"/>
+              <a:t>    - automatically used by UI controls to grey out controls when execution not possible</a:t>
+            </a:r>
+          </a:p>
+          <a:p>
+            <a:endParaRPr lang="en-US" dirty="0"/>
+          </a:p>
+        </p:txBody>
+      </p:sp>
+      <p:sp>
+        <p:nvSpPr>
+          <p:cNvPr id="4" name="Slide Number Placeholder 3"/>
+          <p:cNvSpPr>
+            <a:spLocks noGrp="1"/>
+          </p:cNvSpPr>
+          <p:nvPr>
+            <p:ph type="sldNum" sz="quarter" idx="5"/>
+          </p:nvPr>
+        </p:nvSpPr>
+        <p:spPr/>
+        <p:txBody>
+          <a:bodyPr/>
+          <a:lstStyle/>
+          <a:p>
+            <a:fld id="{52D86A8A-0D3B-4DD1-BCA4-15D29761E8A6}" type="slidenum">
+              <a:rPr lang="en-US" smtClean="0"/>
+              <a:t>33</a:t>
+            </a:fld>
+            <a:endParaRPr lang="en-US"/>
+          </a:p>
+        </p:txBody>
+      </p:sp>
+    </p:spTree>
+    <p:extLst>
+      <p:ext uri="{BB962C8B-B14F-4D97-AF65-F5344CB8AC3E}">
+        <p14:creationId xmlns:p14="http://schemas.microsoft.com/office/powerpoint/2010/main" val="3065635492"/>
+      </p:ext>
+    </p:extLst>
+  </p:cSld>
+  <p:clrMapOvr>
+    <a:masterClrMapping/>
+  </p:clrMapOvr>
+</p:notes>
+</file>
+
 <file path=ppt/notesSlides/notesSlide3.xml><?xml version="1.0" encoding="utf-8"?>
 <p:notes xmlns:a="http://schemas.openxmlformats.org/drawingml/2006/main" xmlns:r="http://schemas.openxmlformats.org/officeDocument/2006/relationships" xmlns:p="http://schemas.openxmlformats.org/presentationml/2006/main">
   <p:cSld>
@@ -2609,6 +2932,121 @@
     <p:extLst>
       <p:ext uri="{BB962C8B-B14F-4D97-AF65-F5344CB8AC3E}">
         <p14:creationId xmlns:p14="http://schemas.microsoft.com/office/powerpoint/2010/main" val="1411583224"/>
+      </p:ext>
+    </p:extLst>
+  </p:cSld>
+  <p:clrMapOvr>
+    <a:masterClrMapping/>
+  </p:clrMapOvr>
+</p:notes>
+</file>
+
+<file path=ppt/notesSlides/notesSlide30.xml><?xml version="1.0" encoding="utf-8"?>
+<p:notes xmlns:a="http://schemas.openxmlformats.org/drawingml/2006/main" xmlns:r="http://schemas.openxmlformats.org/officeDocument/2006/relationships" xmlns:p="http://schemas.openxmlformats.org/presentationml/2006/main">
+  <p:cSld>
+    <p:spTree>
+      <p:nvGrpSpPr>
+        <p:cNvPr id="1" name=""/>
+        <p:cNvGrpSpPr/>
+        <p:nvPr/>
+      </p:nvGrpSpPr>
+      <p:grpSpPr>
+        <a:xfrm>
+          <a:off x="0" y="0"/>
+          <a:ext cx="0" cy="0"/>
+          <a:chOff x="0" y="0"/>
+          <a:chExt cx="0" cy="0"/>
+        </a:xfrm>
+      </p:grpSpPr>
+      <p:sp>
+        <p:nvSpPr>
+          <p:cNvPr id="2" name="Slide Image Placeholder 1"/>
+          <p:cNvSpPr>
+            <a:spLocks noGrp="1" noRot="1" noChangeAspect="1"/>
+          </p:cNvSpPr>
+          <p:nvPr>
+            <p:ph type="sldImg"/>
+          </p:nvPr>
+        </p:nvSpPr>
+        <p:spPr/>
+      </p:sp>
+      <p:sp>
+        <p:nvSpPr>
+          <p:cNvPr id="3" name="Notes Placeholder 2"/>
+          <p:cNvSpPr>
+            <a:spLocks noGrp="1"/>
+          </p:cNvSpPr>
+          <p:nvPr>
+            <p:ph type="body" idx="1"/>
+          </p:nvPr>
+        </p:nvSpPr>
+        <p:spPr/>
+        <p:txBody>
+          <a:bodyPr/>
+          <a:lstStyle/>
+          <a:p>
+            <a:r>
+              <a:rPr lang="en-US" dirty="0"/>
+              <a:t>LAST: Example</a:t>
+            </a:r>
+          </a:p>
+          <a:p>
+            <a:r>
+              <a:rPr lang="en-US" dirty="0"/>
+              <a:t>- Look at </a:t>
+            </a:r>
+            <a:r>
+              <a:rPr lang="en-US" dirty="0" err="1"/>
+              <a:t>DelegateCommand</a:t>
+            </a:r>
+            <a:endParaRPr lang="en-US" dirty="0"/>
+          </a:p>
+          <a:p>
+            <a:r>
+              <a:rPr lang="en-US" i="0" dirty="0"/>
+              <a:t>- </a:t>
+            </a:r>
+            <a:r>
+              <a:rPr lang="en-US" sz="1800" i="0" dirty="0">
+                <a:effectLst/>
+                <a:latin typeface="Calibri" panose="020F0502020204030204" pitchFamily="34" charset="0"/>
+              </a:rPr>
+              <a:t>Look at ViewModel; NB lambdas could be methods</a:t>
+            </a:r>
+            <a:endParaRPr lang="en-US" i="0" dirty="0"/>
+          </a:p>
+          <a:p>
+            <a:endParaRPr lang="en-US" dirty="0"/>
+          </a:p>
+        </p:txBody>
+      </p:sp>
+      <p:sp>
+        <p:nvSpPr>
+          <p:cNvPr id="4" name="Slide Number Placeholder 3"/>
+          <p:cNvSpPr>
+            <a:spLocks noGrp="1"/>
+          </p:cNvSpPr>
+          <p:nvPr>
+            <p:ph type="sldNum" sz="quarter" idx="5"/>
+          </p:nvPr>
+        </p:nvSpPr>
+        <p:spPr/>
+        <p:txBody>
+          <a:bodyPr/>
+          <a:lstStyle/>
+          <a:p>
+            <a:fld id="{52D86A8A-0D3B-4DD1-BCA4-15D29761E8A6}" type="slidenum">
+              <a:rPr lang="en-US" smtClean="0"/>
+              <a:t>34</a:t>
+            </a:fld>
+            <a:endParaRPr lang="en-US"/>
+          </a:p>
+        </p:txBody>
+      </p:sp>
+    </p:spTree>
+    <p:extLst>
+      <p:ext uri="{BB962C8B-B14F-4D97-AF65-F5344CB8AC3E}">
+        <p14:creationId xmlns:p14="http://schemas.microsoft.com/office/powerpoint/2010/main" val="1509336187"/>
       </p:ext>
     </p:extLst>
   </p:cSld>
@@ -20856,6 +21294,3319 @@
 </p:sld>
 </file>
 
+<file path=ppt/slides/slide30.xml><?xml version="1.0" encoding="utf-8"?>
+<p:sld xmlns:a="http://schemas.openxmlformats.org/drawingml/2006/main" xmlns:r="http://schemas.openxmlformats.org/officeDocument/2006/relationships" xmlns:p="http://schemas.openxmlformats.org/presentationml/2006/main">
+  <p:cSld>
+    <p:spTree>
+      <p:nvGrpSpPr>
+        <p:cNvPr id="1" name=""/>
+        <p:cNvGrpSpPr/>
+        <p:nvPr/>
+      </p:nvGrpSpPr>
+      <p:grpSpPr>
+        <a:xfrm>
+          <a:off x="0" y="0"/>
+          <a:ext cx="0" cy="0"/>
+          <a:chOff x="0" y="0"/>
+          <a:chExt cx="0" cy="0"/>
+        </a:xfrm>
+      </p:grpSpPr>
+      <p:sp>
+        <p:nvSpPr>
+          <p:cNvPr id="2" name="Title 1">
+            <a:extLst>
+              <a:ext uri="{FF2B5EF4-FFF2-40B4-BE49-F238E27FC236}">
+                <a16:creationId xmlns:a16="http://schemas.microsoft.com/office/drawing/2014/main" id="{01A7E273-1AA8-F1E2-DC53-D9366CB098A0}"/>
+              </a:ext>
+            </a:extLst>
+          </p:cNvPr>
+          <p:cNvSpPr>
+            <a:spLocks noGrp="1"/>
+          </p:cNvSpPr>
+          <p:nvPr>
+            <p:ph type="title"/>
+          </p:nvPr>
+        </p:nvSpPr>
+        <p:spPr/>
+        <p:txBody>
+          <a:bodyPr/>
+          <a:lstStyle/>
+          <a:p>
+            <a:r>
+              <a:rPr lang="en-US" dirty="0"/>
+              <a:t>Unit 5 – Data Templates</a:t>
+            </a:r>
+          </a:p>
+        </p:txBody>
+      </p:sp>
+      <p:sp>
+        <p:nvSpPr>
+          <p:cNvPr id="3" name="Content Placeholder 2">
+            <a:extLst>
+              <a:ext uri="{FF2B5EF4-FFF2-40B4-BE49-F238E27FC236}">
+                <a16:creationId xmlns:a16="http://schemas.microsoft.com/office/drawing/2014/main" id="{6452C711-3751-289D-E62F-64E3F6D6BC96}"/>
+              </a:ext>
+            </a:extLst>
+          </p:cNvPr>
+          <p:cNvSpPr>
+            <a:spLocks noGrp="1"/>
+          </p:cNvSpPr>
+          <p:nvPr>
+            <p:ph idx="1"/>
+          </p:nvPr>
+        </p:nvSpPr>
+        <p:spPr/>
+        <p:txBody>
+          <a:bodyPr>
+            <a:normAutofit fontScale="77500" lnSpcReduction="20000"/>
+          </a:bodyPr>
+          <a:lstStyle/>
+          <a:p>
+            <a:r>
+              <a:rPr lang="en-US" dirty="0"/>
+              <a:t>Data templates dictate how to format objects in lists</a:t>
+            </a:r>
+          </a:p>
+          <a:p>
+            <a:r>
+              <a:rPr lang="en-US" dirty="0"/>
+              <a:t>Default behavior</a:t>
+            </a:r>
+          </a:p>
+          <a:p>
+            <a:pPr lvl="1"/>
+            <a:r>
+              <a:rPr lang="en-US" dirty="0"/>
+              <a:t>In a list, default data template is just text</a:t>
+            </a:r>
+          </a:p>
+          <a:p>
+            <a:pPr lvl="1"/>
+            <a:r>
+              <a:rPr lang="en-US" dirty="0"/>
+              <a:t>Text comes from calling </a:t>
+            </a:r>
+            <a:r>
+              <a:rPr lang="en-US" dirty="0" err="1"/>
+              <a:t>ToString</a:t>
+            </a:r>
+            <a:r>
+              <a:rPr lang="en-US" dirty="0"/>
+              <a:t> on the object</a:t>
+            </a:r>
+          </a:p>
+          <a:p>
+            <a:r>
+              <a:rPr lang="en-US" dirty="0"/>
+              <a:t>Override data template for a </a:t>
+            </a:r>
+            <a:r>
+              <a:rPr lang="en-US" dirty="0" err="1"/>
+              <a:t>ListBox</a:t>
+            </a:r>
+            <a:endParaRPr lang="en-US" dirty="0"/>
+          </a:p>
+          <a:p>
+            <a:pPr lvl="1"/>
+            <a:r>
+              <a:rPr lang="en-US" dirty="0"/>
+              <a:t>Each item in list binds to object of a particular type  (e.g. Person)</a:t>
+            </a:r>
+          </a:p>
+          <a:p>
+            <a:pPr lvl="1"/>
+            <a:r>
+              <a:rPr lang="en-US" dirty="0"/>
+              <a:t>You create data template to define how to display the data</a:t>
+            </a:r>
+          </a:p>
+          <a:p>
+            <a:r>
+              <a:rPr lang="en-US" dirty="0"/>
+              <a:t>ItemTemplate property of </a:t>
+            </a:r>
+            <a:r>
+              <a:rPr lang="en-US" dirty="0" err="1"/>
+              <a:t>ListBox</a:t>
+            </a:r>
+            <a:endParaRPr lang="en-US" dirty="0"/>
+          </a:p>
+          <a:p>
+            <a:pPr lvl="1"/>
+            <a:r>
+              <a:rPr lang="en-US" dirty="0"/>
+              <a:t>Set to a </a:t>
+            </a:r>
+            <a:r>
+              <a:rPr lang="en-US" dirty="0" err="1"/>
+              <a:t>DataTemplate</a:t>
+            </a:r>
+            <a:endParaRPr lang="en-US" dirty="0"/>
+          </a:p>
+          <a:p>
+            <a:pPr lvl="1"/>
+            <a:r>
+              <a:rPr lang="en-US" dirty="0"/>
+              <a:t>Data context of the data template is the item in the list  (e.g. Person)</a:t>
+            </a:r>
+          </a:p>
+          <a:p>
+            <a:pPr lvl="1"/>
+            <a:r>
+              <a:rPr lang="en-US" dirty="0"/>
+              <a:t>Use normal layout techniques</a:t>
+            </a:r>
+          </a:p>
+          <a:p>
+            <a:pPr lvl="1"/>
+            <a:r>
+              <a:rPr lang="en-US" dirty="0"/>
+              <a:t>Bind to properties on the item in the list  (e.g. Person)</a:t>
+            </a:r>
+          </a:p>
+          <a:p>
+            <a:r>
+              <a:rPr lang="en-US" dirty="0">
+                <a:solidFill>
+                  <a:srgbClr val="00B050"/>
+                </a:solidFill>
+              </a:rPr>
+              <a:t>Example - </a:t>
+            </a:r>
+            <a:r>
+              <a:rPr lang="en-US" dirty="0" err="1">
+                <a:solidFill>
+                  <a:srgbClr val="00B050"/>
+                </a:solidFill>
+              </a:rPr>
+              <a:t>DataTemplate</a:t>
+            </a:r>
+            <a:r>
+              <a:rPr lang="en-US" dirty="0">
+                <a:solidFill>
+                  <a:srgbClr val="00B050"/>
+                </a:solidFill>
+              </a:rPr>
+              <a:t> in a </a:t>
+            </a:r>
+            <a:r>
+              <a:rPr lang="en-US" dirty="0" err="1">
+                <a:solidFill>
+                  <a:srgbClr val="00B050"/>
+                </a:solidFill>
+              </a:rPr>
+              <a:t>ListBox</a:t>
+            </a:r>
+            <a:endParaRPr lang="en-US" dirty="0">
+              <a:solidFill>
+                <a:srgbClr val="00B050"/>
+              </a:solidFill>
+            </a:endParaRPr>
+          </a:p>
+          <a:p>
+            <a:endParaRPr lang="en-US" dirty="0"/>
+          </a:p>
+        </p:txBody>
+      </p:sp>
+    </p:spTree>
+    <p:extLst>
+      <p:ext uri="{BB962C8B-B14F-4D97-AF65-F5344CB8AC3E}">
+        <p14:creationId xmlns:p14="http://schemas.microsoft.com/office/powerpoint/2010/main" val="3573494172"/>
+      </p:ext>
+    </p:extLst>
+  </p:cSld>
+  <p:clrMapOvr>
+    <a:masterClrMapping/>
+  </p:clrMapOvr>
+  <p:timing>
+    <p:tnLst>
+      <p:par>
+        <p:cTn id="1" dur="indefinite" restart="never" nodeType="tmRoot">
+          <p:childTnLst>
+            <p:seq concurrent="1" nextAc="seek">
+              <p:cTn id="2" dur="indefinite" nodeType="mainSeq">
+                <p:childTnLst>
+                  <p:par>
+                    <p:cTn id="3" fill="hold">
+                      <p:stCondLst>
+                        <p:cond delay="indefinite"/>
+                      </p:stCondLst>
+                      <p:childTnLst>
+                        <p:par>
+                          <p:cTn id="4" fill="hold">
+                            <p:stCondLst>
+                              <p:cond delay="0"/>
+                            </p:stCondLst>
+                            <p:childTnLst>
+                              <p:par>
+                                <p:cTn id="5" presetID="10" presetClass="entr" presetSubtype="0" fill="hold" nodeType="clickEffect">
+                                  <p:stCondLst>
+                                    <p:cond delay="0"/>
+                                  </p:stCondLst>
+                                  <p:childTnLst>
+                                    <p:set>
+                                      <p:cBhvr>
+                                        <p:cTn id="6" dur="1" fill="hold">
+                                          <p:stCondLst>
+                                            <p:cond delay="0"/>
+                                          </p:stCondLst>
+                                        </p:cTn>
+                                        <p:tgtEl>
+                                          <p:spTgt spid="3">
+                                            <p:txEl>
+                                              <p:pRg st="0" end="0"/>
+                                            </p:txEl>
+                                          </p:spTgt>
+                                        </p:tgtEl>
+                                        <p:attrNameLst>
+                                          <p:attrName>style.visibility</p:attrName>
+                                        </p:attrNameLst>
+                                      </p:cBhvr>
+                                      <p:to>
+                                        <p:strVal val="visible"/>
+                                      </p:to>
+                                    </p:set>
+                                    <p:animEffect transition="in" filter="fade">
+                                      <p:cBhvr>
+                                        <p:cTn id="7" dur="500"/>
+                                        <p:tgtEl>
+                                          <p:spTgt spid="3">
+                                            <p:txEl>
+                                              <p:pRg st="0" end="0"/>
+                                            </p:txEl>
+                                          </p:spTgt>
+                                        </p:tgtEl>
+                                      </p:cBhvr>
+                                    </p:animEffect>
+                                  </p:childTnLst>
+                                </p:cTn>
+                              </p:par>
+                            </p:childTnLst>
+                          </p:cTn>
+                        </p:par>
+                      </p:childTnLst>
+                    </p:cTn>
+                  </p:par>
+                  <p:par>
+                    <p:cTn id="8" fill="hold">
+                      <p:stCondLst>
+                        <p:cond delay="indefinite"/>
+                      </p:stCondLst>
+                      <p:childTnLst>
+                        <p:par>
+                          <p:cTn id="9" fill="hold">
+                            <p:stCondLst>
+                              <p:cond delay="0"/>
+                            </p:stCondLst>
+                            <p:childTnLst>
+                              <p:par>
+                                <p:cTn id="10" presetID="10" presetClass="entr" presetSubtype="0" fill="hold" nodeType="clickEffect">
+                                  <p:stCondLst>
+                                    <p:cond delay="0"/>
+                                  </p:stCondLst>
+                                  <p:childTnLst>
+                                    <p:set>
+                                      <p:cBhvr>
+                                        <p:cTn id="11" dur="1" fill="hold">
+                                          <p:stCondLst>
+                                            <p:cond delay="0"/>
+                                          </p:stCondLst>
+                                        </p:cTn>
+                                        <p:tgtEl>
+                                          <p:spTgt spid="3">
+                                            <p:txEl>
+                                              <p:pRg st="1" end="1"/>
+                                            </p:txEl>
+                                          </p:spTgt>
+                                        </p:tgtEl>
+                                        <p:attrNameLst>
+                                          <p:attrName>style.visibility</p:attrName>
+                                        </p:attrNameLst>
+                                      </p:cBhvr>
+                                      <p:to>
+                                        <p:strVal val="visible"/>
+                                      </p:to>
+                                    </p:set>
+                                    <p:animEffect transition="in" filter="fade">
+                                      <p:cBhvr>
+                                        <p:cTn id="12" dur="500"/>
+                                        <p:tgtEl>
+                                          <p:spTgt spid="3">
+                                            <p:txEl>
+                                              <p:pRg st="1" end="1"/>
+                                            </p:txEl>
+                                          </p:spTgt>
+                                        </p:tgtEl>
+                                      </p:cBhvr>
+                                    </p:animEffect>
+                                  </p:childTnLst>
+                                </p:cTn>
+                              </p:par>
+                              <p:par>
+                                <p:cTn id="13" presetID="10" presetClass="entr" presetSubtype="0" fill="hold" nodeType="withEffect">
+                                  <p:stCondLst>
+                                    <p:cond delay="0"/>
+                                  </p:stCondLst>
+                                  <p:childTnLst>
+                                    <p:set>
+                                      <p:cBhvr>
+                                        <p:cTn id="14" dur="1" fill="hold">
+                                          <p:stCondLst>
+                                            <p:cond delay="0"/>
+                                          </p:stCondLst>
+                                        </p:cTn>
+                                        <p:tgtEl>
+                                          <p:spTgt spid="3">
+                                            <p:txEl>
+                                              <p:pRg st="2" end="2"/>
+                                            </p:txEl>
+                                          </p:spTgt>
+                                        </p:tgtEl>
+                                        <p:attrNameLst>
+                                          <p:attrName>style.visibility</p:attrName>
+                                        </p:attrNameLst>
+                                      </p:cBhvr>
+                                      <p:to>
+                                        <p:strVal val="visible"/>
+                                      </p:to>
+                                    </p:set>
+                                    <p:animEffect transition="in" filter="fade">
+                                      <p:cBhvr>
+                                        <p:cTn id="15" dur="500"/>
+                                        <p:tgtEl>
+                                          <p:spTgt spid="3">
+                                            <p:txEl>
+                                              <p:pRg st="2" end="2"/>
+                                            </p:txEl>
+                                          </p:spTgt>
+                                        </p:tgtEl>
+                                      </p:cBhvr>
+                                    </p:animEffect>
+                                  </p:childTnLst>
+                                </p:cTn>
+                              </p:par>
+                              <p:par>
+                                <p:cTn id="16" presetID="10" presetClass="entr" presetSubtype="0" fill="hold" nodeType="withEffect">
+                                  <p:stCondLst>
+                                    <p:cond delay="0"/>
+                                  </p:stCondLst>
+                                  <p:childTnLst>
+                                    <p:set>
+                                      <p:cBhvr>
+                                        <p:cTn id="17" dur="1" fill="hold">
+                                          <p:stCondLst>
+                                            <p:cond delay="0"/>
+                                          </p:stCondLst>
+                                        </p:cTn>
+                                        <p:tgtEl>
+                                          <p:spTgt spid="3">
+                                            <p:txEl>
+                                              <p:pRg st="3" end="3"/>
+                                            </p:txEl>
+                                          </p:spTgt>
+                                        </p:tgtEl>
+                                        <p:attrNameLst>
+                                          <p:attrName>style.visibility</p:attrName>
+                                        </p:attrNameLst>
+                                      </p:cBhvr>
+                                      <p:to>
+                                        <p:strVal val="visible"/>
+                                      </p:to>
+                                    </p:set>
+                                    <p:animEffect transition="in" filter="fade">
+                                      <p:cBhvr>
+                                        <p:cTn id="18" dur="500"/>
+                                        <p:tgtEl>
+                                          <p:spTgt spid="3">
+                                            <p:txEl>
+                                              <p:pRg st="3" end="3"/>
+                                            </p:txEl>
+                                          </p:spTgt>
+                                        </p:tgtEl>
+                                      </p:cBhvr>
+                                    </p:animEffect>
+                                  </p:childTnLst>
+                                </p:cTn>
+                              </p:par>
+                            </p:childTnLst>
+                          </p:cTn>
+                        </p:par>
+                      </p:childTnLst>
+                    </p:cTn>
+                  </p:par>
+                  <p:par>
+                    <p:cTn id="19" fill="hold">
+                      <p:stCondLst>
+                        <p:cond delay="indefinite"/>
+                      </p:stCondLst>
+                      <p:childTnLst>
+                        <p:par>
+                          <p:cTn id="20" fill="hold">
+                            <p:stCondLst>
+                              <p:cond delay="0"/>
+                            </p:stCondLst>
+                            <p:childTnLst>
+                              <p:par>
+                                <p:cTn id="21" presetID="10" presetClass="entr" presetSubtype="0" fill="hold" nodeType="clickEffect">
+                                  <p:stCondLst>
+                                    <p:cond delay="0"/>
+                                  </p:stCondLst>
+                                  <p:childTnLst>
+                                    <p:set>
+                                      <p:cBhvr>
+                                        <p:cTn id="22" dur="1" fill="hold">
+                                          <p:stCondLst>
+                                            <p:cond delay="0"/>
+                                          </p:stCondLst>
+                                        </p:cTn>
+                                        <p:tgtEl>
+                                          <p:spTgt spid="3">
+                                            <p:txEl>
+                                              <p:pRg st="4" end="4"/>
+                                            </p:txEl>
+                                          </p:spTgt>
+                                        </p:tgtEl>
+                                        <p:attrNameLst>
+                                          <p:attrName>style.visibility</p:attrName>
+                                        </p:attrNameLst>
+                                      </p:cBhvr>
+                                      <p:to>
+                                        <p:strVal val="visible"/>
+                                      </p:to>
+                                    </p:set>
+                                    <p:animEffect transition="in" filter="fade">
+                                      <p:cBhvr>
+                                        <p:cTn id="23" dur="500"/>
+                                        <p:tgtEl>
+                                          <p:spTgt spid="3">
+                                            <p:txEl>
+                                              <p:pRg st="4" end="4"/>
+                                            </p:txEl>
+                                          </p:spTgt>
+                                        </p:tgtEl>
+                                      </p:cBhvr>
+                                    </p:animEffect>
+                                  </p:childTnLst>
+                                </p:cTn>
+                              </p:par>
+                              <p:par>
+                                <p:cTn id="24" presetID="10" presetClass="entr" presetSubtype="0" fill="hold" nodeType="withEffect">
+                                  <p:stCondLst>
+                                    <p:cond delay="0"/>
+                                  </p:stCondLst>
+                                  <p:childTnLst>
+                                    <p:set>
+                                      <p:cBhvr>
+                                        <p:cTn id="25" dur="1" fill="hold">
+                                          <p:stCondLst>
+                                            <p:cond delay="0"/>
+                                          </p:stCondLst>
+                                        </p:cTn>
+                                        <p:tgtEl>
+                                          <p:spTgt spid="3">
+                                            <p:txEl>
+                                              <p:pRg st="5" end="5"/>
+                                            </p:txEl>
+                                          </p:spTgt>
+                                        </p:tgtEl>
+                                        <p:attrNameLst>
+                                          <p:attrName>style.visibility</p:attrName>
+                                        </p:attrNameLst>
+                                      </p:cBhvr>
+                                      <p:to>
+                                        <p:strVal val="visible"/>
+                                      </p:to>
+                                    </p:set>
+                                    <p:animEffect transition="in" filter="fade">
+                                      <p:cBhvr>
+                                        <p:cTn id="26" dur="500"/>
+                                        <p:tgtEl>
+                                          <p:spTgt spid="3">
+                                            <p:txEl>
+                                              <p:pRg st="5" end="5"/>
+                                            </p:txEl>
+                                          </p:spTgt>
+                                        </p:tgtEl>
+                                      </p:cBhvr>
+                                    </p:animEffect>
+                                  </p:childTnLst>
+                                </p:cTn>
+                              </p:par>
+                              <p:par>
+                                <p:cTn id="27" presetID="10" presetClass="entr" presetSubtype="0" fill="hold" nodeType="withEffect">
+                                  <p:stCondLst>
+                                    <p:cond delay="0"/>
+                                  </p:stCondLst>
+                                  <p:childTnLst>
+                                    <p:set>
+                                      <p:cBhvr>
+                                        <p:cTn id="28" dur="1" fill="hold">
+                                          <p:stCondLst>
+                                            <p:cond delay="0"/>
+                                          </p:stCondLst>
+                                        </p:cTn>
+                                        <p:tgtEl>
+                                          <p:spTgt spid="3">
+                                            <p:txEl>
+                                              <p:pRg st="6" end="6"/>
+                                            </p:txEl>
+                                          </p:spTgt>
+                                        </p:tgtEl>
+                                        <p:attrNameLst>
+                                          <p:attrName>style.visibility</p:attrName>
+                                        </p:attrNameLst>
+                                      </p:cBhvr>
+                                      <p:to>
+                                        <p:strVal val="visible"/>
+                                      </p:to>
+                                    </p:set>
+                                    <p:animEffect transition="in" filter="fade">
+                                      <p:cBhvr>
+                                        <p:cTn id="29" dur="500"/>
+                                        <p:tgtEl>
+                                          <p:spTgt spid="3">
+                                            <p:txEl>
+                                              <p:pRg st="6" end="6"/>
+                                            </p:txEl>
+                                          </p:spTgt>
+                                        </p:tgtEl>
+                                      </p:cBhvr>
+                                    </p:animEffect>
+                                  </p:childTnLst>
+                                </p:cTn>
+                              </p:par>
+                            </p:childTnLst>
+                          </p:cTn>
+                        </p:par>
+                      </p:childTnLst>
+                    </p:cTn>
+                  </p:par>
+                  <p:par>
+                    <p:cTn id="30" fill="hold">
+                      <p:stCondLst>
+                        <p:cond delay="indefinite"/>
+                      </p:stCondLst>
+                      <p:childTnLst>
+                        <p:par>
+                          <p:cTn id="31" fill="hold">
+                            <p:stCondLst>
+                              <p:cond delay="0"/>
+                            </p:stCondLst>
+                            <p:childTnLst>
+                              <p:par>
+                                <p:cTn id="32" presetID="10" presetClass="entr" presetSubtype="0" fill="hold" nodeType="clickEffect">
+                                  <p:stCondLst>
+                                    <p:cond delay="0"/>
+                                  </p:stCondLst>
+                                  <p:childTnLst>
+                                    <p:set>
+                                      <p:cBhvr>
+                                        <p:cTn id="33" dur="1" fill="hold">
+                                          <p:stCondLst>
+                                            <p:cond delay="0"/>
+                                          </p:stCondLst>
+                                        </p:cTn>
+                                        <p:tgtEl>
+                                          <p:spTgt spid="3">
+                                            <p:txEl>
+                                              <p:pRg st="7" end="7"/>
+                                            </p:txEl>
+                                          </p:spTgt>
+                                        </p:tgtEl>
+                                        <p:attrNameLst>
+                                          <p:attrName>style.visibility</p:attrName>
+                                        </p:attrNameLst>
+                                      </p:cBhvr>
+                                      <p:to>
+                                        <p:strVal val="visible"/>
+                                      </p:to>
+                                    </p:set>
+                                    <p:animEffect transition="in" filter="fade">
+                                      <p:cBhvr>
+                                        <p:cTn id="34" dur="500"/>
+                                        <p:tgtEl>
+                                          <p:spTgt spid="3">
+                                            <p:txEl>
+                                              <p:pRg st="7" end="7"/>
+                                            </p:txEl>
+                                          </p:spTgt>
+                                        </p:tgtEl>
+                                      </p:cBhvr>
+                                    </p:animEffect>
+                                  </p:childTnLst>
+                                </p:cTn>
+                              </p:par>
+                              <p:par>
+                                <p:cTn id="35" presetID="10" presetClass="entr" presetSubtype="0" fill="hold" nodeType="withEffect">
+                                  <p:stCondLst>
+                                    <p:cond delay="0"/>
+                                  </p:stCondLst>
+                                  <p:childTnLst>
+                                    <p:set>
+                                      <p:cBhvr>
+                                        <p:cTn id="36" dur="1" fill="hold">
+                                          <p:stCondLst>
+                                            <p:cond delay="0"/>
+                                          </p:stCondLst>
+                                        </p:cTn>
+                                        <p:tgtEl>
+                                          <p:spTgt spid="3">
+                                            <p:txEl>
+                                              <p:pRg st="8" end="8"/>
+                                            </p:txEl>
+                                          </p:spTgt>
+                                        </p:tgtEl>
+                                        <p:attrNameLst>
+                                          <p:attrName>style.visibility</p:attrName>
+                                        </p:attrNameLst>
+                                      </p:cBhvr>
+                                      <p:to>
+                                        <p:strVal val="visible"/>
+                                      </p:to>
+                                    </p:set>
+                                    <p:animEffect transition="in" filter="fade">
+                                      <p:cBhvr>
+                                        <p:cTn id="37" dur="500"/>
+                                        <p:tgtEl>
+                                          <p:spTgt spid="3">
+                                            <p:txEl>
+                                              <p:pRg st="8" end="8"/>
+                                            </p:txEl>
+                                          </p:spTgt>
+                                        </p:tgtEl>
+                                      </p:cBhvr>
+                                    </p:animEffect>
+                                  </p:childTnLst>
+                                </p:cTn>
+                              </p:par>
+                              <p:par>
+                                <p:cTn id="38" presetID="10" presetClass="entr" presetSubtype="0" fill="hold" nodeType="withEffect">
+                                  <p:stCondLst>
+                                    <p:cond delay="0"/>
+                                  </p:stCondLst>
+                                  <p:childTnLst>
+                                    <p:set>
+                                      <p:cBhvr>
+                                        <p:cTn id="39" dur="1" fill="hold">
+                                          <p:stCondLst>
+                                            <p:cond delay="0"/>
+                                          </p:stCondLst>
+                                        </p:cTn>
+                                        <p:tgtEl>
+                                          <p:spTgt spid="3">
+                                            <p:txEl>
+                                              <p:pRg st="9" end="9"/>
+                                            </p:txEl>
+                                          </p:spTgt>
+                                        </p:tgtEl>
+                                        <p:attrNameLst>
+                                          <p:attrName>style.visibility</p:attrName>
+                                        </p:attrNameLst>
+                                      </p:cBhvr>
+                                      <p:to>
+                                        <p:strVal val="visible"/>
+                                      </p:to>
+                                    </p:set>
+                                    <p:animEffect transition="in" filter="fade">
+                                      <p:cBhvr>
+                                        <p:cTn id="40" dur="500"/>
+                                        <p:tgtEl>
+                                          <p:spTgt spid="3">
+                                            <p:txEl>
+                                              <p:pRg st="9" end="9"/>
+                                            </p:txEl>
+                                          </p:spTgt>
+                                        </p:tgtEl>
+                                      </p:cBhvr>
+                                    </p:animEffect>
+                                  </p:childTnLst>
+                                </p:cTn>
+                              </p:par>
+                              <p:par>
+                                <p:cTn id="41" presetID="10" presetClass="entr" presetSubtype="0" fill="hold" nodeType="withEffect">
+                                  <p:stCondLst>
+                                    <p:cond delay="0"/>
+                                  </p:stCondLst>
+                                  <p:childTnLst>
+                                    <p:set>
+                                      <p:cBhvr>
+                                        <p:cTn id="42" dur="1" fill="hold">
+                                          <p:stCondLst>
+                                            <p:cond delay="0"/>
+                                          </p:stCondLst>
+                                        </p:cTn>
+                                        <p:tgtEl>
+                                          <p:spTgt spid="3">
+                                            <p:txEl>
+                                              <p:pRg st="10" end="10"/>
+                                            </p:txEl>
+                                          </p:spTgt>
+                                        </p:tgtEl>
+                                        <p:attrNameLst>
+                                          <p:attrName>style.visibility</p:attrName>
+                                        </p:attrNameLst>
+                                      </p:cBhvr>
+                                      <p:to>
+                                        <p:strVal val="visible"/>
+                                      </p:to>
+                                    </p:set>
+                                    <p:animEffect transition="in" filter="fade">
+                                      <p:cBhvr>
+                                        <p:cTn id="43" dur="500"/>
+                                        <p:tgtEl>
+                                          <p:spTgt spid="3">
+                                            <p:txEl>
+                                              <p:pRg st="10" end="10"/>
+                                            </p:txEl>
+                                          </p:spTgt>
+                                        </p:tgtEl>
+                                      </p:cBhvr>
+                                    </p:animEffect>
+                                  </p:childTnLst>
+                                </p:cTn>
+                              </p:par>
+                              <p:par>
+                                <p:cTn id="44" presetID="10" presetClass="entr" presetSubtype="0" fill="hold" nodeType="withEffect">
+                                  <p:stCondLst>
+                                    <p:cond delay="0"/>
+                                  </p:stCondLst>
+                                  <p:childTnLst>
+                                    <p:set>
+                                      <p:cBhvr>
+                                        <p:cTn id="45" dur="1" fill="hold">
+                                          <p:stCondLst>
+                                            <p:cond delay="0"/>
+                                          </p:stCondLst>
+                                        </p:cTn>
+                                        <p:tgtEl>
+                                          <p:spTgt spid="3">
+                                            <p:txEl>
+                                              <p:pRg st="11" end="11"/>
+                                            </p:txEl>
+                                          </p:spTgt>
+                                        </p:tgtEl>
+                                        <p:attrNameLst>
+                                          <p:attrName>style.visibility</p:attrName>
+                                        </p:attrNameLst>
+                                      </p:cBhvr>
+                                      <p:to>
+                                        <p:strVal val="visible"/>
+                                      </p:to>
+                                    </p:set>
+                                    <p:animEffect transition="in" filter="fade">
+                                      <p:cBhvr>
+                                        <p:cTn id="46" dur="500"/>
+                                        <p:tgtEl>
+                                          <p:spTgt spid="3">
+                                            <p:txEl>
+                                              <p:pRg st="11" end="11"/>
+                                            </p:txEl>
+                                          </p:spTgt>
+                                        </p:tgtEl>
+                                      </p:cBhvr>
+                                    </p:animEffect>
+                                  </p:childTnLst>
+                                </p:cTn>
+                              </p:par>
+                            </p:childTnLst>
+                          </p:cTn>
+                        </p:par>
+                      </p:childTnLst>
+                    </p:cTn>
+                  </p:par>
+                  <p:par>
+                    <p:cTn id="47" fill="hold">
+                      <p:stCondLst>
+                        <p:cond delay="indefinite"/>
+                      </p:stCondLst>
+                      <p:childTnLst>
+                        <p:par>
+                          <p:cTn id="48" fill="hold">
+                            <p:stCondLst>
+                              <p:cond delay="0"/>
+                            </p:stCondLst>
+                            <p:childTnLst>
+                              <p:par>
+                                <p:cTn id="49" presetID="10" presetClass="entr" presetSubtype="0" fill="hold" nodeType="clickEffect">
+                                  <p:stCondLst>
+                                    <p:cond delay="0"/>
+                                  </p:stCondLst>
+                                  <p:childTnLst>
+                                    <p:set>
+                                      <p:cBhvr>
+                                        <p:cTn id="50" dur="1" fill="hold">
+                                          <p:stCondLst>
+                                            <p:cond delay="0"/>
+                                          </p:stCondLst>
+                                        </p:cTn>
+                                        <p:tgtEl>
+                                          <p:spTgt spid="3">
+                                            <p:txEl>
+                                              <p:pRg st="12" end="12"/>
+                                            </p:txEl>
+                                          </p:spTgt>
+                                        </p:tgtEl>
+                                        <p:attrNameLst>
+                                          <p:attrName>style.visibility</p:attrName>
+                                        </p:attrNameLst>
+                                      </p:cBhvr>
+                                      <p:to>
+                                        <p:strVal val="visible"/>
+                                      </p:to>
+                                    </p:set>
+                                    <p:animEffect transition="in" filter="fade">
+                                      <p:cBhvr>
+                                        <p:cTn id="51" dur="500"/>
+                                        <p:tgtEl>
+                                          <p:spTgt spid="3">
+                                            <p:txEl>
+                                              <p:pRg st="12" end="12"/>
+                                            </p:txEl>
+                                          </p:spTgt>
+                                        </p:tgtEl>
+                                      </p:cBhvr>
+                                    </p:animEffect>
+                                  </p:childTnLst>
+                                </p:cTn>
+                              </p:par>
+                            </p:childTnLst>
+                          </p:cTn>
+                        </p:par>
+                      </p:childTnLst>
+                    </p:cTn>
+                  </p:par>
+                </p:childTnLst>
+              </p:cTn>
+              <p:prevCondLst>
+                <p:cond evt="onPrev" delay="0">
+                  <p:tgtEl>
+                    <p:sldTgt/>
+                  </p:tgtEl>
+                </p:cond>
+              </p:prevCondLst>
+              <p:nextCondLst>
+                <p:cond evt="onNext" delay="0">
+                  <p:tgtEl>
+                    <p:sldTgt/>
+                  </p:tgtEl>
+                </p:cond>
+              </p:nextCondLst>
+            </p:seq>
+          </p:childTnLst>
+        </p:cTn>
+      </p:par>
+    </p:tnLst>
+  </p:timing>
+</p:sld>
+</file>
+
+<file path=ppt/slides/slide31.xml><?xml version="1.0" encoding="utf-8"?>
+<p:sld xmlns:a="http://schemas.openxmlformats.org/drawingml/2006/main" xmlns:r="http://schemas.openxmlformats.org/officeDocument/2006/relationships" xmlns:p="http://schemas.openxmlformats.org/presentationml/2006/main">
+  <p:cSld>
+    <p:spTree>
+      <p:nvGrpSpPr>
+        <p:cNvPr id="1" name=""/>
+        <p:cNvGrpSpPr/>
+        <p:nvPr/>
+      </p:nvGrpSpPr>
+      <p:grpSpPr>
+        <a:xfrm>
+          <a:off x="0" y="0"/>
+          <a:ext cx="0" cy="0"/>
+          <a:chOff x="0" y="0"/>
+          <a:chExt cx="0" cy="0"/>
+        </a:xfrm>
+      </p:grpSpPr>
+      <p:sp>
+        <p:nvSpPr>
+          <p:cNvPr id="2" name="Title 1">
+            <a:extLst>
+              <a:ext uri="{FF2B5EF4-FFF2-40B4-BE49-F238E27FC236}">
+                <a16:creationId xmlns:a16="http://schemas.microsoft.com/office/drawing/2014/main" id="{E663141A-B776-67B8-CB94-BACAA27BF758}"/>
+              </a:ext>
+            </a:extLst>
+          </p:cNvPr>
+          <p:cNvSpPr>
+            <a:spLocks noGrp="1"/>
+          </p:cNvSpPr>
+          <p:nvPr>
+            <p:ph type="title"/>
+          </p:nvPr>
+        </p:nvSpPr>
+        <p:spPr/>
+        <p:txBody>
+          <a:bodyPr/>
+          <a:lstStyle/>
+          <a:p>
+            <a:r>
+              <a:rPr lang="en-US" dirty="0"/>
+              <a:t>Unit 5 – Data Templates</a:t>
+            </a:r>
+          </a:p>
+        </p:txBody>
+      </p:sp>
+      <p:sp>
+        <p:nvSpPr>
+          <p:cNvPr id="3" name="Content Placeholder 2">
+            <a:extLst>
+              <a:ext uri="{FF2B5EF4-FFF2-40B4-BE49-F238E27FC236}">
+                <a16:creationId xmlns:a16="http://schemas.microsoft.com/office/drawing/2014/main" id="{B01C3E1B-AD35-8B67-26FE-A843007FE719}"/>
+              </a:ext>
+            </a:extLst>
+          </p:cNvPr>
+          <p:cNvSpPr>
+            <a:spLocks noGrp="1"/>
+          </p:cNvSpPr>
+          <p:nvPr>
+            <p:ph idx="1"/>
+          </p:nvPr>
+        </p:nvSpPr>
+        <p:spPr/>
+        <p:txBody>
+          <a:bodyPr/>
+          <a:lstStyle/>
+          <a:p>
+            <a:r>
+              <a:rPr lang="en-US" dirty="0"/>
+              <a:t>Where you can define data templates</a:t>
+            </a:r>
+          </a:p>
+          <a:p>
+            <a:pPr lvl="1"/>
+            <a:r>
+              <a:rPr lang="en-US" dirty="0"/>
+              <a:t>ItemTemplate property of list-based controls</a:t>
+            </a:r>
+          </a:p>
+          <a:p>
+            <a:pPr lvl="2"/>
+            <a:r>
+              <a:rPr lang="en-US" dirty="0" err="1"/>
+              <a:t>ListBox</a:t>
+            </a:r>
+            <a:r>
+              <a:rPr lang="en-US" dirty="0"/>
+              <a:t>, </a:t>
+            </a:r>
+            <a:r>
+              <a:rPr lang="en-US" dirty="0" err="1"/>
+              <a:t>ComboBox</a:t>
+            </a:r>
+            <a:r>
+              <a:rPr lang="en-US" dirty="0"/>
+              <a:t>, </a:t>
+            </a:r>
+            <a:r>
+              <a:rPr lang="en-US" dirty="0" err="1"/>
+              <a:t>TabControl</a:t>
+            </a:r>
+            <a:r>
+              <a:rPr lang="en-US" dirty="0"/>
+              <a:t>, </a:t>
+            </a:r>
+            <a:r>
+              <a:rPr lang="en-US" dirty="0" err="1"/>
+              <a:t>etc</a:t>
+            </a:r>
+            <a:endParaRPr lang="en-US" dirty="0"/>
+          </a:p>
+          <a:p>
+            <a:pPr lvl="1"/>
+            <a:r>
+              <a:rPr lang="en-US" dirty="0" err="1"/>
+              <a:t>ContentTemplate</a:t>
+            </a:r>
+            <a:r>
+              <a:rPr lang="en-US" dirty="0"/>
+              <a:t> of control with Content property</a:t>
+            </a:r>
+          </a:p>
+          <a:p>
+            <a:pPr lvl="2"/>
+            <a:r>
+              <a:rPr lang="en-US" dirty="0"/>
+              <a:t>Label, Button</a:t>
+            </a:r>
+          </a:p>
+          <a:p>
+            <a:pPr lvl="2"/>
+            <a:r>
+              <a:rPr lang="en-US" dirty="0" err="1"/>
+              <a:t>ContentPresenter</a:t>
+            </a:r>
+            <a:r>
+              <a:rPr lang="en-US" dirty="0"/>
+              <a:t> -- allows reuse, shared template becomes custom control</a:t>
+            </a:r>
+          </a:p>
+          <a:p>
+            <a:pPr lvl="1"/>
+            <a:endParaRPr lang="en-US" dirty="0"/>
+          </a:p>
+        </p:txBody>
+      </p:sp>
+    </p:spTree>
+    <p:extLst>
+      <p:ext uri="{BB962C8B-B14F-4D97-AF65-F5344CB8AC3E}">
+        <p14:creationId xmlns:p14="http://schemas.microsoft.com/office/powerpoint/2010/main" val="1929417824"/>
+      </p:ext>
+    </p:extLst>
+  </p:cSld>
+  <p:clrMapOvr>
+    <a:masterClrMapping/>
+  </p:clrMapOvr>
+  <p:timing>
+    <p:tnLst>
+      <p:par>
+        <p:cTn id="1" dur="indefinite" restart="never" nodeType="tmRoot">
+          <p:childTnLst>
+            <p:seq concurrent="1" nextAc="seek">
+              <p:cTn id="2" dur="indefinite" nodeType="mainSeq">
+                <p:childTnLst>
+                  <p:par>
+                    <p:cTn id="3" fill="hold">
+                      <p:stCondLst>
+                        <p:cond delay="indefinite"/>
+                      </p:stCondLst>
+                      <p:childTnLst>
+                        <p:par>
+                          <p:cTn id="4" fill="hold">
+                            <p:stCondLst>
+                              <p:cond delay="0"/>
+                            </p:stCondLst>
+                            <p:childTnLst>
+                              <p:par>
+                                <p:cTn id="5" presetID="10" presetClass="entr" presetSubtype="0" fill="hold" grpId="0" nodeType="clickEffect">
+                                  <p:stCondLst>
+                                    <p:cond delay="0"/>
+                                  </p:stCondLst>
+                                  <p:childTnLst>
+                                    <p:set>
+                                      <p:cBhvr>
+                                        <p:cTn id="6" dur="1" fill="hold">
+                                          <p:stCondLst>
+                                            <p:cond delay="0"/>
+                                          </p:stCondLst>
+                                        </p:cTn>
+                                        <p:tgtEl>
+                                          <p:spTgt spid="3">
+                                            <p:txEl>
+                                              <p:pRg st="0" end="0"/>
+                                            </p:txEl>
+                                          </p:spTgt>
+                                        </p:tgtEl>
+                                        <p:attrNameLst>
+                                          <p:attrName>style.visibility</p:attrName>
+                                        </p:attrNameLst>
+                                      </p:cBhvr>
+                                      <p:to>
+                                        <p:strVal val="visible"/>
+                                      </p:to>
+                                    </p:set>
+                                    <p:animEffect transition="in" filter="fade">
+                                      <p:cBhvr>
+                                        <p:cTn id="7" dur="500"/>
+                                        <p:tgtEl>
+                                          <p:spTgt spid="3">
+                                            <p:txEl>
+                                              <p:pRg st="0" end="0"/>
+                                            </p:txEl>
+                                          </p:spTgt>
+                                        </p:tgtEl>
+                                      </p:cBhvr>
+                                    </p:animEffect>
+                                  </p:childTnLst>
+                                </p:cTn>
+                              </p:par>
+                            </p:childTnLst>
+                          </p:cTn>
+                        </p:par>
+                      </p:childTnLst>
+                    </p:cTn>
+                  </p:par>
+                  <p:par>
+                    <p:cTn id="8" fill="hold">
+                      <p:stCondLst>
+                        <p:cond delay="indefinite"/>
+                      </p:stCondLst>
+                      <p:childTnLst>
+                        <p:par>
+                          <p:cTn id="9" fill="hold">
+                            <p:stCondLst>
+                              <p:cond delay="0"/>
+                            </p:stCondLst>
+                            <p:childTnLst>
+                              <p:par>
+                                <p:cTn id="10" presetID="10" presetClass="entr" presetSubtype="0" fill="hold" grpId="0" nodeType="clickEffect">
+                                  <p:stCondLst>
+                                    <p:cond delay="0"/>
+                                  </p:stCondLst>
+                                  <p:childTnLst>
+                                    <p:set>
+                                      <p:cBhvr>
+                                        <p:cTn id="11" dur="1" fill="hold">
+                                          <p:stCondLst>
+                                            <p:cond delay="0"/>
+                                          </p:stCondLst>
+                                        </p:cTn>
+                                        <p:tgtEl>
+                                          <p:spTgt spid="3">
+                                            <p:txEl>
+                                              <p:pRg st="1" end="1"/>
+                                            </p:txEl>
+                                          </p:spTgt>
+                                        </p:tgtEl>
+                                        <p:attrNameLst>
+                                          <p:attrName>style.visibility</p:attrName>
+                                        </p:attrNameLst>
+                                      </p:cBhvr>
+                                      <p:to>
+                                        <p:strVal val="visible"/>
+                                      </p:to>
+                                    </p:set>
+                                    <p:animEffect transition="in" filter="fade">
+                                      <p:cBhvr>
+                                        <p:cTn id="12" dur="500"/>
+                                        <p:tgtEl>
+                                          <p:spTgt spid="3">
+                                            <p:txEl>
+                                              <p:pRg st="1" end="1"/>
+                                            </p:txEl>
+                                          </p:spTgt>
+                                        </p:tgtEl>
+                                      </p:cBhvr>
+                                    </p:animEffect>
+                                  </p:childTnLst>
+                                </p:cTn>
+                              </p:par>
+                              <p:par>
+                                <p:cTn id="13" presetID="10" presetClass="entr" presetSubtype="0" fill="hold" grpId="0" nodeType="withEffect">
+                                  <p:stCondLst>
+                                    <p:cond delay="0"/>
+                                  </p:stCondLst>
+                                  <p:childTnLst>
+                                    <p:set>
+                                      <p:cBhvr>
+                                        <p:cTn id="14" dur="1" fill="hold">
+                                          <p:stCondLst>
+                                            <p:cond delay="0"/>
+                                          </p:stCondLst>
+                                        </p:cTn>
+                                        <p:tgtEl>
+                                          <p:spTgt spid="3">
+                                            <p:txEl>
+                                              <p:pRg st="2" end="2"/>
+                                            </p:txEl>
+                                          </p:spTgt>
+                                        </p:tgtEl>
+                                        <p:attrNameLst>
+                                          <p:attrName>style.visibility</p:attrName>
+                                        </p:attrNameLst>
+                                      </p:cBhvr>
+                                      <p:to>
+                                        <p:strVal val="visible"/>
+                                      </p:to>
+                                    </p:set>
+                                    <p:animEffect transition="in" filter="fade">
+                                      <p:cBhvr>
+                                        <p:cTn id="15" dur="500"/>
+                                        <p:tgtEl>
+                                          <p:spTgt spid="3">
+                                            <p:txEl>
+                                              <p:pRg st="2" end="2"/>
+                                            </p:txEl>
+                                          </p:spTgt>
+                                        </p:tgtEl>
+                                      </p:cBhvr>
+                                    </p:animEffect>
+                                  </p:childTnLst>
+                                </p:cTn>
+                              </p:par>
+                            </p:childTnLst>
+                          </p:cTn>
+                        </p:par>
+                      </p:childTnLst>
+                    </p:cTn>
+                  </p:par>
+                  <p:par>
+                    <p:cTn id="16" fill="hold">
+                      <p:stCondLst>
+                        <p:cond delay="indefinite"/>
+                      </p:stCondLst>
+                      <p:childTnLst>
+                        <p:par>
+                          <p:cTn id="17" fill="hold">
+                            <p:stCondLst>
+                              <p:cond delay="0"/>
+                            </p:stCondLst>
+                            <p:childTnLst>
+                              <p:par>
+                                <p:cTn id="18" presetID="10" presetClass="entr" presetSubtype="0" fill="hold" grpId="0" nodeType="clickEffect">
+                                  <p:stCondLst>
+                                    <p:cond delay="0"/>
+                                  </p:stCondLst>
+                                  <p:childTnLst>
+                                    <p:set>
+                                      <p:cBhvr>
+                                        <p:cTn id="19" dur="1" fill="hold">
+                                          <p:stCondLst>
+                                            <p:cond delay="0"/>
+                                          </p:stCondLst>
+                                        </p:cTn>
+                                        <p:tgtEl>
+                                          <p:spTgt spid="3">
+                                            <p:txEl>
+                                              <p:pRg st="3" end="3"/>
+                                            </p:txEl>
+                                          </p:spTgt>
+                                        </p:tgtEl>
+                                        <p:attrNameLst>
+                                          <p:attrName>style.visibility</p:attrName>
+                                        </p:attrNameLst>
+                                      </p:cBhvr>
+                                      <p:to>
+                                        <p:strVal val="visible"/>
+                                      </p:to>
+                                    </p:set>
+                                    <p:animEffect transition="in" filter="fade">
+                                      <p:cBhvr>
+                                        <p:cTn id="20" dur="500"/>
+                                        <p:tgtEl>
+                                          <p:spTgt spid="3">
+                                            <p:txEl>
+                                              <p:pRg st="3" end="3"/>
+                                            </p:txEl>
+                                          </p:spTgt>
+                                        </p:tgtEl>
+                                      </p:cBhvr>
+                                    </p:animEffect>
+                                  </p:childTnLst>
+                                </p:cTn>
+                              </p:par>
+                              <p:par>
+                                <p:cTn id="21" presetID="10" presetClass="entr" presetSubtype="0" fill="hold" grpId="0" nodeType="withEffect">
+                                  <p:stCondLst>
+                                    <p:cond delay="0"/>
+                                  </p:stCondLst>
+                                  <p:childTnLst>
+                                    <p:set>
+                                      <p:cBhvr>
+                                        <p:cTn id="22" dur="1" fill="hold">
+                                          <p:stCondLst>
+                                            <p:cond delay="0"/>
+                                          </p:stCondLst>
+                                        </p:cTn>
+                                        <p:tgtEl>
+                                          <p:spTgt spid="3">
+                                            <p:txEl>
+                                              <p:pRg st="4" end="4"/>
+                                            </p:txEl>
+                                          </p:spTgt>
+                                        </p:tgtEl>
+                                        <p:attrNameLst>
+                                          <p:attrName>style.visibility</p:attrName>
+                                        </p:attrNameLst>
+                                      </p:cBhvr>
+                                      <p:to>
+                                        <p:strVal val="visible"/>
+                                      </p:to>
+                                    </p:set>
+                                    <p:animEffect transition="in" filter="fade">
+                                      <p:cBhvr>
+                                        <p:cTn id="23" dur="500"/>
+                                        <p:tgtEl>
+                                          <p:spTgt spid="3">
+                                            <p:txEl>
+                                              <p:pRg st="4" end="4"/>
+                                            </p:txEl>
+                                          </p:spTgt>
+                                        </p:tgtEl>
+                                      </p:cBhvr>
+                                    </p:animEffect>
+                                  </p:childTnLst>
+                                </p:cTn>
+                              </p:par>
+                              <p:par>
+                                <p:cTn id="24" presetID="10" presetClass="entr" presetSubtype="0" fill="hold" grpId="0" nodeType="withEffect">
+                                  <p:stCondLst>
+                                    <p:cond delay="0"/>
+                                  </p:stCondLst>
+                                  <p:childTnLst>
+                                    <p:set>
+                                      <p:cBhvr>
+                                        <p:cTn id="25" dur="1" fill="hold">
+                                          <p:stCondLst>
+                                            <p:cond delay="0"/>
+                                          </p:stCondLst>
+                                        </p:cTn>
+                                        <p:tgtEl>
+                                          <p:spTgt spid="3">
+                                            <p:txEl>
+                                              <p:pRg st="5" end="5"/>
+                                            </p:txEl>
+                                          </p:spTgt>
+                                        </p:tgtEl>
+                                        <p:attrNameLst>
+                                          <p:attrName>style.visibility</p:attrName>
+                                        </p:attrNameLst>
+                                      </p:cBhvr>
+                                      <p:to>
+                                        <p:strVal val="visible"/>
+                                      </p:to>
+                                    </p:set>
+                                    <p:animEffect transition="in" filter="fade">
+                                      <p:cBhvr>
+                                        <p:cTn id="26" dur="500"/>
+                                        <p:tgtEl>
+                                          <p:spTgt spid="3">
+                                            <p:txEl>
+                                              <p:pRg st="5" end="5"/>
+                                            </p:txEl>
+                                          </p:spTgt>
+                                        </p:tgtEl>
+                                      </p:cBhvr>
+                                    </p:animEffect>
+                                  </p:childTnLst>
+                                </p:cTn>
+                              </p:par>
+                            </p:childTnLst>
+                          </p:cTn>
+                        </p:par>
+                      </p:childTnLst>
+                    </p:cTn>
+                  </p:par>
+                </p:childTnLst>
+              </p:cTn>
+              <p:prevCondLst>
+                <p:cond evt="onPrev" delay="0">
+                  <p:tgtEl>
+                    <p:sldTgt/>
+                  </p:tgtEl>
+                </p:cond>
+              </p:prevCondLst>
+              <p:nextCondLst>
+                <p:cond evt="onNext" delay="0">
+                  <p:tgtEl>
+                    <p:sldTgt/>
+                  </p:tgtEl>
+                </p:cond>
+              </p:nextCondLst>
+            </p:seq>
+          </p:childTnLst>
+        </p:cTn>
+      </p:par>
+    </p:tnLst>
+    <p:bldLst>
+      <p:bldP spid="3" grpId="0" uiExpand="1" build="p"/>
+    </p:bldLst>
+  </p:timing>
+</p:sld>
+</file>
+
+<file path=ppt/slides/slide32.xml><?xml version="1.0" encoding="utf-8"?>
+<p:sld xmlns:a="http://schemas.openxmlformats.org/drawingml/2006/main" xmlns:r="http://schemas.openxmlformats.org/officeDocument/2006/relationships" xmlns:p="http://schemas.openxmlformats.org/presentationml/2006/main">
+  <p:cSld>
+    <p:spTree>
+      <p:nvGrpSpPr>
+        <p:cNvPr id="1" name=""/>
+        <p:cNvGrpSpPr/>
+        <p:nvPr/>
+      </p:nvGrpSpPr>
+      <p:grpSpPr>
+        <a:xfrm>
+          <a:off x="0" y="0"/>
+          <a:ext cx="0" cy="0"/>
+          <a:chOff x="0" y="0"/>
+          <a:chExt cx="0" cy="0"/>
+        </a:xfrm>
+      </p:grpSpPr>
+      <p:sp>
+        <p:nvSpPr>
+          <p:cNvPr id="2" name="Title 1">
+            <a:extLst>
+              <a:ext uri="{FF2B5EF4-FFF2-40B4-BE49-F238E27FC236}">
+                <a16:creationId xmlns:a16="http://schemas.microsoft.com/office/drawing/2014/main" id="{71AC9470-4C0D-0446-29FF-40F7150B4FD9}"/>
+              </a:ext>
+            </a:extLst>
+          </p:cNvPr>
+          <p:cNvSpPr>
+            <a:spLocks noGrp="1"/>
+          </p:cNvSpPr>
+          <p:nvPr>
+            <p:ph type="title"/>
+          </p:nvPr>
+        </p:nvSpPr>
+        <p:spPr/>
+        <p:txBody>
+          <a:bodyPr/>
+          <a:lstStyle/>
+          <a:p>
+            <a:r>
+              <a:rPr lang="en-US" dirty="0">
+                <a:solidFill>
+                  <a:schemeClr val="accent5">
+                    <a:lumMod val="75000"/>
+                  </a:schemeClr>
+                </a:solidFill>
+              </a:rPr>
+              <a:t>Exercise 5 – Data Templates</a:t>
+            </a:r>
+          </a:p>
+        </p:txBody>
+      </p:sp>
+      <p:sp>
+        <p:nvSpPr>
+          <p:cNvPr id="3" name="Content Placeholder 2">
+            <a:extLst>
+              <a:ext uri="{FF2B5EF4-FFF2-40B4-BE49-F238E27FC236}">
+                <a16:creationId xmlns:a16="http://schemas.microsoft.com/office/drawing/2014/main" id="{9E541936-5CD7-A9AD-7F63-EA0337371606}"/>
+              </a:ext>
+            </a:extLst>
+          </p:cNvPr>
+          <p:cNvSpPr>
+            <a:spLocks noGrp="1"/>
+          </p:cNvSpPr>
+          <p:nvPr>
+            <p:ph idx="1"/>
+          </p:nvPr>
+        </p:nvSpPr>
+        <p:spPr/>
+        <p:txBody>
+          <a:bodyPr/>
+          <a:lstStyle/>
+          <a:p>
+            <a:r>
+              <a:rPr lang="en-US" dirty="0"/>
+              <a:t>What You’ll Learn</a:t>
+            </a:r>
+          </a:p>
+          <a:p>
+            <a:pPr lvl="1"/>
+            <a:r>
+              <a:rPr lang="en-US" dirty="0"/>
+              <a:t>How to create a data template for items in a </a:t>
+            </a:r>
+            <a:r>
+              <a:rPr lang="en-US" dirty="0" err="1"/>
+              <a:t>ListBox</a:t>
+            </a:r>
+            <a:endParaRPr lang="en-US" dirty="0"/>
+          </a:p>
+          <a:p>
+            <a:r>
+              <a:rPr lang="en-US" dirty="0"/>
+              <a:t>Exercise</a:t>
+            </a:r>
+          </a:p>
+          <a:p>
+            <a:pPr lvl="1"/>
+            <a:r>
+              <a:rPr lang="en-US" dirty="0"/>
+              <a:t>Start from existing project: Exercise_5_DataTemplate</a:t>
+            </a:r>
+          </a:p>
+          <a:p>
+            <a:pPr lvl="1"/>
+            <a:r>
+              <a:rPr lang="en-US" dirty="0"/>
+              <a:t>Bind list to ItemTemplate</a:t>
+            </a:r>
+          </a:p>
+          <a:p>
+            <a:pPr lvl="1"/>
+            <a:r>
+              <a:rPr lang="en-US" dirty="0"/>
+              <a:t>Extra credit</a:t>
+            </a:r>
+          </a:p>
+        </p:txBody>
+      </p:sp>
+    </p:spTree>
+    <p:extLst>
+      <p:ext uri="{BB962C8B-B14F-4D97-AF65-F5344CB8AC3E}">
+        <p14:creationId xmlns:p14="http://schemas.microsoft.com/office/powerpoint/2010/main" val="2632699467"/>
+      </p:ext>
+    </p:extLst>
+  </p:cSld>
+  <p:clrMapOvr>
+    <a:masterClrMapping/>
+  </p:clrMapOvr>
+</p:sld>
+</file>
+
+<file path=ppt/slides/slide33.xml><?xml version="1.0" encoding="utf-8"?>
+<p:sld xmlns:a="http://schemas.openxmlformats.org/drawingml/2006/main" xmlns:r="http://schemas.openxmlformats.org/officeDocument/2006/relationships" xmlns:p="http://schemas.openxmlformats.org/presentationml/2006/main">
+  <p:cSld>
+    <p:spTree>
+      <p:nvGrpSpPr>
+        <p:cNvPr id="1" name=""/>
+        <p:cNvGrpSpPr/>
+        <p:nvPr/>
+      </p:nvGrpSpPr>
+      <p:grpSpPr>
+        <a:xfrm>
+          <a:off x="0" y="0"/>
+          <a:ext cx="0" cy="0"/>
+          <a:chOff x="0" y="0"/>
+          <a:chExt cx="0" cy="0"/>
+        </a:xfrm>
+      </p:grpSpPr>
+      <p:sp>
+        <p:nvSpPr>
+          <p:cNvPr id="2" name="Title 1">
+            <a:extLst>
+              <a:ext uri="{FF2B5EF4-FFF2-40B4-BE49-F238E27FC236}">
+                <a16:creationId xmlns:a16="http://schemas.microsoft.com/office/drawing/2014/main" id="{58AD8829-FD46-A879-2629-B2590C599187}"/>
+              </a:ext>
+            </a:extLst>
+          </p:cNvPr>
+          <p:cNvSpPr>
+            <a:spLocks noGrp="1"/>
+          </p:cNvSpPr>
+          <p:nvPr>
+            <p:ph type="title"/>
+          </p:nvPr>
+        </p:nvSpPr>
+        <p:spPr/>
+        <p:txBody>
+          <a:bodyPr/>
+          <a:lstStyle/>
+          <a:p>
+            <a:r>
+              <a:rPr lang="en-US" dirty="0"/>
+              <a:t>Unit 6 - Commands</a:t>
+            </a:r>
+          </a:p>
+        </p:txBody>
+      </p:sp>
+      <p:sp>
+        <p:nvSpPr>
+          <p:cNvPr id="3" name="Content Placeholder 2">
+            <a:extLst>
+              <a:ext uri="{FF2B5EF4-FFF2-40B4-BE49-F238E27FC236}">
+                <a16:creationId xmlns:a16="http://schemas.microsoft.com/office/drawing/2014/main" id="{99B17B6F-567C-21EC-21BA-2427E221CD88}"/>
+              </a:ext>
+            </a:extLst>
+          </p:cNvPr>
+          <p:cNvSpPr>
+            <a:spLocks noGrp="1"/>
+          </p:cNvSpPr>
+          <p:nvPr>
+            <p:ph idx="1"/>
+          </p:nvPr>
+        </p:nvSpPr>
+        <p:spPr/>
+        <p:txBody>
+          <a:bodyPr>
+            <a:normAutofit lnSpcReduction="10000"/>
+          </a:bodyPr>
+          <a:lstStyle/>
+          <a:p>
+            <a:r>
+              <a:rPr lang="en-US" dirty="0"/>
+              <a:t>Command - an object that executes some logic, independent from the UI</a:t>
+            </a:r>
+          </a:p>
+          <a:p>
+            <a:r>
+              <a:rPr lang="en-US" dirty="0"/>
+              <a:t>UI element (e.g. Button) can bind to a Command</a:t>
+            </a:r>
+          </a:p>
+          <a:p>
+            <a:pPr lvl="1"/>
+            <a:r>
+              <a:rPr lang="en-US" dirty="0"/>
+              <a:t>User interacts with the UI element, command logic is executed</a:t>
+            </a:r>
+          </a:p>
+          <a:p>
+            <a:r>
+              <a:rPr lang="en-US" dirty="0"/>
+              <a:t>Commands vs Event Handlers</a:t>
+            </a:r>
+          </a:p>
+          <a:p>
+            <a:pPr lvl="1"/>
+            <a:r>
+              <a:rPr lang="en-US" dirty="0"/>
+              <a:t>Command - View binds to a Command object in the ViewModel</a:t>
+            </a:r>
+          </a:p>
+          <a:p>
+            <a:pPr lvl="1"/>
+            <a:r>
+              <a:rPr lang="en-US" dirty="0"/>
+              <a:t>Event Handler - code-behind for UI element (e.g. Click handler) executes logic</a:t>
+            </a:r>
+          </a:p>
+          <a:p>
+            <a:r>
+              <a:rPr lang="en-US" dirty="0"/>
+              <a:t>Benefits of commands</a:t>
+            </a:r>
+          </a:p>
+          <a:p>
+            <a:pPr lvl="1"/>
+            <a:r>
+              <a:rPr lang="en-US" dirty="0"/>
+              <a:t>Separation of concerns -- logic of what the command does is outside of the View</a:t>
+            </a:r>
+          </a:p>
+          <a:p>
+            <a:pPr lvl="1"/>
+            <a:r>
+              <a:rPr lang="en-US" dirty="0"/>
+              <a:t>Reuse -- can use same command for multiple UI elements (e.g. menu, toolbar)</a:t>
+            </a:r>
+          </a:p>
+          <a:p>
+            <a:pPr lvl="1"/>
+            <a:r>
+              <a:rPr lang="en-US" dirty="0" err="1"/>
+              <a:t>CanExecute</a:t>
+            </a:r>
+            <a:r>
+              <a:rPr lang="en-US" dirty="0"/>
+              <a:t> property -- used to disable controls</a:t>
+            </a:r>
+          </a:p>
+        </p:txBody>
+      </p:sp>
+    </p:spTree>
+    <p:extLst>
+      <p:ext uri="{BB962C8B-B14F-4D97-AF65-F5344CB8AC3E}">
+        <p14:creationId xmlns:p14="http://schemas.microsoft.com/office/powerpoint/2010/main" val="2112032915"/>
+      </p:ext>
+    </p:extLst>
+  </p:cSld>
+  <p:clrMapOvr>
+    <a:masterClrMapping/>
+  </p:clrMapOvr>
+  <p:timing>
+    <p:tnLst>
+      <p:par>
+        <p:cTn id="1" dur="indefinite" restart="never" nodeType="tmRoot">
+          <p:childTnLst>
+            <p:seq concurrent="1" nextAc="seek">
+              <p:cTn id="2" dur="indefinite" nodeType="mainSeq">
+                <p:childTnLst>
+                  <p:par>
+                    <p:cTn id="3" fill="hold">
+                      <p:stCondLst>
+                        <p:cond delay="indefinite"/>
+                      </p:stCondLst>
+                      <p:childTnLst>
+                        <p:par>
+                          <p:cTn id="4" fill="hold">
+                            <p:stCondLst>
+                              <p:cond delay="0"/>
+                            </p:stCondLst>
+                            <p:childTnLst>
+                              <p:par>
+                                <p:cTn id="5" presetID="10" presetClass="entr" presetSubtype="0" fill="hold" grpId="0" nodeType="clickEffect">
+                                  <p:stCondLst>
+                                    <p:cond delay="0"/>
+                                  </p:stCondLst>
+                                  <p:childTnLst>
+                                    <p:set>
+                                      <p:cBhvr>
+                                        <p:cTn id="6" dur="1" fill="hold">
+                                          <p:stCondLst>
+                                            <p:cond delay="0"/>
+                                          </p:stCondLst>
+                                        </p:cTn>
+                                        <p:tgtEl>
+                                          <p:spTgt spid="3">
+                                            <p:txEl>
+                                              <p:pRg st="0" end="0"/>
+                                            </p:txEl>
+                                          </p:spTgt>
+                                        </p:tgtEl>
+                                        <p:attrNameLst>
+                                          <p:attrName>style.visibility</p:attrName>
+                                        </p:attrNameLst>
+                                      </p:cBhvr>
+                                      <p:to>
+                                        <p:strVal val="visible"/>
+                                      </p:to>
+                                    </p:set>
+                                    <p:animEffect transition="in" filter="fade">
+                                      <p:cBhvr>
+                                        <p:cTn id="7" dur="500"/>
+                                        <p:tgtEl>
+                                          <p:spTgt spid="3">
+                                            <p:txEl>
+                                              <p:pRg st="0" end="0"/>
+                                            </p:txEl>
+                                          </p:spTgt>
+                                        </p:tgtEl>
+                                      </p:cBhvr>
+                                    </p:animEffect>
+                                  </p:childTnLst>
+                                </p:cTn>
+                              </p:par>
+                            </p:childTnLst>
+                          </p:cTn>
+                        </p:par>
+                      </p:childTnLst>
+                    </p:cTn>
+                  </p:par>
+                  <p:par>
+                    <p:cTn id="8" fill="hold">
+                      <p:stCondLst>
+                        <p:cond delay="indefinite"/>
+                      </p:stCondLst>
+                      <p:childTnLst>
+                        <p:par>
+                          <p:cTn id="9" fill="hold">
+                            <p:stCondLst>
+                              <p:cond delay="0"/>
+                            </p:stCondLst>
+                            <p:childTnLst>
+                              <p:par>
+                                <p:cTn id="10" presetID="10" presetClass="entr" presetSubtype="0" fill="hold" grpId="0" nodeType="clickEffect">
+                                  <p:stCondLst>
+                                    <p:cond delay="0"/>
+                                  </p:stCondLst>
+                                  <p:childTnLst>
+                                    <p:set>
+                                      <p:cBhvr>
+                                        <p:cTn id="11" dur="1" fill="hold">
+                                          <p:stCondLst>
+                                            <p:cond delay="0"/>
+                                          </p:stCondLst>
+                                        </p:cTn>
+                                        <p:tgtEl>
+                                          <p:spTgt spid="3">
+                                            <p:txEl>
+                                              <p:pRg st="1" end="1"/>
+                                            </p:txEl>
+                                          </p:spTgt>
+                                        </p:tgtEl>
+                                        <p:attrNameLst>
+                                          <p:attrName>style.visibility</p:attrName>
+                                        </p:attrNameLst>
+                                      </p:cBhvr>
+                                      <p:to>
+                                        <p:strVal val="visible"/>
+                                      </p:to>
+                                    </p:set>
+                                    <p:animEffect transition="in" filter="fade">
+                                      <p:cBhvr>
+                                        <p:cTn id="12" dur="500"/>
+                                        <p:tgtEl>
+                                          <p:spTgt spid="3">
+                                            <p:txEl>
+                                              <p:pRg st="1" end="1"/>
+                                            </p:txEl>
+                                          </p:spTgt>
+                                        </p:tgtEl>
+                                      </p:cBhvr>
+                                    </p:animEffect>
+                                  </p:childTnLst>
+                                </p:cTn>
+                              </p:par>
+                              <p:par>
+                                <p:cTn id="13" presetID="10" presetClass="entr" presetSubtype="0" fill="hold" grpId="0" nodeType="withEffect">
+                                  <p:stCondLst>
+                                    <p:cond delay="0"/>
+                                  </p:stCondLst>
+                                  <p:childTnLst>
+                                    <p:set>
+                                      <p:cBhvr>
+                                        <p:cTn id="14" dur="1" fill="hold">
+                                          <p:stCondLst>
+                                            <p:cond delay="0"/>
+                                          </p:stCondLst>
+                                        </p:cTn>
+                                        <p:tgtEl>
+                                          <p:spTgt spid="3">
+                                            <p:txEl>
+                                              <p:pRg st="2" end="2"/>
+                                            </p:txEl>
+                                          </p:spTgt>
+                                        </p:tgtEl>
+                                        <p:attrNameLst>
+                                          <p:attrName>style.visibility</p:attrName>
+                                        </p:attrNameLst>
+                                      </p:cBhvr>
+                                      <p:to>
+                                        <p:strVal val="visible"/>
+                                      </p:to>
+                                    </p:set>
+                                    <p:animEffect transition="in" filter="fade">
+                                      <p:cBhvr>
+                                        <p:cTn id="15" dur="500"/>
+                                        <p:tgtEl>
+                                          <p:spTgt spid="3">
+                                            <p:txEl>
+                                              <p:pRg st="2" end="2"/>
+                                            </p:txEl>
+                                          </p:spTgt>
+                                        </p:tgtEl>
+                                      </p:cBhvr>
+                                    </p:animEffect>
+                                  </p:childTnLst>
+                                </p:cTn>
+                              </p:par>
+                            </p:childTnLst>
+                          </p:cTn>
+                        </p:par>
+                      </p:childTnLst>
+                    </p:cTn>
+                  </p:par>
+                  <p:par>
+                    <p:cTn id="16" fill="hold">
+                      <p:stCondLst>
+                        <p:cond delay="indefinite"/>
+                      </p:stCondLst>
+                      <p:childTnLst>
+                        <p:par>
+                          <p:cTn id="17" fill="hold">
+                            <p:stCondLst>
+                              <p:cond delay="0"/>
+                            </p:stCondLst>
+                            <p:childTnLst>
+                              <p:par>
+                                <p:cTn id="18" presetID="10" presetClass="entr" presetSubtype="0" fill="hold" grpId="0" nodeType="clickEffect">
+                                  <p:stCondLst>
+                                    <p:cond delay="0"/>
+                                  </p:stCondLst>
+                                  <p:childTnLst>
+                                    <p:set>
+                                      <p:cBhvr>
+                                        <p:cTn id="19" dur="1" fill="hold">
+                                          <p:stCondLst>
+                                            <p:cond delay="0"/>
+                                          </p:stCondLst>
+                                        </p:cTn>
+                                        <p:tgtEl>
+                                          <p:spTgt spid="3">
+                                            <p:txEl>
+                                              <p:pRg st="3" end="3"/>
+                                            </p:txEl>
+                                          </p:spTgt>
+                                        </p:tgtEl>
+                                        <p:attrNameLst>
+                                          <p:attrName>style.visibility</p:attrName>
+                                        </p:attrNameLst>
+                                      </p:cBhvr>
+                                      <p:to>
+                                        <p:strVal val="visible"/>
+                                      </p:to>
+                                    </p:set>
+                                    <p:animEffect transition="in" filter="fade">
+                                      <p:cBhvr>
+                                        <p:cTn id="20" dur="500"/>
+                                        <p:tgtEl>
+                                          <p:spTgt spid="3">
+                                            <p:txEl>
+                                              <p:pRg st="3" end="3"/>
+                                            </p:txEl>
+                                          </p:spTgt>
+                                        </p:tgtEl>
+                                      </p:cBhvr>
+                                    </p:animEffect>
+                                  </p:childTnLst>
+                                </p:cTn>
+                              </p:par>
+                              <p:par>
+                                <p:cTn id="21" presetID="10" presetClass="entr" presetSubtype="0" fill="hold" grpId="0" nodeType="withEffect">
+                                  <p:stCondLst>
+                                    <p:cond delay="0"/>
+                                  </p:stCondLst>
+                                  <p:childTnLst>
+                                    <p:set>
+                                      <p:cBhvr>
+                                        <p:cTn id="22" dur="1" fill="hold">
+                                          <p:stCondLst>
+                                            <p:cond delay="0"/>
+                                          </p:stCondLst>
+                                        </p:cTn>
+                                        <p:tgtEl>
+                                          <p:spTgt spid="3">
+                                            <p:txEl>
+                                              <p:pRg st="4" end="4"/>
+                                            </p:txEl>
+                                          </p:spTgt>
+                                        </p:tgtEl>
+                                        <p:attrNameLst>
+                                          <p:attrName>style.visibility</p:attrName>
+                                        </p:attrNameLst>
+                                      </p:cBhvr>
+                                      <p:to>
+                                        <p:strVal val="visible"/>
+                                      </p:to>
+                                    </p:set>
+                                    <p:animEffect transition="in" filter="fade">
+                                      <p:cBhvr>
+                                        <p:cTn id="23" dur="500"/>
+                                        <p:tgtEl>
+                                          <p:spTgt spid="3">
+                                            <p:txEl>
+                                              <p:pRg st="4" end="4"/>
+                                            </p:txEl>
+                                          </p:spTgt>
+                                        </p:tgtEl>
+                                      </p:cBhvr>
+                                    </p:animEffect>
+                                  </p:childTnLst>
+                                </p:cTn>
+                              </p:par>
+                              <p:par>
+                                <p:cTn id="24" presetID="10" presetClass="entr" presetSubtype="0" fill="hold" grpId="0" nodeType="withEffect">
+                                  <p:stCondLst>
+                                    <p:cond delay="0"/>
+                                  </p:stCondLst>
+                                  <p:childTnLst>
+                                    <p:set>
+                                      <p:cBhvr>
+                                        <p:cTn id="25" dur="1" fill="hold">
+                                          <p:stCondLst>
+                                            <p:cond delay="0"/>
+                                          </p:stCondLst>
+                                        </p:cTn>
+                                        <p:tgtEl>
+                                          <p:spTgt spid="3">
+                                            <p:txEl>
+                                              <p:pRg st="5" end="5"/>
+                                            </p:txEl>
+                                          </p:spTgt>
+                                        </p:tgtEl>
+                                        <p:attrNameLst>
+                                          <p:attrName>style.visibility</p:attrName>
+                                        </p:attrNameLst>
+                                      </p:cBhvr>
+                                      <p:to>
+                                        <p:strVal val="visible"/>
+                                      </p:to>
+                                    </p:set>
+                                    <p:animEffect transition="in" filter="fade">
+                                      <p:cBhvr>
+                                        <p:cTn id="26" dur="500"/>
+                                        <p:tgtEl>
+                                          <p:spTgt spid="3">
+                                            <p:txEl>
+                                              <p:pRg st="5" end="5"/>
+                                            </p:txEl>
+                                          </p:spTgt>
+                                        </p:tgtEl>
+                                      </p:cBhvr>
+                                    </p:animEffect>
+                                  </p:childTnLst>
+                                </p:cTn>
+                              </p:par>
+                            </p:childTnLst>
+                          </p:cTn>
+                        </p:par>
+                      </p:childTnLst>
+                    </p:cTn>
+                  </p:par>
+                  <p:par>
+                    <p:cTn id="27" fill="hold">
+                      <p:stCondLst>
+                        <p:cond delay="indefinite"/>
+                      </p:stCondLst>
+                      <p:childTnLst>
+                        <p:par>
+                          <p:cTn id="28" fill="hold">
+                            <p:stCondLst>
+                              <p:cond delay="0"/>
+                            </p:stCondLst>
+                            <p:childTnLst>
+                              <p:par>
+                                <p:cTn id="29" presetID="10" presetClass="entr" presetSubtype="0" fill="hold" grpId="0" nodeType="clickEffect">
+                                  <p:stCondLst>
+                                    <p:cond delay="0"/>
+                                  </p:stCondLst>
+                                  <p:childTnLst>
+                                    <p:set>
+                                      <p:cBhvr>
+                                        <p:cTn id="30" dur="1" fill="hold">
+                                          <p:stCondLst>
+                                            <p:cond delay="0"/>
+                                          </p:stCondLst>
+                                        </p:cTn>
+                                        <p:tgtEl>
+                                          <p:spTgt spid="3">
+                                            <p:txEl>
+                                              <p:pRg st="6" end="6"/>
+                                            </p:txEl>
+                                          </p:spTgt>
+                                        </p:tgtEl>
+                                        <p:attrNameLst>
+                                          <p:attrName>style.visibility</p:attrName>
+                                        </p:attrNameLst>
+                                      </p:cBhvr>
+                                      <p:to>
+                                        <p:strVal val="visible"/>
+                                      </p:to>
+                                    </p:set>
+                                    <p:animEffect transition="in" filter="fade">
+                                      <p:cBhvr>
+                                        <p:cTn id="31" dur="500"/>
+                                        <p:tgtEl>
+                                          <p:spTgt spid="3">
+                                            <p:txEl>
+                                              <p:pRg st="6" end="6"/>
+                                            </p:txEl>
+                                          </p:spTgt>
+                                        </p:tgtEl>
+                                      </p:cBhvr>
+                                    </p:animEffect>
+                                  </p:childTnLst>
+                                </p:cTn>
+                              </p:par>
+                              <p:par>
+                                <p:cTn id="32" presetID="10" presetClass="entr" presetSubtype="0" fill="hold" grpId="0" nodeType="withEffect">
+                                  <p:stCondLst>
+                                    <p:cond delay="0"/>
+                                  </p:stCondLst>
+                                  <p:childTnLst>
+                                    <p:set>
+                                      <p:cBhvr>
+                                        <p:cTn id="33" dur="1" fill="hold">
+                                          <p:stCondLst>
+                                            <p:cond delay="0"/>
+                                          </p:stCondLst>
+                                        </p:cTn>
+                                        <p:tgtEl>
+                                          <p:spTgt spid="3">
+                                            <p:txEl>
+                                              <p:pRg st="7" end="7"/>
+                                            </p:txEl>
+                                          </p:spTgt>
+                                        </p:tgtEl>
+                                        <p:attrNameLst>
+                                          <p:attrName>style.visibility</p:attrName>
+                                        </p:attrNameLst>
+                                      </p:cBhvr>
+                                      <p:to>
+                                        <p:strVal val="visible"/>
+                                      </p:to>
+                                    </p:set>
+                                    <p:animEffect transition="in" filter="fade">
+                                      <p:cBhvr>
+                                        <p:cTn id="34" dur="500"/>
+                                        <p:tgtEl>
+                                          <p:spTgt spid="3">
+                                            <p:txEl>
+                                              <p:pRg st="7" end="7"/>
+                                            </p:txEl>
+                                          </p:spTgt>
+                                        </p:tgtEl>
+                                      </p:cBhvr>
+                                    </p:animEffect>
+                                  </p:childTnLst>
+                                </p:cTn>
+                              </p:par>
+                              <p:par>
+                                <p:cTn id="35" presetID="10" presetClass="entr" presetSubtype="0" fill="hold" grpId="0" nodeType="withEffect">
+                                  <p:stCondLst>
+                                    <p:cond delay="0"/>
+                                  </p:stCondLst>
+                                  <p:childTnLst>
+                                    <p:set>
+                                      <p:cBhvr>
+                                        <p:cTn id="36" dur="1" fill="hold">
+                                          <p:stCondLst>
+                                            <p:cond delay="0"/>
+                                          </p:stCondLst>
+                                        </p:cTn>
+                                        <p:tgtEl>
+                                          <p:spTgt spid="3">
+                                            <p:txEl>
+                                              <p:pRg st="8" end="8"/>
+                                            </p:txEl>
+                                          </p:spTgt>
+                                        </p:tgtEl>
+                                        <p:attrNameLst>
+                                          <p:attrName>style.visibility</p:attrName>
+                                        </p:attrNameLst>
+                                      </p:cBhvr>
+                                      <p:to>
+                                        <p:strVal val="visible"/>
+                                      </p:to>
+                                    </p:set>
+                                    <p:animEffect transition="in" filter="fade">
+                                      <p:cBhvr>
+                                        <p:cTn id="37" dur="500"/>
+                                        <p:tgtEl>
+                                          <p:spTgt spid="3">
+                                            <p:txEl>
+                                              <p:pRg st="8" end="8"/>
+                                            </p:txEl>
+                                          </p:spTgt>
+                                        </p:tgtEl>
+                                      </p:cBhvr>
+                                    </p:animEffect>
+                                  </p:childTnLst>
+                                </p:cTn>
+                              </p:par>
+                              <p:par>
+                                <p:cTn id="38" presetID="10" presetClass="entr" presetSubtype="0" fill="hold" grpId="0" nodeType="withEffect">
+                                  <p:stCondLst>
+                                    <p:cond delay="0"/>
+                                  </p:stCondLst>
+                                  <p:childTnLst>
+                                    <p:set>
+                                      <p:cBhvr>
+                                        <p:cTn id="39" dur="1" fill="hold">
+                                          <p:stCondLst>
+                                            <p:cond delay="0"/>
+                                          </p:stCondLst>
+                                        </p:cTn>
+                                        <p:tgtEl>
+                                          <p:spTgt spid="3">
+                                            <p:txEl>
+                                              <p:pRg st="9" end="9"/>
+                                            </p:txEl>
+                                          </p:spTgt>
+                                        </p:tgtEl>
+                                        <p:attrNameLst>
+                                          <p:attrName>style.visibility</p:attrName>
+                                        </p:attrNameLst>
+                                      </p:cBhvr>
+                                      <p:to>
+                                        <p:strVal val="visible"/>
+                                      </p:to>
+                                    </p:set>
+                                    <p:animEffect transition="in" filter="fade">
+                                      <p:cBhvr>
+                                        <p:cTn id="40" dur="500"/>
+                                        <p:tgtEl>
+                                          <p:spTgt spid="3">
+                                            <p:txEl>
+                                              <p:pRg st="9" end="9"/>
+                                            </p:txEl>
+                                          </p:spTgt>
+                                        </p:tgtEl>
+                                      </p:cBhvr>
+                                    </p:animEffect>
+                                  </p:childTnLst>
+                                </p:cTn>
+                              </p:par>
+                            </p:childTnLst>
+                          </p:cTn>
+                        </p:par>
+                      </p:childTnLst>
+                    </p:cTn>
+                  </p:par>
+                </p:childTnLst>
+              </p:cTn>
+              <p:prevCondLst>
+                <p:cond evt="onPrev" delay="0">
+                  <p:tgtEl>
+                    <p:sldTgt/>
+                  </p:tgtEl>
+                </p:cond>
+              </p:prevCondLst>
+              <p:nextCondLst>
+                <p:cond evt="onNext" delay="0">
+                  <p:tgtEl>
+                    <p:sldTgt/>
+                  </p:tgtEl>
+                </p:cond>
+              </p:nextCondLst>
+            </p:seq>
+          </p:childTnLst>
+        </p:cTn>
+      </p:par>
+    </p:tnLst>
+    <p:bldLst>
+      <p:bldP spid="3" grpId="0" uiExpand="1" build="p"/>
+    </p:bldLst>
+  </p:timing>
+</p:sld>
+</file>
+
+<file path=ppt/slides/slide34.xml><?xml version="1.0" encoding="utf-8"?>
+<p:sld xmlns:a="http://schemas.openxmlformats.org/drawingml/2006/main" xmlns:r="http://schemas.openxmlformats.org/officeDocument/2006/relationships" xmlns:p="http://schemas.openxmlformats.org/presentationml/2006/main">
+  <p:cSld>
+    <p:spTree>
+      <p:nvGrpSpPr>
+        <p:cNvPr id="1" name=""/>
+        <p:cNvGrpSpPr/>
+        <p:nvPr/>
+      </p:nvGrpSpPr>
+      <p:grpSpPr>
+        <a:xfrm>
+          <a:off x="0" y="0"/>
+          <a:ext cx="0" cy="0"/>
+          <a:chOff x="0" y="0"/>
+          <a:chExt cx="0" cy="0"/>
+        </a:xfrm>
+      </p:grpSpPr>
+      <p:sp>
+        <p:nvSpPr>
+          <p:cNvPr id="2" name="Title 1">
+            <a:extLst>
+              <a:ext uri="{FF2B5EF4-FFF2-40B4-BE49-F238E27FC236}">
+                <a16:creationId xmlns:a16="http://schemas.microsoft.com/office/drawing/2014/main" id="{A5D34920-B7B0-87FC-6F07-4D616409BC9F}"/>
+              </a:ext>
+            </a:extLst>
+          </p:cNvPr>
+          <p:cNvSpPr>
+            <a:spLocks noGrp="1"/>
+          </p:cNvSpPr>
+          <p:nvPr>
+            <p:ph type="title"/>
+          </p:nvPr>
+        </p:nvSpPr>
+        <p:spPr/>
+        <p:txBody>
+          <a:bodyPr/>
+          <a:lstStyle/>
+          <a:p>
+            <a:r>
+              <a:rPr lang="en-US" dirty="0"/>
+              <a:t>Unit 6 - Commands</a:t>
+            </a:r>
+          </a:p>
+        </p:txBody>
+      </p:sp>
+      <p:sp>
+        <p:nvSpPr>
+          <p:cNvPr id="3" name="Content Placeholder 2">
+            <a:extLst>
+              <a:ext uri="{FF2B5EF4-FFF2-40B4-BE49-F238E27FC236}">
+                <a16:creationId xmlns:a16="http://schemas.microsoft.com/office/drawing/2014/main" id="{815D14F8-6FCF-75DC-89CE-AD9AE76F9465}"/>
+              </a:ext>
+            </a:extLst>
+          </p:cNvPr>
+          <p:cNvSpPr>
+            <a:spLocks noGrp="1"/>
+          </p:cNvSpPr>
+          <p:nvPr>
+            <p:ph idx="1"/>
+          </p:nvPr>
+        </p:nvSpPr>
+        <p:spPr/>
+        <p:txBody>
+          <a:bodyPr>
+            <a:normAutofit fontScale="70000" lnSpcReduction="20000"/>
+          </a:bodyPr>
+          <a:lstStyle/>
+          <a:p>
+            <a:r>
+              <a:rPr lang="en-US" dirty="0"/>
+              <a:t>Command class</a:t>
+            </a:r>
+          </a:p>
+          <a:p>
+            <a:pPr lvl="1"/>
+            <a:r>
+              <a:rPr lang="en-US" dirty="0"/>
+              <a:t>Must implement </a:t>
+            </a:r>
+            <a:r>
+              <a:rPr lang="en-US" dirty="0" err="1"/>
+              <a:t>ICommand</a:t>
+            </a:r>
+            <a:endParaRPr lang="en-US" dirty="0"/>
+          </a:p>
+          <a:p>
+            <a:pPr lvl="1"/>
+            <a:r>
+              <a:rPr lang="en-US" dirty="0"/>
+              <a:t>Execute - method that executes the command  (takes optional parameter)</a:t>
+            </a:r>
+          </a:p>
+          <a:p>
+            <a:pPr lvl="1"/>
+            <a:r>
+              <a:rPr lang="en-US" dirty="0" err="1"/>
+              <a:t>CanExecute</a:t>
+            </a:r>
+            <a:r>
+              <a:rPr lang="en-US" dirty="0"/>
+              <a:t> - method that determines whether command can execute, return bool</a:t>
+            </a:r>
+          </a:p>
+          <a:p>
+            <a:r>
+              <a:rPr lang="en-US" dirty="0" err="1"/>
+              <a:t>DelegateCommand</a:t>
+            </a:r>
+            <a:endParaRPr lang="en-US" dirty="0"/>
+          </a:p>
+          <a:p>
+            <a:pPr lvl="1"/>
+            <a:r>
+              <a:rPr lang="en-US" dirty="0"/>
+              <a:t>Helper class that implements </a:t>
+            </a:r>
+            <a:r>
+              <a:rPr lang="en-US" dirty="0" err="1"/>
+              <a:t>ICommand</a:t>
+            </a:r>
+            <a:endParaRPr lang="en-US" dirty="0"/>
+          </a:p>
+          <a:p>
+            <a:pPr lvl="1"/>
+            <a:r>
+              <a:rPr lang="en-US" dirty="0"/>
+              <a:t>Can use it everywhere you need a command</a:t>
+            </a:r>
+          </a:p>
+          <a:p>
+            <a:r>
+              <a:rPr lang="en-US" dirty="0"/>
+              <a:t>ViewModel</a:t>
+            </a:r>
+          </a:p>
+          <a:p>
+            <a:pPr lvl="1"/>
+            <a:r>
+              <a:rPr lang="en-US" dirty="0"/>
+              <a:t>Creates instance of the command</a:t>
+            </a:r>
+          </a:p>
+          <a:p>
+            <a:pPr lvl="1"/>
+            <a:r>
+              <a:rPr lang="en-US" dirty="0"/>
+              <a:t>Pass in delegates for Execute and </a:t>
+            </a:r>
+            <a:r>
+              <a:rPr lang="en-US" dirty="0" err="1"/>
+              <a:t>CanExecute</a:t>
+            </a:r>
+            <a:endParaRPr lang="en-US" dirty="0"/>
+          </a:p>
+          <a:p>
+            <a:pPr lvl="1"/>
+            <a:r>
+              <a:rPr lang="en-US" dirty="0"/>
+              <a:t>ViewModel provides the logic</a:t>
+            </a:r>
+          </a:p>
+          <a:p>
+            <a:r>
+              <a:rPr lang="en-US" dirty="0"/>
+              <a:t>View</a:t>
+            </a:r>
+          </a:p>
+          <a:p>
+            <a:pPr lvl="1"/>
+            <a:r>
+              <a:rPr lang="en-US" dirty="0"/>
+              <a:t>Bind Command property on UI element to a command property in ViewModel</a:t>
+            </a:r>
+          </a:p>
+          <a:p>
+            <a:r>
+              <a:rPr lang="en-US" dirty="0">
+                <a:solidFill>
+                  <a:srgbClr val="00B050"/>
+                </a:solidFill>
+              </a:rPr>
+              <a:t>Example – Implementing a Command</a:t>
+            </a:r>
+          </a:p>
+          <a:p>
+            <a:pPr lvl="1"/>
+            <a:endParaRPr lang="en-US" dirty="0"/>
+          </a:p>
+          <a:p>
+            <a:pPr lvl="1"/>
+            <a:endParaRPr lang="en-US" dirty="0"/>
+          </a:p>
+        </p:txBody>
+      </p:sp>
+    </p:spTree>
+    <p:extLst>
+      <p:ext uri="{BB962C8B-B14F-4D97-AF65-F5344CB8AC3E}">
+        <p14:creationId xmlns:p14="http://schemas.microsoft.com/office/powerpoint/2010/main" val="3262754024"/>
+      </p:ext>
+    </p:extLst>
+  </p:cSld>
+  <p:clrMapOvr>
+    <a:masterClrMapping/>
+  </p:clrMapOvr>
+  <p:timing>
+    <p:tnLst>
+      <p:par>
+        <p:cTn id="1" dur="indefinite" restart="never" nodeType="tmRoot">
+          <p:childTnLst>
+            <p:seq concurrent="1" nextAc="seek">
+              <p:cTn id="2" dur="indefinite" nodeType="mainSeq">
+                <p:childTnLst>
+                  <p:par>
+                    <p:cTn id="3" fill="hold">
+                      <p:stCondLst>
+                        <p:cond delay="indefinite"/>
+                      </p:stCondLst>
+                      <p:childTnLst>
+                        <p:par>
+                          <p:cTn id="4" fill="hold">
+                            <p:stCondLst>
+                              <p:cond delay="0"/>
+                            </p:stCondLst>
+                            <p:childTnLst>
+                              <p:par>
+                                <p:cTn id="5" presetID="10" presetClass="entr" presetSubtype="0" fill="hold" grpId="0" nodeType="clickEffect">
+                                  <p:stCondLst>
+                                    <p:cond delay="0"/>
+                                  </p:stCondLst>
+                                  <p:childTnLst>
+                                    <p:set>
+                                      <p:cBhvr>
+                                        <p:cTn id="6" dur="1" fill="hold">
+                                          <p:stCondLst>
+                                            <p:cond delay="0"/>
+                                          </p:stCondLst>
+                                        </p:cTn>
+                                        <p:tgtEl>
+                                          <p:spTgt spid="3">
+                                            <p:txEl>
+                                              <p:pRg st="0" end="0"/>
+                                            </p:txEl>
+                                          </p:spTgt>
+                                        </p:tgtEl>
+                                        <p:attrNameLst>
+                                          <p:attrName>style.visibility</p:attrName>
+                                        </p:attrNameLst>
+                                      </p:cBhvr>
+                                      <p:to>
+                                        <p:strVal val="visible"/>
+                                      </p:to>
+                                    </p:set>
+                                    <p:animEffect transition="in" filter="fade">
+                                      <p:cBhvr>
+                                        <p:cTn id="7" dur="500"/>
+                                        <p:tgtEl>
+                                          <p:spTgt spid="3">
+                                            <p:txEl>
+                                              <p:pRg st="0" end="0"/>
+                                            </p:txEl>
+                                          </p:spTgt>
+                                        </p:tgtEl>
+                                      </p:cBhvr>
+                                    </p:animEffect>
+                                  </p:childTnLst>
+                                </p:cTn>
+                              </p:par>
+                              <p:par>
+                                <p:cTn id="8" presetID="10" presetClass="entr" presetSubtype="0" fill="hold" grpId="0" nodeType="withEffect">
+                                  <p:stCondLst>
+                                    <p:cond delay="0"/>
+                                  </p:stCondLst>
+                                  <p:childTnLst>
+                                    <p:set>
+                                      <p:cBhvr>
+                                        <p:cTn id="9" dur="1" fill="hold">
+                                          <p:stCondLst>
+                                            <p:cond delay="0"/>
+                                          </p:stCondLst>
+                                        </p:cTn>
+                                        <p:tgtEl>
+                                          <p:spTgt spid="3">
+                                            <p:txEl>
+                                              <p:pRg st="1" end="1"/>
+                                            </p:txEl>
+                                          </p:spTgt>
+                                        </p:tgtEl>
+                                        <p:attrNameLst>
+                                          <p:attrName>style.visibility</p:attrName>
+                                        </p:attrNameLst>
+                                      </p:cBhvr>
+                                      <p:to>
+                                        <p:strVal val="visible"/>
+                                      </p:to>
+                                    </p:set>
+                                    <p:animEffect transition="in" filter="fade">
+                                      <p:cBhvr>
+                                        <p:cTn id="10" dur="500"/>
+                                        <p:tgtEl>
+                                          <p:spTgt spid="3">
+                                            <p:txEl>
+                                              <p:pRg st="1" end="1"/>
+                                            </p:txEl>
+                                          </p:spTgt>
+                                        </p:tgtEl>
+                                      </p:cBhvr>
+                                    </p:animEffect>
+                                  </p:childTnLst>
+                                </p:cTn>
+                              </p:par>
+                              <p:par>
+                                <p:cTn id="11" presetID="10" presetClass="entr" presetSubtype="0" fill="hold" grpId="0" nodeType="withEffect">
+                                  <p:stCondLst>
+                                    <p:cond delay="0"/>
+                                  </p:stCondLst>
+                                  <p:childTnLst>
+                                    <p:set>
+                                      <p:cBhvr>
+                                        <p:cTn id="12" dur="1" fill="hold">
+                                          <p:stCondLst>
+                                            <p:cond delay="0"/>
+                                          </p:stCondLst>
+                                        </p:cTn>
+                                        <p:tgtEl>
+                                          <p:spTgt spid="3">
+                                            <p:txEl>
+                                              <p:pRg st="2" end="2"/>
+                                            </p:txEl>
+                                          </p:spTgt>
+                                        </p:tgtEl>
+                                        <p:attrNameLst>
+                                          <p:attrName>style.visibility</p:attrName>
+                                        </p:attrNameLst>
+                                      </p:cBhvr>
+                                      <p:to>
+                                        <p:strVal val="visible"/>
+                                      </p:to>
+                                    </p:set>
+                                    <p:animEffect transition="in" filter="fade">
+                                      <p:cBhvr>
+                                        <p:cTn id="13" dur="500"/>
+                                        <p:tgtEl>
+                                          <p:spTgt spid="3">
+                                            <p:txEl>
+                                              <p:pRg st="2" end="2"/>
+                                            </p:txEl>
+                                          </p:spTgt>
+                                        </p:tgtEl>
+                                      </p:cBhvr>
+                                    </p:animEffect>
+                                  </p:childTnLst>
+                                </p:cTn>
+                              </p:par>
+                              <p:par>
+                                <p:cTn id="14" presetID="10" presetClass="entr" presetSubtype="0" fill="hold" grpId="0" nodeType="withEffect">
+                                  <p:stCondLst>
+                                    <p:cond delay="0"/>
+                                  </p:stCondLst>
+                                  <p:childTnLst>
+                                    <p:set>
+                                      <p:cBhvr>
+                                        <p:cTn id="15" dur="1" fill="hold">
+                                          <p:stCondLst>
+                                            <p:cond delay="0"/>
+                                          </p:stCondLst>
+                                        </p:cTn>
+                                        <p:tgtEl>
+                                          <p:spTgt spid="3">
+                                            <p:txEl>
+                                              <p:pRg st="3" end="3"/>
+                                            </p:txEl>
+                                          </p:spTgt>
+                                        </p:tgtEl>
+                                        <p:attrNameLst>
+                                          <p:attrName>style.visibility</p:attrName>
+                                        </p:attrNameLst>
+                                      </p:cBhvr>
+                                      <p:to>
+                                        <p:strVal val="visible"/>
+                                      </p:to>
+                                    </p:set>
+                                    <p:animEffect transition="in" filter="fade">
+                                      <p:cBhvr>
+                                        <p:cTn id="16" dur="500"/>
+                                        <p:tgtEl>
+                                          <p:spTgt spid="3">
+                                            <p:txEl>
+                                              <p:pRg st="3" end="3"/>
+                                            </p:txEl>
+                                          </p:spTgt>
+                                        </p:tgtEl>
+                                      </p:cBhvr>
+                                    </p:animEffect>
+                                  </p:childTnLst>
+                                </p:cTn>
+                              </p:par>
+                            </p:childTnLst>
+                          </p:cTn>
+                        </p:par>
+                      </p:childTnLst>
+                    </p:cTn>
+                  </p:par>
+                  <p:par>
+                    <p:cTn id="17" fill="hold">
+                      <p:stCondLst>
+                        <p:cond delay="indefinite"/>
+                      </p:stCondLst>
+                      <p:childTnLst>
+                        <p:par>
+                          <p:cTn id="18" fill="hold">
+                            <p:stCondLst>
+                              <p:cond delay="0"/>
+                            </p:stCondLst>
+                            <p:childTnLst>
+                              <p:par>
+                                <p:cTn id="19" presetID="10" presetClass="entr" presetSubtype="0" fill="hold" grpId="0" nodeType="clickEffect">
+                                  <p:stCondLst>
+                                    <p:cond delay="0"/>
+                                  </p:stCondLst>
+                                  <p:childTnLst>
+                                    <p:set>
+                                      <p:cBhvr>
+                                        <p:cTn id="20" dur="1" fill="hold">
+                                          <p:stCondLst>
+                                            <p:cond delay="0"/>
+                                          </p:stCondLst>
+                                        </p:cTn>
+                                        <p:tgtEl>
+                                          <p:spTgt spid="3">
+                                            <p:txEl>
+                                              <p:pRg st="4" end="4"/>
+                                            </p:txEl>
+                                          </p:spTgt>
+                                        </p:tgtEl>
+                                        <p:attrNameLst>
+                                          <p:attrName>style.visibility</p:attrName>
+                                        </p:attrNameLst>
+                                      </p:cBhvr>
+                                      <p:to>
+                                        <p:strVal val="visible"/>
+                                      </p:to>
+                                    </p:set>
+                                    <p:animEffect transition="in" filter="fade">
+                                      <p:cBhvr>
+                                        <p:cTn id="21" dur="500"/>
+                                        <p:tgtEl>
+                                          <p:spTgt spid="3">
+                                            <p:txEl>
+                                              <p:pRg st="4" end="4"/>
+                                            </p:txEl>
+                                          </p:spTgt>
+                                        </p:tgtEl>
+                                      </p:cBhvr>
+                                    </p:animEffect>
+                                  </p:childTnLst>
+                                </p:cTn>
+                              </p:par>
+                              <p:par>
+                                <p:cTn id="22" presetID="10" presetClass="entr" presetSubtype="0" fill="hold" grpId="0" nodeType="withEffect">
+                                  <p:stCondLst>
+                                    <p:cond delay="0"/>
+                                  </p:stCondLst>
+                                  <p:childTnLst>
+                                    <p:set>
+                                      <p:cBhvr>
+                                        <p:cTn id="23" dur="1" fill="hold">
+                                          <p:stCondLst>
+                                            <p:cond delay="0"/>
+                                          </p:stCondLst>
+                                        </p:cTn>
+                                        <p:tgtEl>
+                                          <p:spTgt spid="3">
+                                            <p:txEl>
+                                              <p:pRg st="5" end="5"/>
+                                            </p:txEl>
+                                          </p:spTgt>
+                                        </p:tgtEl>
+                                        <p:attrNameLst>
+                                          <p:attrName>style.visibility</p:attrName>
+                                        </p:attrNameLst>
+                                      </p:cBhvr>
+                                      <p:to>
+                                        <p:strVal val="visible"/>
+                                      </p:to>
+                                    </p:set>
+                                    <p:animEffect transition="in" filter="fade">
+                                      <p:cBhvr>
+                                        <p:cTn id="24" dur="500"/>
+                                        <p:tgtEl>
+                                          <p:spTgt spid="3">
+                                            <p:txEl>
+                                              <p:pRg st="5" end="5"/>
+                                            </p:txEl>
+                                          </p:spTgt>
+                                        </p:tgtEl>
+                                      </p:cBhvr>
+                                    </p:animEffect>
+                                  </p:childTnLst>
+                                </p:cTn>
+                              </p:par>
+                              <p:par>
+                                <p:cTn id="25" presetID="10" presetClass="entr" presetSubtype="0" fill="hold" grpId="0" nodeType="withEffect">
+                                  <p:stCondLst>
+                                    <p:cond delay="0"/>
+                                  </p:stCondLst>
+                                  <p:childTnLst>
+                                    <p:set>
+                                      <p:cBhvr>
+                                        <p:cTn id="26" dur="1" fill="hold">
+                                          <p:stCondLst>
+                                            <p:cond delay="0"/>
+                                          </p:stCondLst>
+                                        </p:cTn>
+                                        <p:tgtEl>
+                                          <p:spTgt spid="3">
+                                            <p:txEl>
+                                              <p:pRg st="6" end="6"/>
+                                            </p:txEl>
+                                          </p:spTgt>
+                                        </p:tgtEl>
+                                        <p:attrNameLst>
+                                          <p:attrName>style.visibility</p:attrName>
+                                        </p:attrNameLst>
+                                      </p:cBhvr>
+                                      <p:to>
+                                        <p:strVal val="visible"/>
+                                      </p:to>
+                                    </p:set>
+                                    <p:animEffect transition="in" filter="fade">
+                                      <p:cBhvr>
+                                        <p:cTn id="27" dur="500"/>
+                                        <p:tgtEl>
+                                          <p:spTgt spid="3">
+                                            <p:txEl>
+                                              <p:pRg st="6" end="6"/>
+                                            </p:txEl>
+                                          </p:spTgt>
+                                        </p:tgtEl>
+                                      </p:cBhvr>
+                                    </p:animEffect>
+                                  </p:childTnLst>
+                                </p:cTn>
+                              </p:par>
+                            </p:childTnLst>
+                          </p:cTn>
+                        </p:par>
+                      </p:childTnLst>
+                    </p:cTn>
+                  </p:par>
+                  <p:par>
+                    <p:cTn id="28" fill="hold">
+                      <p:stCondLst>
+                        <p:cond delay="indefinite"/>
+                      </p:stCondLst>
+                      <p:childTnLst>
+                        <p:par>
+                          <p:cTn id="29" fill="hold">
+                            <p:stCondLst>
+                              <p:cond delay="0"/>
+                            </p:stCondLst>
+                            <p:childTnLst>
+                              <p:par>
+                                <p:cTn id="30" presetID="10" presetClass="entr" presetSubtype="0" fill="hold" grpId="0" nodeType="clickEffect">
+                                  <p:stCondLst>
+                                    <p:cond delay="0"/>
+                                  </p:stCondLst>
+                                  <p:childTnLst>
+                                    <p:set>
+                                      <p:cBhvr>
+                                        <p:cTn id="31" dur="1" fill="hold">
+                                          <p:stCondLst>
+                                            <p:cond delay="0"/>
+                                          </p:stCondLst>
+                                        </p:cTn>
+                                        <p:tgtEl>
+                                          <p:spTgt spid="3">
+                                            <p:txEl>
+                                              <p:pRg st="7" end="7"/>
+                                            </p:txEl>
+                                          </p:spTgt>
+                                        </p:tgtEl>
+                                        <p:attrNameLst>
+                                          <p:attrName>style.visibility</p:attrName>
+                                        </p:attrNameLst>
+                                      </p:cBhvr>
+                                      <p:to>
+                                        <p:strVal val="visible"/>
+                                      </p:to>
+                                    </p:set>
+                                    <p:animEffect transition="in" filter="fade">
+                                      <p:cBhvr>
+                                        <p:cTn id="32" dur="500"/>
+                                        <p:tgtEl>
+                                          <p:spTgt spid="3">
+                                            <p:txEl>
+                                              <p:pRg st="7" end="7"/>
+                                            </p:txEl>
+                                          </p:spTgt>
+                                        </p:tgtEl>
+                                      </p:cBhvr>
+                                    </p:animEffect>
+                                  </p:childTnLst>
+                                </p:cTn>
+                              </p:par>
+                              <p:par>
+                                <p:cTn id="33" presetID="10" presetClass="entr" presetSubtype="0" fill="hold" grpId="0" nodeType="withEffect">
+                                  <p:stCondLst>
+                                    <p:cond delay="0"/>
+                                  </p:stCondLst>
+                                  <p:childTnLst>
+                                    <p:set>
+                                      <p:cBhvr>
+                                        <p:cTn id="34" dur="1" fill="hold">
+                                          <p:stCondLst>
+                                            <p:cond delay="0"/>
+                                          </p:stCondLst>
+                                        </p:cTn>
+                                        <p:tgtEl>
+                                          <p:spTgt spid="3">
+                                            <p:txEl>
+                                              <p:pRg st="8" end="8"/>
+                                            </p:txEl>
+                                          </p:spTgt>
+                                        </p:tgtEl>
+                                        <p:attrNameLst>
+                                          <p:attrName>style.visibility</p:attrName>
+                                        </p:attrNameLst>
+                                      </p:cBhvr>
+                                      <p:to>
+                                        <p:strVal val="visible"/>
+                                      </p:to>
+                                    </p:set>
+                                    <p:animEffect transition="in" filter="fade">
+                                      <p:cBhvr>
+                                        <p:cTn id="35" dur="500"/>
+                                        <p:tgtEl>
+                                          <p:spTgt spid="3">
+                                            <p:txEl>
+                                              <p:pRg st="8" end="8"/>
+                                            </p:txEl>
+                                          </p:spTgt>
+                                        </p:tgtEl>
+                                      </p:cBhvr>
+                                    </p:animEffect>
+                                  </p:childTnLst>
+                                </p:cTn>
+                              </p:par>
+                              <p:par>
+                                <p:cTn id="36" presetID="10" presetClass="entr" presetSubtype="0" fill="hold" grpId="0" nodeType="withEffect">
+                                  <p:stCondLst>
+                                    <p:cond delay="0"/>
+                                  </p:stCondLst>
+                                  <p:childTnLst>
+                                    <p:set>
+                                      <p:cBhvr>
+                                        <p:cTn id="37" dur="1" fill="hold">
+                                          <p:stCondLst>
+                                            <p:cond delay="0"/>
+                                          </p:stCondLst>
+                                        </p:cTn>
+                                        <p:tgtEl>
+                                          <p:spTgt spid="3">
+                                            <p:txEl>
+                                              <p:pRg st="9" end="9"/>
+                                            </p:txEl>
+                                          </p:spTgt>
+                                        </p:tgtEl>
+                                        <p:attrNameLst>
+                                          <p:attrName>style.visibility</p:attrName>
+                                        </p:attrNameLst>
+                                      </p:cBhvr>
+                                      <p:to>
+                                        <p:strVal val="visible"/>
+                                      </p:to>
+                                    </p:set>
+                                    <p:animEffect transition="in" filter="fade">
+                                      <p:cBhvr>
+                                        <p:cTn id="38" dur="500"/>
+                                        <p:tgtEl>
+                                          <p:spTgt spid="3">
+                                            <p:txEl>
+                                              <p:pRg st="9" end="9"/>
+                                            </p:txEl>
+                                          </p:spTgt>
+                                        </p:tgtEl>
+                                      </p:cBhvr>
+                                    </p:animEffect>
+                                  </p:childTnLst>
+                                </p:cTn>
+                              </p:par>
+                              <p:par>
+                                <p:cTn id="39" presetID="10" presetClass="entr" presetSubtype="0" fill="hold" grpId="0" nodeType="withEffect">
+                                  <p:stCondLst>
+                                    <p:cond delay="0"/>
+                                  </p:stCondLst>
+                                  <p:childTnLst>
+                                    <p:set>
+                                      <p:cBhvr>
+                                        <p:cTn id="40" dur="1" fill="hold">
+                                          <p:stCondLst>
+                                            <p:cond delay="0"/>
+                                          </p:stCondLst>
+                                        </p:cTn>
+                                        <p:tgtEl>
+                                          <p:spTgt spid="3">
+                                            <p:txEl>
+                                              <p:pRg st="10" end="10"/>
+                                            </p:txEl>
+                                          </p:spTgt>
+                                        </p:tgtEl>
+                                        <p:attrNameLst>
+                                          <p:attrName>style.visibility</p:attrName>
+                                        </p:attrNameLst>
+                                      </p:cBhvr>
+                                      <p:to>
+                                        <p:strVal val="visible"/>
+                                      </p:to>
+                                    </p:set>
+                                    <p:animEffect transition="in" filter="fade">
+                                      <p:cBhvr>
+                                        <p:cTn id="41" dur="500"/>
+                                        <p:tgtEl>
+                                          <p:spTgt spid="3">
+                                            <p:txEl>
+                                              <p:pRg st="10" end="10"/>
+                                            </p:txEl>
+                                          </p:spTgt>
+                                        </p:tgtEl>
+                                      </p:cBhvr>
+                                    </p:animEffect>
+                                  </p:childTnLst>
+                                </p:cTn>
+                              </p:par>
+                            </p:childTnLst>
+                          </p:cTn>
+                        </p:par>
+                      </p:childTnLst>
+                    </p:cTn>
+                  </p:par>
+                  <p:par>
+                    <p:cTn id="42" fill="hold">
+                      <p:stCondLst>
+                        <p:cond delay="indefinite"/>
+                      </p:stCondLst>
+                      <p:childTnLst>
+                        <p:par>
+                          <p:cTn id="43" fill="hold">
+                            <p:stCondLst>
+                              <p:cond delay="0"/>
+                            </p:stCondLst>
+                            <p:childTnLst>
+                              <p:par>
+                                <p:cTn id="44" presetID="10" presetClass="entr" presetSubtype="0" fill="hold" grpId="0" nodeType="clickEffect">
+                                  <p:stCondLst>
+                                    <p:cond delay="0"/>
+                                  </p:stCondLst>
+                                  <p:childTnLst>
+                                    <p:set>
+                                      <p:cBhvr>
+                                        <p:cTn id="45" dur="1" fill="hold">
+                                          <p:stCondLst>
+                                            <p:cond delay="0"/>
+                                          </p:stCondLst>
+                                        </p:cTn>
+                                        <p:tgtEl>
+                                          <p:spTgt spid="3">
+                                            <p:txEl>
+                                              <p:pRg st="11" end="11"/>
+                                            </p:txEl>
+                                          </p:spTgt>
+                                        </p:tgtEl>
+                                        <p:attrNameLst>
+                                          <p:attrName>style.visibility</p:attrName>
+                                        </p:attrNameLst>
+                                      </p:cBhvr>
+                                      <p:to>
+                                        <p:strVal val="visible"/>
+                                      </p:to>
+                                    </p:set>
+                                    <p:animEffect transition="in" filter="fade">
+                                      <p:cBhvr>
+                                        <p:cTn id="46" dur="500"/>
+                                        <p:tgtEl>
+                                          <p:spTgt spid="3">
+                                            <p:txEl>
+                                              <p:pRg st="11" end="11"/>
+                                            </p:txEl>
+                                          </p:spTgt>
+                                        </p:tgtEl>
+                                      </p:cBhvr>
+                                    </p:animEffect>
+                                  </p:childTnLst>
+                                </p:cTn>
+                              </p:par>
+                              <p:par>
+                                <p:cTn id="47" presetID="10" presetClass="entr" presetSubtype="0" fill="hold" grpId="0" nodeType="withEffect">
+                                  <p:stCondLst>
+                                    <p:cond delay="0"/>
+                                  </p:stCondLst>
+                                  <p:childTnLst>
+                                    <p:set>
+                                      <p:cBhvr>
+                                        <p:cTn id="48" dur="1" fill="hold">
+                                          <p:stCondLst>
+                                            <p:cond delay="0"/>
+                                          </p:stCondLst>
+                                        </p:cTn>
+                                        <p:tgtEl>
+                                          <p:spTgt spid="3">
+                                            <p:txEl>
+                                              <p:pRg st="12" end="12"/>
+                                            </p:txEl>
+                                          </p:spTgt>
+                                        </p:tgtEl>
+                                        <p:attrNameLst>
+                                          <p:attrName>style.visibility</p:attrName>
+                                        </p:attrNameLst>
+                                      </p:cBhvr>
+                                      <p:to>
+                                        <p:strVal val="visible"/>
+                                      </p:to>
+                                    </p:set>
+                                    <p:animEffect transition="in" filter="fade">
+                                      <p:cBhvr>
+                                        <p:cTn id="49" dur="500"/>
+                                        <p:tgtEl>
+                                          <p:spTgt spid="3">
+                                            <p:txEl>
+                                              <p:pRg st="12" end="12"/>
+                                            </p:txEl>
+                                          </p:spTgt>
+                                        </p:tgtEl>
+                                      </p:cBhvr>
+                                    </p:animEffect>
+                                  </p:childTnLst>
+                                </p:cTn>
+                              </p:par>
+                            </p:childTnLst>
+                          </p:cTn>
+                        </p:par>
+                      </p:childTnLst>
+                    </p:cTn>
+                  </p:par>
+                  <p:par>
+                    <p:cTn id="50" fill="hold">
+                      <p:stCondLst>
+                        <p:cond delay="indefinite"/>
+                      </p:stCondLst>
+                      <p:childTnLst>
+                        <p:par>
+                          <p:cTn id="51" fill="hold">
+                            <p:stCondLst>
+                              <p:cond delay="0"/>
+                            </p:stCondLst>
+                            <p:childTnLst>
+                              <p:par>
+                                <p:cTn id="52" presetID="10" presetClass="entr" presetSubtype="0" fill="hold" grpId="0" nodeType="clickEffect">
+                                  <p:stCondLst>
+                                    <p:cond delay="0"/>
+                                  </p:stCondLst>
+                                  <p:childTnLst>
+                                    <p:set>
+                                      <p:cBhvr>
+                                        <p:cTn id="53" dur="1" fill="hold">
+                                          <p:stCondLst>
+                                            <p:cond delay="0"/>
+                                          </p:stCondLst>
+                                        </p:cTn>
+                                        <p:tgtEl>
+                                          <p:spTgt spid="3">
+                                            <p:txEl>
+                                              <p:pRg st="13" end="13"/>
+                                            </p:txEl>
+                                          </p:spTgt>
+                                        </p:tgtEl>
+                                        <p:attrNameLst>
+                                          <p:attrName>style.visibility</p:attrName>
+                                        </p:attrNameLst>
+                                      </p:cBhvr>
+                                      <p:to>
+                                        <p:strVal val="visible"/>
+                                      </p:to>
+                                    </p:set>
+                                    <p:animEffect transition="in" filter="fade">
+                                      <p:cBhvr>
+                                        <p:cTn id="54" dur="500"/>
+                                        <p:tgtEl>
+                                          <p:spTgt spid="3">
+                                            <p:txEl>
+                                              <p:pRg st="13" end="13"/>
+                                            </p:txEl>
+                                          </p:spTgt>
+                                        </p:tgtEl>
+                                      </p:cBhvr>
+                                    </p:animEffect>
+                                  </p:childTnLst>
+                                </p:cTn>
+                              </p:par>
+                            </p:childTnLst>
+                          </p:cTn>
+                        </p:par>
+                      </p:childTnLst>
+                    </p:cTn>
+                  </p:par>
+                </p:childTnLst>
+              </p:cTn>
+              <p:prevCondLst>
+                <p:cond evt="onPrev" delay="0">
+                  <p:tgtEl>
+                    <p:sldTgt/>
+                  </p:tgtEl>
+                </p:cond>
+              </p:prevCondLst>
+              <p:nextCondLst>
+                <p:cond evt="onNext" delay="0">
+                  <p:tgtEl>
+                    <p:sldTgt/>
+                  </p:tgtEl>
+                </p:cond>
+              </p:nextCondLst>
+            </p:seq>
+          </p:childTnLst>
+        </p:cTn>
+      </p:par>
+    </p:tnLst>
+    <p:bldLst>
+      <p:bldP spid="3" grpId="0" uiExpand="1" build="p"/>
+    </p:bldLst>
+  </p:timing>
+</p:sld>
+</file>
+
+<file path=ppt/slides/slide35.xml><?xml version="1.0" encoding="utf-8"?>
+<p:sld xmlns:a="http://schemas.openxmlformats.org/drawingml/2006/main" xmlns:r="http://schemas.openxmlformats.org/officeDocument/2006/relationships" xmlns:p="http://schemas.openxmlformats.org/presentationml/2006/main">
+  <p:cSld>
+    <p:spTree>
+      <p:nvGrpSpPr>
+        <p:cNvPr id="1" name=""/>
+        <p:cNvGrpSpPr/>
+        <p:nvPr/>
+      </p:nvGrpSpPr>
+      <p:grpSpPr>
+        <a:xfrm>
+          <a:off x="0" y="0"/>
+          <a:ext cx="0" cy="0"/>
+          <a:chOff x="0" y="0"/>
+          <a:chExt cx="0" cy="0"/>
+        </a:xfrm>
+      </p:grpSpPr>
+      <p:sp>
+        <p:nvSpPr>
+          <p:cNvPr id="2" name="Title 1">
+            <a:extLst>
+              <a:ext uri="{FF2B5EF4-FFF2-40B4-BE49-F238E27FC236}">
+                <a16:creationId xmlns:a16="http://schemas.microsoft.com/office/drawing/2014/main" id="{FBD97A06-93BB-FE90-8547-65DA2112F90B}"/>
+              </a:ext>
+            </a:extLst>
+          </p:cNvPr>
+          <p:cNvSpPr>
+            <a:spLocks noGrp="1"/>
+          </p:cNvSpPr>
+          <p:nvPr>
+            <p:ph type="title"/>
+          </p:nvPr>
+        </p:nvSpPr>
+        <p:spPr/>
+        <p:txBody>
+          <a:bodyPr/>
+          <a:lstStyle/>
+          <a:p>
+            <a:r>
+              <a:rPr lang="en-US" dirty="0">
+                <a:solidFill>
+                  <a:schemeClr val="accent5">
+                    <a:lumMod val="75000"/>
+                  </a:schemeClr>
+                </a:solidFill>
+              </a:rPr>
+              <a:t>Exercise 6 - Commands</a:t>
+            </a:r>
+          </a:p>
+        </p:txBody>
+      </p:sp>
+      <p:sp>
+        <p:nvSpPr>
+          <p:cNvPr id="3" name="Content Placeholder 2">
+            <a:extLst>
+              <a:ext uri="{FF2B5EF4-FFF2-40B4-BE49-F238E27FC236}">
+                <a16:creationId xmlns:a16="http://schemas.microsoft.com/office/drawing/2014/main" id="{6E9ED6CA-AAAC-FB90-A4DB-029EDD0F9A12}"/>
+              </a:ext>
+            </a:extLst>
+          </p:cNvPr>
+          <p:cNvSpPr>
+            <a:spLocks noGrp="1"/>
+          </p:cNvSpPr>
+          <p:nvPr>
+            <p:ph idx="1"/>
+          </p:nvPr>
+        </p:nvSpPr>
+        <p:spPr/>
+        <p:txBody>
+          <a:bodyPr/>
+          <a:lstStyle/>
+          <a:p>
+            <a:r>
+              <a:rPr lang="en-US" dirty="0"/>
+              <a:t>What You’ll Learn</a:t>
+            </a:r>
+          </a:p>
+          <a:p>
+            <a:pPr lvl="1"/>
+            <a:r>
+              <a:rPr lang="en-US" dirty="0"/>
+              <a:t>How to bind a Button to a Command object</a:t>
+            </a:r>
+          </a:p>
+          <a:p>
+            <a:r>
+              <a:rPr lang="en-US" dirty="0"/>
+              <a:t>Exercise</a:t>
+            </a:r>
+          </a:p>
+          <a:p>
+            <a:pPr lvl="1"/>
+            <a:r>
+              <a:rPr lang="en-US" dirty="0"/>
+              <a:t>Start from existing project: Exercise_6_Commands</a:t>
+            </a:r>
+          </a:p>
+          <a:p>
+            <a:pPr lvl="1"/>
+            <a:r>
+              <a:rPr lang="en-US" dirty="0"/>
+              <a:t>Create </a:t>
+            </a:r>
+            <a:r>
+              <a:rPr lang="en-US" dirty="0" err="1"/>
+              <a:t>MyCommand</a:t>
+            </a:r>
+            <a:r>
+              <a:rPr lang="en-US" dirty="0"/>
+              <a:t> property in ViewModel</a:t>
+            </a:r>
+          </a:p>
+          <a:p>
+            <a:pPr lvl="1"/>
+            <a:r>
+              <a:rPr lang="en-US" dirty="0"/>
+              <a:t>Create Button in view, bind to command</a:t>
+            </a:r>
+          </a:p>
+          <a:p>
+            <a:pPr lvl="1"/>
+            <a:r>
+              <a:rPr lang="en-US" dirty="0"/>
+              <a:t>Implement </a:t>
+            </a:r>
+            <a:r>
+              <a:rPr lang="en-US" dirty="0" err="1"/>
+              <a:t>CanExecute</a:t>
+            </a:r>
+            <a:r>
+              <a:rPr lang="en-US" dirty="0"/>
+              <a:t>, tied to </a:t>
+            </a:r>
+            <a:r>
+              <a:rPr lang="en-US" dirty="0" err="1"/>
+              <a:t>CheckBox</a:t>
+            </a:r>
+            <a:endParaRPr lang="en-US" dirty="0"/>
+          </a:p>
+        </p:txBody>
+      </p:sp>
+    </p:spTree>
+    <p:extLst>
+      <p:ext uri="{BB962C8B-B14F-4D97-AF65-F5344CB8AC3E}">
+        <p14:creationId xmlns:p14="http://schemas.microsoft.com/office/powerpoint/2010/main" val="1607399576"/>
+      </p:ext>
+    </p:extLst>
+  </p:cSld>
+  <p:clrMapOvr>
+    <a:masterClrMapping/>
+  </p:clrMapOvr>
+</p:sld>
+</file>
+
 <file path=ppt/slides/slide4.xml><?xml version="1.0" encoding="utf-8"?>
 <p:sld xmlns:a="http://schemas.openxmlformats.org/drawingml/2006/main" xmlns:r="http://schemas.openxmlformats.org/officeDocument/2006/relationships" xmlns:p="http://schemas.openxmlformats.org/presentationml/2006/main">
   <p:cSld>

</xml_diff>

<commit_message>
Added content thru Unit 7
</commit_message>
<xml_diff>
--- a/WPF-Workshop-Sexton-Oct2023.pptx
+++ b/WPF-Workshop-Sexton-Oct2023.pptx
@@ -5,7 +5,7 @@
     <p:sldMasterId id="2147483896" r:id="rId1"/>
   </p:sldMasterIdLst>
   <p:notesMasterIdLst>
-    <p:notesMasterId r:id="rId37"/>
+    <p:notesMasterId r:id="rId43"/>
   </p:notesMasterIdLst>
   <p:sldIdLst>
     <p:sldId id="256" r:id="rId2"/>
@@ -43,6 +43,12 @@
     <p:sldId id="289" r:id="rId34"/>
     <p:sldId id="290" r:id="rId35"/>
     <p:sldId id="291" r:id="rId36"/>
+    <p:sldId id="292" r:id="rId37"/>
+    <p:sldId id="293" r:id="rId38"/>
+    <p:sldId id="294" r:id="rId39"/>
+    <p:sldId id="295" r:id="rId40"/>
+    <p:sldId id="296" r:id="rId41"/>
+    <p:sldId id="297" r:id="rId42"/>
   </p:sldIdLst>
   <p:sldSz cx="12192000" cy="6858000"/>
   <p:notesSz cx="6858000" cy="9144000"/>
@@ -3047,6 +3053,652 @@
     <p:extLst>
       <p:ext uri="{BB962C8B-B14F-4D97-AF65-F5344CB8AC3E}">
         <p14:creationId xmlns:p14="http://schemas.microsoft.com/office/powerpoint/2010/main" val="1509336187"/>
+      </p:ext>
+    </p:extLst>
+  </p:cSld>
+  <p:clrMapOvr>
+    <a:masterClrMapping/>
+  </p:clrMapOvr>
+</p:notes>
+</file>
+
+<file path=ppt/notesSlides/notesSlide31.xml><?xml version="1.0" encoding="utf-8"?>
+<p:notes xmlns:a="http://schemas.openxmlformats.org/drawingml/2006/main" xmlns:r="http://schemas.openxmlformats.org/officeDocument/2006/relationships" xmlns:p="http://schemas.openxmlformats.org/presentationml/2006/main">
+  <p:cSld>
+    <p:spTree>
+      <p:nvGrpSpPr>
+        <p:cNvPr id="1" name=""/>
+        <p:cNvGrpSpPr/>
+        <p:nvPr/>
+      </p:nvGrpSpPr>
+      <p:grpSpPr>
+        <a:xfrm>
+          <a:off x="0" y="0"/>
+          <a:ext cx="0" cy="0"/>
+          <a:chOff x="0" y="0"/>
+          <a:chExt cx="0" cy="0"/>
+        </a:xfrm>
+      </p:grpSpPr>
+      <p:sp>
+        <p:nvSpPr>
+          <p:cNvPr id="2" name="Slide Image Placeholder 1"/>
+          <p:cNvSpPr>
+            <a:spLocks noGrp="1" noRot="1" noChangeAspect="1"/>
+          </p:cNvSpPr>
+          <p:nvPr>
+            <p:ph type="sldImg"/>
+          </p:nvPr>
+        </p:nvSpPr>
+        <p:spPr/>
+      </p:sp>
+      <p:sp>
+        <p:nvSpPr>
+          <p:cNvPr id="3" name="Notes Placeholder 2"/>
+          <p:cNvSpPr>
+            <a:spLocks noGrp="1"/>
+          </p:cNvSpPr>
+          <p:nvPr>
+            <p:ph type="body" idx="1"/>
+          </p:nvPr>
+        </p:nvSpPr>
+        <p:spPr/>
+        <p:txBody>
+          <a:bodyPr/>
+          <a:lstStyle/>
+          <a:p>
+            <a:r>
+              <a:rPr lang="en-US" dirty="0"/>
+              <a:t>LAST: Styles</a:t>
+            </a:r>
+          </a:p>
+        </p:txBody>
+      </p:sp>
+      <p:sp>
+        <p:nvSpPr>
+          <p:cNvPr id="4" name="Slide Number Placeholder 3"/>
+          <p:cNvSpPr>
+            <a:spLocks noGrp="1"/>
+          </p:cNvSpPr>
+          <p:nvPr>
+            <p:ph type="sldNum" sz="quarter" idx="5"/>
+          </p:nvPr>
+        </p:nvSpPr>
+        <p:spPr/>
+        <p:txBody>
+          <a:bodyPr/>
+          <a:lstStyle/>
+          <a:p>
+            <a:fld id="{52D86A8A-0D3B-4DD1-BCA4-15D29761E8A6}" type="slidenum">
+              <a:rPr lang="en-US" smtClean="0"/>
+              <a:t>36</a:t>
+            </a:fld>
+            <a:endParaRPr lang="en-US"/>
+          </a:p>
+        </p:txBody>
+      </p:sp>
+    </p:spTree>
+    <p:extLst>
+      <p:ext uri="{BB962C8B-B14F-4D97-AF65-F5344CB8AC3E}">
+        <p14:creationId xmlns:p14="http://schemas.microsoft.com/office/powerpoint/2010/main" val="1818049886"/>
+      </p:ext>
+    </p:extLst>
+  </p:cSld>
+  <p:clrMapOvr>
+    <a:masterClrMapping/>
+  </p:clrMapOvr>
+</p:notes>
+</file>
+
+<file path=ppt/notesSlides/notesSlide32.xml><?xml version="1.0" encoding="utf-8"?>
+<p:notes xmlns:a="http://schemas.openxmlformats.org/drawingml/2006/main" xmlns:r="http://schemas.openxmlformats.org/officeDocument/2006/relationships" xmlns:p="http://schemas.openxmlformats.org/presentationml/2006/main">
+  <p:cSld>
+    <p:spTree>
+      <p:nvGrpSpPr>
+        <p:cNvPr id="1" name=""/>
+        <p:cNvGrpSpPr/>
+        <p:nvPr/>
+      </p:nvGrpSpPr>
+      <p:grpSpPr>
+        <a:xfrm>
+          <a:off x="0" y="0"/>
+          <a:ext cx="0" cy="0"/>
+          <a:chOff x="0" y="0"/>
+          <a:chExt cx="0" cy="0"/>
+        </a:xfrm>
+      </p:grpSpPr>
+      <p:sp>
+        <p:nvSpPr>
+          <p:cNvPr id="2" name="Slide Image Placeholder 1"/>
+          <p:cNvSpPr>
+            <a:spLocks noGrp="1" noRot="1" noChangeAspect="1"/>
+          </p:cNvSpPr>
+          <p:nvPr>
+            <p:ph type="sldImg"/>
+          </p:nvPr>
+        </p:nvSpPr>
+        <p:spPr/>
+      </p:sp>
+      <p:sp>
+        <p:nvSpPr>
+          <p:cNvPr id="3" name="Notes Placeholder 2"/>
+          <p:cNvSpPr>
+            <a:spLocks noGrp="1"/>
+          </p:cNvSpPr>
+          <p:nvPr>
+            <p:ph type="body" idx="1"/>
+          </p:nvPr>
+        </p:nvSpPr>
+        <p:spPr/>
+        <p:txBody>
+          <a:bodyPr/>
+          <a:lstStyle/>
+          <a:p>
+            <a:r>
+              <a:rPr lang="en-US" dirty="0"/>
+              <a:t>LAST: Example</a:t>
+            </a:r>
+          </a:p>
+          <a:p>
+            <a:r>
+              <a:rPr lang="en-US" dirty="0"/>
+              <a:t>- Ex 1 - without resources - different ways to specify a property value</a:t>
+            </a:r>
+          </a:p>
+          <a:p>
+            <a:r>
+              <a:rPr lang="en-US" dirty="0"/>
+              <a:t>- Ex 2 - with resources - now using </a:t>
+            </a:r>
+            <a:r>
+              <a:rPr lang="en-US" dirty="0" err="1"/>
+              <a:t>StaticResource</a:t>
+            </a:r>
+            <a:endParaRPr lang="en-US" dirty="0"/>
+          </a:p>
+          <a:p>
+            <a:r>
+              <a:rPr lang="en-US" dirty="0"/>
+              <a:t>- Then change to new color</a:t>
+            </a:r>
+          </a:p>
+          <a:p>
+            <a:r>
+              <a:rPr lang="en-US" dirty="0"/>
+              <a:t>- Note: change on the fly, w/o restarting application</a:t>
+            </a:r>
+          </a:p>
+          <a:p>
+            <a:r>
+              <a:rPr lang="en-US" dirty="0"/>
+              <a:t>- Note: Would normally move this to </a:t>
+            </a:r>
+            <a:r>
+              <a:rPr lang="en-US" dirty="0" err="1"/>
+              <a:t>ResourceDictionary</a:t>
+            </a:r>
+            <a:r>
+              <a:rPr lang="en-US" dirty="0"/>
+              <a:t> in external file</a:t>
+            </a:r>
+          </a:p>
+          <a:p>
+            <a:r>
+              <a:rPr lang="en-US" dirty="0"/>
+              <a:t>- Q: </a:t>
+            </a:r>
+            <a:r>
+              <a:rPr lang="en-US" dirty="0" err="1"/>
+              <a:t>DynamicResource</a:t>
+            </a:r>
+            <a:r>
+              <a:rPr lang="en-US" dirty="0"/>
+              <a:t>?  </a:t>
+            </a:r>
+            <a:r>
+              <a:rPr lang="en-US" dirty="0" err="1"/>
+              <a:t>StaticResource</a:t>
+            </a:r>
+            <a:r>
+              <a:rPr lang="en-US" dirty="0"/>
+              <a:t> resolves at load time, vs Dynamic resolved at run-time</a:t>
+            </a:r>
+          </a:p>
+          <a:p>
+            <a:r>
+              <a:rPr lang="en-US" dirty="0"/>
+              <a:t>- Almost always static, dynamic if value comes from something you load later; or performance savings, if control not immediately loaded</a:t>
+            </a:r>
+          </a:p>
+          <a:p>
+            <a:endParaRPr lang="en-US" dirty="0"/>
+          </a:p>
+        </p:txBody>
+      </p:sp>
+      <p:sp>
+        <p:nvSpPr>
+          <p:cNvPr id="4" name="Slide Number Placeholder 3"/>
+          <p:cNvSpPr>
+            <a:spLocks noGrp="1"/>
+          </p:cNvSpPr>
+          <p:nvPr>
+            <p:ph type="sldNum" sz="quarter" idx="5"/>
+          </p:nvPr>
+        </p:nvSpPr>
+        <p:spPr/>
+        <p:txBody>
+          <a:bodyPr/>
+          <a:lstStyle/>
+          <a:p>
+            <a:fld id="{52D86A8A-0D3B-4DD1-BCA4-15D29761E8A6}" type="slidenum">
+              <a:rPr lang="en-US" smtClean="0"/>
+              <a:t>37</a:t>
+            </a:fld>
+            <a:endParaRPr lang="en-US"/>
+          </a:p>
+        </p:txBody>
+      </p:sp>
+    </p:spTree>
+    <p:extLst>
+      <p:ext uri="{BB962C8B-B14F-4D97-AF65-F5344CB8AC3E}">
+        <p14:creationId xmlns:p14="http://schemas.microsoft.com/office/powerpoint/2010/main" val="3496533343"/>
+      </p:ext>
+    </p:extLst>
+  </p:cSld>
+  <p:clrMapOvr>
+    <a:masterClrMapping/>
+  </p:clrMapOvr>
+</p:notes>
+</file>
+
+<file path=ppt/notesSlides/notesSlide33.xml><?xml version="1.0" encoding="utf-8"?>
+<p:notes xmlns:a="http://schemas.openxmlformats.org/drawingml/2006/main" xmlns:r="http://schemas.openxmlformats.org/officeDocument/2006/relationships" xmlns:p="http://schemas.openxmlformats.org/presentationml/2006/main">
+  <p:cSld>
+    <p:spTree>
+      <p:nvGrpSpPr>
+        <p:cNvPr id="1" name=""/>
+        <p:cNvGrpSpPr/>
+        <p:nvPr/>
+      </p:nvGrpSpPr>
+      <p:grpSpPr>
+        <a:xfrm>
+          <a:off x="0" y="0"/>
+          <a:ext cx="0" cy="0"/>
+          <a:chOff x="0" y="0"/>
+          <a:chExt cx="0" cy="0"/>
+        </a:xfrm>
+      </p:grpSpPr>
+      <p:sp>
+        <p:nvSpPr>
+          <p:cNvPr id="2" name="Slide Image Placeholder 1"/>
+          <p:cNvSpPr>
+            <a:spLocks noGrp="1" noRot="1" noChangeAspect="1"/>
+          </p:cNvSpPr>
+          <p:nvPr>
+            <p:ph type="sldImg"/>
+          </p:nvPr>
+        </p:nvSpPr>
+        <p:spPr/>
+      </p:sp>
+      <p:sp>
+        <p:nvSpPr>
+          <p:cNvPr id="3" name="Notes Placeholder 2"/>
+          <p:cNvSpPr>
+            <a:spLocks noGrp="1"/>
+          </p:cNvSpPr>
+          <p:nvPr>
+            <p:ph type="body" idx="1"/>
+          </p:nvPr>
+        </p:nvSpPr>
+        <p:spPr/>
+        <p:txBody>
+          <a:bodyPr/>
+          <a:lstStyle/>
+          <a:p>
+            <a:r>
+              <a:rPr lang="en-US" dirty="0"/>
+              <a:t>LAST: Example</a:t>
+            </a:r>
+          </a:p>
+          <a:p>
+            <a:r>
+              <a:rPr lang="en-US" dirty="0"/>
+              <a:t>- Show XAML - defining and using style</a:t>
+            </a:r>
+          </a:p>
+          <a:p>
+            <a:r>
+              <a:rPr lang="en-US" dirty="0"/>
+              <a:t>- NB: Much cleaner, not repeating all of those styles</a:t>
+            </a:r>
+          </a:p>
+          <a:p>
+            <a:r>
+              <a:rPr lang="en-US" dirty="0"/>
+              <a:t>- NB: Style can itself reference resources</a:t>
+            </a:r>
+          </a:p>
+          <a:p>
+            <a:endParaRPr lang="en-US" dirty="0"/>
+          </a:p>
+        </p:txBody>
+      </p:sp>
+      <p:sp>
+        <p:nvSpPr>
+          <p:cNvPr id="4" name="Slide Number Placeholder 3"/>
+          <p:cNvSpPr>
+            <a:spLocks noGrp="1"/>
+          </p:cNvSpPr>
+          <p:nvPr>
+            <p:ph type="sldNum" sz="quarter" idx="5"/>
+          </p:nvPr>
+        </p:nvSpPr>
+        <p:spPr/>
+        <p:txBody>
+          <a:bodyPr/>
+          <a:lstStyle/>
+          <a:p>
+            <a:fld id="{52D86A8A-0D3B-4DD1-BCA4-15D29761E8A6}" type="slidenum">
+              <a:rPr lang="en-US" smtClean="0"/>
+              <a:t>38</a:t>
+            </a:fld>
+            <a:endParaRPr lang="en-US"/>
+          </a:p>
+        </p:txBody>
+      </p:sp>
+    </p:spTree>
+    <p:extLst>
+      <p:ext uri="{BB962C8B-B14F-4D97-AF65-F5344CB8AC3E}">
+        <p14:creationId xmlns:p14="http://schemas.microsoft.com/office/powerpoint/2010/main" val="1128755736"/>
+      </p:ext>
+    </p:extLst>
+  </p:cSld>
+  <p:clrMapOvr>
+    <a:masterClrMapping/>
+  </p:clrMapOvr>
+</p:notes>
+</file>
+
+<file path=ppt/notesSlides/notesSlide34.xml><?xml version="1.0" encoding="utf-8"?>
+<p:notes xmlns:a="http://schemas.openxmlformats.org/drawingml/2006/main" xmlns:r="http://schemas.openxmlformats.org/officeDocument/2006/relationships" xmlns:p="http://schemas.openxmlformats.org/presentationml/2006/main">
+  <p:cSld>
+    <p:spTree>
+      <p:nvGrpSpPr>
+        <p:cNvPr id="1" name=""/>
+        <p:cNvGrpSpPr/>
+        <p:nvPr/>
+      </p:nvGrpSpPr>
+      <p:grpSpPr>
+        <a:xfrm>
+          <a:off x="0" y="0"/>
+          <a:ext cx="0" cy="0"/>
+          <a:chOff x="0" y="0"/>
+          <a:chExt cx="0" cy="0"/>
+        </a:xfrm>
+      </p:grpSpPr>
+      <p:sp>
+        <p:nvSpPr>
+          <p:cNvPr id="2" name="Slide Image Placeholder 1"/>
+          <p:cNvSpPr>
+            <a:spLocks noGrp="1" noRot="1" noChangeAspect="1"/>
+          </p:cNvSpPr>
+          <p:nvPr>
+            <p:ph type="sldImg"/>
+          </p:nvPr>
+        </p:nvSpPr>
+        <p:spPr/>
+      </p:sp>
+      <p:sp>
+        <p:nvSpPr>
+          <p:cNvPr id="3" name="Notes Placeholder 2"/>
+          <p:cNvSpPr>
+            <a:spLocks noGrp="1"/>
+          </p:cNvSpPr>
+          <p:nvPr>
+            <p:ph type="body" idx="1"/>
+          </p:nvPr>
+        </p:nvSpPr>
+        <p:spPr/>
+        <p:txBody>
+          <a:bodyPr/>
+          <a:lstStyle/>
+          <a:p>
+            <a:r>
+              <a:rPr lang="en-US" dirty="0"/>
+              <a:t>LAST: Example</a:t>
+            </a:r>
+          </a:p>
+          <a:p>
+            <a:r>
+              <a:rPr lang="en-US" dirty="0"/>
+              <a:t>-  Show XAML</a:t>
+            </a:r>
+          </a:p>
+          <a:p>
+            <a:r>
+              <a:rPr lang="en-US" dirty="0"/>
+              <a:t>- Child styles can add or override other property setters</a:t>
+            </a:r>
+          </a:p>
+        </p:txBody>
+      </p:sp>
+      <p:sp>
+        <p:nvSpPr>
+          <p:cNvPr id="4" name="Slide Number Placeholder 3"/>
+          <p:cNvSpPr>
+            <a:spLocks noGrp="1"/>
+          </p:cNvSpPr>
+          <p:nvPr>
+            <p:ph type="sldNum" sz="quarter" idx="5"/>
+          </p:nvPr>
+        </p:nvSpPr>
+        <p:spPr/>
+        <p:txBody>
+          <a:bodyPr/>
+          <a:lstStyle/>
+          <a:p>
+            <a:fld id="{52D86A8A-0D3B-4DD1-BCA4-15D29761E8A6}" type="slidenum">
+              <a:rPr lang="en-US" smtClean="0"/>
+              <a:t>39</a:t>
+            </a:fld>
+            <a:endParaRPr lang="en-US"/>
+          </a:p>
+        </p:txBody>
+      </p:sp>
+    </p:spTree>
+    <p:extLst>
+      <p:ext uri="{BB962C8B-B14F-4D97-AF65-F5344CB8AC3E}">
+        <p14:creationId xmlns:p14="http://schemas.microsoft.com/office/powerpoint/2010/main" val="2408310933"/>
+      </p:ext>
+    </p:extLst>
+  </p:cSld>
+  <p:clrMapOvr>
+    <a:masterClrMapping/>
+  </p:clrMapOvr>
+</p:notes>
+</file>
+
+<file path=ppt/notesSlides/notesSlide35.xml><?xml version="1.0" encoding="utf-8"?>
+<p:notes xmlns:a="http://schemas.openxmlformats.org/drawingml/2006/main" xmlns:r="http://schemas.openxmlformats.org/officeDocument/2006/relationships" xmlns:p="http://schemas.openxmlformats.org/presentationml/2006/main">
+  <p:cSld>
+    <p:spTree>
+      <p:nvGrpSpPr>
+        <p:cNvPr id="1" name=""/>
+        <p:cNvGrpSpPr/>
+        <p:nvPr/>
+      </p:nvGrpSpPr>
+      <p:grpSpPr>
+        <a:xfrm>
+          <a:off x="0" y="0"/>
+          <a:ext cx="0" cy="0"/>
+          <a:chOff x="0" y="0"/>
+          <a:chExt cx="0" cy="0"/>
+        </a:xfrm>
+      </p:grpSpPr>
+      <p:sp>
+        <p:nvSpPr>
+          <p:cNvPr id="2" name="Slide Image Placeholder 1"/>
+          <p:cNvSpPr>
+            <a:spLocks noGrp="1" noRot="1" noChangeAspect="1"/>
+          </p:cNvSpPr>
+          <p:nvPr>
+            <p:ph type="sldImg"/>
+          </p:nvPr>
+        </p:nvSpPr>
+        <p:spPr/>
+      </p:sp>
+      <p:sp>
+        <p:nvSpPr>
+          <p:cNvPr id="3" name="Notes Placeholder 2"/>
+          <p:cNvSpPr>
+            <a:spLocks noGrp="1"/>
+          </p:cNvSpPr>
+          <p:nvPr>
+            <p:ph type="body" idx="1"/>
+          </p:nvPr>
+        </p:nvSpPr>
+        <p:spPr/>
+        <p:txBody>
+          <a:bodyPr/>
+          <a:lstStyle/>
+          <a:p>
+            <a:r>
+              <a:rPr lang="en-US" dirty="0"/>
+              <a:t>LAST: Example</a:t>
+            </a:r>
+          </a:p>
+          <a:p>
+            <a:r>
+              <a:rPr lang="en-US" dirty="0"/>
+              <a:t>-  Show XAML </a:t>
+            </a:r>
+          </a:p>
+          <a:p>
+            <a:r>
+              <a:rPr lang="en-US" dirty="0"/>
+              <a:t>- NB: Named style inheriting from default style requires that </a:t>
+            </a:r>
+            <a:r>
+              <a:rPr lang="en-US" dirty="0" err="1"/>
+              <a:t>BasedOn</a:t>
+            </a:r>
+            <a:r>
+              <a:rPr lang="en-US" dirty="0"/>
+              <a:t> mentions a type</a:t>
+            </a:r>
+          </a:p>
+        </p:txBody>
+      </p:sp>
+      <p:sp>
+        <p:nvSpPr>
+          <p:cNvPr id="4" name="Slide Number Placeholder 3"/>
+          <p:cNvSpPr>
+            <a:spLocks noGrp="1"/>
+          </p:cNvSpPr>
+          <p:nvPr>
+            <p:ph type="sldNum" sz="quarter" idx="5"/>
+          </p:nvPr>
+        </p:nvSpPr>
+        <p:spPr/>
+        <p:txBody>
+          <a:bodyPr/>
+          <a:lstStyle/>
+          <a:p>
+            <a:fld id="{52D86A8A-0D3B-4DD1-BCA4-15D29761E8A6}" type="slidenum">
+              <a:rPr lang="en-US" smtClean="0"/>
+              <a:t>40</a:t>
+            </a:fld>
+            <a:endParaRPr lang="en-US"/>
+          </a:p>
+        </p:txBody>
+      </p:sp>
+    </p:spTree>
+    <p:extLst>
+      <p:ext uri="{BB962C8B-B14F-4D97-AF65-F5344CB8AC3E}">
+        <p14:creationId xmlns:p14="http://schemas.microsoft.com/office/powerpoint/2010/main" val="1150926509"/>
+      </p:ext>
+    </p:extLst>
+  </p:cSld>
+  <p:clrMapOvr>
+    <a:masterClrMapping/>
+  </p:clrMapOvr>
+</p:notes>
+</file>
+
+<file path=ppt/notesSlides/notesSlide36.xml><?xml version="1.0" encoding="utf-8"?>
+<p:notes xmlns:a="http://schemas.openxmlformats.org/drawingml/2006/main" xmlns:r="http://schemas.openxmlformats.org/officeDocument/2006/relationships" xmlns:p="http://schemas.openxmlformats.org/presentationml/2006/main">
+  <p:cSld>
+    <p:spTree>
+      <p:nvGrpSpPr>
+        <p:cNvPr id="1" name=""/>
+        <p:cNvGrpSpPr/>
+        <p:nvPr/>
+      </p:nvGrpSpPr>
+      <p:grpSpPr>
+        <a:xfrm>
+          <a:off x="0" y="0"/>
+          <a:ext cx="0" cy="0"/>
+          <a:chOff x="0" y="0"/>
+          <a:chExt cx="0" cy="0"/>
+        </a:xfrm>
+      </p:grpSpPr>
+      <p:sp>
+        <p:nvSpPr>
+          <p:cNvPr id="2" name="Slide Image Placeholder 1"/>
+          <p:cNvSpPr>
+            <a:spLocks noGrp="1" noRot="1" noChangeAspect="1"/>
+          </p:cNvSpPr>
+          <p:nvPr>
+            <p:ph type="sldImg"/>
+          </p:nvPr>
+        </p:nvSpPr>
+        <p:spPr/>
+      </p:sp>
+      <p:sp>
+        <p:nvSpPr>
+          <p:cNvPr id="3" name="Notes Placeholder 2"/>
+          <p:cNvSpPr>
+            <a:spLocks noGrp="1"/>
+          </p:cNvSpPr>
+          <p:nvPr>
+            <p:ph type="body" idx="1"/>
+          </p:nvPr>
+        </p:nvSpPr>
+        <p:spPr/>
+        <p:txBody>
+          <a:bodyPr/>
+          <a:lstStyle/>
+          <a:p>
+            <a:endParaRPr lang="en-US"/>
+          </a:p>
+        </p:txBody>
+      </p:sp>
+      <p:sp>
+        <p:nvSpPr>
+          <p:cNvPr id="4" name="Slide Number Placeholder 3"/>
+          <p:cNvSpPr>
+            <a:spLocks noGrp="1"/>
+          </p:cNvSpPr>
+          <p:nvPr>
+            <p:ph type="sldNum" sz="quarter" idx="5"/>
+          </p:nvPr>
+        </p:nvSpPr>
+        <p:spPr/>
+        <p:txBody>
+          <a:bodyPr/>
+          <a:lstStyle/>
+          <a:p>
+            <a:fld id="{52D86A8A-0D3B-4DD1-BCA4-15D29761E8A6}" type="slidenum">
+              <a:rPr lang="en-US" smtClean="0"/>
+              <a:t>41</a:t>
+            </a:fld>
+            <a:endParaRPr lang="en-US"/>
+          </a:p>
+        </p:txBody>
+      </p:sp>
+    </p:spTree>
+    <p:extLst>
+      <p:ext uri="{BB962C8B-B14F-4D97-AF65-F5344CB8AC3E}">
+        <p14:creationId xmlns:p14="http://schemas.microsoft.com/office/powerpoint/2010/main" val="905484214"/>
       </p:ext>
     </p:extLst>
   </p:cSld>
@@ -24607,6 +25259,2221 @@
 </p:sld>
 </file>
 
+<file path=ppt/slides/slide36.xml><?xml version="1.0" encoding="utf-8"?>
+<p:sld xmlns:a="http://schemas.openxmlformats.org/drawingml/2006/main" xmlns:r="http://schemas.openxmlformats.org/officeDocument/2006/relationships" xmlns:p="http://schemas.openxmlformats.org/presentationml/2006/main">
+  <p:cSld>
+    <p:spTree>
+      <p:nvGrpSpPr>
+        <p:cNvPr id="1" name=""/>
+        <p:cNvGrpSpPr/>
+        <p:nvPr/>
+      </p:nvGrpSpPr>
+      <p:grpSpPr>
+        <a:xfrm>
+          <a:off x="0" y="0"/>
+          <a:ext cx="0" cy="0"/>
+          <a:chOff x="0" y="0"/>
+          <a:chExt cx="0" cy="0"/>
+        </a:xfrm>
+      </p:grpSpPr>
+      <p:sp>
+        <p:nvSpPr>
+          <p:cNvPr id="2" name="Title 1">
+            <a:extLst>
+              <a:ext uri="{FF2B5EF4-FFF2-40B4-BE49-F238E27FC236}">
+                <a16:creationId xmlns:a16="http://schemas.microsoft.com/office/drawing/2014/main" id="{CE208DA4-CE42-5723-CA08-7FA0818B3743}"/>
+              </a:ext>
+            </a:extLst>
+          </p:cNvPr>
+          <p:cNvSpPr>
+            <a:spLocks noGrp="1"/>
+          </p:cNvSpPr>
+          <p:nvPr>
+            <p:ph type="title"/>
+          </p:nvPr>
+        </p:nvSpPr>
+        <p:spPr/>
+        <p:txBody>
+          <a:bodyPr/>
+          <a:lstStyle/>
+          <a:p>
+            <a:r>
+              <a:rPr lang="en-US" dirty="0"/>
+              <a:t>Unit 7 – Resources and Styles</a:t>
+            </a:r>
+          </a:p>
+        </p:txBody>
+      </p:sp>
+      <p:sp>
+        <p:nvSpPr>
+          <p:cNvPr id="3" name="Content Placeholder 2">
+            <a:extLst>
+              <a:ext uri="{FF2B5EF4-FFF2-40B4-BE49-F238E27FC236}">
+                <a16:creationId xmlns:a16="http://schemas.microsoft.com/office/drawing/2014/main" id="{657277D4-82E1-C094-7543-9C45A2A253A2}"/>
+              </a:ext>
+            </a:extLst>
+          </p:cNvPr>
+          <p:cNvSpPr>
+            <a:spLocks noGrp="1"/>
+          </p:cNvSpPr>
+          <p:nvPr>
+            <p:ph idx="1"/>
+          </p:nvPr>
+        </p:nvSpPr>
+        <p:spPr/>
+        <p:txBody>
+          <a:bodyPr/>
+          <a:lstStyle/>
+          <a:p>
+            <a:r>
+              <a:rPr lang="en-US" dirty="0"/>
+              <a:t>Hard-coding attribute values in XAML</a:t>
+            </a:r>
+          </a:p>
+          <a:p>
+            <a:pPr lvl="1"/>
+            <a:r>
+              <a:rPr lang="en-US" dirty="0"/>
+              <a:t>Can't easily share values</a:t>
+            </a:r>
+          </a:p>
+          <a:p>
+            <a:pPr lvl="1"/>
+            <a:r>
+              <a:rPr lang="en-US" dirty="0"/>
+              <a:t>Can't apply sets of values</a:t>
+            </a:r>
+          </a:p>
+          <a:p>
+            <a:r>
+              <a:rPr lang="en-US" dirty="0"/>
+              <a:t>Resources - name and reuse attribute values</a:t>
+            </a:r>
+          </a:p>
+          <a:p>
+            <a:r>
+              <a:rPr lang="en-US" dirty="0"/>
+              <a:t>Styles - name and reuse sets of attribute values</a:t>
+            </a:r>
+          </a:p>
+        </p:txBody>
+      </p:sp>
+    </p:spTree>
+    <p:extLst>
+      <p:ext uri="{BB962C8B-B14F-4D97-AF65-F5344CB8AC3E}">
+        <p14:creationId xmlns:p14="http://schemas.microsoft.com/office/powerpoint/2010/main" val="1325647635"/>
+      </p:ext>
+    </p:extLst>
+  </p:cSld>
+  <p:clrMapOvr>
+    <a:masterClrMapping/>
+  </p:clrMapOvr>
+  <p:timing>
+    <p:tnLst>
+      <p:par>
+        <p:cTn id="1" dur="indefinite" restart="never" nodeType="tmRoot">
+          <p:childTnLst>
+            <p:seq concurrent="1" nextAc="seek">
+              <p:cTn id="2" dur="indefinite" nodeType="mainSeq">
+                <p:childTnLst>
+                  <p:par>
+                    <p:cTn id="3" fill="hold">
+                      <p:stCondLst>
+                        <p:cond delay="indefinite"/>
+                      </p:stCondLst>
+                      <p:childTnLst>
+                        <p:par>
+                          <p:cTn id="4" fill="hold">
+                            <p:stCondLst>
+                              <p:cond delay="0"/>
+                            </p:stCondLst>
+                            <p:childTnLst>
+                              <p:par>
+                                <p:cTn id="5" presetID="10" presetClass="entr" presetSubtype="0" fill="hold" grpId="0" nodeType="clickEffect">
+                                  <p:stCondLst>
+                                    <p:cond delay="0"/>
+                                  </p:stCondLst>
+                                  <p:childTnLst>
+                                    <p:set>
+                                      <p:cBhvr>
+                                        <p:cTn id="6" dur="1" fill="hold">
+                                          <p:stCondLst>
+                                            <p:cond delay="0"/>
+                                          </p:stCondLst>
+                                        </p:cTn>
+                                        <p:tgtEl>
+                                          <p:spTgt spid="3">
+                                            <p:txEl>
+                                              <p:pRg st="0" end="0"/>
+                                            </p:txEl>
+                                          </p:spTgt>
+                                        </p:tgtEl>
+                                        <p:attrNameLst>
+                                          <p:attrName>style.visibility</p:attrName>
+                                        </p:attrNameLst>
+                                      </p:cBhvr>
+                                      <p:to>
+                                        <p:strVal val="visible"/>
+                                      </p:to>
+                                    </p:set>
+                                    <p:animEffect transition="in" filter="fade">
+                                      <p:cBhvr>
+                                        <p:cTn id="7" dur="500"/>
+                                        <p:tgtEl>
+                                          <p:spTgt spid="3">
+                                            <p:txEl>
+                                              <p:pRg st="0" end="0"/>
+                                            </p:txEl>
+                                          </p:spTgt>
+                                        </p:tgtEl>
+                                      </p:cBhvr>
+                                    </p:animEffect>
+                                  </p:childTnLst>
+                                </p:cTn>
+                              </p:par>
+                              <p:par>
+                                <p:cTn id="8" presetID="10" presetClass="entr" presetSubtype="0" fill="hold" grpId="0" nodeType="withEffect">
+                                  <p:stCondLst>
+                                    <p:cond delay="0"/>
+                                  </p:stCondLst>
+                                  <p:childTnLst>
+                                    <p:set>
+                                      <p:cBhvr>
+                                        <p:cTn id="9" dur="1" fill="hold">
+                                          <p:stCondLst>
+                                            <p:cond delay="0"/>
+                                          </p:stCondLst>
+                                        </p:cTn>
+                                        <p:tgtEl>
+                                          <p:spTgt spid="3">
+                                            <p:txEl>
+                                              <p:pRg st="1" end="1"/>
+                                            </p:txEl>
+                                          </p:spTgt>
+                                        </p:tgtEl>
+                                        <p:attrNameLst>
+                                          <p:attrName>style.visibility</p:attrName>
+                                        </p:attrNameLst>
+                                      </p:cBhvr>
+                                      <p:to>
+                                        <p:strVal val="visible"/>
+                                      </p:to>
+                                    </p:set>
+                                    <p:animEffect transition="in" filter="fade">
+                                      <p:cBhvr>
+                                        <p:cTn id="10" dur="500"/>
+                                        <p:tgtEl>
+                                          <p:spTgt spid="3">
+                                            <p:txEl>
+                                              <p:pRg st="1" end="1"/>
+                                            </p:txEl>
+                                          </p:spTgt>
+                                        </p:tgtEl>
+                                      </p:cBhvr>
+                                    </p:animEffect>
+                                  </p:childTnLst>
+                                </p:cTn>
+                              </p:par>
+                              <p:par>
+                                <p:cTn id="11" presetID="10" presetClass="entr" presetSubtype="0" fill="hold" grpId="0" nodeType="withEffect">
+                                  <p:stCondLst>
+                                    <p:cond delay="0"/>
+                                  </p:stCondLst>
+                                  <p:childTnLst>
+                                    <p:set>
+                                      <p:cBhvr>
+                                        <p:cTn id="12" dur="1" fill="hold">
+                                          <p:stCondLst>
+                                            <p:cond delay="0"/>
+                                          </p:stCondLst>
+                                        </p:cTn>
+                                        <p:tgtEl>
+                                          <p:spTgt spid="3">
+                                            <p:txEl>
+                                              <p:pRg st="2" end="2"/>
+                                            </p:txEl>
+                                          </p:spTgt>
+                                        </p:tgtEl>
+                                        <p:attrNameLst>
+                                          <p:attrName>style.visibility</p:attrName>
+                                        </p:attrNameLst>
+                                      </p:cBhvr>
+                                      <p:to>
+                                        <p:strVal val="visible"/>
+                                      </p:to>
+                                    </p:set>
+                                    <p:animEffect transition="in" filter="fade">
+                                      <p:cBhvr>
+                                        <p:cTn id="13" dur="500"/>
+                                        <p:tgtEl>
+                                          <p:spTgt spid="3">
+                                            <p:txEl>
+                                              <p:pRg st="2" end="2"/>
+                                            </p:txEl>
+                                          </p:spTgt>
+                                        </p:tgtEl>
+                                      </p:cBhvr>
+                                    </p:animEffect>
+                                  </p:childTnLst>
+                                </p:cTn>
+                              </p:par>
+                            </p:childTnLst>
+                          </p:cTn>
+                        </p:par>
+                      </p:childTnLst>
+                    </p:cTn>
+                  </p:par>
+                  <p:par>
+                    <p:cTn id="14" fill="hold">
+                      <p:stCondLst>
+                        <p:cond delay="indefinite"/>
+                      </p:stCondLst>
+                      <p:childTnLst>
+                        <p:par>
+                          <p:cTn id="15" fill="hold">
+                            <p:stCondLst>
+                              <p:cond delay="0"/>
+                            </p:stCondLst>
+                            <p:childTnLst>
+                              <p:par>
+                                <p:cTn id="16" presetID="10" presetClass="entr" presetSubtype="0" fill="hold" grpId="0" nodeType="clickEffect">
+                                  <p:stCondLst>
+                                    <p:cond delay="0"/>
+                                  </p:stCondLst>
+                                  <p:childTnLst>
+                                    <p:set>
+                                      <p:cBhvr>
+                                        <p:cTn id="17" dur="1" fill="hold">
+                                          <p:stCondLst>
+                                            <p:cond delay="0"/>
+                                          </p:stCondLst>
+                                        </p:cTn>
+                                        <p:tgtEl>
+                                          <p:spTgt spid="3">
+                                            <p:txEl>
+                                              <p:pRg st="3" end="3"/>
+                                            </p:txEl>
+                                          </p:spTgt>
+                                        </p:tgtEl>
+                                        <p:attrNameLst>
+                                          <p:attrName>style.visibility</p:attrName>
+                                        </p:attrNameLst>
+                                      </p:cBhvr>
+                                      <p:to>
+                                        <p:strVal val="visible"/>
+                                      </p:to>
+                                    </p:set>
+                                    <p:animEffect transition="in" filter="fade">
+                                      <p:cBhvr>
+                                        <p:cTn id="18" dur="500"/>
+                                        <p:tgtEl>
+                                          <p:spTgt spid="3">
+                                            <p:txEl>
+                                              <p:pRg st="3" end="3"/>
+                                            </p:txEl>
+                                          </p:spTgt>
+                                        </p:tgtEl>
+                                      </p:cBhvr>
+                                    </p:animEffect>
+                                  </p:childTnLst>
+                                </p:cTn>
+                              </p:par>
+                            </p:childTnLst>
+                          </p:cTn>
+                        </p:par>
+                      </p:childTnLst>
+                    </p:cTn>
+                  </p:par>
+                  <p:par>
+                    <p:cTn id="19" fill="hold">
+                      <p:stCondLst>
+                        <p:cond delay="indefinite"/>
+                      </p:stCondLst>
+                      <p:childTnLst>
+                        <p:par>
+                          <p:cTn id="20" fill="hold">
+                            <p:stCondLst>
+                              <p:cond delay="0"/>
+                            </p:stCondLst>
+                            <p:childTnLst>
+                              <p:par>
+                                <p:cTn id="21" presetID="10" presetClass="entr" presetSubtype="0" fill="hold" grpId="0" nodeType="clickEffect">
+                                  <p:stCondLst>
+                                    <p:cond delay="0"/>
+                                  </p:stCondLst>
+                                  <p:childTnLst>
+                                    <p:set>
+                                      <p:cBhvr>
+                                        <p:cTn id="22" dur="1" fill="hold">
+                                          <p:stCondLst>
+                                            <p:cond delay="0"/>
+                                          </p:stCondLst>
+                                        </p:cTn>
+                                        <p:tgtEl>
+                                          <p:spTgt spid="3">
+                                            <p:txEl>
+                                              <p:pRg st="4" end="4"/>
+                                            </p:txEl>
+                                          </p:spTgt>
+                                        </p:tgtEl>
+                                        <p:attrNameLst>
+                                          <p:attrName>style.visibility</p:attrName>
+                                        </p:attrNameLst>
+                                      </p:cBhvr>
+                                      <p:to>
+                                        <p:strVal val="visible"/>
+                                      </p:to>
+                                    </p:set>
+                                    <p:animEffect transition="in" filter="fade">
+                                      <p:cBhvr>
+                                        <p:cTn id="23" dur="500"/>
+                                        <p:tgtEl>
+                                          <p:spTgt spid="3">
+                                            <p:txEl>
+                                              <p:pRg st="4" end="4"/>
+                                            </p:txEl>
+                                          </p:spTgt>
+                                        </p:tgtEl>
+                                      </p:cBhvr>
+                                    </p:animEffect>
+                                  </p:childTnLst>
+                                </p:cTn>
+                              </p:par>
+                            </p:childTnLst>
+                          </p:cTn>
+                        </p:par>
+                      </p:childTnLst>
+                    </p:cTn>
+                  </p:par>
+                </p:childTnLst>
+              </p:cTn>
+              <p:prevCondLst>
+                <p:cond evt="onPrev" delay="0">
+                  <p:tgtEl>
+                    <p:sldTgt/>
+                  </p:tgtEl>
+                </p:cond>
+              </p:prevCondLst>
+              <p:nextCondLst>
+                <p:cond evt="onNext" delay="0">
+                  <p:tgtEl>
+                    <p:sldTgt/>
+                  </p:tgtEl>
+                </p:cond>
+              </p:nextCondLst>
+            </p:seq>
+          </p:childTnLst>
+        </p:cTn>
+      </p:par>
+    </p:tnLst>
+    <p:bldLst>
+      <p:bldP spid="3" grpId="0" uiExpand="1" build="p"/>
+    </p:bldLst>
+  </p:timing>
+</p:sld>
+</file>
+
+<file path=ppt/slides/slide37.xml><?xml version="1.0" encoding="utf-8"?>
+<p:sld xmlns:a="http://schemas.openxmlformats.org/drawingml/2006/main" xmlns:r="http://schemas.openxmlformats.org/officeDocument/2006/relationships" xmlns:p="http://schemas.openxmlformats.org/presentationml/2006/main">
+  <p:cSld>
+    <p:spTree>
+      <p:nvGrpSpPr>
+        <p:cNvPr id="1" name=""/>
+        <p:cNvGrpSpPr/>
+        <p:nvPr/>
+      </p:nvGrpSpPr>
+      <p:grpSpPr>
+        <a:xfrm>
+          <a:off x="0" y="0"/>
+          <a:ext cx="0" cy="0"/>
+          <a:chOff x="0" y="0"/>
+          <a:chExt cx="0" cy="0"/>
+        </a:xfrm>
+      </p:grpSpPr>
+      <p:sp>
+        <p:nvSpPr>
+          <p:cNvPr id="2" name="Title 1">
+            <a:extLst>
+              <a:ext uri="{FF2B5EF4-FFF2-40B4-BE49-F238E27FC236}">
+                <a16:creationId xmlns:a16="http://schemas.microsoft.com/office/drawing/2014/main" id="{BF955379-A8C3-B8B1-25F3-1E7E931819DF}"/>
+              </a:ext>
+            </a:extLst>
+          </p:cNvPr>
+          <p:cNvSpPr>
+            <a:spLocks noGrp="1"/>
+          </p:cNvSpPr>
+          <p:nvPr>
+            <p:ph type="title"/>
+          </p:nvPr>
+        </p:nvSpPr>
+        <p:spPr/>
+        <p:txBody>
+          <a:bodyPr/>
+          <a:lstStyle/>
+          <a:p>
+            <a:r>
+              <a:rPr lang="en-US" dirty="0"/>
+              <a:t>Unit 7 – Resources and Styles</a:t>
+            </a:r>
+          </a:p>
+        </p:txBody>
+      </p:sp>
+      <p:sp>
+        <p:nvSpPr>
+          <p:cNvPr id="3" name="Content Placeholder 2">
+            <a:extLst>
+              <a:ext uri="{FF2B5EF4-FFF2-40B4-BE49-F238E27FC236}">
+                <a16:creationId xmlns:a16="http://schemas.microsoft.com/office/drawing/2014/main" id="{E0F291F2-1DD2-0403-D3D2-8D2848954651}"/>
+              </a:ext>
+            </a:extLst>
+          </p:cNvPr>
+          <p:cNvSpPr>
+            <a:spLocks noGrp="1"/>
+          </p:cNvSpPr>
+          <p:nvPr>
+            <p:ph idx="1"/>
+          </p:nvPr>
+        </p:nvSpPr>
+        <p:spPr/>
+        <p:txBody>
+          <a:bodyPr/>
+          <a:lstStyle/>
+          <a:p>
+            <a:r>
+              <a:rPr lang="en-US" dirty="0"/>
+              <a:t>Resources</a:t>
+            </a:r>
+          </a:p>
+          <a:p>
+            <a:pPr lvl="1"/>
+            <a:r>
+              <a:rPr lang="en-US" dirty="0"/>
+              <a:t>Resources - object that can be reused in different places in application</a:t>
+            </a:r>
+          </a:p>
+          <a:p>
+            <a:pPr lvl="1"/>
+            <a:r>
+              <a:rPr lang="en-US" dirty="0"/>
+              <a:t>Defining a Resource</a:t>
+            </a:r>
+          </a:p>
+          <a:p>
+            <a:pPr lvl="2"/>
+            <a:r>
+              <a:rPr lang="en-US" dirty="0"/>
+              <a:t>Define in </a:t>
+            </a:r>
+            <a:r>
+              <a:rPr lang="en-US" dirty="0" err="1"/>
+              <a:t>ResourceDictionary</a:t>
+            </a:r>
+            <a:r>
+              <a:rPr lang="en-US" dirty="0"/>
+              <a:t> (separate file) or in Resources property of parent</a:t>
+            </a:r>
+          </a:p>
+          <a:p>
+            <a:pPr lvl="2"/>
+            <a:r>
+              <a:rPr lang="en-US" dirty="0"/>
+              <a:t>Define element normally, but add x:Key attribute, to give it a name</a:t>
+            </a:r>
+          </a:p>
+          <a:p>
+            <a:pPr lvl="1"/>
+            <a:r>
+              <a:rPr lang="en-US" dirty="0"/>
+              <a:t>Using a Resource</a:t>
+            </a:r>
+          </a:p>
+          <a:p>
+            <a:pPr lvl="2"/>
+            <a:r>
+              <a:rPr lang="en-US" dirty="0"/>
+              <a:t>Use </a:t>
+            </a:r>
+            <a:r>
+              <a:rPr lang="en-US" dirty="0" err="1"/>
+              <a:t>StaticResource</a:t>
+            </a:r>
+            <a:r>
+              <a:rPr lang="en-US" dirty="0"/>
+              <a:t> markup extension</a:t>
+            </a:r>
+          </a:p>
+          <a:p>
+            <a:r>
+              <a:rPr lang="en-US" dirty="0">
+                <a:solidFill>
+                  <a:srgbClr val="00B050"/>
+                </a:solidFill>
+              </a:rPr>
+              <a:t>Example - Resources</a:t>
+            </a:r>
+          </a:p>
+        </p:txBody>
+      </p:sp>
+    </p:spTree>
+    <p:extLst>
+      <p:ext uri="{BB962C8B-B14F-4D97-AF65-F5344CB8AC3E}">
+        <p14:creationId xmlns:p14="http://schemas.microsoft.com/office/powerpoint/2010/main" val="2100091513"/>
+      </p:ext>
+    </p:extLst>
+  </p:cSld>
+  <p:clrMapOvr>
+    <a:masterClrMapping/>
+  </p:clrMapOvr>
+  <p:timing>
+    <p:tnLst>
+      <p:par>
+        <p:cTn id="1" dur="indefinite" restart="never" nodeType="tmRoot">
+          <p:childTnLst>
+            <p:seq concurrent="1" nextAc="seek">
+              <p:cTn id="2" dur="indefinite" nodeType="mainSeq">
+                <p:childTnLst>
+                  <p:par>
+                    <p:cTn id="3" fill="hold">
+                      <p:stCondLst>
+                        <p:cond delay="indefinite"/>
+                      </p:stCondLst>
+                      <p:childTnLst>
+                        <p:par>
+                          <p:cTn id="4" fill="hold">
+                            <p:stCondLst>
+                              <p:cond delay="0"/>
+                            </p:stCondLst>
+                            <p:childTnLst>
+                              <p:par>
+                                <p:cTn id="5" presetID="10" presetClass="entr" presetSubtype="0" fill="hold" grpId="0" nodeType="clickEffect">
+                                  <p:stCondLst>
+                                    <p:cond delay="0"/>
+                                  </p:stCondLst>
+                                  <p:childTnLst>
+                                    <p:set>
+                                      <p:cBhvr>
+                                        <p:cTn id="6" dur="1" fill="hold">
+                                          <p:stCondLst>
+                                            <p:cond delay="0"/>
+                                          </p:stCondLst>
+                                        </p:cTn>
+                                        <p:tgtEl>
+                                          <p:spTgt spid="3">
+                                            <p:txEl>
+                                              <p:pRg st="0" end="0"/>
+                                            </p:txEl>
+                                          </p:spTgt>
+                                        </p:tgtEl>
+                                        <p:attrNameLst>
+                                          <p:attrName>style.visibility</p:attrName>
+                                        </p:attrNameLst>
+                                      </p:cBhvr>
+                                      <p:to>
+                                        <p:strVal val="visible"/>
+                                      </p:to>
+                                    </p:set>
+                                    <p:animEffect transition="in" filter="fade">
+                                      <p:cBhvr>
+                                        <p:cTn id="7" dur="500"/>
+                                        <p:tgtEl>
+                                          <p:spTgt spid="3">
+                                            <p:txEl>
+                                              <p:pRg st="0" end="0"/>
+                                            </p:txEl>
+                                          </p:spTgt>
+                                        </p:tgtEl>
+                                      </p:cBhvr>
+                                    </p:animEffect>
+                                  </p:childTnLst>
+                                </p:cTn>
+                              </p:par>
+                            </p:childTnLst>
+                          </p:cTn>
+                        </p:par>
+                      </p:childTnLst>
+                    </p:cTn>
+                  </p:par>
+                  <p:par>
+                    <p:cTn id="8" fill="hold">
+                      <p:stCondLst>
+                        <p:cond delay="indefinite"/>
+                      </p:stCondLst>
+                      <p:childTnLst>
+                        <p:par>
+                          <p:cTn id="9" fill="hold">
+                            <p:stCondLst>
+                              <p:cond delay="0"/>
+                            </p:stCondLst>
+                            <p:childTnLst>
+                              <p:par>
+                                <p:cTn id="10" presetID="10" presetClass="entr" presetSubtype="0" fill="hold" grpId="0" nodeType="clickEffect">
+                                  <p:stCondLst>
+                                    <p:cond delay="0"/>
+                                  </p:stCondLst>
+                                  <p:childTnLst>
+                                    <p:set>
+                                      <p:cBhvr>
+                                        <p:cTn id="11" dur="1" fill="hold">
+                                          <p:stCondLst>
+                                            <p:cond delay="0"/>
+                                          </p:stCondLst>
+                                        </p:cTn>
+                                        <p:tgtEl>
+                                          <p:spTgt spid="3">
+                                            <p:txEl>
+                                              <p:pRg st="1" end="1"/>
+                                            </p:txEl>
+                                          </p:spTgt>
+                                        </p:tgtEl>
+                                        <p:attrNameLst>
+                                          <p:attrName>style.visibility</p:attrName>
+                                        </p:attrNameLst>
+                                      </p:cBhvr>
+                                      <p:to>
+                                        <p:strVal val="visible"/>
+                                      </p:to>
+                                    </p:set>
+                                    <p:animEffect transition="in" filter="fade">
+                                      <p:cBhvr>
+                                        <p:cTn id="12" dur="500"/>
+                                        <p:tgtEl>
+                                          <p:spTgt spid="3">
+                                            <p:txEl>
+                                              <p:pRg st="1" end="1"/>
+                                            </p:txEl>
+                                          </p:spTgt>
+                                        </p:tgtEl>
+                                      </p:cBhvr>
+                                    </p:animEffect>
+                                  </p:childTnLst>
+                                </p:cTn>
+                              </p:par>
+                            </p:childTnLst>
+                          </p:cTn>
+                        </p:par>
+                      </p:childTnLst>
+                    </p:cTn>
+                  </p:par>
+                  <p:par>
+                    <p:cTn id="13" fill="hold">
+                      <p:stCondLst>
+                        <p:cond delay="indefinite"/>
+                      </p:stCondLst>
+                      <p:childTnLst>
+                        <p:par>
+                          <p:cTn id="14" fill="hold">
+                            <p:stCondLst>
+                              <p:cond delay="0"/>
+                            </p:stCondLst>
+                            <p:childTnLst>
+                              <p:par>
+                                <p:cTn id="15" presetID="10" presetClass="entr" presetSubtype="0" fill="hold" grpId="0" nodeType="clickEffect">
+                                  <p:stCondLst>
+                                    <p:cond delay="0"/>
+                                  </p:stCondLst>
+                                  <p:childTnLst>
+                                    <p:set>
+                                      <p:cBhvr>
+                                        <p:cTn id="16" dur="1" fill="hold">
+                                          <p:stCondLst>
+                                            <p:cond delay="0"/>
+                                          </p:stCondLst>
+                                        </p:cTn>
+                                        <p:tgtEl>
+                                          <p:spTgt spid="3">
+                                            <p:txEl>
+                                              <p:pRg st="2" end="2"/>
+                                            </p:txEl>
+                                          </p:spTgt>
+                                        </p:tgtEl>
+                                        <p:attrNameLst>
+                                          <p:attrName>style.visibility</p:attrName>
+                                        </p:attrNameLst>
+                                      </p:cBhvr>
+                                      <p:to>
+                                        <p:strVal val="visible"/>
+                                      </p:to>
+                                    </p:set>
+                                    <p:animEffect transition="in" filter="fade">
+                                      <p:cBhvr>
+                                        <p:cTn id="17" dur="500"/>
+                                        <p:tgtEl>
+                                          <p:spTgt spid="3">
+                                            <p:txEl>
+                                              <p:pRg st="2" end="2"/>
+                                            </p:txEl>
+                                          </p:spTgt>
+                                        </p:tgtEl>
+                                      </p:cBhvr>
+                                    </p:animEffect>
+                                  </p:childTnLst>
+                                </p:cTn>
+                              </p:par>
+                              <p:par>
+                                <p:cTn id="18" presetID="10" presetClass="entr" presetSubtype="0" fill="hold" grpId="0" nodeType="withEffect">
+                                  <p:stCondLst>
+                                    <p:cond delay="0"/>
+                                  </p:stCondLst>
+                                  <p:childTnLst>
+                                    <p:set>
+                                      <p:cBhvr>
+                                        <p:cTn id="19" dur="1" fill="hold">
+                                          <p:stCondLst>
+                                            <p:cond delay="0"/>
+                                          </p:stCondLst>
+                                        </p:cTn>
+                                        <p:tgtEl>
+                                          <p:spTgt spid="3">
+                                            <p:txEl>
+                                              <p:pRg st="3" end="3"/>
+                                            </p:txEl>
+                                          </p:spTgt>
+                                        </p:tgtEl>
+                                        <p:attrNameLst>
+                                          <p:attrName>style.visibility</p:attrName>
+                                        </p:attrNameLst>
+                                      </p:cBhvr>
+                                      <p:to>
+                                        <p:strVal val="visible"/>
+                                      </p:to>
+                                    </p:set>
+                                    <p:animEffect transition="in" filter="fade">
+                                      <p:cBhvr>
+                                        <p:cTn id="20" dur="500"/>
+                                        <p:tgtEl>
+                                          <p:spTgt spid="3">
+                                            <p:txEl>
+                                              <p:pRg st="3" end="3"/>
+                                            </p:txEl>
+                                          </p:spTgt>
+                                        </p:tgtEl>
+                                      </p:cBhvr>
+                                    </p:animEffect>
+                                  </p:childTnLst>
+                                </p:cTn>
+                              </p:par>
+                              <p:par>
+                                <p:cTn id="21" presetID="10" presetClass="entr" presetSubtype="0" fill="hold" grpId="0" nodeType="withEffect">
+                                  <p:stCondLst>
+                                    <p:cond delay="0"/>
+                                  </p:stCondLst>
+                                  <p:childTnLst>
+                                    <p:set>
+                                      <p:cBhvr>
+                                        <p:cTn id="22" dur="1" fill="hold">
+                                          <p:stCondLst>
+                                            <p:cond delay="0"/>
+                                          </p:stCondLst>
+                                        </p:cTn>
+                                        <p:tgtEl>
+                                          <p:spTgt spid="3">
+                                            <p:txEl>
+                                              <p:pRg st="4" end="4"/>
+                                            </p:txEl>
+                                          </p:spTgt>
+                                        </p:tgtEl>
+                                        <p:attrNameLst>
+                                          <p:attrName>style.visibility</p:attrName>
+                                        </p:attrNameLst>
+                                      </p:cBhvr>
+                                      <p:to>
+                                        <p:strVal val="visible"/>
+                                      </p:to>
+                                    </p:set>
+                                    <p:animEffect transition="in" filter="fade">
+                                      <p:cBhvr>
+                                        <p:cTn id="23" dur="500"/>
+                                        <p:tgtEl>
+                                          <p:spTgt spid="3">
+                                            <p:txEl>
+                                              <p:pRg st="4" end="4"/>
+                                            </p:txEl>
+                                          </p:spTgt>
+                                        </p:tgtEl>
+                                      </p:cBhvr>
+                                    </p:animEffect>
+                                  </p:childTnLst>
+                                </p:cTn>
+                              </p:par>
+                            </p:childTnLst>
+                          </p:cTn>
+                        </p:par>
+                      </p:childTnLst>
+                    </p:cTn>
+                  </p:par>
+                  <p:par>
+                    <p:cTn id="24" fill="hold">
+                      <p:stCondLst>
+                        <p:cond delay="indefinite"/>
+                      </p:stCondLst>
+                      <p:childTnLst>
+                        <p:par>
+                          <p:cTn id="25" fill="hold">
+                            <p:stCondLst>
+                              <p:cond delay="0"/>
+                            </p:stCondLst>
+                            <p:childTnLst>
+                              <p:par>
+                                <p:cTn id="26" presetID="10" presetClass="entr" presetSubtype="0" fill="hold" grpId="0" nodeType="clickEffect">
+                                  <p:stCondLst>
+                                    <p:cond delay="0"/>
+                                  </p:stCondLst>
+                                  <p:childTnLst>
+                                    <p:set>
+                                      <p:cBhvr>
+                                        <p:cTn id="27" dur="1" fill="hold">
+                                          <p:stCondLst>
+                                            <p:cond delay="0"/>
+                                          </p:stCondLst>
+                                        </p:cTn>
+                                        <p:tgtEl>
+                                          <p:spTgt spid="3">
+                                            <p:txEl>
+                                              <p:pRg st="5" end="5"/>
+                                            </p:txEl>
+                                          </p:spTgt>
+                                        </p:tgtEl>
+                                        <p:attrNameLst>
+                                          <p:attrName>style.visibility</p:attrName>
+                                        </p:attrNameLst>
+                                      </p:cBhvr>
+                                      <p:to>
+                                        <p:strVal val="visible"/>
+                                      </p:to>
+                                    </p:set>
+                                    <p:animEffect transition="in" filter="fade">
+                                      <p:cBhvr>
+                                        <p:cTn id="28" dur="500"/>
+                                        <p:tgtEl>
+                                          <p:spTgt spid="3">
+                                            <p:txEl>
+                                              <p:pRg st="5" end="5"/>
+                                            </p:txEl>
+                                          </p:spTgt>
+                                        </p:tgtEl>
+                                      </p:cBhvr>
+                                    </p:animEffect>
+                                  </p:childTnLst>
+                                </p:cTn>
+                              </p:par>
+                              <p:par>
+                                <p:cTn id="29" presetID="10" presetClass="entr" presetSubtype="0" fill="hold" grpId="0" nodeType="withEffect">
+                                  <p:stCondLst>
+                                    <p:cond delay="0"/>
+                                  </p:stCondLst>
+                                  <p:childTnLst>
+                                    <p:set>
+                                      <p:cBhvr>
+                                        <p:cTn id="30" dur="1" fill="hold">
+                                          <p:stCondLst>
+                                            <p:cond delay="0"/>
+                                          </p:stCondLst>
+                                        </p:cTn>
+                                        <p:tgtEl>
+                                          <p:spTgt spid="3">
+                                            <p:txEl>
+                                              <p:pRg st="6" end="6"/>
+                                            </p:txEl>
+                                          </p:spTgt>
+                                        </p:tgtEl>
+                                        <p:attrNameLst>
+                                          <p:attrName>style.visibility</p:attrName>
+                                        </p:attrNameLst>
+                                      </p:cBhvr>
+                                      <p:to>
+                                        <p:strVal val="visible"/>
+                                      </p:to>
+                                    </p:set>
+                                    <p:animEffect transition="in" filter="fade">
+                                      <p:cBhvr>
+                                        <p:cTn id="31" dur="500"/>
+                                        <p:tgtEl>
+                                          <p:spTgt spid="3">
+                                            <p:txEl>
+                                              <p:pRg st="6" end="6"/>
+                                            </p:txEl>
+                                          </p:spTgt>
+                                        </p:tgtEl>
+                                      </p:cBhvr>
+                                    </p:animEffect>
+                                  </p:childTnLst>
+                                </p:cTn>
+                              </p:par>
+                            </p:childTnLst>
+                          </p:cTn>
+                        </p:par>
+                      </p:childTnLst>
+                    </p:cTn>
+                  </p:par>
+                  <p:par>
+                    <p:cTn id="32" fill="hold">
+                      <p:stCondLst>
+                        <p:cond delay="indefinite"/>
+                      </p:stCondLst>
+                      <p:childTnLst>
+                        <p:par>
+                          <p:cTn id="33" fill="hold">
+                            <p:stCondLst>
+                              <p:cond delay="0"/>
+                            </p:stCondLst>
+                            <p:childTnLst>
+                              <p:par>
+                                <p:cTn id="34" presetID="10" presetClass="entr" presetSubtype="0" fill="hold" grpId="0" nodeType="clickEffect">
+                                  <p:stCondLst>
+                                    <p:cond delay="0"/>
+                                  </p:stCondLst>
+                                  <p:childTnLst>
+                                    <p:set>
+                                      <p:cBhvr>
+                                        <p:cTn id="35" dur="1" fill="hold">
+                                          <p:stCondLst>
+                                            <p:cond delay="0"/>
+                                          </p:stCondLst>
+                                        </p:cTn>
+                                        <p:tgtEl>
+                                          <p:spTgt spid="3">
+                                            <p:txEl>
+                                              <p:pRg st="7" end="7"/>
+                                            </p:txEl>
+                                          </p:spTgt>
+                                        </p:tgtEl>
+                                        <p:attrNameLst>
+                                          <p:attrName>style.visibility</p:attrName>
+                                        </p:attrNameLst>
+                                      </p:cBhvr>
+                                      <p:to>
+                                        <p:strVal val="visible"/>
+                                      </p:to>
+                                    </p:set>
+                                    <p:animEffect transition="in" filter="fade">
+                                      <p:cBhvr>
+                                        <p:cTn id="36" dur="500"/>
+                                        <p:tgtEl>
+                                          <p:spTgt spid="3">
+                                            <p:txEl>
+                                              <p:pRg st="7" end="7"/>
+                                            </p:txEl>
+                                          </p:spTgt>
+                                        </p:tgtEl>
+                                      </p:cBhvr>
+                                    </p:animEffect>
+                                  </p:childTnLst>
+                                </p:cTn>
+                              </p:par>
+                            </p:childTnLst>
+                          </p:cTn>
+                        </p:par>
+                      </p:childTnLst>
+                    </p:cTn>
+                  </p:par>
+                </p:childTnLst>
+              </p:cTn>
+              <p:prevCondLst>
+                <p:cond evt="onPrev" delay="0">
+                  <p:tgtEl>
+                    <p:sldTgt/>
+                  </p:tgtEl>
+                </p:cond>
+              </p:prevCondLst>
+              <p:nextCondLst>
+                <p:cond evt="onNext" delay="0">
+                  <p:tgtEl>
+                    <p:sldTgt/>
+                  </p:tgtEl>
+                </p:cond>
+              </p:nextCondLst>
+            </p:seq>
+          </p:childTnLst>
+        </p:cTn>
+      </p:par>
+    </p:tnLst>
+    <p:bldLst>
+      <p:bldP spid="3" grpId="0" uiExpand="1" build="p"/>
+    </p:bldLst>
+  </p:timing>
+</p:sld>
+</file>
+
+<file path=ppt/slides/slide38.xml><?xml version="1.0" encoding="utf-8"?>
+<p:sld xmlns:a="http://schemas.openxmlformats.org/drawingml/2006/main" xmlns:r="http://schemas.openxmlformats.org/officeDocument/2006/relationships" xmlns:p="http://schemas.openxmlformats.org/presentationml/2006/main">
+  <p:cSld>
+    <p:spTree>
+      <p:nvGrpSpPr>
+        <p:cNvPr id="1" name=""/>
+        <p:cNvGrpSpPr/>
+        <p:nvPr/>
+      </p:nvGrpSpPr>
+      <p:grpSpPr>
+        <a:xfrm>
+          <a:off x="0" y="0"/>
+          <a:ext cx="0" cy="0"/>
+          <a:chOff x="0" y="0"/>
+          <a:chExt cx="0" cy="0"/>
+        </a:xfrm>
+      </p:grpSpPr>
+      <p:sp>
+        <p:nvSpPr>
+          <p:cNvPr id="2" name="Title 1">
+            <a:extLst>
+              <a:ext uri="{FF2B5EF4-FFF2-40B4-BE49-F238E27FC236}">
+                <a16:creationId xmlns:a16="http://schemas.microsoft.com/office/drawing/2014/main" id="{AD80C5C6-6B55-52E7-1A12-AA0FD9F3C64E}"/>
+              </a:ext>
+            </a:extLst>
+          </p:cNvPr>
+          <p:cNvSpPr>
+            <a:spLocks noGrp="1"/>
+          </p:cNvSpPr>
+          <p:nvPr>
+            <p:ph type="title"/>
+          </p:nvPr>
+        </p:nvSpPr>
+        <p:spPr/>
+        <p:txBody>
+          <a:bodyPr/>
+          <a:lstStyle/>
+          <a:p>
+            <a:r>
+              <a:rPr lang="en-US" dirty="0"/>
+              <a:t>Unit 7 – Resources and Styles</a:t>
+            </a:r>
+          </a:p>
+        </p:txBody>
+      </p:sp>
+      <p:sp>
+        <p:nvSpPr>
+          <p:cNvPr id="3" name="Content Placeholder 2">
+            <a:extLst>
+              <a:ext uri="{FF2B5EF4-FFF2-40B4-BE49-F238E27FC236}">
+                <a16:creationId xmlns:a16="http://schemas.microsoft.com/office/drawing/2014/main" id="{A624AD30-408C-0867-E689-30934C4E84D4}"/>
+              </a:ext>
+            </a:extLst>
+          </p:cNvPr>
+          <p:cNvSpPr>
+            <a:spLocks noGrp="1"/>
+          </p:cNvSpPr>
+          <p:nvPr>
+            <p:ph idx="1"/>
+          </p:nvPr>
+        </p:nvSpPr>
+        <p:spPr/>
+        <p:txBody>
+          <a:bodyPr>
+            <a:normAutofit fontScale="92500" lnSpcReduction="10000"/>
+          </a:bodyPr>
+          <a:lstStyle/>
+          <a:p>
+            <a:r>
+              <a:rPr lang="en-US" dirty="0"/>
+              <a:t>Styles</a:t>
+            </a:r>
+          </a:p>
+          <a:p>
+            <a:pPr lvl="1"/>
+            <a:r>
+              <a:rPr lang="en-US" dirty="0"/>
+              <a:t>A named set of property values</a:t>
+            </a:r>
+          </a:p>
+          <a:p>
+            <a:pPr lvl="1"/>
+            <a:r>
+              <a:rPr lang="en-US" dirty="0"/>
+              <a:t>Encourages reuse</a:t>
+            </a:r>
+          </a:p>
+          <a:p>
+            <a:r>
+              <a:rPr lang="en-US" dirty="0"/>
+              <a:t>Defining a style</a:t>
+            </a:r>
+          </a:p>
+          <a:p>
+            <a:pPr lvl="1"/>
+            <a:r>
+              <a:rPr lang="en-US" dirty="0"/>
+              <a:t>Define in </a:t>
+            </a:r>
+            <a:r>
+              <a:rPr lang="en-US" dirty="0" err="1"/>
+              <a:t>ResourceDictionary</a:t>
+            </a:r>
+            <a:r>
+              <a:rPr lang="en-US" dirty="0"/>
+              <a:t> or .Resources</a:t>
+            </a:r>
+          </a:p>
+          <a:p>
+            <a:pPr lvl="1"/>
+            <a:r>
+              <a:rPr lang="en-US" dirty="0"/>
+              <a:t>&lt;Style&gt; tag and set of &lt;Setter&gt; tags</a:t>
+            </a:r>
+          </a:p>
+          <a:p>
+            <a:pPr lvl="1"/>
+            <a:r>
+              <a:rPr lang="en-US" dirty="0"/>
+              <a:t>Specify x:Key and </a:t>
+            </a:r>
+            <a:r>
+              <a:rPr lang="en-US" dirty="0" err="1"/>
+              <a:t>TargetType</a:t>
+            </a:r>
+            <a:endParaRPr lang="en-US" dirty="0"/>
+          </a:p>
+          <a:p>
+            <a:pPr lvl="1"/>
+            <a:r>
+              <a:rPr lang="en-US" dirty="0"/>
+              <a:t>Each &lt;Setter&gt; sets Property and Value</a:t>
+            </a:r>
+          </a:p>
+          <a:p>
+            <a:r>
+              <a:rPr lang="en-US" dirty="0"/>
+              <a:t>Using a Style</a:t>
+            </a:r>
+          </a:p>
+          <a:p>
+            <a:pPr lvl="1"/>
+            <a:r>
+              <a:rPr lang="en-US" dirty="0"/>
+              <a:t>Set Style attribute, use </a:t>
+            </a:r>
+            <a:r>
+              <a:rPr lang="en-US" dirty="0" err="1"/>
+              <a:t>StaticResource</a:t>
+            </a:r>
+            <a:r>
+              <a:rPr lang="en-US" dirty="0"/>
+              <a:t> markup extension, reference style's key</a:t>
+            </a:r>
+          </a:p>
+          <a:p>
+            <a:r>
+              <a:rPr lang="en-US" dirty="0">
+                <a:solidFill>
+                  <a:srgbClr val="00B050"/>
+                </a:solidFill>
+              </a:rPr>
+              <a:t>Example - Styles</a:t>
+            </a:r>
+          </a:p>
+        </p:txBody>
+      </p:sp>
+    </p:spTree>
+    <p:extLst>
+      <p:ext uri="{BB962C8B-B14F-4D97-AF65-F5344CB8AC3E}">
+        <p14:creationId xmlns:p14="http://schemas.microsoft.com/office/powerpoint/2010/main" val="2411172984"/>
+      </p:ext>
+    </p:extLst>
+  </p:cSld>
+  <p:clrMapOvr>
+    <a:masterClrMapping/>
+  </p:clrMapOvr>
+  <p:timing>
+    <p:tnLst>
+      <p:par>
+        <p:cTn id="1" dur="indefinite" restart="never" nodeType="tmRoot">
+          <p:childTnLst>
+            <p:seq concurrent="1" nextAc="seek">
+              <p:cTn id="2" dur="indefinite" nodeType="mainSeq">
+                <p:childTnLst>
+                  <p:par>
+                    <p:cTn id="3" fill="hold">
+                      <p:stCondLst>
+                        <p:cond delay="indefinite"/>
+                      </p:stCondLst>
+                      <p:childTnLst>
+                        <p:par>
+                          <p:cTn id="4" fill="hold">
+                            <p:stCondLst>
+                              <p:cond delay="0"/>
+                            </p:stCondLst>
+                            <p:childTnLst>
+                              <p:par>
+                                <p:cTn id="5" presetID="10" presetClass="entr" presetSubtype="0" fill="hold" grpId="0" nodeType="clickEffect">
+                                  <p:stCondLst>
+                                    <p:cond delay="0"/>
+                                  </p:stCondLst>
+                                  <p:childTnLst>
+                                    <p:set>
+                                      <p:cBhvr>
+                                        <p:cTn id="6" dur="1" fill="hold">
+                                          <p:stCondLst>
+                                            <p:cond delay="0"/>
+                                          </p:stCondLst>
+                                        </p:cTn>
+                                        <p:tgtEl>
+                                          <p:spTgt spid="3">
+                                            <p:txEl>
+                                              <p:pRg st="0" end="0"/>
+                                            </p:txEl>
+                                          </p:spTgt>
+                                        </p:tgtEl>
+                                        <p:attrNameLst>
+                                          <p:attrName>style.visibility</p:attrName>
+                                        </p:attrNameLst>
+                                      </p:cBhvr>
+                                      <p:to>
+                                        <p:strVal val="visible"/>
+                                      </p:to>
+                                    </p:set>
+                                    <p:animEffect transition="in" filter="fade">
+                                      <p:cBhvr>
+                                        <p:cTn id="7" dur="500"/>
+                                        <p:tgtEl>
+                                          <p:spTgt spid="3">
+                                            <p:txEl>
+                                              <p:pRg st="0" end="0"/>
+                                            </p:txEl>
+                                          </p:spTgt>
+                                        </p:tgtEl>
+                                      </p:cBhvr>
+                                    </p:animEffect>
+                                  </p:childTnLst>
+                                </p:cTn>
+                              </p:par>
+                              <p:par>
+                                <p:cTn id="8" presetID="10" presetClass="entr" presetSubtype="0" fill="hold" grpId="0" nodeType="withEffect">
+                                  <p:stCondLst>
+                                    <p:cond delay="0"/>
+                                  </p:stCondLst>
+                                  <p:childTnLst>
+                                    <p:set>
+                                      <p:cBhvr>
+                                        <p:cTn id="9" dur="1" fill="hold">
+                                          <p:stCondLst>
+                                            <p:cond delay="0"/>
+                                          </p:stCondLst>
+                                        </p:cTn>
+                                        <p:tgtEl>
+                                          <p:spTgt spid="3">
+                                            <p:txEl>
+                                              <p:pRg st="1" end="1"/>
+                                            </p:txEl>
+                                          </p:spTgt>
+                                        </p:tgtEl>
+                                        <p:attrNameLst>
+                                          <p:attrName>style.visibility</p:attrName>
+                                        </p:attrNameLst>
+                                      </p:cBhvr>
+                                      <p:to>
+                                        <p:strVal val="visible"/>
+                                      </p:to>
+                                    </p:set>
+                                    <p:animEffect transition="in" filter="fade">
+                                      <p:cBhvr>
+                                        <p:cTn id="10" dur="500"/>
+                                        <p:tgtEl>
+                                          <p:spTgt spid="3">
+                                            <p:txEl>
+                                              <p:pRg st="1" end="1"/>
+                                            </p:txEl>
+                                          </p:spTgt>
+                                        </p:tgtEl>
+                                      </p:cBhvr>
+                                    </p:animEffect>
+                                  </p:childTnLst>
+                                </p:cTn>
+                              </p:par>
+                              <p:par>
+                                <p:cTn id="11" presetID="10" presetClass="entr" presetSubtype="0" fill="hold" grpId="0" nodeType="withEffect">
+                                  <p:stCondLst>
+                                    <p:cond delay="0"/>
+                                  </p:stCondLst>
+                                  <p:childTnLst>
+                                    <p:set>
+                                      <p:cBhvr>
+                                        <p:cTn id="12" dur="1" fill="hold">
+                                          <p:stCondLst>
+                                            <p:cond delay="0"/>
+                                          </p:stCondLst>
+                                        </p:cTn>
+                                        <p:tgtEl>
+                                          <p:spTgt spid="3">
+                                            <p:txEl>
+                                              <p:pRg st="2" end="2"/>
+                                            </p:txEl>
+                                          </p:spTgt>
+                                        </p:tgtEl>
+                                        <p:attrNameLst>
+                                          <p:attrName>style.visibility</p:attrName>
+                                        </p:attrNameLst>
+                                      </p:cBhvr>
+                                      <p:to>
+                                        <p:strVal val="visible"/>
+                                      </p:to>
+                                    </p:set>
+                                    <p:animEffect transition="in" filter="fade">
+                                      <p:cBhvr>
+                                        <p:cTn id="13" dur="500"/>
+                                        <p:tgtEl>
+                                          <p:spTgt spid="3">
+                                            <p:txEl>
+                                              <p:pRg st="2" end="2"/>
+                                            </p:txEl>
+                                          </p:spTgt>
+                                        </p:tgtEl>
+                                      </p:cBhvr>
+                                    </p:animEffect>
+                                  </p:childTnLst>
+                                </p:cTn>
+                              </p:par>
+                            </p:childTnLst>
+                          </p:cTn>
+                        </p:par>
+                      </p:childTnLst>
+                    </p:cTn>
+                  </p:par>
+                  <p:par>
+                    <p:cTn id="14" fill="hold">
+                      <p:stCondLst>
+                        <p:cond delay="indefinite"/>
+                      </p:stCondLst>
+                      <p:childTnLst>
+                        <p:par>
+                          <p:cTn id="15" fill="hold">
+                            <p:stCondLst>
+                              <p:cond delay="0"/>
+                            </p:stCondLst>
+                            <p:childTnLst>
+                              <p:par>
+                                <p:cTn id="16" presetID="10" presetClass="entr" presetSubtype="0" fill="hold" grpId="0" nodeType="clickEffect">
+                                  <p:stCondLst>
+                                    <p:cond delay="0"/>
+                                  </p:stCondLst>
+                                  <p:childTnLst>
+                                    <p:set>
+                                      <p:cBhvr>
+                                        <p:cTn id="17" dur="1" fill="hold">
+                                          <p:stCondLst>
+                                            <p:cond delay="0"/>
+                                          </p:stCondLst>
+                                        </p:cTn>
+                                        <p:tgtEl>
+                                          <p:spTgt spid="3">
+                                            <p:txEl>
+                                              <p:pRg st="3" end="3"/>
+                                            </p:txEl>
+                                          </p:spTgt>
+                                        </p:tgtEl>
+                                        <p:attrNameLst>
+                                          <p:attrName>style.visibility</p:attrName>
+                                        </p:attrNameLst>
+                                      </p:cBhvr>
+                                      <p:to>
+                                        <p:strVal val="visible"/>
+                                      </p:to>
+                                    </p:set>
+                                    <p:animEffect transition="in" filter="fade">
+                                      <p:cBhvr>
+                                        <p:cTn id="18" dur="500"/>
+                                        <p:tgtEl>
+                                          <p:spTgt spid="3">
+                                            <p:txEl>
+                                              <p:pRg st="3" end="3"/>
+                                            </p:txEl>
+                                          </p:spTgt>
+                                        </p:tgtEl>
+                                      </p:cBhvr>
+                                    </p:animEffect>
+                                  </p:childTnLst>
+                                </p:cTn>
+                              </p:par>
+                              <p:par>
+                                <p:cTn id="19" presetID="10" presetClass="entr" presetSubtype="0" fill="hold" grpId="0" nodeType="withEffect">
+                                  <p:stCondLst>
+                                    <p:cond delay="0"/>
+                                  </p:stCondLst>
+                                  <p:childTnLst>
+                                    <p:set>
+                                      <p:cBhvr>
+                                        <p:cTn id="20" dur="1" fill="hold">
+                                          <p:stCondLst>
+                                            <p:cond delay="0"/>
+                                          </p:stCondLst>
+                                        </p:cTn>
+                                        <p:tgtEl>
+                                          <p:spTgt spid="3">
+                                            <p:txEl>
+                                              <p:pRg st="4" end="4"/>
+                                            </p:txEl>
+                                          </p:spTgt>
+                                        </p:tgtEl>
+                                        <p:attrNameLst>
+                                          <p:attrName>style.visibility</p:attrName>
+                                        </p:attrNameLst>
+                                      </p:cBhvr>
+                                      <p:to>
+                                        <p:strVal val="visible"/>
+                                      </p:to>
+                                    </p:set>
+                                    <p:animEffect transition="in" filter="fade">
+                                      <p:cBhvr>
+                                        <p:cTn id="21" dur="500"/>
+                                        <p:tgtEl>
+                                          <p:spTgt spid="3">
+                                            <p:txEl>
+                                              <p:pRg st="4" end="4"/>
+                                            </p:txEl>
+                                          </p:spTgt>
+                                        </p:tgtEl>
+                                      </p:cBhvr>
+                                    </p:animEffect>
+                                  </p:childTnLst>
+                                </p:cTn>
+                              </p:par>
+                              <p:par>
+                                <p:cTn id="22" presetID="10" presetClass="entr" presetSubtype="0" fill="hold" grpId="0" nodeType="withEffect">
+                                  <p:stCondLst>
+                                    <p:cond delay="0"/>
+                                  </p:stCondLst>
+                                  <p:childTnLst>
+                                    <p:set>
+                                      <p:cBhvr>
+                                        <p:cTn id="23" dur="1" fill="hold">
+                                          <p:stCondLst>
+                                            <p:cond delay="0"/>
+                                          </p:stCondLst>
+                                        </p:cTn>
+                                        <p:tgtEl>
+                                          <p:spTgt spid="3">
+                                            <p:txEl>
+                                              <p:pRg st="5" end="5"/>
+                                            </p:txEl>
+                                          </p:spTgt>
+                                        </p:tgtEl>
+                                        <p:attrNameLst>
+                                          <p:attrName>style.visibility</p:attrName>
+                                        </p:attrNameLst>
+                                      </p:cBhvr>
+                                      <p:to>
+                                        <p:strVal val="visible"/>
+                                      </p:to>
+                                    </p:set>
+                                    <p:animEffect transition="in" filter="fade">
+                                      <p:cBhvr>
+                                        <p:cTn id="24" dur="500"/>
+                                        <p:tgtEl>
+                                          <p:spTgt spid="3">
+                                            <p:txEl>
+                                              <p:pRg st="5" end="5"/>
+                                            </p:txEl>
+                                          </p:spTgt>
+                                        </p:tgtEl>
+                                      </p:cBhvr>
+                                    </p:animEffect>
+                                  </p:childTnLst>
+                                </p:cTn>
+                              </p:par>
+                              <p:par>
+                                <p:cTn id="25" presetID="10" presetClass="entr" presetSubtype="0" fill="hold" grpId="0" nodeType="withEffect">
+                                  <p:stCondLst>
+                                    <p:cond delay="0"/>
+                                  </p:stCondLst>
+                                  <p:childTnLst>
+                                    <p:set>
+                                      <p:cBhvr>
+                                        <p:cTn id="26" dur="1" fill="hold">
+                                          <p:stCondLst>
+                                            <p:cond delay="0"/>
+                                          </p:stCondLst>
+                                        </p:cTn>
+                                        <p:tgtEl>
+                                          <p:spTgt spid="3">
+                                            <p:txEl>
+                                              <p:pRg st="6" end="6"/>
+                                            </p:txEl>
+                                          </p:spTgt>
+                                        </p:tgtEl>
+                                        <p:attrNameLst>
+                                          <p:attrName>style.visibility</p:attrName>
+                                        </p:attrNameLst>
+                                      </p:cBhvr>
+                                      <p:to>
+                                        <p:strVal val="visible"/>
+                                      </p:to>
+                                    </p:set>
+                                    <p:animEffect transition="in" filter="fade">
+                                      <p:cBhvr>
+                                        <p:cTn id="27" dur="500"/>
+                                        <p:tgtEl>
+                                          <p:spTgt spid="3">
+                                            <p:txEl>
+                                              <p:pRg st="6" end="6"/>
+                                            </p:txEl>
+                                          </p:spTgt>
+                                        </p:tgtEl>
+                                      </p:cBhvr>
+                                    </p:animEffect>
+                                  </p:childTnLst>
+                                </p:cTn>
+                              </p:par>
+                              <p:par>
+                                <p:cTn id="28" presetID="10" presetClass="entr" presetSubtype="0" fill="hold" grpId="0" nodeType="withEffect">
+                                  <p:stCondLst>
+                                    <p:cond delay="0"/>
+                                  </p:stCondLst>
+                                  <p:childTnLst>
+                                    <p:set>
+                                      <p:cBhvr>
+                                        <p:cTn id="29" dur="1" fill="hold">
+                                          <p:stCondLst>
+                                            <p:cond delay="0"/>
+                                          </p:stCondLst>
+                                        </p:cTn>
+                                        <p:tgtEl>
+                                          <p:spTgt spid="3">
+                                            <p:txEl>
+                                              <p:pRg st="7" end="7"/>
+                                            </p:txEl>
+                                          </p:spTgt>
+                                        </p:tgtEl>
+                                        <p:attrNameLst>
+                                          <p:attrName>style.visibility</p:attrName>
+                                        </p:attrNameLst>
+                                      </p:cBhvr>
+                                      <p:to>
+                                        <p:strVal val="visible"/>
+                                      </p:to>
+                                    </p:set>
+                                    <p:animEffect transition="in" filter="fade">
+                                      <p:cBhvr>
+                                        <p:cTn id="30" dur="500"/>
+                                        <p:tgtEl>
+                                          <p:spTgt spid="3">
+                                            <p:txEl>
+                                              <p:pRg st="7" end="7"/>
+                                            </p:txEl>
+                                          </p:spTgt>
+                                        </p:tgtEl>
+                                      </p:cBhvr>
+                                    </p:animEffect>
+                                  </p:childTnLst>
+                                </p:cTn>
+                              </p:par>
+                            </p:childTnLst>
+                          </p:cTn>
+                        </p:par>
+                      </p:childTnLst>
+                    </p:cTn>
+                  </p:par>
+                  <p:par>
+                    <p:cTn id="31" fill="hold">
+                      <p:stCondLst>
+                        <p:cond delay="indefinite"/>
+                      </p:stCondLst>
+                      <p:childTnLst>
+                        <p:par>
+                          <p:cTn id="32" fill="hold">
+                            <p:stCondLst>
+                              <p:cond delay="0"/>
+                            </p:stCondLst>
+                            <p:childTnLst>
+                              <p:par>
+                                <p:cTn id="33" presetID="10" presetClass="entr" presetSubtype="0" fill="hold" grpId="0" nodeType="clickEffect">
+                                  <p:stCondLst>
+                                    <p:cond delay="0"/>
+                                  </p:stCondLst>
+                                  <p:childTnLst>
+                                    <p:set>
+                                      <p:cBhvr>
+                                        <p:cTn id="34" dur="1" fill="hold">
+                                          <p:stCondLst>
+                                            <p:cond delay="0"/>
+                                          </p:stCondLst>
+                                        </p:cTn>
+                                        <p:tgtEl>
+                                          <p:spTgt spid="3">
+                                            <p:txEl>
+                                              <p:pRg st="8" end="8"/>
+                                            </p:txEl>
+                                          </p:spTgt>
+                                        </p:tgtEl>
+                                        <p:attrNameLst>
+                                          <p:attrName>style.visibility</p:attrName>
+                                        </p:attrNameLst>
+                                      </p:cBhvr>
+                                      <p:to>
+                                        <p:strVal val="visible"/>
+                                      </p:to>
+                                    </p:set>
+                                    <p:animEffect transition="in" filter="fade">
+                                      <p:cBhvr>
+                                        <p:cTn id="35" dur="500"/>
+                                        <p:tgtEl>
+                                          <p:spTgt spid="3">
+                                            <p:txEl>
+                                              <p:pRg st="8" end="8"/>
+                                            </p:txEl>
+                                          </p:spTgt>
+                                        </p:tgtEl>
+                                      </p:cBhvr>
+                                    </p:animEffect>
+                                  </p:childTnLst>
+                                </p:cTn>
+                              </p:par>
+                              <p:par>
+                                <p:cTn id="36" presetID="10" presetClass="entr" presetSubtype="0" fill="hold" grpId="0" nodeType="withEffect">
+                                  <p:stCondLst>
+                                    <p:cond delay="0"/>
+                                  </p:stCondLst>
+                                  <p:childTnLst>
+                                    <p:set>
+                                      <p:cBhvr>
+                                        <p:cTn id="37" dur="1" fill="hold">
+                                          <p:stCondLst>
+                                            <p:cond delay="0"/>
+                                          </p:stCondLst>
+                                        </p:cTn>
+                                        <p:tgtEl>
+                                          <p:spTgt spid="3">
+                                            <p:txEl>
+                                              <p:pRg st="9" end="9"/>
+                                            </p:txEl>
+                                          </p:spTgt>
+                                        </p:tgtEl>
+                                        <p:attrNameLst>
+                                          <p:attrName>style.visibility</p:attrName>
+                                        </p:attrNameLst>
+                                      </p:cBhvr>
+                                      <p:to>
+                                        <p:strVal val="visible"/>
+                                      </p:to>
+                                    </p:set>
+                                    <p:animEffect transition="in" filter="fade">
+                                      <p:cBhvr>
+                                        <p:cTn id="38" dur="500"/>
+                                        <p:tgtEl>
+                                          <p:spTgt spid="3">
+                                            <p:txEl>
+                                              <p:pRg st="9" end="9"/>
+                                            </p:txEl>
+                                          </p:spTgt>
+                                        </p:tgtEl>
+                                      </p:cBhvr>
+                                    </p:animEffect>
+                                  </p:childTnLst>
+                                </p:cTn>
+                              </p:par>
+                            </p:childTnLst>
+                          </p:cTn>
+                        </p:par>
+                      </p:childTnLst>
+                    </p:cTn>
+                  </p:par>
+                  <p:par>
+                    <p:cTn id="39" fill="hold">
+                      <p:stCondLst>
+                        <p:cond delay="indefinite"/>
+                      </p:stCondLst>
+                      <p:childTnLst>
+                        <p:par>
+                          <p:cTn id="40" fill="hold">
+                            <p:stCondLst>
+                              <p:cond delay="0"/>
+                            </p:stCondLst>
+                            <p:childTnLst>
+                              <p:par>
+                                <p:cTn id="41" presetID="10" presetClass="entr" presetSubtype="0" fill="hold" grpId="0" nodeType="clickEffect">
+                                  <p:stCondLst>
+                                    <p:cond delay="0"/>
+                                  </p:stCondLst>
+                                  <p:childTnLst>
+                                    <p:set>
+                                      <p:cBhvr>
+                                        <p:cTn id="42" dur="1" fill="hold">
+                                          <p:stCondLst>
+                                            <p:cond delay="0"/>
+                                          </p:stCondLst>
+                                        </p:cTn>
+                                        <p:tgtEl>
+                                          <p:spTgt spid="3">
+                                            <p:txEl>
+                                              <p:pRg st="10" end="10"/>
+                                            </p:txEl>
+                                          </p:spTgt>
+                                        </p:tgtEl>
+                                        <p:attrNameLst>
+                                          <p:attrName>style.visibility</p:attrName>
+                                        </p:attrNameLst>
+                                      </p:cBhvr>
+                                      <p:to>
+                                        <p:strVal val="visible"/>
+                                      </p:to>
+                                    </p:set>
+                                    <p:animEffect transition="in" filter="fade">
+                                      <p:cBhvr>
+                                        <p:cTn id="43" dur="500"/>
+                                        <p:tgtEl>
+                                          <p:spTgt spid="3">
+                                            <p:txEl>
+                                              <p:pRg st="10" end="10"/>
+                                            </p:txEl>
+                                          </p:spTgt>
+                                        </p:tgtEl>
+                                      </p:cBhvr>
+                                    </p:animEffect>
+                                  </p:childTnLst>
+                                </p:cTn>
+                              </p:par>
+                            </p:childTnLst>
+                          </p:cTn>
+                        </p:par>
+                      </p:childTnLst>
+                    </p:cTn>
+                  </p:par>
+                </p:childTnLst>
+              </p:cTn>
+              <p:prevCondLst>
+                <p:cond evt="onPrev" delay="0">
+                  <p:tgtEl>
+                    <p:sldTgt/>
+                  </p:tgtEl>
+                </p:cond>
+              </p:prevCondLst>
+              <p:nextCondLst>
+                <p:cond evt="onNext" delay="0">
+                  <p:tgtEl>
+                    <p:sldTgt/>
+                  </p:tgtEl>
+                </p:cond>
+              </p:nextCondLst>
+            </p:seq>
+          </p:childTnLst>
+        </p:cTn>
+      </p:par>
+    </p:tnLst>
+    <p:bldLst>
+      <p:bldP spid="3" grpId="0" uiExpand="1" build="p"/>
+    </p:bldLst>
+  </p:timing>
+</p:sld>
+</file>
+
+<file path=ppt/slides/slide39.xml><?xml version="1.0" encoding="utf-8"?>
+<p:sld xmlns:a="http://schemas.openxmlformats.org/drawingml/2006/main" xmlns:r="http://schemas.openxmlformats.org/officeDocument/2006/relationships" xmlns:p="http://schemas.openxmlformats.org/presentationml/2006/main">
+  <p:cSld>
+    <p:spTree>
+      <p:nvGrpSpPr>
+        <p:cNvPr id="1" name=""/>
+        <p:cNvGrpSpPr/>
+        <p:nvPr/>
+      </p:nvGrpSpPr>
+      <p:grpSpPr>
+        <a:xfrm>
+          <a:off x="0" y="0"/>
+          <a:ext cx="0" cy="0"/>
+          <a:chOff x="0" y="0"/>
+          <a:chExt cx="0" cy="0"/>
+        </a:xfrm>
+      </p:grpSpPr>
+      <p:sp>
+        <p:nvSpPr>
+          <p:cNvPr id="2" name="Title 1">
+            <a:extLst>
+              <a:ext uri="{FF2B5EF4-FFF2-40B4-BE49-F238E27FC236}">
+                <a16:creationId xmlns:a16="http://schemas.microsoft.com/office/drawing/2014/main" id="{D65E478C-0FFE-90B4-2EE1-E82C9CCCD096}"/>
+              </a:ext>
+            </a:extLst>
+          </p:cNvPr>
+          <p:cNvSpPr>
+            <a:spLocks noGrp="1"/>
+          </p:cNvSpPr>
+          <p:nvPr>
+            <p:ph type="title"/>
+          </p:nvPr>
+        </p:nvSpPr>
+        <p:spPr/>
+        <p:txBody>
+          <a:bodyPr/>
+          <a:lstStyle/>
+          <a:p>
+            <a:r>
+              <a:rPr lang="en-US" dirty="0"/>
+              <a:t>Unit 7 – Resources and Styles</a:t>
+            </a:r>
+          </a:p>
+        </p:txBody>
+      </p:sp>
+      <p:sp>
+        <p:nvSpPr>
+          <p:cNvPr id="3" name="Content Placeholder 2">
+            <a:extLst>
+              <a:ext uri="{FF2B5EF4-FFF2-40B4-BE49-F238E27FC236}">
+                <a16:creationId xmlns:a16="http://schemas.microsoft.com/office/drawing/2014/main" id="{92D3E223-8041-23DB-76B6-4523BC8A5D57}"/>
+              </a:ext>
+            </a:extLst>
+          </p:cNvPr>
+          <p:cNvSpPr>
+            <a:spLocks noGrp="1"/>
+          </p:cNvSpPr>
+          <p:nvPr>
+            <p:ph idx="1"/>
+          </p:nvPr>
+        </p:nvSpPr>
+        <p:spPr/>
+        <p:txBody>
+          <a:bodyPr/>
+          <a:lstStyle/>
+          <a:p>
+            <a:r>
+              <a:rPr lang="en-US" dirty="0"/>
+              <a:t>Styles Based on Other Styles</a:t>
+            </a:r>
+          </a:p>
+          <a:p>
+            <a:pPr lvl="1"/>
+            <a:r>
+              <a:rPr lang="en-US" dirty="0"/>
+              <a:t>Style can inherit from another style using the </a:t>
+            </a:r>
+            <a:r>
+              <a:rPr lang="en-US" dirty="0" err="1"/>
+              <a:t>BasedOn</a:t>
+            </a:r>
+            <a:r>
+              <a:rPr lang="en-US" dirty="0"/>
+              <a:t> attribute</a:t>
+            </a:r>
+          </a:p>
+          <a:p>
+            <a:pPr lvl="1"/>
+            <a:r>
+              <a:rPr lang="en-US" dirty="0"/>
+              <a:t>Allows styles in different scopes--e.g. entire application, one window, portion of window</a:t>
+            </a:r>
+          </a:p>
+          <a:p>
+            <a:pPr lvl="1"/>
+            <a:r>
+              <a:rPr lang="en-US" dirty="0"/>
+              <a:t>This is quite common in production WPF applications</a:t>
+            </a:r>
+          </a:p>
+          <a:p>
+            <a:r>
+              <a:rPr lang="en-US" dirty="0">
+                <a:solidFill>
+                  <a:srgbClr val="00B050"/>
+                </a:solidFill>
+              </a:rPr>
+              <a:t>Example - </a:t>
+            </a:r>
+            <a:r>
+              <a:rPr lang="en-US" dirty="0" err="1">
+                <a:solidFill>
+                  <a:srgbClr val="00B050"/>
+                </a:solidFill>
+              </a:rPr>
+              <a:t>BasedOn</a:t>
+            </a:r>
+            <a:endParaRPr lang="en-US" dirty="0">
+              <a:solidFill>
+                <a:srgbClr val="00B050"/>
+              </a:solidFill>
+            </a:endParaRPr>
+          </a:p>
+        </p:txBody>
+      </p:sp>
+    </p:spTree>
+    <p:extLst>
+      <p:ext uri="{BB962C8B-B14F-4D97-AF65-F5344CB8AC3E}">
+        <p14:creationId xmlns:p14="http://schemas.microsoft.com/office/powerpoint/2010/main" val="2679255486"/>
+      </p:ext>
+    </p:extLst>
+  </p:cSld>
+  <p:clrMapOvr>
+    <a:masterClrMapping/>
+  </p:clrMapOvr>
+  <p:timing>
+    <p:tnLst>
+      <p:par>
+        <p:cTn id="1" dur="indefinite" restart="never" nodeType="tmRoot">
+          <p:childTnLst>
+            <p:seq concurrent="1" nextAc="seek">
+              <p:cTn id="2" dur="indefinite" nodeType="mainSeq">
+                <p:childTnLst>
+                  <p:par>
+                    <p:cTn id="3" fill="hold">
+                      <p:stCondLst>
+                        <p:cond delay="indefinite"/>
+                      </p:stCondLst>
+                      <p:childTnLst>
+                        <p:par>
+                          <p:cTn id="4" fill="hold">
+                            <p:stCondLst>
+                              <p:cond delay="0"/>
+                            </p:stCondLst>
+                            <p:childTnLst>
+                              <p:par>
+                                <p:cTn id="5" presetID="10" presetClass="entr" presetSubtype="0" fill="hold" grpId="0" nodeType="clickEffect">
+                                  <p:stCondLst>
+                                    <p:cond delay="0"/>
+                                  </p:stCondLst>
+                                  <p:childTnLst>
+                                    <p:set>
+                                      <p:cBhvr>
+                                        <p:cTn id="6" dur="1" fill="hold">
+                                          <p:stCondLst>
+                                            <p:cond delay="0"/>
+                                          </p:stCondLst>
+                                        </p:cTn>
+                                        <p:tgtEl>
+                                          <p:spTgt spid="3">
+                                            <p:txEl>
+                                              <p:pRg st="0" end="0"/>
+                                            </p:txEl>
+                                          </p:spTgt>
+                                        </p:tgtEl>
+                                        <p:attrNameLst>
+                                          <p:attrName>style.visibility</p:attrName>
+                                        </p:attrNameLst>
+                                      </p:cBhvr>
+                                      <p:to>
+                                        <p:strVal val="visible"/>
+                                      </p:to>
+                                    </p:set>
+                                    <p:animEffect transition="in" filter="fade">
+                                      <p:cBhvr>
+                                        <p:cTn id="7" dur="500"/>
+                                        <p:tgtEl>
+                                          <p:spTgt spid="3">
+                                            <p:txEl>
+                                              <p:pRg st="0" end="0"/>
+                                            </p:txEl>
+                                          </p:spTgt>
+                                        </p:tgtEl>
+                                      </p:cBhvr>
+                                    </p:animEffect>
+                                  </p:childTnLst>
+                                </p:cTn>
+                              </p:par>
+                              <p:par>
+                                <p:cTn id="8" presetID="10" presetClass="entr" presetSubtype="0" fill="hold" grpId="0" nodeType="withEffect">
+                                  <p:stCondLst>
+                                    <p:cond delay="0"/>
+                                  </p:stCondLst>
+                                  <p:childTnLst>
+                                    <p:set>
+                                      <p:cBhvr>
+                                        <p:cTn id="9" dur="1" fill="hold">
+                                          <p:stCondLst>
+                                            <p:cond delay="0"/>
+                                          </p:stCondLst>
+                                        </p:cTn>
+                                        <p:tgtEl>
+                                          <p:spTgt spid="3">
+                                            <p:txEl>
+                                              <p:pRg st="1" end="1"/>
+                                            </p:txEl>
+                                          </p:spTgt>
+                                        </p:tgtEl>
+                                        <p:attrNameLst>
+                                          <p:attrName>style.visibility</p:attrName>
+                                        </p:attrNameLst>
+                                      </p:cBhvr>
+                                      <p:to>
+                                        <p:strVal val="visible"/>
+                                      </p:to>
+                                    </p:set>
+                                    <p:animEffect transition="in" filter="fade">
+                                      <p:cBhvr>
+                                        <p:cTn id="10" dur="500"/>
+                                        <p:tgtEl>
+                                          <p:spTgt spid="3">
+                                            <p:txEl>
+                                              <p:pRg st="1" end="1"/>
+                                            </p:txEl>
+                                          </p:spTgt>
+                                        </p:tgtEl>
+                                      </p:cBhvr>
+                                    </p:animEffect>
+                                  </p:childTnLst>
+                                </p:cTn>
+                              </p:par>
+                              <p:par>
+                                <p:cTn id="11" presetID="10" presetClass="entr" presetSubtype="0" fill="hold" grpId="0" nodeType="withEffect">
+                                  <p:stCondLst>
+                                    <p:cond delay="0"/>
+                                  </p:stCondLst>
+                                  <p:childTnLst>
+                                    <p:set>
+                                      <p:cBhvr>
+                                        <p:cTn id="12" dur="1" fill="hold">
+                                          <p:stCondLst>
+                                            <p:cond delay="0"/>
+                                          </p:stCondLst>
+                                        </p:cTn>
+                                        <p:tgtEl>
+                                          <p:spTgt spid="3">
+                                            <p:txEl>
+                                              <p:pRg st="2" end="2"/>
+                                            </p:txEl>
+                                          </p:spTgt>
+                                        </p:tgtEl>
+                                        <p:attrNameLst>
+                                          <p:attrName>style.visibility</p:attrName>
+                                        </p:attrNameLst>
+                                      </p:cBhvr>
+                                      <p:to>
+                                        <p:strVal val="visible"/>
+                                      </p:to>
+                                    </p:set>
+                                    <p:animEffect transition="in" filter="fade">
+                                      <p:cBhvr>
+                                        <p:cTn id="13" dur="500"/>
+                                        <p:tgtEl>
+                                          <p:spTgt spid="3">
+                                            <p:txEl>
+                                              <p:pRg st="2" end="2"/>
+                                            </p:txEl>
+                                          </p:spTgt>
+                                        </p:tgtEl>
+                                      </p:cBhvr>
+                                    </p:animEffect>
+                                  </p:childTnLst>
+                                </p:cTn>
+                              </p:par>
+                              <p:par>
+                                <p:cTn id="14" presetID="10" presetClass="entr" presetSubtype="0" fill="hold" grpId="0" nodeType="withEffect">
+                                  <p:stCondLst>
+                                    <p:cond delay="0"/>
+                                  </p:stCondLst>
+                                  <p:childTnLst>
+                                    <p:set>
+                                      <p:cBhvr>
+                                        <p:cTn id="15" dur="1" fill="hold">
+                                          <p:stCondLst>
+                                            <p:cond delay="0"/>
+                                          </p:stCondLst>
+                                        </p:cTn>
+                                        <p:tgtEl>
+                                          <p:spTgt spid="3">
+                                            <p:txEl>
+                                              <p:pRg st="3" end="3"/>
+                                            </p:txEl>
+                                          </p:spTgt>
+                                        </p:tgtEl>
+                                        <p:attrNameLst>
+                                          <p:attrName>style.visibility</p:attrName>
+                                        </p:attrNameLst>
+                                      </p:cBhvr>
+                                      <p:to>
+                                        <p:strVal val="visible"/>
+                                      </p:to>
+                                    </p:set>
+                                    <p:animEffect transition="in" filter="fade">
+                                      <p:cBhvr>
+                                        <p:cTn id="16" dur="500"/>
+                                        <p:tgtEl>
+                                          <p:spTgt spid="3">
+                                            <p:txEl>
+                                              <p:pRg st="3" end="3"/>
+                                            </p:txEl>
+                                          </p:spTgt>
+                                        </p:tgtEl>
+                                      </p:cBhvr>
+                                    </p:animEffect>
+                                  </p:childTnLst>
+                                </p:cTn>
+                              </p:par>
+                            </p:childTnLst>
+                          </p:cTn>
+                        </p:par>
+                      </p:childTnLst>
+                    </p:cTn>
+                  </p:par>
+                  <p:par>
+                    <p:cTn id="17" fill="hold">
+                      <p:stCondLst>
+                        <p:cond delay="indefinite"/>
+                      </p:stCondLst>
+                      <p:childTnLst>
+                        <p:par>
+                          <p:cTn id="18" fill="hold">
+                            <p:stCondLst>
+                              <p:cond delay="0"/>
+                            </p:stCondLst>
+                            <p:childTnLst>
+                              <p:par>
+                                <p:cTn id="19" presetID="10" presetClass="entr" presetSubtype="0" fill="hold" grpId="0" nodeType="clickEffect">
+                                  <p:stCondLst>
+                                    <p:cond delay="0"/>
+                                  </p:stCondLst>
+                                  <p:childTnLst>
+                                    <p:set>
+                                      <p:cBhvr>
+                                        <p:cTn id="20" dur="1" fill="hold">
+                                          <p:stCondLst>
+                                            <p:cond delay="0"/>
+                                          </p:stCondLst>
+                                        </p:cTn>
+                                        <p:tgtEl>
+                                          <p:spTgt spid="3">
+                                            <p:txEl>
+                                              <p:pRg st="4" end="4"/>
+                                            </p:txEl>
+                                          </p:spTgt>
+                                        </p:tgtEl>
+                                        <p:attrNameLst>
+                                          <p:attrName>style.visibility</p:attrName>
+                                        </p:attrNameLst>
+                                      </p:cBhvr>
+                                      <p:to>
+                                        <p:strVal val="visible"/>
+                                      </p:to>
+                                    </p:set>
+                                    <p:animEffect transition="in" filter="fade">
+                                      <p:cBhvr>
+                                        <p:cTn id="21" dur="500"/>
+                                        <p:tgtEl>
+                                          <p:spTgt spid="3">
+                                            <p:txEl>
+                                              <p:pRg st="4" end="4"/>
+                                            </p:txEl>
+                                          </p:spTgt>
+                                        </p:tgtEl>
+                                      </p:cBhvr>
+                                    </p:animEffect>
+                                  </p:childTnLst>
+                                </p:cTn>
+                              </p:par>
+                            </p:childTnLst>
+                          </p:cTn>
+                        </p:par>
+                      </p:childTnLst>
+                    </p:cTn>
+                  </p:par>
+                </p:childTnLst>
+              </p:cTn>
+              <p:prevCondLst>
+                <p:cond evt="onPrev" delay="0">
+                  <p:tgtEl>
+                    <p:sldTgt/>
+                  </p:tgtEl>
+                </p:cond>
+              </p:prevCondLst>
+              <p:nextCondLst>
+                <p:cond evt="onNext" delay="0">
+                  <p:tgtEl>
+                    <p:sldTgt/>
+                  </p:tgtEl>
+                </p:cond>
+              </p:nextCondLst>
+            </p:seq>
+          </p:childTnLst>
+        </p:cTn>
+      </p:par>
+    </p:tnLst>
+    <p:bldLst>
+      <p:bldP spid="3" grpId="0" uiExpand="1" build="p"/>
+    </p:bldLst>
+  </p:timing>
+</p:sld>
+</file>
+
 <file path=ppt/slides/slide4.xml><?xml version="1.0" encoding="utf-8"?>
 <p:sld xmlns:a="http://schemas.openxmlformats.org/drawingml/2006/main" xmlns:r="http://schemas.openxmlformats.org/officeDocument/2006/relationships" xmlns:p="http://schemas.openxmlformats.org/presentationml/2006/main">
   <p:cSld>
@@ -25406,6 +28273,758 @@
       <p:bldP spid="3" grpId="0" uiExpand="1" build="p"/>
     </p:bldLst>
   </p:timing>
+</p:sld>
+</file>
+
+<file path=ppt/slides/slide40.xml><?xml version="1.0" encoding="utf-8"?>
+<p:sld xmlns:a="http://schemas.openxmlformats.org/drawingml/2006/main" xmlns:r="http://schemas.openxmlformats.org/officeDocument/2006/relationships" xmlns:p="http://schemas.openxmlformats.org/presentationml/2006/main">
+  <p:cSld>
+    <p:spTree>
+      <p:nvGrpSpPr>
+        <p:cNvPr id="1" name=""/>
+        <p:cNvGrpSpPr/>
+        <p:nvPr/>
+      </p:nvGrpSpPr>
+      <p:grpSpPr>
+        <a:xfrm>
+          <a:off x="0" y="0"/>
+          <a:ext cx="0" cy="0"/>
+          <a:chOff x="0" y="0"/>
+          <a:chExt cx="0" cy="0"/>
+        </a:xfrm>
+      </p:grpSpPr>
+      <p:sp>
+        <p:nvSpPr>
+          <p:cNvPr id="2" name="Title 1">
+            <a:extLst>
+              <a:ext uri="{FF2B5EF4-FFF2-40B4-BE49-F238E27FC236}">
+                <a16:creationId xmlns:a16="http://schemas.microsoft.com/office/drawing/2014/main" id="{91CE4F80-854E-39EE-765C-52A051738EDE}"/>
+              </a:ext>
+            </a:extLst>
+          </p:cNvPr>
+          <p:cNvSpPr>
+            <a:spLocks noGrp="1"/>
+          </p:cNvSpPr>
+          <p:nvPr>
+            <p:ph type="title"/>
+          </p:nvPr>
+        </p:nvSpPr>
+        <p:spPr/>
+        <p:txBody>
+          <a:bodyPr/>
+          <a:lstStyle/>
+          <a:p>
+            <a:r>
+              <a:rPr lang="en-US" dirty="0"/>
+              <a:t>Unit 7 – Resources and Styles</a:t>
+            </a:r>
+          </a:p>
+        </p:txBody>
+      </p:sp>
+      <p:sp>
+        <p:nvSpPr>
+          <p:cNvPr id="3" name="Content Placeholder 2">
+            <a:extLst>
+              <a:ext uri="{FF2B5EF4-FFF2-40B4-BE49-F238E27FC236}">
+                <a16:creationId xmlns:a16="http://schemas.microsoft.com/office/drawing/2014/main" id="{ECFE8794-34DF-2386-CA8A-DAF29F17FA52}"/>
+              </a:ext>
+            </a:extLst>
+          </p:cNvPr>
+          <p:cNvSpPr>
+            <a:spLocks noGrp="1"/>
+          </p:cNvSpPr>
+          <p:nvPr>
+            <p:ph idx="1"/>
+          </p:nvPr>
+        </p:nvSpPr>
+        <p:spPr/>
+        <p:txBody>
+          <a:bodyPr/>
+          <a:lstStyle/>
+          <a:p>
+            <a:r>
+              <a:rPr lang="en-US" dirty="0"/>
+              <a:t>Default Styles</a:t>
+            </a:r>
+          </a:p>
+          <a:p>
+            <a:pPr lvl="1"/>
+            <a:r>
+              <a:rPr lang="en-US" dirty="0"/>
+              <a:t>Define a style that automatically applies to all elements of a given type</a:t>
+            </a:r>
+          </a:p>
+          <a:p>
+            <a:pPr lvl="1"/>
+            <a:r>
+              <a:rPr lang="en-US" dirty="0"/>
+              <a:t>Default style has a type but no name</a:t>
+            </a:r>
+          </a:p>
+          <a:p>
+            <a:pPr lvl="1"/>
+            <a:r>
+              <a:rPr lang="en-US" dirty="0"/>
+              <a:t>Element does not need to reference the style</a:t>
+            </a:r>
+          </a:p>
+          <a:p>
+            <a:r>
+              <a:rPr lang="en-US" dirty="0"/>
+              <a:t>Property Value Precedence</a:t>
+            </a:r>
+          </a:p>
+          <a:p>
+            <a:pPr lvl="1"/>
+            <a:r>
+              <a:rPr lang="en-US" dirty="0"/>
+              <a:t>Property values in named styles override default property values -- normal default or from default style</a:t>
+            </a:r>
+          </a:p>
+          <a:p>
+            <a:pPr lvl="1"/>
+            <a:r>
+              <a:rPr lang="en-US" dirty="0"/>
+              <a:t>Property values in element override values in a style</a:t>
+            </a:r>
+          </a:p>
+          <a:p>
+            <a:pPr lvl="1"/>
+            <a:r>
+              <a:rPr lang="en-US" dirty="0"/>
+              <a:t>There's a fairly complicated chain of precedence</a:t>
+            </a:r>
+          </a:p>
+          <a:p>
+            <a:r>
+              <a:rPr lang="en-US" dirty="0">
+                <a:solidFill>
+                  <a:srgbClr val="00B050"/>
+                </a:solidFill>
+              </a:rPr>
+              <a:t>Example – Default Style</a:t>
+            </a:r>
+          </a:p>
+        </p:txBody>
+      </p:sp>
+    </p:spTree>
+    <p:extLst>
+      <p:ext uri="{BB962C8B-B14F-4D97-AF65-F5344CB8AC3E}">
+        <p14:creationId xmlns:p14="http://schemas.microsoft.com/office/powerpoint/2010/main" val="1498630836"/>
+      </p:ext>
+    </p:extLst>
+  </p:cSld>
+  <p:clrMapOvr>
+    <a:masterClrMapping/>
+  </p:clrMapOvr>
+  <p:timing>
+    <p:tnLst>
+      <p:par>
+        <p:cTn id="1" dur="indefinite" restart="never" nodeType="tmRoot">
+          <p:childTnLst>
+            <p:seq concurrent="1" nextAc="seek">
+              <p:cTn id="2" dur="indefinite" nodeType="mainSeq">
+                <p:childTnLst>
+                  <p:par>
+                    <p:cTn id="3" fill="hold">
+                      <p:stCondLst>
+                        <p:cond delay="indefinite"/>
+                      </p:stCondLst>
+                      <p:childTnLst>
+                        <p:par>
+                          <p:cTn id="4" fill="hold">
+                            <p:stCondLst>
+                              <p:cond delay="0"/>
+                            </p:stCondLst>
+                            <p:childTnLst>
+                              <p:par>
+                                <p:cTn id="5" presetID="10" presetClass="entr" presetSubtype="0" fill="hold" grpId="0" nodeType="clickEffect">
+                                  <p:stCondLst>
+                                    <p:cond delay="0"/>
+                                  </p:stCondLst>
+                                  <p:childTnLst>
+                                    <p:set>
+                                      <p:cBhvr>
+                                        <p:cTn id="6" dur="1" fill="hold">
+                                          <p:stCondLst>
+                                            <p:cond delay="0"/>
+                                          </p:stCondLst>
+                                        </p:cTn>
+                                        <p:tgtEl>
+                                          <p:spTgt spid="3">
+                                            <p:txEl>
+                                              <p:pRg st="0" end="0"/>
+                                            </p:txEl>
+                                          </p:spTgt>
+                                        </p:tgtEl>
+                                        <p:attrNameLst>
+                                          <p:attrName>style.visibility</p:attrName>
+                                        </p:attrNameLst>
+                                      </p:cBhvr>
+                                      <p:to>
+                                        <p:strVal val="visible"/>
+                                      </p:to>
+                                    </p:set>
+                                    <p:animEffect transition="in" filter="fade">
+                                      <p:cBhvr>
+                                        <p:cTn id="7" dur="500"/>
+                                        <p:tgtEl>
+                                          <p:spTgt spid="3">
+                                            <p:txEl>
+                                              <p:pRg st="0" end="0"/>
+                                            </p:txEl>
+                                          </p:spTgt>
+                                        </p:tgtEl>
+                                      </p:cBhvr>
+                                    </p:animEffect>
+                                  </p:childTnLst>
+                                </p:cTn>
+                              </p:par>
+                              <p:par>
+                                <p:cTn id="8" presetID="10" presetClass="entr" presetSubtype="0" fill="hold" grpId="0" nodeType="withEffect">
+                                  <p:stCondLst>
+                                    <p:cond delay="0"/>
+                                  </p:stCondLst>
+                                  <p:childTnLst>
+                                    <p:set>
+                                      <p:cBhvr>
+                                        <p:cTn id="9" dur="1" fill="hold">
+                                          <p:stCondLst>
+                                            <p:cond delay="0"/>
+                                          </p:stCondLst>
+                                        </p:cTn>
+                                        <p:tgtEl>
+                                          <p:spTgt spid="3">
+                                            <p:txEl>
+                                              <p:pRg st="1" end="1"/>
+                                            </p:txEl>
+                                          </p:spTgt>
+                                        </p:tgtEl>
+                                        <p:attrNameLst>
+                                          <p:attrName>style.visibility</p:attrName>
+                                        </p:attrNameLst>
+                                      </p:cBhvr>
+                                      <p:to>
+                                        <p:strVal val="visible"/>
+                                      </p:to>
+                                    </p:set>
+                                    <p:animEffect transition="in" filter="fade">
+                                      <p:cBhvr>
+                                        <p:cTn id="10" dur="500"/>
+                                        <p:tgtEl>
+                                          <p:spTgt spid="3">
+                                            <p:txEl>
+                                              <p:pRg st="1" end="1"/>
+                                            </p:txEl>
+                                          </p:spTgt>
+                                        </p:tgtEl>
+                                      </p:cBhvr>
+                                    </p:animEffect>
+                                  </p:childTnLst>
+                                </p:cTn>
+                              </p:par>
+                              <p:par>
+                                <p:cTn id="11" presetID="10" presetClass="entr" presetSubtype="0" fill="hold" grpId="0" nodeType="withEffect">
+                                  <p:stCondLst>
+                                    <p:cond delay="0"/>
+                                  </p:stCondLst>
+                                  <p:childTnLst>
+                                    <p:set>
+                                      <p:cBhvr>
+                                        <p:cTn id="12" dur="1" fill="hold">
+                                          <p:stCondLst>
+                                            <p:cond delay="0"/>
+                                          </p:stCondLst>
+                                        </p:cTn>
+                                        <p:tgtEl>
+                                          <p:spTgt spid="3">
+                                            <p:txEl>
+                                              <p:pRg st="2" end="2"/>
+                                            </p:txEl>
+                                          </p:spTgt>
+                                        </p:tgtEl>
+                                        <p:attrNameLst>
+                                          <p:attrName>style.visibility</p:attrName>
+                                        </p:attrNameLst>
+                                      </p:cBhvr>
+                                      <p:to>
+                                        <p:strVal val="visible"/>
+                                      </p:to>
+                                    </p:set>
+                                    <p:animEffect transition="in" filter="fade">
+                                      <p:cBhvr>
+                                        <p:cTn id="13" dur="500"/>
+                                        <p:tgtEl>
+                                          <p:spTgt spid="3">
+                                            <p:txEl>
+                                              <p:pRg st="2" end="2"/>
+                                            </p:txEl>
+                                          </p:spTgt>
+                                        </p:tgtEl>
+                                      </p:cBhvr>
+                                    </p:animEffect>
+                                  </p:childTnLst>
+                                </p:cTn>
+                              </p:par>
+                              <p:par>
+                                <p:cTn id="14" presetID="10" presetClass="entr" presetSubtype="0" fill="hold" grpId="0" nodeType="withEffect">
+                                  <p:stCondLst>
+                                    <p:cond delay="0"/>
+                                  </p:stCondLst>
+                                  <p:childTnLst>
+                                    <p:set>
+                                      <p:cBhvr>
+                                        <p:cTn id="15" dur="1" fill="hold">
+                                          <p:stCondLst>
+                                            <p:cond delay="0"/>
+                                          </p:stCondLst>
+                                        </p:cTn>
+                                        <p:tgtEl>
+                                          <p:spTgt spid="3">
+                                            <p:txEl>
+                                              <p:pRg st="3" end="3"/>
+                                            </p:txEl>
+                                          </p:spTgt>
+                                        </p:tgtEl>
+                                        <p:attrNameLst>
+                                          <p:attrName>style.visibility</p:attrName>
+                                        </p:attrNameLst>
+                                      </p:cBhvr>
+                                      <p:to>
+                                        <p:strVal val="visible"/>
+                                      </p:to>
+                                    </p:set>
+                                    <p:animEffect transition="in" filter="fade">
+                                      <p:cBhvr>
+                                        <p:cTn id="16" dur="500"/>
+                                        <p:tgtEl>
+                                          <p:spTgt spid="3">
+                                            <p:txEl>
+                                              <p:pRg st="3" end="3"/>
+                                            </p:txEl>
+                                          </p:spTgt>
+                                        </p:tgtEl>
+                                      </p:cBhvr>
+                                    </p:animEffect>
+                                  </p:childTnLst>
+                                </p:cTn>
+                              </p:par>
+                            </p:childTnLst>
+                          </p:cTn>
+                        </p:par>
+                      </p:childTnLst>
+                    </p:cTn>
+                  </p:par>
+                  <p:par>
+                    <p:cTn id="17" fill="hold">
+                      <p:stCondLst>
+                        <p:cond delay="indefinite"/>
+                      </p:stCondLst>
+                      <p:childTnLst>
+                        <p:par>
+                          <p:cTn id="18" fill="hold">
+                            <p:stCondLst>
+                              <p:cond delay="0"/>
+                            </p:stCondLst>
+                            <p:childTnLst>
+                              <p:par>
+                                <p:cTn id="19" presetID="10" presetClass="entr" presetSubtype="0" fill="hold" grpId="0" nodeType="clickEffect">
+                                  <p:stCondLst>
+                                    <p:cond delay="0"/>
+                                  </p:stCondLst>
+                                  <p:childTnLst>
+                                    <p:set>
+                                      <p:cBhvr>
+                                        <p:cTn id="20" dur="1" fill="hold">
+                                          <p:stCondLst>
+                                            <p:cond delay="0"/>
+                                          </p:stCondLst>
+                                        </p:cTn>
+                                        <p:tgtEl>
+                                          <p:spTgt spid="3">
+                                            <p:txEl>
+                                              <p:pRg st="4" end="4"/>
+                                            </p:txEl>
+                                          </p:spTgt>
+                                        </p:tgtEl>
+                                        <p:attrNameLst>
+                                          <p:attrName>style.visibility</p:attrName>
+                                        </p:attrNameLst>
+                                      </p:cBhvr>
+                                      <p:to>
+                                        <p:strVal val="visible"/>
+                                      </p:to>
+                                    </p:set>
+                                    <p:animEffect transition="in" filter="fade">
+                                      <p:cBhvr>
+                                        <p:cTn id="21" dur="500"/>
+                                        <p:tgtEl>
+                                          <p:spTgt spid="3">
+                                            <p:txEl>
+                                              <p:pRg st="4" end="4"/>
+                                            </p:txEl>
+                                          </p:spTgt>
+                                        </p:tgtEl>
+                                      </p:cBhvr>
+                                    </p:animEffect>
+                                  </p:childTnLst>
+                                </p:cTn>
+                              </p:par>
+                              <p:par>
+                                <p:cTn id="22" presetID="10" presetClass="entr" presetSubtype="0" fill="hold" grpId="0" nodeType="withEffect">
+                                  <p:stCondLst>
+                                    <p:cond delay="0"/>
+                                  </p:stCondLst>
+                                  <p:childTnLst>
+                                    <p:set>
+                                      <p:cBhvr>
+                                        <p:cTn id="23" dur="1" fill="hold">
+                                          <p:stCondLst>
+                                            <p:cond delay="0"/>
+                                          </p:stCondLst>
+                                        </p:cTn>
+                                        <p:tgtEl>
+                                          <p:spTgt spid="3">
+                                            <p:txEl>
+                                              <p:pRg st="5" end="5"/>
+                                            </p:txEl>
+                                          </p:spTgt>
+                                        </p:tgtEl>
+                                        <p:attrNameLst>
+                                          <p:attrName>style.visibility</p:attrName>
+                                        </p:attrNameLst>
+                                      </p:cBhvr>
+                                      <p:to>
+                                        <p:strVal val="visible"/>
+                                      </p:to>
+                                    </p:set>
+                                    <p:animEffect transition="in" filter="fade">
+                                      <p:cBhvr>
+                                        <p:cTn id="24" dur="500"/>
+                                        <p:tgtEl>
+                                          <p:spTgt spid="3">
+                                            <p:txEl>
+                                              <p:pRg st="5" end="5"/>
+                                            </p:txEl>
+                                          </p:spTgt>
+                                        </p:tgtEl>
+                                      </p:cBhvr>
+                                    </p:animEffect>
+                                  </p:childTnLst>
+                                </p:cTn>
+                              </p:par>
+                              <p:par>
+                                <p:cTn id="25" presetID="10" presetClass="entr" presetSubtype="0" fill="hold" grpId="0" nodeType="withEffect">
+                                  <p:stCondLst>
+                                    <p:cond delay="0"/>
+                                  </p:stCondLst>
+                                  <p:childTnLst>
+                                    <p:set>
+                                      <p:cBhvr>
+                                        <p:cTn id="26" dur="1" fill="hold">
+                                          <p:stCondLst>
+                                            <p:cond delay="0"/>
+                                          </p:stCondLst>
+                                        </p:cTn>
+                                        <p:tgtEl>
+                                          <p:spTgt spid="3">
+                                            <p:txEl>
+                                              <p:pRg st="6" end="6"/>
+                                            </p:txEl>
+                                          </p:spTgt>
+                                        </p:tgtEl>
+                                        <p:attrNameLst>
+                                          <p:attrName>style.visibility</p:attrName>
+                                        </p:attrNameLst>
+                                      </p:cBhvr>
+                                      <p:to>
+                                        <p:strVal val="visible"/>
+                                      </p:to>
+                                    </p:set>
+                                    <p:animEffect transition="in" filter="fade">
+                                      <p:cBhvr>
+                                        <p:cTn id="27" dur="500"/>
+                                        <p:tgtEl>
+                                          <p:spTgt spid="3">
+                                            <p:txEl>
+                                              <p:pRg st="6" end="6"/>
+                                            </p:txEl>
+                                          </p:spTgt>
+                                        </p:tgtEl>
+                                      </p:cBhvr>
+                                    </p:animEffect>
+                                  </p:childTnLst>
+                                </p:cTn>
+                              </p:par>
+                              <p:par>
+                                <p:cTn id="28" presetID="10" presetClass="entr" presetSubtype="0" fill="hold" grpId="0" nodeType="withEffect">
+                                  <p:stCondLst>
+                                    <p:cond delay="0"/>
+                                  </p:stCondLst>
+                                  <p:childTnLst>
+                                    <p:set>
+                                      <p:cBhvr>
+                                        <p:cTn id="29" dur="1" fill="hold">
+                                          <p:stCondLst>
+                                            <p:cond delay="0"/>
+                                          </p:stCondLst>
+                                        </p:cTn>
+                                        <p:tgtEl>
+                                          <p:spTgt spid="3">
+                                            <p:txEl>
+                                              <p:pRg st="7" end="7"/>
+                                            </p:txEl>
+                                          </p:spTgt>
+                                        </p:tgtEl>
+                                        <p:attrNameLst>
+                                          <p:attrName>style.visibility</p:attrName>
+                                        </p:attrNameLst>
+                                      </p:cBhvr>
+                                      <p:to>
+                                        <p:strVal val="visible"/>
+                                      </p:to>
+                                    </p:set>
+                                    <p:animEffect transition="in" filter="fade">
+                                      <p:cBhvr>
+                                        <p:cTn id="30" dur="500"/>
+                                        <p:tgtEl>
+                                          <p:spTgt spid="3">
+                                            <p:txEl>
+                                              <p:pRg st="7" end="7"/>
+                                            </p:txEl>
+                                          </p:spTgt>
+                                        </p:tgtEl>
+                                      </p:cBhvr>
+                                    </p:animEffect>
+                                  </p:childTnLst>
+                                </p:cTn>
+                              </p:par>
+                            </p:childTnLst>
+                          </p:cTn>
+                        </p:par>
+                      </p:childTnLst>
+                    </p:cTn>
+                  </p:par>
+                  <p:par>
+                    <p:cTn id="31" fill="hold">
+                      <p:stCondLst>
+                        <p:cond delay="indefinite"/>
+                      </p:stCondLst>
+                      <p:childTnLst>
+                        <p:par>
+                          <p:cTn id="32" fill="hold">
+                            <p:stCondLst>
+                              <p:cond delay="0"/>
+                            </p:stCondLst>
+                            <p:childTnLst>
+                              <p:par>
+                                <p:cTn id="33" presetID="10" presetClass="entr" presetSubtype="0" fill="hold" grpId="0" nodeType="clickEffect">
+                                  <p:stCondLst>
+                                    <p:cond delay="0"/>
+                                  </p:stCondLst>
+                                  <p:childTnLst>
+                                    <p:set>
+                                      <p:cBhvr>
+                                        <p:cTn id="34" dur="1" fill="hold">
+                                          <p:stCondLst>
+                                            <p:cond delay="0"/>
+                                          </p:stCondLst>
+                                        </p:cTn>
+                                        <p:tgtEl>
+                                          <p:spTgt spid="3">
+                                            <p:txEl>
+                                              <p:pRg st="8" end="8"/>
+                                            </p:txEl>
+                                          </p:spTgt>
+                                        </p:tgtEl>
+                                        <p:attrNameLst>
+                                          <p:attrName>style.visibility</p:attrName>
+                                        </p:attrNameLst>
+                                      </p:cBhvr>
+                                      <p:to>
+                                        <p:strVal val="visible"/>
+                                      </p:to>
+                                    </p:set>
+                                    <p:animEffect transition="in" filter="fade">
+                                      <p:cBhvr>
+                                        <p:cTn id="35" dur="500"/>
+                                        <p:tgtEl>
+                                          <p:spTgt spid="3">
+                                            <p:txEl>
+                                              <p:pRg st="8" end="8"/>
+                                            </p:txEl>
+                                          </p:spTgt>
+                                        </p:tgtEl>
+                                      </p:cBhvr>
+                                    </p:animEffect>
+                                  </p:childTnLst>
+                                </p:cTn>
+                              </p:par>
+                            </p:childTnLst>
+                          </p:cTn>
+                        </p:par>
+                      </p:childTnLst>
+                    </p:cTn>
+                  </p:par>
+                </p:childTnLst>
+              </p:cTn>
+              <p:prevCondLst>
+                <p:cond evt="onPrev" delay="0">
+                  <p:tgtEl>
+                    <p:sldTgt/>
+                  </p:tgtEl>
+                </p:cond>
+              </p:prevCondLst>
+              <p:nextCondLst>
+                <p:cond evt="onNext" delay="0">
+                  <p:tgtEl>
+                    <p:sldTgt/>
+                  </p:tgtEl>
+                </p:cond>
+              </p:nextCondLst>
+            </p:seq>
+          </p:childTnLst>
+        </p:cTn>
+      </p:par>
+    </p:tnLst>
+    <p:bldLst>
+      <p:bldP spid="3" grpId="0" uiExpand="1" build="p"/>
+    </p:bldLst>
+  </p:timing>
+</p:sld>
+</file>
+
+<file path=ppt/slides/slide41.xml><?xml version="1.0" encoding="utf-8"?>
+<p:sld xmlns:a="http://schemas.openxmlformats.org/drawingml/2006/main" xmlns:r="http://schemas.openxmlformats.org/officeDocument/2006/relationships" xmlns:p="http://schemas.openxmlformats.org/presentationml/2006/main">
+  <p:cSld>
+    <p:spTree>
+      <p:nvGrpSpPr>
+        <p:cNvPr id="1" name=""/>
+        <p:cNvGrpSpPr/>
+        <p:nvPr/>
+      </p:nvGrpSpPr>
+      <p:grpSpPr>
+        <a:xfrm>
+          <a:off x="0" y="0"/>
+          <a:ext cx="0" cy="0"/>
+          <a:chOff x="0" y="0"/>
+          <a:chExt cx="0" cy="0"/>
+        </a:xfrm>
+      </p:grpSpPr>
+      <p:sp>
+        <p:nvSpPr>
+          <p:cNvPr id="2" name="Title 1">
+            <a:extLst>
+              <a:ext uri="{FF2B5EF4-FFF2-40B4-BE49-F238E27FC236}">
+                <a16:creationId xmlns:a16="http://schemas.microsoft.com/office/drawing/2014/main" id="{6C36D941-AA42-DC86-19B7-C1507297E0AC}"/>
+              </a:ext>
+            </a:extLst>
+          </p:cNvPr>
+          <p:cNvSpPr>
+            <a:spLocks noGrp="1"/>
+          </p:cNvSpPr>
+          <p:nvPr>
+            <p:ph type="title"/>
+          </p:nvPr>
+        </p:nvSpPr>
+        <p:spPr/>
+        <p:txBody>
+          <a:bodyPr/>
+          <a:lstStyle/>
+          <a:p>
+            <a:r>
+              <a:rPr lang="en-US" dirty="0"/>
+              <a:t>Exercise 7 – Resources and Styles</a:t>
+            </a:r>
+          </a:p>
+        </p:txBody>
+      </p:sp>
+      <p:sp>
+        <p:nvSpPr>
+          <p:cNvPr id="3" name="Content Placeholder 2">
+            <a:extLst>
+              <a:ext uri="{FF2B5EF4-FFF2-40B4-BE49-F238E27FC236}">
+                <a16:creationId xmlns:a16="http://schemas.microsoft.com/office/drawing/2014/main" id="{B4616C01-73B6-CF87-0BE9-66AE1B6B5E13}"/>
+              </a:ext>
+            </a:extLst>
+          </p:cNvPr>
+          <p:cNvSpPr>
+            <a:spLocks noGrp="1"/>
+          </p:cNvSpPr>
+          <p:nvPr>
+            <p:ph idx="1"/>
+          </p:nvPr>
+        </p:nvSpPr>
+        <p:spPr/>
+        <p:txBody>
+          <a:bodyPr/>
+          <a:lstStyle/>
+          <a:p>
+            <a:r>
+              <a:rPr lang="en-US" dirty="0"/>
+              <a:t>What You’ll Learn</a:t>
+            </a:r>
+          </a:p>
+          <a:p>
+            <a:pPr lvl="1"/>
+            <a:r>
+              <a:rPr lang="en-US" dirty="0"/>
+              <a:t>How to define and use a static resource</a:t>
+            </a:r>
+          </a:p>
+          <a:p>
+            <a:pPr lvl="1"/>
+            <a:r>
+              <a:rPr lang="en-US" dirty="0"/>
+              <a:t>How to define and use a style</a:t>
+            </a:r>
+          </a:p>
+          <a:p>
+            <a:r>
+              <a:rPr lang="en-US" dirty="0"/>
+              <a:t>Exercise</a:t>
+            </a:r>
+          </a:p>
+          <a:p>
+            <a:pPr lvl="1"/>
+            <a:r>
+              <a:rPr lang="en-US" dirty="0"/>
+              <a:t>Create a new project</a:t>
+            </a:r>
+          </a:p>
+          <a:p>
+            <a:pPr lvl="1"/>
+            <a:r>
+              <a:rPr lang="en-US" dirty="0"/>
+              <a:t>Part 1 - Create and use a Resource</a:t>
+            </a:r>
+          </a:p>
+          <a:p>
+            <a:pPr lvl="1"/>
+            <a:r>
+              <a:rPr lang="en-US" dirty="0"/>
+              <a:t>Part 2 - Define and use a Style</a:t>
+            </a:r>
+          </a:p>
+          <a:p>
+            <a:pPr lvl="1"/>
+            <a:r>
+              <a:rPr lang="en-US" dirty="0"/>
+              <a:t>Part 3 - Create a Default Style</a:t>
+            </a:r>
+          </a:p>
+        </p:txBody>
+      </p:sp>
+    </p:spTree>
+    <p:extLst>
+      <p:ext uri="{BB962C8B-B14F-4D97-AF65-F5344CB8AC3E}">
+        <p14:creationId xmlns:p14="http://schemas.microsoft.com/office/powerpoint/2010/main" val="430974822"/>
+      </p:ext>
+    </p:extLst>
+  </p:cSld>
+  <p:clrMapOvr>
+    <a:masterClrMapping/>
+  </p:clrMapOvr>
 </p:sld>
 </file>
 

</xml_diff>

<commit_message>
Content thru Unit 8
</commit_message>
<xml_diff>
--- a/WPF-Workshop-Sexton-Oct2023.pptx
+++ b/WPF-Workshop-Sexton-Oct2023.pptx
@@ -5,7 +5,7 @@
     <p:sldMasterId id="2147483896" r:id="rId1"/>
   </p:sldMasterIdLst>
   <p:notesMasterIdLst>
-    <p:notesMasterId r:id="rId43"/>
+    <p:notesMasterId r:id="rId51"/>
   </p:notesMasterIdLst>
   <p:sldIdLst>
     <p:sldId id="256" r:id="rId2"/>
@@ -49,6 +49,14 @@
     <p:sldId id="295" r:id="rId40"/>
     <p:sldId id="296" r:id="rId41"/>
     <p:sldId id="297" r:id="rId42"/>
+    <p:sldId id="298" r:id="rId43"/>
+    <p:sldId id="299" r:id="rId44"/>
+    <p:sldId id="300" r:id="rId45"/>
+    <p:sldId id="301" r:id="rId46"/>
+    <p:sldId id="302" r:id="rId47"/>
+    <p:sldId id="303" r:id="rId48"/>
+    <p:sldId id="304" r:id="rId49"/>
+    <p:sldId id="305" r:id="rId50"/>
   </p:sldIdLst>
   <p:sldSz cx="12192000" cy="6858000"/>
   <p:notesSz cx="6858000" cy="9144000"/>
@@ -3699,6 +3707,90 @@
     <p:extLst>
       <p:ext uri="{BB962C8B-B14F-4D97-AF65-F5344CB8AC3E}">
         <p14:creationId xmlns:p14="http://schemas.microsoft.com/office/powerpoint/2010/main" val="905484214"/>
+      </p:ext>
+    </p:extLst>
+  </p:cSld>
+  <p:clrMapOvr>
+    <a:masterClrMapping/>
+  </p:clrMapOvr>
+</p:notes>
+</file>
+
+<file path=ppt/notesSlides/notesSlide37.xml><?xml version="1.0" encoding="utf-8"?>
+<p:notes xmlns:a="http://schemas.openxmlformats.org/drawingml/2006/main" xmlns:r="http://schemas.openxmlformats.org/officeDocument/2006/relationships" xmlns:p="http://schemas.openxmlformats.org/presentationml/2006/main">
+  <p:cSld>
+    <p:spTree>
+      <p:nvGrpSpPr>
+        <p:cNvPr id="1" name=""/>
+        <p:cNvGrpSpPr/>
+        <p:nvPr/>
+      </p:nvGrpSpPr>
+      <p:grpSpPr>
+        <a:xfrm>
+          <a:off x="0" y="0"/>
+          <a:ext cx="0" cy="0"/>
+          <a:chOff x="0" y="0"/>
+          <a:chExt cx="0" cy="0"/>
+        </a:xfrm>
+      </p:grpSpPr>
+      <p:sp>
+        <p:nvSpPr>
+          <p:cNvPr id="2" name="Slide Image Placeholder 1"/>
+          <p:cNvSpPr>
+            <a:spLocks noGrp="1" noRot="1" noChangeAspect="1"/>
+          </p:cNvSpPr>
+          <p:nvPr>
+            <p:ph type="sldImg"/>
+          </p:nvPr>
+        </p:nvSpPr>
+        <p:spPr/>
+      </p:sp>
+      <p:sp>
+        <p:nvSpPr>
+          <p:cNvPr id="3" name="Notes Placeholder 2"/>
+          <p:cNvSpPr>
+            <a:spLocks noGrp="1"/>
+          </p:cNvSpPr>
+          <p:nvPr>
+            <p:ph type="body" idx="1"/>
+          </p:nvPr>
+        </p:nvSpPr>
+        <p:spPr/>
+        <p:txBody>
+          <a:bodyPr/>
+          <a:lstStyle/>
+          <a:p>
+            <a:endParaRPr lang="en-US" dirty="0"/>
+          </a:p>
+        </p:txBody>
+      </p:sp>
+      <p:sp>
+        <p:nvSpPr>
+          <p:cNvPr id="4" name="Slide Number Placeholder 3"/>
+          <p:cNvSpPr>
+            <a:spLocks noGrp="1"/>
+          </p:cNvSpPr>
+          <p:nvPr>
+            <p:ph type="sldNum" sz="quarter" idx="5"/>
+          </p:nvPr>
+        </p:nvSpPr>
+        <p:spPr/>
+        <p:txBody>
+          <a:bodyPr/>
+          <a:lstStyle/>
+          <a:p>
+            <a:fld id="{52D86A8A-0D3B-4DD1-BCA4-15D29761E8A6}" type="slidenum">
+              <a:rPr lang="en-US" smtClean="0"/>
+              <a:t>45</a:t>
+            </a:fld>
+            <a:endParaRPr lang="en-US"/>
+          </a:p>
+        </p:txBody>
+      </p:sp>
+    </p:spTree>
+    <p:extLst>
+      <p:ext uri="{BB962C8B-B14F-4D97-AF65-F5344CB8AC3E}">
+        <p14:creationId xmlns:p14="http://schemas.microsoft.com/office/powerpoint/2010/main" val="162492078"/>
       </p:ext>
     </p:extLst>
   </p:cSld>
@@ -28933,8 +29025,18 @@
           <a:lstStyle/>
           <a:p>
             <a:r>
-              <a:rPr lang="en-US" dirty="0"/>
-              <a:t>Exercise 7 – Resources and Styles</a:t>
+              <a:rPr lang="en-US" dirty="0">
+                <a:solidFill>
+                  <a:schemeClr val="accent5">
+                    <a:lumMod val="75000"/>
+                  </a:schemeClr>
+                </a:solidFill>
+              </a:rPr>
+              <a:t>Exercise 7 – Resources and St</a:t>
+            </a:r>
+            <a:r>
+              <a:rPr lang="en-US" dirty="0"/>
+              <a:t>yles</a:t>
             </a:r>
           </a:p>
         </p:txBody>
@@ -29019,6 +29121,1733 @@
     <p:extLst>
       <p:ext uri="{BB962C8B-B14F-4D97-AF65-F5344CB8AC3E}">
         <p14:creationId xmlns:p14="http://schemas.microsoft.com/office/powerpoint/2010/main" val="430974822"/>
+      </p:ext>
+    </p:extLst>
+  </p:cSld>
+  <p:clrMapOvr>
+    <a:masterClrMapping/>
+  </p:clrMapOvr>
+</p:sld>
+</file>
+
+<file path=ppt/slides/slide42.xml><?xml version="1.0" encoding="utf-8"?>
+<p:sld xmlns:a="http://schemas.openxmlformats.org/drawingml/2006/main" xmlns:r="http://schemas.openxmlformats.org/officeDocument/2006/relationships" xmlns:p="http://schemas.openxmlformats.org/presentationml/2006/main">
+  <p:cSld>
+    <p:spTree>
+      <p:nvGrpSpPr>
+        <p:cNvPr id="1" name=""/>
+        <p:cNvGrpSpPr/>
+        <p:nvPr/>
+      </p:nvGrpSpPr>
+      <p:grpSpPr>
+        <a:xfrm>
+          <a:off x="0" y="0"/>
+          <a:ext cx="0" cy="0"/>
+          <a:chOff x="0" y="0"/>
+          <a:chExt cx="0" cy="0"/>
+        </a:xfrm>
+      </p:grpSpPr>
+      <p:sp>
+        <p:nvSpPr>
+          <p:cNvPr id="2" name="Title 1">
+            <a:extLst>
+              <a:ext uri="{FF2B5EF4-FFF2-40B4-BE49-F238E27FC236}">
+                <a16:creationId xmlns:a16="http://schemas.microsoft.com/office/drawing/2014/main" id="{63A735CD-ADE2-3A66-13FF-2DCBBFA8F55E}"/>
+              </a:ext>
+            </a:extLst>
+          </p:cNvPr>
+          <p:cNvSpPr>
+            <a:spLocks noGrp="1"/>
+          </p:cNvSpPr>
+          <p:nvPr>
+            <p:ph type="title"/>
+          </p:nvPr>
+        </p:nvSpPr>
+        <p:spPr/>
+        <p:txBody>
+          <a:bodyPr/>
+          <a:lstStyle/>
+          <a:p>
+            <a:r>
+              <a:rPr lang="en-US" dirty="0"/>
+              <a:t>Unit 8 – Control Survey</a:t>
+            </a:r>
+          </a:p>
+        </p:txBody>
+      </p:sp>
+      <p:sp>
+        <p:nvSpPr>
+          <p:cNvPr id="3" name="Content Placeholder 2">
+            <a:extLst>
+              <a:ext uri="{FF2B5EF4-FFF2-40B4-BE49-F238E27FC236}">
+                <a16:creationId xmlns:a16="http://schemas.microsoft.com/office/drawing/2014/main" id="{C7D20E74-8665-F147-FF61-25AED1B89646}"/>
+              </a:ext>
+            </a:extLst>
+          </p:cNvPr>
+          <p:cNvSpPr>
+            <a:spLocks noGrp="1"/>
+          </p:cNvSpPr>
+          <p:nvPr>
+            <p:ph idx="1"/>
+          </p:nvPr>
+        </p:nvSpPr>
+        <p:spPr/>
+        <p:txBody>
+          <a:bodyPr/>
+          <a:lstStyle/>
+          <a:p>
+            <a:r>
+              <a:rPr lang="en-US" dirty="0"/>
+              <a:t>Survey of various WPF controls</a:t>
+            </a:r>
+          </a:p>
+          <a:p>
+            <a:pPr lvl="1"/>
+            <a:r>
+              <a:rPr lang="en-US" dirty="0"/>
+              <a:t>Most of these are fairly typical of other UI frameworks</a:t>
+            </a:r>
+          </a:p>
+          <a:p>
+            <a:r>
+              <a:rPr lang="en-US" dirty="0"/>
+              <a:t>&lt;Button&gt; - click on button to perform action</a:t>
+            </a:r>
+          </a:p>
+          <a:p>
+            <a:endParaRPr lang="en-US" dirty="0"/>
+          </a:p>
+          <a:p>
+            <a:r>
+              <a:rPr lang="en-US" dirty="0"/>
+              <a:t>&lt;</a:t>
+            </a:r>
+            <a:r>
+              <a:rPr lang="en-US" dirty="0" err="1"/>
+              <a:t>CheckBox</a:t>
+            </a:r>
+            <a:r>
+              <a:rPr lang="en-US" dirty="0"/>
+              <a:t>&gt; - allow user to change state</a:t>
+            </a:r>
+          </a:p>
+          <a:p>
+            <a:endParaRPr lang="en-US" dirty="0"/>
+          </a:p>
+          <a:p>
+            <a:r>
+              <a:rPr lang="en-US" dirty="0"/>
+              <a:t>&lt;</a:t>
+            </a:r>
+            <a:r>
+              <a:rPr lang="en-US" dirty="0" err="1"/>
+              <a:t>RadioButton</a:t>
+            </a:r>
+            <a:r>
+              <a:rPr lang="en-US" dirty="0"/>
+              <a:t>&gt; and &lt;</a:t>
+            </a:r>
+            <a:r>
+              <a:rPr lang="en-US" dirty="0" err="1"/>
+              <a:t>GroupBox</a:t>
+            </a:r>
+            <a:r>
+              <a:rPr lang="en-US" dirty="0"/>
+              <a:t>&gt; - select exactly one of a set of options</a:t>
+            </a:r>
+          </a:p>
+          <a:p>
+            <a:endParaRPr lang="en-US" dirty="0"/>
+          </a:p>
+          <a:p>
+            <a:endParaRPr lang="en-US" dirty="0"/>
+          </a:p>
+        </p:txBody>
+      </p:sp>
+      <p:pic>
+        <p:nvPicPr>
+          <p:cNvPr id="5" name="Picture 4">
+            <a:extLst>
+              <a:ext uri="{FF2B5EF4-FFF2-40B4-BE49-F238E27FC236}">
+                <a16:creationId xmlns:a16="http://schemas.microsoft.com/office/drawing/2014/main" id="{6C429D7E-7C47-5BC0-748C-2215E08C7510}"/>
+              </a:ext>
+            </a:extLst>
+          </p:cNvPr>
+          <p:cNvPicPr>
+            <a:picLocks noChangeAspect="1"/>
+          </p:cNvPicPr>
+          <p:nvPr/>
+        </p:nvPicPr>
+        <p:blipFill>
+          <a:blip r:embed="rId2"/>
+          <a:stretch>
+            <a:fillRect/>
+          </a:stretch>
+        </p:blipFill>
+        <p:spPr>
+          <a:xfrm>
+            <a:off x="3182385" y="3355661"/>
+            <a:ext cx="847725" cy="323850"/>
+          </a:xfrm>
+          <a:prstGeom prst="rect">
+            <a:avLst/>
+          </a:prstGeom>
+        </p:spPr>
+      </p:pic>
+      <p:pic>
+        <p:nvPicPr>
+          <p:cNvPr id="7" name="Picture 6">
+            <a:extLst>
+              <a:ext uri="{FF2B5EF4-FFF2-40B4-BE49-F238E27FC236}">
+                <a16:creationId xmlns:a16="http://schemas.microsoft.com/office/drawing/2014/main" id="{205C7B56-9EED-6159-DFBF-DECFEDD834F5}"/>
+              </a:ext>
+            </a:extLst>
+          </p:cNvPr>
+          <p:cNvPicPr>
+            <a:picLocks noChangeAspect="1"/>
+          </p:cNvPicPr>
+          <p:nvPr/>
+        </p:nvPicPr>
+        <p:blipFill>
+          <a:blip r:embed="rId3"/>
+          <a:stretch>
+            <a:fillRect/>
+          </a:stretch>
+        </p:blipFill>
+        <p:spPr>
+          <a:xfrm>
+            <a:off x="3182385" y="4151620"/>
+            <a:ext cx="781050" cy="228600"/>
+          </a:xfrm>
+          <a:prstGeom prst="rect">
+            <a:avLst/>
+          </a:prstGeom>
+        </p:spPr>
+      </p:pic>
+      <p:pic>
+        <p:nvPicPr>
+          <p:cNvPr id="1026" name="Picture 2" descr="Mode &#10;@ Walk &#10;O ">
+            <a:extLst>
+              <a:ext uri="{FF2B5EF4-FFF2-40B4-BE49-F238E27FC236}">
+                <a16:creationId xmlns:a16="http://schemas.microsoft.com/office/drawing/2014/main" id="{240C2C10-E42A-6C73-875F-E7A3AEEC05F3}"/>
+              </a:ext>
+            </a:extLst>
+          </p:cNvPr>
+          <p:cNvPicPr>
+            <a:picLocks noChangeAspect="1" noChangeArrowheads="1"/>
+          </p:cNvPicPr>
+          <p:nvPr/>
+        </p:nvPicPr>
+        <p:blipFill>
+          <a:blip r:embed="rId4">
+            <a:extLst>
+              <a:ext uri="{28A0092B-C50C-407E-A947-70E740481C1C}">
+                <a14:useLocalDpi xmlns:a14="http://schemas.microsoft.com/office/drawing/2010/main" val="0"/>
+              </a:ext>
+            </a:extLst>
+          </a:blip>
+          <a:srcRect/>
+          <a:stretch>
+            <a:fillRect/>
+          </a:stretch>
+        </p:blipFill>
+        <p:spPr bwMode="auto">
+          <a:xfrm>
+            <a:off x="3182385" y="4940990"/>
+            <a:ext cx="1085850" cy="742950"/>
+          </a:xfrm>
+          <a:prstGeom prst="rect">
+            <a:avLst/>
+          </a:prstGeom>
+          <a:noFill/>
+          <a:extLst>
+            <a:ext uri="{909E8E84-426E-40DD-AFC4-6F175D3DCCD1}">
+              <a14:hiddenFill xmlns:a14="http://schemas.microsoft.com/office/drawing/2010/main">
+                <a:solidFill>
+                  <a:srgbClr val="FFFFFF"/>
+                </a:solidFill>
+              </a14:hiddenFill>
+            </a:ext>
+          </a:extLst>
+        </p:spPr>
+      </p:pic>
+    </p:spTree>
+    <p:extLst>
+      <p:ext uri="{BB962C8B-B14F-4D97-AF65-F5344CB8AC3E}">
+        <p14:creationId xmlns:p14="http://schemas.microsoft.com/office/powerpoint/2010/main" val="1024177944"/>
+      </p:ext>
+    </p:extLst>
+  </p:cSld>
+  <p:clrMapOvr>
+    <a:masterClrMapping/>
+  </p:clrMapOvr>
+</p:sld>
+</file>
+
+<file path=ppt/slides/slide43.xml><?xml version="1.0" encoding="utf-8"?>
+<p:sld xmlns:a="http://schemas.openxmlformats.org/drawingml/2006/main" xmlns:r="http://schemas.openxmlformats.org/officeDocument/2006/relationships" xmlns:p="http://schemas.openxmlformats.org/presentationml/2006/main">
+  <p:cSld>
+    <p:spTree>
+      <p:nvGrpSpPr>
+        <p:cNvPr id="1" name=""/>
+        <p:cNvGrpSpPr/>
+        <p:nvPr/>
+      </p:nvGrpSpPr>
+      <p:grpSpPr>
+        <a:xfrm>
+          <a:off x="0" y="0"/>
+          <a:ext cx="0" cy="0"/>
+          <a:chOff x="0" y="0"/>
+          <a:chExt cx="0" cy="0"/>
+        </a:xfrm>
+      </p:grpSpPr>
+      <p:sp>
+        <p:nvSpPr>
+          <p:cNvPr id="2" name="Title 1">
+            <a:extLst>
+              <a:ext uri="{FF2B5EF4-FFF2-40B4-BE49-F238E27FC236}">
+                <a16:creationId xmlns:a16="http://schemas.microsoft.com/office/drawing/2014/main" id="{9C54BF0D-9706-86A7-B647-4A19A2A242C1}"/>
+              </a:ext>
+            </a:extLst>
+          </p:cNvPr>
+          <p:cNvSpPr>
+            <a:spLocks noGrp="1"/>
+          </p:cNvSpPr>
+          <p:nvPr>
+            <p:ph type="title"/>
+          </p:nvPr>
+        </p:nvSpPr>
+        <p:spPr/>
+        <p:txBody>
+          <a:bodyPr/>
+          <a:lstStyle/>
+          <a:p>
+            <a:r>
+              <a:rPr lang="en-US" dirty="0"/>
+              <a:t>Unit 8 – Control Survey</a:t>
+            </a:r>
+          </a:p>
+        </p:txBody>
+      </p:sp>
+      <p:sp>
+        <p:nvSpPr>
+          <p:cNvPr id="3" name="Content Placeholder 2">
+            <a:extLst>
+              <a:ext uri="{FF2B5EF4-FFF2-40B4-BE49-F238E27FC236}">
+                <a16:creationId xmlns:a16="http://schemas.microsoft.com/office/drawing/2014/main" id="{AD2FC855-63DF-B37A-03E5-84F2917D7C92}"/>
+              </a:ext>
+            </a:extLst>
+          </p:cNvPr>
+          <p:cNvSpPr>
+            <a:spLocks noGrp="1"/>
+          </p:cNvSpPr>
+          <p:nvPr>
+            <p:ph idx="1"/>
+          </p:nvPr>
+        </p:nvSpPr>
+        <p:spPr/>
+        <p:txBody>
+          <a:bodyPr/>
+          <a:lstStyle/>
+          <a:p>
+            <a:r>
+              <a:rPr lang="en-US" dirty="0"/>
+              <a:t>&lt;</a:t>
+            </a:r>
+            <a:r>
+              <a:rPr lang="en-US" dirty="0" err="1"/>
+              <a:t>TextBlock</a:t>
+            </a:r>
+            <a:r>
+              <a:rPr lang="en-US" dirty="0"/>
+              <a:t>&gt; and &lt;Label&gt;</a:t>
+            </a:r>
+          </a:p>
+          <a:p>
+            <a:pPr lvl="1"/>
+            <a:r>
+              <a:rPr lang="en-US" dirty="0"/>
+              <a:t>&lt;</a:t>
+            </a:r>
+            <a:r>
+              <a:rPr lang="en-US" dirty="0" err="1"/>
+              <a:t>TextBlock</a:t>
+            </a:r>
+            <a:r>
+              <a:rPr lang="en-US" dirty="0"/>
+              <a:t>&gt; - simple text </a:t>
+            </a:r>
+            <a:r>
+              <a:rPr lang="en-US" dirty="0" err="1"/>
+              <a:t>labe</a:t>
+            </a:r>
+            <a:endParaRPr lang="en-US" dirty="0"/>
+          </a:p>
+          <a:p>
+            <a:pPr lvl="1"/>
+            <a:r>
+              <a:rPr lang="en-US" dirty="0"/>
+              <a:t>&lt;Label&gt; - label that can have more complex content</a:t>
+            </a:r>
+          </a:p>
+          <a:p>
+            <a:r>
+              <a:rPr lang="en-US" dirty="0"/>
+              <a:t>&lt;ToolTip&gt; - Provide info when user hovers over control</a:t>
+            </a:r>
+          </a:p>
+          <a:p>
+            <a:endParaRPr lang="en-US" dirty="0"/>
+          </a:p>
+          <a:p>
+            <a:endParaRPr lang="en-US" dirty="0"/>
+          </a:p>
+          <a:p>
+            <a:r>
+              <a:rPr lang="en-US" dirty="0"/>
+              <a:t>&lt;Expander&gt; - user clicks expander to show/hide child controls</a:t>
+            </a:r>
+          </a:p>
+          <a:p>
+            <a:endParaRPr lang="en-US" dirty="0"/>
+          </a:p>
+        </p:txBody>
+      </p:sp>
+      <p:pic>
+        <p:nvPicPr>
+          <p:cNvPr id="2050" name="Picture 2" descr="This button doesn't do much ">
+            <a:extLst>
+              <a:ext uri="{FF2B5EF4-FFF2-40B4-BE49-F238E27FC236}">
+                <a16:creationId xmlns:a16="http://schemas.microsoft.com/office/drawing/2014/main" id="{236D4F85-54E9-5363-CF1A-7373D8ACF271}"/>
+              </a:ext>
+            </a:extLst>
+          </p:cNvPr>
+          <p:cNvPicPr>
+            <a:picLocks noChangeAspect="1" noChangeArrowheads="1"/>
+          </p:cNvPicPr>
+          <p:nvPr/>
+        </p:nvPicPr>
+        <p:blipFill>
+          <a:blip r:embed="rId2">
+            <a:extLst>
+              <a:ext uri="{28A0092B-C50C-407E-A947-70E740481C1C}">
+                <a14:useLocalDpi xmlns:a14="http://schemas.microsoft.com/office/drawing/2010/main" val="0"/>
+              </a:ext>
+            </a:extLst>
+          </a:blip>
+          <a:srcRect/>
+          <a:stretch>
+            <a:fillRect/>
+          </a:stretch>
+        </p:blipFill>
+        <p:spPr bwMode="auto">
+          <a:xfrm>
+            <a:off x="3102458" y="3674748"/>
+            <a:ext cx="2200275" cy="695325"/>
+          </a:xfrm>
+          <a:prstGeom prst="rect">
+            <a:avLst/>
+          </a:prstGeom>
+          <a:noFill/>
+          <a:extLst>
+            <a:ext uri="{909E8E84-426E-40DD-AFC4-6F175D3DCCD1}">
+              <a14:hiddenFill xmlns:a14="http://schemas.microsoft.com/office/drawing/2010/main">
+                <a:solidFill>
+                  <a:srgbClr val="FFFFFF"/>
+                </a:solidFill>
+              </a14:hiddenFill>
+            </a:ext>
+          </a:extLst>
+        </p:spPr>
+      </p:pic>
+      <p:pic>
+        <p:nvPicPr>
+          <p:cNvPr id="2052" name="Picture 4" descr="Goals &#10;Re3d l]lysses &#10;'v%sit Fiji &#10;Take out Trash ">
+            <a:extLst>
+              <a:ext uri="{FF2B5EF4-FFF2-40B4-BE49-F238E27FC236}">
+                <a16:creationId xmlns:a16="http://schemas.microsoft.com/office/drawing/2014/main" id="{3C1E7A6A-6E9F-A978-E9A1-C772379835AF}"/>
+              </a:ext>
+            </a:extLst>
+          </p:cNvPr>
+          <p:cNvPicPr>
+            <a:picLocks noChangeAspect="1" noChangeArrowheads="1"/>
+          </p:cNvPicPr>
+          <p:nvPr/>
+        </p:nvPicPr>
+        <p:blipFill>
+          <a:blip r:embed="rId3">
+            <a:extLst>
+              <a:ext uri="{28A0092B-C50C-407E-A947-70E740481C1C}">
+                <a14:useLocalDpi xmlns:a14="http://schemas.microsoft.com/office/drawing/2010/main" val="0"/>
+              </a:ext>
+            </a:extLst>
+          </a:blip>
+          <a:srcRect/>
+          <a:stretch>
+            <a:fillRect/>
+          </a:stretch>
+        </p:blipFill>
+        <p:spPr bwMode="auto">
+          <a:xfrm>
+            <a:off x="3102458" y="4919870"/>
+            <a:ext cx="1304925" cy="914400"/>
+          </a:xfrm>
+          <a:prstGeom prst="rect">
+            <a:avLst/>
+          </a:prstGeom>
+          <a:noFill/>
+          <a:extLst>
+            <a:ext uri="{909E8E84-426E-40DD-AFC4-6F175D3DCCD1}">
+              <a14:hiddenFill xmlns:a14="http://schemas.microsoft.com/office/drawing/2010/main">
+                <a:solidFill>
+                  <a:srgbClr val="FFFFFF"/>
+                </a:solidFill>
+              </a14:hiddenFill>
+            </a:ext>
+          </a:extLst>
+        </p:spPr>
+      </p:pic>
+    </p:spTree>
+    <p:extLst>
+      <p:ext uri="{BB962C8B-B14F-4D97-AF65-F5344CB8AC3E}">
+        <p14:creationId xmlns:p14="http://schemas.microsoft.com/office/powerpoint/2010/main" val="2253617249"/>
+      </p:ext>
+    </p:extLst>
+  </p:cSld>
+  <p:clrMapOvr>
+    <a:masterClrMapping/>
+  </p:clrMapOvr>
+</p:sld>
+</file>
+
+<file path=ppt/slides/slide44.xml><?xml version="1.0" encoding="utf-8"?>
+<p:sld xmlns:a="http://schemas.openxmlformats.org/drawingml/2006/main" xmlns:r="http://schemas.openxmlformats.org/officeDocument/2006/relationships" xmlns:p="http://schemas.openxmlformats.org/presentationml/2006/main">
+  <p:cSld>
+    <p:spTree>
+      <p:nvGrpSpPr>
+        <p:cNvPr id="1" name=""/>
+        <p:cNvGrpSpPr/>
+        <p:nvPr/>
+      </p:nvGrpSpPr>
+      <p:grpSpPr>
+        <a:xfrm>
+          <a:off x="0" y="0"/>
+          <a:ext cx="0" cy="0"/>
+          <a:chOff x="0" y="0"/>
+          <a:chExt cx="0" cy="0"/>
+        </a:xfrm>
+      </p:grpSpPr>
+      <p:sp>
+        <p:nvSpPr>
+          <p:cNvPr id="2" name="Title 1">
+            <a:extLst>
+              <a:ext uri="{FF2B5EF4-FFF2-40B4-BE49-F238E27FC236}">
+                <a16:creationId xmlns:a16="http://schemas.microsoft.com/office/drawing/2014/main" id="{8F0F374B-CB3D-BE95-6BF6-CF469CCAFB5E}"/>
+              </a:ext>
+            </a:extLst>
+          </p:cNvPr>
+          <p:cNvSpPr>
+            <a:spLocks noGrp="1"/>
+          </p:cNvSpPr>
+          <p:nvPr>
+            <p:ph type="title"/>
+          </p:nvPr>
+        </p:nvSpPr>
+        <p:spPr/>
+        <p:txBody>
+          <a:bodyPr/>
+          <a:lstStyle/>
+          <a:p>
+            <a:r>
+              <a:rPr lang="en-US" dirty="0"/>
+              <a:t>Unit 8 – Control Survey</a:t>
+            </a:r>
+          </a:p>
+        </p:txBody>
+      </p:sp>
+      <p:sp>
+        <p:nvSpPr>
+          <p:cNvPr id="3" name="Content Placeholder 2">
+            <a:extLst>
+              <a:ext uri="{FF2B5EF4-FFF2-40B4-BE49-F238E27FC236}">
+                <a16:creationId xmlns:a16="http://schemas.microsoft.com/office/drawing/2014/main" id="{AF4FAF27-2126-A65D-C135-6392E256BAB5}"/>
+              </a:ext>
+            </a:extLst>
+          </p:cNvPr>
+          <p:cNvSpPr>
+            <a:spLocks noGrp="1"/>
+          </p:cNvSpPr>
+          <p:nvPr>
+            <p:ph idx="1"/>
+          </p:nvPr>
+        </p:nvSpPr>
+        <p:spPr>
+          <a:xfrm>
+            <a:off x="2592925" y="2123660"/>
+            <a:ext cx="8915400" cy="3777622"/>
+          </a:xfrm>
+        </p:spPr>
+        <p:txBody>
+          <a:bodyPr/>
+          <a:lstStyle/>
+          <a:p>
+            <a:r>
+              <a:rPr lang="en-US" dirty="0"/>
+              <a:t>&lt;</a:t>
+            </a:r>
+            <a:r>
+              <a:rPr lang="en-US" dirty="0" err="1"/>
+              <a:t>ComboBox</a:t>
+            </a:r>
+            <a:r>
+              <a:rPr lang="en-US" dirty="0"/>
+              <a:t>&gt; - select one item from dropdown list</a:t>
+            </a:r>
+          </a:p>
+          <a:p>
+            <a:endParaRPr lang="en-US" dirty="0"/>
+          </a:p>
+          <a:p>
+            <a:endParaRPr lang="en-US" dirty="0"/>
+          </a:p>
+          <a:p>
+            <a:r>
+              <a:rPr lang="en-US" dirty="0"/>
+              <a:t>&lt;</a:t>
+            </a:r>
+            <a:r>
+              <a:rPr lang="en-US" dirty="0" err="1"/>
+              <a:t>ListBox</a:t>
+            </a:r>
+            <a:r>
+              <a:rPr lang="en-US" dirty="0"/>
+              <a:t>&gt; - select one or more items from a list, w/optional scrollbar</a:t>
+            </a:r>
+          </a:p>
+          <a:p>
+            <a:endParaRPr lang="en-US" dirty="0"/>
+          </a:p>
+          <a:p>
+            <a:endParaRPr lang="en-US" dirty="0"/>
+          </a:p>
+          <a:p>
+            <a:r>
+              <a:rPr lang="en-US" dirty="0"/>
+              <a:t>&lt;</a:t>
+            </a:r>
+            <a:r>
+              <a:rPr lang="en-US" dirty="0" err="1"/>
+              <a:t>ListView</a:t>
+            </a:r>
+            <a:r>
+              <a:rPr lang="en-US" dirty="0"/>
+              <a:t>&gt; - list items with properties, support different views (like File Explorer</a:t>
+            </a:r>
+          </a:p>
+          <a:p>
+            <a:endParaRPr lang="en-US" dirty="0"/>
+          </a:p>
+        </p:txBody>
+      </p:sp>
+      <p:pic>
+        <p:nvPicPr>
+          <p:cNvPr id="3074" name="Picture 2" descr="uaua•L &#10;sa6 ">
+            <a:extLst>
+              <a:ext uri="{FF2B5EF4-FFF2-40B4-BE49-F238E27FC236}">
+                <a16:creationId xmlns:a16="http://schemas.microsoft.com/office/drawing/2014/main" id="{889B7CDD-62DB-3881-6ABB-51DEEC76B6AD}"/>
+              </a:ext>
+            </a:extLst>
+          </p:cNvPr>
+          <p:cNvPicPr>
+            <a:picLocks noChangeAspect="1" noChangeArrowheads="1"/>
+          </p:cNvPicPr>
+          <p:nvPr/>
+        </p:nvPicPr>
+        <p:blipFill>
+          <a:blip r:embed="rId2">
+            <a:extLst>
+              <a:ext uri="{28A0092B-C50C-407E-A947-70E740481C1C}">
+                <a14:useLocalDpi xmlns:a14="http://schemas.microsoft.com/office/drawing/2010/main" val="0"/>
+              </a:ext>
+            </a:extLst>
+          </a:blip>
+          <a:srcRect/>
+          <a:stretch>
+            <a:fillRect/>
+          </a:stretch>
+        </p:blipFill>
+        <p:spPr bwMode="auto">
+          <a:xfrm>
+            <a:off x="2996855" y="2497829"/>
+            <a:ext cx="1228725" cy="828675"/>
+          </a:xfrm>
+          <a:prstGeom prst="rect">
+            <a:avLst/>
+          </a:prstGeom>
+          <a:noFill/>
+          <a:extLst>
+            <a:ext uri="{909E8E84-426E-40DD-AFC4-6F175D3DCCD1}">
+              <a14:hiddenFill xmlns:a14="http://schemas.microsoft.com/office/drawing/2010/main">
+                <a:solidFill>
+                  <a:srgbClr val="FFFFFF"/>
+                </a:solidFill>
+              </a14:hiddenFill>
+            </a:ext>
+          </a:extLst>
+        </p:spPr>
+      </p:pic>
+      <p:pic>
+        <p:nvPicPr>
+          <p:cNvPr id="3076" name="Picture 4" descr="F ries ">
+            <a:extLst>
+              <a:ext uri="{FF2B5EF4-FFF2-40B4-BE49-F238E27FC236}">
+                <a16:creationId xmlns:a16="http://schemas.microsoft.com/office/drawing/2014/main" id="{7AEBBB4D-6C56-E694-F731-902B44D8ECF3}"/>
+              </a:ext>
+            </a:extLst>
+          </p:cNvPr>
+          <p:cNvPicPr>
+            <a:picLocks noChangeAspect="1" noChangeArrowheads="1"/>
+          </p:cNvPicPr>
+          <p:nvPr/>
+        </p:nvPicPr>
+        <p:blipFill>
+          <a:blip r:embed="rId3">
+            <a:extLst>
+              <a:ext uri="{28A0092B-C50C-407E-A947-70E740481C1C}">
+                <a14:useLocalDpi xmlns:a14="http://schemas.microsoft.com/office/drawing/2010/main" val="0"/>
+              </a:ext>
+            </a:extLst>
+          </a:blip>
+          <a:srcRect/>
+          <a:stretch>
+            <a:fillRect/>
+          </a:stretch>
+        </p:blipFill>
+        <p:spPr bwMode="auto">
+          <a:xfrm>
+            <a:off x="3060218" y="3700673"/>
+            <a:ext cx="942975" cy="800100"/>
+          </a:xfrm>
+          <a:prstGeom prst="rect">
+            <a:avLst/>
+          </a:prstGeom>
+          <a:noFill/>
+          <a:extLst>
+            <a:ext uri="{909E8E84-426E-40DD-AFC4-6F175D3DCCD1}">
+              <a14:hiddenFill xmlns:a14="http://schemas.microsoft.com/office/drawing/2010/main">
+                <a:solidFill>
+                  <a:srgbClr val="FFFFFF"/>
+                </a:solidFill>
+              </a14:hiddenFill>
+            </a:ext>
+          </a:extLst>
+        </p:spPr>
+      </p:pic>
+      <p:pic>
+        <p:nvPicPr>
+          <p:cNvPr id="3078" name="Picture 6" descr="Temer &#10;Border Collie &#10;Retriever &#10;Name &#10;Kirby &#10;Gus &#10;Color &#10;Mixed &#10;Black &#10;Golden ">
+            <a:extLst>
+              <a:ext uri="{FF2B5EF4-FFF2-40B4-BE49-F238E27FC236}">
+                <a16:creationId xmlns:a16="http://schemas.microsoft.com/office/drawing/2014/main" id="{E4907781-BAAA-1341-89C3-A9C3BA5EFF8D}"/>
+              </a:ext>
+            </a:extLst>
+          </p:cNvPr>
+          <p:cNvPicPr>
+            <a:picLocks noChangeAspect="1" noChangeArrowheads="1"/>
+          </p:cNvPicPr>
+          <p:nvPr/>
+        </p:nvPicPr>
+        <p:blipFill>
+          <a:blip r:embed="rId4">
+            <a:extLst>
+              <a:ext uri="{28A0092B-C50C-407E-A947-70E740481C1C}">
+                <a14:useLocalDpi xmlns:a14="http://schemas.microsoft.com/office/drawing/2010/main" val="0"/>
+              </a:ext>
+            </a:extLst>
+          </a:blip>
+          <a:srcRect/>
+          <a:stretch>
+            <a:fillRect/>
+          </a:stretch>
+        </p:blipFill>
+        <p:spPr bwMode="auto">
+          <a:xfrm>
+            <a:off x="2996855" y="5246751"/>
+            <a:ext cx="2466975" cy="1028700"/>
+          </a:xfrm>
+          <a:prstGeom prst="rect">
+            <a:avLst/>
+          </a:prstGeom>
+          <a:noFill/>
+          <a:extLst>
+            <a:ext uri="{909E8E84-426E-40DD-AFC4-6F175D3DCCD1}">
+              <a14:hiddenFill xmlns:a14="http://schemas.microsoft.com/office/drawing/2010/main">
+                <a:solidFill>
+                  <a:srgbClr val="FFFFFF"/>
+                </a:solidFill>
+              </a14:hiddenFill>
+            </a:ext>
+          </a:extLst>
+        </p:spPr>
+      </p:pic>
+    </p:spTree>
+    <p:extLst>
+      <p:ext uri="{BB962C8B-B14F-4D97-AF65-F5344CB8AC3E}">
+        <p14:creationId xmlns:p14="http://schemas.microsoft.com/office/powerpoint/2010/main" val="1077241885"/>
+      </p:ext>
+    </p:extLst>
+  </p:cSld>
+  <p:clrMapOvr>
+    <a:masterClrMapping/>
+  </p:clrMapOvr>
+</p:sld>
+</file>
+
+<file path=ppt/slides/slide45.xml><?xml version="1.0" encoding="utf-8"?>
+<p:sld xmlns:a="http://schemas.openxmlformats.org/drawingml/2006/main" xmlns:r="http://schemas.openxmlformats.org/officeDocument/2006/relationships" xmlns:p="http://schemas.openxmlformats.org/presentationml/2006/main">
+  <p:cSld>
+    <p:spTree>
+      <p:nvGrpSpPr>
+        <p:cNvPr id="1" name=""/>
+        <p:cNvGrpSpPr/>
+        <p:nvPr/>
+      </p:nvGrpSpPr>
+      <p:grpSpPr>
+        <a:xfrm>
+          <a:off x="0" y="0"/>
+          <a:ext cx="0" cy="0"/>
+          <a:chOff x="0" y="0"/>
+          <a:chExt cx="0" cy="0"/>
+        </a:xfrm>
+      </p:grpSpPr>
+      <p:sp>
+        <p:nvSpPr>
+          <p:cNvPr id="2" name="Title 1">
+            <a:extLst>
+              <a:ext uri="{FF2B5EF4-FFF2-40B4-BE49-F238E27FC236}">
+                <a16:creationId xmlns:a16="http://schemas.microsoft.com/office/drawing/2014/main" id="{AD30007B-6995-FF5C-A9F4-0DD2264F7D42}"/>
+              </a:ext>
+            </a:extLst>
+          </p:cNvPr>
+          <p:cNvSpPr>
+            <a:spLocks noGrp="1"/>
+          </p:cNvSpPr>
+          <p:nvPr>
+            <p:ph type="title"/>
+          </p:nvPr>
+        </p:nvSpPr>
+        <p:spPr>
+          <a:xfrm>
+            <a:off x="2592925" y="609823"/>
+            <a:ext cx="8911687" cy="1280890"/>
+          </a:xfrm>
+        </p:spPr>
+        <p:txBody>
+          <a:bodyPr/>
+          <a:lstStyle/>
+          <a:p>
+            <a:r>
+              <a:rPr lang="en-US" dirty="0"/>
+              <a:t>Unit 8 – Control Survey</a:t>
+            </a:r>
+          </a:p>
+        </p:txBody>
+      </p:sp>
+      <p:sp>
+        <p:nvSpPr>
+          <p:cNvPr id="3" name="Content Placeholder 2">
+            <a:extLst>
+              <a:ext uri="{FF2B5EF4-FFF2-40B4-BE49-F238E27FC236}">
+                <a16:creationId xmlns:a16="http://schemas.microsoft.com/office/drawing/2014/main" id="{D1E4A412-F8C1-B272-DA07-E8D024D017C2}"/>
+              </a:ext>
+            </a:extLst>
+          </p:cNvPr>
+          <p:cNvSpPr>
+            <a:spLocks noGrp="1"/>
+          </p:cNvSpPr>
+          <p:nvPr>
+            <p:ph idx="1"/>
+          </p:nvPr>
+        </p:nvSpPr>
+        <p:spPr/>
+        <p:txBody>
+          <a:bodyPr/>
+          <a:lstStyle/>
+          <a:p>
+            <a:r>
+              <a:rPr lang="en-US" dirty="0"/>
+              <a:t>&lt;</a:t>
+            </a:r>
+            <a:r>
+              <a:rPr lang="en-US" dirty="0" err="1"/>
+              <a:t>TabControl</a:t>
+            </a:r>
+            <a:r>
+              <a:rPr lang="en-US" dirty="0"/>
+              <a:t>&gt; - each tab contains collection of controls</a:t>
+            </a:r>
+          </a:p>
+          <a:p>
+            <a:endParaRPr lang="en-US" dirty="0"/>
+          </a:p>
+          <a:p>
+            <a:endParaRPr lang="en-US" dirty="0"/>
+          </a:p>
+          <a:p>
+            <a:endParaRPr lang="en-US" dirty="0"/>
+          </a:p>
+          <a:p>
+            <a:r>
+              <a:rPr lang="en-US" dirty="0"/>
+              <a:t>	&lt;DataGrid&gt; - grid of data items, typically bound to collection of objects</a:t>
+            </a:r>
+            <a:br>
+              <a:rPr lang="en-US" dirty="0"/>
+            </a:br>
+            <a:endParaRPr lang="en-US" dirty="0"/>
+          </a:p>
+        </p:txBody>
+      </p:sp>
+      <p:pic>
+        <p:nvPicPr>
+          <p:cNvPr id="4098" name="Picture 2" descr="Friends Photos V' &#10;Content goes here„ ">
+            <a:extLst>
+              <a:ext uri="{FF2B5EF4-FFF2-40B4-BE49-F238E27FC236}">
+                <a16:creationId xmlns:a16="http://schemas.microsoft.com/office/drawing/2014/main" id="{DE64CDC5-B8B3-6874-2CF4-9FAA113591A1}"/>
+              </a:ext>
+            </a:extLst>
+          </p:cNvPr>
+          <p:cNvPicPr>
+            <a:picLocks noChangeAspect="1" noChangeArrowheads="1"/>
+          </p:cNvPicPr>
+          <p:nvPr/>
+        </p:nvPicPr>
+        <p:blipFill>
+          <a:blip r:embed="rId3">
+            <a:extLst>
+              <a:ext uri="{28A0092B-C50C-407E-A947-70E740481C1C}">
+                <a14:useLocalDpi xmlns:a14="http://schemas.microsoft.com/office/drawing/2010/main" val="0"/>
+              </a:ext>
+            </a:extLst>
+          </a:blip>
+          <a:srcRect/>
+          <a:stretch>
+            <a:fillRect/>
+          </a:stretch>
+        </p:blipFill>
+        <p:spPr bwMode="auto">
+          <a:xfrm>
+            <a:off x="2992093" y="2528888"/>
+            <a:ext cx="1924050" cy="1114425"/>
+          </a:xfrm>
+          <a:prstGeom prst="rect">
+            <a:avLst/>
+          </a:prstGeom>
+          <a:noFill/>
+          <a:extLst>
+            <a:ext uri="{909E8E84-426E-40DD-AFC4-6F175D3DCCD1}">
+              <a14:hiddenFill xmlns:a14="http://schemas.microsoft.com/office/drawing/2010/main">
+                <a:solidFill>
+                  <a:srgbClr val="FFFFFF"/>
+                </a:solidFill>
+              </a14:hiddenFill>
+            </a:ext>
+          </a:extLst>
+        </p:spPr>
+      </p:pic>
+      <p:pic>
+        <p:nvPicPr>
+          <p:cNvPr id="4100" name="Picture 4" descr="Temer &#10;Name &#10;Jack &#10;Border Collie Kirby &#10;Retriever Gus &#10;Color &#10;Mixed &#10;alack &#10;Golden ">
+            <a:extLst>
+              <a:ext uri="{FF2B5EF4-FFF2-40B4-BE49-F238E27FC236}">
+                <a16:creationId xmlns:a16="http://schemas.microsoft.com/office/drawing/2014/main" id="{1427A160-717E-9A82-82EB-FC498F0E94F2}"/>
+              </a:ext>
+            </a:extLst>
+          </p:cNvPr>
+          <p:cNvPicPr>
+            <a:picLocks noChangeAspect="1" noChangeArrowheads="1"/>
+          </p:cNvPicPr>
+          <p:nvPr/>
+        </p:nvPicPr>
+        <p:blipFill>
+          <a:blip r:embed="rId4">
+            <a:extLst>
+              <a:ext uri="{28A0092B-C50C-407E-A947-70E740481C1C}">
+                <a14:useLocalDpi xmlns:a14="http://schemas.microsoft.com/office/drawing/2010/main" val="0"/>
+              </a:ext>
+            </a:extLst>
+          </a:blip>
+          <a:srcRect/>
+          <a:stretch>
+            <a:fillRect/>
+          </a:stretch>
+        </p:blipFill>
+        <p:spPr bwMode="auto">
+          <a:xfrm>
+            <a:off x="3099352" y="4134678"/>
+            <a:ext cx="2514600" cy="914400"/>
+          </a:xfrm>
+          <a:prstGeom prst="rect">
+            <a:avLst/>
+          </a:prstGeom>
+          <a:noFill/>
+          <a:extLst>
+            <a:ext uri="{909E8E84-426E-40DD-AFC4-6F175D3DCCD1}">
+              <a14:hiddenFill xmlns:a14="http://schemas.microsoft.com/office/drawing/2010/main">
+                <a:solidFill>
+                  <a:srgbClr val="FFFFFF"/>
+                </a:solidFill>
+              </a14:hiddenFill>
+            </a:ext>
+          </a:extLst>
+        </p:spPr>
+      </p:pic>
+    </p:spTree>
+    <p:extLst>
+      <p:ext uri="{BB962C8B-B14F-4D97-AF65-F5344CB8AC3E}">
+        <p14:creationId xmlns:p14="http://schemas.microsoft.com/office/powerpoint/2010/main" val="1286498036"/>
+      </p:ext>
+    </p:extLst>
+  </p:cSld>
+  <p:clrMapOvr>
+    <a:masterClrMapping/>
+  </p:clrMapOvr>
+</p:sld>
+</file>
+
+<file path=ppt/slides/slide46.xml><?xml version="1.0" encoding="utf-8"?>
+<p:sld xmlns:a="http://schemas.openxmlformats.org/drawingml/2006/main" xmlns:r="http://schemas.openxmlformats.org/officeDocument/2006/relationships" xmlns:p="http://schemas.openxmlformats.org/presentationml/2006/main">
+  <p:cSld>
+    <p:spTree>
+      <p:nvGrpSpPr>
+        <p:cNvPr id="1" name=""/>
+        <p:cNvGrpSpPr/>
+        <p:nvPr/>
+      </p:nvGrpSpPr>
+      <p:grpSpPr>
+        <a:xfrm>
+          <a:off x="0" y="0"/>
+          <a:ext cx="0" cy="0"/>
+          <a:chOff x="0" y="0"/>
+          <a:chExt cx="0" cy="0"/>
+        </a:xfrm>
+      </p:grpSpPr>
+      <p:sp>
+        <p:nvSpPr>
+          <p:cNvPr id="2" name="Title 1">
+            <a:extLst>
+              <a:ext uri="{FF2B5EF4-FFF2-40B4-BE49-F238E27FC236}">
+                <a16:creationId xmlns:a16="http://schemas.microsoft.com/office/drawing/2014/main" id="{80F61E4D-2212-1127-3871-C281B5193472}"/>
+              </a:ext>
+            </a:extLst>
+          </p:cNvPr>
+          <p:cNvSpPr>
+            <a:spLocks noGrp="1"/>
+          </p:cNvSpPr>
+          <p:nvPr>
+            <p:ph type="title"/>
+          </p:nvPr>
+        </p:nvSpPr>
+        <p:spPr/>
+        <p:txBody>
+          <a:bodyPr/>
+          <a:lstStyle/>
+          <a:p>
+            <a:r>
+              <a:rPr lang="en-US" dirty="0"/>
+              <a:t>Unit 8 – Control Survey</a:t>
+            </a:r>
+          </a:p>
+        </p:txBody>
+      </p:sp>
+      <p:sp>
+        <p:nvSpPr>
+          <p:cNvPr id="3" name="Content Placeholder 2">
+            <a:extLst>
+              <a:ext uri="{FF2B5EF4-FFF2-40B4-BE49-F238E27FC236}">
+                <a16:creationId xmlns:a16="http://schemas.microsoft.com/office/drawing/2014/main" id="{0750F6A6-3C95-ACF2-E6BD-77B895FB4B46}"/>
+              </a:ext>
+            </a:extLst>
+          </p:cNvPr>
+          <p:cNvSpPr>
+            <a:spLocks noGrp="1"/>
+          </p:cNvSpPr>
+          <p:nvPr>
+            <p:ph idx="1"/>
+          </p:nvPr>
+        </p:nvSpPr>
+        <p:spPr/>
+        <p:txBody>
+          <a:bodyPr/>
+          <a:lstStyle/>
+          <a:p>
+            <a:r>
+              <a:rPr lang="en-US" dirty="0"/>
+              <a:t>&lt;</a:t>
+            </a:r>
+            <a:r>
+              <a:rPr lang="en-US" dirty="0" err="1"/>
+              <a:t>TreeView</a:t>
+            </a:r>
+            <a:r>
+              <a:rPr lang="en-US" dirty="0"/>
+              <a:t>&gt; - hierarchical tree, with expandable nodes</a:t>
+            </a:r>
+          </a:p>
+          <a:p>
+            <a:endParaRPr lang="en-US" dirty="0"/>
+          </a:p>
+          <a:p>
+            <a:endParaRPr lang="en-US" dirty="0"/>
+          </a:p>
+          <a:p>
+            <a:endParaRPr lang="en-US" dirty="0"/>
+          </a:p>
+          <a:p>
+            <a:endParaRPr lang="en-US" dirty="0"/>
+          </a:p>
+          <a:p>
+            <a:r>
+              <a:rPr lang="en-US" dirty="0"/>
+              <a:t>&lt;</a:t>
+            </a:r>
+            <a:r>
+              <a:rPr lang="en-US" dirty="0" err="1"/>
+              <a:t>TextBox</a:t>
+            </a:r>
+            <a:r>
+              <a:rPr lang="en-US" dirty="0"/>
+              <a:t>&gt; - editable text</a:t>
+            </a:r>
+          </a:p>
+          <a:p>
+            <a:endParaRPr lang="en-US" dirty="0"/>
+          </a:p>
+          <a:p>
+            <a:endParaRPr lang="en-US" dirty="0"/>
+          </a:p>
+        </p:txBody>
+      </p:sp>
+      <p:pic>
+        <p:nvPicPr>
+          <p:cNvPr id="5122" name="Picture 2" descr="Authors &#10;Hemingway ">
+            <a:extLst>
+              <a:ext uri="{FF2B5EF4-FFF2-40B4-BE49-F238E27FC236}">
+                <a16:creationId xmlns:a16="http://schemas.microsoft.com/office/drawing/2014/main" id="{43DEDD0A-2234-6312-F7D2-D952654F8674}"/>
+              </a:ext>
+            </a:extLst>
+          </p:cNvPr>
+          <p:cNvPicPr>
+            <a:picLocks noChangeAspect="1" noChangeArrowheads="1"/>
+          </p:cNvPicPr>
+          <p:nvPr/>
+        </p:nvPicPr>
+        <p:blipFill>
+          <a:blip r:embed="rId2">
+            <a:extLst>
+              <a:ext uri="{28A0092B-C50C-407E-A947-70E740481C1C}">
+                <a14:useLocalDpi xmlns:a14="http://schemas.microsoft.com/office/drawing/2010/main" val="0"/>
+              </a:ext>
+            </a:extLst>
+          </a:blip>
+          <a:srcRect/>
+          <a:stretch>
+            <a:fillRect/>
+          </a:stretch>
+        </p:blipFill>
+        <p:spPr bwMode="auto">
+          <a:xfrm>
+            <a:off x="3111776" y="2552494"/>
+            <a:ext cx="1257300" cy="1514475"/>
+          </a:xfrm>
+          <a:prstGeom prst="rect">
+            <a:avLst/>
+          </a:prstGeom>
+          <a:noFill/>
+          <a:extLst>
+            <a:ext uri="{909E8E84-426E-40DD-AFC4-6F175D3DCCD1}">
+              <a14:hiddenFill xmlns:a14="http://schemas.microsoft.com/office/drawing/2010/main">
+                <a:solidFill>
+                  <a:srgbClr val="FFFFFF"/>
+                </a:solidFill>
+              </a14:hiddenFill>
+            </a:ext>
+          </a:extLst>
+        </p:spPr>
+      </p:pic>
+      <p:pic>
+        <p:nvPicPr>
+          <p:cNvPr id="5124" name="Picture 4" descr="Call me &#10;years ago--never mind &#10;how long precisely-having &#10;little or no money in my &#10;purse, and nothing &#10;particular to interest me on ">
+            <a:extLst>
+              <a:ext uri="{FF2B5EF4-FFF2-40B4-BE49-F238E27FC236}">
+                <a16:creationId xmlns:a16="http://schemas.microsoft.com/office/drawing/2014/main" id="{3BE3D156-1C2A-AD42-F4BD-0CBDDB18B0BD}"/>
+              </a:ext>
+            </a:extLst>
+          </p:cNvPr>
+          <p:cNvPicPr>
+            <a:picLocks noChangeAspect="1" noChangeArrowheads="1"/>
+          </p:cNvPicPr>
+          <p:nvPr/>
+        </p:nvPicPr>
+        <p:blipFill>
+          <a:blip r:embed="rId3">
+            <a:extLst>
+              <a:ext uri="{28A0092B-C50C-407E-A947-70E740481C1C}">
+                <a14:useLocalDpi xmlns:a14="http://schemas.microsoft.com/office/drawing/2010/main" val="0"/>
+              </a:ext>
+            </a:extLst>
+          </a:blip>
+          <a:srcRect/>
+          <a:stretch>
+            <a:fillRect/>
+          </a:stretch>
+        </p:blipFill>
+        <p:spPr bwMode="auto">
+          <a:xfrm>
+            <a:off x="3111776" y="4630185"/>
+            <a:ext cx="1571625" cy="1076325"/>
+          </a:xfrm>
+          <a:prstGeom prst="rect">
+            <a:avLst/>
+          </a:prstGeom>
+          <a:noFill/>
+          <a:extLst>
+            <a:ext uri="{909E8E84-426E-40DD-AFC4-6F175D3DCCD1}">
+              <a14:hiddenFill xmlns:a14="http://schemas.microsoft.com/office/drawing/2010/main">
+                <a:solidFill>
+                  <a:srgbClr val="FFFFFF"/>
+                </a:solidFill>
+              </a14:hiddenFill>
+            </a:ext>
+          </a:extLst>
+        </p:spPr>
+      </p:pic>
+    </p:spTree>
+    <p:extLst>
+      <p:ext uri="{BB962C8B-B14F-4D97-AF65-F5344CB8AC3E}">
+        <p14:creationId xmlns:p14="http://schemas.microsoft.com/office/powerpoint/2010/main" val="4159636948"/>
+      </p:ext>
+    </p:extLst>
+  </p:cSld>
+  <p:clrMapOvr>
+    <a:masterClrMapping/>
+  </p:clrMapOvr>
+</p:sld>
+</file>
+
+<file path=ppt/slides/slide47.xml><?xml version="1.0" encoding="utf-8"?>
+<p:sld xmlns:a="http://schemas.openxmlformats.org/drawingml/2006/main" xmlns:r="http://schemas.openxmlformats.org/officeDocument/2006/relationships" xmlns:p="http://schemas.openxmlformats.org/presentationml/2006/main">
+  <p:cSld>
+    <p:spTree>
+      <p:nvGrpSpPr>
+        <p:cNvPr id="1" name=""/>
+        <p:cNvGrpSpPr/>
+        <p:nvPr/>
+      </p:nvGrpSpPr>
+      <p:grpSpPr>
+        <a:xfrm>
+          <a:off x="0" y="0"/>
+          <a:ext cx="0" cy="0"/>
+          <a:chOff x="0" y="0"/>
+          <a:chExt cx="0" cy="0"/>
+        </a:xfrm>
+      </p:grpSpPr>
+      <p:sp>
+        <p:nvSpPr>
+          <p:cNvPr id="2" name="Title 1">
+            <a:extLst>
+              <a:ext uri="{FF2B5EF4-FFF2-40B4-BE49-F238E27FC236}">
+                <a16:creationId xmlns:a16="http://schemas.microsoft.com/office/drawing/2014/main" id="{D8943537-A737-BFED-5D55-27CB94DAA6DF}"/>
+              </a:ext>
+            </a:extLst>
+          </p:cNvPr>
+          <p:cNvSpPr>
+            <a:spLocks noGrp="1"/>
+          </p:cNvSpPr>
+          <p:nvPr>
+            <p:ph type="title"/>
+          </p:nvPr>
+        </p:nvSpPr>
+        <p:spPr/>
+        <p:txBody>
+          <a:bodyPr/>
+          <a:lstStyle/>
+          <a:p>
+            <a:r>
+              <a:rPr lang="en-US" dirty="0"/>
+              <a:t>Unit 8 – Control Survey</a:t>
+            </a:r>
+          </a:p>
+        </p:txBody>
+      </p:sp>
+      <p:sp>
+        <p:nvSpPr>
+          <p:cNvPr id="3" name="Content Placeholder 2">
+            <a:extLst>
+              <a:ext uri="{FF2B5EF4-FFF2-40B4-BE49-F238E27FC236}">
+                <a16:creationId xmlns:a16="http://schemas.microsoft.com/office/drawing/2014/main" id="{CD720548-BBD2-464F-398F-AE48D86B1EF9}"/>
+              </a:ext>
+            </a:extLst>
+          </p:cNvPr>
+          <p:cNvSpPr>
+            <a:spLocks noGrp="1"/>
+          </p:cNvSpPr>
+          <p:nvPr>
+            <p:ph idx="1"/>
+          </p:nvPr>
+        </p:nvSpPr>
+        <p:spPr>
+          <a:xfrm>
+            <a:off x="2589212" y="2128630"/>
+            <a:ext cx="8915400" cy="3777622"/>
+          </a:xfrm>
+        </p:spPr>
+        <p:txBody>
+          <a:bodyPr/>
+          <a:lstStyle/>
+          <a:p>
+            <a:r>
+              <a:rPr lang="en-US" dirty="0"/>
+              <a:t>&lt;Slider&gt; - Slide to set different values</a:t>
+            </a:r>
+          </a:p>
+          <a:p>
+            <a:endParaRPr lang="en-US" dirty="0"/>
+          </a:p>
+          <a:p>
+            <a:r>
+              <a:rPr lang="en-US" dirty="0"/>
+              <a:t>&lt;</a:t>
+            </a:r>
+            <a:r>
+              <a:rPr lang="en-US" dirty="0" err="1"/>
+              <a:t>ProgressBar</a:t>
+            </a:r>
+            <a:r>
+              <a:rPr lang="en-US" dirty="0"/>
+              <a:t>&gt; - show progress, determine or indeterminate</a:t>
+            </a:r>
+          </a:p>
+          <a:p>
+            <a:endParaRPr lang="en-US" dirty="0"/>
+          </a:p>
+          <a:p>
+            <a:endParaRPr lang="en-US" dirty="0"/>
+          </a:p>
+          <a:p>
+            <a:r>
+              <a:rPr lang="en-US" dirty="0"/>
+              <a:t>&lt;</a:t>
+            </a:r>
+            <a:r>
+              <a:rPr lang="en-US" dirty="0" err="1"/>
+              <a:t>DatePicker</a:t>
+            </a:r>
+            <a:r>
+              <a:rPr lang="en-US" dirty="0"/>
+              <a:t>&gt; - select a date</a:t>
+            </a:r>
+          </a:p>
+          <a:p>
+            <a:endParaRPr lang="en-US" dirty="0"/>
+          </a:p>
+          <a:p>
+            <a:endParaRPr lang="en-US" dirty="0"/>
+          </a:p>
+        </p:txBody>
+      </p:sp>
+      <p:pic>
+        <p:nvPicPr>
+          <p:cNvPr id="5" name="Picture 4">
+            <a:extLst>
+              <a:ext uri="{FF2B5EF4-FFF2-40B4-BE49-F238E27FC236}">
+                <a16:creationId xmlns:a16="http://schemas.microsoft.com/office/drawing/2014/main" id="{7A5004BA-4E68-C3E8-BB83-6FBFE6A2277D}"/>
+              </a:ext>
+            </a:extLst>
+          </p:cNvPr>
+          <p:cNvPicPr>
+            <a:picLocks noChangeAspect="1"/>
+          </p:cNvPicPr>
+          <p:nvPr/>
+        </p:nvPicPr>
+        <p:blipFill>
+          <a:blip r:embed="rId2"/>
+          <a:stretch>
+            <a:fillRect/>
+          </a:stretch>
+        </p:blipFill>
+        <p:spPr>
+          <a:xfrm>
+            <a:off x="3068499" y="2542968"/>
+            <a:ext cx="1095375" cy="390525"/>
+          </a:xfrm>
+          <a:prstGeom prst="rect">
+            <a:avLst/>
+          </a:prstGeom>
+        </p:spPr>
+      </p:pic>
+      <p:pic>
+        <p:nvPicPr>
+          <p:cNvPr id="6146" name="Picture 2" descr="Working . ">
+            <a:extLst>
+              <a:ext uri="{FF2B5EF4-FFF2-40B4-BE49-F238E27FC236}">
+                <a16:creationId xmlns:a16="http://schemas.microsoft.com/office/drawing/2014/main" id="{B63B8F07-B408-A0FC-8D18-56167FC7E176}"/>
+              </a:ext>
+            </a:extLst>
+          </p:cNvPr>
+          <p:cNvPicPr>
+            <a:picLocks noChangeAspect="1" noChangeArrowheads="1"/>
+          </p:cNvPicPr>
+          <p:nvPr/>
+        </p:nvPicPr>
+        <p:blipFill>
+          <a:blip r:embed="rId3">
+            <a:extLst>
+              <a:ext uri="{28A0092B-C50C-407E-A947-70E740481C1C}">
+                <a14:useLocalDpi xmlns:a14="http://schemas.microsoft.com/office/drawing/2010/main" val="0"/>
+              </a:ext>
+            </a:extLst>
+          </a:blip>
+          <a:srcRect/>
+          <a:stretch>
+            <a:fillRect/>
+          </a:stretch>
+        </p:blipFill>
+        <p:spPr bwMode="auto">
+          <a:xfrm>
+            <a:off x="3068499" y="3342861"/>
+            <a:ext cx="1514475" cy="523875"/>
+          </a:xfrm>
+          <a:prstGeom prst="rect">
+            <a:avLst/>
+          </a:prstGeom>
+          <a:noFill/>
+          <a:extLst>
+            <a:ext uri="{909E8E84-426E-40DD-AFC4-6F175D3DCCD1}">
+              <a14:hiddenFill xmlns:a14="http://schemas.microsoft.com/office/drawing/2010/main">
+                <a:solidFill>
+                  <a:srgbClr val="FFFFFF"/>
+                </a:solidFill>
+              </a14:hiddenFill>
+            </a:ext>
+          </a:extLst>
+        </p:spPr>
+      </p:pic>
+      <p:pic>
+        <p:nvPicPr>
+          <p:cNvPr id="6148" name="Picture 4" descr="S el ect a date &#10;August. 2010 &#10;Tu We &#10;Su MO &#10;25 26 &#10;27 &#10;10 &#10;17 &#10;24 &#10;31 &#10;28 &#10;11 &#10;18 &#10;as &#10;29 &#10;12 &#10;19 &#10;26 &#10;30 &#10;13 &#10;20 &#10;27 &#10;sa &#10;31 &#10;14 &#10;21 &#10;28 &#10;22 &#10;29 &#10;16 &#10;23 &#10;30 ">
+            <a:extLst>
+              <a:ext uri="{FF2B5EF4-FFF2-40B4-BE49-F238E27FC236}">
+                <a16:creationId xmlns:a16="http://schemas.microsoft.com/office/drawing/2014/main" id="{15ECE390-56A7-C671-B0F6-6797B7BD034A}"/>
+              </a:ext>
+            </a:extLst>
+          </p:cNvPr>
+          <p:cNvPicPr>
+            <a:picLocks noChangeAspect="1" noChangeArrowheads="1"/>
+          </p:cNvPicPr>
+          <p:nvPr/>
+        </p:nvPicPr>
+        <p:blipFill>
+          <a:blip r:embed="rId4">
+            <a:extLst>
+              <a:ext uri="{28A0092B-C50C-407E-A947-70E740481C1C}">
+                <a14:useLocalDpi xmlns:a14="http://schemas.microsoft.com/office/drawing/2010/main" val="0"/>
+              </a:ext>
+            </a:extLst>
+          </a:blip>
+          <a:srcRect/>
+          <a:stretch>
+            <a:fillRect/>
+          </a:stretch>
+        </p:blipFill>
+        <p:spPr bwMode="auto">
+          <a:xfrm>
+            <a:off x="3000168" y="4543632"/>
+            <a:ext cx="1838325" cy="1895475"/>
+          </a:xfrm>
+          <a:prstGeom prst="rect">
+            <a:avLst/>
+          </a:prstGeom>
+          <a:noFill/>
+          <a:extLst>
+            <a:ext uri="{909E8E84-426E-40DD-AFC4-6F175D3DCCD1}">
+              <a14:hiddenFill xmlns:a14="http://schemas.microsoft.com/office/drawing/2010/main">
+                <a:solidFill>
+                  <a:srgbClr val="FFFFFF"/>
+                </a:solidFill>
+              </a14:hiddenFill>
+            </a:ext>
+          </a:extLst>
+        </p:spPr>
+      </p:pic>
+    </p:spTree>
+    <p:extLst>
+      <p:ext uri="{BB962C8B-B14F-4D97-AF65-F5344CB8AC3E}">
+        <p14:creationId xmlns:p14="http://schemas.microsoft.com/office/powerpoint/2010/main" val="1536388918"/>
+      </p:ext>
+    </p:extLst>
+  </p:cSld>
+  <p:clrMapOvr>
+    <a:masterClrMapping/>
+  </p:clrMapOvr>
+</p:sld>
+</file>
+
+<file path=ppt/slides/slide48.xml><?xml version="1.0" encoding="utf-8"?>
+<p:sld xmlns:a="http://schemas.openxmlformats.org/drawingml/2006/main" xmlns:r="http://schemas.openxmlformats.org/officeDocument/2006/relationships" xmlns:p="http://schemas.openxmlformats.org/presentationml/2006/main">
+  <p:cSld>
+    <p:spTree>
+      <p:nvGrpSpPr>
+        <p:cNvPr id="1" name=""/>
+        <p:cNvGrpSpPr/>
+        <p:nvPr/>
+      </p:nvGrpSpPr>
+      <p:grpSpPr>
+        <a:xfrm>
+          <a:off x="0" y="0"/>
+          <a:ext cx="0" cy="0"/>
+          <a:chOff x="0" y="0"/>
+          <a:chExt cx="0" cy="0"/>
+        </a:xfrm>
+      </p:grpSpPr>
+      <p:sp>
+        <p:nvSpPr>
+          <p:cNvPr id="2" name="Title 1">
+            <a:extLst>
+              <a:ext uri="{FF2B5EF4-FFF2-40B4-BE49-F238E27FC236}">
+                <a16:creationId xmlns:a16="http://schemas.microsoft.com/office/drawing/2014/main" id="{E0B97F94-BBB4-09BB-A367-D69178AA8CE7}"/>
+              </a:ext>
+            </a:extLst>
+          </p:cNvPr>
+          <p:cNvSpPr>
+            <a:spLocks noGrp="1"/>
+          </p:cNvSpPr>
+          <p:nvPr>
+            <p:ph type="title"/>
+          </p:nvPr>
+        </p:nvSpPr>
+        <p:spPr/>
+        <p:txBody>
+          <a:bodyPr/>
+          <a:lstStyle/>
+          <a:p>
+            <a:r>
+              <a:rPr lang="en-US" dirty="0"/>
+              <a:t>Unit 8 – Control Survey</a:t>
+            </a:r>
+          </a:p>
+        </p:txBody>
+      </p:sp>
+      <p:sp>
+        <p:nvSpPr>
+          <p:cNvPr id="3" name="Content Placeholder 2">
+            <a:extLst>
+              <a:ext uri="{FF2B5EF4-FFF2-40B4-BE49-F238E27FC236}">
+                <a16:creationId xmlns:a16="http://schemas.microsoft.com/office/drawing/2014/main" id="{820C3C22-98AA-CCB7-F328-64AE09B1AC62}"/>
+              </a:ext>
+            </a:extLst>
+          </p:cNvPr>
+          <p:cNvSpPr>
+            <a:spLocks noGrp="1"/>
+          </p:cNvSpPr>
+          <p:nvPr>
+            <p:ph idx="1"/>
+          </p:nvPr>
+        </p:nvSpPr>
+        <p:spPr/>
+        <p:txBody>
+          <a:bodyPr/>
+          <a:lstStyle/>
+          <a:p>
+            <a:r>
+              <a:rPr lang="en-US" dirty="0" err="1"/>
+              <a:t>MTS.Controls</a:t>
+            </a:r>
+            <a:endParaRPr lang="en-US" dirty="0"/>
+          </a:p>
+          <a:p>
+            <a:pPr lvl="1"/>
+            <a:r>
+              <a:rPr lang="en-US" dirty="0"/>
+              <a:t>For MTS products, we also make use of custom controls from </a:t>
+            </a:r>
+            <a:r>
+              <a:rPr lang="en-US" dirty="0" err="1"/>
+              <a:t>MTS.Controls</a:t>
+            </a:r>
+            <a:r>
+              <a:rPr lang="en-US" dirty="0"/>
+              <a:t> project</a:t>
+            </a:r>
+          </a:p>
+          <a:p>
+            <a:pPr lvl="1"/>
+            <a:r>
+              <a:rPr lang="en-US" dirty="0"/>
+              <a:t>These are all customized versions of standard WPF controls</a:t>
+            </a:r>
+          </a:p>
+          <a:p>
+            <a:pPr lvl="2"/>
+            <a:r>
+              <a:rPr lang="en-US" dirty="0"/>
+              <a:t>Some composite controls, built up from basic controls</a:t>
+            </a:r>
+          </a:p>
+          <a:p>
+            <a:pPr lvl="1"/>
+            <a:r>
+              <a:rPr lang="en-US" dirty="0"/>
+              <a:t>Also default styles for built-in controls</a:t>
+            </a:r>
+          </a:p>
+          <a:p>
+            <a:pPr lvl="1"/>
+            <a:r>
+              <a:rPr lang="en-US" dirty="0"/>
+              <a:t>Can run Test App, found in </a:t>
+            </a:r>
+            <a:r>
+              <a:rPr lang="en-US" dirty="0" err="1"/>
+              <a:t>MTS.Controls</a:t>
+            </a:r>
+            <a:r>
+              <a:rPr lang="en-US" dirty="0"/>
+              <a:t> repo</a:t>
+            </a:r>
+          </a:p>
+        </p:txBody>
+      </p:sp>
+    </p:spTree>
+    <p:extLst>
+      <p:ext uri="{BB962C8B-B14F-4D97-AF65-F5344CB8AC3E}">
+        <p14:creationId xmlns:p14="http://schemas.microsoft.com/office/powerpoint/2010/main" val="3084536743"/>
+      </p:ext>
+    </p:extLst>
+  </p:cSld>
+  <p:clrMapOvr>
+    <a:masterClrMapping/>
+  </p:clrMapOvr>
+</p:sld>
+</file>
+
+<file path=ppt/slides/slide49.xml><?xml version="1.0" encoding="utf-8"?>
+<p:sld xmlns:a="http://schemas.openxmlformats.org/drawingml/2006/main" xmlns:r="http://schemas.openxmlformats.org/officeDocument/2006/relationships" xmlns:p="http://schemas.openxmlformats.org/presentationml/2006/main">
+  <p:cSld>
+    <p:spTree>
+      <p:nvGrpSpPr>
+        <p:cNvPr id="1" name=""/>
+        <p:cNvGrpSpPr/>
+        <p:nvPr/>
+      </p:nvGrpSpPr>
+      <p:grpSpPr>
+        <a:xfrm>
+          <a:off x="0" y="0"/>
+          <a:ext cx="0" cy="0"/>
+          <a:chOff x="0" y="0"/>
+          <a:chExt cx="0" cy="0"/>
+        </a:xfrm>
+      </p:grpSpPr>
+      <p:sp>
+        <p:nvSpPr>
+          <p:cNvPr id="2" name="Title 1">
+            <a:extLst>
+              <a:ext uri="{FF2B5EF4-FFF2-40B4-BE49-F238E27FC236}">
+                <a16:creationId xmlns:a16="http://schemas.microsoft.com/office/drawing/2014/main" id="{5E78A3C9-D59D-A5EF-B5E8-CF5CDF2A3E93}"/>
+              </a:ext>
+            </a:extLst>
+          </p:cNvPr>
+          <p:cNvSpPr>
+            <a:spLocks noGrp="1"/>
+          </p:cNvSpPr>
+          <p:nvPr>
+            <p:ph type="title"/>
+          </p:nvPr>
+        </p:nvSpPr>
+        <p:spPr/>
+        <p:txBody>
+          <a:bodyPr/>
+          <a:lstStyle/>
+          <a:p>
+            <a:r>
+              <a:rPr lang="en-US" dirty="0">
+                <a:solidFill>
+                  <a:schemeClr val="accent5">
+                    <a:lumMod val="75000"/>
+                  </a:schemeClr>
+                </a:solidFill>
+              </a:rPr>
+              <a:t>Exercise 8 – Control Survey</a:t>
+            </a:r>
+          </a:p>
+        </p:txBody>
+      </p:sp>
+      <p:sp>
+        <p:nvSpPr>
+          <p:cNvPr id="3" name="Content Placeholder 2">
+            <a:extLst>
+              <a:ext uri="{FF2B5EF4-FFF2-40B4-BE49-F238E27FC236}">
+                <a16:creationId xmlns:a16="http://schemas.microsoft.com/office/drawing/2014/main" id="{5E4C398A-2184-8928-1C5A-38F6C9F14782}"/>
+              </a:ext>
+            </a:extLst>
+          </p:cNvPr>
+          <p:cNvSpPr>
+            <a:spLocks noGrp="1"/>
+          </p:cNvSpPr>
+          <p:nvPr>
+            <p:ph idx="1"/>
+          </p:nvPr>
+        </p:nvSpPr>
+        <p:spPr/>
+        <p:txBody>
+          <a:bodyPr/>
+          <a:lstStyle/>
+          <a:p>
+            <a:r>
+              <a:rPr lang="en-US" dirty="0"/>
+              <a:t>What You’ll Learn</a:t>
+            </a:r>
+          </a:p>
+          <a:p>
+            <a:pPr lvl="1"/>
+            <a:r>
+              <a:rPr lang="en-US" dirty="0"/>
+              <a:t>What the main WPF controls are that you can use in an application</a:t>
+            </a:r>
+          </a:p>
+          <a:p>
+            <a:r>
+              <a:rPr lang="en-US" dirty="0"/>
+              <a:t>Exercise</a:t>
+            </a:r>
+          </a:p>
+          <a:p>
+            <a:pPr lvl="1"/>
+            <a:r>
+              <a:rPr lang="en-US" dirty="0"/>
+              <a:t>Create a new WPF project</a:t>
+            </a:r>
+          </a:p>
+          <a:p>
+            <a:pPr lvl="1"/>
+            <a:r>
+              <a:rPr lang="en-US" dirty="0"/>
+              <a:t>Experiment with different types of controls</a:t>
+            </a:r>
+          </a:p>
+          <a:p>
+            <a:pPr lvl="1"/>
+            <a:r>
+              <a:rPr lang="en-US" dirty="0"/>
+              <a:t>See project Exercise_8_Control_Survey_Solution for examples</a:t>
+            </a:r>
+          </a:p>
+        </p:txBody>
+      </p:sp>
+    </p:spTree>
+    <p:extLst>
+      <p:ext uri="{BB962C8B-B14F-4D97-AF65-F5344CB8AC3E}">
+        <p14:creationId xmlns:p14="http://schemas.microsoft.com/office/powerpoint/2010/main" val="3734995151"/>
       </p:ext>
     </p:extLst>
   </p:cSld>

</xml_diff>

<commit_message>
Finished adding content to PPT
</commit_message>
<xml_diff>
--- a/WPF-Workshop-Sexton-Oct2023.pptx
+++ b/WPF-Workshop-Sexton-Oct2023.pptx
@@ -5,7 +5,7 @@
     <p:sldMasterId id="2147483896" r:id="rId1"/>
   </p:sldMasterIdLst>
   <p:notesMasterIdLst>
-    <p:notesMasterId r:id="rId51"/>
+    <p:notesMasterId r:id="rId61"/>
   </p:notesMasterIdLst>
   <p:sldIdLst>
     <p:sldId id="256" r:id="rId2"/>
@@ -57,6 +57,16 @@
     <p:sldId id="303" r:id="rId48"/>
     <p:sldId id="304" r:id="rId49"/>
     <p:sldId id="305" r:id="rId50"/>
+    <p:sldId id="306" r:id="rId51"/>
+    <p:sldId id="307" r:id="rId52"/>
+    <p:sldId id="308" r:id="rId53"/>
+    <p:sldId id="309" r:id="rId54"/>
+    <p:sldId id="310" r:id="rId55"/>
+    <p:sldId id="311" r:id="rId56"/>
+    <p:sldId id="312" r:id="rId57"/>
+    <p:sldId id="313" r:id="rId58"/>
+    <p:sldId id="314" r:id="rId59"/>
+    <p:sldId id="315" r:id="rId60"/>
   </p:sldIdLst>
   <p:sldSz cx="12192000" cy="6858000"/>
   <p:notesSz cx="6858000" cy="9144000"/>
@@ -3800,6 +3810,271 @@
 </p:notes>
 </file>
 
+<file path=ppt/notesSlides/notesSlide38.xml><?xml version="1.0" encoding="utf-8"?>
+<p:notes xmlns:a="http://schemas.openxmlformats.org/drawingml/2006/main" xmlns:r="http://schemas.openxmlformats.org/officeDocument/2006/relationships" xmlns:p="http://schemas.openxmlformats.org/presentationml/2006/main">
+  <p:cSld>
+    <p:spTree>
+      <p:nvGrpSpPr>
+        <p:cNvPr id="1" name=""/>
+        <p:cNvGrpSpPr/>
+        <p:nvPr/>
+      </p:nvGrpSpPr>
+      <p:grpSpPr>
+        <a:xfrm>
+          <a:off x="0" y="0"/>
+          <a:ext cx="0" cy="0"/>
+          <a:chOff x="0" y="0"/>
+          <a:chExt cx="0" cy="0"/>
+        </a:xfrm>
+      </p:grpSpPr>
+      <p:sp>
+        <p:nvSpPr>
+          <p:cNvPr id="2" name="Slide Image Placeholder 1"/>
+          <p:cNvSpPr>
+            <a:spLocks noGrp="1" noRot="1" noChangeAspect="1"/>
+          </p:cNvSpPr>
+          <p:nvPr>
+            <p:ph type="sldImg"/>
+          </p:nvPr>
+        </p:nvSpPr>
+        <p:spPr/>
+      </p:sp>
+      <p:sp>
+        <p:nvSpPr>
+          <p:cNvPr id="3" name="Notes Placeholder 2"/>
+          <p:cNvSpPr>
+            <a:spLocks noGrp="1"/>
+          </p:cNvSpPr>
+          <p:nvPr>
+            <p:ph type="body" idx="1"/>
+          </p:nvPr>
+        </p:nvSpPr>
+        <p:spPr/>
+        <p:txBody>
+          <a:bodyPr/>
+          <a:lstStyle/>
+          <a:p>
+            <a:r>
+              <a:rPr lang="en-US" dirty="0"/>
+              <a:t>LAST: Example</a:t>
+            </a:r>
+          </a:p>
+          <a:p>
+            <a:r>
+              <a:rPr lang="en-US" dirty="0"/>
+              <a:t>-  Look at Button and </a:t>
+            </a:r>
+            <a:r>
+              <a:rPr lang="en-US" dirty="0" err="1"/>
+              <a:t>TextBlock</a:t>
+            </a:r>
+            <a:endParaRPr lang="en-US" dirty="0"/>
+          </a:p>
+          <a:p>
+            <a:r>
+              <a:rPr lang="en-US" dirty="0"/>
+              <a:t>-  Ctrl-Shift</a:t>
+            </a:r>
+          </a:p>
+          <a:p>
+            <a:r>
+              <a:rPr lang="en-US" dirty="0"/>
+              <a:t>-  So a Button is built up from constituent controls</a:t>
+            </a:r>
+          </a:p>
+          <a:p>
+            <a:r>
+              <a:rPr lang="en-US" dirty="0"/>
+              <a:t>-  Visual tree</a:t>
+            </a:r>
+          </a:p>
+          <a:p>
+            <a:endParaRPr lang="en-US" dirty="0"/>
+          </a:p>
+        </p:txBody>
+      </p:sp>
+      <p:sp>
+        <p:nvSpPr>
+          <p:cNvPr id="4" name="Slide Number Placeholder 3"/>
+          <p:cNvSpPr>
+            <a:spLocks noGrp="1"/>
+          </p:cNvSpPr>
+          <p:nvPr>
+            <p:ph type="sldNum" sz="quarter" idx="5"/>
+          </p:nvPr>
+        </p:nvSpPr>
+        <p:spPr/>
+        <p:txBody>
+          <a:bodyPr/>
+          <a:lstStyle/>
+          <a:p>
+            <a:fld id="{52D86A8A-0D3B-4DD1-BCA4-15D29761E8A6}" type="slidenum">
+              <a:rPr lang="en-US" smtClean="0"/>
+              <a:t>50</a:t>
+            </a:fld>
+            <a:endParaRPr lang="en-US"/>
+          </a:p>
+        </p:txBody>
+      </p:sp>
+    </p:spTree>
+    <p:extLst>
+      <p:ext uri="{BB962C8B-B14F-4D97-AF65-F5344CB8AC3E}">
+        <p14:creationId xmlns:p14="http://schemas.microsoft.com/office/powerpoint/2010/main" val="1521262102"/>
+      </p:ext>
+    </p:extLst>
+  </p:cSld>
+  <p:clrMapOvr>
+    <a:masterClrMapping/>
+  </p:clrMapOvr>
+</p:notes>
+</file>
+
+<file path=ppt/notesSlides/notesSlide39.xml><?xml version="1.0" encoding="utf-8"?>
+<p:notes xmlns:a="http://schemas.openxmlformats.org/drawingml/2006/main" xmlns:r="http://schemas.openxmlformats.org/officeDocument/2006/relationships" xmlns:p="http://schemas.openxmlformats.org/presentationml/2006/main">
+  <p:cSld>
+    <p:spTree>
+      <p:nvGrpSpPr>
+        <p:cNvPr id="1" name=""/>
+        <p:cNvGrpSpPr/>
+        <p:nvPr/>
+      </p:nvGrpSpPr>
+      <p:grpSpPr>
+        <a:xfrm>
+          <a:off x="0" y="0"/>
+          <a:ext cx="0" cy="0"/>
+          <a:chOff x="0" y="0"/>
+          <a:chExt cx="0" cy="0"/>
+        </a:xfrm>
+      </p:grpSpPr>
+      <p:sp>
+        <p:nvSpPr>
+          <p:cNvPr id="2" name="Slide Image Placeholder 1"/>
+          <p:cNvSpPr>
+            <a:spLocks noGrp="1" noRot="1" noChangeAspect="1"/>
+          </p:cNvSpPr>
+          <p:nvPr>
+            <p:ph type="sldImg"/>
+          </p:nvPr>
+        </p:nvSpPr>
+        <p:spPr/>
+      </p:sp>
+      <p:sp>
+        <p:nvSpPr>
+          <p:cNvPr id="3" name="Notes Placeholder 2"/>
+          <p:cNvSpPr>
+            <a:spLocks noGrp="1"/>
+          </p:cNvSpPr>
+          <p:nvPr>
+            <p:ph type="body" idx="1"/>
+          </p:nvPr>
+        </p:nvSpPr>
+        <p:spPr/>
+        <p:txBody>
+          <a:bodyPr/>
+          <a:lstStyle/>
+          <a:p>
+            <a:r>
+              <a:rPr lang="en-US" dirty="0"/>
+              <a:t>LAST: Example</a:t>
+            </a:r>
+          </a:p>
+          <a:p>
+            <a:r>
+              <a:rPr lang="en-US" dirty="0"/>
+              <a:t>-  Walk thru steps above</a:t>
+            </a:r>
+          </a:p>
+          <a:p>
+            <a:r>
+              <a:rPr lang="en-US" dirty="0"/>
+              <a:t>-  Talk through pieces of control template, starting with the Button</a:t>
+            </a:r>
+          </a:p>
+          <a:p>
+            <a:r>
+              <a:rPr lang="en-US" dirty="0"/>
+              <a:t>-  Can see logic for what happens when you hover over button</a:t>
+            </a:r>
+          </a:p>
+          <a:p>
+            <a:r>
+              <a:rPr lang="en-US" dirty="0"/>
+              <a:t>-  Triggers - when property changes, change something else</a:t>
+            </a:r>
+          </a:p>
+          <a:p>
+            <a:r>
+              <a:rPr lang="en-US" dirty="0"/>
+              <a:t>-  </a:t>
+            </a:r>
+            <a:r>
+              <a:rPr lang="en-US" dirty="0" err="1"/>
+              <a:t>ContentPresenter</a:t>
+            </a:r>
+            <a:r>
+              <a:rPr lang="en-US" dirty="0"/>
+              <a:t> - placeholder for control's Content</a:t>
+            </a:r>
+          </a:p>
+          <a:p>
+            <a:r>
+              <a:rPr lang="en-US" dirty="0"/>
+              <a:t>-  Note Content property--just text</a:t>
+            </a:r>
+          </a:p>
+          <a:p>
+            <a:r>
+              <a:rPr lang="en-US" dirty="0"/>
+              <a:t>-  This gives you an idea of what's possible--overriding look and feel of a control </a:t>
+            </a:r>
+          </a:p>
+          <a:p>
+            <a:r>
+              <a:rPr lang="en-US" dirty="0"/>
+              <a:t>    - And some behaviors</a:t>
+            </a:r>
+          </a:p>
+          <a:p>
+            <a:endParaRPr lang="en-US" dirty="0"/>
+          </a:p>
+        </p:txBody>
+      </p:sp>
+      <p:sp>
+        <p:nvSpPr>
+          <p:cNvPr id="4" name="Slide Number Placeholder 3"/>
+          <p:cNvSpPr>
+            <a:spLocks noGrp="1"/>
+          </p:cNvSpPr>
+          <p:nvPr>
+            <p:ph type="sldNum" sz="quarter" idx="5"/>
+          </p:nvPr>
+        </p:nvSpPr>
+        <p:spPr/>
+        <p:txBody>
+          <a:bodyPr/>
+          <a:lstStyle/>
+          <a:p>
+            <a:fld id="{52D86A8A-0D3B-4DD1-BCA4-15D29761E8A6}" type="slidenum">
+              <a:rPr lang="en-US" smtClean="0"/>
+              <a:t>51</a:t>
+            </a:fld>
+            <a:endParaRPr lang="en-US"/>
+          </a:p>
+        </p:txBody>
+      </p:sp>
+    </p:spTree>
+    <p:extLst>
+      <p:ext uri="{BB962C8B-B14F-4D97-AF65-F5344CB8AC3E}">
+        <p14:creationId xmlns:p14="http://schemas.microsoft.com/office/powerpoint/2010/main" val="3879459969"/>
+      </p:ext>
+    </p:extLst>
+  </p:cSld>
+  <p:clrMapOvr>
+    <a:masterClrMapping/>
+  </p:clrMapOvr>
+</p:notes>
+</file>
+
 <file path=ppt/notesSlides/notesSlide4.xml><?xml version="1.0" encoding="utf-8"?>
 <p:notes xmlns:a="http://schemas.openxmlformats.org/drawingml/2006/main" xmlns:r="http://schemas.openxmlformats.org/officeDocument/2006/relationships" xmlns:p="http://schemas.openxmlformats.org/presentationml/2006/main">
   <p:cSld>
@@ -3878,6 +4153,438 @@
     <p:extLst>
       <p:ext uri="{BB962C8B-B14F-4D97-AF65-F5344CB8AC3E}">
         <p14:creationId xmlns:p14="http://schemas.microsoft.com/office/powerpoint/2010/main" val="3213769857"/>
+      </p:ext>
+    </p:extLst>
+  </p:cSld>
+  <p:clrMapOvr>
+    <a:masterClrMapping/>
+  </p:clrMapOvr>
+</p:notes>
+</file>
+
+<file path=ppt/notesSlides/notesSlide40.xml><?xml version="1.0" encoding="utf-8"?>
+<p:notes xmlns:a="http://schemas.openxmlformats.org/drawingml/2006/main" xmlns:r="http://schemas.openxmlformats.org/officeDocument/2006/relationships" xmlns:p="http://schemas.openxmlformats.org/presentationml/2006/main">
+  <p:cSld>
+    <p:spTree>
+      <p:nvGrpSpPr>
+        <p:cNvPr id="1" name=""/>
+        <p:cNvGrpSpPr/>
+        <p:nvPr/>
+      </p:nvGrpSpPr>
+      <p:grpSpPr>
+        <a:xfrm>
+          <a:off x="0" y="0"/>
+          <a:ext cx="0" cy="0"/>
+          <a:chOff x="0" y="0"/>
+          <a:chExt cx="0" cy="0"/>
+        </a:xfrm>
+      </p:grpSpPr>
+      <p:sp>
+        <p:nvSpPr>
+          <p:cNvPr id="2" name="Slide Image Placeholder 1"/>
+          <p:cNvSpPr>
+            <a:spLocks noGrp="1" noRot="1" noChangeAspect="1"/>
+          </p:cNvSpPr>
+          <p:nvPr>
+            <p:ph type="sldImg"/>
+          </p:nvPr>
+        </p:nvSpPr>
+        <p:spPr/>
+      </p:sp>
+      <p:sp>
+        <p:nvSpPr>
+          <p:cNvPr id="3" name="Notes Placeholder 2"/>
+          <p:cNvSpPr>
+            <a:spLocks noGrp="1"/>
+          </p:cNvSpPr>
+          <p:nvPr>
+            <p:ph type="body" idx="1"/>
+          </p:nvPr>
+        </p:nvSpPr>
+        <p:spPr/>
+        <p:txBody>
+          <a:bodyPr/>
+          <a:lstStyle/>
+          <a:p>
+            <a:r>
+              <a:rPr lang="en-US" dirty="0"/>
+              <a:t>LAST: It is very common</a:t>
+            </a:r>
+          </a:p>
+          <a:p>
+            <a:endParaRPr lang="en-US" dirty="0"/>
+          </a:p>
+        </p:txBody>
+      </p:sp>
+      <p:sp>
+        <p:nvSpPr>
+          <p:cNvPr id="4" name="Slide Number Placeholder 3"/>
+          <p:cNvSpPr>
+            <a:spLocks noGrp="1"/>
+          </p:cNvSpPr>
+          <p:nvPr>
+            <p:ph type="sldNum" sz="quarter" idx="5"/>
+          </p:nvPr>
+        </p:nvSpPr>
+        <p:spPr/>
+        <p:txBody>
+          <a:bodyPr/>
+          <a:lstStyle/>
+          <a:p>
+            <a:fld id="{52D86A8A-0D3B-4DD1-BCA4-15D29761E8A6}" type="slidenum">
+              <a:rPr lang="en-US" smtClean="0"/>
+              <a:t>52</a:t>
+            </a:fld>
+            <a:endParaRPr lang="en-US"/>
+          </a:p>
+        </p:txBody>
+      </p:sp>
+    </p:spTree>
+    <p:extLst>
+      <p:ext uri="{BB962C8B-B14F-4D97-AF65-F5344CB8AC3E}">
+        <p14:creationId xmlns:p14="http://schemas.microsoft.com/office/powerpoint/2010/main" val="2844434021"/>
+      </p:ext>
+    </p:extLst>
+  </p:cSld>
+  <p:clrMapOvr>
+    <a:masterClrMapping/>
+  </p:clrMapOvr>
+</p:notes>
+</file>
+
+<file path=ppt/notesSlides/notesSlide41.xml><?xml version="1.0" encoding="utf-8"?>
+<p:notes xmlns:a="http://schemas.openxmlformats.org/drawingml/2006/main" xmlns:r="http://schemas.openxmlformats.org/officeDocument/2006/relationships" xmlns:p="http://schemas.openxmlformats.org/presentationml/2006/main">
+  <p:cSld>
+    <p:spTree>
+      <p:nvGrpSpPr>
+        <p:cNvPr id="1" name=""/>
+        <p:cNvGrpSpPr/>
+        <p:nvPr/>
+      </p:nvGrpSpPr>
+      <p:grpSpPr>
+        <a:xfrm>
+          <a:off x="0" y="0"/>
+          <a:ext cx="0" cy="0"/>
+          <a:chOff x="0" y="0"/>
+          <a:chExt cx="0" cy="0"/>
+        </a:xfrm>
+      </p:grpSpPr>
+      <p:sp>
+        <p:nvSpPr>
+          <p:cNvPr id="2" name="Slide Image Placeholder 1"/>
+          <p:cNvSpPr>
+            <a:spLocks noGrp="1" noRot="1" noChangeAspect="1"/>
+          </p:cNvSpPr>
+          <p:nvPr>
+            <p:ph type="sldImg"/>
+          </p:nvPr>
+        </p:nvSpPr>
+        <p:spPr/>
+      </p:sp>
+      <p:sp>
+        <p:nvSpPr>
+          <p:cNvPr id="3" name="Notes Placeholder 2"/>
+          <p:cNvSpPr>
+            <a:spLocks noGrp="1"/>
+          </p:cNvSpPr>
+          <p:nvPr>
+            <p:ph type="body" idx="1"/>
+          </p:nvPr>
+        </p:nvSpPr>
+        <p:spPr/>
+        <p:txBody>
+          <a:bodyPr/>
+          <a:lstStyle/>
+          <a:p>
+            <a:r>
+              <a:rPr lang="en-US" dirty="0"/>
+              <a:t>LAST: Alternatives</a:t>
+            </a:r>
+          </a:p>
+        </p:txBody>
+      </p:sp>
+      <p:sp>
+        <p:nvSpPr>
+          <p:cNvPr id="4" name="Slide Number Placeholder 3"/>
+          <p:cNvSpPr>
+            <a:spLocks noGrp="1"/>
+          </p:cNvSpPr>
+          <p:nvPr>
+            <p:ph type="sldNum" sz="quarter" idx="5"/>
+          </p:nvPr>
+        </p:nvSpPr>
+        <p:spPr/>
+        <p:txBody>
+          <a:bodyPr/>
+          <a:lstStyle/>
+          <a:p>
+            <a:fld id="{52D86A8A-0D3B-4DD1-BCA4-15D29761E8A6}" type="slidenum">
+              <a:rPr lang="en-US" smtClean="0"/>
+              <a:t>53</a:t>
+            </a:fld>
+            <a:endParaRPr lang="en-US"/>
+          </a:p>
+        </p:txBody>
+      </p:sp>
+    </p:spTree>
+    <p:extLst>
+      <p:ext uri="{BB962C8B-B14F-4D97-AF65-F5344CB8AC3E}">
+        <p14:creationId xmlns:p14="http://schemas.microsoft.com/office/powerpoint/2010/main" val="1948620501"/>
+      </p:ext>
+    </p:extLst>
+  </p:cSld>
+  <p:clrMapOvr>
+    <a:masterClrMapping/>
+  </p:clrMapOvr>
+</p:notes>
+</file>
+
+<file path=ppt/notesSlides/notesSlide42.xml><?xml version="1.0" encoding="utf-8"?>
+<p:notes xmlns:a="http://schemas.openxmlformats.org/drawingml/2006/main" xmlns:r="http://schemas.openxmlformats.org/officeDocument/2006/relationships" xmlns:p="http://schemas.openxmlformats.org/presentationml/2006/main">
+  <p:cSld>
+    <p:spTree>
+      <p:nvGrpSpPr>
+        <p:cNvPr id="1" name=""/>
+        <p:cNvGrpSpPr/>
+        <p:nvPr/>
+      </p:nvGrpSpPr>
+      <p:grpSpPr>
+        <a:xfrm>
+          <a:off x="0" y="0"/>
+          <a:ext cx="0" cy="0"/>
+          <a:chOff x="0" y="0"/>
+          <a:chExt cx="0" cy="0"/>
+        </a:xfrm>
+      </p:grpSpPr>
+      <p:sp>
+        <p:nvSpPr>
+          <p:cNvPr id="2" name="Slide Image Placeholder 1"/>
+          <p:cNvSpPr>
+            <a:spLocks noGrp="1" noRot="1" noChangeAspect="1"/>
+          </p:cNvSpPr>
+          <p:nvPr>
+            <p:ph type="sldImg"/>
+          </p:nvPr>
+        </p:nvSpPr>
+        <p:spPr/>
+      </p:sp>
+      <p:sp>
+        <p:nvSpPr>
+          <p:cNvPr id="3" name="Notes Placeholder 2"/>
+          <p:cNvSpPr>
+            <a:spLocks noGrp="1"/>
+          </p:cNvSpPr>
+          <p:nvPr>
+            <p:ph type="body" idx="1"/>
+          </p:nvPr>
+        </p:nvSpPr>
+        <p:spPr/>
+        <p:txBody>
+          <a:bodyPr/>
+          <a:lstStyle/>
+          <a:p>
+            <a:r>
+              <a:rPr lang="en-US" dirty="0"/>
+              <a:t>- Just pointing out that we've just barely scratched the surface; this stuff is all common in a typical WPF production application</a:t>
+            </a:r>
+          </a:p>
+        </p:txBody>
+      </p:sp>
+      <p:sp>
+        <p:nvSpPr>
+          <p:cNvPr id="4" name="Slide Number Placeholder 3"/>
+          <p:cNvSpPr>
+            <a:spLocks noGrp="1"/>
+          </p:cNvSpPr>
+          <p:nvPr>
+            <p:ph type="sldNum" sz="quarter" idx="5"/>
+          </p:nvPr>
+        </p:nvSpPr>
+        <p:spPr/>
+        <p:txBody>
+          <a:bodyPr/>
+          <a:lstStyle/>
+          <a:p>
+            <a:fld id="{52D86A8A-0D3B-4DD1-BCA4-15D29761E8A6}" type="slidenum">
+              <a:rPr lang="en-US" smtClean="0"/>
+              <a:t>56</a:t>
+            </a:fld>
+            <a:endParaRPr lang="en-US"/>
+          </a:p>
+        </p:txBody>
+      </p:sp>
+    </p:spTree>
+    <p:extLst>
+      <p:ext uri="{BB962C8B-B14F-4D97-AF65-F5344CB8AC3E}">
+        <p14:creationId xmlns:p14="http://schemas.microsoft.com/office/powerpoint/2010/main" val="2037246118"/>
+      </p:ext>
+    </p:extLst>
+  </p:cSld>
+  <p:clrMapOvr>
+    <a:masterClrMapping/>
+  </p:clrMapOvr>
+</p:notes>
+</file>
+
+<file path=ppt/notesSlides/notesSlide43.xml><?xml version="1.0" encoding="utf-8"?>
+<p:notes xmlns:a="http://schemas.openxmlformats.org/drawingml/2006/main" xmlns:r="http://schemas.openxmlformats.org/officeDocument/2006/relationships" xmlns:p="http://schemas.openxmlformats.org/presentationml/2006/main">
+  <p:cSld>
+    <p:spTree>
+      <p:nvGrpSpPr>
+        <p:cNvPr id="1" name=""/>
+        <p:cNvGrpSpPr/>
+        <p:nvPr/>
+      </p:nvGrpSpPr>
+      <p:grpSpPr>
+        <a:xfrm>
+          <a:off x="0" y="0"/>
+          <a:ext cx="0" cy="0"/>
+          <a:chOff x="0" y="0"/>
+          <a:chExt cx="0" cy="0"/>
+        </a:xfrm>
+      </p:grpSpPr>
+      <p:sp>
+        <p:nvSpPr>
+          <p:cNvPr id="2" name="Slide Image Placeholder 1"/>
+          <p:cNvSpPr>
+            <a:spLocks noGrp="1" noRot="1" noChangeAspect="1"/>
+          </p:cNvSpPr>
+          <p:nvPr>
+            <p:ph type="sldImg"/>
+          </p:nvPr>
+        </p:nvSpPr>
+        <p:spPr/>
+      </p:sp>
+      <p:sp>
+        <p:nvSpPr>
+          <p:cNvPr id="3" name="Notes Placeholder 2"/>
+          <p:cNvSpPr>
+            <a:spLocks noGrp="1"/>
+          </p:cNvSpPr>
+          <p:nvPr>
+            <p:ph type="body" idx="1"/>
+          </p:nvPr>
+        </p:nvSpPr>
+        <p:spPr/>
+        <p:txBody>
+          <a:bodyPr/>
+          <a:lstStyle/>
+          <a:p>
+            <a:endParaRPr lang="en-US" dirty="0"/>
+          </a:p>
+        </p:txBody>
+      </p:sp>
+      <p:sp>
+        <p:nvSpPr>
+          <p:cNvPr id="4" name="Slide Number Placeholder 3"/>
+          <p:cNvSpPr>
+            <a:spLocks noGrp="1"/>
+          </p:cNvSpPr>
+          <p:nvPr>
+            <p:ph type="sldNum" sz="quarter" idx="5"/>
+          </p:nvPr>
+        </p:nvSpPr>
+        <p:spPr/>
+        <p:txBody>
+          <a:bodyPr/>
+          <a:lstStyle/>
+          <a:p>
+            <a:fld id="{52D86A8A-0D3B-4DD1-BCA4-15D29761E8A6}" type="slidenum">
+              <a:rPr lang="en-US" smtClean="0"/>
+              <a:t>58</a:t>
+            </a:fld>
+            <a:endParaRPr lang="en-US"/>
+          </a:p>
+        </p:txBody>
+      </p:sp>
+    </p:spTree>
+    <p:extLst>
+      <p:ext uri="{BB962C8B-B14F-4D97-AF65-F5344CB8AC3E}">
+        <p14:creationId xmlns:p14="http://schemas.microsoft.com/office/powerpoint/2010/main" val="3998156340"/>
+      </p:ext>
+    </p:extLst>
+  </p:cSld>
+  <p:clrMapOvr>
+    <a:masterClrMapping/>
+  </p:clrMapOvr>
+</p:notes>
+</file>
+
+<file path=ppt/notesSlides/notesSlide44.xml><?xml version="1.0" encoding="utf-8"?>
+<p:notes xmlns:a="http://schemas.openxmlformats.org/drawingml/2006/main" xmlns:r="http://schemas.openxmlformats.org/officeDocument/2006/relationships" xmlns:p="http://schemas.openxmlformats.org/presentationml/2006/main">
+  <p:cSld>
+    <p:spTree>
+      <p:nvGrpSpPr>
+        <p:cNvPr id="1" name=""/>
+        <p:cNvGrpSpPr/>
+        <p:nvPr/>
+      </p:nvGrpSpPr>
+      <p:grpSpPr>
+        <a:xfrm>
+          <a:off x="0" y="0"/>
+          <a:ext cx="0" cy="0"/>
+          <a:chOff x="0" y="0"/>
+          <a:chExt cx="0" cy="0"/>
+        </a:xfrm>
+      </p:grpSpPr>
+      <p:sp>
+        <p:nvSpPr>
+          <p:cNvPr id="2" name="Slide Image Placeholder 1"/>
+          <p:cNvSpPr>
+            <a:spLocks noGrp="1" noRot="1" noChangeAspect="1"/>
+          </p:cNvSpPr>
+          <p:nvPr>
+            <p:ph type="sldImg"/>
+          </p:nvPr>
+        </p:nvSpPr>
+        <p:spPr/>
+      </p:sp>
+      <p:sp>
+        <p:nvSpPr>
+          <p:cNvPr id="3" name="Notes Placeholder 2"/>
+          <p:cNvSpPr>
+            <a:spLocks noGrp="1"/>
+          </p:cNvSpPr>
+          <p:nvPr>
+            <p:ph type="body" idx="1"/>
+          </p:nvPr>
+        </p:nvSpPr>
+        <p:spPr/>
+        <p:txBody>
+          <a:bodyPr/>
+          <a:lstStyle/>
+          <a:p>
+            <a:endParaRPr lang="en-US" dirty="0"/>
+          </a:p>
+        </p:txBody>
+      </p:sp>
+      <p:sp>
+        <p:nvSpPr>
+          <p:cNvPr id="4" name="Slide Number Placeholder 3"/>
+          <p:cNvSpPr>
+            <a:spLocks noGrp="1"/>
+          </p:cNvSpPr>
+          <p:nvPr>
+            <p:ph type="sldNum" sz="quarter" idx="5"/>
+          </p:nvPr>
+        </p:nvSpPr>
+        <p:spPr/>
+        <p:txBody>
+          <a:bodyPr/>
+          <a:lstStyle/>
+          <a:p>
+            <a:fld id="{52D86A8A-0D3B-4DD1-BCA4-15D29761E8A6}" type="slidenum">
+              <a:rPr lang="en-US" smtClean="0"/>
+              <a:t>59</a:t>
+            </a:fld>
+            <a:endParaRPr lang="en-US"/>
+          </a:p>
+        </p:txBody>
+      </p:sp>
+    </p:spTree>
+    <p:extLst>
+      <p:ext uri="{BB962C8B-B14F-4D97-AF65-F5344CB8AC3E}">
+        <p14:creationId xmlns:p14="http://schemas.microsoft.com/office/powerpoint/2010/main" val="1088505115"/>
       </p:ext>
     </p:extLst>
   </p:cSld>
@@ -30728,6 +31435,387 @@
   <p:clrMapOvr>
     <a:masterClrMapping/>
   </p:clrMapOvr>
+  <p:timing>
+    <p:tnLst>
+      <p:par>
+        <p:cTn id="1" dur="indefinite" restart="never" nodeType="tmRoot">
+          <p:childTnLst>
+            <p:seq concurrent="1" nextAc="seek">
+              <p:cTn id="2" dur="indefinite" nodeType="mainSeq">
+                <p:childTnLst>
+                  <p:par>
+                    <p:cTn id="3" fill="hold">
+                      <p:stCondLst>
+                        <p:cond delay="indefinite"/>
+                      </p:stCondLst>
+                      <p:childTnLst>
+                        <p:par>
+                          <p:cTn id="4" fill="hold">
+                            <p:stCondLst>
+                              <p:cond delay="0"/>
+                            </p:stCondLst>
+                            <p:childTnLst>
+                              <p:par>
+                                <p:cTn id="5" presetID="10" presetClass="entr" presetSubtype="0" fill="hold" grpId="0" nodeType="clickEffect">
+                                  <p:stCondLst>
+                                    <p:cond delay="0"/>
+                                  </p:stCondLst>
+                                  <p:childTnLst>
+                                    <p:set>
+                                      <p:cBhvr>
+                                        <p:cTn id="6" dur="1" fill="hold">
+                                          <p:stCondLst>
+                                            <p:cond delay="0"/>
+                                          </p:stCondLst>
+                                        </p:cTn>
+                                        <p:tgtEl>
+                                          <p:spTgt spid="3">
+                                            <p:txEl>
+                                              <p:pRg st="0" end="0"/>
+                                            </p:txEl>
+                                          </p:spTgt>
+                                        </p:tgtEl>
+                                        <p:attrNameLst>
+                                          <p:attrName>style.visibility</p:attrName>
+                                        </p:attrNameLst>
+                                      </p:cBhvr>
+                                      <p:to>
+                                        <p:strVal val="visible"/>
+                                      </p:to>
+                                    </p:set>
+                                    <p:animEffect transition="in" filter="fade">
+                                      <p:cBhvr>
+                                        <p:cTn id="7" dur="500"/>
+                                        <p:tgtEl>
+                                          <p:spTgt spid="3">
+                                            <p:txEl>
+                                              <p:pRg st="0" end="0"/>
+                                            </p:txEl>
+                                          </p:spTgt>
+                                        </p:tgtEl>
+                                      </p:cBhvr>
+                                    </p:animEffect>
+                                  </p:childTnLst>
+                                </p:cTn>
+                              </p:par>
+                            </p:childTnLst>
+                          </p:cTn>
+                        </p:par>
+                      </p:childTnLst>
+                    </p:cTn>
+                  </p:par>
+                  <p:par>
+                    <p:cTn id="8" fill="hold">
+                      <p:stCondLst>
+                        <p:cond delay="indefinite"/>
+                      </p:stCondLst>
+                      <p:childTnLst>
+                        <p:par>
+                          <p:cTn id="9" fill="hold">
+                            <p:stCondLst>
+                              <p:cond delay="0"/>
+                            </p:stCondLst>
+                            <p:childTnLst>
+                              <p:par>
+                                <p:cTn id="10" presetID="10" presetClass="entr" presetSubtype="0" fill="hold" grpId="0" nodeType="clickEffect">
+                                  <p:stCondLst>
+                                    <p:cond delay="0"/>
+                                  </p:stCondLst>
+                                  <p:childTnLst>
+                                    <p:set>
+                                      <p:cBhvr>
+                                        <p:cTn id="11" dur="1" fill="hold">
+                                          <p:stCondLst>
+                                            <p:cond delay="0"/>
+                                          </p:stCondLst>
+                                        </p:cTn>
+                                        <p:tgtEl>
+                                          <p:spTgt spid="3">
+                                            <p:txEl>
+                                              <p:pRg st="1" end="1"/>
+                                            </p:txEl>
+                                          </p:spTgt>
+                                        </p:tgtEl>
+                                        <p:attrNameLst>
+                                          <p:attrName>style.visibility</p:attrName>
+                                        </p:attrNameLst>
+                                      </p:cBhvr>
+                                      <p:to>
+                                        <p:strVal val="visible"/>
+                                      </p:to>
+                                    </p:set>
+                                    <p:animEffect transition="in" filter="fade">
+                                      <p:cBhvr>
+                                        <p:cTn id="12" dur="500"/>
+                                        <p:tgtEl>
+                                          <p:spTgt spid="3">
+                                            <p:txEl>
+                                              <p:pRg st="1" end="1"/>
+                                            </p:txEl>
+                                          </p:spTgt>
+                                        </p:tgtEl>
+                                      </p:cBhvr>
+                                    </p:animEffect>
+                                  </p:childTnLst>
+                                </p:cTn>
+                              </p:par>
+                            </p:childTnLst>
+                          </p:cTn>
+                        </p:par>
+                      </p:childTnLst>
+                    </p:cTn>
+                  </p:par>
+                  <p:par>
+                    <p:cTn id="13" fill="hold">
+                      <p:stCondLst>
+                        <p:cond delay="indefinite"/>
+                      </p:stCondLst>
+                      <p:childTnLst>
+                        <p:par>
+                          <p:cTn id="14" fill="hold">
+                            <p:stCondLst>
+                              <p:cond delay="0"/>
+                            </p:stCondLst>
+                            <p:childTnLst>
+                              <p:par>
+                                <p:cTn id="15" presetID="10" presetClass="entr" presetSubtype="0" fill="hold" grpId="0" nodeType="clickEffect">
+                                  <p:stCondLst>
+                                    <p:cond delay="0"/>
+                                  </p:stCondLst>
+                                  <p:childTnLst>
+                                    <p:set>
+                                      <p:cBhvr>
+                                        <p:cTn id="16" dur="1" fill="hold">
+                                          <p:stCondLst>
+                                            <p:cond delay="0"/>
+                                          </p:stCondLst>
+                                        </p:cTn>
+                                        <p:tgtEl>
+                                          <p:spTgt spid="3">
+                                            <p:txEl>
+                                              <p:pRg st="2" end="2"/>
+                                            </p:txEl>
+                                          </p:spTgt>
+                                        </p:tgtEl>
+                                        <p:attrNameLst>
+                                          <p:attrName>style.visibility</p:attrName>
+                                        </p:attrNameLst>
+                                      </p:cBhvr>
+                                      <p:to>
+                                        <p:strVal val="visible"/>
+                                      </p:to>
+                                    </p:set>
+                                    <p:animEffect transition="in" filter="fade">
+                                      <p:cBhvr>
+                                        <p:cTn id="17" dur="500"/>
+                                        <p:tgtEl>
+                                          <p:spTgt spid="3">
+                                            <p:txEl>
+                                              <p:pRg st="2" end="2"/>
+                                            </p:txEl>
+                                          </p:spTgt>
+                                        </p:tgtEl>
+                                      </p:cBhvr>
+                                    </p:animEffect>
+                                  </p:childTnLst>
+                                </p:cTn>
+                              </p:par>
+                              <p:par>
+                                <p:cTn id="18" presetID="10" presetClass="entr" presetSubtype="0" fill="hold" grpId="0" nodeType="withEffect">
+                                  <p:stCondLst>
+                                    <p:cond delay="0"/>
+                                  </p:stCondLst>
+                                  <p:childTnLst>
+                                    <p:set>
+                                      <p:cBhvr>
+                                        <p:cTn id="19" dur="1" fill="hold">
+                                          <p:stCondLst>
+                                            <p:cond delay="0"/>
+                                          </p:stCondLst>
+                                        </p:cTn>
+                                        <p:tgtEl>
+                                          <p:spTgt spid="3">
+                                            <p:txEl>
+                                              <p:pRg st="3" end="3"/>
+                                            </p:txEl>
+                                          </p:spTgt>
+                                        </p:tgtEl>
+                                        <p:attrNameLst>
+                                          <p:attrName>style.visibility</p:attrName>
+                                        </p:attrNameLst>
+                                      </p:cBhvr>
+                                      <p:to>
+                                        <p:strVal val="visible"/>
+                                      </p:to>
+                                    </p:set>
+                                    <p:animEffect transition="in" filter="fade">
+                                      <p:cBhvr>
+                                        <p:cTn id="20" dur="500"/>
+                                        <p:tgtEl>
+                                          <p:spTgt spid="3">
+                                            <p:txEl>
+                                              <p:pRg st="3" end="3"/>
+                                            </p:txEl>
+                                          </p:spTgt>
+                                        </p:tgtEl>
+                                      </p:cBhvr>
+                                    </p:animEffect>
+                                  </p:childTnLst>
+                                </p:cTn>
+                              </p:par>
+                            </p:childTnLst>
+                          </p:cTn>
+                        </p:par>
+                      </p:childTnLst>
+                    </p:cTn>
+                  </p:par>
+                  <p:par>
+                    <p:cTn id="21" fill="hold">
+                      <p:stCondLst>
+                        <p:cond delay="indefinite"/>
+                      </p:stCondLst>
+                      <p:childTnLst>
+                        <p:par>
+                          <p:cTn id="22" fill="hold">
+                            <p:stCondLst>
+                              <p:cond delay="0"/>
+                            </p:stCondLst>
+                            <p:childTnLst>
+                              <p:par>
+                                <p:cTn id="23" presetID="10" presetClass="entr" presetSubtype="0" fill="hold" grpId="0" nodeType="clickEffect">
+                                  <p:stCondLst>
+                                    <p:cond delay="0"/>
+                                  </p:stCondLst>
+                                  <p:childTnLst>
+                                    <p:set>
+                                      <p:cBhvr>
+                                        <p:cTn id="24" dur="1" fill="hold">
+                                          <p:stCondLst>
+                                            <p:cond delay="0"/>
+                                          </p:stCondLst>
+                                        </p:cTn>
+                                        <p:tgtEl>
+                                          <p:spTgt spid="3">
+                                            <p:txEl>
+                                              <p:pRg st="4" end="4"/>
+                                            </p:txEl>
+                                          </p:spTgt>
+                                        </p:tgtEl>
+                                        <p:attrNameLst>
+                                          <p:attrName>style.visibility</p:attrName>
+                                        </p:attrNameLst>
+                                      </p:cBhvr>
+                                      <p:to>
+                                        <p:strVal val="visible"/>
+                                      </p:to>
+                                    </p:set>
+                                    <p:animEffect transition="in" filter="fade">
+                                      <p:cBhvr>
+                                        <p:cTn id="25" dur="500"/>
+                                        <p:tgtEl>
+                                          <p:spTgt spid="3">
+                                            <p:txEl>
+                                              <p:pRg st="4" end="4"/>
+                                            </p:txEl>
+                                          </p:spTgt>
+                                        </p:tgtEl>
+                                      </p:cBhvr>
+                                    </p:animEffect>
+                                  </p:childTnLst>
+                                </p:cTn>
+                              </p:par>
+                            </p:childTnLst>
+                          </p:cTn>
+                        </p:par>
+                      </p:childTnLst>
+                    </p:cTn>
+                  </p:par>
+                  <p:par>
+                    <p:cTn id="26" fill="hold">
+                      <p:stCondLst>
+                        <p:cond delay="indefinite"/>
+                      </p:stCondLst>
+                      <p:childTnLst>
+                        <p:par>
+                          <p:cTn id="27" fill="hold">
+                            <p:stCondLst>
+                              <p:cond delay="0"/>
+                            </p:stCondLst>
+                            <p:childTnLst>
+                              <p:par>
+                                <p:cTn id="28" presetID="10" presetClass="entr" presetSubtype="0" fill="hold" grpId="0" nodeType="clickEffect">
+                                  <p:stCondLst>
+                                    <p:cond delay="0"/>
+                                  </p:stCondLst>
+                                  <p:childTnLst>
+                                    <p:set>
+                                      <p:cBhvr>
+                                        <p:cTn id="29" dur="1" fill="hold">
+                                          <p:stCondLst>
+                                            <p:cond delay="0"/>
+                                          </p:stCondLst>
+                                        </p:cTn>
+                                        <p:tgtEl>
+                                          <p:spTgt spid="3">
+                                            <p:txEl>
+                                              <p:pRg st="5" end="5"/>
+                                            </p:txEl>
+                                          </p:spTgt>
+                                        </p:tgtEl>
+                                        <p:attrNameLst>
+                                          <p:attrName>style.visibility</p:attrName>
+                                        </p:attrNameLst>
+                                      </p:cBhvr>
+                                      <p:to>
+                                        <p:strVal val="visible"/>
+                                      </p:to>
+                                    </p:set>
+                                    <p:animEffect transition="in" filter="fade">
+                                      <p:cBhvr>
+                                        <p:cTn id="30" dur="500"/>
+                                        <p:tgtEl>
+                                          <p:spTgt spid="3">
+                                            <p:txEl>
+                                              <p:pRg st="5" end="5"/>
+                                            </p:txEl>
+                                          </p:spTgt>
+                                        </p:tgtEl>
+                                      </p:cBhvr>
+                                    </p:animEffect>
+                                  </p:childTnLst>
+                                </p:cTn>
+                              </p:par>
+                            </p:childTnLst>
+                          </p:cTn>
+                        </p:par>
+                      </p:childTnLst>
+                    </p:cTn>
+                  </p:par>
+                </p:childTnLst>
+              </p:cTn>
+              <p:prevCondLst>
+                <p:cond evt="onPrev" delay="0">
+                  <p:tgtEl>
+                    <p:sldTgt/>
+                  </p:tgtEl>
+                </p:cond>
+              </p:prevCondLst>
+              <p:nextCondLst>
+                <p:cond evt="onNext" delay="0">
+                  <p:tgtEl>
+                    <p:sldTgt/>
+                  </p:tgtEl>
+                </p:cond>
+              </p:nextCondLst>
+            </p:seq>
+          </p:childTnLst>
+        </p:cTn>
+      </p:par>
+    </p:tnLst>
+    <p:bldLst>
+      <p:bldP spid="3" grpId="0" uiExpand="1" build="p"/>
+    </p:bldLst>
+  </p:timing>
 </p:sld>
 </file>
 
@@ -31675,6 +32763,3534 @@
       <p:bldP spid="3" grpId="0" uiExpand="1" build="p"/>
     </p:bldLst>
   </p:timing>
+</p:sld>
+</file>
+
+<file path=ppt/slides/slide50.xml><?xml version="1.0" encoding="utf-8"?>
+<p:sld xmlns:a="http://schemas.openxmlformats.org/drawingml/2006/main" xmlns:r="http://schemas.openxmlformats.org/officeDocument/2006/relationships" xmlns:p="http://schemas.openxmlformats.org/presentationml/2006/main">
+  <p:cSld>
+    <p:spTree>
+      <p:nvGrpSpPr>
+        <p:cNvPr id="1" name=""/>
+        <p:cNvGrpSpPr/>
+        <p:nvPr/>
+      </p:nvGrpSpPr>
+      <p:grpSpPr>
+        <a:xfrm>
+          <a:off x="0" y="0"/>
+          <a:ext cx="0" cy="0"/>
+          <a:chOff x="0" y="0"/>
+          <a:chExt cx="0" cy="0"/>
+        </a:xfrm>
+      </p:grpSpPr>
+      <p:sp>
+        <p:nvSpPr>
+          <p:cNvPr id="2" name="Title 1">
+            <a:extLst>
+              <a:ext uri="{FF2B5EF4-FFF2-40B4-BE49-F238E27FC236}">
+                <a16:creationId xmlns:a16="http://schemas.microsoft.com/office/drawing/2014/main" id="{61E9E0B2-9C47-73E0-2F31-0D23D41D72B6}"/>
+              </a:ext>
+            </a:extLst>
+          </p:cNvPr>
+          <p:cNvSpPr>
+            <a:spLocks noGrp="1"/>
+          </p:cNvSpPr>
+          <p:nvPr>
+            <p:ph type="title"/>
+          </p:nvPr>
+        </p:nvSpPr>
+        <p:spPr/>
+        <p:txBody>
+          <a:bodyPr/>
+          <a:lstStyle/>
+          <a:p>
+            <a:r>
+              <a:rPr lang="en-US" dirty="0"/>
+              <a:t>Unit 9 – Control Templates</a:t>
+            </a:r>
+          </a:p>
+        </p:txBody>
+      </p:sp>
+      <p:sp>
+        <p:nvSpPr>
+          <p:cNvPr id="3" name="Content Placeholder 2">
+            <a:extLst>
+              <a:ext uri="{FF2B5EF4-FFF2-40B4-BE49-F238E27FC236}">
+                <a16:creationId xmlns:a16="http://schemas.microsoft.com/office/drawing/2014/main" id="{2ED59342-7D44-ED11-04F6-4D7A5BB98236}"/>
+              </a:ext>
+            </a:extLst>
+          </p:cNvPr>
+          <p:cNvSpPr>
+            <a:spLocks noGrp="1"/>
+          </p:cNvSpPr>
+          <p:nvPr>
+            <p:ph idx="1"/>
+          </p:nvPr>
+        </p:nvSpPr>
+        <p:spPr/>
+        <p:txBody>
+          <a:bodyPr>
+            <a:normAutofit fontScale="92500" lnSpcReduction="10000"/>
+          </a:bodyPr>
+          <a:lstStyle/>
+          <a:p>
+            <a:r>
+              <a:rPr lang="en-US" dirty="0"/>
+              <a:t>Two ways to customize built-in controls</a:t>
+            </a:r>
+          </a:p>
+          <a:p>
+            <a:pPr lvl="1"/>
+            <a:r>
+              <a:rPr lang="en-US" dirty="0"/>
+              <a:t>Apply a style -- set a bunch of property values</a:t>
+            </a:r>
+          </a:p>
+          <a:p>
+            <a:pPr lvl="1"/>
+            <a:r>
+              <a:rPr lang="en-US" dirty="0"/>
+              <a:t>Override control template -- change how the control is </a:t>
+            </a:r>
+            <a:r>
+              <a:rPr lang="en-US" dirty="0" err="1"/>
+              <a:t>constructe</a:t>
+            </a:r>
+            <a:endParaRPr lang="en-US" dirty="0"/>
+          </a:p>
+          <a:p>
+            <a:r>
+              <a:rPr lang="en-US" dirty="0"/>
+              <a:t>Control templates</a:t>
+            </a:r>
+          </a:p>
+          <a:p>
+            <a:pPr lvl="1"/>
+            <a:r>
+              <a:rPr lang="en-US" dirty="0"/>
+              <a:t>Every control has a default control template</a:t>
+            </a:r>
+          </a:p>
+          <a:p>
+            <a:pPr lvl="2"/>
+            <a:r>
+              <a:rPr lang="en-US" dirty="0"/>
+              <a:t>Full definition of the visual appearance of the control</a:t>
+            </a:r>
+          </a:p>
+          <a:p>
+            <a:pPr lvl="1"/>
+            <a:r>
+              <a:rPr lang="en-US" dirty="0"/>
+              <a:t>Every control is comprised of smaller pieces</a:t>
+            </a:r>
+          </a:p>
+          <a:p>
+            <a:r>
+              <a:rPr lang="en-US" dirty="0"/>
+              <a:t>Logical tree and visual tree</a:t>
+            </a:r>
+          </a:p>
+          <a:p>
+            <a:pPr lvl="1"/>
+            <a:r>
+              <a:rPr lang="en-US" dirty="0"/>
+              <a:t>What you see in XAML is the </a:t>
+            </a:r>
+            <a:r>
+              <a:rPr lang="en-US" i="1" dirty="0"/>
+              <a:t>logical tree </a:t>
+            </a:r>
+            <a:r>
+              <a:rPr lang="en-US" dirty="0"/>
+              <a:t>-- elements that you define</a:t>
+            </a:r>
+          </a:p>
+          <a:p>
+            <a:pPr lvl="1"/>
+            <a:r>
+              <a:rPr lang="en-US" dirty="0"/>
+              <a:t>At a lower level is the </a:t>
+            </a:r>
+            <a:r>
+              <a:rPr lang="en-US" i="1" dirty="0"/>
+              <a:t>visual tree </a:t>
+            </a:r>
+            <a:r>
+              <a:rPr lang="en-US" dirty="0"/>
+              <a:t>-- the actual low-level elements</a:t>
+            </a:r>
+          </a:p>
+          <a:p>
+            <a:r>
+              <a:rPr lang="en-US" dirty="0">
+                <a:solidFill>
+                  <a:srgbClr val="00B050"/>
+                </a:solidFill>
+              </a:rPr>
+              <a:t>Example – Using Snoop</a:t>
+            </a:r>
+          </a:p>
+        </p:txBody>
+      </p:sp>
+    </p:spTree>
+    <p:extLst>
+      <p:ext uri="{BB962C8B-B14F-4D97-AF65-F5344CB8AC3E}">
+        <p14:creationId xmlns:p14="http://schemas.microsoft.com/office/powerpoint/2010/main" val="339714021"/>
+      </p:ext>
+    </p:extLst>
+  </p:cSld>
+  <p:clrMapOvr>
+    <a:masterClrMapping/>
+  </p:clrMapOvr>
+  <p:timing>
+    <p:tnLst>
+      <p:par>
+        <p:cTn id="1" dur="indefinite" restart="never" nodeType="tmRoot">
+          <p:childTnLst>
+            <p:seq concurrent="1" nextAc="seek">
+              <p:cTn id="2" dur="indefinite" nodeType="mainSeq">
+                <p:childTnLst>
+                  <p:par>
+                    <p:cTn id="3" fill="hold">
+                      <p:stCondLst>
+                        <p:cond delay="indefinite"/>
+                      </p:stCondLst>
+                      <p:childTnLst>
+                        <p:par>
+                          <p:cTn id="4" fill="hold">
+                            <p:stCondLst>
+                              <p:cond delay="0"/>
+                            </p:stCondLst>
+                            <p:childTnLst>
+                              <p:par>
+                                <p:cTn id="5" presetID="10" presetClass="entr" presetSubtype="0" fill="hold" grpId="0" nodeType="clickEffect">
+                                  <p:stCondLst>
+                                    <p:cond delay="0"/>
+                                  </p:stCondLst>
+                                  <p:childTnLst>
+                                    <p:set>
+                                      <p:cBhvr>
+                                        <p:cTn id="6" dur="1" fill="hold">
+                                          <p:stCondLst>
+                                            <p:cond delay="0"/>
+                                          </p:stCondLst>
+                                        </p:cTn>
+                                        <p:tgtEl>
+                                          <p:spTgt spid="3">
+                                            <p:txEl>
+                                              <p:pRg st="0" end="0"/>
+                                            </p:txEl>
+                                          </p:spTgt>
+                                        </p:tgtEl>
+                                        <p:attrNameLst>
+                                          <p:attrName>style.visibility</p:attrName>
+                                        </p:attrNameLst>
+                                      </p:cBhvr>
+                                      <p:to>
+                                        <p:strVal val="visible"/>
+                                      </p:to>
+                                    </p:set>
+                                    <p:animEffect transition="in" filter="fade">
+                                      <p:cBhvr>
+                                        <p:cTn id="7" dur="500"/>
+                                        <p:tgtEl>
+                                          <p:spTgt spid="3">
+                                            <p:txEl>
+                                              <p:pRg st="0" end="0"/>
+                                            </p:txEl>
+                                          </p:spTgt>
+                                        </p:tgtEl>
+                                      </p:cBhvr>
+                                    </p:animEffect>
+                                  </p:childTnLst>
+                                </p:cTn>
+                              </p:par>
+                              <p:par>
+                                <p:cTn id="8" presetID="10" presetClass="entr" presetSubtype="0" fill="hold" grpId="0" nodeType="withEffect">
+                                  <p:stCondLst>
+                                    <p:cond delay="0"/>
+                                  </p:stCondLst>
+                                  <p:childTnLst>
+                                    <p:set>
+                                      <p:cBhvr>
+                                        <p:cTn id="9" dur="1" fill="hold">
+                                          <p:stCondLst>
+                                            <p:cond delay="0"/>
+                                          </p:stCondLst>
+                                        </p:cTn>
+                                        <p:tgtEl>
+                                          <p:spTgt spid="3">
+                                            <p:txEl>
+                                              <p:pRg st="1" end="1"/>
+                                            </p:txEl>
+                                          </p:spTgt>
+                                        </p:tgtEl>
+                                        <p:attrNameLst>
+                                          <p:attrName>style.visibility</p:attrName>
+                                        </p:attrNameLst>
+                                      </p:cBhvr>
+                                      <p:to>
+                                        <p:strVal val="visible"/>
+                                      </p:to>
+                                    </p:set>
+                                    <p:animEffect transition="in" filter="fade">
+                                      <p:cBhvr>
+                                        <p:cTn id="10" dur="500"/>
+                                        <p:tgtEl>
+                                          <p:spTgt spid="3">
+                                            <p:txEl>
+                                              <p:pRg st="1" end="1"/>
+                                            </p:txEl>
+                                          </p:spTgt>
+                                        </p:tgtEl>
+                                      </p:cBhvr>
+                                    </p:animEffect>
+                                  </p:childTnLst>
+                                </p:cTn>
+                              </p:par>
+                              <p:par>
+                                <p:cTn id="11" presetID="10" presetClass="entr" presetSubtype="0" fill="hold" grpId="0" nodeType="withEffect">
+                                  <p:stCondLst>
+                                    <p:cond delay="0"/>
+                                  </p:stCondLst>
+                                  <p:childTnLst>
+                                    <p:set>
+                                      <p:cBhvr>
+                                        <p:cTn id="12" dur="1" fill="hold">
+                                          <p:stCondLst>
+                                            <p:cond delay="0"/>
+                                          </p:stCondLst>
+                                        </p:cTn>
+                                        <p:tgtEl>
+                                          <p:spTgt spid="3">
+                                            <p:txEl>
+                                              <p:pRg st="2" end="2"/>
+                                            </p:txEl>
+                                          </p:spTgt>
+                                        </p:tgtEl>
+                                        <p:attrNameLst>
+                                          <p:attrName>style.visibility</p:attrName>
+                                        </p:attrNameLst>
+                                      </p:cBhvr>
+                                      <p:to>
+                                        <p:strVal val="visible"/>
+                                      </p:to>
+                                    </p:set>
+                                    <p:animEffect transition="in" filter="fade">
+                                      <p:cBhvr>
+                                        <p:cTn id="13" dur="500"/>
+                                        <p:tgtEl>
+                                          <p:spTgt spid="3">
+                                            <p:txEl>
+                                              <p:pRg st="2" end="2"/>
+                                            </p:txEl>
+                                          </p:spTgt>
+                                        </p:tgtEl>
+                                      </p:cBhvr>
+                                    </p:animEffect>
+                                  </p:childTnLst>
+                                </p:cTn>
+                              </p:par>
+                            </p:childTnLst>
+                          </p:cTn>
+                        </p:par>
+                      </p:childTnLst>
+                    </p:cTn>
+                  </p:par>
+                  <p:par>
+                    <p:cTn id="14" fill="hold">
+                      <p:stCondLst>
+                        <p:cond delay="indefinite"/>
+                      </p:stCondLst>
+                      <p:childTnLst>
+                        <p:par>
+                          <p:cTn id="15" fill="hold">
+                            <p:stCondLst>
+                              <p:cond delay="0"/>
+                            </p:stCondLst>
+                            <p:childTnLst>
+                              <p:par>
+                                <p:cTn id="16" presetID="10" presetClass="entr" presetSubtype="0" fill="hold" grpId="0" nodeType="clickEffect">
+                                  <p:stCondLst>
+                                    <p:cond delay="0"/>
+                                  </p:stCondLst>
+                                  <p:childTnLst>
+                                    <p:set>
+                                      <p:cBhvr>
+                                        <p:cTn id="17" dur="1" fill="hold">
+                                          <p:stCondLst>
+                                            <p:cond delay="0"/>
+                                          </p:stCondLst>
+                                        </p:cTn>
+                                        <p:tgtEl>
+                                          <p:spTgt spid="3">
+                                            <p:txEl>
+                                              <p:pRg st="3" end="3"/>
+                                            </p:txEl>
+                                          </p:spTgt>
+                                        </p:tgtEl>
+                                        <p:attrNameLst>
+                                          <p:attrName>style.visibility</p:attrName>
+                                        </p:attrNameLst>
+                                      </p:cBhvr>
+                                      <p:to>
+                                        <p:strVal val="visible"/>
+                                      </p:to>
+                                    </p:set>
+                                    <p:animEffect transition="in" filter="fade">
+                                      <p:cBhvr>
+                                        <p:cTn id="18" dur="500"/>
+                                        <p:tgtEl>
+                                          <p:spTgt spid="3">
+                                            <p:txEl>
+                                              <p:pRg st="3" end="3"/>
+                                            </p:txEl>
+                                          </p:spTgt>
+                                        </p:tgtEl>
+                                      </p:cBhvr>
+                                    </p:animEffect>
+                                  </p:childTnLst>
+                                </p:cTn>
+                              </p:par>
+                              <p:par>
+                                <p:cTn id="19" presetID="10" presetClass="entr" presetSubtype="0" fill="hold" grpId="0" nodeType="withEffect">
+                                  <p:stCondLst>
+                                    <p:cond delay="0"/>
+                                  </p:stCondLst>
+                                  <p:childTnLst>
+                                    <p:set>
+                                      <p:cBhvr>
+                                        <p:cTn id="20" dur="1" fill="hold">
+                                          <p:stCondLst>
+                                            <p:cond delay="0"/>
+                                          </p:stCondLst>
+                                        </p:cTn>
+                                        <p:tgtEl>
+                                          <p:spTgt spid="3">
+                                            <p:txEl>
+                                              <p:pRg st="4" end="4"/>
+                                            </p:txEl>
+                                          </p:spTgt>
+                                        </p:tgtEl>
+                                        <p:attrNameLst>
+                                          <p:attrName>style.visibility</p:attrName>
+                                        </p:attrNameLst>
+                                      </p:cBhvr>
+                                      <p:to>
+                                        <p:strVal val="visible"/>
+                                      </p:to>
+                                    </p:set>
+                                    <p:animEffect transition="in" filter="fade">
+                                      <p:cBhvr>
+                                        <p:cTn id="21" dur="500"/>
+                                        <p:tgtEl>
+                                          <p:spTgt spid="3">
+                                            <p:txEl>
+                                              <p:pRg st="4" end="4"/>
+                                            </p:txEl>
+                                          </p:spTgt>
+                                        </p:tgtEl>
+                                      </p:cBhvr>
+                                    </p:animEffect>
+                                  </p:childTnLst>
+                                </p:cTn>
+                              </p:par>
+                              <p:par>
+                                <p:cTn id="22" presetID="10" presetClass="entr" presetSubtype="0" fill="hold" grpId="0" nodeType="withEffect">
+                                  <p:stCondLst>
+                                    <p:cond delay="0"/>
+                                  </p:stCondLst>
+                                  <p:childTnLst>
+                                    <p:set>
+                                      <p:cBhvr>
+                                        <p:cTn id="23" dur="1" fill="hold">
+                                          <p:stCondLst>
+                                            <p:cond delay="0"/>
+                                          </p:stCondLst>
+                                        </p:cTn>
+                                        <p:tgtEl>
+                                          <p:spTgt spid="3">
+                                            <p:txEl>
+                                              <p:pRg st="5" end="5"/>
+                                            </p:txEl>
+                                          </p:spTgt>
+                                        </p:tgtEl>
+                                        <p:attrNameLst>
+                                          <p:attrName>style.visibility</p:attrName>
+                                        </p:attrNameLst>
+                                      </p:cBhvr>
+                                      <p:to>
+                                        <p:strVal val="visible"/>
+                                      </p:to>
+                                    </p:set>
+                                    <p:animEffect transition="in" filter="fade">
+                                      <p:cBhvr>
+                                        <p:cTn id="24" dur="500"/>
+                                        <p:tgtEl>
+                                          <p:spTgt spid="3">
+                                            <p:txEl>
+                                              <p:pRg st="5" end="5"/>
+                                            </p:txEl>
+                                          </p:spTgt>
+                                        </p:tgtEl>
+                                      </p:cBhvr>
+                                    </p:animEffect>
+                                  </p:childTnLst>
+                                </p:cTn>
+                              </p:par>
+                              <p:par>
+                                <p:cTn id="25" presetID="10" presetClass="entr" presetSubtype="0" fill="hold" grpId="0" nodeType="withEffect">
+                                  <p:stCondLst>
+                                    <p:cond delay="0"/>
+                                  </p:stCondLst>
+                                  <p:childTnLst>
+                                    <p:set>
+                                      <p:cBhvr>
+                                        <p:cTn id="26" dur="1" fill="hold">
+                                          <p:stCondLst>
+                                            <p:cond delay="0"/>
+                                          </p:stCondLst>
+                                        </p:cTn>
+                                        <p:tgtEl>
+                                          <p:spTgt spid="3">
+                                            <p:txEl>
+                                              <p:pRg st="6" end="6"/>
+                                            </p:txEl>
+                                          </p:spTgt>
+                                        </p:tgtEl>
+                                        <p:attrNameLst>
+                                          <p:attrName>style.visibility</p:attrName>
+                                        </p:attrNameLst>
+                                      </p:cBhvr>
+                                      <p:to>
+                                        <p:strVal val="visible"/>
+                                      </p:to>
+                                    </p:set>
+                                    <p:animEffect transition="in" filter="fade">
+                                      <p:cBhvr>
+                                        <p:cTn id="27" dur="500"/>
+                                        <p:tgtEl>
+                                          <p:spTgt spid="3">
+                                            <p:txEl>
+                                              <p:pRg st="6" end="6"/>
+                                            </p:txEl>
+                                          </p:spTgt>
+                                        </p:tgtEl>
+                                      </p:cBhvr>
+                                    </p:animEffect>
+                                  </p:childTnLst>
+                                </p:cTn>
+                              </p:par>
+                            </p:childTnLst>
+                          </p:cTn>
+                        </p:par>
+                      </p:childTnLst>
+                    </p:cTn>
+                  </p:par>
+                  <p:par>
+                    <p:cTn id="28" fill="hold">
+                      <p:stCondLst>
+                        <p:cond delay="indefinite"/>
+                      </p:stCondLst>
+                      <p:childTnLst>
+                        <p:par>
+                          <p:cTn id="29" fill="hold">
+                            <p:stCondLst>
+                              <p:cond delay="0"/>
+                            </p:stCondLst>
+                            <p:childTnLst>
+                              <p:par>
+                                <p:cTn id="30" presetID="10" presetClass="entr" presetSubtype="0" fill="hold" grpId="0" nodeType="clickEffect">
+                                  <p:stCondLst>
+                                    <p:cond delay="0"/>
+                                  </p:stCondLst>
+                                  <p:childTnLst>
+                                    <p:set>
+                                      <p:cBhvr>
+                                        <p:cTn id="31" dur="1" fill="hold">
+                                          <p:stCondLst>
+                                            <p:cond delay="0"/>
+                                          </p:stCondLst>
+                                        </p:cTn>
+                                        <p:tgtEl>
+                                          <p:spTgt spid="3">
+                                            <p:txEl>
+                                              <p:pRg st="7" end="7"/>
+                                            </p:txEl>
+                                          </p:spTgt>
+                                        </p:tgtEl>
+                                        <p:attrNameLst>
+                                          <p:attrName>style.visibility</p:attrName>
+                                        </p:attrNameLst>
+                                      </p:cBhvr>
+                                      <p:to>
+                                        <p:strVal val="visible"/>
+                                      </p:to>
+                                    </p:set>
+                                    <p:animEffect transition="in" filter="fade">
+                                      <p:cBhvr>
+                                        <p:cTn id="32" dur="500"/>
+                                        <p:tgtEl>
+                                          <p:spTgt spid="3">
+                                            <p:txEl>
+                                              <p:pRg st="7" end="7"/>
+                                            </p:txEl>
+                                          </p:spTgt>
+                                        </p:tgtEl>
+                                      </p:cBhvr>
+                                    </p:animEffect>
+                                  </p:childTnLst>
+                                </p:cTn>
+                              </p:par>
+                              <p:par>
+                                <p:cTn id="33" presetID="10" presetClass="entr" presetSubtype="0" fill="hold" grpId="0" nodeType="withEffect">
+                                  <p:stCondLst>
+                                    <p:cond delay="0"/>
+                                  </p:stCondLst>
+                                  <p:childTnLst>
+                                    <p:set>
+                                      <p:cBhvr>
+                                        <p:cTn id="34" dur="1" fill="hold">
+                                          <p:stCondLst>
+                                            <p:cond delay="0"/>
+                                          </p:stCondLst>
+                                        </p:cTn>
+                                        <p:tgtEl>
+                                          <p:spTgt spid="3">
+                                            <p:txEl>
+                                              <p:pRg st="8" end="8"/>
+                                            </p:txEl>
+                                          </p:spTgt>
+                                        </p:tgtEl>
+                                        <p:attrNameLst>
+                                          <p:attrName>style.visibility</p:attrName>
+                                        </p:attrNameLst>
+                                      </p:cBhvr>
+                                      <p:to>
+                                        <p:strVal val="visible"/>
+                                      </p:to>
+                                    </p:set>
+                                    <p:animEffect transition="in" filter="fade">
+                                      <p:cBhvr>
+                                        <p:cTn id="35" dur="500"/>
+                                        <p:tgtEl>
+                                          <p:spTgt spid="3">
+                                            <p:txEl>
+                                              <p:pRg st="8" end="8"/>
+                                            </p:txEl>
+                                          </p:spTgt>
+                                        </p:tgtEl>
+                                      </p:cBhvr>
+                                    </p:animEffect>
+                                  </p:childTnLst>
+                                </p:cTn>
+                              </p:par>
+                              <p:par>
+                                <p:cTn id="36" presetID="10" presetClass="entr" presetSubtype="0" fill="hold" grpId="0" nodeType="withEffect">
+                                  <p:stCondLst>
+                                    <p:cond delay="0"/>
+                                  </p:stCondLst>
+                                  <p:childTnLst>
+                                    <p:set>
+                                      <p:cBhvr>
+                                        <p:cTn id="37" dur="1" fill="hold">
+                                          <p:stCondLst>
+                                            <p:cond delay="0"/>
+                                          </p:stCondLst>
+                                        </p:cTn>
+                                        <p:tgtEl>
+                                          <p:spTgt spid="3">
+                                            <p:txEl>
+                                              <p:pRg st="9" end="9"/>
+                                            </p:txEl>
+                                          </p:spTgt>
+                                        </p:tgtEl>
+                                        <p:attrNameLst>
+                                          <p:attrName>style.visibility</p:attrName>
+                                        </p:attrNameLst>
+                                      </p:cBhvr>
+                                      <p:to>
+                                        <p:strVal val="visible"/>
+                                      </p:to>
+                                    </p:set>
+                                    <p:animEffect transition="in" filter="fade">
+                                      <p:cBhvr>
+                                        <p:cTn id="38" dur="500"/>
+                                        <p:tgtEl>
+                                          <p:spTgt spid="3">
+                                            <p:txEl>
+                                              <p:pRg st="9" end="9"/>
+                                            </p:txEl>
+                                          </p:spTgt>
+                                        </p:tgtEl>
+                                      </p:cBhvr>
+                                    </p:animEffect>
+                                  </p:childTnLst>
+                                </p:cTn>
+                              </p:par>
+                            </p:childTnLst>
+                          </p:cTn>
+                        </p:par>
+                      </p:childTnLst>
+                    </p:cTn>
+                  </p:par>
+                  <p:par>
+                    <p:cTn id="39" fill="hold">
+                      <p:stCondLst>
+                        <p:cond delay="indefinite"/>
+                      </p:stCondLst>
+                      <p:childTnLst>
+                        <p:par>
+                          <p:cTn id="40" fill="hold">
+                            <p:stCondLst>
+                              <p:cond delay="0"/>
+                            </p:stCondLst>
+                            <p:childTnLst>
+                              <p:par>
+                                <p:cTn id="41" presetID="10" presetClass="entr" presetSubtype="0" fill="hold" grpId="0" nodeType="clickEffect">
+                                  <p:stCondLst>
+                                    <p:cond delay="0"/>
+                                  </p:stCondLst>
+                                  <p:childTnLst>
+                                    <p:set>
+                                      <p:cBhvr>
+                                        <p:cTn id="42" dur="1" fill="hold">
+                                          <p:stCondLst>
+                                            <p:cond delay="0"/>
+                                          </p:stCondLst>
+                                        </p:cTn>
+                                        <p:tgtEl>
+                                          <p:spTgt spid="3">
+                                            <p:txEl>
+                                              <p:pRg st="10" end="10"/>
+                                            </p:txEl>
+                                          </p:spTgt>
+                                        </p:tgtEl>
+                                        <p:attrNameLst>
+                                          <p:attrName>style.visibility</p:attrName>
+                                        </p:attrNameLst>
+                                      </p:cBhvr>
+                                      <p:to>
+                                        <p:strVal val="visible"/>
+                                      </p:to>
+                                    </p:set>
+                                    <p:animEffect transition="in" filter="fade">
+                                      <p:cBhvr>
+                                        <p:cTn id="43" dur="500"/>
+                                        <p:tgtEl>
+                                          <p:spTgt spid="3">
+                                            <p:txEl>
+                                              <p:pRg st="10" end="10"/>
+                                            </p:txEl>
+                                          </p:spTgt>
+                                        </p:tgtEl>
+                                      </p:cBhvr>
+                                    </p:animEffect>
+                                  </p:childTnLst>
+                                </p:cTn>
+                              </p:par>
+                            </p:childTnLst>
+                          </p:cTn>
+                        </p:par>
+                      </p:childTnLst>
+                    </p:cTn>
+                  </p:par>
+                </p:childTnLst>
+              </p:cTn>
+              <p:prevCondLst>
+                <p:cond evt="onPrev" delay="0">
+                  <p:tgtEl>
+                    <p:sldTgt/>
+                  </p:tgtEl>
+                </p:cond>
+              </p:prevCondLst>
+              <p:nextCondLst>
+                <p:cond evt="onNext" delay="0">
+                  <p:tgtEl>
+                    <p:sldTgt/>
+                  </p:tgtEl>
+                </p:cond>
+              </p:nextCondLst>
+            </p:seq>
+          </p:childTnLst>
+        </p:cTn>
+      </p:par>
+    </p:tnLst>
+    <p:bldLst>
+      <p:bldP spid="3" grpId="0" uiExpand="1" build="p"/>
+    </p:bldLst>
+  </p:timing>
+</p:sld>
+</file>
+
+<file path=ppt/slides/slide51.xml><?xml version="1.0" encoding="utf-8"?>
+<p:sld xmlns:a="http://schemas.openxmlformats.org/drawingml/2006/main" xmlns:r="http://schemas.openxmlformats.org/officeDocument/2006/relationships" xmlns:p="http://schemas.openxmlformats.org/presentationml/2006/main">
+  <p:cSld>
+    <p:spTree>
+      <p:nvGrpSpPr>
+        <p:cNvPr id="1" name=""/>
+        <p:cNvGrpSpPr/>
+        <p:nvPr/>
+      </p:nvGrpSpPr>
+      <p:grpSpPr>
+        <a:xfrm>
+          <a:off x="0" y="0"/>
+          <a:ext cx="0" cy="0"/>
+          <a:chOff x="0" y="0"/>
+          <a:chExt cx="0" cy="0"/>
+        </a:xfrm>
+      </p:grpSpPr>
+      <p:sp>
+        <p:nvSpPr>
+          <p:cNvPr id="2" name="Title 1">
+            <a:extLst>
+              <a:ext uri="{FF2B5EF4-FFF2-40B4-BE49-F238E27FC236}">
+                <a16:creationId xmlns:a16="http://schemas.microsoft.com/office/drawing/2014/main" id="{3BAD8753-C607-4735-7895-DB22BF1F885B}"/>
+              </a:ext>
+            </a:extLst>
+          </p:cNvPr>
+          <p:cNvSpPr>
+            <a:spLocks noGrp="1"/>
+          </p:cNvSpPr>
+          <p:nvPr>
+            <p:ph type="title"/>
+          </p:nvPr>
+        </p:nvSpPr>
+        <p:spPr/>
+        <p:txBody>
+          <a:bodyPr/>
+          <a:lstStyle/>
+          <a:p>
+            <a:r>
+              <a:rPr lang="en-US" dirty="0"/>
+              <a:t>Unit 9 – Control Templates</a:t>
+            </a:r>
+          </a:p>
+        </p:txBody>
+      </p:sp>
+      <p:sp>
+        <p:nvSpPr>
+          <p:cNvPr id="3" name="Content Placeholder 2">
+            <a:extLst>
+              <a:ext uri="{FF2B5EF4-FFF2-40B4-BE49-F238E27FC236}">
+                <a16:creationId xmlns:a16="http://schemas.microsoft.com/office/drawing/2014/main" id="{19155667-282E-1AF4-E4A8-C95859C92D53}"/>
+              </a:ext>
+            </a:extLst>
+          </p:cNvPr>
+          <p:cNvSpPr>
+            <a:spLocks noGrp="1"/>
+          </p:cNvSpPr>
+          <p:nvPr>
+            <p:ph idx="1"/>
+          </p:nvPr>
+        </p:nvSpPr>
+        <p:spPr/>
+        <p:txBody>
+          <a:bodyPr>
+            <a:normAutofit fontScale="70000" lnSpcReduction="20000"/>
+          </a:bodyPr>
+          <a:lstStyle/>
+          <a:p>
+            <a:r>
+              <a:rPr lang="en-US" dirty="0"/>
+              <a:t>Overriding a control template</a:t>
+            </a:r>
+          </a:p>
+          <a:p>
+            <a:pPr lvl="1"/>
+            <a:r>
+              <a:rPr lang="en-US" dirty="0"/>
+              <a:t>You can override a control template and then modify it</a:t>
+            </a:r>
+          </a:p>
+          <a:p>
+            <a:pPr lvl="1"/>
+            <a:r>
+              <a:rPr lang="en-US" dirty="0"/>
+              <a:t>It's "all or nothing" -- use as is or replace</a:t>
+            </a:r>
+          </a:p>
+          <a:p>
+            <a:r>
+              <a:rPr lang="en-US" dirty="0"/>
+              <a:t>How to override control template</a:t>
+            </a:r>
+          </a:p>
+          <a:p>
+            <a:pPr lvl="1"/>
+            <a:r>
+              <a:rPr lang="en-US" dirty="0"/>
+              <a:t>Open XAML containing control to override  (e.g. Button)</a:t>
+            </a:r>
+          </a:p>
+          <a:p>
+            <a:pPr lvl="1"/>
+            <a:r>
+              <a:rPr lang="en-US" dirty="0"/>
+              <a:t>Rt-click on control and select View Designer</a:t>
+            </a:r>
+          </a:p>
+          <a:p>
+            <a:pPr lvl="2"/>
+            <a:r>
+              <a:rPr lang="en-US" dirty="0"/>
+              <a:t>Designer window opens, with design at top, XAML at bottom</a:t>
+            </a:r>
+          </a:p>
+          <a:p>
+            <a:pPr lvl="1"/>
+            <a:r>
+              <a:rPr lang="en-US" dirty="0"/>
+              <a:t>Left-click on the control, in the bottom window</a:t>
+            </a:r>
+          </a:p>
+          <a:p>
+            <a:pPr lvl="2"/>
+            <a:r>
+              <a:rPr lang="en-US" dirty="0"/>
+              <a:t>Properties window appears</a:t>
+            </a:r>
+          </a:p>
+          <a:p>
+            <a:pPr lvl="1"/>
+            <a:r>
+              <a:rPr lang="en-US" dirty="0"/>
+              <a:t>In Properties window, find Template, under Miscellaneous section</a:t>
+            </a:r>
+          </a:p>
+          <a:p>
+            <a:pPr lvl="1"/>
+            <a:r>
+              <a:rPr lang="en-US" dirty="0"/>
+              <a:t>Click dropdown to right of New button, Convert to New Resource</a:t>
+            </a:r>
+          </a:p>
+          <a:p>
+            <a:pPr lvl="1"/>
+            <a:r>
+              <a:rPr lang="en-US" dirty="0"/>
+              <a:t>Accept defaults, click OK</a:t>
+            </a:r>
+          </a:p>
+          <a:p>
+            <a:pPr lvl="2"/>
+            <a:r>
+              <a:rPr lang="en-US" dirty="0"/>
+              <a:t>A </a:t>
+            </a:r>
+            <a:r>
+              <a:rPr lang="en-US" dirty="0" err="1"/>
+              <a:t>ControlTemplate</a:t>
+            </a:r>
+            <a:r>
+              <a:rPr lang="en-US" dirty="0"/>
+              <a:t> is added to XAML file and the Button references it</a:t>
+            </a:r>
+          </a:p>
+          <a:p>
+            <a:r>
+              <a:rPr lang="en-US" dirty="0">
+                <a:solidFill>
+                  <a:srgbClr val="00B050"/>
+                </a:solidFill>
+              </a:rPr>
+              <a:t>Example – Copy of Control Template</a:t>
+            </a:r>
+          </a:p>
+          <a:p>
+            <a:pPr lvl="2"/>
+            <a:endParaRPr lang="en-US" dirty="0"/>
+          </a:p>
+        </p:txBody>
+      </p:sp>
+    </p:spTree>
+    <p:extLst>
+      <p:ext uri="{BB962C8B-B14F-4D97-AF65-F5344CB8AC3E}">
+        <p14:creationId xmlns:p14="http://schemas.microsoft.com/office/powerpoint/2010/main" val="1129592060"/>
+      </p:ext>
+    </p:extLst>
+  </p:cSld>
+  <p:clrMapOvr>
+    <a:masterClrMapping/>
+  </p:clrMapOvr>
+  <p:timing>
+    <p:tnLst>
+      <p:par>
+        <p:cTn id="1" dur="indefinite" restart="never" nodeType="tmRoot">
+          <p:childTnLst>
+            <p:seq concurrent="1" nextAc="seek">
+              <p:cTn id="2" dur="indefinite" nodeType="mainSeq">
+                <p:childTnLst>
+                  <p:par>
+                    <p:cTn id="3" fill="hold">
+                      <p:stCondLst>
+                        <p:cond delay="indefinite"/>
+                      </p:stCondLst>
+                      <p:childTnLst>
+                        <p:par>
+                          <p:cTn id="4" fill="hold">
+                            <p:stCondLst>
+                              <p:cond delay="0"/>
+                            </p:stCondLst>
+                            <p:childTnLst>
+                              <p:par>
+                                <p:cTn id="5" presetID="10" presetClass="entr" presetSubtype="0" fill="hold" grpId="0" nodeType="clickEffect">
+                                  <p:stCondLst>
+                                    <p:cond delay="0"/>
+                                  </p:stCondLst>
+                                  <p:childTnLst>
+                                    <p:set>
+                                      <p:cBhvr>
+                                        <p:cTn id="6" dur="1" fill="hold">
+                                          <p:stCondLst>
+                                            <p:cond delay="0"/>
+                                          </p:stCondLst>
+                                        </p:cTn>
+                                        <p:tgtEl>
+                                          <p:spTgt spid="3">
+                                            <p:txEl>
+                                              <p:pRg st="0" end="0"/>
+                                            </p:txEl>
+                                          </p:spTgt>
+                                        </p:tgtEl>
+                                        <p:attrNameLst>
+                                          <p:attrName>style.visibility</p:attrName>
+                                        </p:attrNameLst>
+                                      </p:cBhvr>
+                                      <p:to>
+                                        <p:strVal val="visible"/>
+                                      </p:to>
+                                    </p:set>
+                                    <p:animEffect transition="in" filter="fade">
+                                      <p:cBhvr>
+                                        <p:cTn id="7" dur="500"/>
+                                        <p:tgtEl>
+                                          <p:spTgt spid="3">
+                                            <p:txEl>
+                                              <p:pRg st="0" end="0"/>
+                                            </p:txEl>
+                                          </p:spTgt>
+                                        </p:tgtEl>
+                                      </p:cBhvr>
+                                    </p:animEffect>
+                                  </p:childTnLst>
+                                </p:cTn>
+                              </p:par>
+                              <p:par>
+                                <p:cTn id="8" presetID="10" presetClass="entr" presetSubtype="0" fill="hold" grpId="0" nodeType="withEffect">
+                                  <p:stCondLst>
+                                    <p:cond delay="0"/>
+                                  </p:stCondLst>
+                                  <p:childTnLst>
+                                    <p:set>
+                                      <p:cBhvr>
+                                        <p:cTn id="9" dur="1" fill="hold">
+                                          <p:stCondLst>
+                                            <p:cond delay="0"/>
+                                          </p:stCondLst>
+                                        </p:cTn>
+                                        <p:tgtEl>
+                                          <p:spTgt spid="3">
+                                            <p:txEl>
+                                              <p:pRg st="1" end="1"/>
+                                            </p:txEl>
+                                          </p:spTgt>
+                                        </p:tgtEl>
+                                        <p:attrNameLst>
+                                          <p:attrName>style.visibility</p:attrName>
+                                        </p:attrNameLst>
+                                      </p:cBhvr>
+                                      <p:to>
+                                        <p:strVal val="visible"/>
+                                      </p:to>
+                                    </p:set>
+                                    <p:animEffect transition="in" filter="fade">
+                                      <p:cBhvr>
+                                        <p:cTn id="10" dur="500"/>
+                                        <p:tgtEl>
+                                          <p:spTgt spid="3">
+                                            <p:txEl>
+                                              <p:pRg st="1" end="1"/>
+                                            </p:txEl>
+                                          </p:spTgt>
+                                        </p:tgtEl>
+                                      </p:cBhvr>
+                                    </p:animEffect>
+                                  </p:childTnLst>
+                                </p:cTn>
+                              </p:par>
+                              <p:par>
+                                <p:cTn id="11" presetID="10" presetClass="entr" presetSubtype="0" fill="hold" grpId="0" nodeType="withEffect">
+                                  <p:stCondLst>
+                                    <p:cond delay="0"/>
+                                  </p:stCondLst>
+                                  <p:childTnLst>
+                                    <p:set>
+                                      <p:cBhvr>
+                                        <p:cTn id="12" dur="1" fill="hold">
+                                          <p:stCondLst>
+                                            <p:cond delay="0"/>
+                                          </p:stCondLst>
+                                        </p:cTn>
+                                        <p:tgtEl>
+                                          <p:spTgt spid="3">
+                                            <p:txEl>
+                                              <p:pRg st="2" end="2"/>
+                                            </p:txEl>
+                                          </p:spTgt>
+                                        </p:tgtEl>
+                                        <p:attrNameLst>
+                                          <p:attrName>style.visibility</p:attrName>
+                                        </p:attrNameLst>
+                                      </p:cBhvr>
+                                      <p:to>
+                                        <p:strVal val="visible"/>
+                                      </p:to>
+                                    </p:set>
+                                    <p:animEffect transition="in" filter="fade">
+                                      <p:cBhvr>
+                                        <p:cTn id="13" dur="500"/>
+                                        <p:tgtEl>
+                                          <p:spTgt spid="3">
+                                            <p:txEl>
+                                              <p:pRg st="2" end="2"/>
+                                            </p:txEl>
+                                          </p:spTgt>
+                                        </p:tgtEl>
+                                      </p:cBhvr>
+                                    </p:animEffect>
+                                  </p:childTnLst>
+                                </p:cTn>
+                              </p:par>
+                            </p:childTnLst>
+                          </p:cTn>
+                        </p:par>
+                      </p:childTnLst>
+                    </p:cTn>
+                  </p:par>
+                  <p:par>
+                    <p:cTn id="14" fill="hold">
+                      <p:stCondLst>
+                        <p:cond delay="indefinite"/>
+                      </p:stCondLst>
+                      <p:childTnLst>
+                        <p:par>
+                          <p:cTn id="15" fill="hold">
+                            <p:stCondLst>
+                              <p:cond delay="0"/>
+                            </p:stCondLst>
+                            <p:childTnLst>
+                              <p:par>
+                                <p:cTn id="16" presetID="10" presetClass="entr" presetSubtype="0" fill="hold" grpId="0" nodeType="clickEffect">
+                                  <p:stCondLst>
+                                    <p:cond delay="0"/>
+                                  </p:stCondLst>
+                                  <p:childTnLst>
+                                    <p:set>
+                                      <p:cBhvr>
+                                        <p:cTn id="17" dur="1" fill="hold">
+                                          <p:stCondLst>
+                                            <p:cond delay="0"/>
+                                          </p:stCondLst>
+                                        </p:cTn>
+                                        <p:tgtEl>
+                                          <p:spTgt spid="3">
+                                            <p:txEl>
+                                              <p:pRg st="3" end="3"/>
+                                            </p:txEl>
+                                          </p:spTgt>
+                                        </p:tgtEl>
+                                        <p:attrNameLst>
+                                          <p:attrName>style.visibility</p:attrName>
+                                        </p:attrNameLst>
+                                      </p:cBhvr>
+                                      <p:to>
+                                        <p:strVal val="visible"/>
+                                      </p:to>
+                                    </p:set>
+                                    <p:animEffect transition="in" filter="fade">
+                                      <p:cBhvr>
+                                        <p:cTn id="18" dur="500"/>
+                                        <p:tgtEl>
+                                          <p:spTgt spid="3">
+                                            <p:txEl>
+                                              <p:pRg st="3" end="3"/>
+                                            </p:txEl>
+                                          </p:spTgt>
+                                        </p:tgtEl>
+                                      </p:cBhvr>
+                                    </p:animEffect>
+                                  </p:childTnLst>
+                                </p:cTn>
+                              </p:par>
+                              <p:par>
+                                <p:cTn id="19" presetID="10" presetClass="entr" presetSubtype="0" fill="hold" grpId="0" nodeType="withEffect">
+                                  <p:stCondLst>
+                                    <p:cond delay="0"/>
+                                  </p:stCondLst>
+                                  <p:childTnLst>
+                                    <p:set>
+                                      <p:cBhvr>
+                                        <p:cTn id="20" dur="1" fill="hold">
+                                          <p:stCondLst>
+                                            <p:cond delay="0"/>
+                                          </p:stCondLst>
+                                        </p:cTn>
+                                        <p:tgtEl>
+                                          <p:spTgt spid="3">
+                                            <p:txEl>
+                                              <p:pRg st="4" end="4"/>
+                                            </p:txEl>
+                                          </p:spTgt>
+                                        </p:tgtEl>
+                                        <p:attrNameLst>
+                                          <p:attrName>style.visibility</p:attrName>
+                                        </p:attrNameLst>
+                                      </p:cBhvr>
+                                      <p:to>
+                                        <p:strVal val="visible"/>
+                                      </p:to>
+                                    </p:set>
+                                    <p:animEffect transition="in" filter="fade">
+                                      <p:cBhvr>
+                                        <p:cTn id="21" dur="500"/>
+                                        <p:tgtEl>
+                                          <p:spTgt spid="3">
+                                            <p:txEl>
+                                              <p:pRg st="4" end="4"/>
+                                            </p:txEl>
+                                          </p:spTgt>
+                                        </p:tgtEl>
+                                      </p:cBhvr>
+                                    </p:animEffect>
+                                  </p:childTnLst>
+                                </p:cTn>
+                              </p:par>
+                              <p:par>
+                                <p:cTn id="22" presetID="10" presetClass="entr" presetSubtype="0" fill="hold" grpId="0" nodeType="withEffect">
+                                  <p:stCondLst>
+                                    <p:cond delay="0"/>
+                                  </p:stCondLst>
+                                  <p:childTnLst>
+                                    <p:set>
+                                      <p:cBhvr>
+                                        <p:cTn id="23" dur="1" fill="hold">
+                                          <p:stCondLst>
+                                            <p:cond delay="0"/>
+                                          </p:stCondLst>
+                                        </p:cTn>
+                                        <p:tgtEl>
+                                          <p:spTgt spid="3">
+                                            <p:txEl>
+                                              <p:pRg st="5" end="5"/>
+                                            </p:txEl>
+                                          </p:spTgt>
+                                        </p:tgtEl>
+                                        <p:attrNameLst>
+                                          <p:attrName>style.visibility</p:attrName>
+                                        </p:attrNameLst>
+                                      </p:cBhvr>
+                                      <p:to>
+                                        <p:strVal val="visible"/>
+                                      </p:to>
+                                    </p:set>
+                                    <p:animEffect transition="in" filter="fade">
+                                      <p:cBhvr>
+                                        <p:cTn id="24" dur="500"/>
+                                        <p:tgtEl>
+                                          <p:spTgt spid="3">
+                                            <p:txEl>
+                                              <p:pRg st="5" end="5"/>
+                                            </p:txEl>
+                                          </p:spTgt>
+                                        </p:tgtEl>
+                                      </p:cBhvr>
+                                    </p:animEffect>
+                                  </p:childTnLst>
+                                </p:cTn>
+                              </p:par>
+                              <p:par>
+                                <p:cTn id="25" presetID="10" presetClass="entr" presetSubtype="0" fill="hold" grpId="0" nodeType="withEffect">
+                                  <p:stCondLst>
+                                    <p:cond delay="0"/>
+                                  </p:stCondLst>
+                                  <p:childTnLst>
+                                    <p:set>
+                                      <p:cBhvr>
+                                        <p:cTn id="26" dur="1" fill="hold">
+                                          <p:stCondLst>
+                                            <p:cond delay="0"/>
+                                          </p:stCondLst>
+                                        </p:cTn>
+                                        <p:tgtEl>
+                                          <p:spTgt spid="3">
+                                            <p:txEl>
+                                              <p:pRg st="6" end="6"/>
+                                            </p:txEl>
+                                          </p:spTgt>
+                                        </p:tgtEl>
+                                        <p:attrNameLst>
+                                          <p:attrName>style.visibility</p:attrName>
+                                        </p:attrNameLst>
+                                      </p:cBhvr>
+                                      <p:to>
+                                        <p:strVal val="visible"/>
+                                      </p:to>
+                                    </p:set>
+                                    <p:animEffect transition="in" filter="fade">
+                                      <p:cBhvr>
+                                        <p:cTn id="27" dur="500"/>
+                                        <p:tgtEl>
+                                          <p:spTgt spid="3">
+                                            <p:txEl>
+                                              <p:pRg st="6" end="6"/>
+                                            </p:txEl>
+                                          </p:spTgt>
+                                        </p:tgtEl>
+                                      </p:cBhvr>
+                                    </p:animEffect>
+                                  </p:childTnLst>
+                                </p:cTn>
+                              </p:par>
+                              <p:par>
+                                <p:cTn id="28" presetID="10" presetClass="entr" presetSubtype="0" fill="hold" grpId="0" nodeType="withEffect">
+                                  <p:stCondLst>
+                                    <p:cond delay="0"/>
+                                  </p:stCondLst>
+                                  <p:childTnLst>
+                                    <p:set>
+                                      <p:cBhvr>
+                                        <p:cTn id="29" dur="1" fill="hold">
+                                          <p:stCondLst>
+                                            <p:cond delay="0"/>
+                                          </p:stCondLst>
+                                        </p:cTn>
+                                        <p:tgtEl>
+                                          <p:spTgt spid="3">
+                                            <p:txEl>
+                                              <p:pRg st="7" end="7"/>
+                                            </p:txEl>
+                                          </p:spTgt>
+                                        </p:tgtEl>
+                                        <p:attrNameLst>
+                                          <p:attrName>style.visibility</p:attrName>
+                                        </p:attrNameLst>
+                                      </p:cBhvr>
+                                      <p:to>
+                                        <p:strVal val="visible"/>
+                                      </p:to>
+                                    </p:set>
+                                    <p:animEffect transition="in" filter="fade">
+                                      <p:cBhvr>
+                                        <p:cTn id="30" dur="500"/>
+                                        <p:tgtEl>
+                                          <p:spTgt spid="3">
+                                            <p:txEl>
+                                              <p:pRg st="7" end="7"/>
+                                            </p:txEl>
+                                          </p:spTgt>
+                                        </p:tgtEl>
+                                      </p:cBhvr>
+                                    </p:animEffect>
+                                  </p:childTnLst>
+                                </p:cTn>
+                              </p:par>
+                              <p:par>
+                                <p:cTn id="31" presetID="10" presetClass="entr" presetSubtype="0" fill="hold" grpId="0" nodeType="withEffect">
+                                  <p:stCondLst>
+                                    <p:cond delay="0"/>
+                                  </p:stCondLst>
+                                  <p:childTnLst>
+                                    <p:set>
+                                      <p:cBhvr>
+                                        <p:cTn id="32" dur="1" fill="hold">
+                                          <p:stCondLst>
+                                            <p:cond delay="0"/>
+                                          </p:stCondLst>
+                                        </p:cTn>
+                                        <p:tgtEl>
+                                          <p:spTgt spid="3">
+                                            <p:txEl>
+                                              <p:pRg st="8" end="8"/>
+                                            </p:txEl>
+                                          </p:spTgt>
+                                        </p:tgtEl>
+                                        <p:attrNameLst>
+                                          <p:attrName>style.visibility</p:attrName>
+                                        </p:attrNameLst>
+                                      </p:cBhvr>
+                                      <p:to>
+                                        <p:strVal val="visible"/>
+                                      </p:to>
+                                    </p:set>
+                                    <p:animEffect transition="in" filter="fade">
+                                      <p:cBhvr>
+                                        <p:cTn id="33" dur="500"/>
+                                        <p:tgtEl>
+                                          <p:spTgt spid="3">
+                                            <p:txEl>
+                                              <p:pRg st="8" end="8"/>
+                                            </p:txEl>
+                                          </p:spTgt>
+                                        </p:tgtEl>
+                                      </p:cBhvr>
+                                    </p:animEffect>
+                                  </p:childTnLst>
+                                </p:cTn>
+                              </p:par>
+                              <p:par>
+                                <p:cTn id="34" presetID="10" presetClass="entr" presetSubtype="0" fill="hold" grpId="0" nodeType="withEffect">
+                                  <p:stCondLst>
+                                    <p:cond delay="0"/>
+                                  </p:stCondLst>
+                                  <p:childTnLst>
+                                    <p:set>
+                                      <p:cBhvr>
+                                        <p:cTn id="35" dur="1" fill="hold">
+                                          <p:stCondLst>
+                                            <p:cond delay="0"/>
+                                          </p:stCondLst>
+                                        </p:cTn>
+                                        <p:tgtEl>
+                                          <p:spTgt spid="3">
+                                            <p:txEl>
+                                              <p:pRg st="9" end="9"/>
+                                            </p:txEl>
+                                          </p:spTgt>
+                                        </p:tgtEl>
+                                        <p:attrNameLst>
+                                          <p:attrName>style.visibility</p:attrName>
+                                        </p:attrNameLst>
+                                      </p:cBhvr>
+                                      <p:to>
+                                        <p:strVal val="visible"/>
+                                      </p:to>
+                                    </p:set>
+                                    <p:animEffect transition="in" filter="fade">
+                                      <p:cBhvr>
+                                        <p:cTn id="36" dur="500"/>
+                                        <p:tgtEl>
+                                          <p:spTgt spid="3">
+                                            <p:txEl>
+                                              <p:pRg st="9" end="9"/>
+                                            </p:txEl>
+                                          </p:spTgt>
+                                        </p:tgtEl>
+                                      </p:cBhvr>
+                                    </p:animEffect>
+                                  </p:childTnLst>
+                                </p:cTn>
+                              </p:par>
+                              <p:par>
+                                <p:cTn id="37" presetID="10" presetClass="entr" presetSubtype="0" fill="hold" grpId="0" nodeType="withEffect">
+                                  <p:stCondLst>
+                                    <p:cond delay="0"/>
+                                  </p:stCondLst>
+                                  <p:childTnLst>
+                                    <p:set>
+                                      <p:cBhvr>
+                                        <p:cTn id="38" dur="1" fill="hold">
+                                          <p:stCondLst>
+                                            <p:cond delay="0"/>
+                                          </p:stCondLst>
+                                        </p:cTn>
+                                        <p:tgtEl>
+                                          <p:spTgt spid="3">
+                                            <p:txEl>
+                                              <p:pRg st="10" end="10"/>
+                                            </p:txEl>
+                                          </p:spTgt>
+                                        </p:tgtEl>
+                                        <p:attrNameLst>
+                                          <p:attrName>style.visibility</p:attrName>
+                                        </p:attrNameLst>
+                                      </p:cBhvr>
+                                      <p:to>
+                                        <p:strVal val="visible"/>
+                                      </p:to>
+                                    </p:set>
+                                    <p:animEffect transition="in" filter="fade">
+                                      <p:cBhvr>
+                                        <p:cTn id="39" dur="500"/>
+                                        <p:tgtEl>
+                                          <p:spTgt spid="3">
+                                            <p:txEl>
+                                              <p:pRg st="10" end="10"/>
+                                            </p:txEl>
+                                          </p:spTgt>
+                                        </p:tgtEl>
+                                      </p:cBhvr>
+                                    </p:animEffect>
+                                  </p:childTnLst>
+                                </p:cTn>
+                              </p:par>
+                              <p:par>
+                                <p:cTn id="40" presetID="10" presetClass="entr" presetSubtype="0" fill="hold" grpId="0" nodeType="withEffect">
+                                  <p:stCondLst>
+                                    <p:cond delay="0"/>
+                                  </p:stCondLst>
+                                  <p:childTnLst>
+                                    <p:set>
+                                      <p:cBhvr>
+                                        <p:cTn id="41" dur="1" fill="hold">
+                                          <p:stCondLst>
+                                            <p:cond delay="0"/>
+                                          </p:stCondLst>
+                                        </p:cTn>
+                                        <p:tgtEl>
+                                          <p:spTgt spid="3">
+                                            <p:txEl>
+                                              <p:pRg st="11" end="11"/>
+                                            </p:txEl>
+                                          </p:spTgt>
+                                        </p:tgtEl>
+                                        <p:attrNameLst>
+                                          <p:attrName>style.visibility</p:attrName>
+                                        </p:attrNameLst>
+                                      </p:cBhvr>
+                                      <p:to>
+                                        <p:strVal val="visible"/>
+                                      </p:to>
+                                    </p:set>
+                                    <p:animEffect transition="in" filter="fade">
+                                      <p:cBhvr>
+                                        <p:cTn id="42" dur="500"/>
+                                        <p:tgtEl>
+                                          <p:spTgt spid="3">
+                                            <p:txEl>
+                                              <p:pRg st="11" end="11"/>
+                                            </p:txEl>
+                                          </p:spTgt>
+                                        </p:tgtEl>
+                                      </p:cBhvr>
+                                    </p:animEffect>
+                                  </p:childTnLst>
+                                </p:cTn>
+                              </p:par>
+                              <p:par>
+                                <p:cTn id="43" presetID="10" presetClass="entr" presetSubtype="0" fill="hold" grpId="0" nodeType="withEffect">
+                                  <p:stCondLst>
+                                    <p:cond delay="0"/>
+                                  </p:stCondLst>
+                                  <p:childTnLst>
+                                    <p:set>
+                                      <p:cBhvr>
+                                        <p:cTn id="44" dur="1" fill="hold">
+                                          <p:stCondLst>
+                                            <p:cond delay="0"/>
+                                          </p:stCondLst>
+                                        </p:cTn>
+                                        <p:tgtEl>
+                                          <p:spTgt spid="3">
+                                            <p:txEl>
+                                              <p:pRg st="12" end="12"/>
+                                            </p:txEl>
+                                          </p:spTgt>
+                                        </p:tgtEl>
+                                        <p:attrNameLst>
+                                          <p:attrName>style.visibility</p:attrName>
+                                        </p:attrNameLst>
+                                      </p:cBhvr>
+                                      <p:to>
+                                        <p:strVal val="visible"/>
+                                      </p:to>
+                                    </p:set>
+                                    <p:animEffect transition="in" filter="fade">
+                                      <p:cBhvr>
+                                        <p:cTn id="45" dur="500"/>
+                                        <p:tgtEl>
+                                          <p:spTgt spid="3">
+                                            <p:txEl>
+                                              <p:pRg st="12" end="12"/>
+                                            </p:txEl>
+                                          </p:spTgt>
+                                        </p:tgtEl>
+                                      </p:cBhvr>
+                                    </p:animEffect>
+                                  </p:childTnLst>
+                                </p:cTn>
+                              </p:par>
+                            </p:childTnLst>
+                          </p:cTn>
+                        </p:par>
+                      </p:childTnLst>
+                    </p:cTn>
+                  </p:par>
+                  <p:par>
+                    <p:cTn id="46" fill="hold">
+                      <p:stCondLst>
+                        <p:cond delay="indefinite"/>
+                      </p:stCondLst>
+                      <p:childTnLst>
+                        <p:par>
+                          <p:cTn id="47" fill="hold">
+                            <p:stCondLst>
+                              <p:cond delay="0"/>
+                            </p:stCondLst>
+                            <p:childTnLst>
+                              <p:par>
+                                <p:cTn id="48" presetID="10" presetClass="entr" presetSubtype="0" fill="hold" grpId="0" nodeType="clickEffect">
+                                  <p:stCondLst>
+                                    <p:cond delay="0"/>
+                                  </p:stCondLst>
+                                  <p:childTnLst>
+                                    <p:set>
+                                      <p:cBhvr>
+                                        <p:cTn id="49" dur="1" fill="hold">
+                                          <p:stCondLst>
+                                            <p:cond delay="0"/>
+                                          </p:stCondLst>
+                                        </p:cTn>
+                                        <p:tgtEl>
+                                          <p:spTgt spid="3">
+                                            <p:txEl>
+                                              <p:pRg st="13" end="13"/>
+                                            </p:txEl>
+                                          </p:spTgt>
+                                        </p:tgtEl>
+                                        <p:attrNameLst>
+                                          <p:attrName>style.visibility</p:attrName>
+                                        </p:attrNameLst>
+                                      </p:cBhvr>
+                                      <p:to>
+                                        <p:strVal val="visible"/>
+                                      </p:to>
+                                    </p:set>
+                                    <p:animEffect transition="in" filter="fade">
+                                      <p:cBhvr>
+                                        <p:cTn id="50" dur="500"/>
+                                        <p:tgtEl>
+                                          <p:spTgt spid="3">
+                                            <p:txEl>
+                                              <p:pRg st="13" end="13"/>
+                                            </p:txEl>
+                                          </p:spTgt>
+                                        </p:tgtEl>
+                                      </p:cBhvr>
+                                    </p:animEffect>
+                                  </p:childTnLst>
+                                </p:cTn>
+                              </p:par>
+                            </p:childTnLst>
+                          </p:cTn>
+                        </p:par>
+                      </p:childTnLst>
+                    </p:cTn>
+                  </p:par>
+                </p:childTnLst>
+              </p:cTn>
+              <p:prevCondLst>
+                <p:cond evt="onPrev" delay="0">
+                  <p:tgtEl>
+                    <p:sldTgt/>
+                  </p:tgtEl>
+                </p:cond>
+              </p:prevCondLst>
+              <p:nextCondLst>
+                <p:cond evt="onNext" delay="0">
+                  <p:tgtEl>
+                    <p:sldTgt/>
+                  </p:tgtEl>
+                </p:cond>
+              </p:nextCondLst>
+            </p:seq>
+          </p:childTnLst>
+        </p:cTn>
+      </p:par>
+    </p:tnLst>
+    <p:bldLst>
+      <p:bldP spid="3" grpId="0" uiExpand="1" build="p"/>
+    </p:bldLst>
+  </p:timing>
+</p:sld>
+</file>
+
+<file path=ppt/slides/slide52.xml><?xml version="1.0" encoding="utf-8"?>
+<p:sld xmlns:a="http://schemas.openxmlformats.org/drawingml/2006/main" xmlns:r="http://schemas.openxmlformats.org/officeDocument/2006/relationships" xmlns:p="http://schemas.openxmlformats.org/presentationml/2006/main">
+  <p:cSld>
+    <p:spTree>
+      <p:nvGrpSpPr>
+        <p:cNvPr id="1" name=""/>
+        <p:cNvGrpSpPr/>
+        <p:nvPr/>
+      </p:nvGrpSpPr>
+      <p:grpSpPr>
+        <a:xfrm>
+          <a:off x="0" y="0"/>
+          <a:ext cx="0" cy="0"/>
+          <a:chOff x="0" y="0"/>
+          <a:chExt cx="0" cy="0"/>
+        </a:xfrm>
+      </p:grpSpPr>
+      <p:sp>
+        <p:nvSpPr>
+          <p:cNvPr id="2" name="Title 1">
+            <a:extLst>
+              <a:ext uri="{FF2B5EF4-FFF2-40B4-BE49-F238E27FC236}">
+                <a16:creationId xmlns:a16="http://schemas.microsoft.com/office/drawing/2014/main" id="{857D1496-3EEA-9F2C-D61E-20F7A35E1CE8}"/>
+              </a:ext>
+            </a:extLst>
+          </p:cNvPr>
+          <p:cNvSpPr>
+            <a:spLocks noGrp="1"/>
+          </p:cNvSpPr>
+          <p:nvPr>
+            <p:ph type="title"/>
+          </p:nvPr>
+        </p:nvSpPr>
+        <p:spPr/>
+        <p:txBody>
+          <a:bodyPr/>
+          <a:lstStyle/>
+          <a:p>
+            <a:r>
+              <a:rPr lang="en-US" dirty="0"/>
+              <a:t>Unit 9 – Control Templates</a:t>
+            </a:r>
+          </a:p>
+        </p:txBody>
+      </p:sp>
+      <p:sp>
+        <p:nvSpPr>
+          <p:cNvPr id="3" name="Content Placeholder 2">
+            <a:extLst>
+              <a:ext uri="{FF2B5EF4-FFF2-40B4-BE49-F238E27FC236}">
+                <a16:creationId xmlns:a16="http://schemas.microsoft.com/office/drawing/2014/main" id="{18030AB0-524B-BAEB-66D7-6D7523D20518}"/>
+              </a:ext>
+            </a:extLst>
+          </p:cNvPr>
+          <p:cNvSpPr>
+            <a:spLocks noGrp="1"/>
+          </p:cNvSpPr>
+          <p:nvPr>
+            <p:ph idx="1"/>
+          </p:nvPr>
+        </p:nvSpPr>
+        <p:spPr/>
+        <p:txBody>
+          <a:bodyPr/>
+          <a:lstStyle/>
+          <a:p>
+            <a:r>
+              <a:rPr lang="en-US" dirty="0"/>
+              <a:t>Why / when to override a control template</a:t>
+            </a:r>
+          </a:p>
+          <a:p>
+            <a:pPr lvl="1"/>
+            <a:r>
+              <a:rPr lang="en-US" dirty="0"/>
+              <a:t>Customize appearance, e.g. add child controls within the parent control</a:t>
+            </a:r>
+          </a:p>
+          <a:p>
+            <a:pPr lvl="1"/>
+            <a:r>
+              <a:rPr lang="en-US" dirty="0"/>
+              <a:t>Customize behavior, e.g. change basic triggers</a:t>
+            </a:r>
+          </a:p>
+          <a:p>
+            <a:r>
+              <a:rPr lang="en-US" dirty="0"/>
+              <a:t>It is very common to override control templates for common controls	</a:t>
+            </a:r>
+          </a:p>
+          <a:p>
+            <a:pPr lvl="1"/>
+            <a:r>
+              <a:rPr lang="en-US" dirty="0"/>
+              <a:t>For MTS products, this is done in </a:t>
+            </a:r>
+            <a:r>
+              <a:rPr lang="en-US" dirty="0" err="1"/>
+              <a:t>MTS.Controls</a:t>
+            </a:r>
+            <a:r>
+              <a:rPr lang="en-US" dirty="0"/>
+              <a:t> and applications like Connect</a:t>
+            </a:r>
+          </a:p>
+        </p:txBody>
+      </p:sp>
+    </p:spTree>
+    <p:extLst>
+      <p:ext uri="{BB962C8B-B14F-4D97-AF65-F5344CB8AC3E}">
+        <p14:creationId xmlns:p14="http://schemas.microsoft.com/office/powerpoint/2010/main" val="2008243583"/>
+      </p:ext>
+    </p:extLst>
+  </p:cSld>
+  <p:clrMapOvr>
+    <a:masterClrMapping/>
+  </p:clrMapOvr>
+  <p:timing>
+    <p:tnLst>
+      <p:par>
+        <p:cTn id="1" dur="indefinite" restart="never" nodeType="tmRoot">
+          <p:childTnLst>
+            <p:seq concurrent="1" nextAc="seek">
+              <p:cTn id="2" dur="indefinite" nodeType="mainSeq">
+                <p:childTnLst>
+                  <p:par>
+                    <p:cTn id="3" fill="hold">
+                      <p:stCondLst>
+                        <p:cond delay="indefinite"/>
+                      </p:stCondLst>
+                      <p:childTnLst>
+                        <p:par>
+                          <p:cTn id="4" fill="hold">
+                            <p:stCondLst>
+                              <p:cond delay="0"/>
+                            </p:stCondLst>
+                            <p:childTnLst>
+                              <p:par>
+                                <p:cTn id="5" presetID="10" presetClass="entr" presetSubtype="0" fill="hold" grpId="0" nodeType="clickEffect">
+                                  <p:stCondLst>
+                                    <p:cond delay="0"/>
+                                  </p:stCondLst>
+                                  <p:childTnLst>
+                                    <p:set>
+                                      <p:cBhvr>
+                                        <p:cTn id="6" dur="1" fill="hold">
+                                          <p:stCondLst>
+                                            <p:cond delay="0"/>
+                                          </p:stCondLst>
+                                        </p:cTn>
+                                        <p:tgtEl>
+                                          <p:spTgt spid="3">
+                                            <p:txEl>
+                                              <p:pRg st="0" end="0"/>
+                                            </p:txEl>
+                                          </p:spTgt>
+                                        </p:tgtEl>
+                                        <p:attrNameLst>
+                                          <p:attrName>style.visibility</p:attrName>
+                                        </p:attrNameLst>
+                                      </p:cBhvr>
+                                      <p:to>
+                                        <p:strVal val="visible"/>
+                                      </p:to>
+                                    </p:set>
+                                    <p:animEffect transition="in" filter="fade">
+                                      <p:cBhvr>
+                                        <p:cTn id="7" dur="500"/>
+                                        <p:tgtEl>
+                                          <p:spTgt spid="3">
+                                            <p:txEl>
+                                              <p:pRg st="0" end="0"/>
+                                            </p:txEl>
+                                          </p:spTgt>
+                                        </p:tgtEl>
+                                      </p:cBhvr>
+                                    </p:animEffect>
+                                  </p:childTnLst>
+                                </p:cTn>
+                              </p:par>
+                              <p:par>
+                                <p:cTn id="8" presetID="10" presetClass="entr" presetSubtype="0" fill="hold" grpId="0" nodeType="withEffect">
+                                  <p:stCondLst>
+                                    <p:cond delay="0"/>
+                                  </p:stCondLst>
+                                  <p:childTnLst>
+                                    <p:set>
+                                      <p:cBhvr>
+                                        <p:cTn id="9" dur="1" fill="hold">
+                                          <p:stCondLst>
+                                            <p:cond delay="0"/>
+                                          </p:stCondLst>
+                                        </p:cTn>
+                                        <p:tgtEl>
+                                          <p:spTgt spid="3">
+                                            <p:txEl>
+                                              <p:pRg st="1" end="1"/>
+                                            </p:txEl>
+                                          </p:spTgt>
+                                        </p:tgtEl>
+                                        <p:attrNameLst>
+                                          <p:attrName>style.visibility</p:attrName>
+                                        </p:attrNameLst>
+                                      </p:cBhvr>
+                                      <p:to>
+                                        <p:strVal val="visible"/>
+                                      </p:to>
+                                    </p:set>
+                                    <p:animEffect transition="in" filter="fade">
+                                      <p:cBhvr>
+                                        <p:cTn id="10" dur="500"/>
+                                        <p:tgtEl>
+                                          <p:spTgt spid="3">
+                                            <p:txEl>
+                                              <p:pRg st="1" end="1"/>
+                                            </p:txEl>
+                                          </p:spTgt>
+                                        </p:tgtEl>
+                                      </p:cBhvr>
+                                    </p:animEffect>
+                                  </p:childTnLst>
+                                </p:cTn>
+                              </p:par>
+                              <p:par>
+                                <p:cTn id="11" presetID="10" presetClass="entr" presetSubtype="0" fill="hold" grpId="0" nodeType="withEffect">
+                                  <p:stCondLst>
+                                    <p:cond delay="0"/>
+                                  </p:stCondLst>
+                                  <p:childTnLst>
+                                    <p:set>
+                                      <p:cBhvr>
+                                        <p:cTn id="12" dur="1" fill="hold">
+                                          <p:stCondLst>
+                                            <p:cond delay="0"/>
+                                          </p:stCondLst>
+                                        </p:cTn>
+                                        <p:tgtEl>
+                                          <p:spTgt spid="3">
+                                            <p:txEl>
+                                              <p:pRg st="2" end="2"/>
+                                            </p:txEl>
+                                          </p:spTgt>
+                                        </p:tgtEl>
+                                        <p:attrNameLst>
+                                          <p:attrName>style.visibility</p:attrName>
+                                        </p:attrNameLst>
+                                      </p:cBhvr>
+                                      <p:to>
+                                        <p:strVal val="visible"/>
+                                      </p:to>
+                                    </p:set>
+                                    <p:animEffect transition="in" filter="fade">
+                                      <p:cBhvr>
+                                        <p:cTn id="13" dur="500"/>
+                                        <p:tgtEl>
+                                          <p:spTgt spid="3">
+                                            <p:txEl>
+                                              <p:pRg st="2" end="2"/>
+                                            </p:txEl>
+                                          </p:spTgt>
+                                        </p:tgtEl>
+                                      </p:cBhvr>
+                                    </p:animEffect>
+                                  </p:childTnLst>
+                                </p:cTn>
+                              </p:par>
+                            </p:childTnLst>
+                          </p:cTn>
+                        </p:par>
+                      </p:childTnLst>
+                    </p:cTn>
+                  </p:par>
+                  <p:par>
+                    <p:cTn id="14" fill="hold">
+                      <p:stCondLst>
+                        <p:cond delay="indefinite"/>
+                      </p:stCondLst>
+                      <p:childTnLst>
+                        <p:par>
+                          <p:cTn id="15" fill="hold">
+                            <p:stCondLst>
+                              <p:cond delay="0"/>
+                            </p:stCondLst>
+                            <p:childTnLst>
+                              <p:par>
+                                <p:cTn id="16" presetID="10" presetClass="entr" presetSubtype="0" fill="hold" grpId="0" nodeType="clickEffect">
+                                  <p:stCondLst>
+                                    <p:cond delay="0"/>
+                                  </p:stCondLst>
+                                  <p:childTnLst>
+                                    <p:set>
+                                      <p:cBhvr>
+                                        <p:cTn id="17" dur="1" fill="hold">
+                                          <p:stCondLst>
+                                            <p:cond delay="0"/>
+                                          </p:stCondLst>
+                                        </p:cTn>
+                                        <p:tgtEl>
+                                          <p:spTgt spid="3">
+                                            <p:txEl>
+                                              <p:pRg st="3" end="3"/>
+                                            </p:txEl>
+                                          </p:spTgt>
+                                        </p:tgtEl>
+                                        <p:attrNameLst>
+                                          <p:attrName>style.visibility</p:attrName>
+                                        </p:attrNameLst>
+                                      </p:cBhvr>
+                                      <p:to>
+                                        <p:strVal val="visible"/>
+                                      </p:to>
+                                    </p:set>
+                                    <p:animEffect transition="in" filter="fade">
+                                      <p:cBhvr>
+                                        <p:cTn id="18" dur="500"/>
+                                        <p:tgtEl>
+                                          <p:spTgt spid="3">
+                                            <p:txEl>
+                                              <p:pRg st="3" end="3"/>
+                                            </p:txEl>
+                                          </p:spTgt>
+                                        </p:tgtEl>
+                                      </p:cBhvr>
+                                    </p:animEffect>
+                                  </p:childTnLst>
+                                </p:cTn>
+                              </p:par>
+                              <p:par>
+                                <p:cTn id="19" presetID="10" presetClass="entr" presetSubtype="0" fill="hold" grpId="0" nodeType="withEffect">
+                                  <p:stCondLst>
+                                    <p:cond delay="0"/>
+                                  </p:stCondLst>
+                                  <p:childTnLst>
+                                    <p:set>
+                                      <p:cBhvr>
+                                        <p:cTn id="20" dur="1" fill="hold">
+                                          <p:stCondLst>
+                                            <p:cond delay="0"/>
+                                          </p:stCondLst>
+                                        </p:cTn>
+                                        <p:tgtEl>
+                                          <p:spTgt spid="3">
+                                            <p:txEl>
+                                              <p:pRg st="4" end="4"/>
+                                            </p:txEl>
+                                          </p:spTgt>
+                                        </p:tgtEl>
+                                        <p:attrNameLst>
+                                          <p:attrName>style.visibility</p:attrName>
+                                        </p:attrNameLst>
+                                      </p:cBhvr>
+                                      <p:to>
+                                        <p:strVal val="visible"/>
+                                      </p:to>
+                                    </p:set>
+                                    <p:animEffect transition="in" filter="fade">
+                                      <p:cBhvr>
+                                        <p:cTn id="21" dur="500"/>
+                                        <p:tgtEl>
+                                          <p:spTgt spid="3">
+                                            <p:txEl>
+                                              <p:pRg st="4" end="4"/>
+                                            </p:txEl>
+                                          </p:spTgt>
+                                        </p:tgtEl>
+                                      </p:cBhvr>
+                                    </p:animEffect>
+                                  </p:childTnLst>
+                                </p:cTn>
+                              </p:par>
+                            </p:childTnLst>
+                          </p:cTn>
+                        </p:par>
+                      </p:childTnLst>
+                    </p:cTn>
+                  </p:par>
+                </p:childTnLst>
+              </p:cTn>
+              <p:prevCondLst>
+                <p:cond evt="onPrev" delay="0">
+                  <p:tgtEl>
+                    <p:sldTgt/>
+                  </p:tgtEl>
+                </p:cond>
+              </p:prevCondLst>
+              <p:nextCondLst>
+                <p:cond evt="onNext" delay="0">
+                  <p:tgtEl>
+                    <p:sldTgt/>
+                  </p:tgtEl>
+                </p:cond>
+              </p:nextCondLst>
+            </p:seq>
+          </p:childTnLst>
+        </p:cTn>
+      </p:par>
+    </p:tnLst>
+    <p:bldLst>
+      <p:bldP spid="3" grpId="0" uiExpand="1" build="p"/>
+    </p:bldLst>
+  </p:timing>
+</p:sld>
+</file>
+
+<file path=ppt/slides/slide53.xml><?xml version="1.0" encoding="utf-8"?>
+<p:sld xmlns:a="http://schemas.openxmlformats.org/drawingml/2006/main" xmlns:r="http://schemas.openxmlformats.org/officeDocument/2006/relationships" xmlns:p="http://schemas.openxmlformats.org/presentationml/2006/main">
+  <p:cSld>
+    <p:spTree>
+      <p:nvGrpSpPr>
+        <p:cNvPr id="1" name=""/>
+        <p:cNvGrpSpPr/>
+        <p:nvPr/>
+      </p:nvGrpSpPr>
+      <p:grpSpPr>
+        <a:xfrm>
+          <a:off x="0" y="0"/>
+          <a:ext cx="0" cy="0"/>
+          <a:chOff x="0" y="0"/>
+          <a:chExt cx="0" cy="0"/>
+        </a:xfrm>
+      </p:grpSpPr>
+      <p:sp>
+        <p:nvSpPr>
+          <p:cNvPr id="2" name="Title 1">
+            <a:extLst>
+              <a:ext uri="{FF2B5EF4-FFF2-40B4-BE49-F238E27FC236}">
+                <a16:creationId xmlns:a16="http://schemas.microsoft.com/office/drawing/2014/main" id="{F59FF877-20E4-8B4A-449E-6623E202252E}"/>
+              </a:ext>
+            </a:extLst>
+          </p:cNvPr>
+          <p:cNvSpPr>
+            <a:spLocks noGrp="1"/>
+          </p:cNvSpPr>
+          <p:nvPr>
+            <p:ph type="title"/>
+          </p:nvPr>
+        </p:nvSpPr>
+        <p:spPr/>
+        <p:txBody>
+          <a:bodyPr/>
+          <a:lstStyle/>
+          <a:p>
+            <a:r>
+              <a:rPr lang="en-US" dirty="0"/>
+              <a:t>Unit 9 – Control Templates</a:t>
+            </a:r>
+          </a:p>
+        </p:txBody>
+      </p:sp>
+      <p:sp>
+        <p:nvSpPr>
+          <p:cNvPr id="3" name="Content Placeholder 2">
+            <a:extLst>
+              <a:ext uri="{FF2B5EF4-FFF2-40B4-BE49-F238E27FC236}">
+                <a16:creationId xmlns:a16="http://schemas.microsoft.com/office/drawing/2014/main" id="{0868871B-176D-F38E-E427-624BB5851CDA}"/>
+              </a:ext>
+            </a:extLst>
+          </p:cNvPr>
+          <p:cNvSpPr>
+            <a:spLocks noGrp="1"/>
+          </p:cNvSpPr>
+          <p:nvPr>
+            <p:ph idx="1"/>
+          </p:nvPr>
+        </p:nvSpPr>
+        <p:spPr/>
+        <p:txBody>
+          <a:bodyPr/>
+          <a:lstStyle/>
+          <a:p>
+            <a:r>
+              <a:rPr lang="en-US" dirty="0"/>
+              <a:t>Custom Controls</a:t>
+            </a:r>
+          </a:p>
+          <a:p>
+            <a:pPr lvl="1"/>
+            <a:r>
+              <a:rPr lang="en-US" dirty="0"/>
+              <a:t>Can also create new controls, deriving from existing</a:t>
+            </a:r>
+          </a:p>
+          <a:p>
+            <a:pPr lvl="1"/>
+            <a:r>
+              <a:rPr lang="en-US" dirty="0"/>
+              <a:t>Less common than you would think</a:t>
+            </a:r>
+          </a:p>
+          <a:p>
+            <a:pPr lvl="1"/>
+            <a:r>
+              <a:rPr lang="en-US" dirty="0"/>
+              <a:t>Alternatives to a new control</a:t>
+            </a:r>
+          </a:p>
+          <a:p>
+            <a:pPr lvl="2"/>
+            <a:r>
+              <a:rPr lang="en-US" dirty="0"/>
+              <a:t>Modify properties</a:t>
+            </a:r>
+          </a:p>
+          <a:p>
+            <a:pPr lvl="2"/>
+            <a:r>
+              <a:rPr lang="en-US" dirty="0"/>
+              <a:t>Custom data template</a:t>
+            </a:r>
+          </a:p>
+          <a:p>
+            <a:pPr lvl="2"/>
+            <a:r>
+              <a:rPr lang="en-US" dirty="0"/>
+              <a:t>Custom control template, with new layout and/or triggers</a:t>
+            </a:r>
+          </a:p>
+          <a:p>
+            <a:pPr lvl="2"/>
+            <a:r>
+              <a:rPr lang="en-US" dirty="0"/>
+              <a:t>Custom behavior -- code you write that acts based on events that fire</a:t>
+            </a:r>
+          </a:p>
+        </p:txBody>
+      </p:sp>
+    </p:spTree>
+    <p:extLst>
+      <p:ext uri="{BB962C8B-B14F-4D97-AF65-F5344CB8AC3E}">
+        <p14:creationId xmlns:p14="http://schemas.microsoft.com/office/powerpoint/2010/main" val="2936349123"/>
+      </p:ext>
+    </p:extLst>
+  </p:cSld>
+  <p:clrMapOvr>
+    <a:masterClrMapping/>
+  </p:clrMapOvr>
+  <p:timing>
+    <p:tnLst>
+      <p:par>
+        <p:cTn id="1" dur="indefinite" restart="never" nodeType="tmRoot">
+          <p:childTnLst>
+            <p:seq concurrent="1" nextAc="seek">
+              <p:cTn id="2" dur="indefinite" nodeType="mainSeq">
+                <p:childTnLst>
+                  <p:par>
+                    <p:cTn id="3" fill="hold">
+                      <p:stCondLst>
+                        <p:cond delay="indefinite"/>
+                      </p:stCondLst>
+                      <p:childTnLst>
+                        <p:par>
+                          <p:cTn id="4" fill="hold">
+                            <p:stCondLst>
+                              <p:cond delay="0"/>
+                            </p:stCondLst>
+                            <p:childTnLst>
+                              <p:par>
+                                <p:cTn id="5" presetID="10" presetClass="entr" presetSubtype="0" fill="hold" grpId="0" nodeType="clickEffect">
+                                  <p:stCondLst>
+                                    <p:cond delay="0"/>
+                                  </p:stCondLst>
+                                  <p:childTnLst>
+                                    <p:set>
+                                      <p:cBhvr>
+                                        <p:cTn id="6" dur="1" fill="hold">
+                                          <p:stCondLst>
+                                            <p:cond delay="0"/>
+                                          </p:stCondLst>
+                                        </p:cTn>
+                                        <p:tgtEl>
+                                          <p:spTgt spid="3">
+                                            <p:txEl>
+                                              <p:pRg st="0" end="0"/>
+                                            </p:txEl>
+                                          </p:spTgt>
+                                        </p:tgtEl>
+                                        <p:attrNameLst>
+                                          <p:attrName>style.visibility</p:attrName>
+                                        </p:attrNameLst>
+                                      </p:cBhvr>
+                                      <p:to>
+                                        <p:strVal val="visible"/>
+                                      </p:to>
+                                    </p:set>
+                                    <p:animEffect transition="in" filter="fade">
+                                      <p:cBhvr>
+                                        <p:cTn id="7" dur="500"/>
+                                        <p:tgtEl>
+                                          <p:spTgt spid="3">
+                                            <p:txEl>
+                                              <p:pRg st="0" end="0"/>
+                                            </p:txEl>
+                                          </p:spTgt>
+                                        </p:tgtEl>
+                                      </p:cBhvr>
+                                    </p:animEffect>
+                                  </p:childTnLst>
+                                </p:cTn>
+                              </p:par>
+                            </p:childTnLst>
+                          </p:cTn>
+                        </p:par>
+                      </p:childTnLst>
+                    </p:cTn>
+                  </p:par>
+                  <p:par>
+                    <p:cTn id="8" fill="hold">
+                      <p:stCondLst>
+                        <p:cond delay="indefinite"/>
+                      </p:stCondLst>
+                      <p:childTnLst>
+                        <p:par>
+                          <p:cTn id="9" fill="hold">
+                            <p:stCondLst>
+                              <p:cond delay="0"/>
+                            </p:stCondLst>
+                            <p:childTnLst>
+                              <p:par>
+                                <p:cTn id="10" presetID="10" presetClass="entr" presetSubtype="0" fill="hold" grpId="0" nodeType="clickEffect">
+                                  <p:stCondLst>
+                                    <p:cond delay="0"/>
+                                  </p:stCondLst>
+                                  <p:childTnLst>
+                                    <p:set>
+                                      <p:cBhvr>
+                                        <p:cTn id="11" dur="1" fill="hold">
+                                          <p:stCondLst>
+                                            <p:cond delay="0"/>
+                                          </p:stCondLst>
+                                        </p:cTn>
+                                        <p:tgtEl>
+                                          <p:spTgt spid="3">
+                                            <p:txEl>
+                                              <p:pRg st="1" end="1"/>
+                                            </p:txEl>
+                                          </p:spTgt>
+                                        </p:tgtEl>
+                                        <p:attrNameLst>
+                                          <p:attrName>style.visibility</p:attrName>
+                                        </p:attrNameLst>
+                                      </p:cBhvr>
+                                      <p:to>
+                                        <p:strVal val="visible"/>
+                                      </p:to>
+                                    </p:set>
+                                    <p:animEffect transition="in" filter="fade">
+                                      <p:cBhvr>
+                                        <p:cTn id="12" dur="500"/>
+                                        <p:tgtEl>
+                                          <p:spTgt spid="3">
+                                            <p:txEl>
+                                              <p:pRg st="1" end="1"/>
+                                            </p:txEl>
+                                          </p:spTgt>
+                                        </p:tgtEl>
+                                      </p:cBhvr>
+                                    </p:animEffect>
+                                  </p:childTnLst>
+                                </p:cTn>
+                              </p:par>
+                            </p:childTnLst>
+                          </p:cTn>
+                        </p:par>
+                      </p:childTnLst>
+                    </p:cTn>
+                  </p:par>
+                  <p:par>
+                    <p:cTn id="13" fill="hold">
+                      <p:stCondLst>
+                        <p:cond delay="indefinite"/>
+                      </p:stCondLst>
+                      <p:childTnLst>
+                        <p:par>
+                          <p:cTn id="14" fill="hold">
+                            <p:stCondLst>
+                              <p:cond delay="0"/>
+                            </p:stCondLst>
+                            <p:childTnLst>
+                              <p:par>
+                                <p:cTn id="15" presetID="10" presetClass="entr" presetSubtype="0" fill="hold" grpId="0" nodeType="clickEffect">
+                                  <p:stCondLst>
+                                    <p:cond delay="0"/>
+                                  </p:stCondLst>
+                                  <p:childTnLst>
+                                    <p:set>
+                                      <p:cBhvr>
+                                        <p:cTn id="16" dur="1" fill="hold">
+                                          <p:stCondLst>
+                                            <p:cond delay="0"/>
+                                          </p:stCondLst>
+                                        </p:cTn>
+                                        <p:tgtEl>
+                                          <p:spTgt spid="3">
+                                            <p:txEl>
+                                              <p:pRg st="2" end="2"/>
+                                            </p:txEl>
+                                          </p:spTgt>
+                                        </p:tgtEl>
+                                        <p:attrNameLst>
+                                          <p:attrName>style.visibility</p:attrName>
+                                        </p:attrNameLst>
+                                      </p:cBhvr>
+                                      <p:to>
+                                        <p:strVal val="visible"/>
+                                      </p:to>
+                                    </p:set>
+                                    <p:animEffect transition="in" filter="fade">
+                                      <p:cBhvr>
+                                        <p:cTn id="17" dur="500"/>
+                                        <p:tgtEl>
+                                          <p:spTgt spid="3">
+                                            <p:txEl>
+                                              <p:pRg st="2" end="2"/>
+                                            </p:txEl>
+                                          </p:spTgt>
+                                        </p:tgtEl>
+                                      </p:cBhvr>
+                                    </p:animEffect>
+                                  </p:childTnLst>
+                                </p:cTn>
+                              </p:par>
+                            </p:childTnLst>
+                          </p:cTn>
+                        </p:par>
+                      </p:childTnLst>
+                    </p:cTn>
+                  </p:par>
+                  <p:par>
+                    <p:cTn id="18" fill="hold">
+                      <p:stCondLst>
+                        <p:cond delay="indefinite"/>
+                      </p:stCondLst>
+                      <p:childTnLst>
+                        <p:par>
+                          <p:cTn id="19" fill="hold">
+                            <p:stCondLst>
+                              <p:cond delay="0"/>
+                            </p:stCondLst>
+                            <p:childTnLst>
+                              <p:par>
+                                <p:cTn id="20" presetID="10" presetClass="entr" presetSubtype="0" fill="hold" grpId="0" nodeType="clickEffect">
+                                  <p:stCondLst>
+                                    <p:cond delay="0"/>
+                                  </p:stCondLst>
+                                  <p:childTnLst>
+                                    <p:set>
+                                      <p:cBhvr>
+                                        <p:cTn id="21" dur="1" fill="hold">
+                                          <p:stCondLst>
+                                            <p:cond delay="0"/>
+                                          </p:stCondLst>
+                                        </p:cTn>
+                                        <p:tgtEl>
+                                          <p:spTgt spid="3">
+                                            <p:txEl>
+                                              <p:pRg st="3" end="3"/>
+                                            </p:txEl>
+                                          </p:spTgt>
+                                        </p:tgtEl>
+                                        <p:attrNameLst>
+                                          <p:attrName>style.visibility</p:attrName>
+                                        </p:attrNameLst>
+                                      </p:cBhvr>
+                                      <p:to>
+                                        <p:strVal val="visible"/>
+                                      </p:to>
+                                    </p:set>
+                                    <p:animEffect transition="in" filter="fade">
+                                      <p:cBhvr>
+                                        <p:cTn id="22" dur="500"/>
+                                        <p:tgtEl>
+                                          <p:spTgt spid="3">
+                                            <p:txEl>
+                                              <p:pRg st="3" end="3"/>
+                                            </p:txEl>
+                                          </p:spTgt>
+                                        </p:tgtEl>
+                                      </p:cBhvr>
+                                    </p:animEffect>
+                                  </p:childTnLst>
+                                </p:cTn>
+                              </p:par>
+                              <p:par>
+                                <p:cTn id="23" presetID="10" presetClass="entr" presetSubtype="0" fill="hold" grpId="0" nodeType="withEffect">
+                                  <p:stCondLst>
+                                    <p:cond delay="0"/>
+                                  </p:stCondLst>
+                                  <p:childTnLst>
+                                    <p:set>
+                                      <p:cBhvr>
+                                        <p:cTn id="24" dur="1" fill="hold">
+                                          <p:stCondLst>
+                                            <p:cond delay="0"/>
+                                          </p:stCondLst>
+                                        </p:cTn>
+                                        <p:tgtEl>
+                                          <p:spTgt spid="3">
+                                            <p:txEl>
+                                              <p:pRg st="4" end="4"/>
+                                            </p:txEl>
+                                          </p:spTgt>
+                                        </p:tgtEl>
+                                        <p:attrNameLst>
+                                          <p:attrName>style.visibility</p:attrName>
+                                        </p:attrNameLst>
+                                      </p:cBhvr>
+                                      <p:to>
+                                        <p:strVal val="visible"/>
+                                      </p:to>
+                                    </p:set>
+                                    <p:animEffect transition="in" filter="fade">
+                                      <p:cBhvr>
+                                        <p:cTn id="25" dur="500"/>
+                                        <p:tgtEl>
+                                          <p:spTgt spid="3">
+                                            <p:txEl>
+                                              <p:pRg st="4" end="4"/>
+                                            </p:txEl>
+                                          </p:spTgt>
+                                        </p:tgtEl>
+                                      </p:cBhvr>
+                                    </p:animEffect>
+                                  </p:childTnLst>
+                                </p:cTn>
+                              </p:par>
+                              <p:par>
+                                <p:cTn id="26" presetID="10" presetClass="entr" presetSubtype="0" fill="hold" grpId="0" nodeType="withEffect">
+                                  <p:stCondLst>
+                                    <p:cond delay="0"/>
+                                  </p:stCondLst>
+                                  <p:childTnLst>
+                                    <p:set>
+                                      <p:cBhvr>
+                                        <p:cTn id="27" dur="1" fill="hold">
+                                          <p:stCondLst>
+                                            <p:cond delay="0"/>
+                                          </p:stCondLst>
+                                        </p:cTn>
+                                        <p:tgtEl>
+                                          <p:spTgt spid="3">
+                                            <p:txEl>
+                                              <p:pRg st="5" end="5"/>
+                                            </p:txEl>
+                                          </p:spTgt>
+                                        </p:tgtEl>
+                                        <p:attrNameLst>
+                                          <p:attrName>style.visibility</p:attrName>
+                                        </p:attrNameLst>
+                                      </p:cBhvr>
+                                      <p:to>
+                                        <p:strVal val="visible"/>
+                                      </p:to>
+                                    </p:set>
+                                    <p:animEffect transition="in" filter="fade">
+                                      <p:cBhvr>
+                                        <p:cTn id="28" dur="500"/>
+                                        <p:tgtEl>
+                                          <p:spTgt spid="3">
+                                            <p:txEl>
+                                              <p:pRg st="5" end="5"/>
+                                            </p:txEl>
+                                          </p:spTgt>
+                                        </p:tgtEl>
+                                      </p:cBhvr>
+                                    </p:animEffect>
+                                  </p:childTnLst>
+                                </p:cTn>
+                              </p:par>
+                              <p:par>
+                                <p:cTn id="29" presetID="10" presetClass="entr" presetSubtype="0" fill="hold" grpId="0" nodeType="withEffect">
+                                  <p:stCondLst>
+                                    <p:cond delay="0"/>
+                                  </p:stCondLst>
+                                  <p:childTnLst>
+                                    <p:set>
+                                      <p:cBhvr>
+                                        <p:cTn id="30" dur="1" fill="hold">
+                                          <p:stCondLst>
+                                            <p:cond delay="0"/>
+                                          </p:stCondLst>
+                                        </p:cTn>
+                                        <p:tgtEl>
+                                          <p:spTgt spid="3">
+                                            <p:txEl>
+                                              <p:pRg st="6" end="6"/>
+                                            </p:txEl>
+                                          </p:spTgt>
+                                        </p:tgtEl>
+                                        <p:attrNameLst>
+                                          <p:attrName>style.visibility</p:attrName>
+                                        </p:attrNameLst>
+                                      </p:cBhvr>
+                                      <p:to>
+                                        <p:strVal val="visible"/>
+                                      </p:to>
+                                    </p:set>
+                                    <p:animEffect transition="in" filter="fade">
+                                      <p:cBhvr>
+                                        <p:cTn id="31" dur="500"/>
+                                        <p:tgtEl>
+                                          <p:spTgt spid="3">
+                                            <p:txEl>
+                                              <p:pRg st="6" end="6"/>
+                                            </p:txEl>
+                                          </p:spTgt>
+                                        </p:tgtEl>
+                                      </p:cBhvr>
+                                    </p:animEffect>
+                                  </p:childTnLst>
+                                </p:cTn>
+                              </p:par>
+                              <p:par>
+                                <p:cTn id="32" presetID="10" presetClass="entr" presetSubtype="0" fill="hold" grpId="0" nodeType="withEffect">
+                                  <p:stCondLst>
+                                    <p:cond delay="0"/>
+                                  </p:stCondLst>
+                                  <p:childTnLst>
+                                    <p:set>
+                                      <p:cBhvr>
+                                        <p:cTn id="33" dur="1" fill="hold">
+                                          <p:stCondLst>
+                                            <p:cond delay="0"/>
+                                          </p:stCondLst>
+                                        </p:cTn>
+                                        <p:tgtEl>
+                                          <p:spTgt spid="3">
+                                            <p:txEl>
+                                              <p:pRg st="7" end="7"/>
+                                            </p:txEl>
+                                          </p:spTgt>
+                                        </p:tgtEl>
+                                        <p:attrNameLst>
+                                          <p:attrName>style.visibility</p:attrName>
+                                        </p:attrNameLst>
+                                      </p:cBhvr>
+                                      <p:to>
+                                        <p:strVal val="visible"/>
+                                      </p:to>
+                                    </p:set>
+                                    <p:animEffect transition="in" filter="fade">
+                                      <p:cBhvr>
+                                        <p:cTn id="34" dur="500"/>
+                                        <p:tgtEl>
+                                          <p:spTgt spid="3">
+                                            <p:txEl>
+                                              <p:pRg st="7" end="7"/>
+                                            </p:txEl>
+                                          </p:spTgt>
+                                        </p:tgtEl>
+                                      </p:cBhvr>
+                                    </p:animEffect>
+                                  </p:childTnLst>
+                                </p:cTn>
+                              </p:par>
+                            </p:childTnLst>
+                          </p:cTn>
+                        </p:par>
+                      </p:childTnLst>
+                    </p:cTn>
+                  </p:par>
+                </p:childTnLst>
+              </p:cTn>
+              <p:prevCondLst>
+                <p:cond evt="onPrev" delay="0">
+                  <p:tgtEl>
+                    <p:sldTgt/>
+                  </p:tgtEl>
+                </p:cond>
+              </p:prevCondLst>
+              <p:nextCondLst>
+                <p:cond evt="onNext" delay="0">
+                  <p:tgtEl>
+                    <p:sldTgt/>
+                  </p:tgtEl>
+                </p:cond>
+              </p:nextCondLst>
+            </p:seq>
+          </p:childTnLst>
+        </p:cTn>
+      </p:par>
+    </p:tnLst>
+    <p:bldLst>
+      <p:bldP spid="3" grpId="0" uiExpand="1" build="p"/>
+    </p:bldLst>
+  </p:timing>
+</p:sld>
+</file>
+
+<file path=ppt/slides/slide54.xml><?xml version="1.0" encoding="utf-8"?>
+<p:sld xmlns:a="http://schemas.openxmlformats.org/drawingml/2006/main" xmlns:r="http://schemas.openxmlformats.org/officeDocument/2006/relationships" xmlns:p="http://schemas.openxmlformats.org/presentationml/2006/main">
+  <p:cSld>
+    <p:spTree>
+      <p:nvGrpSpPr>
+        <p:cNvPr id="1" name=""/>
+        <p:cNvGrpSpPr/>
+        <p:nvPr/>
+      </p:nvGrpSpPr>
+      <p:grpSpPr>
+        <a:xfrm>
+          <a:off x="0" y="0"/>
+          <a:ext cx="0" cy="0"/>
+          <a:chOff x="0" y="0"/>
+          <a:chExt cx="0" cy="0"/>
+        </a:xfrm>
+      </p:grpSpPr>
+      <p:sp>
+        <p:nvSpPr>
+          <p:cNvPr id="2" name="Title 1">
+            <a:extLst>
+              <a:ext uri="{FF2B5EF4-FFF2-40B4-BE49-F238E27FC236}">
+                <a16:creationId xmlns:a16="http://schemas.microsoft.com/office/drawing/2014/main" id="{DAB2E2A9-A919-23DC-05E9-34152C57034B}"/>
+              </a:ext>
+            </a:extLst>
+          </p:cNvPr>
+          <p:cNvSpPr>
+            <a:spLocks noGrp="1"/>
+          </p:cNvSpPr>
+          <p:nvPr>
+            <p:ph type="title"/>
+          </p:nvPr>
+        </p:nvSpPr>
+        <p:spPr/>
+        <p:txBody>
+          <a:bodyPr/>
+          <a:lstStyle/>
+          <a:p>
+            <a:r>
+              <a:rPr lang="en-US" dirty="0">
+                <a:solidFill>
+                  <a:schemeClr val="accent5">
+                    <a:lumMod val="75000"/>
+                  </a:schemeClr>
+                </a:solidFill>
+              </a:rPr>
+              <a:t>Exercise 9 – Control Templates</a:t>
+            </a:r>
+          </a:p>
+        </p:txBody>
+      </p:sp>
+      <p:sp>
+        <p:nvSpPr>
+          <p:cNvPr id="3" name="Content Placeholder 2">
+            <a:extLst>
+              <a:ext uri="{FF2B5EF4-FFF2-40B4-BE49-F238E27FC236}">
+                <a16:creationId xmlns:a16="http://schemas.microsoft.com/office/drawing/2014/main" id="{16E1AD3B-3883-78D8-D579-5B1EB3804C9C}"/>
+              </a:ext>
+            </a:extLst>
+          </p:cNvPr>
+          <p:cNvSpPr>
+            <a:spLocks noGrp="1"/>
+          </p:cNvSpPr>
+          <p:nvPr>
+            <p:ph idx="1"/>
+          </p:nvPr>
+        </p:nvSpPr>
+        <p:spPr/>
+        <p:txBody>
+          <a:bodyPr/>
+          <a:lstStyle/>
+          <a:p>
+            <a:r>
+              <a:rPr lang="en-US" dirty="0"/>
+              <a:t>What You’ll Learn</a:t>
+            </a:r>
+          </a:p>
+          <a:p>
+            <a:pPr lvl="1"/>
+            <a:r>
+              <a:rPr lang="en-US" dirty="0"/>
+              <a:t>How to override a default control template</a:t>
+            </a:r>
+          </a:p>
+          <a:p>
+            <a:r>
+              <a:rPr lang="en-US" dirty="0"/>
+              <a:t>Exercise</a:t>
+            </a:r>
+          </a:p>
+          <a:p>
+            <a:pPr lvl="1"/>
+            <a:r>
+              <a:rPr lang="en-US" dirty="0"/>
+              <a:t>Create a new WPF Application project</a:t>
+            </a:r>
+          </a:p>
+          <a:p>
+            <a:pPr lvl="1"/>
+            <a:r>
+              <a:rPr lang="en-US" dirty="0"/>
+              <a:t>Add a Button to the project</a:t>
+            </a:r>
+          </a:p>
+          <a:p>
+            <a:pPr lvl="1"/>
+            <a:r>
+              <a:rPr lang="en-US" dirty="0"/>
+              <a:t>Override the control template for the Button</a:t>
+            </a:r>
+          </a:p>
+          <a:p>
+            <a:pPr lvl="1"/>
+            <a:r>
+              <a:rPr lang="en-US" dirty="0"/>
+              <a:t>Verify that the application still functions as expected</a:t>
+            </a:r>
+          </a:p>
+          <a:p>
+            <a:pPr lvl="1"/>
+            <a:r>
+              <a:rPr lang="en-US" dirty="0"/>
+              <a:t>Modifications to control template</a:t>
+            </a:r>
+          </a:p>
+        </p:txBody>
+      </p:sp>
+    </p:spTree>
+    <p:extLst>
+      <p:ext uri="{BB962C8B-B14F-4D97-AF65-F5344CB8AC3E}">
+        <p14:creationId xmlns:p14="http://schemas.microsoft.com/office/powerpoint/2010/main" val="1151517676"/>
+      </p:ext>
+    </p:extLst>
+  </p:cSld>
+  <p:clrMapOvr>
+    <a:masterClrMapping/>
+  </p:clrMapOvr>
+</p:sld>
+</file>
+
+<file path=ppt/slides/slide55.xml><?xml version="1.0" encoding="utf-8"?>
+<p:sld xmlns:a="http://schemas.openxmlformats.org/drawingml/2006/main" xmlns:r="http://schemas.openxmlformats.org/officeDocument/2006/relationships" xmlns:p="http://schemas.openxmlformats.org/presentationml/2006/main">
+  <p:cSld>
+    <p:spTree>
+      <p:nvGrpSpPr>
+        <p:cNvPr id="1" name=""/>
+        <p:cNvGrpSpPr/>
+        <p:nvPr/>
+      </p:nvGrpSpPr>
+      <p:grpSpPr>
+        <a:xfrm>
+          <a:off x="0" y="0"/>
+          <a:ext cx="0" cy="0"/>
+          <a:chOff x="0" y="0"/>
+          <a:chExt cx="0" cy="0"/>
+        </a:xfrm>
+      </p:grpSpPr>
+      <p:sp>
+        <p:nvSpPr>
+          <p:cNvPr id="2" name="Title 1">
+            <a:extLst>
+              <a:ext uri="{FF2B5EF4-FFF2-40B4-BE49-F238E27FC236}">
+                <a16:creationId xmlns:a16="http://schemas.microsoft.com/office/drawing/2014/main" id="{DCC41D7C-26CA-9771-A162-2B75073DF19E}"/>
+              </a:ext>
+            </a:extLst>
+          </p:cNvPr>
+          <p:cNvSpPr>
+            <a:spLocks noGrp="1"/>
+          </p:cNvSpPr>
+          <p:nvPr>
+            <p:ph type="title"/>
+          </p:nvPr>
+        </p:nvSpPr>
+        <p:spPr/>
+        <p:txBody>
+          <a:bodyPr/>
+          <a:lstStyle/>
+          <a:p>
+            <a:r>
+              <a:rPr lang="en-US" dirty="0"/>
+              <a:t>Summary</a:t>
+            </a:r>
+          </a:p>
+        </p:txBody>
+      </p:sp>
+      <p:sp>
+        <p:nvSpPr>
+          <p:cNvPr id="3" name="Content Placeholder 2">
+            <a:extLst>
+              <a:ext uri="{FF2B5EF4-FFF2-40B4-BE49-F238E27FC236}">
+                <a16:creationId xmlns:a16="http://schemas.microsoft.com/office/drawing/2014/main" id="{5993DAB6-9FB3-C466-2E24-87FE49605FB4}"/>
+              </a:ext>
+            </a:extLst>
+          </p:cNvPr>
+          <p:cNvSpPr>
+            <a:spLocks noGrp="1"/>
+          </p:cNvSpPr>
+          <p:nvPr>
+            <p:ph idx="1"/>
+          </p:nvPr>
+        </p:nvSpPr>
+        <p:spPr/>
+        <p:txBody>
+          <a:bodyPr/>
+          <a:lstStyle/>
+          <a:p>
+            <a:r>
+              <a:rPr lang="en-US" dirty="0"/>
+              <a:t>What We've Learned</a:t>
+            </a:r>
+          </a:p>
+          <a:p>
+            <a:pPr lvl="1"/>
+            <a:r>
+              <a:rPr lang="en-US" dirty="0"/>
+              <a:t>Core WPF topics + some best practices</a:t>
+            </a:r>
+          </a:p>
+          <a:p>
+            <a:pPr lvl="1"/>
+            <a:r>
+              <a:rPr lang="en-US" dirty="0"/>
+              <a:t>Enough to build a basic WPF application</a:t>
+            </a:r>
+          </a:p>
+        </p:txBody>
+      </p:sp>
+    </p:spTree>
+    <p:extLst>
+      <p:ext uri="{BB962C8B-B14F-4D97-AF65-F5344CB8AC3E}">
+        <p14:creationId xmlns:p14="http://schemas.microsoft.com/office/powerpoint/2010/main" val="3128347606"/>
+      </p:ext>
+    </p:extLst>
+  </p:cSld>
+  <p:clrMapOvr>
+    <a:masterClrMapping/>
+  </p:clrMapOvr>
+</p:sld>
+</file>
+
+<file path=ppt/slides/slide56.xml><?xml version="1.0" encoding="utf-8"?>
+<p:sld xmlns:a="http://schemas.openxmlformats.org/drawingml/2006/main" xmlns:r="http://schemas.openxmlformats.org/officeDocument/2006/relationships" xmlns:p="http://schemas.openxmlformats.org/presentationml/2006/main">
+  <p:cSld>
+    <p:spTree>
+      <p:nvGrpSpPr>
+        <p:cNvPr id="1" name=""/>
+        <p:cNvGrpSpPr/>
+        <p:nvPr/>
+      </p:nvGrpSpPr>
+      <p:grpSpPr>
+        <a:xfrm>
+          <a:off x="0" y="0"/>
+          <a:ext cx="0" cy="0"/>
+          <a:chOff x="0" y="0"/>
+          <a:chExt cx="0" cy="0"/>
+        </a:xfrm>
+      </p:grpSpPr>
+      <p:sp>
+        <p:nvSpPr>
+          <p:cNvPr id="2" name="Title 1">
+            <a:extLst>
+              <a:ext uri="{FF2B5EF4-FFF2-40B4-BE49-F238E27FC236}">
+                <a16:creationId xmlns:a16="http://schemas.microsoft.com/office/drawing/2014/main" id="{08D352D9-E1DB-9874-CCC0-B29DBB573F0C}"/>
+              </a:ext>
+            </a:extLst>
+          </p:cNvPr>
+          <p:cNvSpPr>
+            <a:spLocks noGrp="1"/>
+          </p:cNvSpPr>
+          <p:nvPr>
+            <p:ph type="title"/>
+          </p:nvPr>
+        </p:nvSpPr>
+        <p:spPr/>
+        <p:txBody>
+          <a:bodyPr/>
+          <a:lstStyle/>
+          <a:p>
+            <a:r>
+              <a:rPr lang="en-US" dirty="0"/>
+              <a:t>Summary</a:t>
+            </a:r>
+          </a:p>
+        </p:txBody>
+      </p:sp>
+      <p:sp>
+        <p:nvSpPr>
+          <p:cNvPr id="3" name="Content Placeholder 2">
+            <a:extLst>
+              <a:ext uri="{FF2B5EF4-FFF2-40B4-BE49-F238E27FC236}">
+                <a16:creationId xmlns:a16="http://schemas.microsoft.com/office/drawing/2014/main" id="{FD21A499-6705-F3E5-AA2B-64890C3C687C}"/>
+              </a:ext>
+            </a:extLst>
+          </p:cNvPr>
+          <p:cNvSpPr>
+            <a:spLocks noGrp="1"/>
+          </p:cNvSpPr>
+          <p:nvPr>
+            <p:ph idx="1"/>
+          </p:nvPr>
+        </p:nvSpPr>
+        <p:spPr/>
+        <p:txBody>
+          <a:bodyPr>
+            <a:normAutofit fontScale="92500" lnSpcReduction="20000"/>
+          </a:bodyPr>
+          <a:lstStyle/>
+          <a:p>
+            <a:r>
+              <a:rPr lang="en-US" dirty="0"/>
+              <a:t>Not Covered – Other WPF core topics</a:t>
+            </a:r>
+          </a:p>
+          <a:p>
+            <a:pPr lvl="1"/>
+            <a:r>
+              <a:rPr lang="en-US" dirty="0"/>
+              <a:t>Other layout containers -- </a:t>
+            </a:r>
+            <a:r>
+              <a:rPr lang="en-US" dirty="0" err="1"/>
+              <a:t>DockPanel</a:t>
+            </a:r>
+            <a:r>
+              <a:rPr lang="en-US" dirty="0"/>
+              <a:t>, </a:t>
+            </a:r>
+            <a:r>
+              <a:rPr lang="en-US" dirty="0" err="1"/>
+              <a:t>WrapPanel</a:t>
+            </a:r>
+            <a:r>
+              <a:rPr lang="en-US" dirty="0"/>
+              <a:t> et al</a:t>
+            </a:r>
+          </a:p>
+          <a:p>
+            <a:pPr lvl="1"/>
+            <a:r>
+              <a:rPr lang="en-US" dirty="0" err="1"/>
+              <a:t>GridSplitter</a:t>
+            </a:r>
+            <a:r>
+              <a:rPr lang="en-US" dirty="0"/>
+              <a:t>, Routed events, custom controls, dependency properties</a:t>
+            </a:r>
+          </a:p>
+          <a:p>
+            <a:pPr lvl="1"/>
+            <a:r>
+              <a:rPr lang="en-US" dirty="0"/>
+              <a:t>Keyboard input and focus, fonts, gradient brushes, alpha channel in color</a:t>
+            </a:r>
+          </a:p>
+          <a:p>
+            <a:pPr lvl="1"/>
+            <a:r>
+              <a:rPr lang="en-US" dirty="0"/>
+              <a:t>Embedding resources, pack URIs, localization support</a:t>
+            </a:r>
+          </a:p>
+          <a:p>
+            <a:pPr lvl="1"/>
+            <a:r>
+              <a:rPr lang="en-US" dirty="0"/>
+              <a:t>Data binding - </a:t>
+            </a:r>
+            <a:r>
+              <a:rPr lang="en-US" dirty="0" err="1"/>
+              <a:t>TemplateBinding</a:t>
+            </a:r>
+            <a:r>
+              <a:rPr lang="en-US" dirty="0"/>
+              <a:t>, Source, </a:t>
+            </a:r>
+            <a:r>
+              <a:rPr lang="en-US" dirty="0" err="1"/>
+              <a:t>RelativeSource</a:t>
+            </a:r>
+            <a:endParaRPr lang="en-US" dirty="0"/>
+          </a:p>
+          <a:p>
+            <a:pPr lvl="1"/>
+            <a:r>
+              <a:rPr lang="en-US" dirty="0"/>
+              <a:t>Resource management - </a:t>
+            </a:r>
+            <a:r>
+              <a:rPr lang="en-US" dirty="0" err="1"/>
+              <a:t>ResourceDictionary</a:t>
+            </a:r>
+            <a:r>
+              <a:rPr lang="en-US" dirty="0"/>
+              <a:t>, dictionaries from code</a:t>
+            </a:r>
+          </a:p>
+          <a:p>
+            <a:pPr lvl="1"/>
+            <a:r>
+              <a:rPr lang="en-US" dirty="0"/>
+              <a:t>Triggers, Behaviors, Value converters</a:t>
+            </a:r>
+          </a:p>
+          <a:p>
+            <a:pPr lvl="1"/>
+            <a:r>
+              <a:rPr lang="en-US" dirty="0"/>
+              <a:t>Icons and images, validation</a:t>
+            </a:r>
+          </a:p>
+          <a:p>
+            <a:pPr lvl="1"/>
+            <a:r>
+              <a:rPr lang="en-US" dirty="0" err="1"/>
+              <a:t>ContentPresenter</a:t>
+            </a:r>
+            <a:r>
+              <a:rPr lang="en-US" dirty="0"/>
+              <a:t>, content templates, data template selectors</a:t>
+            </a:r>
+          </a:p>
+          <a:p>
+            <a:pPr lvl="1"/>
+            <a:r>
+              <a:rPr lang="en-US" dirty="0"/>
+              <a:t>Menus, Toolbars, Ribbons</a:t>
+            </a:r>
+          </a:p>
+          <a:p>
+            <a:pPr lvl="1"/>
+            <a:r>
+              <a:rPr lang="en-US" dirty="0"/>
+              <a:t>Asynchronous programming</a:t>
+            </a:r>
+          </a:p>
+          <a:p>
+            <a:pPr lvl="1"/>
+            <a:endParaRPr lang="en-US" dirty="0"/>
+          </a:p>
+          <a:p>
+            <a:pPr lvl="1"/>
+            <a:endParaRPr lang="en-US" dirty="0"/>
+          </a:p>
+        </p:txBody>
+      </p:sp>
+    </p:spTree>
+    <p:extLst>
+      <p:ext uri="{BB962C8B-B14F-4D97-AF65-F5344CB8AC3E}">
+        <p14:creationId xmlns:p14="http://schemas.microsoft.com/office/powerpoint/2010/main" val="2705254462"/>
+      </p:ext>
+    </p:extLst>
+  </p:cSld>
+  <p:clrMapOvr>
+    <a:masterClrMapping/>
+  </p:clrMapOvr>
+</p:sld>
+</file>
+
+<file path=ppt/slides/slide57.xml><?xml version="1.0" encoding="utf-8"?>
+<p:sld xmlns:a="http://schemas.openxmlformats.org/drawingml/2006/main" xmlns:r="http://schemas.openxmlformats.org/officeDocument/2006/relationships" xmlns:p="http://schemas.openxmlformats.org/presentationml/2006/main">
+  <p:cSld>
+    <p:spTree>
+      <p:nvGrpSpPr>
+        <p:cNvPr id="1" name=""/>
+        <p:cNvGrpSpPr/>
+        <p:nvPr/>
+      </p:nvGrpSpPr>
+      <p:grpSpPr>
+        <a:xfrm>
+          <a:off x="0" y="0"/>
+          <a:ext cx="0" cy="0"/>
+          <a:chOff x="0" y="0"/>
+          <a:chExt cx="0" cy="0"/>
+        </a:xfrm>
+      </p:grpSpPr>
+      <p:sp>
+        <p:nvSpPr>
+          <p:cNvPr id="2" name="Title 1">
+            <a:extLst>
+              <a:ext uri="{FF2B5EF4-FFF2-40B4-BE49-F238E27FC236}">
+                <a16:creationId xmlns:a16="http://schemas.microsoft.com/office/drawing/2014/main" id="{6D185DBF-80FF-C45E-6F3C-11DB24B36758}"/>
+              </a:ext>
+            </a:extLst>
+          </p:cNvPr>
+          <p:cNvSpPr>
+            <a:spLocks noGrp="1"/>
+          </p:cNvSpPr>
+          <p:nvPr>
+            <p:ph type="title"/>
+          </p:nvPr>
+        </p:nvSpPr>
+        <p:spPr/>
+        <p:txBody>
+          <a:bodyPr/>
+          <a:lstStyle/>
+          <a:p>
+            <a:r>
+              <a:rPr lang="en-US" dirty="0"/>
+              <a:t>Summary</a:t>
+            </a:r>
+          </a:p>
+        </p:txBody>
+      </p:sp>
+      <p:sp>
+        <p:nvSpPr>
+          <p:cNvPr id="3" name="Content Placeholder 2">
+            <a:extLst>
+              <a:ext uri="{FF2B5EF4-FFF2-40B4-BE49-F238E27FC236}">
+                <a16:creationId xmlns:a16="http://schemas.microsoft.com/office/drawing/2014/main" id="{9E25807D-DB63-976C-D645-2525C430D1AB}"/>
+              </a:ext>
+            </a:extLst>
+          </p:cNvPr>
+          <p:cNvSpPr>
+            <a:spLocks noGrp="1"/>
+          </p:cNvSpPr>
+          <p:nvPr>
+            <p:ph idx="1"/>
+          </p:nvPr>
+        </p:nvSpPr>
+        <p:spPr/>
+        <p:txBody>
+          <a:bodyPr/>
+          <a:lstStyle/>
+          <a:p>
+            <a:r>
+              <a:rPr lang="en-US" dirty="0"/>
+              <a:t>Not covered – outside WPF</a:t>
+            </a:r>
+          </a:p>
+          <a:p>
+            <a:pPr lvl="1"/>
+            <a:r>
+              <a:rPr lang="en-US" dirty="0"/>
+              <a:t>Patterns for dirty, load / save</a:t>
+            </a:r>
+          </a:p>
+          <a:p>
+            <a:pPr lvl="1"/>
+            <a:r>
+              <a:rPr lang="en-US" dirty="0"/>
+              <a:t>File IO</a:t>
+            </a:r>
+          </a:p>
+          <a:p>
+            <a:pPr lvl="1"/>
+            <a:r>
+              <a:rPr lang="en-US" dirty="0"/>
+              <a:t>C# patterns and practices</a:t>
+            </a:r>
+          </a:p>
+          <a:p>
+            <a:pPr lvl="1"/>
+            <a:r>
+              <a:rPr lang="en-US" dirty="0"/>
+              <a:t>Architecture - patterns for Model layer</a:t>
+            </a:r>
+          </a:p>
+          <a:p>
+            <a:pPr lvl="1"/>
+            <a:r>
+              <a:rPr lang="en-US" dirty="0"/>
+              <a:t>Deployment</a:t>
+            </a:r>
+          </a:p>
+        </p:txBody>
+      </p:sp>
+    </p:spTree>
+    <p:extLst>
+      <p:ext uri="{BB962C8B-B14F-4D97-AF65-F5344CB8AC3E}">
+        <p14:creationId xmlns:p14="http://schemas.microsoft.com/office/powerpoint/2010/main" val="2446652650"/>
+      </p:ext>
+    </p:extLst>
+  </p:cSld>
+  <p:clrMapOvr>
+    <a:masterClrMapping/>
+  </p:clrMapOvr>
+</p:sld>
+</file>
+
+<file path=ppt/slides/slide58.xml><?xml version="1.0" encoding="utf-8"?>
+<p:sld xmlns:a="http://schemas.openxmlformats.org/drawingml/2006/main" xmlns:r="http://schemas.openxmlformats.org/officeDocument/2006/relationships" xmlns:p="http://schemas.openxmlformats.org/presentationml/2006/main">
+  <p:cSld>
+    <p:spTree>
+      <p:nvGrpSpPr>
+        <p:cNvPr id="1" name=""/>
+        <p:cNvGrpSpPr/>
+        <p:nvPr/>
+      </p:nvGrpSpPr>
+      <p:grpSpPr>
+        <a:xfrm>
+          <a:off x="0" y="0"/>
+          <a:ext cx="0" cy="0"/>
+          <a:chOff x="0" y="0"/>
+          <a:chExt cx="0" cy="0"/>
+        </a:xfrm>
+      </p:grpSpPr>
+      <p:sp>
+        <p:nvSpPr>
+          <p:cNvPr id="2" name="Title 1">
+            <a:extLst>
+              <a:ext uri="{FF2B5EF4-FFF2-40B4-BE49-F238E27FC236}">
+                <a16:creationId xmlns:a16="http://schemas.microsoft.com/office/drawing/2014/main" id="{7F151C4E-91F2-BBF6-45E4-5D3173551F0D}"/>
+              </a:ext>
+            </a:extLst>
+          </p:cNvPr>
+          <p:cNvSpPr>
+            <a:spLocks noGrp="1"/>
+          </p:cNvSpPr>
+          <p:nvPr>
+            <p:ph type="title"/>
+          </p:nvPr>
+        </p:nvSpPr>
+        <p:spPr/>
+        <p:txBody>
+          <a:bodyPr/>
+          <a:lstStyle/>
+          <a:p>
+            <a:r>
+              <a:rPr lang="en-US" dirty="0"/>
+              <a:t>Summary</a:t>
+            </a:r>
+          </a:p>
+        </p:txBody>
+      </p:sp>
+      <p:sp>
+        <p:nvSpPr>
+          <p:cNvPr id="3" name="Content Placeholder 2">
+            <a:extLst>
+              <a:ext uri="{FF2B5EF4-FFF2-40B4-BE49-F238E27FC236}">
+                <a16:creationId xmlns:a16="http://schemas.microsoft.com/office/drawing/2014/main" id="{7783314F-35A8-5969-1FEC-75B805536C7D}"/>
+              </a:ext>
+            </a:extLst>
+          </p:cNvPr>
+          <p:cNvSpPr>
+            <a:spLocks noGrp="1"/>
+          </p:cNvSpPr>
+          <p:nvPr>
+            <p:ph idx="1"/>
+          </p:nvPr>
+        </p:nvSpPr>
+        <p:spPr/>
+        <p:txBody>
+          <a:bodyPr/>
+          <a:lstStyle/>
+          <a:p>
+            <a:r>
+              <a:rPr lang="en-US" dirty="0"/>
+              <a:t>Takeaways</a:t>
+            </a:r>
+          </a:p>
+          <a:p>
+            <a:pPr lvl="1"/>
+            <a:r>
+              <a:rPr lang="en-US" dirty="0"/>
+              <a:t>Is UI easy or difficult with WPF?</a:t>
+            </a:r>
+          </a:p>
+          <a:p>
+            <a:pPr lvl="1"/>
+            <a:r>
+              <a:rPr lang="en-US" dirty="0"/>
+              <a:t>Powerful - easy to quickly create custom </a:t>
+            </a:r>
+            <a:r>
+              <a:rPr lang="en-US" dirty="0" err="1"/>
+              <a:t>Uis</a:t>
+            </a:r>
+            <a:endParaRPr lang="en-US" dirty="0"/>
+          </a:p>
+          <a:p>
+            <a:pPr lvl="1"/>
+            <a:r>
+              <a:rPr lang="en-US" dirty="0"/>
+              <a:t>Challenge - still takes considerable time</a:t>
+            </a:r>
+          </a:p>
+          <a:p>
+            <a:pPr lvl="2"/>
+            <a:r>
+              <a:rPr lang="en-US" dirty="0"/>
+              <a:t>Not because it's WPF, not due to doing custom stuff</a:t>
+            </a:r>
+          </a:p>
+          <a:p>
+            <a:pPr lvl="2"/>
+            <a:r>
+              <a:rPr lang="en-US" b="1" dirty="0"/>
+              <a:t>Implementing UI patterns takes time </a:t>
+            </a:r>
+            <a:r>
+              <a:rPr lang="en-US" dirty="0"/>
+              <a:t>-- on any platform</a:t>
+            </a:r>
+          </a:p>
+          <a:p>
+            <a:pPr lvl="1"/>
+            <a:r>
+              <a:rPr lang="en-US" dirty="0"/>
+              <a:t>WPF makes many things easier than other frameworks</a:t>
+            </a:r>
+          </a:p>
+          <a:p>
+            <a:r>
+              <a:rPr lang="en-US" dirty="0">
+                <a:solidFill>
+                  <a:srgbClr val="00B050"/>
+                </a:solidFill>
+              </a:rPr>
+              <a:t>Demo – Print Wizard</a:t>
+            </a:r>
+          </a:p>
+        </p:txBody>
+      </p:sp>
+    </p:spTree>
+    <p:extLst>
+      <p:ext uri="{BB962C8B-B14F-4D97-AF65-F5344CB8AC3E}">
+        <p14:creationId xmlns:p14="http://schemas.microsoft.com/office/powerpoint/2010/main" val="127590695"/>
+      </p:ext>
+    </p:extLst>
+  </p:cSld>
+  <p:clrMapOvr>
+    <a:masterClrMapping/>
+  </p:clrMapOvr>
+</p:sld>
+</file>
+
+<file path=ppt/slides/slide59.xml><?xml version="1.0" encoding="utf-8"?>
+<p:sld xmlns:a="http://schemas.openxmlformats.org/drawingml/2006/main" xmlns:r="http://schemas.openxmlformats.org/officeDocument/2006/relationships" xmlns:p="http://schemas.openxmlformats.org/presentationml/2006/main">
+  <p:cSld>
+    <p:spTree>
+      <p:nvGrpSpPr>
+        <p:cNvPr id="1" name=""/>
+        <p:cNvGrpSpPr/>
+        <p:nvPr/>
+      </p:nvGrpSpPr>
+      <p:grpSpPr>
+        <a:xfrm>
+          <a:off x="0" y="0"/>
+          <a:ext cx="0" cy="0"/>
+          <a:chOff x="0" y="0"/>
+          <a:chExt cx="0" cy="0"/>
+        </a:xfrm>
+      </p:grpSpPr>
+      <p:sp>
+        <p:nvSpPr>
+          <p:cNvPr id="2" name="Title 1">
+            <a:extLst>
+              <a:ext uri="{FF2B5EF4-FFF2-40B4-BE49-F238E27FC236}">
+                <a16:creationId xmlns:a16="http://schemas.microsoft.com/office/drawing/2014/main" id="{3AA16D51-4043-A7ED-6E84-2A74F2299AFD}"/>
+              </a:ext>
+            </a:extLst>
+          </p:cNvPr>
+          <p:cNvSpPr>
+            <a:spLocks noGrp="1"/>
+          </p:cNvSpPr>
+          <p:nvPr>
+            <p:ph type="title"/>
+          </p:nvPr>
+        </p:nvSpPr>
+        <p:spPr/>
+        <p:txBody>
+          <a:bodyPr/>
+          <a:lstStyle/>
+          <a:p>
+            <a:r>
+              <a:rPr lang="en-US" dirty="0"/>
+              <a:t>Resources</a:t>
+            </a:r>
+          </a:p>
+        </p:txBody>
+      </p:sp>
+      <p:sp>
+        <p:nvSpPr>
+          <p:cNvPr id="3" name="Content Placeholder 2">
+            <a:extLst>
+              <a:ext uri="{FF2B5EF4-FFF2-40B4-BE49-F238E27FC236}">
+                <a16:creationId xmlns:a16="http://schemas.microsoft.com/office/drawing/2014/main" id="{6BC115AB-6ED0-5977-2931-A14583B8BF87}"/>
+              </a:ext>
+            </a:extLst>
+          </p:cNvPr>
+          <p:cNvSpPr>
+            <a:spLocks noGrp="1"/>
+          </p:cNvSpPr>
+          <p:nvPr>
+            <p:ph idx="1"/>
+          </p:nvPr>
+        </p:nvSpPr>
+        <p:spPr/>
+        <p:txBody>
+          <a:bodyPr>
+            <a:normAutofit lnSpcReduction="10000"/>
+          </a:bodyPr>
+          <a:lstStyle/>
+          <a:p>
+            <a:r>
+              <a:rPr lang="en-US" dirty="0" err="1"/>
+              <a:t>Github</a:t>
+            </a:r>
+            <a:r>
+              <a:rPr lang="en-US" dirty="0"/>
+              <a:t> repos with materials from today</a:t>
+            </a:r>
+          </a:p>
+          <a:p>
+            <a:pPr lvl="1"/>
+            <a:r>
+              <a:rPr lang="en-US" dirty="0">
+                <a:hlinkClick r:id="rId3"/>
+              </a:rPr>
+              <a:t>https://github.com/seanpsexton/wpf-workshop</a:t>
+            </a:r>
+            <a:endParaRPr lang="en-US" dirty="0"/>
+          </a:p>
+          <a:p>
+            <a:pPr lvl="1"/>
+            <a:r>
+              <a:rPr lang="en-US" dirty="0">
+                <a:hlinkClick r:id="rId4"/>
+              </a:rPr>
+              <a:t>https://github.com/seanpsexton/wpf-workshop-solutions</a:t>
+            </a:r>
+            <a:endParaRPr lang="en-US" dirty="0"/>
+          </a:p>
+          <a:p>
+            <a:r>
+              <a:rPr lang="en-US" dirty="0"/>
+              <a:t>Materials also copied to</a:t>
+            </a:r>
+          </a:p>
+          <a:p>
+            <a:pPr lvl="1"/>
+            <a:r>
+              <a:rPr lang="en-US" dirty="0">
+                <a:hlinkClick r:id="rId5" action="ppaction://hlinkfile"/>
+              </a:rPr>
+              <a:t>\\msp02-fs01\mtsdepartments\Oslo\Training\WPF-Workshop-Sexton-Oct2023</a:t>
+            </a:r>
+            <a:endParaRPr lang="en-US" dirty="0"/>
+          </a:p>
+          <a:p>
+            <a:r>
+              <a:rPr lang="en-US" dirty="0"/>
+              <a:t>Online – many resources</a:t>
+            </a:r>
+          </a:p>
+          <a:p>
+            <a:pPr lvl="1"/>
+            <a:r>
+              <a:rPr lang="en-US" dirty="0">
+                <a:hlinkClick r:id="rId6"/>
+              </a:rPr>
+              <a:t>https://learn.microsoft.com</a:t>
+            </a:r>
+            <a:endParaRPr lang="en-US" dirty="0"/>
+          </a:p>
+          <a:p>
+            <a:pPr lvl="1"/>
+            <a:r>
+              <a:rPr lang="en-US" dirty="0">
+                <a:hlinkClick r:id="rId7"/>
+              </a:rPr>
+              <a:t>https://www.wpftutorial.net/</a:t>
+            </a:r>
+            <a:endParaRPr lang="en-US" dirty="0"/>
+          </a:p>
+          <a:p>
+            <a:r>
+              <a:rPr lang="en-US" dirty="0"/>
+              <a:t>Questions?</a:t>
+            </a:r>
+          </a:p>
+          <a:p>
+            <a:pPr lvl="1"/>
+            <a:r>
+              <a:rPr lang="en-US" dirty="0">
+                <a:hlinkClick r:id="rId8"/>
+              </a:rPr>
+              <a:t>seanpsexton@gmail.com</a:t>
+            </a:r>
+            <a:r>
+              <a:rPr lang="en-US" dirty="0"/>
+              <a:t> </a:t>
+            </a:r>
+          </a:p>
+        </p:txBody>
+      </p:sp>
+    </p:spTree>
+    <p:extLst>
+      <p:ext uri="{BB962C8B-B14F-4D97-AF65-F5344CB8AC3E}">
+        <p14:creationId xmlns:p14="http://schemas.microsoft.com/office/powerpoint/2010/main" val="3398622978"/>
+      </p:ext>
+    </p:extLst>
+  </p:cSld>
+  <p:clrMapOvr>
+    <a:masterClrMapping/>
+  </p:clrMapOvr>
 </p:sld>
 </file>
 

</xml_diff>